<commit_message>
Deployed fc3cea2 with MkDocs version: 1.0.4
</commit_message>
<xml_diff>
--- a/mm2-diagrams.pptx
+++ b/mm2-diagrams.pptx
@@ -6,10 +6,10 @@
     <p:sldMasterId id="2147483943" r:id="rId2"/>
   </p:sldMasterIdLst>
   <p:notesMasterIdLst>
-    <p:notesMasterId r:id="rId14"/>
+    <p:notesMasterId r:id="rId15"/>
   </p:notesMasterIdLst>
   <p:handoutMasterIdLst>
-    <p:handoutMasterId r:id="rId15"/>
+    <p:handoutMasterId r:id="rId16"/>
   </p:handoutMasterIdLst>
   <p:sldIdLst>
     <p:sldId id="141169016" r:id="rId3"/>
@@ -22,7 +22,8 @@
     <p:sldId id="141169002" r:id="rId10"/>
     <p:sldId id="141168520" r:id="rId11"/>
     <p:sldId id="141168521" r:id="rId12"/>
-    <p:sldId id="141169017" r:id="rId13"/>
+    <p:sldId id="141169019" r:id="rId13"/>
+    <p:sldId id="141169017" r:id="rId14"/>
   </p:sldIdLst>
   <p:sldSz cx="9144000" cy="5143500" type="screen16x9"/>
   <p:notesSz cx="6858000" cy="9144000"/>
@@ -225,7 +226,7 @@
           <a:p>
             <a:fld id="{43B1B1F9-D0CB-FF4D-BEE0-BED1F1FDA196}" type="datetimeFigureOut">
               <a:rPr lang="en-US" smtClean="0"/>
-              <a:t>3/18/20</a:t>
+              <a:t>3/25/20</a:t>
             </a:fld>
             <a:endParaRPr lang="en-US"/>
           </a:p>
@@ -390,7 +391,7 @@
           <a:p>
             <a:fld id="{26BE012A-D992-5D42-B86E-AA2BC0764EE1}" type="datetimeFigureOut">
               <a:rPr lang="en-US" smtClean="0"/>
-              <a:t>3/18/20</a:t>
+              <a:t>3/25/20</a:t>
             </a:fld>
             <a:endParaRPr lang="en-US"/>
           </a:p>
@@ -2771,14 +2772,14 @@
           </a:ln>
           <a:extLst>
             <a:ext uri="{909E8E84-426E-40dd-AFC4-6F175D3DCCD1}">
-              <a14:hiddenFill xmlns="" xmlns:a14="http://schemas.microsoft.com/office/drawing/2010/main">
+              <a14:hiddenFill xmlns:a14="http://schemas.microsoft.com/office/drawing/2010/main" xmlns="">
                 <a:solidFill>
                   <a:srgbClr val="FFFFFF"/>
                 </a:solidFill>
               </a14:hiddenFill>
             </a:ext>
             <a:ext uri="{91240B29-F687-4f45-9708-019B960494DF}">
-              <a14:hiddenLine xmlns="" xmlns:a14="http://schemas.microsoft.com/office/drawing/2010/main" w="9525">
+              <a14:hiddenLine xmlns:a14="http://schemas.microsoft.com/office/drawing/2010/main" xmlns="" w="9525">
                 <a:solidFill>
                   <a:srgbClr val="000000"/>
                 </a:solidFill>
@@ -2830,14 +2831,14 @@
           <a:effectLst/>
           <a:extLst>
             <a:ext uri="{909E8E84-426E-40dd-AFC4-6F175D3DCCD1}">
-              <a14:hiddenFill xmlns="" xmlns:a14="http://schemas.microsoft.com/office/drawing/2010/main">
+              <a14:hiddenFill xmlns:a14="http://schemas.microsoft.com/office/drawing/2010/main" xmlns="">
                 <a:solidFill>
                   <a:schemeClr val="accent1"/>
                 </a:solidFill>
               </a14:hiddenFill>
             </a:ext>
             <a:ext uri="{91240B29-F687-4f45-9708-019B960494DF}">
-              <a14:hiddenLine xmlns="" xmlns:a14="http://schemas.microsoft.com/office/drawing/2010/main" w="9525">
+              <a14:hiddenLine xmlns:a14="http://schemas.microsoft.com/office/drawing/2010/main" xmlns="" w="9525">
                 <a:solidFill>
                   <a:schemeClr val="tx1"/>
                 </a:solidFill>
@@ -2847,7 +2848,7 @@
               </a14:hiddenLine>
             </a:ext>
             <a:ext uri="{AF507438-7753-43e0-B8FC-AC1667EBCBE1}">
-              <a14:hiddenEffects xmlns="" xmlns:a14="http://schemas.microsoft.com/office/drawing/2010/main">
+              <a14:hiddenEffects xmlns:a14="http://schemas.microsoft.com/office/drawing/2010/main" xmlns="">
                 <a:effectLst>
                   <a:outerShdw blurRad="63500" dist="38099" dir="2700000" algn="ctr" rotWithShape="0">
                     <a:schemeClr val="bg2">
@@ -3563,10 +3564,10 @@
           </a:ln>
           <a:extLst>
             <a:ext uri="{FAA26D3D-D897-4be2-8F04-BA451C77F1D7}">
-              <ma14:placeholderFlag xmlns:ma14="http://schemas.microsoft.com/office/mac/drawingml/2011/main" xmlns="" val="1"/>
+              <ma14:placeholderFlag xmlns="" xmlns:ma14="http://schemas.microsoft.com/office/mac/drawingml/2011/main" val="1"/>
             </a:ext>
             <a:ext uri="{909E8E84-426E-40dd-AFC4-6F175D3DCCD1}">
-              <a14:hiddenFill xmlns:a14="http://schemas.microsoft.com/office/drawing/2010/main" xmlns="">
+              <a14:hiddenFill xmlns="" xmlns:a14="http://schemas.microsoft.com/office/drawing/2010/main">
                 <a:solidFill>
                   <a:srgbClr val="FFFFFF"/>
                 </a:solidFill>
@@ -3617,10 +3618,10 @@
           </a:ln>
           <a:extLst>
             <a:ext uri="{FAA26D3D-D897-4be2-8F04-BA451C77F1D7}">
-              <ma14:placeholderFlag xmlns:ma14="http://schemas.microsoft.com/office/mac/drawingml/2011/main" xmlns="" val="1"/>
+              <ma14:placeholderFlag xmlns="" xmlns:ma14="http://schemas.microsoft.com/office/mac/drawingml/2011/main" val="1"/>
             </a:ext>
             <a:ext uri="{909E8E84-426E-40dd-AFC4-6F175D3DCCD1}">
-              <a14:hiddenFill xmlns:a14="http://schemas.microsoft.com/office/drawing/2010/main" xmlns="">
+              <a14:hiddenFill xmlns="" xmlns:a14="http://schemas.microsoft.com/office/drawing/2010/main">
                 <a:solidFill>
                   <a:srgbClr val="FFFFFF"/>
                 </a:solidFill>
@@ -7820,7 +7821,7 @@
           <p:cNvPr id="2" name="Title 1">
             <a:extLst>
               <a:ext uri="{FF2B5EF4-FFF2-40B4-BE49-F238E27FC236}">
-                <a16:creationId xmlns:a16="http://schemas.microsoft.com/office/drawing/2014/main" id="{58169065-201E-5F42-BB75-6EA30E0A8D38}"/>
+                <a16:creationId xmlns:a16="http://schemas.microsoft.com/office/drawing/2014/main" id="{7DD0824B-9D29-3747-BFBA-533EF2DF6980}"/>
               </a:ext>
             </a:extLst>
           </p:cNvPr>
@@ -7838,6 +7839,2563 @@
           <a:p>
             <a:r>
               <a:rPr lang="en-US" dirty="0"/>
+              <a:t>Performance Test</a:t>
+            </a:r>
+          </a:p>
+        </p:txBody>
+      </p:sp>
+      <p:sp>
+        <p:nvSpPr>
+          <p:cNvPr id="4" name="Slide Number Placeholder 3">
+            <a:extLst>
+              <a:ext uri="{FF2B5EF4-FFF2-40B4-BE49-F238E27FC236}">
+                <a16:creationId xmlns:a16="http://schemas.microsoft.com/office/drawing/2014/main" id="{223BEDBE-0C1E-504D-8318-92C91D8D607F}"/>
+              </a:ext>
+            </a:extLst>
+          </p:cNvPr>
+          <p:cNvSpPr>
+            <a:spLocks noGrp="1"/>
+          </p:cNvSpPr>
+          <p:nvPr>
+            <p:ph type="sldNum" sz="quarter" idx="12"/>
+          </p:nvPr>
+        </p:nvSpPr>
+        <p:spPr>
+          <a:xfrm>
+            <a:off x="11383211" y="6441552"/>
+            <a:ext cx="533845" cy="365125"/>
+          </a:xfrm>
+          <a:prstGeom prst="rect">
+            <a:avLst/>
+          </a:prstGeom>
+        </p:spPr>
+        <p:txBody>
+          <a:bodyPr vert="horz" lIns="91440" tIns="45720" rIns="91440" bIns="45720" rtlCol="0" anchor="ctr"/>
+          <a:lstStyle>
+            <a:defPPr>
+              <a:defRPr lang="en-US"/>
+            </a:defPPr>
+            <a:lvl1pPr algn="r" rtl="0" eaLnBrk="0" fontAlgn="base" hangingPunct="0">
+              <a:spcBef>
+                <a:spcPct val="0"/>
+              </a:spcBef>
+              <a:spcAft>
+                <a:spcPct val="0"/>
+              </a:spcAft>
+              <a:defRPr sz="1200" kern="1200">
+                <a:solidFill>
+                  <a:schemeClr val="tx1"/>
+                </a:solidFill>
+                <a:latin typeface="Arial" panose="020B0604020202020204" pitchFamily="34" charset="0"/>
+                <a:ea typeface="+mn-ea"/>
+                <a:cs typeface="Arial" panose="020B0604020202020204" pitchFamily="34" charset="0"/>
+              </a:defRPr>
+            </a:lvl1pPr>
+            <a:lvl2pPr marL="457071" algn="l" rtl="0" eaLnBrk="0" fontAlgn="base" hangingPunct="0">
+              <a:spcBef>
+                <a:spcPct val="0"/>
+              </a:spcBef>
+              <a:spcAft>
+                <a:spcPct val="0"/>
+              </a:spcAft>
+              <a:defRPr kern="1200">
+                <a:solidFill>
+                  <a:schemeClr val="tx1"/>
+                </a:solidFill>
+                <a:latin typeface="Arial" panose="020B0604020202020204" pitchFamily="34" charset="0"/>
+                <a:ea typeface="+mn-ea"/>
+                <a:cs typeface="Arial" panose="020B0604020202020204" pitchFamily="34" charset="0"/>
+              </a:defRPr>
+            </a:lvl2pPr>
+            <a:lvl3pPr marL="914150" algn="l" rtl="0" eaLnBrk="0" fontAlgn="base" hangingPunct="0">
+              <a:spcBef>
+                <a:spcPct val="0"/>
+              </a:spcBef>
+              <a:spcAft>
+                <a:spcPct val="0"/>
+              </a:spcAft>
+              <a:defRPr kern="1200">
+                <a:solidFill>
+                  <a:schemeClr val="tx1"/>
+                </a:solidFill>
+                <a:latin typeface="Arial" panose="020B0604020202020204" pitchFamily="34" charset="0"/>
+                <a:ea typeface="+mn-ea"/>
+                <a:cs typeface="Arial" panose="020B0604020202020204" pitchFamily="34" charset="0"/>
+              </a:defRPr>
+            </a:lvl3pPr>
+            <a:lvl4pPr marL="1371226" algn="l" rtl="0" eaLnBrk="0" fontAlgn="base" hangingPunct="0">
+              <a:spcBef>
+                <a:spcPct val="0"/>
+              </a:spcBef>
+              <a:spcAft>
+                <a:spcPct val="0"/>
+              </a:spcAft>
+              <a:defRPr kern="1200">
+                <a:solidFill>
+                  <a:schemeClr val="tx1"/>
+                </a:solidFill>
+                <a:latin typeface="Arial" panose="020B0604020202020204" pitchFamily="34" charset="0"/>
+                <a:ea typeface="+mn-ea"/>
+                <a:cs typeface="Arial" panose="020B0604020202020204" pitchFamily="34" charset="0"/>
+              </a:defRPr>
+            </a:lvl4pPr>
+            <a:lvl5pPr marL="1828301" algn="l" rtl="0" eaLnBrk="0" fontAlgn="base" hangingPunct="0">
+              <a:spcBef>
+                <a:spcPct val="0"/>
+              </a:spcBef>
+              <a:spcAft>
+                <a:spcPct val="0"/>
+              </a:spcAft>
+              <a:defRPr kern="1200">
+                <a:solidFill>
+                  <a:schemeClr val="tx1"/>
+                </a:solidFill>
+                <a:latin typeface="Arial" panose="020B0604020202020204" pitchFamily="34" charset="0"/>
+                <a:ea typeface="+mn-ea"/>
+                <a:cs typeface="Arial" panose="020B0604020202020204" pitchFamily="34" charset="0"/>
+              </a:defRPr>
+            </a:lvl5pPr>
+            <a:lvl6pPr marL="2285382" algn="l" defTabSz="914150" rtl="0" eaLnBrk="1" latinLnBrk="0" hangingPunct="1">
+              <a:defRPr kern="1200">
+                <a:solidFill>
+                  <a:schemeClr val="tx1"/>
+                </a:solidFill>
+                <a:latin typeface="Arial" panose="020B0604020202020204" pitchFamily="34" charset="0"/>
+                <a:ea typeface="+mn-ea"/>
+                <a:cs typeface="Arial" panose="020B0604020202020204" pitchFamily="34" charset="0"/>
+              </a:defRPr>
+            </a:lvl6pPr>
+            <a:lvl7pPr marL="2742450" algn="l" defTabSz="914150" rtl="0" eaLnBrk="1" latinLnBrk="0" hangingPunct="1">
+              <a:defRPr kern="1200">
+                <a:solidFill>
+                  <a:schemeClr val="tx1"/>
+                </a:solidFill>
+                <a:latin typeface="Arial" panose="020B0604020202020204" pitchFamily="34" charset="0"/>
+                <a:ea typeface="+mn-ea"/>
+                <a:cs typeface="Arial" panose="020B0604020202020204" pitchFamily="34" charset="0"/>
+              </a:defRPr>
+            </a:lvl7pPr>
+            <a:lvl8pPr marL="3199520" algn="l" defTabSz="914150" rtl="0" eaLnBrk="1" latinLnBrk="0" hangingPunct="1">
+              <a:defRPr kern="1200">
+                <a:solidFill>
+                  <a:schemeClr val="tx1"/>
+                </a:solidFill>
+                <a:latin typeface="Arial" panose="020B0604020202020204" pitchFamily="34" charset="0"/>
+                <a:ea typeface="+mn-ea"/>
+                <a:cs typeface="Arial" panose="020B0604020202020204" pitchFamily="34" charset="0"/>
+              </a:defRPr>
+            </a:lvl8pPr>
+            <a:lvl9pPr marL="3656591" algn="l" defTabSz="914150" rtl="0" eaLnBrk="1" latinLnBrk="0" hangingPunct="1">
+              <a:defRPr kern="1200">
+                <a:solidFill>
+                  <a:schemeClr val="tx1"/>
+                </a:solidFill>
+                <a:latin typeface="Arial" panose="020B0604020202020204" pitchFamily="34" charset="0"/>
+                <a:ea typeface="+mn-ea"/>
+                <a:cs typeface="Arial" panose="020B0604020202020204" pitchFamily="34" charset="0"/>
+              </a:defRPr>
+            </a:lvl9pPr>
+          </a:lstStyle>
+          <a:p>
+            <a:fld id="{E9549862-13E2-C34D-815E-8545BD36FC59}" type="slidenum">
+              <a:rPr lang="en-US" smtClean="0">
+                <a:solidFill>
+                  <a:srgbClr val="6D7777"/>
+                </a:solidFill>
+              </a:rPr>
+              <a:pPr/>
+              <a:t>11</a:t>
+            </a:fld>
+            <a:endParaRPr lang="en-US">
+              <a:solidFill>
+                <a:srgbClr val="6D7777"/>
+              </a:solidFill>
+            </a:endParaRPr>
+          </a:p>
+        </p:txBody>
+      </p:sp>
+      <p:sp>
+        <p:nvSpPr>
+          <p:cNvPr id="5" name="Rectangle 4">
+            <a:extLst>
+              <a:ext uri="{FF2B5EF4-FFF2-40B4-BE49-F238E27FC236}">
+                <a16:creationId xmlns:a16="http://schemas.microsoft.com/office/drawing/2014/main" id="{A0F8AA87-8AA4-D045-B050-ED7AC92CDFC1}"/>
+              </a:ext>
+            </a:extLst>
+          </p:cNvPr>
+          <p:cNvSpPr/>
+          <p:nvPr/>
+        </p:nvSpPr>
+        <p:spPr>
+          <a:xfrm>
+            <a:off x="298411" y="1073443"/>
+            <a:ext cx="4008458" cy="2996614"/>
+          </a:xfrm>
+          <a:prstGeom prst="rect">
+            <a:avLst/>
+          </a:prstGeom>
+          <a:noFill/>
+          <a:ln>
+            <a:solidFill>
+              <a:srgbClr val="0000FF"/>
+            </a:solidFill>
+            <a:prstDash val="dash"/>
+          </a:ln>
+        </p:spPr>
+        <p:style>
+          <a:lnRef idx="2">
+            <a:schemeClr val="accent1">
+              <a:shade val="50000"/>
+            </a:schemeClr>
+          </a:lnRef>
+          <a:fillRef idx="1">
+            <a:schemeClr val="accent1"/>
+          </a:fillRef>
+          <a:effectRef idx="0">
+            <a:schemeClr val="accent1"/>
+          </a:effectRef>
+          <a:fontRef idx="minor">
+            <a:schemeClr val="lt1"/>
+          </a:fontRef>
+        </p:style>
+        <p:txBody>
+          <a:bodyPr rtlCol="0" anchor="t"/>
+          <a:lstStyle/>
+          <a:p>
+            <a:pPr algn="ctr" defTabSz="514350"/>
+            <a:r>
+              <a:rPr lang="en-US" sz="750" b="1">
+                <a:solidFill>
+                  <a:srgbClr val="0000FF"/>
+                </a:solidFill>
+                <a:latin typeface="Arial"/>
+              </a:rPr>
+              <a:t>On-Premise Environment</a:t>
+            </a:r>
+          </a:p>
+        </p:txBody>
+      </p:sp>
+      <p:sp>
+        <p:nvSpPr>
+          <p:cNvPr id="6" name="Rectangle 5">
+            <a:extLst>
+              <a:ext uri="{FF2B5EF4-FFF2-40B4-BE49-F238E27FC236}">
+                <a16:creationId xmlns:a16="http://schemas.microsoft.com/office/drawing/2014/main" id="{90B1E0CB-CD1E-D14F-9238-763E6AF8FC20}"/>
+              </a:ext>
+            </a:extLst>
+          </p:cNvPr>
+          <p:cNvSpPr/>
+          <p:nvPr/>
+        </p:nvSpPr>
+        <p:spPr>
+          <a:xfrm>
+            <a:off x="4710303" y="1073443"/>
+            <a:ext cx="3747898" cy="2996614"/>
+          </a:xfrm>
+          <a:prstGeom prst="rect">
+            <a:avLst/>
+          </a:prstGeom>
+          <a:noFill/>
+          <a:ln>
+            <a:solidFill>
+              <a:srgbClr val="00B050"/>
+            </a:solidFill>
+            <a:prstDash val="dash"/>
+          </a:ln>
+        </p:spPr>
+        <p:style>
+          <a:lnRef idx="2">
+            <a:schemeClr val="accent1">
+              <a:shade val="50000"/>
+            </a:schemeClr>
+          </a:lnRef>
+          <a:fillRef idx="1">
+            <a:schemeClr val="accent1"/>
+          </a:fillRef>
+          <a:effectRef idx="0">
+            <a:schemeClr val="accent1"/>
+          </a:effectRef>
+          <a:fontRef idx="minor">
+            <a:schemeClr val="lt1"/>
+          </a:fontRef>
+        </p:style>
+        <p:txBody>
+          <a:bodyPr rtlCol="0" anchor="t"/>
+          <a:lstStyle/>
+          <a:p>
+            <a:pPr algn="ctr" defTabSz="514350"/>
+            <a:r>
+              <a:rPr lang="en-US" sz="750" b="1">
+                <a:solidFill>
+                  <a:srgbClr val="00B050"/>
+                </a:solidFill>
+                <a:latin typeface="Arial"/>
+              </a:rPr>
+              <a:t>IBM Cloud</a:t>
+            </a:r>
+          </a:p>
+        </p:txBody>
+      </p:sp>
+      <p:sp>
+        <p:nvSpPr>
+          <p:cNvPr id="8" name="Rounded Rectangle 7">
+            <a:extLst>
+              <a:ext uri="{FF2B5EF4-FFF2-40B4-BE49-F238E27FC236}">
+                <a16:creationId xmlns:a16="http://schemas.microsoft.com/office/drawing/2014/main" id="{AF5BE487-0468-A243-9C73-9209F84D654B}"/>
+              </a:ext>
+            </a:extLst>
+          </p:cNvPr>
+          <p:cNvSpPr/>
+          <p:nvPr/>
+        </p:nvSpPr>
+        <p:spPr bwMode="auto">
+          <a:xfrm>
+            <a:off x="5547599" y="1634579"/>
+            <a:ext cx="138128" cy="411476"/>
+          </a:xfrm>
+          <a:prstGeom prst="roundRect">
+            <a:avLst/>
+          </a:prstGeom>
+          <a:solidFill>
+            <a:schemeClr val="bg1">
+              <a:lumMod val="50000"/>
+            </a:schemeClr>
+          </a:solidFill>
+          <a:ln>
+            <a:solidFill>
+              <a:schemeClr val="bg1"/>
+            </a:solidFill>
+            <a:prstDash val="solid"/>
+            <a:headEnd type="none" w="med" len="med"/>
+            <a:tailEnd type="none" w="med" len="med"/>
+          </a:ln>
+          <a:effectLst/>
+        </p:spPr>
+        <p:style>
+          <a:lnRef idx="1">
+            <a:schemeClr val="accent5"/>
+          </a:lnRef>
+          <a:fillRef idx="3">
+            <a:schemeClr val="accent5"/>
+          </a:fillRef>
+          <a:effectRef idx="2">
+            <a:schemeClr val="accent5"/>
+          </a:effectRef>
+          <a:fontRef idx="minor">
+            <a:schemeClr val="lt1"/>
+          </a:fontRef>
+        </p:style>
+        <p:txBody>
+          <a:bodyPr vert="horz" wrap="square" lIns="0" tIns="0" rIns="0" bIns="0" numCol="1" rtlCol="0" anchor="ctr" anchorCtr="0" compatLnSpc="1">
+            <a:prstTxWarp prst="textNoShape">
+              <a:avLst/>
+            </a:prstTxWarp>
+            <a:noAutofit/>
+          </a:bodyPr>
+          <a:lstStyle/>
+          <a:p>
+            <a:pPr algn="ctr" defTabSz="685784" fontAlgn="base">
+              <a:lnSpc>
+                <a:spcPct val="90000"/>
+              </a:lnSpc>
+              <a:spcBef>
+                <a:spcPct val="0"/>
+              </a:spcBef>
+              <a:spcAft>
+                <a:spcPct val="0"/>
+              </a:spcAft>
+            </a:pPr>
+            <a:r>
+              <a:rPr lang="en-US" sz="675">
+                <a:solidFill>
+                  <a:schemeClr val="bg1"/>
+                </a:solidFill>
+              </a:rPr>
+              <a:t>0</a:t>
+            </a:r>
+            <a:endParaRPr lang="en-US" sz="375">
+              <a:solidFill>
+                <a:schemeClr val="bg1"/>
+              </a:solidFill>
+            </a:endParaRPr>
+          </a:p>
+        </p:txBody>
+      </p:sp>
+      <p:sp>
+        <p:nvSpPr>
+          <p:cNvPr id="9" name="Rounded Rectangle 8">
+            <a:extLst>
+              <a:ext uri="{FF2B5EF4-FFF2-40B4-BE49-F238E27FC236}">
+                <a16:creationId xmlns:a16="http://schemas.microsoft.com/office/drawing/2014/main" id="{D5E58477-E1E3-594C-AF48-F4CA8530EABE}"/>
+              </a:ext>
+            </a:extLst>
+          </p:cNvPr>
+          <p:cNvSpPr/>
+          <p:nvPr/>
+        </p:nvSpPr>
+        <p:spPr bwMode="auto">
+          <a:xfrm>
+            <a:off x="5684757" y="1634579"/>
+            <a:ext cx="138128" cy="411476"/>
+          </a:xfrm>
+          <a:prstGeom prst="roundRect">
+            <a:avLst/>
+          </a:prstGeom>
+          <a:solidFill>
+            <a:schemeClr val="bg1">
+              <a:lumMod val="50000"/>
+            </a:schemeClr>
+          </a:solidFill>
+          <a:ln>
+            <a:solidFill>
+              <a:schemeClr val="bg1"/>
+            </a:solidFill>
+            <a:prstDash val="solid"/>
+            <a:headEnd type="none" w="med" len="med"/>
+            <a:tailEnd type="none" w="med" len="med"/>
+          </a:ln>
+          <a:effectLst/>
+        </p:spPr>
+        <p:style>
+          <a:lnRef idx="1">
+            <a:schemeClr val="accent5"/>
+          </a:lnRef>
+          <a:fillRef idx="3">
+            <a:schemeClr val="accent5"/>
+          </a:fillRef>
+          <a:effectRef idx="2">
+            <a:schemeClr val="accent5"/>
+          </a:effectRef>
+          <a:fontRef idx="minor">
+            <a:schemeClr val="lt1"/>
+          </a:fontRef>
+        </p:style>
+        <p:txBody>
+          <a:bodyPr vert="horz" wrap="square" lIns="0" tIns="0" rIns="0" bIns="0" numCol="1" rtlCol="0" anchor="ctr" anchorCtr="0" compatLnSpc="1">
+            <a:prstTxWarp prst="textNoShape">
+              <a:avLst/>
+            </a:prstTxWarp>
+            <a:noAutofit/>
+          </a:bodyPr>
+          <a:lstStyle/>
+          <a:p>
+            <a:pPr algn="ctr" defTabSz="685784" fontAlgn="base">
+              <a:lnSpc>
+                <a:spcPct val="90000"/>
+              </a:lnSpc>
+              <a:spcBef>
+                <a:spcPct val="0"/>
+              </a:spcBef>
+              <a:spcAft>
+                <a:spcPct val="0"/>
+              </a:spcAft>
+            </a:pPr>
+            <a:r>
+              <a:rPr lang="en-US" sz="675">
+                <a:solidFill>
+                  <a:schemeClr val="bg1"/>
+                </a:solidFill>
+              </a:rPr>
+              <a:t>1</a:t>
+            </a:r>
+            <a:endParaRPr lang="en-US" sz="375">
+              <a:solidFill>
+                <a:schemeClr val="bg1"/>
+              </a:solidFill>
+            </a:endParaRPr>
+          </a:p>
+        </p:txBody>
+      </p:sp>
+      <p:sp>
+        <p:nvSpPr>
+          <p:cNvPr id="10" name="Rounded Rectangle 9">
+            <a:extLst>
+              <a:ext uri="{FF2B5EF4-FFF2-40B4-BE49-F238E27FC236}">
+                <a16:creationId xmlns:a16="http://schemas.microsoft.com/office/drawing/2014/main" id="{F7310BC1-71B2-BD47-95DA-A5A9F09D389B}"/>
+              </a:ext>
+            </a:extLst>
+          </p:cNvPr>
+          <p:cNvSpPr/>
+          <p:nvPr/>
+        </p:nvSpPr>
+        <p:spPr bwMode="auto">
+          <a:xfrm>
+            <a:off x="5822886" y="1634579"/>
+            <a:ext cx="138128" cy="411476"/>
+          </a:xfrm>
+          <a:prstGeom prst="roundRect">
+            <a:avLst/>
+          </a:prstGeom>
+          <a:solidFill>
+            <a:schemeClr val="bg1">
+              <a:lumMod val="50000"/>
+            </a:schemeClr>
+          </a:solidFill>
+          <a:ln>
+            <a:solidFill>
+              <a:schemeClr val="bg1"/>
+            </a:solidFill>
+            <a:prstDash val="solid"/>
+            <a:headEnd type="none" w="med" len="med"/>
+            <a:tailEnd type="none" w="med" len="med"/>
+          </a:ln>
+          <a:effectLst/>
+        </p:spPr>
+        <p:style>
+          <a:lnRef idx="1">
+            <a:schemeClr val="accent5"/>
+          </a:lnRef>
+          <a:fillRef idx="3">
+            <a:schemeClr val="accent5"/>
+          </a:fillRef>
+          <a:effectRef idx="2">
+            <a:schemeClr val="accent5"/>
+          </a:effectRef>
+          <a:fontRef idx="minor">
+            <a:schemeClr val="lt1"/>
+          </a:fontRef>
+        </p:style>
+        <p:txBody>
+          <a:bodyPr vert="horz" wrap="square" lIns="0" tIns="0" rIns="0" bIns="0" numCol="1" rtlCol="0" anchor="ctr" anchorCtr="0" compatLnSpc="1">
+            <a:prstTxWarp prst="textNoShape">
+              <a:avLst/>
+            </a:prstTxWarp>
+            <a:noAutofit/>
+          </a:bodyPr>
+          <a:lstStyle/>
+          <a:p>
+            <a:pPr algn="ctr" defTabSz="685784" fontAlgn="base">
+              <a:lnSpc>
+                <a:spcPct val="90000"/>
+              </a:lnSpc>
+              <a:spcBef>
+                <a:spcPct val="0"/>
+              </a:spcBef>
+              <a:spcAft>
+                <a:spcPct val="0"/>
+              </a:spcAft>
+            </a:pPr>
+            <a:r>
+              <a:rPr lang="en-US" sz="675">
+                <a:solidFill>
+                  <a:schemeClr val="bg1"/>
+                </a:solidFill>
+              </a:rPr>
+              <a:t>2</a:t>
+            </a:r>
+            <a:endParaRPr lang="en-US" sz="375">
+              <a:solidFill>
+                <a:schemeClr val="bg1"/>
+              </a:solidFill>
+            </a:endParaRPr>
+          </a:p>
+        </p:txBody>
+      </p:sp>
+      <p:sp>
+        <p:nvSpPr>
+          <p:cNvPr id="11" name="Rounded Rectangle 10">
+            <a:extLst>
+              <a:ext uri="{FF2B5EF4-FFF2-40B4-BE49-F238E27FC236}">
+                <a16:creationId xmlns:a16="http://schemas.microsoft.com/office/drawing/2014/main" id="{B6291CC4-0B45-D044-90E7-3543E7A968CF}"/>
+              </a:ext>
+            </a:extLst>
+          </p:cNvPr>
+          <p:cNvSpPr/>
+          <p:nvPr/>
+        </p:nvSpPr>
+        <p:spPr bwMode="auto">
+          <a:xfrm>
+            <a:off x="5960044" y="1634579"/>
+            <a:ext cx="138128" cy="411476"/>
+          </a:xfrm>
+          <a:prstGeom prst="roundRect">
+            <a:avLst/>
+          </a:prstGeom>
+          <a:solidFill>
+            <a:schemeClr val="bg1">
+              <a:lumMod val="50000"/>
+            </a:schemeClr>
+          </a:solidFill>
+          <a:ln>
+            <a:solidFill>
+              <a:schemeClr val="bg1"/>
+            </a:solidFill>
+            <a:prstDash val="solid"/>
+            <a:headEnd type="none" w="med" len="med"/>
+            <a:tailEnd type="none" w="med" len="med"/>
+          </a:ln>
+          <a:effectLst/>
+        </p:spPr>
+        <p:style>
+          <a:lnRef idx="1">
+            <a:schemeClr val="accent5"/>
+          </a:lnRef>
+          <a:fillRef idx="3">
+            <a:schemeClr val="accent5"/>
+          </a:fillRef>
+          <a:effectRef idx="2">
+            <a:schemeClr val="accent5"/>
+          </a:effectRef>
+          <a:fontRef idx="minor">
+            <a:schemeClr val="lt1"/>
+          </a:fontRef>
+        </p:style>
+        <p:txBody>
+          <a:bodyPr vert="horz" wrap="square" lIns="0" tIns="0" rIns="0" bIns="0" numCol="1" rtlCol="0" anchor="ctr" anchorCtr="0" compatLnSpc="1">
+            <a:prstTxWarp prst="textNoShape">
+              <a:avLst/>
+            </a:prstTxWarp>
+            <a:noAutofit/>
+          </a:bodyPr>
+          <a:lstStyle/>
+          <a:p>
+            <a:pPr algn="ctr" defTabSz="685784" fontAlgn="base">
+              <a:lnSpc>
+                <a:spcPct val="90000"/>
+              </a:lnSpc>
+              <a:spcBef>
+                <a:spcPct val="0"/>
+              </a:spcBef>
+              <a:spcAft>
+                <a:spcPct val="0"/>
+              </a:spcAft>
+            </a:pPr>
+            <a:r>
+              <a:rPr lang="en-US" sz="675">
+                <a:solidFill>
+                  <a:schemeClr val="bg1"/>
+                </a:solidFill>
+              </a:rPr>
+              <a:t>3</a:t>
+            </a:r>
+            <a:endParaRPr lang="en-US" sz="375">
+              <a:solidFill>
+                <a:schemeClr val="bg1"/>
+              </a:solidFill>
+            </a:endParaRPr>
+          </a:p>
+        </p:txBody>
+      </p:sp>
+      <p:sp>
+        <p:nvSpPr>
+          <p:cNvPr id="12" name="Rounded Rectangle 11">
+            <a:extLst>
+              <a:ext uri="{FF2B5EF4-FFF2-40B4-BE49-F238E27FC236}">
+                <a16:creationId xmlns:a16="http://schemas.microsoft.com/office/drawing/2014/main" id="{94EF47BB-26F6-B343-B071-171636EE579D}"/>
+              </a:ext>
+            </a:extLst>
+          </p:cNvPr>
+          <p:cNvSpPr/>
+          <p:nvPr/>
+        </p:nvSpPr>
+        <p:spPr bwMode="auto">
+          <a:xfrm>
+            <a:off x="6098172" y="1634579"/>
+            <a:ext cx="138128" cy="411476"/>
+          </a:xfrm>
+          <a:prstGeom prst="roundRect">
+            <a:avLst/>
+          </a:prstGeom>
+          <a:solidFill>
+            <a:schemeClr val="bg1">
+              <a:lumMod val="50000"/>
+            </a:schemeClr>
+          </a:solidFill>
+          <a:ln>
+            <a:solidFill>
+              <a:schemeClr val="bg1"/>
+            </a:solidFill>
+            <a:prstDash val="solid"/>
+            <a:headEnd type="none" w="med" len="med"/>
+            <a:tailEnd type="none" w="med" len="med"/>
+          </a:ln>
+          <a:effectLst/>
+        </p:spPr>
+        <p:style>
+          <a:lnRef idx="1">
+            <a:schemeClr val="accent5"/>
+          </a:lnRef>
+          <a:fillRef idx="3">
+            <a:schemeClr val="accent5"/>
+          </a:fillRef>
+          <a:effectRef idx="2">
+            <a:schemeClr val="accent5"/>
+          </a:effectRef>
+          <a:fontRef idx="minor">
+            <a:schemeClr val="lt1"/>
+          </a:fontRef>
+        </p:style>
+        <p:txBody>
+          <a:bodyPr vert="horz" wrap="square" lIns="0" tIns="0" rIns="0" bIns="0" numCol="1" rtlCol="0" anchor="ctr" anchorCtr="0" compatLnSpc="1">
+            <a:prstTxWarp prst="textNoShape">
+              <a:avLst/>
+            </a:prstTxWarp>
+            <a:noAutofit/>
+          </a:bodyPr>
+          <a:lstStyle/>
+          <a:p>
+            <a:pPr algn="ctr" defTabSz="685784" fontAlgn="base">
+              <a:lnSpc>
+                <a:spcPct val="90000"/>
+              </a:lnSpc>
+              <a:spcBef>
+                <a:spcPct val="0"/>
+              </a:spcBef>
+              <a:spcAft>
+                <a:spcPct val="0"/>
+              </a:spcAft>
+            </a:pPr>
+            <a:r>
+              <a:rPr lang="en-US" sz="675">
+                <a:solidFill>
+                  <a:schemeClr val="bg1"/>
+                </a:solidFill>
+              </a:rPr>
+              <a:t>4</a:t>
+            </a:r>
+            <a:endParaRPr lang="en-US" sz="375">
+              <a:solidFill>
+                <a:schemeClr val="bg1"/>
+              </a:solidFill>
+            </a:endParaRPr>
+          </a:p>
+        </p:txBody>
+      </p:sp>
+      <p:sp>
+        <p:nvSpPr>
+          <p:cNvPr id="13" name="Rounded Rectangle 12">
+            <a:extLst>
+              <a:ext uri="{FF2B5EF4-FFF2-40B4-BE49-F238E27FC236}">
+                <a16:creationId xmlns:a16="http://schemas.microsoft.com/office/drawing/2014/main" id="{00BCA8E7-112B-094B-8994-52A4B5E872FB}"/>
+              </a:ext>
+            </a:extLst>
+          </p:cNvPr>
+          <p:cNvSpPr/>
+          <p:nvPr/>
+        </p:nvSpPr>
+        <p:spPr bwMode="auto">
+          <a:xfrm>
+            <a:off x="6227995" y="1634579"/>
+            <a:ext cx="138128" cy="411476"/>
+          </a:xfrm>
+          <a:prstGeom prst="roundRect">
+            <a:avLst/>
+          </a:prstGeom>
+          <a:solidFill>
+            <a:schemeClr val="bg1">
+              <a:lumMod val="50000"/>
+            </a:schemeClr>
+          </a:solidFill>
+          <a:ln>
+            <a:solidFill>
+              <a:schemeClr val="bg1"/>
+            </a:solidFill>
+            <a:prstDash val="solid"/>
+            <a:headEnd type="none" w="med" len="med"/>
+            <a:tailEnd type="none" w="med" len="med"/>
+          </a:ln>
+          <a:effectLst/>
+        </p:spPr>
+        <p:style>
+          <a:lnRef idx="1">
+            <a:schemeClr val="accent5"/>
+          </a:lnRef>
+          <a:fillRef idx="3">
+            <a:schemeClr val="accent5"/>
+          </a:fillRef>
+          <a:effectRef idx="2">
+            <a:schemeClr val="accent5"/>
+          </a:effectRef>
+          <a:fontRef idx="minor">
+            <a:schemeClr val="lt1"/>
+          </a:fontRef>
+        </p:style>
+        <p:txBody>
+          <a:bodyPr vert="horz" wrap="square" lIns="0" tIns="0" rIns="0" bIns="0" numCol="1" rtlCol="0" anchor="ctr" anchorCtr="0" compatLnSpc="1">
+            <a:prstTxWarp prst="textNoShape">
+              <a:avLst/>
+            </a:prstTxWarp>
+            <a:noAutofit/>
+          </a:bodyPr>
+          <a:lstStyle/>
+          <a:p>
+            <a:pPr algn="ctr" defTabSz="685784" fontAlgn="base">
+              <a:lnSpc>
+                <a:spcPct val="90000"/>
+              </a:lnSpc>
+              <a:spcBef>
+                <a:spcPct val="0"/>
+              </a:spcBef>
+              <a:spcAft>
+                <a:spcPct val="0"/>
+              </a:spcAft>
+            </a:pPr>
+            <a:r>
+              <a:rPr lang="en-US" sz="675">
+                <a:solidFill>
+                  <a:schemeClr val="bg1"/>
+                </a:solidFill>
+              </a:rPr>
+              <a:t>5</a:t>
+            </a:r>
+            <a:endParaRPr lang="en-US" sz="375">
+              <a:solidFill>
+                <a:schemeClr val="bg1"/>
+              </a:solidFill>
+            </a:endParaRPr>
+          </a:p>
+        </p:txBody>
+      </p:sp>
+      <p:sp>
+        <p:nvSpPr>
+          <p:cNvPr id="14" name="AutoShape 4">
+            <a:extLst>
+              <a:ext uri="{FF2B5EF4-FFF2-40B4-BE49-F238E27FC236}">
+                <a16:creationId xmlns:a16="http://schemas.microsoft.com/office/drawing/2014/main" id="{419F5FD2-9DE2-F445-A68B-0CAD344E39B6}"/>
+              </a:ext>
+            </a:extLst>
+          </p:cNvPr>
+          <p:cNvSpPr>
+            <a:spLocks noChangeArrowheads="1"/>
+          </p:cNvSpPr>
+          <p:nvPr/>
+        </p:nvSpPr>
+        <p:spPr bwMode="auto">
+          <a:xfrm>
+            <a:off x="4935506" y="1499732"/>
+            <a:ext cx="3333325" cy="745927"/>
+          </a:xfrm>
+          <a:prstGeom prst="roundRect">
+            <a:avLst>
+              <a:gd name="adj" fmla="val 7117"/>
+            </a:avLst>
+          </a:prstGeom>
+          <a:noFill/>
+          <a:ln w="12700">
+            <a:solidFill>
+              <a:schemeClr val="accent3"/>
+            </a:solidFill>
+            <a:prstDash val="dash"/>
+            <a:round/>
+            <a:headEnd/>
+            <a:tailEnd/>
+          </a:ln>
+        </p:spPr>
+        <p:txBody>
+          <a:bodyPr lIns="0" tIns="0" rIns="0" bIns="0" anchor="b" anchorCtr="1"/>
+          <a:lstStyle/>
+          <a:p>
+            <a:pPr algn="ctr"/>
+            <a:r>
+              <a:rPr lang="en-US" sz="750" dirty="0"/>
+              <a:t>Event Streams Cluster</a:t>
+            </a:r>
+          </a:p>
+        </p:txBody>
+      </p:sp>
+      <p:sp>
+        <p:nvSpPr>
+          <p:cNvPr id="18" name="AutoShape 4">
+            <a:extLst>
+              <a:ext uri="{FF2B5EF4-FFF2-40B4-BE49-F238E27FC236}">
+                <a16:creationId xmlns:a16="http://schemas.microsoft.com/office/drawing/2014/main" id="{211CB3E3-B829-2C4F-A3D6-B13BE7F48F22}"/>
+              </a:ext>
+            </a:extLst>
+          </p:cNvPr>
+          <p:cNvSpPr>
+            <a:spLocks noChangeArrowheads="1"/>
+          </p:cNvSpPr>
+          <p:nvPr/>
+        </p:nvSpPr>
+        <p:spPr bwMode="auto">
+          <a:xfrm>
+            <a:off x="411972" y="1363612"/>
+            <a:ext cx="3611870" cy="2482247"/>
+          </a:xfrm>
+          <a:prstGeom prst="roundRect">
+            <a:avLst>
+              <a:gd name="adj" fmla="val 3325"/>
+            </a:avLst>
+          </a:prstGeom>
+          <a:noFill/>
+          <a:ln w="12700">
+            <a:solidFill>
+              <a:schemeClr val="accent3"/>
+            </a:solidFill>
+            <a:prstDash val="dash"/>
+            <a:round/>
+            <a:headEnd/>
+            <a:tailEnd/>
+          </a:ln>
+        </p:spPr>
+        <p:txBody>
+          <a:bodyPr lIns="0" tIns="0" rIns="0" bIns="0" anchor="b" anchorCtr="1"/>
+          <a:lstStyle/>
+          <a:p>
+            <a:pPr algn="ctr"/>
+            <a:endParaRPr lang="en-US" sz="750"/>
+          </a:p>
+        </p:txBody>
+      </p:sp>
+      <p:sp>
+        <p:nvSpPr>
+          <p:cNvPr id="28" name="Rounded Rectangle 27">
+            <a:extLst>
+              <a:ext uri="{FF2B5EF4-FFF2-40B4-BE49-F238E27FC236}">
+                <a16:creationId xmlns:a16="http://schemas.microsoft.com/office/drawing/2014/main" id="{058E4018-54EF-C241-A10F-9BB485461EFF}"/>
+              </a:ext>
+            </a:extLst>
+          </p:cNvPr>
+          <p:cNvSpPr/>
+          <p:nvPr/>
+        </p:nvSpPr>
+        <p:spPr bwMode="auto">
+          <a:xfrm>
+            <a:off x="1193647" y="1635094"/>
+            <a:ext cx="138128" cy="411476"/>
+          </a:xfrm>
+          <a:prstGeom prst="roundRect">
+            <a:avLst/>
+          </a:prstGeom>
+          <a:solidFill>
+            <a:schemeClr val="bg1">
+              <a:lumMod val="50000"/>
+            </a:schemeClr>
+          </a:solidFill>
+          <a:ln>
+            <a:solidFill>
+              <a:schemeClr val="bg1"/>
+            </a:solidFill>
+            <a:prstDash val="solid"/>
+            <a:headEnd type="none" w="med" len="med"/>
+            <a:tailEnd type="none" w="med" len="med"/>
+          </a:ln>
+          <a:effectLst/>
+        </p:spPr>
+        <p:style>
+          <a:lnRef idx="1">
+            <a:schemeClr val="accent5"/>
+          </a:lnRef>
+          <a:fillRef idx="3">
+            <a:schemeClr val="accent5"/>
+          </a:fillRef>
+          <a:effectRef idx="2">
+            <a:schemeClr val="accent5"/>
+          </a:effectRef>
+          <a:fontRef idx="minor">
+            <a:schemeClr val="lt1"/>
+          </a:fontRef>
+        </p:style>
+        <p:txBody>
+          <a:bodyPr vert="horz" wrap="square" lIns="0" tIns="0" rIns="0" bIns="0" numCol="1" rtlCol="0" anchor="ctr" anchorCtr="0" compatLnSpc="1">
+            <a:prstTxWarp prst="textNoShape">
+              <a:avLst/>
+            </a:prstTxWarp>
+            <a:noAutofit/>
+          </a:bodyPr>
+          <a:lstStyle/>
+          <a:p>
+            <a:pPr algn="ctr" defTabSz="685784" fontAlgn="base">
+              <a:lnSpc>
+                <a:spcPct val="90000"/>
+              </a:lnSpc>
+              <a:spcBef>
+                <a:spcPct val="0"/>
+              </a:spcBef>
+              <a:spcAft>
+                <a:spcPct val="0"/>
+              </a:spcAft>
+            </a:pPr>
+            <a:r>
+              <a:rPr lang="en-US" sz="675">
+                <a:solidFill>
+                  <a:schemeClr val="bg1"/>
+                </a:solidFill>
+              </a:rPr>
+              <a:t>0</a:t>
+            </a:r>
+            <a:endParaRPr lang="en-US" sz="375">
+              <a:solidFill>
+                <a:schemeClr val="bg1"/>
+              </a:solidFill>
+            </a:endParaRPr>
+          </a:p>
+        </p:txBody>
+      </p:sp>
+      <p:sp>
+        <p:nvSpPr>
+          <p:cNvPr id="29" name="Rounded Rectangle 28">
+            <a:extLst>
+              <a:ext uri="{FF2B5EF4-FFF2-40B4-BE49-F238E27FC236}">
+                <a16:creationId xmlns:a16="http://schemas.microsoft.com/office/drawing/2014/main" id="{2DEDB43F-6BDF-F347-95A5-F47AA2B1C71F}"/>
+              </a:ext>
+            </a:extLst>
+          </p:cNvPr>
+          <p:cNvSpPr/>
+          <p:nvPr/>
+        </p:nvSpPr>
+        <p:spPr bwMode="auto">
+          <a:xfrm>
+            <a:off x="1330805" y="1635094"/>
+            <a:ext cx="138128" cy="411476"/>
+          </a:xfrm>
+          <a:prstGeom prst="roundRect">
+            <a:avLst/>
+          </a:prstGeom>
+          <a:solidFill>
+            <a:schemeClr val="bg1">
+              <a:lumMod val="50000"/>
+            </a:schemeClr>
+          </a:solidFill>
+          <a:ln>
+            <a:solidFill>
+              <a:schemeClr val="bg1"/>
+            </a:solidFill>
+            <a:prstDash val="solid"/>
+            <a:headEnd type="none" w="med" len="med"/>
+            <a:tailEnd type="none" w="med" len="med"/>
+          </a:ln>
+          <a:effectLst/>
+        </p:spPr>
+        <p:style>
+          <a:lnRef idx="1">
+            <a:schemeClr val="accent5"/>
+          </a:lnRef>
+          <a:fillRef idx="3">
+            <a:schemeClr val="accent5"/>
+          </a:fillRef>
+          <a:effectRef idx="2">
+            <a:schemeClr val="accent5"/>
+          </a:effectRef>
+          <a:fontRef idx="minor">
+            <a:schemeClr val="lt1"/>
+          </a:fontRef>
+        </p:style>
+        <p:txBody>
+          <a:bodyPr vert="horz" wrap="square" lIns="0" tIns="0" rIns="0" bIns="0" numCol="1" rtlCol="0" anchor="ctr" anchorCtr="0" compatLnSpc="1">
+            <a:prstTxWarp prst="textNoShape">
+              <a:avLst/>
+            </a:prstTxWarp>
+            <a:noAutofit/>
+          </a:bodyPr>
+          <a:lstStyle/>
+          <a:p>
+            <a:pPr algn="ctr" defTabSz="685784" fontAlgn="base">
+              <a:lnSpc>
+                <a:spcPct val="90000"/>
+              </a:lnSpc>
+              <a:spcBef>
+                <a:spcPct val="0"/>
+              </a:spcBef>
+              <a:spcAft>
+                <a:spcPct val="0"/>
+              </a:spcAft>
+            </a:pPr>
+            <a:r>
+              <a:rPr lang="en-US" sz="675">
+                <a:solidFill>
+                  <a:schemeClr val="bg1"/>
+                </a:solidFill>
+              </a:rPr>
+              <a:t>1</a:t>
+            </a:r>
+            <a:endParaRPr lang="en-US" sz="375">
+              <a:solidFill>
+                <a:schemeClr val="bg1"/>
+              </a:solidFill>
+            </a:endParaRPr>
+          </a:p>
+        </p:txBody>
+      </p:sp>
+      <p:sp>
+        <p:nvSpPr>
+          <p:cNvPr id="30" name="Rounded Rectangle 29">
+            <a:extLst>
+              <a:ext uri="{FF2B5EF4-FFF2-40B4-BE49-F238E27FC236}">
+                <a16:creationId xmlns:a16="http://schemas.microsoft.com/office/drawing/2014/main" id="{99244A3B-B483-4E43-A1E9-229B6A27DB31}"/>
+              </a:ext>
+            </a:extLst>
+          </p:cNvPr>
+          <p:cNvSpPr/>
+          <p:nvPr/>
+        </p:nvSpPr>
+        <p:spPr bwMode="auto">
+          <a:xfrm>
+            <a:off x="1468934" y="1635094"/>
+            <a:ext cx="138128" cy="411476"/>
+          </a:xfrm>
+          <a:prstGeom prst="roundRect">
+            <a:avLst/>
+          </a:prstGeom>
+          <a:solidFill>
+            <a:schemeClr val="bg1">
+              <a:lumMod val="50000"/>
+            </a:schemeClr>
+          </a:solidFill>
+          <a:ln>
+            <a:solidFill>
+              <a:schemeClr val="bg1"/>
+            </a:solidFill>
+            <a:prstDash val="solid"/>
+            <a:headEnd type="none" w="med" len="med"/>
+            <a:tailEnd type="none" w="med" len="med"/>
+          </a:ln>
+          <a:effectLst/>
+        </p:spPr>
+        <p:style>
+          <a:lnRef idx="1">
+            <a:schemeClr val="accent5"/>
+          </a:lnRef>
+          <a:fillRef idx="3">
+            <a:schemeClr val="accent5"/>
+          </a:fillRef>
+          <a:effectRef idx="2">
+            <a:schemeClr val="accent5"/>
+          </a:effectRef>
+          <a:fontRef idx="minor">
+            <a:schemeClr val="lt1"/>
+          </a:fontRef>
+        </p:style>
+        <p:txBody>
+          <a:bodyPr vert="horz" wrap="square" lIns="0" tIns="0" rIns="0" bIns="0" numCol="1" rtlCol="0" anchor="ctr" anchorCtr="0" compatLnSpc="1">
+            <a:prstTxWarp prst="textNoShape">
+              <a:avLst/>
+            </a:prstTxWarp>
+            <a:noAutofit/>
+          </a:bodyPr>
+          <a:lstStyle/>
+          <a:p>
+            <a:pPr algn="ctr" defTabSz="685784" fontAlgn="base">
+              <a:lnSpc>
+                <a:spcPct val="90000"/>
+              </a:lnSpc>
+              <a:spcBef>
+                <a:spcPct val="0"/>
+              </a:spcBef>
+              <a:spcAft>
+                <a:spcPct val="0"/>
+              </a:spcAft>
+            </a:pPr>
+            <a:r>
+              <a:rPr lang="en-US" sz="675">
+                <a:solidFill>
+                  <a:schemeClr val="bg1"/>
+                </a:solidFill>
+              </a:rPr>
+              <a:t>2</a:t>
+            </a:r>
+            <a:endParaRPr lang="en-US" sz="375">
+              <a:solidFill>
+                <a:schemeClr val="bg1"/>
+              </a:solidFill>
+            </a:endParaRPr>
+          </a:p>
+        </p:txBody>
+      </p:sp>
+      <p:sp>
+        <p:nvSpPr>
+          <p:cNvPr id="31" name="Rounded Rectangle 30">
+            <a:extLst>
+              <a:ext uri="{FF2B5EF4-FFF2-40B4-BE49-F238E27FC236}">
+                <a16:creationId xmlns:a16="http://schemas.microsoft.com/office/drawing/2014/main" id="{2FC00369-550F-1D47-959E-8E43C24D3F4F}"/>
+              </a:ext>
+            </a:extLst>
+          </p:cNvPr>
+          <p:cNvSpPr/>
+          <p:nvPr/>
+        </p:nvSpPr>
+        <p:spPr bwMode="auto">
+          <a:xfrm>
+            <a:off x="1606093" y="1635094"/>
+            <a:ext cx="138128" cy="411476"/>
+          </a:xfrm>
+          <a:prstGeom prst="roundRect">
+            <a:avLst/>
+          </a:prstGeom>
+          <a:solidFill>
+            <a:schemeClr val="bg1">
+              <a:lumMod val="50000"/>
+            </a:schemeClr>
+          </a:solidFill>
+          <a:ln>
+            <a:solidFill>
+              <a:schemeClr val="bg1"/>
+            </a:solidFill>
+            <a:prstDash val="solid"/>
+            <a:headEnd type="none" w="med" len="med"/>
+            <a:tailEnd type="none" w="med" len="med"/>
+          </a:ln>
+          <a:effectLst/>
+        </p:spPr>
+        <p:style>
+          <a:lnRef idx="1">
+            <a:schemeClr val="accent5"/>
+          </a:lnRef>
+          <a:fillRef idx="3">
+            <a:schemeClr val="accent5"/>
+          </a:fillRef>
+          <a:effectRef idx="2">
+            <a:schemeClr val="accent5"/>
+          </a:effectRef>
+          <a:fontRef idx="minor">
+            <a:schemeClr val="lt1"/>
+          </a:fontRef>
+        </p:style>
+        <p:txBody>
+          <a:bodyPr vert="horz" wrap="square" lIns="0" tIns="0" rIns="0" bIns="0" numCol="1" rtlCol="0" anchor="ctr" anchorCtr="0" compatLnSpc="1">
+            <a:prstTxWarp prst="textNoShape">
+              <a:avLst/>
+            </a:prstTxWarp>
+            <a:noAutofit/>
+          </a:bodyPr>
+          <a:lstStyle/>
+          <a:p>
+            <a:pPr algn="ctr" defTabSz="685784" fontAlgn="base">
+              <a:lnSpc>
+                <a:spcPct val="90000"/>
+              </a:lnSpc>
+              <a:spcBef>
+                <a:spcPct val="0"/>
+              </a:spcBef>
+              <a:spcAft>
+                <a:spcPct val="0"/>
+              </a:spcAft>
+            </a:pPr>
+            <a:r>
+              <a:rPr lang="en-US" sz="675">
+                <a:solidFill>
+                  <a:schemeClr val="bg1"/>
+                </a:solidFill>
+              </a:rPr>
+              <a:t>3</a:t>
+            </a:r>
+            <a:endParaRPr lang="en-US" sz="375">
+              <a:solidFill>
+                <a:schemeClr val="bg1"/>
+              </a:solidFill>
+            </a:endParaRPr>
+          </a:p>
+        </p:txBody>
+      </p:sp>
+      <p:sp>
+        <p:nvSpPr>
+          <p:cNvPr id="32" name="Rounded Rectangle 31">
+            <a:extLst>
+              <a:ext uri="{FF2B5EF4-FFF2-40B4-BE49-F238E27FC236}">
+                <a16:creationId xmlns:a16="http://schemas.microsoft.com/office/drawing/2014/main" id="{CEA02F82-9665-7243-AA5C-E8A8BC93F3C2}"/>
+              </a:ext>
+            </a:extLst>
+          </p:cNvPr>
+          <p:cNvSpPr/>
+          <p:nvPr/>
+        </p:nvSpPr>
+        <p:spPr bwMode="auto">
+          <a:xfrm>
+            <a:off x="1744220" y="1635094"/>
+            <a:ext cx="138128" cy="411476"/>
+          </a:xfrm>
+          <a:prstGeom prst="roundRect">
+            <a:avLst/>
+          </a:prstGeom>
+          <a:solidFill>
+            <a:schemeClr val="bg1">
+              <a:lumMod val="50000"/>
+            </a:schemeClr>
+          </a:solidFill>
+          <a:ln>
+            <a:solidFill>
+              <a:schemeClr val="bg1"/>
+            </a:solidFill>
+            <a:prstDash val="solid"/>
+            <a:headEnd type="none" w="med" len="med"/>
+            <a:tailEnd type="none" w="med" len="med"/>
+          </a:ln>
+          <a:effectLst/>
+        </p:spPr>
+        <p:style>
+          <a:lnRef idx="1">
+            <a:schemeClr val="accent5"/>
+          </a:lnRef>
+          <a:fillRef idx="3">
+            <a:schemeClr val="accent5"/>
+          </a:fillRef>
+          <a:effectRef idx="2">
+            <a:schemeClr val="accent5"/>
+          </a:effectRef>
+          <a:fontRef idx="minor">
+            <a:schemeClr val="lt1"/>
+          </a:fontRef>
+        </p:style>
+        <p:txBody>
+          <a:bodyPr vert="horz" wrap="square" lIns="0" tIns="0" rIns="0" bIns="0" numCol="1" rtlCol="0" anchor="ctr" anchorCtr="0" compatLnSpc="1">
+            <a:prstTxWarp prst="textNoShape">
+              <a:avLst/>
+            </a:prstTxWarp>
+            <a:noAutofit/>
+          </a:bodyPr>
+          <a:lstStyle/>
+          <a:p>
+            <a:pPr algn="ctr" defTabSz="685784" fontAlgn="base">
+              <a:lnSpc>
+                <a:spcPct val="90000"/>
+              </a:lnSpc>
+              <a:spcBef>
+                <a:spcPct val="0"/>
+              </a:spcBef>
+              <a:spcAft>
+                <a:spcPct val="0"/>
+              </a:spcAft>
+            </a:pPr>
+            <a:r>
+              <a:rPr lang="en-US" sz="675">
+                <a:solidFill>
+                  <a:schemeClr val="bg1"/>
+                </a:solidFill>
+              </a:rPr>
+              <a:t>4</a:t>
+            </a:r>
+            <a:endParaRPr lang="en-US" sz="375">
+              <a:solidFill>
+                <a:schemeClr val="bg1"/>
+              </a:solidFill>
+            </a:endParaRPr>
+          </a:p>
+        </p:txBody>
+      </p:sp>
+      <p:sp>
+        <p:nvSpPr>
+          <p:cNvPr id="33" name="Rounded Rectangle 32">
+            <a:extLst>
+              <a:ext uri="{FF2B5EF4-FFF2-40B4-BE49-F238E27FC236}">
+                <a16:creationId xmlns:a16="http://schemas.microsoft.com/office/drawing/2014/main" id="{23355CB8-33EA-2344-9D2F-FD6C81E06FC2}"/>
+              </a:ext>
+            </a:extLst>
+          </p:cNvPr>
+          <p:cNvSpPr/>
+          <p:nvPr/>
+        </p:nvSpPr>
+        <p:spPr bwMode="auto">
+          <a:xfrm>
+            <a:off x="1874043" y="1635094"/>
+            <a:ext cx="138128" cy="411476"/>
+          </a:xfrm>
+          <a:prstGeom prst="roundRect">
+            <a:avLst/>
+          </a:prstGeom>
+          <a:solidFill>
+            <a:schemeClr val="bg1">
+              <a:lumMod val="50000"/>
+            </a:schemeClr>
+          </a:solidFill>
+          <a:ln>
+            <a:solidFill>
+              <a:schemeClr val="bg1"/>
+            </a:solidFill>
+            <a:prstDash val="solid"/>
+            <a:headEnd type="none" w="med" len="med"/>
+            <a:tailEnd type="none" w="med" len="med"/>
+          </a:ln>
+          <a:effectLst/>
+        </p:spPr>
+        <p:style>
+          <a:lnRef idx="1">
+            <a:schemeClr val="accent5"/>
+          </a:lnRef>
+          <a:fillRef idx="3">
+            <a:schemeClr val="accent5"/>
+          </a:fillRef>
+          <a:effectRef idx="2">
+            <a:schemeClr val="accent5"/>
+          </a:effectRef>
+          <a:fontRef idx="minor">
+            <a:schemeClr val="lt1"/>
+          </a:fontRef>
+        </p:style>
+        <p:txBody>
+          <a:bodyPr vert="horz" wrap="square" lIns="0" tIns="0" rIns="0" bIns="0" numCol="1" rtlCol="0" anchor="ctr" anchorCtr="0" compatLnSpc="1">
+            <a:prstTxWarp prst="textNoShape">
+              <a:avLst/>
+            </a:prstTxWarp>
+            <a:noAutofit/>
+          </a:bodyPr>
+          <a:lstStyle/>
+          <a:p>
+            <a:pPr algn="ctr" defTabSz="685784" fontAlgn="base">
+              <a:lnSpc>
+                <a:spcPct val="90000"/>
+              </a:lnSpc>
+              <a:spcBef>
+                <a:spcPct val="0"/>
+              </a:spcBef>
+              <a:spcAft>
+                <a:spcPct val="0"/>
+              </a:spcAft>
+            </a:pPr>
+            <a:r>
+              <a:rPr lang="en-US" sz="675">
+                <a:solidFill>
+                  <a:schemeClr val="bg1"/>
+                </a:solidFill>
+              </a:rPr>
+              <a:t>5</a:t>
+            </a:r>
+            <a:endParaRPr lang="en-US" sz="375">
+              <a:solidFill>
+                <a:schemeClr val="bg1"/>
+              </a:solidFill>
+            </a:endParaRPr>
+          </a:p>
+        </p:txBody>
+      </p:sp>
+      <p:sp>
+        <p:nvSpPr>
+          <p:cNvPr id="34" name="AutoShape 4">
+            <a:extLst>
+              <a:ext uri="{FF2B5EF4-FFF2-40B4-BE49-F238E27FC236}">
+                <a16:creationId xmlns:a16="http://schemas.microsoft.com/office/drawing/2014/main" id="{B1D40963-EC1B-E049-A09B-96D331A21F58}"/>
+              </a:ext>
+            </a:extLst>
+          </p:cNvPr>
+          <p:cNvSpPr>
+            <a:spLocks noChangeArrowheads="1"/>
+          </p:cNvSpPr>
+          <p:nvPr/>
+        </p:nvSpPr>
+        <p:spPr bwMode="auto">
+          <a:xfrm>
+            <a:off x="598146" y="1516741"/>
+            <a:ext cx="3207204" cy="745412"/>
+          </a:xfrm>
+          <a:prstGeom prst="roundRect">
+            <a:avLst>
+              <a:gd name="adj" fmla="val 7117"/>
+            </a:avLst>
+          </a:prstGeom>
+          <a:noFill/>
+          <a:ln w="12700">
+            <a:solidFill>
+              <a:schemeClr val="accent3"/>
+            </a:solidFill>
+            <a:prstDash val="dash"/>
+            <a:round/>
+            <a:headEnd/>
+            <a:tailEnd/>
+          </a:ln>
+        </p:spPr>
+        <p:txBody>
+          <a:bodyPr lIns="0" tIns="0" rIns="0" bIns="0" anchor="b" anchorCtr="1"/>
+          <a:lstStyle/>
+          <a:p>
+            <a:pPr algn="ctr"/>
+            <a:r>
+              <a:rPr lang="en-US" sz="750" dirty="0"/>
+              <a:t>Kafka Cluster</a:t>
+            </a:r>
+          </a:p>
+        </p:txBody>
+      </p:sp>
+      <p:sp>
+        <p:nvSpPr>
+          <p:cNvPr id="45" name="Rounded Rectangle 44">
+            <a:extLst>
+              <a:ext uri="{FF2B5EF4-FFF2-40B4-BE49-F238E27FC236}">
+                <a16:creationId xmlns:a16="http://schemas.microsoft.com/office/drawing/2014/main" id="{034D0250-3CFC-6843-9DDB-30E02E9EBC18}"/>
+              </a:ext>
+            </a:extLst>
+          </p:cNvPr>
+          <p:cNvSpPr/>
+          <p:nvPr/>
+        </p:nvSpPr>
+        <p:spPr>
+          <a:xfrm>
+            <a:off x="5548042" y="2982676"/>
+            <a:ext cx="994405" cy="430365"/>
+          </a:xfrm>
+          <a:prstGeom prst="roundRect">
+            <a:avLst/>
+          </a:prstGeom>
+          <a:solidFill>
+            <a:srgbClr val="D8A602"/>
+          </a:solidFill>
+          <a:ln>
+            <a:noFill/>
+          </a:ln>
+          <a:effectLst>
+            <a:outerShdw blurRad="50800" dist="38100" dir="5400000" algn="t" rotWithShape="0">
+              <a:prstClr val="black">
+                <a:alpha val="40000"/>
+              </a:prstClr>
+            </a:outerShdw>
+          </a:effectLst>
+        </p:spPr>
+        <p:style>
+          <a:lnRef idx="2">
+            <a:schemeClr val="accent1">
+              <a:shade val="50000"/>
+            </a:schemeClr>
+          </a:lnRef>
+          <a:fillRef idx="1">
+            <a:schemeClr val="accent1"/>
+          </a:fillRef>
+          <a:effectRef idx="0">
+            <a:schemeClr val="accent1"/>
+          </a:effectRef>
+          <a:fontRef idx="minor">
+            <a:schemeClr val="lt1"/>
+          </a:fontRef>
+        </p:style>
+        <p:txBody>
+          <a:bodyPr rtlCol="0" anchor="t"/>
+          <a:lstStyle/>
+          <a:p>
+            <a:pPr algn="ctr" defTabSz="514350"/>
+            <a:r>
+              <a:rPr lang="en-US" sz="750" dirty="0">
+                <a:solidFill>
+                  <a:prstClr val="white"/>
+                </a:solidFill>
+                <a:latin typeface="Arial"/>
+              </a:rPr>
+              <a:t>Performance Test Consumer</a:t>
+            </a:r>
+          </a:p>
+        </p:txBody>
+      </p:sp>
+      <p:sp>
+        <p:nvSpPr>
+          <p:cNvPr id="46" name="AutoShape 4">
+            <a:extLst>
+              <a:ext uri="{FF2B5EF4-FFF2-40B4-BE49-F238E27FC236}">
+                <a16:creationId xmlns:a16="http://schemas.microsoft.com/office/drawing/2014/main" id="{490EA60F-E5B8-2A4C-8350-F638E3310E3C}"/>
+              </a:ext>
+            </a:extLst>
+          </p:cNvPr>
+          <p:cNvSpPr>
+            <a:spLocks noChangeArrowheads="1"/>
+          </p:cNvSpPr>
+          <p:nvPr/>
+        </p:nvSpPr>
+        <p:spPr bwMode="auto">
+          <a:xfrm>
+            <a:off x="2008858" y="2530237"/>
+            <a:ext cx="1812650" cy="745412"/>
+          </a:xfrm>
+          <a:prstGeom prst="roundRect">
+            <a:avLst>
+              <a:gd name="adj" fmla="val 7117"/>
+            </a:avLst>
+          </a:prstGeom>
+          <a:noFill/>
+          <a:ln w="12700">
+            <a:solidFill>
+              <a:schemeClr val="accent3"/>
+            </a:solidFill>
+            <a:prstDash val="dash"/>
+            <a:round/>
+            <a:headEnd/>
+            <a:tailEnd/>
+          </a:ln>
+        </p:spPr>
+        <p:txBody>
+          <a:bodyPr lIns="0" tIns="0" rIns="0" bIns="0" anchor="b" anchorCtr="1"/>
+          <a:lstStyle/>
+          <a:p>
+            <a:pPr algn="ctr"/>
+            <a:r>
+              <a:rPr lang="en-US" sz="750" dirty="0"/>
+              <a:t>Kafka Connect Cluster</a:t>
+            </a:r>
+          </a:p>
+        </p:txBody>
+      </p:sp>
+      <p:sp>
+        <p:nvSpPr>
+          <p:cNvPr id="52" name="Cloud 51">
+            <a:extLst>
+              <a:ext uri="{FF2B5EF4-FFF2-40B4-BE49-F238E27FC236}">
+                <a16:creationId xmlns:a16="http://schemas.microsoft.com/office/drawing/2014/main" id="{4695F1F6-1E1D-364B-B95A-5F6E3043E184}"/>
+              </a:ext>
+            </a:extLst>
+          </p:cNvPr>
+          <p:cNvSpPr/>
+          <p:nvPr/>
+        </p:nvSpPr>
+        <p:spPr>
+          <a:xfrm rot="16200000">
+            <a:off x="3800806" y="2418013"/>
+            <a:ext cx="1442045" cy="393701"/>
+          </a:xfrm>
+          <a:prstGeom prst="cloud">
+            <a:avLst/>
+          </a:prstGeom>
+          <a:noFill/>
+          <a:ln>
+            <a:solidFill>
+              <a:schemeClr val="tx2">
+                <a:lumMod val="60000"/>
+                <a:lumOff val="40000"/>
+              </a:schemeClr>
+            </a:solidFill>
+          </a:ln>
+        </p:spPr>
+        <p:style>
+          <a:lnRef idx="2">
+            <a:schemeClr val="accent1">
+              <a:shade val="50000"/>
+            </a:schemeClr>
+          </a:lnRef>
+          <a:fillRef idx="1">
+            <a:schemeClr val="accent1"/>
+          </a:fillRef>
+          <a:effectRef idx="0">
+            <a:schemeClr val="accent1"/>
+          </a:effectRef>
+          <a:fontRef idx="minor">
+            <a:schemeClr val="lt1"/>
+          </a:fontRef>
+        </p:style>
+        <p:txBody>
+          <a:bodyPr rtlCol="0" anchor="ctr"/>
+          <a:lstStyle/>
+          <a:p>
+            <a:pPr algn="ctr"/>
+            <a:endParaRPr lang="en-US" sz="1013"/>
+          </a:p>
+        </p:txBody>
+      </p:sp>
+      <p:pic>
+        <p:nvPicPr>
+          <p:cNvPr id="37" name="Picture 36">
+            <a:extLst>
+              <a:ext uri="{FF2B5EF4-FFF2-40B4-BE49-F238E27FC236}">
+                <a16:creationId xmlns:a16="http://schemas.microsoft.com/office/drawing/2014/main" id="{6D8F6862-7739-D946-A521-B5976D86EED8}"/>
+              </a:ext>
+            </a:extLst>
+          </p:cNvPr>
+          <p:cNvPicPr>
+            <a:picLocks noChangeAspect="1"/>
+          </p:cNvPicPr>
+          <p:nvPr/>
+        </p:nvPicPr>
+        <p:blipFill>
+          <a:blip r:embed="rId2"/>
+          <a:stretch>
+            <a:fillRect/>
+          </a:stretch>
+        </p:blipFill>
+        <p:spPr>
+          <a:xfrm>
+            <a:off x="1956920" y="2941013"/>
+            <a:ext cx="376238" cy="371475"/>
+          </a:xfrm>
+          <a:prstGeom prst="rect">
+            <a:avLst/>
+          </a:prstGeom>
+        </p:spPr>
+      </p:pic>
+      <p:sp>
+        <p:nvSpPr>
+          <p:cNvPr id="38" name="Rounded Rectangle 37">
+            <a:extLst>
+              <a:ext uri="{FF2B5EF4-FFF2-40B4-BE49-F238E27FC236}">
+                <a16:creationId xmlns:a16="http://schemas.microsoft.com/office/drawing/2014/main" id="{B8888133-CCF3-0944-9B5C-B88A02187A65}"/>
+              </a:ext>
+            </a:extLst>
+          </p:cNvPr>
+          <p:cNvSpPr/>
+          <p:nvPr/>
+        </p:nvSpPr>
+        <p:spPr>
+          <a:xfrm>
+            <a:off x="2463609" y="2672578"/>
+            <a:ext cx="994405" cy="292973"/>
+          </a:xfrm>
+          <a:prstGeom prst="roundRect">
+            <a:avLst/>
+          </a:prstGeom>
+          <a:solidFill>
+            <a:srgbClr val="7030A0"/>
+          </a:solidFill>
+          <a:ln>
+            <a:noFill/>
+          </a:ln>
+          <a:effectLst>
+            <a:outerShdw blurRad="50800" dist="38100" dir="5400000" algn="t" rotWithShape="0">
+              <a:prstClr val="black">
+                <a:alpha val="40000"/>
+              </a:prstClr>
+            </a:outerShdw>
+          </a:effectLst>
+        </p:spPr>
+        <p:style>
+          <a:lnRef idx="2">
+            <a:schemeClr val="accent1">
+              <a:shade val="50000"/>
+            </a:schemeClr>
+          </a:lnRef>
+          <a:fillRef idx="1">
+            <a:schemeClr val="accent1"/>
+          </a:fillRef>
+          <a:effectRef idx="0">
+            <a:schemeClr val="accent1"/>
+          </a:effectRef>
+          <a:fontRef idx="minor">
+            <a:schemeClr val="lt1"/>
+          </a:fontRef>
+        </p:style>
+        <p:txBody>
+          <a:bodyPr rtlCol="0" anchor="t"/>
+          <a:lstStyle/>
+          <a:p>
+            <a:pPr algn="ctr" defTabSz="514350"/>
+            <a:r>
+              <a:rPr lang="en-US" sz="750">
+                <a:solidFill>
+                  <a:prstClr val="white"/>
+                </a:solidFill>
+                <a:latin typeface="Arial"/>
+              </a:rPr>
+              <a:t>Mirror Maker 2.0</a:t>
+            </a:r>
+          </a:p>
+        </p:txBody>
+      </p:sp>
+      <p:sp>
+        <p:nvSpPr>
+          <p:cNvPr id="7" name="TextBox 6">
+            <a:extLst>
+              <a:ext uri="{FF2B5EF4-FFF2-40B4-BE49-F238E27FC236}">
+                <a16:creationId xmlns:a16="http://schemas.microsoft.com/office/drawing/2014/main" id="{9C49EA51-B835-094C-91A0-D088AFF81C4B}"/>
+              </a:ext>
+            </a:extLst>
+          </p:cNvPr>
+          <p:cNvSpPr txBox="1"/>
+          <p:nvPr/>
+        </p:nvSpPr>
+        <p:spPr>
+          <a:xfrm>
+            <a:off x="3263370" y="1476355"/>
+            <a:ext cx="577402" cy="276999"/>
+          </a:xfrm>
+          <a:prstGeom prst="rect">
+            <a:avLst/>
+          </a:prstGeom>
+          <a:noFill/>
+        </p:spPr>
+        <p:txBody>
+          <a:bodyPr wrap="none" rtlCol="0">
+            <a:spAutoFit/>
+          </a:bodyPr>
+          <a:lstStyle/>
+          <a:p>
+            <a:r>
+              <a:rPr lang="en-US" sz="1200" dirty="0"/>
+              <a:t>target</a:t>
+            </a:r>
+          </a:p>
+        </p:txBody>
+      </p:sp>
+      <p:sp>
+        <p:nvSpPr>
+          <p:cNvPr id="39" name="TextBox 38">
+            <a:extLst>
+              <a:ext uri="{FF2B5EF4-FFF2-40B4-BE49-F238E27FC236}">
+                <a16:creationId xmlns:a16="http://schemas.microsoft.com/office/drawing/2014/main" id="{E43F178F-4B90-3F45-964F-1FF716720D0E}"/>
+              </a:ext>
+            </a:extLst>
+          </p:cNvPr>
+          <p:cNvSpPr txBox="1"/>
+          <p:nvPr/>
+        </p:nvSpPr>
+        <p:spPr>
+          <a:xfrm>
+            <a:off x="7050077" y="2011888"/>
+            <a:ext cx="644728" cy="276999"/>
+          </a:xfrm>
+          <a:prstGeom prst="rect">
+            <a:avLst/>
+          </a:prstGeom>
+          <a:noFill/>
+        </p:spPr>
+        <p:txBody>
+          <a:bodyPr wrap="none" rtlCol="0">
+            <a:spAutoFit/>
+          </a:bodyPr>
+          <a:lstStyle/>
+          <a:p>
+            <a:r>
+              <a:rPr lang="en-US" sz="1200" dirty="0"/>
+              <a:t>source</a:t>
+            </a:r>
+          </a:p>
+        </p:txBody>
+      </p:sp>
+      <p:cxnSp>
+        <p:nvCxnSpPr>
+          <p:cNvPr id="21" name="Elbow Connector 20">
+            <a:extLst>
+              <a:ext uri="{FF2B5EF4-FFF2-40B4-BE49-F238E27FC236}">
+                <a16:creationId xmlns:a16="http://schemas.microsoft.com/office/drawing/2014/main" id="{1FA5726D-2767-B849-85A3-7CAA002588F7}"/>
+              </a:ext>
+            </a:extLst>
+          </p:cNvPr>
+          <p:cNvCxnSpPr>
+            <a:cxnSpLocks/>
+            <a:stCxn id="11" idx="0"/>
+            <a:endCxn id="38" idx="3"/>
+          </p:cNvCxnSpPr>
+          <p:nvPr/>
+        </p:nvCxnSpPr>
+        <p:spPr>
+          <a:xfrm rot="16200000" flipH="1" flipV="1">
+            <a:off x="4151319" y="941274"/>
+            <a:ext cx="1184485" cy="2571095"/>
+          </a:xfrm>
+          <a:prstGeom prst="bentConnector4">
+            <a:avLst>
+              <a:gd name="adj1" fmla="val -20323"/>
+              <a:gd name="adj2" fmla="val 58618"/>
+            </a:avLst>
+          </a:prstGeom>
+          <a:ln w="15875">
+            <a:solidFill>
+              <a:srgbClr val="7030A0"/>
+            </a:solidFill>
+            <a:tailEnd type="triangle"/>
+          </a:ln>
+          <a:effectLst/>
+        </p:spPr>
+        <p:style>
+          <a:lnRef idx="2">
+            <a:schemeClr val="accent1"/>
+          </a:lnRef>
+          <a:fillRef idx="0">
+            <a:schemeClr val="accent1"/>
+          </a:fillRef>
+          <a:effectRef idx="1">
+            <a:schemeClr val="accent1"/>
+          </a:effectRef>
+          <a:fontRef idx="minor">
+            <a:schemeClr val="tx1"/>
+          </a:fontRef>
+        </p:style>
+      </p:cxnSp>
+      <p:cxnSp>
+        <p:nvCxnSpPr>
+          <p:cNvPr id="53" name="Elbow Connector 52">
+            <a:extLst>
+              <a:ext uri="{FF2B5EF4-FFF2-40B4-BE49-F238E27FC236}">
+                <a16:creationId xmlns:a16="http://schemas.microsoft.com/office/drawing/2014/main" id="{0DC1C79B-85E9-B246-88E9-908878ECC75B}"/>
+              </a:ext>
+            </a:extLst>
+          </p:cNvPr>
+          <p:cNvCxnSpPr>
+            <a:cxnSpLocks/>
+            <a:stCxn id="38" idx="1"/>
+            <a:endCxn id="33" idx="2"/>
+          </p:cNvCxnSpPr>
+          <p:nvPr/>
+        </p:nvCxnSpPr>
+        <p:spPr>
+          <a:xfrm rot="10800000">
+            <a:off x="1943108" y="2046570"/>
+            <a:ext cx="520502" cy="772494"/>
+          </a:xfrm>
+          <a:prstGeom prst="bentConnector2">
+            <a:avLst/>
+          </a:prstGeom>
+          <a:ln w="15875">
+            <a:solidFill>
+              <a:srgbClr val="7030A0"/>
+            </a:solidFill>
+            <a:tailEnd type="triangle"/>
+          </a:ln>
+          <a:effectLst/>
+        </p:spPr>
+        <p:style>
+          <a:lnRef idx="2">
+            <a:schemeClr val="accent1"/>
+          </a:lnRef>
+          <a:fillRef idx="0">
+            <a:schemeClr val="accent1"/>
+          </a:fillRef>
+          <a:effectRef idx="1">
+            <a:schemeClr val="accent1"/>
+          </a:effectRef>
+          <a:fontRef idx="minor">
+            <a:schemeClr val="tx1"/>
+          </a:fontRef>
+        </p:style>
+      </p:cxnSp>
+      <p:sp>
+        <p:nvSpPr>
+          <p:cNvPr id="49" name="Rounded Rectangle 48">
+            <a:extLst>
+              <a:ext uri="{FF2B5EF4-FFF2-40B4-BE49-F238E27FC236}">
+                <a16:creationId xmlns:a16="http://schemas.microsoft.com/office/drawing/2014/main" id="{0B0F9AEA-B6CC-084B-A827-8EC8E3F6D6A5}"/>
+              </a:ext>
+            </a:extLst>
+          </p:cNvPr>
+          <p:cNvSpPr/>
+          <p:nvPr/>
+        </p:nvSpPr>
+        <p:spPr>
+          <a:xfrm>
+            <a:off x="6982404" y="2975166"/>
+            <a:ext cx="1218911" cy="371475"/>
+          </a:xfrm>
+          <a:prstGeom prst="roundRect">
+            <a:avLst/>
+          </a:prstGeom>
+          <a:solidFill>
+            <a:srgbClr val="D8A602"/>
+          </a:solidFill>
+          <a:ln>
+            <a:noFill/>
+          </a:ln>
+          <a:effectLst>
+            <a:outerShdw blurRad="50800" dist="38100" dir="5400000" algn="t" rotWithShape="0">
+              <a:prstClr val="black">
+                <a:alpha val="40000"/>
+              </a:prstClr>
+            </a:outerShdw>
+          </a:effectLst>
+        </p:spPr>
+        <p:style>
+          <a:lnRef idx="2">
+            <a:schemeClr val="accent1">
+              <a:shade val="50000"/>
+            </a:schemeClr>
+          </a:lnRef>
+          <a:fillRef idx="1">
+            <a:schemeClr val="accent1"/>
+          </a:fillRef>
+          <a:effectRef idx="0">
+            <a:schemeClr val="accent1"/>
+          </a:effectRef>
+          <a:fontRef idx="minor">
+            <a:schemeClr val="lt1"/>
+          </a:fontRef>
+        </p:style>
+        <p:txBody>
+          <a:bodyPr rtlCol="0" anchor="t"/>
+          <a:lstStyle/>
+          <a:p>
+            <a:pPr algn="ctr" defTabSz="514350"/>
+            <a:r>
+              <a:rPr lang="en-US" sz="750" dirty="0">
+                <a:solidFill>
+                  <a:prstClr val="white"/>
+                </a:solidFill>
+              </a:rPr>
+              <a:t>Performance Test Producer</a:t>
+            </a:r>
+            <a:endParaRPr lang="en-US" sz="750" dirty="0">
+              <a:solidFill>
+                <a:prstClr val="white"/>
+              </a:solidFill>
+              <a:latin typeface="Arial"/>
+            </a:endParaRPr>
+          </a:p>
+        </p:txBody>
+      </p:sp>
+      <p:cxnSp>
+        <p:nvCxnSpPr>
+          <p:cNvPr id="22" name="Elbow Connector 21">
+            <a:extLst>
+              <a:ext uri="{FF2B5EF4-FFF2-40B4-BE49-F238E27FC236}">
+                <a16:creationId xmlns:a16="http://schemas.microsoft.com/office/drawing/2014/main" id="{44F8EE2A-5BE0-E545-925C-5D70891B4DA5}"/>
+              </a:ext>
+            </a:extLst>
+          </p:cNvPr>
+          <p:cNvCxnSpPr>
+            <a:cxnSpLocks/>
+            <a:stCxn id="32" idx="2"/>
+            <a:endCxn id="45" idx="0"/>
+          </p:cNvCxnSpPr>
+          <p:nvPr/>
+        </p:nvCxnSpPr>
+        <p:spPr>
+          <a:xfrm rot="16200000" flipH="1">
+            <a:off x="3461211" y="398642"/>
+            <a:ext cx="936106" cy="4231961"/>
+          </a:xfrm>
+          <a:prstGeom prst="bentConnector3">
+            <a:avLst/>
+          </a:prstGeom>
+          <a:ln>
+            <a:solidFill>
+              <a:schemeClr val="accent6"/>
+            </a:solidFill>
+            <a:tailEnd type="triangle"/>
+          </a:ln>
+          <a:effectLst/>
+        </p:spPr>
+        <p:style>
+          <a:lnRef idx="2">
+            <a:schemeClr val="accent1"/>
+          </a:lnRef>
+          <a:fillRef idx="0">
+            <a:schemeClr val="accent1"/>
+          </a:fillRef>
+          <a:effectRef idx="1">
+            <a:schemeClr val="accent1"/>
+          </a:effectRef>
+          <a:fontRef idx="minor">
+            <a:schemeClr val="tx1"/>
+          </a:fontRef>
+        </p:style>
+      </p:cxnSp>
+      <p:cxnSp>
+        <p:nvCxnSpPr>
+          <p:cNvPr id="24" name="Elbow Connector 23">
+            <a:extLst>
+              <a:ext uri="{FF2B5EF4-FFF2-40B4-BE49-F238E27FC236}">
+                <a16:creationId xmlns:a16="http://schemas.microsoft.com/office/drawing/2014/main" id="{C6D643C2-3EE4-B147-B10E-BCE4D3790797}"/>
+              </a:ext>
+            </a:extLst>
+          </p:cNvPr>
+          <p:cNvCxnSpPr>
+            <a:cxnSpLocks/>
+            <a:stCxn id="49" idx="0"/>
+            <a:endCxn id="13" idx="2"/>
+          </p:cNvCxnSpPr>
+          <p:nvPr/>
+        </p:nvCxnSpPr>
+        <p:spPr>
+          <a:xfrm rot="16200000" flipV="1">
+            <a:off x="6479905" y="1863210"/>
+            <a:ext cx="929111" cy="1294801"/>
+          </a:xfrm>
+          <a:prstGeom prst="bentConnector3">
+            <a:avLst>
+              <a:gd name="adj1" fmla="val 50000"/>
+            </a:avLst>
+          </a:prstGeom>
+          <a:ln>
+            <a:solidFill>
+              <a:schemeClr val="accent6"/>
+            </a:solidFill>
+            <a:tailEnd type="triangle"/>
+          </a:ln>
+          <a:effectLst/>
+        </p:spPr>
+        <p:style>
+          <a:lnRef idx="2">
+            <a:schemeClr val="accent1"/>
+          </a:lnRef>
+          <a:fillRef idx="0">
+            <a:schemeClr val="accent1"/>
+          </a:fillRef>
+          <a:effectRef idx="1">
+            <a:schemeClr val="accent1"/>
+          </a:effectRef>
+          <a:fontRef idx="minor">
+            <a:schemeClr val="tx1"/>
+          </a:fontRef>
+        </p:style>
+      </p:cxnSp>
+      <p:sp>
+        <p:nvSpPr>
+          <p:cNvPr id="36" name="Oval 35">
+            <a:extLst>
+              <a:ext uri="{FF2B5EF4-FFF2-40B4-BE49-F238E27FC236}">
+                <a16:creationId xmlns:a16="http://schemas.microsoft.com/office/drawing/2014/main" id="{94F4997F-6F2C-BF48-BA63-5430E040A88D}"/>
+              </a:ext>
+            </a:extLst>
+          </p:cNvPr>
+          <p:cNvSpPr/>
+          <p:nvPr/>
+        </p:nvSpPr>
+        <p:spPr>
+          <a:xfrm>
+            <a:off x="3419619" y="2422837"/>
+            <a:ext cx="322730" cy="308102"/>
+          </a:xfrm>
+          <a:prstGeom prst="ellipse">
+            <a:avLst/>
+          </a:prstGeom>
+          <a:solidFill>
+            <a:srgbClr val="0000FF"/>
+          </a:solidFill>
+          <a:ln>
+            <a:noFill/>
+          </a:ln>
+        </p:spPr>
+        <p:style>
+          <a:lnRef idx="2">
+            <a:schemeClr val="accent1">
+              <a:shade val="50000"/>
+            </a:schemeClr>
+          </a:lnRef>
+          <a:fillRef idx="1">
+            <a:schemeClr val="accent1"/>
+          </a:fillRef>
+          <a:effectRef idx="0">
+            <a:schemeClr val="accent1"/>
+          </a:effectRef>
+          <a:fontRef idx="minor">
+            <a:schemeClr val="lt1"/>
+          </a:fontRef>
+        </p:style>
+        <p:txBody>
+          <a:bodyPr rtlCol="0" anchor="ctr"/>
+          <a:lstStyle/>
+          <a:p>
+            <a:pPr algn="ctr"/>
+            <a:r>
+              <a:rPr lang="en-US" sz="1013" dirty="0"/>
+              <a:t>1</a:t>
+            </a:r>
+          </a:p>
+        </p:txBody>
+      </p:sp>
+      <p:sp>
+        <p:nvSpPr>
+          <p:cNvPr id="68" name="Oval 67">
+            <a:extLst>
+              <a:ext uri="{FF2B5EF4-FFF2-40B4-BE49-F238E27FC236}">
+                <a16:creationId xmlns:a16="http://schemas.microsoft.com/office/drawing/2014/main" id="{A8CECD8E-6C3B-D34E-8F6D-8ADB376443E9}"/>
+              </a:ext>
+            </a:extLst>
+          </p:cNvPr>
+          <p:cNvSpPr/>
+          <p:nvPr/>
+        </p:nvSpPr>
+        <p:spPr>
+          <a:xfrm>
+            <a:off x="7372075" y="3301430"/>
+            <a:ext cx="322730" cy="308102"/>
+          </a:xfrm>
+          <a:prstGeom prst="ellipse">
+            <a:avLst/>
+          </a:prstGeom>
+          <a:solidFill>
+            <a:srgbClr val="0000FF"/>
+          </a:solidFill>
+          <a:ln>
+            <a:noFill/>
+          </a:ln>
+        </p:spPr>
+        <p:style>
+          <a:lnRef idx="2">
+            <a:schemeClr val="accent1">
+              <a:shade val="50000"/>
+            </a:schemeClr>
+          </a:lnRef>
+          <a:fillRef idx="1">
+            <a:schemeClr val="accent1"/>
+          </a:fillRef>
+          <a:effectRef idx="0">
+            <a:schemeClr val="accent1"/>
+          </a:effectRef>
+          <a:fontRef idx="minor">
+            <a:schemeClr val="lt1"/>
+          </a:fontRef>
+        </p:style>
+        <p:txBody>
+          <a:bodyPr rtlCol="0" anchor="ctr"/>
+          <a:lstStyle/>
+          <a:p>
+            <a:pPr algn="ctr"/>
+            <a:r>
+              <a:rPr lang="en-US" sz="1013" dirty="0"/>
+              <a:t>2</a:t>
+            </a:r>
+          </a:p>
+        </p:txBody>
+      </p:sp>
+      <p:sp>
+        <p:nvSpPr>
+          <p:cNvPr id="69" name="Oval 68">
+            <a:extLst>
+              <a:ext uri="{FF2B5EF4-FFF2-40B4-BE49-F238E27FC236}">
+                <a16:creationId xmlns:a16="http://schemas.microsoft.com/office/drawing/2014/main" id="{B943FE36-C19E-8A4F-8D1E-178093750F9B}"/>
+              </a:ext>
+            </a:extLst>
+          </p:cNvPr>
+          <p:cNvSpPr/>
+          <p:nvPr/>
+        </p:nvSpPr>
+        <p:spPr>
+          <a:xfrm>
+            <a:off x="5136424" y="3047174"/>
+            <a:ext cx="322730" cy="308102"/>
+          </a:xfrm>
+          <a:prstGeom prst="ellipse">
+            <a:avLst/>
+          </a:prstGeom>
+          <a:solidFill>
+            <a:srgbClr val="0000FF"/>
+          </a:solidFill>
+          <a:ln>
+            <a:noFill/>
+          </a:ln>
+        </p:spPr>
+        <p:style>
+          <a:lnRef idx="2">
+            <a:schemeClr val="accent1">
+              <a:shade val="50000"/>
+            </a:schemeClr>
+          </a:lnRef>
+          <a:fillRef idx="1">
+            <a:schemeClr val="accent1"/>
+          </a:fillRef>
+          <a:effectRef idx="0">
+            <a:schemeClr val="accent1"/>
+          </a:effectRef>
+          <a:fontRef idx="minor">
+            <a:schemeClr val="lt1"/>
+          </a:fontRef>
+        </p:style>
+        <p:txBody>
+          <a:bodyPr rtlCol="0" anchor="ctr"/>
+          <a:lstStyle/>
+          <a:p>
+            <a:pPr algn="ctr"/>
+            <a:r>
+              <a:rPr lang="en-US" sz="1013" dirty="0"/>
+              <a:t>3</a:t>
+            </a:r>
+          </a:p>
+        </p:txBody>
+      </p:sp>
+      <p:sp>
+        <p:nvSpPr>
+          <p:cNvPr id="17" name="TextBox 16">
+            <a:extLst>
+              <a:ext uri="{FF2B5EF4-FFF2-40B4-BE49-F238E27FC236}">
+                <a16:creationId xmlns:a16="http://schemas.microsoft.com/office/drawing/2014/main" id="{1A0874EA-0F31-A94D-A496-B7D42FBB31A3}"/>
+              </a:ext>
+            </a:extLst>
+          </p:cNvPr>
+          <p:cNvSpPr txBox="1"/>
+          <p:nvPr/>
+        </p:nvSpPr>
+        <p:spPr>
+          <a:xfrm>
+            <a:off x="6369341" y="1637937"/>
+            <a:ext cx="482824" cy="207749"/>
+          </a:xfrm>
+          <a:prstGeom prst="rect">
+            <a:avLst/>
+          </a:prstGeom>
+          <a:noFill/>
+        </p:spPr>
+        <p:txBody>
+          <a:bodyPr wrap="none" rtlCol="0">
+            <a:spAutoFit/>
+          </a:bodyPr>
+          <a:lstStyle/>
+          <a:p>
+            <a:r>
+              <a:rPr lang="en-US" sz="750" b="1" dirty="0"/>
+              <a:t>orders</a:t>
+            </a:r>
+          </a:p>
+        </p:txBody>
+      </p:sp>
+      <p:sp>
+        <p:nvSpPr>
+          <p:cNvPr id="44" name="TextBox 43">
+            <a:extLst>
+              <a:ext uri="{FF2B5EF4-FFF2-40B4-BE49-F238E27FC236}">
+                <a16:creationId xmlns:a16="http://schemas.microsoft.com/office/drawing/2014/main" id="{E60BBBCD-AD4E-A94D-A062-4C15C724E8D6}"/>
+              </a:ext>
+            </a:extLst>
+          </p:cNvPr>
+          <p:cNvSpPr txBox="1"/>
+          <p:nvPr/>
+        </p:nvSpPr>
+        <p:spPr>
+          <a:xfrm>
+            <a:off x="2007036" y="1655652"/>
+            <a:ext cx="824265" cy="207749"/>
+          </a:xfrm>
+          <a:prstGeom prst="rect">
+            <a:avLst/>
+          </a:prstGeom>
+          <a:noFill/>
+        </p:spPr>
+        <p:txBody>
+          <a:bodyPr wrap="none" rtlCol="0">
+            <a:spAutoFit/>
+          </a:bodyPr>
+          <a:lstStyle/>
+          <a:p>
+            <a:r>
+              <a:rPr lang="en-US" sz="750" b="1" dirty="0"/>
+              <a:t>source.orders</a:t>
+            </a:r>
+          </a:p>
+        </p:txBody>
+      </p:sp>
+      <p:pic>
+        <p:nvPicPr>
+          <p:cNvPr id="41" name="Picture 40">
+            <a:extLst>
+              <a:ext uri="{FF2B5EF4-FFF2-40B4-BE49-F238E27FC236}">
+                <a16:creationId xmlns:a16="http://schemas.microsoft.com/office/drawing/2014/main" id="{56C25C81-9BFA-624C-9CA8-B1ED9F6886F8}"/>
+              </a:ext>
+            </a:extLst>
+          </p:cNvPr>
+          <p:cNvPicPr>
+            <a:picLocks noChangeAspect="1"/>
+          </p:cNvPicPr>
+          <p:nvPr/>
+        </p:nvPicPr>
+        <p:blipFill>
+          <a:blip r:embed="rId3">
+            <a:extLst>
+              <a:ext uri="{28A0092B-C50C-407E-A947-70E740481C1C}">
+                <a14:useLocalDpi xmlns:a14="http://schemas.microsoft.com/office/drawing/2010/main" val="0"/>
+              </a:ext>
+            </a:extLst>
+          </a:blip>
+          <a:stretch>
+            <a:fillRect/>
+          </a:stretch>
+        </p:blipFill>
+        <p:spPr>
+          <a:xfrm>
+            <a:off x="4945417" y="1503235"/>
+            <a:ext cx="191007" cy="252252"/>
+          </a:xfrm>
+          <a:prstGeom prst="rect">
+            <a:avLst/>
+          </a:prstGeom>
+        </p:spPr>
+      </p:pic>
+      <p:pic>
+        <p:nvPicPr>
+          <p:cNvPr id="42" name="Picture 41">
+            <a:extLst>
+              <a:ext uri="{FF2B5EF4-FFF2-40B4-BE49-F238E27FC236}">
+                <a16:creationId xmlns:a16="http://schemas.microsoft.com/office/drawing/2014/main" id="{68211D15-A32F-8943-9E1A-48A59F5DFCD2}"/>
+              </a:ext>
+            </a:extLst>
+          </p:cNvPr>
+          <p:cNvPicPr>
+            <a:picLocks noChangeAspect="1"/>
+          </p:cNvPicPr>
+          <p:nvPr/>
+        </p:nvPicPr>
+        <p:blipFill>
+          <a:blip r:embed="rId3">
+            <a:extLst>
+              <a:ext uri="{28A0092B-C50C-407E-A947-70E740481C1C}">
+                <a14:useLocalDpi xmlns:a14="http://schemas.microsoft.com/office/drawing/2010/main" val="0"/>
+              </a:ext>
+            </a:extLst>
+          </a:blip>
+          <a:stretch>
+            <a:fillRect/>
+          </a:stretch>
+        </p:blipFill>
+        <p:spPr>
+          <a:xfrm>
+            <a:off x="632701" y="1536885"/>
+            <a:ext cx="191007" cy="252252"/>
+          </a:xfrm>
+          <a:prstGeom prst="rect">
+            <a:avLst/>
+          </a:prstGeom>
+        </p:spPr>
+      </p:pic>
+      <p:pic>
+        <p:nvPicPr>
+          <p:cNvPr id="43" name="Picture 42">
+            <a:extLst>
+              <a:ext uri="{FF2B5EF4-FFF2-40B4-BE49-F238E27FC236}">
+                <a16:creationId xmlns:a16="http://schemas.microsoft.com/office/drawing/2014/main" id="{17C8EA92-3D3A-6646-A77F-C2E199089CD1}"/>
+              </a:ext>
+            </a:extLst>
+          </p:cNvPr>
+          <p:cNvPicPr>
+            <a:picLocks noChangeAspect="1"/>
+          </p:cNvPicPr>
+          <p:nvPr/>
+        </p:nvPicPr>
+        <p:blipFill>
+          <a:blip r:embed="rId4"/>
+          <a:stretch>
+            <a:fillRect/>
+          </a:stretch>
+        </p:blipFill>
+        <p:spPr>
+          <a:xfrm>
+            <a:off x="356381" y="3625830"/>
+            <a:ext cx="261023" cy="238649"/>
+          </a:xfrm>
+          <a:prstGeom prst="rect">
+            <a:avLst/>
+          </a:prstGeom>
+        </p:spPr>
+      </p:pic>
+      <p:sp>
+        <p:nvSpPr>
+          <p:cNvPr id="47" name="AutoShape 4">
+            <a:extLst>
+              <a:ext uri="{FF2B5EF4-FFF2-40B4-BE49-F238E27FC236}">
+                <a16:creationId xmlns:a16="http://schemas.microsoft.com/office/drawing/2014/main" id="{A00EABA6-52E6-B747-BCD6-7A397FE9059C}"/>
+              </a:ext>
+            </a:extLst>
+          </p:cNvPr>
+          <p:cNvSpPr>
+            <a:spLocks noChangeArrowheads="1"/>
+          </p:cNvSpPr>
+          <p:nvPr/>
+        </p:nvSpPr>
+        <p:spPr bwMode="auto">
+          <a:xfrm>
+            <a:off x="4945416" y="2790647"/>
+            <a:ext cx="3333325" cy="814403"/>
+          </a:xfrm>
+          <a:prstGeom prst="roundRect">
+            <a:avLst>
+              <a:gd name="adj" fmla="val 3325"/>
+            </a:avLst>
+          </a:prstGeom>
+          <a:noFill/>
+          <a:ln w="12700">
+            <a:solidFill>
+              <a:schemeClr val="accent3"/>
+            </a:solidFill>
+            <a:prstDash val="dash"/>
+            <a:round/>
+            <a:headEnd/>
+            <a:tailEnd/>
+          </a:ln>
+        </p:spPr>
+        <p:txBody>
+          <a:bodyPr lIns="0" tIns="0" rIns="0" bIns="0" anchor="b" anchorCtr="1"/>
+          <a:lstStyle/>
+          <a:p>
+            <a:pPr algn="ctr"/>
+            <a:r>
+              <a:rPr lang="en-US" sz="750" dirty="0" err="1"/>
+              <a:t>Openshift</a:t>
+            </a:r>
+            <a:r>
+              <a:rPr lang="en-US" sz="750" dirty="0"/>
+              <a:t> on Kubernetes Service</a:t>
+            </a:r>
+          </a:p>
+        </p:txBody>
+      </p:sp>
+      <p:pic>
+        <p:nvPicPr>
+          <p:cNvPr id="48" name="Picture 47">
+            <a:extLst>
+              <a:ext uri="{FF2B5EF4-FFF2-40B4-BE49-F238E27FC236}">
+                <a16:creationId xmlns:a16="http://schemas.microsoft.com/office/drawing/2014/main" id="{D9A1D566-7274-254B-B86D-75F32B5130BE}"/>
+              </a:ext>
+            </a:extLst>
+          </p:cNvPr>
+          <p:cNvPicPr>
+            <a:picLocks noChangeAspect="1"/>
+          </p:cNvPicPr>
+          <p:nvPr/>
+        </p:nvPicPr>
+        <p:blipFill>
+          <a:blip r:embed="rId4"/>
+          <a:stretch>
+            <a:fillRect/>
+          </a:stretch>
+        </p:blipFill>
+        <p:spPr>
+          <a:xfrm>
+            <a:off x="4938273" y="3386344"/>
+            <a:ext cx="261023" cy="238649"/>
+          </a:xfrm>
+          <a:prstGeom prst="rect">
+            <a:avLst/>
+          </a:prstGeom>
+        </p:spPr>
+      </p:pic>
+      <p:pic>
+        <p:nvPicPr>
+          <p:cNvPr id="50" name="Picture 49" descr="A picture containing sign, clock&#10;&#10;Description automatically generated">
+            <a:extLst>
+              <a:ext uri="{FF2B5EF4-FFF2-40B4-BE49-F238E27FC236}">
+                <a16:creationId xmlns:a16="http://schemas.microsoft.com/office/drawing/2014/main" id="{18D36C91-09E9-144D-BA4D-78F0917B3606}"/>
+              </a:ext>
+            </a:extLst>
+          </p:cNvPr>
+          <p:cNvPicPr>
+            <a:picLocks noChangeAspect="1"/>
+          </p:cNvPicPr>
+          <p:nvPr/>
+        </p:nvPicPr>
+        <p:blipFill>
+          <a:blip r:embed="rId5"/>
+          <a:stretch>
+            <a:fillRect/>
+          </a:stretch>
+        </p:blipFill>
+        <p:spPr>
+          <a:xfrm>
+            <a:off x="8002594" y="1071776"/>
+            <a:ext cx="397442" cy="351885"/>
+          </a:xfrm>
+          <a:prstGeom prst="rect">
+            <a:avLst/>
+          </a:prstGeom>
+        </p:spPr>
+      </p:pic>
+    </p:spTree>
+    <p:extLst>
+      <p:ext uri="{BB962C8B-B14F-4D97-AF65-F5344CB8AC3E}">
+        <p14:creationId xmlns:p14="http://schemas.microsoft.com/office/powerpoint/2010/main" val="616788447"/>
+      </p:ext>
+    </p:extLst>
+  </p:cSld>
+  <p:clrMapOvr>
+    <a:masterClrMapping/>
+  </p:clrMapOvr>
+</p:sld>
+</file>
+
+<file path=ppt/slides/slide12.xml><?xml version="1.0" encoding="utf-8"?>
+<p:sld xmlns:a="http://schemas.openxmlformats.org/drawingml/2006/main" xmlns:r="http://schemas.openxmlformats.org/officeDocument/2006/relationships" xmlns:p="http://schemas.openxmlformats.org/presentationml/2006/main">
+  <p:cSld>
+    <p:spTree>
+      <p:nvGrpSpPr>
+        <p:cNvPr id="1" name=""/>
+        <p:cNvGrpSpPr/>
+        <p:nvPr/>
+      </p:nvGrpSpPr>
+      <p:grpSpPr>
+        <a:xfrm>
+          <a:off x="0" y="0"/>
+          <a:ext cx="0" cy="0"/>
+          <a:chOff x="0" y="0"/>
+          <a:chExt cx="0" cy="0"/>
+        </a:xfrm>
+      </p:grpSpPr>
+      <p:sp>
+        <p:nvSpPr>
+          <p:cNvPr id="2" name="Title 1">
+            <a:extLst>
+              <a:ext uri="{FF2B5EF4-FFF2-40B4-BE49-F238E27FC236}">
+                <a16:creationId xmlns:a16="http://schemas.microsoft.com/office/drawing/2014/main" id="{58169065-201E-5F42-BB75-6EA30E0A8D38}"/>
+              </a:ext>
+            </a:extLst>
+          </p:cNvPr>
+          <p:cNvSpPr>
+            <a:spLocks noGrp="1"/>
+          </p:cNvSpPr>
+          <p:nvPr>
+            <p:ph type="title"/>
+          </p:nvPr>
+        </p:nvSpPr>
+        <p:spPr/>
+        <p:txBody>
+          <a:bodyPr/>
+          <a:lstStyle/>
+          <a:p>
+            <a:r>
+              <a:rPr lang="en-US" dirty="0"/>
               <a:t>Mirror maker monitoring</a:t>
             </a:r>
             <a:endParaRPr dirty="0"/>
@@ -7872,7 +10430,7 @@
                 </a:solidFill>
               </a:rPr>
               <a:pPr/>
-              <a:t>11</a:t>
+              <a:t>12</a:t>
             </a:fld>
             <a:endParaRPr lang="en-US">
               <a:solidFill>

</xml_diff>

<commit_message>
Deployed 4222975 with MkDocs version: 1.0.4
</commit_message>
<xml_diff>
--- a/mm2-diagrams.pptx
+++ b/mm2-diagrams.pptx
@@ -6,10 +6,10 @@
     <p:sldMasterId id="2147483943" r:id="rId2"/>
   </p:sldMasterIdLst>
   <p:notesMasterIdLst>
-    <p:notesMasterId r:id="rId18"/>
+    <p:notesMasterId r:id="rId19"/>
   </p:notesMasterIdLst>
   <p:handoutMasterIdLst>
-    <p:handoutMasterId r:id="rId19"/>
+    <p:handoutMasterId r:id="rId20"/>
   </p:handoutMasterIdLst>
   <p:sldIdLst>
     <p:sldId id="141169016" r:id="rId3"/>
@@ -26,7 +26,8 @@
     <p:sldId id="141169020" r:id="rId14"/>
     <p:sldId id="141169021" r:id="rId15"/>
     <p:sldId id="141169022" r:id="rId16"/>
-    <p:sldId id="141169017" r:id="rId17"/>
+    <p:sldId id="141169023" r:id="rId17"/>
+    <p:sldId id="141169017" r:id="rId18"/>
   </p:sldIdLst>
   <p:sldSz cx="9144000" cy="5143500" type="screen16x9"/>
   <p:notesSz cx="6858000" cy="9144000"/>
@@ -229,7 +230,7 @@
           <a:p>
             <a:fld id="{43B1B1F9-D0CB-FF4D-BEE0-BED1F1FDA196}" type="datetimeFigureOut">
               <a:rPr lang="en-US" smtClean="0"/>
-              <a:t>4/8/20</a:t>
+              <a:t>4/9/20</a:t>
             </a:fld>
             <a:endParaRPr lang="en-US"/>
           </a:p>
@@ -394,7 +395,7 @@
           <a:p>
             <a:fld id="{26BE012A-D992-5D42-B86E-AA2BC0764EE1}" type="datetimeFigureOut">
               <a:rPr lang="en-US" smtClean="0"/>
-              <a:t>4/8/20</a:t>
+              <a:t>4/9/20</a:t>
             </a:fld>
             <a:endParaRPr lang="en-US"/>
           </a:p>
@@ -1235,6 +1236,94 @@
 </p:notes>
 </file>
 
+<file path=ppt/notesSlides/notesSlide6.xml><?xml version="1.0" encoding="utf-8"?>
+<p:notes xmlns:a="http://schemas.openxmlformats.org/drawingml/2006/main" xmlns:r="http://schemas.openxmlformats.org/officeDocument/2006/relationships" xmlns:p="http://schemas.openxmlformats.org/presentationml/2006/main">
+  <p:cSld>
+    <p:spTree>
+      <p:nvGrpSpPr>
+        <p:cNvPr id="1" name=""/>
+        <p:cNvGrpSpPr/>
+        <p:nvPr/>
+      </p:nvGrpSpPr>
+      <p:grpSpPr>
+        <a:xfrm>
+          <a:off x="0" y="0"/>
+          <a:ext cx="0" cy="0"/>
+          <a:chOff x="0" y="0"/>
+          <a:chExt cx="0" cy="0"/>
+        </a:xfrm>
+      </p:grpSpPr>
+      <p:sp>
+        <p:nvSpPr>
+          <p:cNvPr id="2" name="Slide Image Placeholder 1"/>
+          <p:cNvSpPr>
+            <a:spLocks noGrp="1" noRot="1" noChangeAspect="1"/>
+          </p:cNvSpPr>
+          <p:nvPr>
+            <p:ph type="sldImg"/>
+          </p:nvPr>
+        </p:nvSpPr>
+        <p:spPr/>
+      </p:sp>
+      <p:sp>
+        <p:nvSpPr>
+          <p:cNvPr id="3" name="Notes Placeholder 2"/>
+          <p:cNvSpPr>
+            <a:spLocks noGrp="1"/>
+          </p:cNvSpPr>
+          <p:nvPr>
+            <p:ph type="body" idx="1"/>
+          </p:nvPr>
+        </p:nvSpPr>
+        <p:spPr/>
+        <p:txBody>
+          <a:bodyPr/>
+          <a:lstStyle/>
+          <a:p>
+            <a:r>
+              <a:rPr lang="en-US" dirty="0"/>
+              <a:t>Checkpoint topic capture the consumer states </a:t>
+            </a:r>
+            <a:endParaRPr dirty="0"/>
+          </a:p>
+        </p:txBody>
+      </p:sp>
+      <p:sp>
+        <p:nvSpPr>
+          <p:cNvPr id="4" name="Slide Number Placeholder 3"/>
+          <p:cNvSpPr>
+            <a:spLocks noGrp="1"/>
+          </p:cNvSpPr>
+          <p:nvPr>
+            <p:ph type="sldNum" sz="quarter" idx="5"/>
+          </p:nvPr>
+        </p:nvSpPr>
+        <p:spPr/>
+        <p:txBody>
+          <a:bodyPr/>
+          <a:lstStyle/>
+          <a:p>
+            <a:fld id="{18D02FFD-07D4-5C4F-BD77-921008177348}" type="slidenum">
+              <a:rPr lang="en-US" smtClean="0"/>
+              <a:t>15</a:t>
+            </a:fld>
+            <a:endParaRPr lang="en-US"/>
+          </a:p>
+        </p:txBody>
+      </p:sp>
+    </p:spTree>
+    <p:extLst>
+      <p:ext uri="{BB962C8B-B14F-4D97-AF65-F5344CB8AC3E}">
+        <p14:creationId xmlns:p14="http://schemas.microsoft.com/office/powerpoint/2010/main" val="3125368110"/>
+      </p:ext>
+    </p:extLst>
+  </p:cSld>
+  <p:clrMapOvr>
+    <a:masterClrMapping/>
+  </p:clrMapOvr>
+</p:notes>
+</file>
+
 <file path=ppt/slideLayouts/slideLayout1.xml><?xml version="1.0" encoding="utf-8"?>
 <p:sldLayout xmlns:a="http://schemas.openxmlformats.org/drawingml/2006/main" xmlns:r="http://schemas.openxmlformats.org/officeDocument/2006/relationships" xmlns:p="http://schemas.openxmlformats.org/presentationml/2006/main" type="obj">
   <p:cSld name="2_Title and Content">
@@ -3225,14 +3314,14 @@
           </a:ln>
           <a:extLst>
             <a:ext uri="{909E8E84-426E-40dd-AFC4-6F175D3DCCD1}">
-              <a14:hiddenFill xmlns="" xmlns:a14="http://schemas.microsoft.com/office/drawing/2010/main">
+              <a14:hiddenFill xmlns:a14="http://schemas.microsoft.com/office/drawing/2010/main" xmlns="">
                 <a:solidFill>
                   <a:srgbClr val="FFFFFF"/>
                 </a:solidFill>
               </a14:hiddenFill>
             </a:ext>
             <a:ext uri="{91240B29-F687-4f45-9708-019B960494DF}">
-              <a14:hiddenLine xmlns="" xmlns:a14="http://schemas.microsoft.com/office/drawing/2010/main" w="9525">
+              <a14:hiddenLine xmlns:a14="http://schemas.microsoft.com/office/drawing/2010/main" xmlns="" w="9525">
                 <a:solidFill>
                   <a:srgbClr val="000000"/>
                 </a:solidFill>
@@ -3284,14 +3373,14 @@
           <a:effectLst/>
           <a:extLst>
             <a:ext uri="{909E8E84-426E-40dd-AFC4-6F175D3DCCD1}">
-              <a14:hiddenFill xmlns="" xmlns:a14="http://schemas.microsoft.com/office/drawing/2010/main">
+              <a14:hiddenFill xmlns:a14="http://schemas.microsoft.com/office/drawing/2010/main" xmlns="">
                 <a:solidFill>
                   <a:schemeClr val="accent1"/>
                 </a:solidFill>
               </a14:hiddenFill>
             </a:ext>
             <a:ext uri="{91240B29-F687-4f45-9708-019B960494DF}">
-              <a14:hiddenLine xmlns="" xmlns:a14="http://schemas.microsoft.com/office/drawing/2010/main" w="9525">
+              <a14:hiddenLine xmlns:a14="http://schemas.microsoft.com/office/drawing/2010/main" xmlns="" w="9525">
                 <a:solidFill>
                   <a:schemeClr val="tx1"/>
                 </a:solidFill>
@@ -3301,7 +3390,7 @@
               </a14:hiddenLine>
             </a:ext>
             <a:ext uri="{AF507438-7753-43e0-B8FC-AC1667EBCBE1}">
-              <a14:hiddenEffects xmlns="" xmlns:a14="http://schemas.microsoft.com/office/drawing/2010/main">
+              <a14:hiddenEffects xmlns:a14="http://schemas.microsoft.com/office/drawing/2010/main" xmlns="">
                 <a:effectLst>
                   <a:outerShdw blurRad="63500" dist="38099" dir="2700000" algn="ctr" rotWithShape="0">
                     <a:schemeClr val="bg2">
@@ -4017,10 +4106,10 @@
           </a:ln>
           <a:extLst>
             <a:ext uri="{FAA26D3D-D897-4be2-8F04-BA451C77F1D7}">
-              <ma14:placeholderFlag xmlns:ma14="http://schemas.microsoft.com/office/mac/drawingml/2011/main" xmlns="" val="1"/>
+              <ma14:placeholderFlag xmlns="" xmlns:ma14="http://schemas.microsoft.com/office/mac/drawingml/2011/main" val="1"/>
             </a:ext>
             <a:ext uri="{909E8E84-426E-40dd-AFC4-6F175D3DCCD1}">
-              <a14:hiddenFill xmlns:a14="http://schemas.microsoft.com/office/drawing/2010/main" xmlns="">
+              <a14:hiddenFill xmlns="" xmlns:a14="http://schemas.microsoft.com/office/drawing/2010/main">
                 <a:solidFill>
                   <a:srgbClr val="FFFFFF"/>
                 </a:solidFill>
@@ -4071,10 +4160,10 @@
           </a:ln>
           <a:extLst>
             <a:ext uri="{FAA26D3D-D897-4be2-8F04-BA451C77F1D7}">
-              <ma14:placeholderFlag xmlns:ma14="http://schemas.microsoft.com/office/mac/drawingml/2011/main" xmlns="" val="1"/>
+              <ma14:placeholderFlag xmlns="" xmlns:ma14="http://schemas.microsoft.com/office/mac/drawingml/2011/main" val="1"/>
             </a:ext>
             <a:ext uri="{909E8E84-426E-40dd-AFC4-6F175D3DCCD1}">
-              <a14:hiddenFill xmlns:a14="http://schemas.microsoft.com/office/drawing/2010/main" xmlns="">
+              <a14:hiddenFill xmlns="" xmlns:a14="http://schemas.microsoft.com/office/drawing/2010/main">
                 <a:solidFill>
                   <a:srgbClr val="FFFFFF"/>
                 </a:solidFill>
@@ -16352,7 +16441,7 @@
               </a:spcAft>
             </a:pPr>
             <a:r>
-              <a:rPr lang="en-US" sz="900" b="1">
+              <a:rPr lang="en-US" sz="900" b="1" dirty="0">
                 <a:solidFill>
                   <a:srgbClr val="325C80">
                     <a:lumMod val="50000"/>
@@ -18086,7 +18175,7 @@
           <p:cNvPr id="2" name="Title 1">
             <a:extLst>
               <a:ext uri="{FF2B5EF4-FFF2-40B4-BE49-F238E27FC236}">
-                <a16:creationId xmlns:a16="http://schemas.microsoft.com/office/drawing/2014/main" id="{58169065-201E-5F42-BB75-6EA30E0A8D38}"/>
+                <a16:creationId xmlns:a16="http://schemas.microsoft.com/office/drawing/2014/main" id="{7B4AC918-9C9F-3748-95FB-8CF19F0B56DB}"/>
               </a:ext>
             </a:extLst>
           </p:cNvPr>
@@ -18104,9 +18193,8 @@
           <a:p>
             <a:r>
               <a:rPr lang="en-US" dirty="0"/>
-              <a:t>Mirror maker monitoring</a:t>
-            </a:r>
-            <a:endParaRPr dirty="0"/>
+              <a:t>Duplicate</a:t>
+            </a:r>
           </a:p>
         </p:txBody>
       </p:sp>
@@ -18115,7 +18203,7 @@
           <p:cNvPr id="4" name="Slide Number Placeholder 3">
             <a:extLst>
               <a:ext uri="{FF2B5EF4-FFF2-40B4-BE49-F238E27FC236}">
-                <a16:creationId xmlns:a16="http://schemas.microsoft.com/office/drawing/2014/main" id="{D461EF70-49A7-3F48-A6F1-90FB6453A640}"/>
+                <a16:creationId xmlns:a16="http://schemas.microsoft.com/office/drawing/2014/main" id="{79E0D2FF-FA8F-5C41-A2E5-39FB0CDCEF9D}"/>
               </a:ext>
             </a:extLst>
           </p:cNvPr>
@@ -18139,6 +18227,4360 @@
               </a:rPr>
               <a:pPr/>
               <a:t>15</a:t>
+            </a:fld>
+            <a:endParaRPr lang="en-US">
+              <a:solidFill>
+                <a:srgbClr val="5AAAFA"/>
+              </a:solidFill>
+            </a:endParaRPr>
+          </a:p>
+        </p:txBody>
+      </p:sp>
+      <p:grpSp>
+        <p:nvGrpSpPr>
+          <p:cNvPr id="38" name="Group 37">
+            <a:extLst>
+              <a:ext uri="{FF2B5EF4-FFF2-40B4-BE49-F238E27FC236}">
+                <a16:creationId xmlns:a16="http://schemas.microsoft.com/office/drawing/2014/main" id="{74DBF001-9AA3-4348-B799-9701E11CCC93}"/>
+              </a:ext>
+            </a:extLst>
+          </p:cNvPr>
+          <p:cNvGrpSpPr/>
+          <p:nvPr/>
+        </p:nvGrpSpPr>
+        <p:grpSpPr>
+          <a:xfrm>
+            <a:off x="379194" y="1407180"/>
+            <a:ext cx="635153" cy="252252"/>
+            <a:chOff x="1193647" y="1635094"/>
+            <a:chExt cx="818524" cy="411476"/>
+          </a:xfrm>
+        </p:grpSpPr>
+        <p:sp>
+          <p:nvSpPr>
+            <p:cNvPr id="39" name="Rounded Rectangle 38">
+              <a:extLst>
+                <a:ext uri="{FF2B5EF4-FFF2-40B4-BE49-F238E27FC236}">
+                  <a16:creationId xmlns:a16="http://schemas.microsoft.com/office/drawing/2014/main" id="{AD4BC446-8427-A34F-9E75-01D09F9DAA61}"/>
+                </a:ext>
+              </a:extLst>
+            </p:cNvPr>
+            <p:cNvSpPr/>
+            <p:nvPr/>
+          </p:nvSpPr>
+          <p:spPr bwMode="auto">
+            <a:xfrm>
+              <a:off x="1193647" y="1635094"/>
+              <a:ext cx="138128" cy="411476"/>
+            </a:xfrm>
+            <a:prstGeom prst="roundRect">
+              <a:avLst/>
+            </a:prstGeom>
+            <a:solidFill>
+              <a:schemeClr val="bg1">
+                <a:lumMod val="50000"/>
+              </a:schemeClr>
+            </a:solidFill>
+            <a:ln>
+              <a:solidFill>
+                <a:schemeClr val="bg1"/>
+              </a:solidFill>
+              <a:prstDash val="solid"/>
+              <a:headEnd type="none" w="med" len="med"/>
+              <a:tailEnd type="none" w="med" len="med"/>
+            </a:ln>
+            <a:effectLst/>
+          </p:spPr>
+          <p:style>
+            <a:lnRef idx="1">
+              <a:schemeClr val="accent5"/>
+            </a:lnRef>
+            <a:fillRef idx="3">
+              <a:schemeClr val="accent5"/>
+            </a:fillRef>
+            <a:effectRef idx="2">
+              <a:schemeClr val="accent5"/>
+            </a:effectRef>
+            <a:fontRef idx="minor">
+              <a:schemeClr val="lt1"/>
+            </a:fontRef>
+          </p:style>
+          <p:txBody>
+            <a:bodyPr vert="horz" wrap="square" lIns="0" tIns="0" rIns="0" bIns="0" numCol="1" rtlCol="0" anchor="ctr" anchorCtr="0" compatLnSpc="1">
+              <a:prstTxWarp prst="textNoShape">
+                <a:avLst/>
+              </a:prstTxWarp>
+              <a:noAutofit/>
+            </a:bodyPr>
+            <a:lstStyle/>
+            <a:p>
+              <a:pPr algn="ctr" defTabSz="685784" eaLnBrk="0" fontAlgn="base" hangingPunct="0">
+                <a:lnSpc>
+                  <a:spcPct val="90000"/>
+                </a:lnSpc>
+                <a:spcBef>
+                  <a:spcPct val="0"/>
+                </a:spcBef>
+                <a:spcAft>
+                  <a:spcPct val="0"/>
+                </a:spcAft>
+              </a:pPr>
+              <a:r>
+                <a:rPr lang="en-US" sz="675">
+                  <a:solidFill>
+                    <a:srgbClr val="FFFFFF"/>
+                  </a:solidFill>
+                  <a:latin typeface="Arial"/>
+                </a:rPr>
+                <a:t>0</a:t>
+              </a:r>
+              <a:endParaRPr lang="en-US" sz="375">
+                <a:solidFill>
+                  <a:srgbClr val="FFFFFF"/>
+                </a:solidFill>
+                <a:latin typeface="Arial"/>
+              </a:endParaRPr>
+            </a:p>
+          </p:txBody>
+        </p:sp>
+        <p:sp>
+          <p:nvSpPr>
+            <p:cNvPr id="40" name="Rounded Rectangle 39">
+              <a:extLst>
+                <a:ext uri="{FF2B5EF4-FFF2-40B4-BE49-F238E27FC236}">
+                  <a16:creationId xmlns:a16="http://schemas.microsoft.com/office/drawing/2014/main" id="{242EF24A-AFD7-334E-9307-F5AA91BCA91F}"/>
+                </a:ext>
+              </a:extLst>
+            </p:cNvPr>
+            <p:cNvSpPr/>
+            <p:nvPr/>
+          </p:nvSpPr>
+          <p:spPr bwMode="auto">
+            <a:xfrm>
+              <a:off x="1330805" y="1635094"/>
+              <a:ext cx="138128" cy="411476"/>
+            </a:xfrm>
+            <a:prstGeom prst="roundRect">
+              <a:avLst/>
+            </a:prstGeom>
+            <a:solidFill>
+              <a:schemeClr val="bg1">
+                <a:lumMod val="50000"/>
+              </a:schemeClr>
+            </a:solidFill>
+            <a:ln>
+              <a:solidFill>
+                <a:schemeClr val="bg1"/>
+              </a:solidFill>
+              <a:prstDash val="solid"/>
+              <a:headEnd type="none" w="med" len="med"/>
+              <a:tailEnd type="none" w="med" len="med"/>
+            </a:ln>
+            <a:effectLst/>
+          </p:spPr>
+          <p:style>
+            <a:lnRef idx="1">
+              <a:schemeClr val="accent5"/>
+            </a:lnRef>
+            <a:fillRef idx="3">
+              <a:schemeClr val="accent5"/>
+            </a:fillRef>
+            <a:effectRef idx="2">
+              <a:schemeClr val="accent5"/>
+            </a:effectRef>
+            <a:fontRef idx="minor">
+              <a:schemeClr val="lt1"/>
+            </a:fontRef>
+          </p:style>
+          <p:txBody>
+            <a:bodyPr vert="horz" wrap="square" lIns="0" tIns="0" rIns="0" bIns="0" numCol="1" rtlCol="0" anchor="ctr" anchorCtr="0" compatLnSpc="1">
+              <a:prstTxWarp prst="textNoShape">
+                <a:avLst/>
+              </a:prstTxWarp>
+              <a:noAutofit/>
+            </a:bodyPr>
+            <a:lstStyle/>
+            <a:p>
+              <a:pPr algn="ctr" defTabSz="685784" eaLnBrk="0" fontAlgn="base" hangingPunct="0">
+                <a:lnSpc>
+                  <a:spcPct val="90000"/>
+                </a:lnSpc>
+                <a:spcBef>
+                  <a:spcPct val="0"/>
+                </a:spcBef>
+                <a:spcAft>
+                  <a:spcPct val="0"/>
+                </a:spcAft>
+              </a:pPr>
+              <a:r>
+                <a:rPr lang="en-US" sz="675">
+                  <a:solidFill>
+                    <a:srgbClr val="FFFFFF"/>
+                  </a:solidFill>
+                  <a:latin typeface="Arial"/>
+                </a:rPr>
+                <a:t>1</a:t>
+              </a:r>
+              <a:endParaRPr lang="en-US" sz="375">
+                <a:solidFill>
+                  <a:srgbClr val="FFFFFF"/>
+                </a:solidFill>
+                <a:latin typeface="Arial"/>
+              </a:endParaRPr>
+            </a:p>
+          </p:txBody>
+        </p:sp>
+        <p:sp>
+          <p:nvSpPr>
+            <p:cNvPr id="41" name="Rounded Rectangle 40">
+              <a:extLst>
+                <a:ext uri="{FF2B5EF4-FFF2-40B4-BE49-F238E27FC236}">
+                  <a16:creationId xmlns:a16="http://schemas.microsoft.com/office/drawing/2014/main" id="{51A79F0C-0532-F24A-AB0B-1ACF277F5474}"/>
+                </a:ext>
+              </a:extLst>
+            </p:cNvPr>
+            <p:cNvSpPr/>
+            <p:nvPr/>
+          </p:nvSpPr>
+          <p:spPr bwMode="auto">
+            <a:xfrm>
+              <a:off x="1468934" y="1635094"/>
+              <a:ext cx="138128" cy="411476"/>
+            </a:xfrm>
+            <a:prstGeom prst="roundRect">
+              <a:avLst/>
+            </a:prstGeom>
+            <a:solidFill>
+              <a:schemeClr val="bg1">
+                <a:lumMod val="50000"/>
+              </a:schemeClr>
+            </a:solidFill>
+            <a:ln>
+              <a:solidFill>
+                <a:schemeClr val="bg1"/>
+              </a:solidFill>
+              <a:prstDash val="solid"/>
+              <a:headEnd type="none" w="med" len="med"/>
+              <a:tailEnd type="none" w="med" len="med"/>
+            </a:ln>
+            <a:effectLst/>
+          </p:spPr>
+          <p:style>
+            <a:lnRef idx="1">
+              <a:schemeClr val="accent5"/>
+            </a:lnRef>
+            <a:fillRef idx="3">
+              <a:schemeClr val="accent5"/>
+            </a:fillRef>
+            <a:effectRef idx="2">
+              <a:schemeClr val="accent5"/>
+            </a:effectRef>
+            <a:fontRef idx="minor">
+              <a:schemeClr val="lt1"/>
+            </a:fontRef>
+          </p:style>
+          <p:txBody>
+            <a:bodyPr vert="horz" wrap="square" lIns="0" tIns="0" rIns="0" bIns="0" numCol="1" rtlCol="0" anchor="ctr" anchorCtr="0" compatLnSpc="1">
+              <a:prstTxWarp prst="textNoShape">
+                <a:avLst/>
+              </a:prstTxWarp>
+              <a:noAutofit/>
+            </a:bodyPr>
+            <a:lstStyle/>
+            <a:p>
+              <a:pPr algn="ctr" defTabSz="685784" eaLnBrk="0" fontAlgn="base" hangingPunct="0">
+                <a:lnSpc>
+                  <a:spcPct val="90000"/>
+                </a:lnSpc>
+                <a:spcBef>
+                  <a:spcPct val="0"/>
+                </a:spcBef>
+                <a:spcAft>
+                  <a:spcPct val="0"/>
+                </a:spcAft>
+              </a:pPr>
+              <a:r>
+                <a:rPr lang="en-US" sz="675">
+                  <a:solidFill>
+                    <a:srgbClr val="FFFFFF"/>
+                  </a:solidFill>
+                  <a:latin typeface="Arial"/>
+                </a:rPr>
+                <a:t>2</a:t>
+              </a:r>
+              <a:endParaRPr lang="en-US" sz="375">
+                <a:solidFill>
+                  <a:srgbClr val="FFFFFF"/>
+                </a:solidFill>
+                <a:latin typeface="Arial"/>
+              </a:endParaRPr>
+            </a:p>
+          </p:txBody>
+        </p:sp>
+        <p:sp>
+          <p:nvSpPr>
+            <p:cNvPr id="42" name="Rounded Rectangle 41">
+              <a:extLst>
+                <a:ext uri="{FF2B5EF4-FFF2-40B4-BE49-F238E27FC236}">
+                  <a16:creationId xmlns:a16="http://schemas.microsoft.com/office/drawing/2014/main" id="{FB28BBFB-FED7-B943-83E9-44CBB75024F2}"/>
+                </a:ext>
+              </a:extLst>
+            </p:cNvPr>
+            <p:cNvSpPr/>
+            <p:nvPr/>
+          </p:nvSpPr>
+          <p:spPr bwMode="auto">
+            <a:xfrm>
+              <a:off x="1606093" y="1635094"/>
+              <a:ext cx="138128" cy="411476"/>
+            </a:xfrm>
+            <a:prstGeom prst="roundRect">
+              <a:avLst/>
+            </a:prstGeom>
+            <a:solidFill>
+              <a:schemeClr val="bg1">
+                <a:lumMod val="50000"/>
+              </a:schemeClr>
+            </a:solidFill>
+            <a:ln>
+              <a:solidFill>
+                <a:schemeClr val="bg1"/>
+              </a:solidFill>
+              <a:prstDash val="solid"/>
+              <a:headEnd type="none" w="med" len="med"/>
+              <a:tailEnd type="none" w="med" len="med"/>
+            </a:ln>
+            <a:effectLst/>
+          </p:spPr>
+          <p:style>
+            <a:lnRef idx="1">
+              <a:schemeClr val="accent5"/>
+            </a:lnRef>
+            <a:fillRef idx="3">
+              <a:schemeClr val="accent5"/>
+            </a:fillRef>
+            <a:effectRef idx="2">
+              <a:schemeClr val="accent5"/>
+            </a:effectRef>
+            <a:fontRef idx="minor">
+              <a:schemeClr val="lt1"/>
+            </a:fontRef>
+          </p:style>
+          <p:txBody>
+            <a:bodyPr vert="horz" wrap="square" lIns="0" tIns="0" rIns="0" bIns="0" numCol="1" rtlCol="0" anchor="ctr" anchorCtr="0" compatLnSpc="1">
+              <a:prstTxWarp prst="textNoShape">
+                <a:avLst/>
+              </a:prstTxWarp>
+              <a:noAutofit/>
+            </a:bodyPr>
+            <a:lstStyle/>
+            <a:p>
+              <a:pPr algn="ctr" defTabSz="685784" eaLnBrk="0" fontAlgn="base" hangingPunct="0">
+                <a:lnSpc>
+                  <a:spcPct val="90000"/>
+                </a:lnSpc>
+                <a:spcBef>
+                  <a:spcPct val="0"/>
+                </a:spcBef>
+                <a:spcAft>
+                  <a:spcPct val="0"/>
+                </a:spcAft>
+              </a:pPr>
+              <a:r>
+                <a:rPr lang="en-US" sz="675">
+                  <a:solidFill>
+                    <a:srgbClr val="FFFFFF"/>
+                  </a:solidFill>
+                  <a:latin typeface="Arial"/>
+                </a:rPr>
+                <a:t>3</a:t>
+              </a:r>
+              <a:endParaRPr lang="en-US" sz="375">
+                <a:solidFill>
+                  <a:srgbClr val="FFFFFF"/>
+                </a:solidFill>
+                <a:latin typeface="Arial"/>
+              </a:endParaRPr>
+            </a:p>
+          </p:txBody>
+        </p:sp>
+        <p:sp>
+          <p:nvSpPr>
+            <p:cNvPr id="43" name="Rounded Rectangle 42">
+              <a:extLst>
+                <a:ext uri="{FF2B5EF4-FFF2-40B4-BE49-F238E27FC236}">
+                  <a16:creationId xmlns:a16="http://schemas.microsoft.com/office/drawing/2014/main" id="{00233D0D-F99F-6742-9827-F788E13E88A1}"/>
+                </a:ext>
+              </a:extLst>
+            </p:cNvPr>
+            <p:cNvSpPr/>
+            <p:nvPr/>
+          </p:nvSpPr>
+          <p:spPr bwMode="auto">
+            <a:xfrm>
+              <a:off x="1744220" y="1635094"/>
+              <a:ext cx="138128" cy="411476"/>
+            </a:xfrm>
+            <a:prstGeom prst="roundRect">
+              <a:avLst/>
+            </a:prstGeom>
+            <a:solidFill>
+              <a:schemeClr val="bg1">
+                <a:lumMod val="50000"/>
+              </a:schemeClr>
+            </a:solidFill>
+            <a:ln>
+              <a:solidFill>
+                <a:schemeClr val="bg1"/>
+              </a:solidFill>
+              <a:prstDash val="solid"/>
+              <a:headEnd type="none" w="med" len="med"/>
+              <a:tailEnd type="none" w="med" len="med"/>
+            </a:ln>
+            <a:effectLst/>
+          </p:spPr>
+          <p:style>
+            <a:lnRef idx="1">
+              <a:schemeClr val="accent5"/>
+            </a:lnRef>
+            <a:fillRef idx="3">
+              <a:schemeClr val="accent5"/>
+            </a:fillRef>
+            <a:effectRef idx="2">
+              <a:schemeClr val="accent5"/>
+            </a:effectRef>
+            <a:fontRef idx="minor">
+              <a:schemeClr val="lt1"/>
+            </a:fontRef>
+          </p:style>
+          <p:txBody>
+            <a:bodyPr vert="horz" wrap="square" lIns="0" tIns="0" rIns="0" bIns="0" numCol="1" rtlCol="0" anchor="ctr" anchorCtr="0" compatLnSpc="1">
+              <a:prstTxWarp prst="textNoShape">
+                <a:avLst/>
+              </a:prstTxWarp>
+              <a:noAutofit/>
+            </a:bodyPr>
+            <a:lstStyle/>
+            <a:p>
+              <a:pPr algn="ctr" defTabSz="685784" eaLnBrk="0" fontAlgn="base" hangingPunct="0">
+                <a:lnSpc>
+                  <a:spcPct val="90000"/>
+                </a:lnSpc>
+                <a:spcBef>
+                  <a:spcPct val="0"/>
+                </a:spcBef>
+                <a:spcAft>
+                  <a:spcPct val="0"/>
+                </a:spcAft>
+              </a:pPr>
+              <a:r>
+                <a:rPr lang="en-US" sz="675">
+                  <a:solidFill>
+                    <a:srgbClr val="FFFFFF"/>
+                  </a:solidFill>
+                  <a:latin typeface="Arial"/>
+                </a:rPr>
+                <a:t>4</a:t>
+              </a:r>
+              <a:endParaRPr lang="en-US" sz="375">
+                <a:solidFill>
+                  <a:srgbClr val="FFFFFF"/>
+                </a:solidFill>
+                <a:latin typeface="Arial"/>
+              </a:endParaRPr>
+            </a:p>
+          </p:txBody>
+        </p:sp>
+        <p:sp>
+          <p:nvSpPr>
+            <p:cNvPr id="45" name="Rounded Rectangle 44">
+              <a:extLst>
+                <a:ext uri="{FF2B5EF4-FFF2-40B4-BE49-F238E27FC236}">
+                  <a16:creationId xmlns:a16="http://schemas.microsoft.com/office/drawing/2014/main" id="{EE6BAF37-92D9-2445-81DD-ACBD6901225B}"/>
+                </a:ext>
+              </a:extLst>
+            </p:cNvPr>
+            <p:cNvSpPr/>
+            <p:nvPr/>
+          </p:nvSpPr>
+          <p:spPr bwMode="auto">
+            <a:xfrm>
+              <a:off x="1874043" y="1635094"/>
+              <a:ext cx="138128" cy="411476"/>
+            </a:xfrm>
+            <a:prstGeom prst="roundRect">
+              <a:avLst/>
+            </a:prstGeom>
+            <a:solidFill>
+              <a:schemeClr val="bg1">
+                <a:lumMod val="50000"/>
+              </a:schemeClr>
+            </a:solidFill>
+            <a:ln>
+              <a:solidFill>
+                <a:schemeClr val="bg1"/>
+              </a:solidFill>
+              <a:prstDash val="solid"/>
+              <a:headEnd type="none" w="med" len="med"/>
+              <a:tailEnd type="none" w="med" len="med"/>
+            </a:ln>
+            <a:effectLst/>
+          </p:spPr>
+          <p:style>
+            <a:lnRef idx="1">
+              <a:schemeClr val="accent5"/>
+            </a:lnRef>
+            <a:fillRef idx="3">
+              <a:schemeClr val="accent5"/>
+            </a:fillRef>
+            <a:effectRef idx="2">
+              <a:schemeClr val="accent5"/>
+            </a:effectRef>
+            <a:fontRef idx="minor">
+              <a:schemeClr val="lt1"/>
+            </a:fontRef>
+          </p:style>
+          <p:txBody>
+            <a:bodyPr vert="horz" wrap="square" lIns="0" tIns="0" rIns="0" bIns="0" numCol="1" rtlCol="0" anchor="ctr" anchorCtr="0" compatLnSpc="1">
+              <a:prstTxWarp prst="textNoShape">
+                <a:avLst/>
+              </a:prstTxWarp>
+              <a:noAutofit/>
+            </a:bodyPr>
+            <a:lstStyle/>
+            <a:p>
+              <a:pPr algn="ctr" defTabSz="685784" eaLnBrk="0" fontAlgn="base" hangingPunct="0">
+                <a:lnSpc>
+                  <a:spcPct val="90000"/>
+                </a:lnSpc>
+                <a:spcBef>
+                  <a:spcPct val="0"/>
+                </a:spcBef>
+                <a:spcAft>
+                  <a:spcPct val="0"/>
+                </a:spcAft>
+              </a:pPr>
+              <a:r>
+                <a:rPr lang="en-US" sz="675">
+                  <a:solidFill>
+                    <a:srgbClr val="FFFFFF"/>
+                  </a:solidFill>
+                  <a:latin typeface="Arial"/>
+                </a:rPr>
+                <a:t>5</a:t>
+              </a:r>
+              <a:endParaRPr lang="en-US" sz="375">
+                <a:solidFill>
+                  <a:srgbClr val="FFFFFF"/>
+                </a:solidFill>
+                <a:latin typeface="Arial"/>
+              </a:endParaRPr>
+            </a:p>
+          </p:txBody>
+        </p:sp>
+      </p:grpSp>
+      <p:sp>
+        <p:nvSpPr>
+          <p:cNvPr id="46" name="Rectangle 45">
+            <a:extLst>
+              <a:ext uri="{FF2B5EF4-FFF2-40B4-BE49-F238E27FC236}">
+                <a16:creationId xmlns:a16="http://schemas.microsoft.com/office/drawing/2014/main" id="{F101ABC2-DA83-884F-B245-79CAA46EB4F7}"/>
+              </a:ext>
+            </a:extLst>
+          </p:cNvPr>
+          <p:cNvSpPr/>
+          <p:nvPr/>
+        </p:nvSpPr>
+        <p:spPr>
+          <a:xfrm>
+            <a:off x="293688" y="1763440"/>
+            <a:ext cx="598241" cy="230832"/>
+          </a:xfrm>
+          <a:prstGeom prst="rect">
+            <a:avLst/>
+          </a:prstGeom>
+        </p:spPr>
+        <p:txBody>
+          <a:bodyPr wrap="none">
+            <a:spAutoFit/>
+          </a:bodyPr>
+          <a:lstStyle/>
+          <a:p>
+            <a:r>
+              <a:rPr lang="en-US" sz="900">
+                <a:latin typeface="Menlo" panose="020B0609030804020204" pitchFamily="49" charset="0"/>
+              </a:rPr>
+              <a:t>orders</a:t>
+            </a:r>
+            <a:endParaRPr lang="en-US" sz="900">
+              <a:effectLst/>
+              <a:latin typeface="Menlo" panose="020B0609030804020204" pitchFamily="49" charset="0"/>
+            </a:endParaRPr>
+          </a:p>
+        </p:txBody>
+      </p:sp>
+      <p:cxnSp>
+        <p:nvCxnSpPr>
+          <p:cNvPr id="47" name="Straight Connector 46">
+            <a:extLst>
+              <a:ext uri="{FF2B5EF4-FFF2-40B4-BE49-F238E27FC236}">
+                <a16:creationId xmlns:a16="http://schemas.microsoft.com/office/drawing/2014/main" id="{1923AC7F-002C-2B4A-A75B-A5C60C98FF3A}"/>
+              </a:ext>
+            </a:extLst>
+          </p:cNvPr>
+          <p:cNvCxnSpPr/>
+          <p:nvPr/>
+        </p:nvCxnSpPr>
+        <p:spPr>
+          <a:xfrm flipH="1">
+            <a:off x="1845794" y="1173579"/>
+            <a:ext cx="15768" cy="2796341"/>
+          </a:xfrm>
+          <a:prstGeom prst="line">
+            <a:avLst/>
+          </a:prstGeom>
+          <a:ln>
+            <a:solidFill>
+              <a:srgbClr val="C00000"/>
+            </a:solidFill>
+          </a:ln>
+          <a:effectLst/>
+        </p:spPr>
+        <p:style>
+          <a:lnRef idx="2">
+            <a:schemeClr val="accent1"/>
+          </a:lnRef>
+          <a:fillRef idx="0">
+            <a:schemeClr val="accent1"/>
+          </a:fillRef>
+          <a:effectRef idx="1">
+            <a:schemeClr val="accent1"/>
+          </a:effectRef>
+          <a:fontRef idx="minor">
+            <a:schemeClr val="tx1"/>
+          </a:fontRef>
+        </p:style>
+      </p:cxnSp>
+      <p:sp>
+        <p:nvSpPr>
+          <p:cNvPr id="49" name="Rectangle 48">
+            <a:extLst>
+              <a:ext uri="{FF2B5EF4-FFF2-40B4-BE49-F238E27FC236}">
+                <a16:creationId xmlns:a16="http://schemas.microsoft.com/office/drawing/2014/main" id="{0282A00A-5415-844C-84F0-E7C4F2A91116}"/>
+              </a:ext>
+            </a:extLst>
+          </p:cNvPr>
+          <p:cNvSpPr/>
+          <p:nvPr/>
+        </p:nvSpPr>
+        <p:spPr>
+          <a:xfrm>
+            <a:off x="1293483" y="812956"/>
+            <a:ext cx="1136158" cy="336180"/>
+          </a:xfrm>
+          <a:prstGeom prst="rect">
+            <a:avLst/>
+          </a:prstGeom>
+          <a:solidFill>
+            <a:srgbClr val="FCEBB8"/>
+          </a:solidFill>
+          <a:ln>
+            <a:noFill/>
+          </a:ln>
+        </p:spPr>
+        <p:style>
+          <a:lnRef idx="2">
+            <a:schemeClr val="accent1">
+              <a:shade val="50000"/>
+            </a:schemeClr>
+          </a:lnRef>
+          <a:fillRef idx="1">
+            <a:schemeClr val="accent1"/>
+          </a:fillRef>
+          <a:effectRef idx="0">
+            <a:schemeClr val="accent1"/>
+          </a:effectRef>
+          <a:fontRef idx="minor">
+            <a:schemeClr val="lt1"/>
+          </a:fontRef>
+        </p:style>
+        <p:txBody>
+          <a:bodyPr rtlCol="0" anchor="t"/>
+          <a:lstStyle/>
+          <a:p>
+            <a:pPr algn="ctr" eaLnBrk="0" fontAlgn="base" hangingPunct="0">
+              <a:spcBef>
+                <a:spcPct val="0"/>
+              </a:spcBef>
+              <a:spcAft>
+                <a:spcPct val="0"/>
+              </a:spcAft>
+            </a:pPr>
+            <a:r>
+              <a:rPr lang="en-US" sz="900" b="1" dirty="0">
+                <a:solidFill>
+                  <a:srgbClr val="325C80">
+                    <a:lumMod val="50000"/>
+                  </a:srgbClr>
+                </a:solidFill>
+                <a:latin typeface="Arial"/>
+              </a:rPr>
+              <a:t>Mirror Source Task</a:t>
+            </a:r>
+          </a:p>
+        </p:txBody>
+      </p:sp>
+      <p:cxnSp>
+        <p:nvCxnSpPr>
+          <p:cNvPr id="51" name="Straight Connector 50">
+            <a:extLst>
+              <a:ext uri="{FF2B5EF4-FFF2-40B4-BE49-F238E27FC236}">
+                <a16:creationId xmlns:a16="http://schemas.microsoft.com/office/drawing/2014/main" id="{99773A12-2515-AE46-A7C2-A2BA7FD1F287}"/>
+              </a:ext>
+            </a:extLst>
+          </p:cNvPr>
+          <p:cNvCxnSpPr>
+            <a:cxnSpLocks/>
+          </p:cNvCxnSpPr>
+          <p:nvPr/>
+        </p:nvCxnSpPr>
+        <p:spPr>
+          <a:xfrm flipH="1">
+            <a:off x="1845793" y="1871056"/>
+            <a:ext cx="1" cy="1572515"/>
+          </a:xfrm>
+          <a:prstGeom prst="line">
+            <a:avLst/>
+          </a:prstGeom>
+          <a:ln w="57150">
+            <a:solidFill>
+              <a:srgbClr val="C00000"/>
+            </a:solidFill>
+          </a:ln>
+          <a:effectLst/>
+        </p:spPr>
+        <p:style>
+          <a:lnRef idx="2">
+            <a:schemeClr val="accent1"/>
+          </a:lnRef>
+          <a:fillRef idx="0">
+            <a:schemeClr val="accent1"/>
+          </a:fillRef>
+          <a:effectRef idx="1">
+            <a:schemeClr val="accent1"/>
+          </a:effectRef>
+          <a:fontRef idx="minor">
+            <a:schemeClr val="tx1"/>
+          </a:fontRef>
+        </p:style>
+      </p:cxnSp>
+      <p:sp>
+        <p:nvSpPr>
+          <p:cNvPr id="53" name="Rectangle 52">
+            <a:extLst>
+              <a:ext uri="{FF2B5EF4-FFF2-40B4-BE49-F238E27FC236}">
+                <a16:creationId xmlns:a16="http://schemas.microsoft.com/office/drawing/2014/main" id="{A56E5990-A282-E043-8A05-20A7D7C1101F}"/>
+              </a:ext>
+            </a:extLst>
+          </p:cNvPr>
+          <p:cNvSpPr/>
+          <p:nvPr/>
+        </p:nvSpPr>
+        <p:spPr>
+          <a:xfrm>
+            <a:off x="2692792" y="812956"/>
+            <a:ext cx="1136158" cy="336180"/>
+          </a:xfrm>
+          <a:prstGeom prst="rect">
+            <a:avLst/>
+          </a:prstGeom>
+          <a:solidFill>
+            <a:srgbClr val="FCEBB8"/>
+          </a:solidFill>
+          <a:ln>
+            <a:noFill/>
+          </a:ln>
+        </p:spPr>
+        <p:style>
+          <a:lnRef idx="2">
+            <a:schemeClr val="accent1">
+              <a:shade val="50000"/>
+            </a:schemeClr>
+          </a:lnRef>
+          <a:fillRef idx="1">
+            <a:schemeClr val="accent1"/>
+          </a:fillRef>
+          <a:effectRef idx="0">
+            <a:schemeClr val="accent1"/>
+          </a:effectRef>
+          <a:fontRef idx="minor">
+            <a:schemeClr val="lt1"/>
+          </a:fontRef>
+        </p:style>
+        <p:txBody>
+          <a:bodyPr rtlCol="0" anchor="t"/>
+          <a:lstStyle/>
+          <a:p>
+            <a:pPr algn="ctr" eaLnBrk="0" fontAlgn="base" hangingPunct="0">
+              <a:spcBef>
+                <a:spcPct val="0"/>
+              </a:spcBef>
+              <a:spcAft>
+                <a:spcPct val="0"/>
+              </a:spcAft>
+            </a:pPr>
+            <a:r>
+              <a:rPr lang="en-US" sz="900" b="1" dirty="0">
+                <a:solidFill>
+                  <a:srgbClr val="325C80">
+                    <a:lumMod val="50000"/>
+                  </a:srgbClr>
+                </a:solidFill>
+                <a:latin typeface="Arial"/>
+              </a:rPr>
+              <a:t>Mirror Sink Task</a:t>
+            </a:r>
+          </a:p>
+        </p:txBody>
+      </p:sp>
+      <p:grpSp>
+        <p:nvGrpSpPr>
+          <p:cNvPr id="54" name="Group 53">
+            <a:extLst>
+              <a:ext uri="{FF2B5EF4-FFF2-40B4-BE49-F238E27FC236}">
+                <a16:creationId xmlns:a16="http://schemas.microsoft.com/office/drawing/2014/main" id="{82649B92-5C5A-9E4F-8005-0C3A383AD741}"/>
+              </a:ext>
+            </a:extLst>
+          </p:cNvPr>
+          <p:cNvGrpSpPr/>
+          <p:nvPr/>
+        </p:nvGrpSpPr>
+        <p:grpSpPr>
+          <a:xfrm>
+            <a:off x="5247978" y="2344166"/>
+            <a:ext cx="635153" cy="252252"/>
+            <a:chOff x="1193647" y="1635094"/>
+            <a:chExt cx="818524" cy="411476"/>
+          </a:xfrm>
+        </p:grpSpPr>
+        <p:sp>
+          <p:nvSpPr>
+            <p:cNvPr id="55" name="Rounded Rectangle 54">
+              <a:extLst>
+                <a:ext uri="{FF2B5EF4-FFF2-40B4-BE49-F238E27FC236}">
+                  <a16:creationId xmlns:a16="http://schemas.microsoft.com/office/drawing/2014/main" id="{D9FCD23C-8BD2-004A-8048-39957E99A533}"/>
+                </a:ext>
+              </a:extLst>
+            </p:cNvPr>
+            <p:cNvSpPr/>
+            <p:nvPr/>
+          </p:nvSpPr>
+          <p:spPr bwMode="auto">
+            <a:xfrm>
+              <a:off x="1193647" y="1635094"/>
+              <a:ext cx="138128" cy="411476"/>
+            </a:xfrm>
+            <a:prstGeom prst="roundRect">
+              <a:avLst/>
+            </a:prstGeom>
+            <a:solidFill>
+              <a:schemeClr val="bg1">
+                <a:lumMod val="50000"/>
+              </a:schemeClr>
+            </a:solidFill>
+            <a:ln>
+              <a:solidFill>
+                <a:schemeClr val="bg1"/>
+              </a:solidFill>
+              <a:prstDash val="solid"/>
+              <a:headEnd type="none" w="med" len="med"/>
+              <a:tailEnd type="none" w="med" len="med"/>
+            </a:ln>
+            <a:effectLst/>
+          </p:spPr>
+          <p:style>
+            <a:lnRef idx="1">
+              <a:schemeClr val="accent5"/>
+            </a:lnRef>
+            <a:fillRef idx="3">
+              <a:schemeClr val="accent5"/>
+            </a:fillRef>
+            <a:effectRef idx="2">
+              <a:schemeClr val="accent5"/>
+            </a:effectRef>
+            <a:fontRef idx="minor">
+              <a:schemeClr val="lt1"/>
+            </a:fontRef>
+          </p:style>
+          <p:txBody>
+            <a:bodyPr vert="horz" wrap="square" lIns="0" tIns="0" rIns="0" bIns="0" numCol="1" rtlCol="0" anchor="ctr" anchorCtr="0" compatLnSpc="1">
+              <a:prstTxWarp prst="textNoShape">
+                <a:avLst/>
+              </a:prstTxWarp>
+              <a:noAutofit/>
+            </a:bodyPr>
+            <a:lstStyle/>
+            <a:p>
+              <a:pPr algn="ctr" defTabSz="685784" eaLnBrk="0" fontAlgn="base" hangingPunct="0">
+                <a:lnSpc>
+                  <a:spcPct val="90000"/>
+                </a:lnSpc>
+                <a:spcBef>
+                  <a:spcPct val="0"/>
+                </a:spcBef>
+                <a:spcAft>
+                  <a:spcPct val="0"/>
+                </a:spcAft>
+              </a:pPr>
+              <a:r>
+                <a:rPr lang="en-US" sz="675" dirty="0">
+                  <a:solidFill>
+                    <a:srgbClr val="FFFFFF"/>
+                  </a:solidFill>
+                  <a:latin typeface="Arial"/>
+                </a:rPr>
+                <a:t>20</a:t>
+              </a:r>
+              <a:endParaRPr lang="en-US" sz="375" dirty="0">
+                <a:solidFill>
+                  <a:srgbClr val="FFFFFF"/>
+                </a:solidFill>
+                <a:latin typeface="Arial"/>
+              </a:endParaRPr>
+            </a:p>
+          </p:txBody>
+        </p:sp>
+        <p:sp>
+          <p:nvSpPr>
+            <p:cNvPr id="56" name="Rounded Rectangle 55">
+              <a:extLst>
+                <a:ext uri="{FF2B5EF4-FFF2-40B4-BE49-F238E27FC236}">
+                  <a16:creationId xmlns:a16="http://schemas.microsoft.com/office/drawing/2014/main" id="{1F77680F-CFB1-1641-83C6-4C66C97C9408}"/>
+                </a:ext>
+              </a:extLst>
+            </p:cNvPr>
+            <p:cNvSpPr/>
+            <p:nvPr/>
+          </p:nvSpPr>
+          <p:spPr bwMode="auto">
+            <a:xfrm>
+              <a:off x="1330805" y="1635094"/>
+              <a:ext cx="138128" cy="411476"/>
+            </a:xfrm>
+            <a:prstGeom prst="roundRect">
+              <a:avLst/>
+            </a:prstGeom>
+            <a:solidFill>
+              <a:schemeClr val="bg1">
+                <a:lumMod val="50000"/>
+              </a:schemeClr>
+            </a:solidFill>
+            <a:ln>
+              <a:solidFill>
+                <a:schemeClr val="bg1"/>
+              </a:solidFill>
+              <a:prstDash val="solid"/>
+              <a:headEnd type="none" w="med" len="med"/>
+              <a:tailEnd type="none" w="med" len="med"/>
+            </a:ln>
+            <a:effectLst/>
+          </p:spPr>
+          <p:style>
+            <a:lnRef idx="1">
+              <a:schemeClr val="accent5"/>
+            </a:lnRef>
+            <a:fillRef idx="3">
+              <a:schemeClr val="accent5"/>
+            </a:fillRef>
+            <a:effectRef idx="2">
+              <a:schemeClr val="accent5"/>
+            </a:effectRef>
+            <a:fontRef idx="minor">
+              <a:schemeClr val="lt1"/>
+            </a:fontRef>
+          </p:style>
+          <p:txBody>
+            <a:bodyPr vert="horz" wrap="square" lIns="0" tIns="0" rIns="0" bIns="0" numCol="1" rtlCol="0" anchor="ctr" anchorCtr="0" compatLnSpc="1">
+              <a:prstTxWarp prst="textNoShape">
+                <a:avLst/>
+              </a:prstTxWarp>
+              <a:noAutofit/>
+            </a:bodyPr>
+            <a:lstStyle/>
+            <a:p>
+              <a:pPr algn="ctr" defTabSz="685784" eaLnBrk="0" fontAlgn="base" hangingPunct="0">
+                <a:lnSpc>
+                  <a:spcPct val="90000"/>
+                </a:lnSpc>
+                <a:spcBef>
+                  <a:spcPct val="0"/>
+                </a:spcBef>
+                <a:spcAft>
+                  <a:spcPct val="0"/>
+                </a:spcAft>
+              </a:pPr>
+              <a:r>
+                <a:rPr lang="en-US" sz="675" dirty="0">
+                  <a:solidFill>
+                    <a:srgbClr val="FFFFFF"/>
+                  </a:solidFill>
+                  <a:latin typeface="Arial"/>
+                </a:rPr>
+                <a:t>21</a:t>
+              </a:r>
+              <a:endParaRPr lang="en-US" sz="375" dirty="0">
+                <a:solidFill>
+                  <a:srgbClr val="FFFFFF"/>
+                </a:solidFill>
+                <a:latin typeface="Arial"/>
+              </a:endParaRPr>
+            </a:p>
+          </p:txBody>
+        </p:sp>
+        <p:sp>
+          <p:nvSpPr>
+            <p:cNvPr id="59" name="Rounded Rectangle 58">
+              <a:extLst>
+                <a:ext uri="{FF2B5EF4-FFF2-40B4-BE49-F238E27FC236}">
+                  <a16:creationId xmlns:a16="http://schemas.microsoft.com/office/drawing/2014/main" id="{586F469D-3032-494C-BC0B-5E665D9A864F}"/>
+                </a:ext>
+              </a:extLst>
+            </p:cNvPr>
+            <p:cNvSpPr/>
+            <p:nvPr/>
+          </p:nvSpPr>
+          <p:spPr bwMode="auto">
+            <a:xfrm>
+              <a:off x="1468934" y="1635094"/>
+              <a:ext cx="138128" cy="411476"/>
+            </a:xfrm>
+            <a:prstGeom prst="roundRect">
+              <a:avLst/>
+            </a:prstGeom>
+            <a:solidFill>
+              <a:schemeClr val="bg1">
+                <a:lumMod val="50000"/>
+              </a:schemeClr>
+            </a:solidFill>
+            <a:ln>
+              <a:solidFill>
+                <a:schemeClr val="bg1"/>
+              </a:solidFill>
+              <a:prstDash val="solid"/>
+              <a:headEnd type="none" w="med" len="med"/>
+              <a:tailEnd type="none" w="med" len="med"/>
+            </a:ln>
+            <a:effectLst/>
+          </p:spPr>
+          <p:style>
+            <a:lnRef idx="1">
+              <a:schemeClr val="accent5"/>
+            </a:lnRef>
+            <a:fillRef idx="3">
+              <a:schemeClr val="accent5"/>
+            </a:fillRef>
+            <a:effectRef idx="2">
+              <a:schemeClr val="accent5"/>
+            </a:effectRef>
+            <a:fontRef idx="minor">
+              <a:schemeClr val="lt1"/>
+            </a:fontRef>
+          </p:style>
+          <p:txBody>
+            <a:bodyPr vert="horz" wrap="square" lIns="0" tIns="0" rIns="0" bIns="0" numCol="1" rtlCol="0" anchor="ctr" anchorCtr="0" compatLnSpc="1">
+              <a:prstTxWarp prst="textNoShape">
+                <a:avLst/>
+              </a:prstTxWarp>
+              <a:noAutofit/>
+            </a:bodyPr>
+            <a:lstStyle/>
+            <a:p>
+              <a:pPr algn="ctr" defTabSz="685784" eaLnBrk="0" fontAlgn="base" hangingPunct="0">
+                <a:lnSpc>
+                  <a:spcPct val="90000"/>
+                </a:lnSpc>
+                <a:spcBef>
+                  <a:spcPct val="0"/>
+                </a:spcBef>
+                <a:spcAft>
+                  <a:spcPct val="0"/>
+                </a:spcAft>
+              </a:pPr>
+              <a:r>
+                <a:rPr lang="en-US" sz="675" dirty="0">
+                  <a:solidFill>
+                    <a:srgbClr val="FFFFFF"/>
+                  </a:solidFill>
+                  <a:latin typeface="Arial"/>
+                </a:rPr>
+                <a:t>22</a:t>
+              </a:r>
+              <a:endParaRPr lang="en-US" sz="375" dirty="0">
+                <a:solidFill>
+                  <a:srgbClr val="FFFFFF"/>
+                </a:solidFill>
+                <a:latin typeface="Arial"/>
+              </a:endParaRPr>
+            </a:p>
+          </p:txBody>
+        </p:sp>
+        <p:sp>
+          <p:nvSpPr>
+            <p:cNvPr id="60" name="Rounded Rectangle 59">
+              <a:extLst>
+                <a:ext uri="{FF2B5EF4-FFF2-40B4-BE49-F238E27FC236}">
+                  <a16:creationId xmlns:a16="http://schemas.microsoft.com/office/drawing/2014/main" id="{4D4F7A75-1E72-394F-929E-587EC147EA1C}"/>
+                </a:ext>
+              </a:extLst>
+            </p:cNvPr>
+            <p:cNvSpPr/>
+            <p:nvPr/>
+          </p:nvSpPr>
+          <p:spPr bwMode="auto">
+            <a:xfrm>
+              <a:off x="1606093" y="1635094"/>
+              <a:ext cx="138128" cy="411476"/>
+            </a:xfrm>
+            <a:prstGeom prst="roundRect">
+              <a:avLst/>
+            </a:prstGeom>
+            <a:solidFill>
+              <a:schemeClr val="bg1">
+                <a:lumMod val="50000"/>
+              </a:schemeClr>
+            </a:solidFill>
+            <a:ln>
+              <a:solidFill>
+                <a:schemeClr val="bg1"/>
+              </a:solidFill>
+              <a:prstDash val="solid"/>
+              <a:headEnd type="none" w="med" len="med"/>
+              <a:tailEnd type="none" w="med" len="med"/>
+            </a:ln>
+            <a:effectLst/>
+          </p:spPr>
+          <p:style>
+            <a:lnRef idx="1">
+              <a:schemeClr val="accent5"/>
+            </a:lnRef>
+            <a:fillRef idx="3">
+              <a:schemeClr val="accent5"/>
+            </a:fillRef>
+            <a:effectRef idx="2">
+              <a:schemeClr val="accent5"/>
+            </a:effectRef>
+            <a:fontRef idx="minor">
+              <a:schemeClr val="lt1"/>
+            </a:fontRef>
+          </p:style>
+          <p:txBody>
+            <a:bodyPr vert="horz" wrap="square" lIns="0" tIns="0" rIns="0" bIns="0" numCol="1" rtlCol="0" anchor="ctr" anchorCtr="0" compatLnSpc="1">
+              <a:prstTxWarp prst="textNoShape">
+                <a:avLst/>
+              </a:prstTxWarp>
+              <a:noAutofit/>
+            </a:bodyPr>
+            <a:lstStyle/>
+            <a:p>
+              <a:pPr algn="ctr" defTabSz="685784" eaLnBrk="0" fontAlgn="base" hangingPunct="0">
+                <a:lnSpc>
+                  <a:spcPct val="90000"/>
+                </a:lnSpc>
+                <a:spcBef>
+                  <a:spcPct val="0"/>
+                </a:spcBef>
+                <a:spcAft>
+                  <a:spcPct val="0"/>
+                </a:spcAft>
+              </a:pPr>
+              <a:r>
+                <a:rPr lang="en-US" sz="675" dirty="0">
+                  <a:solidFill>
+                    <a:srgbClr val="FFFFFF"/>
+                  </a:solidFill>
+                  <a:latin typeface="Arial"/>
+                </a:rPr>
+                <a:t>23</a:t>
+              </a:r>
+              <a:endParaRPr lang="en-US" sz="375" dirty="0">
+                <a:solidFill>
+                  <a:srgbClr val="FFFFFF"/>
+                </a:solidFill>
+                <a:latin typeface="Arial"/>
+              </a:endParaRPr>
+            </a:p>
+          </p:txBody>
+        </p:sp>
+        <p:sp>
+          <p:nvSpPr>
+            <p:cNvPr id="61" name="Rounded Rectangle 60">
+              <a:extLst>
+                <a:ext uri="{FF2B5EF4-FFF2-40B4-BE49-F238E27FC236}">
+                  <a16:creationId xmlns:a16="http://schemas.microsoft.com/office/drawing/2014/main" id="{909A4205-FF05-AB4A-B921-31A039E34C25}"/>
+                </a:ext>
+              </a:extLst>
+            </p:cNvPr>
+            <p:cNvSpPr/>
+            <p:nvPr/>
+          </p:nvSpPr>
+          <p:spPr bwMode="auto">
+            <a:xfrm>
+              <a:off x="1744220" y="1635094"/>
+              <a:ext cx="138128" cy="411476"/>
+            </a:xfrm>
+            <a:prstGeom prst="roundRect">
+              <a:avLst/>
+            </a:prstGeom>
+            <a:solidFill>
+              <a:schemeClr val="bg1">
+                <a:lumMod val="50000"/>
+              </a:schemeClr>
+            </a:solidFill>
+            <a:ln>
+              <a:solidFill>
+                <a:schemeClr val="bg1"/>
+              </a:solidFill>
+              <a:prstDash val="solid"/>
+              <a:headEnd type="none" w="med" len="med"/>
+              <a:tailEnd type="none" w="med" len="med"/>
+            </a:ln>
+            <a:effectLst/>
+          </p:spPr>
+          <p:style>
+            <a:lnRef idx="1">
+              <a:schemeClr val="accent5"/>
+            </a:lnRef>
+            <a:fillRef idx="3">
+              <a:schemeClr val="accent5"/>
+            </a:fillRef>
+            <a:effectRef idx="2">
+              <a:schemeClr val="accent5"/>
+            </a:effectRef>
+            <a:fontRef idx="minor">
+              <a:schemeClr val="lt1"/>
+            </a:fontRef>
+          </p:style>
+          <p:txBody>
+            <a:bodyPr vert="horz" wrap="square" lIns="0" tIns="0" rIns="0" bIns="0" numCol="1" rtlCol="0" anchor="ctr" anchorCtr="0" compatLnSpc="1">
+              <a:prstTxWarp prst="textNoShape">
+                <a:avLst/>
+              </a:prstTxWarp>
+              <a:noAutofit/>
+            </a:bodyPr>
+            <a:lstStyle/>
+            <a:p>
+              <a:pPr algn="ctr" defTabSz="685784" eaLnBrk="0" fontAlgn="base" hangingPunct="0">
+                <a:lnSpc>
+                  <a:spcPct val="90000"/>
+                </a:lnSpc>
+                <a:spcBef>
+                  <a:spcPct val="0"/>
+                </a:spcBef>
+                <a:spcAft>
+                  <a:spcPct val="0"/>
+                </a:spcAft>
+              </a:pPr>
+              <a:r>
+                <a:rPr lang="en-US" sz="675" dirty="0">
+                  <a:solidFill>
+                    <a:srgbClr val="FFFFFF"/>
+                  </a:solidFill>
+                  <a:latin typeface="Arial"/>
+                </a:rPr>
+                <a:t>24</a:t>
+              </a:r>
+              <a:endParaRPr lang="en-US" sz="375" dirty="0">
+                <a:solidFill>
+                  <a:srgbClr val="FFFFFF"/>
+                </a:solidFill>
+                <a:latin typeface="Arial"/>
+              </a:endParaRPr>
+            </a:p>
+          </p:txBody>
+        </p:sp>
+        <p:sp>
+          <p:nvSpPr>
+            <p:cNvPr id="62" name="Rounded Rectangle 61">
+              <a:extLst>
+                <a:ext uri="{FF2B5EF4-FFF2-40B4-BE49-F238E27FC236}">
+                  <a16:creationId xmlns:a16="http://schemas.microsoft.com/office/drawing/2014/main" id="{F5F6B646-95E9-D74A-8375-E776CEBBA7ED}"/>
+                </a:ext>
+              </a:extLst>
+            </p:cNvPr>
+            <p:cNvSpPr/>
+            <p:nvPr/>
+          </p:nvSpPr>
+          <p:spPr bwMode="auto">
+            <a:xfrm>
+              <a:off x="1874043" y="1635094"/>
+              <a:ext cx="138128" cy="411476"/>
+            </a:xfrm>
+            <a:prstGeom prst="roundRect">
+              <a:avLst/>
+            </a:prstGeom>
+            <a:solidFill>
+              <a:schemeClr val="bg1">
+                <a:lumMod val="50000"/>
+              </a:schemeClr>
+            </a:solidFill>
+            <a:ln>
+              <a:solidFill>
+                <a:schemeClr val="bg1"/>
+              </a:solidFill>
+              <a:prstDash val="solid"/>
+              <a:headEnd type="none" w="med" len="med"/>
+              <a:tailEnd type="none" w="med" len="med"/>
+            </a:ln>
+            <a:effectLst/>
+          </p:spPr>
+          <p:style>
+            <a:lnRef idx="1">
+              <a:schemeClr val="accent5"/>
+            </a:lnRef>
+            <a:fillRef idx="3">
+              <a:schemeClr val="accent5"/>
+            </a:fillRef>
+            <a:effectRef idx="2">
+              <a:schemeClr val="accent5"/>
+            </a:effectRef>
+            <a:fontRef idx="minor">
+              <a:schemeClr val="lt1"/>
+            </a:fontRef>
+          </p:style>
+          <p:txBody>
+            <a:bodyPr vert="horz" wrap="square" lIns="0" tIns="0" rIns="0" bIns="0" numCol="1" rtlCol="0" anchor="ctr" anchorCtr="0" compatLnSpc="1">
+              <a:prstTxWarp prst="textNoShape">
+                <a:avLst/>
+              </a:prstTxWarp>
+              <a:noAutofit/>
+            </a:bodyPr>
+            <a:lstStyle/>
+            <a:p>
+              <a:pPr algn="ctr" defTabSz="685784" eaLnBrk="0" fontAlgn="base" hangingPunct="0">
+                <a:lnSpc>
+                  <a:spcPct val="90000"/>
+                </a:lnSpc>
+                <a:spcBef>
+                  <a:spcPct val="0"/>
+                </a:spcBef>
+                <a:spcAft>
+                  <a:spcPct val="0"/>
+                </a:spcAft>
+              </a:pPr>
+              <a:r>
+                <a:rPr lang="en-US" sz="675" dirty="0">
+                  <a:solidFill>
+                    <a:srgbClr val="FFFFFF"/>
+                  </a:solidFill>
+                  <a:latin typeface="Arial"/>
+                </a:rPr>
+                <a:t>25</a:t>
+              </a:r>
+              <a:endParaRPr lang="en-US" sz="375" dirty="0">
+                <a:solidFill>
+                  <a:srgbClr val="FFFFFF"/>
+                </a:solidFill>
+                <a:latin typeface="Arial"/>
+              </a:endParaRPr>
+            </a:p>
+          </p:txBody>
+        </p:sp>
+      </p:grpSp>
+      <p:sp>
+        <p:nvSpPr>
+          <p:cNvPr id="63" name="Rectangle 62">
+            <a:extLst>
+              <a:ext uri="{FF2B5EF4-FFF2-40B4-BE49-F238E27FC236}">
+                <a16:creationId xmlns:a16="http://schemas.microsoft.com/office/drawing/2014/main" id="{1607CC4D-472D-AD42-ADC4-B7E8664FD403}"/>
+              </a:ext>
+            </a:extLst>
+          </p:cNvPr>
+          <p:cNvSpPr/>
+          <p:nvPr/>
+        </p:nvSpPr>
+        <p:spPr>
+          <a:xfrm>
+            <a:off x="5162472" y="2700426"/>
+            <a:ext cx="1080745" cy="230832"/>
+          </a:xfrm>
+          <a:prstGeom prst="rect">
+            <a:avLst/>
+          </a:prstGeom>
+        </p:spPr>
+        <p:txBody>
+          <a:bodyPr wrap="none">
+            <a:spAutoFit/>
+          </a:bodyPr>
+          <a:lstStyle/>
+          <a:p>
+            <a:r>
+              <a:rPr lang="en-US" sz="900" dirty="0">
+                <a:latin typeface="Menlo" panose="020B0609030804020204" pitchFamily="49" charset="0"/>
+              </a:rPr>
+              <a:t>source.orders</a:t>
+            </a:r>
+            <a:endParaRPr lang="en-US" sz="900" dirty="0">
+              <a:effectLst/>
+              <a:latin typeface="Menlo" panose="020B0609030804020204" pitchFamily="49" charset="0"/>
+            </a:endParaRPr>
+          </a:p>
+        </p:txBody>
+      </p:sp>
+      <p:cxnSp>
+        <p:nvCxnSpPr>
+          <p:cNvPr id="64" name="Elbow Connector 63">
+            <a:extLst>
+              <a:ext uri="{FF2B5EF4-FFF2-40B4-BE49-F238E27FC236}">
+                <a16:creationId xmlns:a16="http://schemas.microsoft.com/office/drawing/2014/main" id="{0D11498A-A1A0-464E-A2AD-FF81F65FA92F}"/>
+              </a:ext>
+            </a:extLst>
+          </p:cNvPr>
+          <p:cNvCxnSpPr>
+            <a:cxnSpLocks/>
+            <a:stCxn id="45" idx="2"/>
+          </p:cNvCxnSpPr>
+          <p:nvPr/>
+        </p:nvCxnSpPr>
+        <p:spPr>
+          <a:xfrm rot="16200000" flipH="1">
+            <a:off x="1277148" y="1343038"/>
+            <a:ext cx="252254" cy="885041"/>
+          </a:xfrm>
+          <a:prstGeom prst="bentConnector2">
+            <a:avLst/>
+          </a:prstGeom>
+          <a:ln w="12700">
+            <a:solidFill>
+              <a:schemeClr val="accent6"/>
+            </a:solidFill>
+            <a:tailEnd type="triangle"/>
+          </a:ln>
+          <a:effectLst/>
+        </p:spPr>
+        <p:style>
+          <a:lnRef idx="2">
+            <a:schemeClr val="accent1"/>
+          </a:lnRef>
+          <a:fillRef idx="0">
+            <a:schemeClr val="accent1"/>
+          </a:fillRef>
+          <a:effectRef idx="1">
+            <a:schemeClr val="accent1"/>
+          </a:effectRef>
+          <a:fontRef idx="minor">
+            <a:schemeClr val="tx1"/>
+          </a:fontRef>
+        </p:style>
+      </p:cxnSp>
+      <p:cxnSp>
+        <p:nvCxnSpPr>
+          <p:cNvPr id="66" name="Straight Connector 65">
+            <a:extLst>
+              <a:ext uri="{FF2B5EF4-FFF2-40B4-BE49-F238E27FC236}">
+                <a16:creationId xmlns:a16="http://schemas.microsoft.com/office/drawing/2014/main" id="{E579B518-0C74-EB4B-914D-926DCEA62A71}"/>
+              </a:ext>
+            </a:extLst>
+          </p:cNvPr>
+          <p:cNvCxnSpPr/>
+          <p:nvPr/>
+        </p:nvCxnSpPr>
+        <p:spPr>
+          <a:xfrm flipH="1">
+            <a:off x="3245103" y="1149136"/>
+            <a:ext cx="15768" cy="2796341"/>
+          </a:xfrm>
+          <a:prstGeom prst="line">
+            <a:avLst/>
+          </a:prstGeom>
+          <a:ln>
+            <a:solidFill>
+              <a:srgbClr val="C00000"/>
+            </a:solidFill>
+          </a:ln>
+          <a:effectLst/>
+        </p:spPr>
+        <p:style>
+          <a:lnRef idx="2">
+            <a:schemeClr val="accent1"/>
+          </a:lnRef>
+          <a:fillRef idx="0">
+            <a:schemeClr val="accent1"/>
+          </a:fillRef>
+          <a:effectRef idx="1">
+            <a:schemeClr val="accent1"/>
+          </a:effectRef>
+          <a:fontRef idx="minor">
+            <a:schemeClr val="tx1"/>
+          </a:fontRef>
+        </p:style>
+      </p:cxnSp>
+      <p:cxnSp>
+        <p:nvCxnSpPr>
+          <p:cNvPr id="67" name="Straight Connector 66">
+            <a:extLst>
+              <a:ext uri="{FF2B5EF4-FFF2-40B4-BE49-F238E27FC236}">
+                <a16:creationId xmlns:a16="http://schemas.microsoft.com/office/drawing/2014/main" id="{CCCD17CF-1F1B-1E42-8D70-8DC415243C94}"/>
+              </a:ext>
+            </a:extLst>
+          </p:cNvPr>
+          <p:cNvCxnSpPr>
+            <a:cxnSpLocks/>
+          </p:cNvCxnSpPr>
+          <p:nvPr/>
+        </p:nvCxnSpPr>
+        <p:spPr>
+          <a:xfrm>
+            <a:off x="3245103" y="1878856"/>
+            <a:ext cx="0" cy="1496340"/>
+          </a:xfrm>
+          <a:prstGeom prst="line">
+            <a:avLst/>
+          </a:prstGeom>
+          <a:ln w="57150">
+            <a:solidFill>
+              <a:srgbClr val="C00000"/>
+            </a:solidFill>
+          </a:ln>
+          <a:effectLst/>
+        </p:spPr>
+        <p:style>
+          <a:lnRef idx="2">
+            <a:schemeClr val="accent1"/>
+          </a:lnRef>
+          <a:fillRef idx="0">
+            <a:schemeClr val="accent1"/>
+          </a:fillRef>
+          <a:effectRef idx="1">
+            <a:schemeClr val="accent1"/>
+          </a:effectRef>
+          <a:fontRef idx="minor">
+            <a:schemeClr val="tx1"/>
+          </a:fontRef>
+        </p:style>
+      </p:cxnSp>
+      <p:cxnSp>
+        <p:nvCxnSpPr>
+          <p:cNvPr id="69" name="Elbow Connector 68">
+            <a:extLst>
+              <a:ext uri="{FF2B5EF4-FFF2-40B4-BE49-F238E27FC236}">
+                <a16:creationId xmlns:a16="http://schemas.microsoft.com/office/drawing/2014/main" id="{ED4BE080-310A-614E-A111-817ADA548323}"/>
+              </a:ext>
+            </a:extLst>
+          </p:cNvPr>
+          <p:cNvCxnSpPr>
+            <a:cxnSpLocks/>
+          </p:cNvCxnSpPr>
+          <p:nvPr/>
+        </p:nvCxnSpPr>
+        <p:spPr>
+          <a:xfrm>
+            <a:off x="1861562" y="2052125"/>
+            <a:ext cx="1367776" cy="12700"/>
+          </a:xfrm>
+          <a:prstGeom prst="bentConnector3">
+            <a:avLst>
+              <a:gd name="adj1" fmla="val 50000"/>
+            </a:avLst>
+          </a:prstGeom>
+          <a:ln w="12700">
+            <a:solidFill>
+              <a:schemeClr val="accent6"/>
+            </a:solidFill>
+            <a:tailEnd type="triangle"/>
+          </a:ln>
+          <a:effectLst/>
+        </p:spPr>
+        <p:style>
+          <a:lnRef idx="2">
+            <a:schemeClr val="accent1"/>
+          </a:lnRef>
+          <a:fillRef idx="0">
+            <a:schemeClr val="accent1"/>
+          </a:fillRef>
+          <a:effectRef idx="1">
+            <a:schemeClr val="accent1"/>
+          </a:effectRef>
+          <a:fontRef idx="minor">
+            <a:schemeClr val="tx1"/>
+          </a:fontRef>
+        </p:style>
+      </p:cxnSp>
+      <p:cxnSp>
+        <p:nvCxnSpPr>
+          <p:cNvPr id="72" name="Elbow Connector 71">
+            <a:extLst>
+              <a:ext uri="{FF2B5EF4-FFF2-40B4-BE49-F238E27FC236}">
+                <a16:creationId xmlns:a16="http://schemas.microsoft.com/office/drawing/2014/main" id="{89D49C31-6FA7-164E-ADE8-6D644D8087BD}"/>
+              </a:ext>
+            </a:extLst>
+          </p:cNvPr>
+          <p:cNvCxnSpPr>
+            <a:cxnSpLocks/>
+            <a:endCxn id="131" idx="0"/>
+          </p:cNvCxnSpPr>
+          <p:nvPr/>
+        </p:nvCxnSpPr>
+        <p:spPr>
+          <a:xfrm>
+            <a:off x="3272220" y="4180738"/>
+            <a:ext cx="2656987" cy="164702"/>
+          </a:xfrm>
+          <a:prstGeom prst="bentConnector2">
+            <a:avLst/>
+          </a:prstGeom>
+          <a:ln w="12700">
+            <a:solidFill>
+              <a:schemeClr val="accent6"/>
+            </a:solidFill>
+            <a:tailEnd type="triangle"/>
+          </a:ln>
+          <a:effectLst/>
+        </p:spPr>
+        <p:style>
+          <a:lnRef idx="2">
+            <a:schemeClr val="accent1"/>
+          </a:lnRef>
+          <a:fillRef idx="0">
+            <a:schemeClr val="accent1"/>
+          </a:fillRef>
+          <a:effectRef idx="1">
+            <a:schemeClr val="accent1"/>
+          </a:effectRef>
+          <a:fontRef idx="minor">
+            <a:schemeClr val="tx1"/>
+          </a:fontRef>
+        </p:style>
+      </p:cxnSp>
+      <p:sp>
+        <p:nvSpPr>
+          <p:cNvPr id="74" name="Rectangle 73">
+            <a:extLst>
+              <a:ext uri="{FF2B5EF4-FFF2-40B4-BE49-F238E27FC236}">
+                <a16:creationId xmlns:a16="http://schemas.microsoft.com/office/drawing/2014/main" id="{2C3B799D-C076-A448-AF33-A7E06AE8CA0D}"/>
+              </a:ext>
+            </a:extLst>
+          </p:cNvPr>
+          <p:cNvSpPr/>
+          <p:nvPr/>
+        </p:nvSpPr>
+        <p:spPr>
+          <a:xfrm>
+            <a:off x="5162472" y="3259780"/>
+            <a:ext cx="2045753" cy="230832"/>
+          </a:xfrm>
+          <a:prstGeom prst="rect">
+            <a:avLst/>
+          </a:prstGeom>
+        </p:spPr>
+        <p:txBody>
+          <a:bodyPr wrap="none">
+            <a:spAutoFit/>
+          </a:bodyPr>
+          <a:lstStyle/>
+          <a:p>
+            <a:r>
+              <a:rPr lang="en-US" sz="900" dirty="0">
+                <a:solidFill>
+                  <a:srgbClr val="000000"/>
+                </a:solidFill>
+                <a:latin typeface="Menlo" panose="020B0609030804020204" pitchFamily="49" charset="0"/>
+              </a:rPr>
+              <a:t>mm2.offsets.source.internal</a:t>
+            </a:r>
+          </a:p>
+        </p:txBody>
+      </p:sp>
+      <p:sp>
+        <p:nvSpPr>
+          <p:cNvPr id="71" name="Rectangle 70">
+            <a:extLst>
+              <a:ext uri="{FF2B5EF4-FFF2-40B4-BE49-F238E27FC236}">
+                <a16:creationId xmlns:a16="http://schemas.microsoft.com/office/drawing/2014/main" id="{7612486E-883A-2A4C-8D2C-F01CD5056E4A}"/>
+              </a:ext>
+            </a:extLst>
+          </p:cNvPr>
+          <p:cNvSpPr/>
+          <p:nvPr/>
+        </p:nvSpPr>
+        <p:spPr>
+          <a:xfrm>
+            <a:off x="5162472" y="3875759"/>
+            <a:ext cx="1872629" cy="215444"/>
+          </a:xfrm>
+          <a:prstGeom prst="rect">
+            <a:avLst/>
+          </a:prstGeom>
+        </p:spPr>
+        <p:txBody>
+          <a:bodyPr wrap="none">
+            <a:spAutoFit/>
+          </a:bodyPr>
+          <a:lstStyle/>
+          <a:p>
+            <a:r>
+              <a:rPr lang="en-US" sz="800" dirty="0">
+                <a:solidFill>
+                  <a:srgbClr val="000000"/>
+                </a:solidFill>
+                <a:latin typeface="Menlo" panose="020B0609030804020204" pitchFamily="49" charset="0"/>
+              </a:rPr>
+              <a:t>source.checkpoints.internal</a:t>
+            </a:r>
+          </a:p>
+        </p:txBody>
+      </p:sp>
+      <p:grpSp>
+        <p:nvGrpSpPr>
+          <p:cNvPr id="73" name="Group 72">
+            <a:extLst>
+              <a:ext uri="{FF2B5EF4-FFF2-40B4-BE49-F238E27FC236}">
+                <a16:creationId xmlns:a16="http://schemas.microsoft.com/office/drawing/2014/main" id="{80B4FB03-D5AF-6E42-91F2-266AD5B1DF9F}"/>
+              </a:ext>
+            </a:extLst>
+          </p:cNvPr>
+          <p:cNvGrpSpPr/>
+          <p:nvPr/>
+        </p:nvGrpSpPr>
+        <p:grpSpPr>
+          <a:xfrm>
+            <a:off x="5258656" y="2931258"/>
+            <a:ext cx="609382" cy="342653"/>
+            <a:chOff x="5173010" y="3893080"/>
+            <a:chExt cx="918268" cy="548634"/>
+          </a:xfrm>
+        </p:grpSpPr>
+        <p:sp>
+          <p:nvSpPr>
+            <p:cNvPr id="78" name="Rounded Rectangle 77">
+              <a:extLst>
+                <a:ext uri="{FF2B5EF4-FFF2-40B4-BE49-F238E27FC236}">
+                  <a16:creationId xmlns:a16="http://schemas.microsoft.com/office/drawing/2014/main" id="{7DF77BA4-7607-3B44-BBD6-A1D1651EB53C}"/>
+                </a:ext>
+              </a:extLst>
+            </p:cNvPr>
+            <p:cNvSpPr/>
+            <p:nvPr/>
+          </p:nvSpPr>
+          <p:spPr bwMode="auto">
+            <a:xfrm>
+              <a:off x="5173010" y="3893080"/>
+              <a:ext cx="184171" cy="548634"/>
+            </a:xfrm>
+            <a:prstGeom prst="roundRect">
+              <a:avLst/>
+            </a:prstGeom>
+            <a:solidFill>
+              <a:schemeClr val="accent1">
+                <a:lumMod val="60000"/>
+                <a:lumOff val="40000"/>
+              </a:schemeClr>
+            </a:solidFill>
+            <a:ln>
+              <a:solidFill>
+                <a:schemeClr val="bg1"/>
+              </a:solidFill>
+              <a:prstDash val="solid"/>
+              <a:headEnd type="none" w="med" len="med"/>
+              <a:tailEnd type="none" w="med" len="med"/>
+            </a:ln>
+            <a:effectLst/>
+          </p:spPr>
+          <p:style>
+            <a:lnRef idx="1">
+              <a:schemeClr val="accent5"/>
+            </a:lnRef>
+            <a:fillRef idx="3">
+              <a:schemeClr val="accent5"/>
+            </a:fillRef>
+            <a:effectRef idx="2">
+              <a:schemeClr val="accent5"/>
+            </a:effectRef>
+            <a:fontRef idx="minor">
+              <a:schemeClr val="lt1"/>
+            </a:fontRef>
+          </p:style>
+          <p:txBody>
+            <a:bodyPr vert="horz" wrap="square" lIns="0" tIns="0" rIns="0" bIns="0" numCol="1" rtlCol="0" anchor="ctr" anchorCtr="0" compatLnSpc="1">
+              <a:prstTxWarp prst="textNoShape">
+                <a:avLst/>
+              </a:prstTxWarp>
+              <a:noAutofit/>
+            </a:bodyPr>
+            <a:lstStyle/>
+            <a:p>
+              <a:pPr algn="ctr" defTabSz="914355">
+                <a:lnSpc>
+                  <a:spcPct val="90000"/>
+                </a:lnSpc>
+              </a:pPr>
+              <a:r>
+                <a:rPr lang="en-US" sz="900">
+                  <a:solidFill>
+                    <a:schemeClr val="bg1"/>
+                  </a:solidFill>
+                </a:rPr>
+                <a:t>0</a:t>
+              </a:r>
+              <a:endParaRPr lang="en-US" sz="500">
+                <a:solidFill>
+                  <a:schemeClr val="bg1"/>
+                </a:solidFill>
+              </a:endParaRPr>
+            </a:p>
+          </p:txBody>
+        </p:sp>
+        <p:sp>
+          <p:nvSpPr>
+            <p:cNvPr id="79" name="Rounded Rectangle 78">
+              <a:extLst>
+                <a:ext uri="{FF2B5EF4-FFF2-40B4-BE49-F238E27FC236}">
+                  <a16:creationId xmlns:a16="http://schemas.microsoft.com/office/drawing/2014/main" id="{7326C142-4673-744C-91DA-F944AFEBD71C}"/>
+                </a:ext>
+              </a:extLst>
+            </p:cNvPr>
+            <p:cNvSpPr/>
+            <p:nvPr/>
+          </p:nvSpPr>
+          <p:spPr bwMode="auto">
+            <a:xfrm>
+              <a:off x="5355887" y="3893080"/>
+              <a:ext cx="184171" cy="548634"/>
+            </a:xfrm>
+            <a:prstGeom prst="roundRect">
+              <a:avLst/>
+            </a:prstGeom>
+            <a:solidFill>
+              <a:schemeClr val="accent1">
+                <a:lumMod val="60000"/>
+                <a:lumOff val="40000"/>
+              </a:schemeClr>
+            </a:solidFill>
+            <a:ln>
+              <a:solidFill>
+                <a:schemeClr val="bg1"/>
+              </a:solidFill>
+              <a:prstDash val="solid"/>
+              <a:headEnd type="none" w="med" len="med"/>
+              <a:tailEnd type="none" w="med" len="med"/>
+            </a:ln>
+            <a:effectLst/>
+          </p:spPr>
+          <p:style>
+            <a:lnRef idx="1">
+              <a:schemeClr val="accent5"/>
+            </a:lnRef>
+            <a:fillRef idx="3">
+              <a:schemeClr val="accent5"/>
+            </a:fillRef>
+            <a:effectRef idx="2">
+              <a:schemeClr val="accent5"/>
+            </a:effectRef>
+            <a:fontRef idx="minor">
+              <a:schemeClr val="lt1"/>
+            </a:fontRef>
+          </p:style>
+          <p:txBody>
+            <a:bodyPr vert="horz" wrap="square" lIns="0" tIns="0" rIns="0" bIns="0" numCol="1" rtlCol="0" anchor="ctr" anchorCtr="0" compatLnSpc="1">
+              <a:prstTxWarp prst="textNoShape">
+                <a:avLst/>
+              </a:prstTxWarp>
+              <a:noAutofit/>
+            </a:bodyPr>
+            <a:lstStyle/>
+            <a:p>
+              <a:pPr algn="ctr" defTabSz="914355">
+                <a:lnSpc>
+                  <a:spcPct val="90000"/>
+                </a:lnSpc>
+              </a:pPr>
+              <a:r>
+                <a:rPr lang="en-US" sz="900">
+                  <a:solidFill>
+                    <a:schemeClr val="bg1"/>
+                  </a:solidFill>
+                </a:rPr>
+                <a:t>1</a:t>
+              </a:r>
+              <a:endParaRPr lang="en-US" sz="500">
+                <a:solidFill>
+                  <a:schemeClr val="bg1"/>
+                </a:solidFill>
+              </a:endParaRPr>
+            </a:p>
+          </p:txBody>
+        </p:sp>
+        <p:sp>
+          <p:nvSpPr>
+            <p:cNvPr id="80" name="Rounded Rectangle 79">
+              <a:extLst>
+                <a:ext uri="{FF2B5EF4-FFF2-40B4-BE49-F238E27FC236}">
+                  <a16:creationId xmlns:a16="http://schemas.microsoft.com/office/drawing/2014/main" id="{EE785F0E-B07E-A74C-8EB1-9FFB25FAF8EF}"/>
+                </a:ext>
+              </a:extLst>
+            </p:cNvPr>
+            <p:cNvSpPr/>
+            <p:nvPr/>
+          </p:nvSpPr>
+          <p:spPr bwMode="auto">
+            <a:xfrm>
+              <a:off x="5540059" y="3893080"/>
+              <a:ext cx="184171" cy="548634"/>
+            </a:xfrm>
+            <a:prstGeom prst="roundRect">
+              <a:avLst/>
+            </a:prstGeom>
+            <a:solidFill>
+              <a:schemeClr val="accent1">
+                <a:lumMod val="60000"/>
+                <a:lumOff val="40000"/>
+              </a:schemeClr>
+            </a:solidFill>
+            <a:ln>
+              <a:solidFill>
+                <a:schemeClr val="bg1"/>
+              </a:solidFill>
+              <a:prstDash val="solid"/>
+              <a:headEnd type="none" w="med" len="med"/>
+              <a:tailEnd type="none" w="med" len="med"/>
+            </a:ln>
+            <a:effectLst/>
+          </p:spPr>
+          <p:style>
+            <a:lnRef idx="1">
+              <a:schemeClr val="accent5"/>
+            </a:lnRef>
+            <a:fillRef idx="3">
+              <a:schemeClr val="accent5"/>
+            </a:fillRef>
+            <a:effectRef idx="2">
+              <a:schemeClr val="accent5"/>
+            </a:effectRef>
+            <a:fontRef idx="minor">
+              <a:schemeClr val="lt1"/>
+            </a:fontRef>
+          </p:style>
+          <p:txBody>
+            <a:bodyPr vert="horz" wrap="square" lIns="0" tIns="0" rIns="0" bIns="0" numCol="1" rtlCol="0" anchor="ctr" anchorCtr="0" compatLnSpc="1">
+              <a:prstTxWarp prst="textNoShape">
+                <a:avLst/>
+              </a:prstTxWarp>
+              <a:noAutofit/>
+            </a:bodyPr>
+            <a:lstStyle/>
+            <a:p>
+              <a:pPr algn="ctr" defTabSz="914355">
+                <a:lnSpc>
+                  <a:spcPct val="90000"/>
+                </a:lnSpc>
+              </a:pPr>
+              <a:r>
+                <a:rPr lang="en-US" sz="900">
+                  <a:solidFill>
+                    <a:schemeClr val="bg1"/>
+                  </a:solidFill>
+                </a:rPr>
+                <a:t>2</a:t>
+              </a:r>
+              <a:endParaRPr lang="en-US" sz="500">
+                <a:solidFill>
+                  <a:schemeClr val="bg1"/>
+                </a:solidFill>
+              </a:endParaRPr>
+            </a:p>
+          </p:txBody>
+        </p:sp>
+        <p:sp>
+          <p:nvSpPr>
+            <p:cNvPr id="81" name="Rounded Rectangle 80">
+              <a:extLst>
+                <a:ext uri="{FF2B5EF4-FFF2-40B4-BE49-F238E27FC236}">
+                  <a16:creationId xmlns:a16="http://schemas.microsoft.com/office/drawing/2014/main" id="{710FDECE-9921-9F4B-8103-025AB3A74657}"/>
+                </a:ext>
+              </a:extLst>
+            </p:cNvPr>
+            <p:cNvSpPr/>
+            <p:nvPr/>
+          </p:nvSpPr>
+          <p:spPr bwMode="auto">
+            <a:xfrm>
+              <a:off x="5722937" y="3893080"/>
+              <a:ext cx="184171" cy="548634"/>
+            </a:xfrm>
+            <a:prstGeom prst="roundRect">
+              <a:avLst/>
+            </a:prstGeom>
+            <a:solidFill>
+              <a:schemeClr val="accent1">
+                <a:lumMod val="60000"/>
+                <a:lumOff val="40000"/>
+              </a:schemeClr>
+            </a:solidFill>
+            <a:ln>
+              <a:solidFill>
+                <a:schemeClr val="bg1"/>
+              </a:solidFill>
+              <a:prstDash val="solid"/>
+              <a:headEnd type="none" w="med" len="med"/>
+              <a:tailEnd type="none" w="med" len="med"/>
+            </a:ln>
+            <a:effectLst/>
+          </p:spPr>
+          <p:style>
+            <a:lnRef idx="1">
+              <a:schemeClr val="accent5"/>
+            </a:lnRef>
+            <a:fillRef idx="3">
+              <a:schemeClr val="accent5"/>
+            </a:fillRef>
+            <a:effectRef idx="2">
+              <a:schemeClr val="accent5"/>
+            </a:effectRef>
+            <a:fontRef idx="minor">
+              <a:schemeClr val="lt1"/>
+            </a:fontRef>
+          </p:style>
+          <p:txBody>
+            <a:bodyPr vert="horz" wrap="square" lIns="0" tIns="0" rIns="0" bIns="0" numCol="1" rtlCol="0" anchor="ctr" anchorCtr="0" compatLnSpc="1">
+              <a:prstTxWarp prst="textNoShape">
+                <a:avLst/>
+              </a:prstTxWarp>
+              <a:noAutofit/>
+            </a:bodyPr>
+            <a:lstStyle/>
+            <a:p>
+              <a:pPr algn="ctr" defTabSz="914355">
+                <a:lnSpc>
+                  <a:spcPct val="90000"/>
+                </a:lnSpc>
+              </a:pPr>
+              <a:r>
+                <a:rPr lang="en-US" sz="900">
+                  <a:solidFill>
+                    <a:schemeClr val="bg1"/>
+                  </a:solidFill>
+                </a:rPr>
+                <a:t>3</a:t>
+              </a:r>
+              <a:endParaRPr lang="en-US" sz="500">
+                <a:solidFill>
+                  <a:schemeClr val="bg1"/>
+                </a:solidFill>
+              </a:endParaRPr>
+            </a:p>
+          </p:txBody>
+        </p:sp>
+        <p:sp>
+          <p:nvSpPr>
+            <p:cNvPr id="82" name="Rounded Rectangle 81">
+              <a:extLst>
+                <a:ext uri="{FF2B5EF4-FFF2-40B4-BE49-F238E27FC236}">
+                  <a16:creationId xmlns:a16="http://schemas.microsoft.com/office/drawing/2014/main" id="{0E34A774-2637-8E4D-8E4C-F7513411DAF8}"/>
+                </a:ext>
+              </a:extLst>
+            </p:cNvPr>
+            <p:cNvSpPr/>
+            <p:nvPr/>
+          </p:nvSpPr>
+          <p:spPr bwMode="auto">
+            <a:xfrm>
+              <a:off x="5907107" y="3893080"/>
+              <a:ext cx="184171" cy="548634"/>
+            </a:xfrm>
+            <a:prstGeom prst="roundRect">
+              <a:avLst/>
+            </a:prstGeom>
+            <a:solidFill>
+              <a:schemeClr val="accent1">
+                <a:lumMod val="60000"/>
+                <a:lumOff val="40000"/>
+              </a:schemeClr>
+            </a:solidFill>
+            <a:ln>
+              <a:solidFill>
+                <a:schemeClr val="bg1"/>
+              </a:solidFill>
+              <a:prstDash val="solid"/>
+              <a:headEnd type="none" w="med" len="med"/>
+              <a:tailEnd type="none" w="med" len="med"/>
+            </a:ln>
+            <a:effectLst/>
+          </p:spPr>
+          <p:style>
+            <a:lnRef idx="1">
+              <a:schemeClr val="accent5"/>
+            </a:lnRef>
+            <a:fillRef idx="3">
+              <a:schemeClr val="accent5"/>
+            </a:fillRef>
+            <a:effectRef idx="2">
+              <a:schemeClr val="accent5"/>
+            </a:effectRef>
+            <a:fontRef idx="minor">
+              <a:schemeClr val="lt1"/>
+            </a:fontRef>
+          </p:style>
+          <p:txBody>
+            <a:bodyPr vert="horz" wrap="square" lIns="0" tIns="0" rIns="0" bIns="0" numCol="1" rtlCol="0" anchor="ctr" anchorCtr="0" compatLnSpc="1">
+              <a:prstTxWarp prst="textNoShape">
+                <a:avLst/>
+              </a:prstTxWarp>
+              <a:noAutofit/>
+            </a:bodyPr>
+            <a:lstStyle/>
+            <a:p>
+              <a:pPr algn="ctr" defTabSz="914355">
+                <a:lnSpc>
+                  <a:spcPct val="90000"/>
+                </a:lnSpc>
+              </a:pPr>
+              <a:r>
+                <a:rPr lang="en-US" sz="900" dirty="0">
+                  <a:solidFill>
+                    <a:schemeClr val="bg1"/>
+                  </a:solidFill>
+                </a:rPr>
+                <a:t>4</a:t>
+              </a:r>
+              <a:endParaRPr lang="en-US" sz="500" dirty="0">
+                <a:solidFill>
+                  <a:schemeClr val="bg1"/>
+                </a:solidFill>
+              </a:endParaRPr>
+            </a:p>
+          </p:txBody>
+        </p:sp>
+      </p:grpSp>
+      <p:grpSp>
+        <p:nvGrpSpPr>
+          <p:cNvPr id="83" name="Group 82">
+            <a:extLst>
+              <a:ext uri="{FF2B5EF4-FFF2-40B4-BE49-F238E27FC236}">
+                <a16:creationId xmlns:a16="http://schemas.microsoft.com/office/drawing/2014/main" id="{17EC44B3-E6D2-BC4C-8C74-3A3A23E3EAFA}"/>
+              </a:ext>
+            </a:extLst>
+          </p:cNvPr>
+          <p:cNvGrpSpPr/>
+          <p:nvPr/>
+        </p:nvGrpSpPr>
+        <p:grpSpPr>
+          <a:xfrm>
+            <a:off x="5258656" y="3443571"/>
+            <a:ext cx="609382" cy="342653"/>
+            <a:chOff x="5173010" y="3893080"/>
+            <a:chExt cx="918268" cy="548634"/>
+          </a:xfrm>
+        </p:grpSpPr>
+        <p:sp>
+          <p:nvSpPr>
+            <p:cNvPr id="84" name="Rounded Rectangle 83">
+              <a:extLst>
+                <a:ext uri="{FF2B5EF4-FFF2-40B4-BE49-F238E27FC236}">
+                  <a16:creationId xmlns:a16="http://schemas.microsoft.com/office/drawing/2014/main" id="{5AED603E-88F8-A048-8D05-01825494EE37}"/>
+                </a:ext>
+              </a:extLst>
+            </p:cNvPr>
+            <p:cNvSpPr/>
+            <p:nvPr/>
+          </p:nvSpPr>
+          <p:spPr bwMode="auto">
+            <a:xfrm>
+              <a:off x="5173010" y="3893080"/>
+              <a:ext cx="184171" cy="548634"/>
+            </a:xfrm>
+            <a:prstGeom prst="roundRect">
+              <a:avLst/>
+            </a:prstGeom>
+            <a:solidFill>
+              <a:schemeClr val="accent1">
+                <a:lumMod val="60000"/>
+                <a:lumOff val="40000"/>
+              </a:schemeClr>
+            </a:solidFill>
+            <a:ln>
+              <a:solidFill>
+                <a:schemeClr val="bg1"/>
+              </a:solidFill>
+              <a:prstDash val="solid"/>
+              <a:headEnd type="none" w="med" len="med"/>
+              <a:tailEnd type="none" w="med" len="med"/>
+            </a:ln>
+            <a:effectLst/>
+          </p:spPr>
+          <p:style>
+            <a:lnRef idx="1">
+              <a:schemeClr val="accent5"/>
+            </a:lnRef>
+            <a:fillRef idx="3">
+              <a:schemeClr val="accent5"/>
+            </a:fillRef>
+            <a:effectRef idx="2">
+              <a:schemeClr val="accent5"/>
+            </a:effectRef>
+            <a:fontRef idx="minor">
+              <a:schemeClr val="lt1"/>
+            </a:fontRef>
+          </p:style>
+          <p:txBody>
+            <a:bodyPr vert="horz" wrap="square" lIns="0" tIns="0" rIns="0" bIns="0" numCol="1" rtlCol="0" anchor="ctr" anchorCtr="0" compatLnSpc="1">
+              <a:prstTxWarp prst="textNoShape">
+                <a:avLst/>
+              </a:prstTxWarp>
+              <a:noAutofit/>
+            </a:bodyPr>
+            <a:lstStyle/>
+            <a:p>
+              <a:pPr algn="ctr" defTabSz="914355">
+                <a:lnSpc>
+                  <a:spcPct val="90000"/>
+                </a:lnSpc>
+              </a:pPr>
+              <a:r>
+                <a:rPr lang="en-US" sz="900">
+                  <a:solidFill>
+                    <a:schemeClr val="bg1"/>
+                  </a:solidFill>
+                </a:rPr>
+                <a:t>0</a:t>
+              </a:r>
+              <a:endParaRPr lang="en-US" sz="500">
+                <a:solidFill>
+                  <a:schemeClr val="bg1"/>
+                </a:solidFill>
+              </a:endParaRPr>
+            </a:p>
+          </p:txBody>
+        </p:sp>
+        <p:sp>
+          <p:nvSpPr>
+            <p:cNvPr id="85" name="Rounded Rectangle 84">
+              <a:extLst>
+                <a:ext uri="{FF2B5EF4-FFF2-40B4-BE49-F238E27FC236}">
+                  <a16:creationId xmlns:a16="http://schemas.microsoft.com/office/drawing/2014/main" id="{B0EEFFE6-68D9-8E46-9E98-1E2C6672189C}"/>
+                </a:ext>
+              </a:extLst>
+            </p:cNvPr>
+            <p:cNvSpPr/>
+            <p:nvPr/>
+          </p:nvSpPr>
+          <p:spPr bwMode="auto">
+            <a:xfrm>
+              <a:off x="5355887" y="3893080"/>
+              <a:ext cx="184171" cy="548634"/>
+            </a:xfrm>
+            <a:prstGeom prst="roundRect">
+              <a:avLst/>
+            </a:prstGeom>
+            <a:solidFill>
+              <a:schemeClr val="accent1">
+                <a:lumMod val="60000"/>
+                <a:lumOff val="40000"/>
+              </a:schemeClr>
+            </a:solidFill>
+            <a:ln>
+              <a:solidFill>
+                <a:schemeClr val="bg1"/>
+              </a:solidFill>
+              <a:prstDash val="solid"/>
+              <a:headEnd type="none" w="med" len="med"/>
+              <a:tailEnd type="none" w="med" len="med"/>
+            </a:ln>
+            <a:effectLst/>
+          </p:spPr>
+          <p:style>
+            <a:lnRef idx="1">
+              <a:schemeClr val="accent5"/>
+            </a:lnRef>
+            <a:fillRef idx="3">
+              <a:schemeClr val="accent5"/>
+            </a:fillRef>
+            <a:effectRef idx="2">
+              <a:schemeClr val="accent5"/>
+            </a:effectRef>
+            <a:fontRef idx="minor">
+              <a:schemeClr val="lt1"/>
+            </a:fontRef>
+          </p:style>
+          <p:txBody>
+            <a:bodyPr vert="horz" wrap="square" lIns="0" tIns="0" rIns="0" bIns="0" numCol="1" rtlCol="0" anchor="ctr" anchorCtr="0" compatLnSpc="1">
+              <a:prstTxWarp prst="textNoShape">
+                <a:avLst/>
+              </a:prstTxWarp>
+              <a:noAutofit/>
+            </a:bodyPr>
+            <a:lstStyle/>
+            <a:p>
+              <a:pPr algn="ctr" defTabSz="914355">
+                <a:lnSpc>
+                  <a:spcPct val="90000"/>
+                </a:lnSpc>
+              </a:pPr>
+              <a:r>
+                <a:rPr lang="en-US" sz="900">
+                  <a:solidFill>
+                    <a:schemeClr val="bg1"/>
+                  </a:solidFill>
+                </a:rPr>
+                <a:t>1</a:t>
+              </a:r>
+              <a:endParaRPr lang="en-US" sz="500">
+                <a:solidFill>
+                  <a:schemeClr val="bg1"/>
+                </a:solidFill>
+              </a:endParaRPr>
+            </a:p>
+          </p:txBody>
+        </p:sp>
+        <p:sp>
+          <p:nvSpPr>
+            <p:cNvPr id="86" name="Rounded Rectangle 85">
+              <a:extLst>
+                <a:ext uri="{FF2B5EF4-FFF2-40B4-BE49-F238E27FC236}">
+                  <a16:creationId xmlns:a16="http://schemas.microsoft.com/office/drawing/2014/main" id="{D6F31602-291F-E243-8FA1-C3E5BEFFAEFF}"/>
+                </a:ext>
+              </a:extLst>
+            </p:cNvPr>
+            <p:cNvSpPr/>
+            <p:nvPr/>
+          </p:nvSpPr>
+          <p:spPr bwMode="auto">
+            <a:xfrm>
+              <a:off x="5540059" y="3893080"/>
+              <a:ext cx="184171" cy="548634"/>
+            </a:xfrm>
+            <a:prstGeom prst="roundRect">
+              <a:avLst/>
+            </a:prstGeom>
+            <a:solidFill>
+              <a:schemeClr val="accent1">
+                <a:lumMod val="60000"/>
+                <a:lumOff val="40000"/>
+              </a:schemeClr>
+            </a:solidFill>
+            <a:ln>
+              <a:solidFill>
+                <a:schemeClr val="bg1"/>
+              </a:solidFill>
+              <a:prstDash val="solid"/>
+              <a:headEnd type="none" w="med" len="med"/>
+              <a:tailEnd type="none" w="med" len="med"/>
+            </a:ln>
+            <a:effectLst/>
+          </p:spPr>
+          <p:style>
+            <a:lnRef idx="1">
+              <a:schemeClr val="accent5"/>
+            </a:lnRef>
+            <a:fillRef idx="3">
+              <a:schemeClr val="accent5"/>
+            </a:fillRef>
+            <a:effectRef idx="2">
+              <a:schemeClr val="accent5"/>
+            </a:effectRef>
+            <a:fontRef idx="minor">
+              <a:schemeClr val="lt1"/>
+            </a:fontRef>
+          </p:style>
+          <p:txBody>
+            <a:bodyPr vert="horz" wrap="square" lIns="0" tIns="0" rIns="0" bIns="0" numCol="1" rtlCol="0" anchor="ctr" anchorCtr="0" compatLnSpc="1">
+              <a:prstTxWarp prst="textNoShape">
+                <a:avLst/>
+              </a:prstTxWarp>
+              <a:noAutofit/>
+            </a:bodyPr>
+            <a:lstStyle/>
+            <a:p>
+              <a:pPr algn="ctr" defTabSz="914355">
+                <a:lnSpc>
+                  <a:spcPct val="90000"/>
+                </a:lnSpc>
+              </a:pPr>
+              <a:r>
+                <a:rPr lang="en-US" sz="900">
+                  <a:solidFill>
+                    <a:schemeClr val="bg1"/>
+                  </a:solidFill>
+                </a:rPr>
+                <a:t>2</a:t>
+              </a:r>
+              <a:endParaRPr lang="en-US" sz="500">
+                <a:solidFill>
+                  <a:schemeClr val="bg1"/>
+                </a:solidFill>
+              </a:endParaRPr>
+            </a:p>
+          </p:txBody>
+        </p:sp>
+        <p:sp>
+          <p:nvSpPr>
+            <p:cNvPr id="87" name="Rounded Rectangle 86">
+              <a:extLst>
+                <a:ext uri="{FF2B5EF4-FFF2-40B4-BE49-F238E27FC236}">
+                  <a16:creationId xmlns:a16="http://schemas.microsoft.com/office/drawing/2014/main" id="{5409E56F-90FA-7D4C-A46D-4F8900E666C0}"/>
+                </a:ext>
+              </a:extLst>
+            </p:cNvPr>
+            <p:cNvSpPr/>
+            <p:nvPr/>
+          </p:nvSpPr>
+          <p:spPr bwMode="auto">
+            <a:xfrm>
+              <a:off x="5722937" y="3893080"/>
+              <a:ext cx="184171" cy="548634"/>
+            </a:xfrm>
+            <a:prstGeom prst="roundRect">
+              <a:avLst/>
+            </a:prstGeom>
+            <a:solidFill>
+              <a:schemeClr val="accent1">
+                <a:lumMod val="60000"/>
+                <a:lumOff val="40000"/>
+              </a:schemeClr>
+            </a:solidFill>
+            <a:ln>
+              <a:solidFill>
+                <a:schemeClr val="bg1"/>
+              </a:solidFill>
+              <a:prstDash val="solid"/>
+              <a:headEnd type="none" w="med" len="med"/>
+              <a:tailEnd type="none" w="med" len="med"/>
+            </a:ln>
+            <a:effectLst/>
+          </p:spPr>
+          <p:style>
+            <a:lnRef idx="1">
+              <a:schemeClr val="accent5"/>
+            </a:lnRef>
+            <a:fillRef idx="3">
+              <a:schemeClr val="accent5"/>
+            </a:fillRef>
+            <a:effectRef idx="2">
+              <a:schemeClr val="accent5"/>
+            </a:effectRef>
+            <a:fontRef idx="minor">
+              <a:schemeClr val="lt1"/>
+            </a:fontRef>
+          </p:style>
+          <p:txBody>
+            <a:bodyPr vert="horz" wrap="square" lIns="0" tIns="0" rIns="0" bIns="0" numCol="1" rtlCol="0" anchor="ctr" anchorCtr="0" compatLnSpc="1">
+              <a:prstTxWarp prst="textNoShape">
+                <a:avLst/>
+              </a:prstTxWarp>
+              <a:noAutofit/>
+            </a:bodyPr>
+            <a:lstStyle/>
+            <a:p>
+              <a:pPr algn="ctr" defTabSz="914355">
+                <a:lnSpc>
+                  <a:spcPct val="90000"/>
+                </a:lnSpc>
+              </a:pPr>
+              <a:r>
+                <a:rPr lang="en-US" sz="900">
+                  <a:solidFill>
+                    <a:schemeClr val="bg1"/>
+                  </a:solidFill>
+                </a:rPr>
+                <a:t>3</a:t>
+              </a:r>
+              <a:endParaRPr lang="en-US" sz="500">
+                <a:solidFill>
+                  <a:schemeClr val="bg1"/>
+                </a:solidFill>
+              </a:endParaRPr>
+            </a:p>
+          </p:txBody>
+        </p:sp>
+        <p:sp>
+          <p:nvSpPr>
+            <p:cNvPr id="88" name="Rounded Rectangle 87">
+              <a:extLst>
+                <a:ext uri="{FF2B5EF4-FFF2-40B4-BE49-F238E27FC236}">
+                  <a16:creationId xmlns:a16="http://schemas.microsoft.com/office/drawing/2014/main" id="{8E4A8A17-CCF2-5A44-8506-EDE7BF383FE6}"/>
+                </a:ext>
+              </a:extLst>
+            </p:cNvPr>
+            <p:cNvSpPr/>
+            <p:nvPr/>
+          </p:nvSpPr>
+          <p:spPr bwMode="auto">
+            <a:xfrm>
+              <a:off x="5907107" y="3893080"/>
+              <a:ext cx="184171" cy="548634"/>
+            </a:xfrm>
+            <a:prstGeom prst="roundRect">
+              <a:avLst/>
+            </a:prstGeom>
+            <a:solidFill>
+              <a:schemeClr val="accent1">
+                <a:lumMod val="60000"/>
+                <a:lumOff val="40000"/>
+              </a:schemeClr>
+            </a:solidFill>
+            <a:ln>
+              <a:solidFill>
+                <a:schemeClr val="bg1"/>
+              </a:solidFill>
+              <a:prstDash val="solid"/>
+              <a:headEnd type="none" w="med" len="med"/>
+              <a:tailEnd type="none" w="med" len="med"/>
+            </a:ln>
+            <a:effectLst/>
+          </p:spPr>
+          <p:style>
+            <a:lnRef idx="1">
+              <a:schemeClr val="accent5"/>
+            </a:lnRef>
+            <a:fillRef idx="3">
+              <a:schemeClr val="accent5"/>
+            </a:fillRef>
+            <a:effectRef idx="2">
+              <a:schemeClr val="accent5"/>
+            </a:effectRef>
+            <a:fontRef idx="minor">
+              <a:schemeClr val="lt1"/>
+            </a:fontRef>
+          </p:style>
+          <p:txBody>
+            <a:bodyPr vert="horz" wrap="square" lIns="0" tIns="0" rIns="0" bIns="0" numCol="1" rtlCol="0" anchor="ctr" anchorCtr="0" compatLnSpc="1">
+              <a:prstTxWarp prst="textNoShape">
+                <a:avLst/>
+              </a:prstTxWarp>
+              <a:noAutofit/>
+            </a:bodyPr>
+            <a:lstStyle/>
+            <a:p>
+              <a:pPr algn="ctr" defTabSz="914355">
+                <a:lnSpc>
+                  <a:spcPct val="90000"/>
+                </a:lnSpc>
+              </a:pPr>
+              <a:r>
+                <a:rPr lang="en-US" sz="900" dirty="0">
+                  <a:solidFill>
+                    <a:schemeClr val="bg1"/>
+                  </a:solidFill>
+                </a:rPr>
+                <a:t>4</a:t>
+              </a:r>
+              <a:endParaRPr lang="en-US" sz="500" dirty="0">
+                <a:solidFill>
+                  <a:schemeClr val="bg1"/>
+                </a:solidFill>
+              </a:endParaRPr>
+            </a:p>
+          </p:txBody>
+        </p:sp>
+      </p:grpSp>
+      <p:cxnSp>
+        <p:nvCxnSpPr>
+          <p:cNvPr id="89" name="Elbow Connector 88">
+            <a:extLst>
+              <a:ext uri="{FF2B5EF4-FFF2-40B4-BE49-F238E27FC236}">
+                <a16:creationId xmlns:a16="http://schemas.microsoft.com/office/drawing/2014/main" id="{4DC7066B-8739-C247-8904-4323D1D02AE2}"/>
+              </a:ext>
+            </a:extLst>
+          </p:cNvPr>
+          <p:cNvCxnSpPr>
+            <a:cxnSpLocks/>
+            <a:endCxn id="78" idx="1"/>
+          </p:cNvCxnSpPr>
+          <p:nvPr/>
+        </p:nvCxnSpPr>
+        <p:spPr>
+          <a:xfrm>
+            <a:off x="3276636" y="2428089"/>
+            <a:ext cx="1982020" cy="674496"/>
+          </a:xfrm>
+          <a:prstGeom prst="bentConnector3">
+            <a:avLst>
+              <a:gd name="adj1" fmla="val 50000"/>
+            </a:avLst>
+          </a:prstGeom>
+          <a:ln w="12700">
+            <a:solidFill>
+              <a:schemeClr val="accent6"/>
+            </a:solidFill>
+            <a:tailEnd type="triangle"/>
+          </a:ln>
+          <a:effectLst/>
+        </p:spPr>
+        <p:style>
+          <a:lnRef idx="2">
+            <a:schemeClr val="accent1"/>
+          </a:lnRef>
+          <a:fillRef idx="0">
+            <a:schemeClr val="accent1"/>
+          </a:fillRef>
+          <a:effectRef idx="1">
+            <a:schemeClr val="accent1"/>
+          </a:effectRef>
+          <a:fontRef idx="minor">
+            <a:schemeClr val="tx1"/>
+          </a:fontRef>
+        </p:style>
+      </p:cxnSp>
+      <p:cxnSp>
+        <p:nvCxnSpPr>
+          <p:cNvPr id="91" name="Elbow Connector 90">
+            <a:extLst>
+              <a:ext uri="{FF2B5EF4-FFF2-40B4-BE49-F238E27FC236}">
+                <a16:creationId xmlns:a16="http://schemas.microsoft.com/office/drawing/2014/main" id="{EF3DFCAE-D942-D242-B424-FE0147FFE05A}"/>
+              </a:ext>
+            </a:extLst>
+          </p:cNvPr>
+          <p:cNvCxnSpPr>
+            <a:cxnSpLocks/>
+            <a:endCxn id="84" idx="1"/>
+          </p:cNvCxnSpPr>
+          <p:nvPr/>
+        </p:nvCxnSpPr>
+        <p:spPr>
+          <a:xfrm>
+            <a:off x="3228544" y="2837702"/>
+            <a:ext cx="2030112" cy="777196"/>
+          </a:xfrm>
+          <a:prstGeom prst="bentConnector3">
+            <a:avLst>
+              <a:gd name="adj1" fmla="val 50000"/>
+            </a:avLst>
+          </a:prstGeom>
+          <a:ln w="12700">
+            <a:solidFill>
+              <a:schemeClr val="accent6"/>
+            </a:solidFill>
+            <a:tailEnd type="triangle"/>
+          </a:ln>
+          <a:effectLst/>
+        </p:spPr>
+        <p:style>
+          <a:lnRef idx="2">
+            <a:schemeClr val="accent1"/>
+          </a:lnRef>
+          <a:fillRef idx="0">
+            <a:schemeClr val="accent1"/>
+          </a:fillRef>
+          <a:effectRef idx="1">
+            <a:schemeClr val="accent1"/>
+          </a:effectRef>
+          <a:fontRef idx="minor">
+            <a:schemeClr val="tx1"/>
+          </a:fontRef>
+        </p:style>
+      </p:cxnSp>
+      <p:cxnSp>
+        <p:nvCxnSpPr>
+          <p:cNvPr id="94" name="Elbow Connector 93">
+            <a:extLst>
+              <a:ext uri="{FF2B5EF4-FFF2-40B4-BE49-F238E27FC236}">
+                <a16:creationId xmlns:a16="http://schemas.microsoft.com/office/drawing/2014/main" id="{6FDFE4B2-5AE7-FD4E-8D66-A796B5B0717F}"/>
+              </a:ext>
+            </a:extLst>
+          </p:cNvPr>
+          <p:cNvCxnSpPr>
+            <a:cxnSpLocks/>
+          </p:cNvCxnSpPr>
+          <p:nvPr/>
+        </p:nvCxnSpPr>
+        <p:spPr>
+          <a:xfrm rot="10800000" flipV="1">
+            <a:off x="1845794" y="3196141"/>
+            <a:ext cx="1375185" cy="137276"/>
+          </a:xfrm>
+          <a:prstGeom prst="bentConnector3">
+            <a:avLst>
+              <a:gd name="adj1" fmla="val 50000"/>
+            </a:avLst>
+          </a:prstGeom>
+          <a:ln w="12700">
+            <a:solidFill>
+              <a:schemeClr val="accent6"/>
+            </a:solidFill>
+            <a:tailEnd type="triangle"/>
+          </a:ln>
+          <a:effectLst/>
+        </p:spPr>
+        <p:style>
+          <a:lnRef idx="2">
+            <a:schemeClr val="accent1"/>
+          </a:lnRef>
+          <a:fillRef idx="0">
+            <a:schemeClr val="accent1"/>
+          </a:fillRef>
+          <a:effectRef idx="1">
+            <a:schemeClr val="accent1"/>
+          </a:effectRef>
+          <a:fontRef idx="minor">
+            <a:schemeClr val="tx1"/>
+          </a:fontRef>
+        </p:style>
+      </p:cxnSp>
+      <p:sp>
+        <p:nvSpPr>
+          <p:cNvPr id="101" name="Rectangle 100">
+            <a:extLst>
+              <a:ext uri="{FF2B5EF4-FFF2-40B4-BE49-F238E27FC236}">
+                <a16:creationId xmlns:a16="http://schemas.microsoft.com/office/drawing/2014/main" id="{C60FA432-B67E-574D-A339-D55E8C1CF1A0}"/>
+              </a:ext>
+            </a:extLst>
+          </p:cNvPr>
+          <p:cNvSpPr/>
+          <p:nvPr/>
+        </p:nvSpPr>
+        <p:spPr>
+          <a:xfrm>
+            <a:off x="426007" y="3384065"/>
+            <a:ext cx="1356462" cy="230832"/>
+          </a:xfrm>
+          <a:prstGeom prst="rect">
+            <a:avLst/>
+          </a:prstGeom>
+        </p:spPr>
+        <p:txBody>
+          <a:bodyPr wrap="none">
+            <a:spAutoFit/>
+          </a:bodyPr>
+          <a:lstStyle/>
+          <a:p>
+            <a:r>
+              <a:rPr lang="en-US" sz="900" dirty="0">
+                <a:latin typeface="Menlo" panose="020B0609030804020204" pitchFamily="49" charset="0"/>
+              </a:rPr>
+              <a:t>no commit offsets</a:t>
+            </a:r>
+            <a:endParaRPr lang="en-US" sz="900" dirty="0">
+              <a:effectLst/>
+              <a:latin typeface="Menlo" panose="020B0609030804020204" pitchFamily="49" charset="0"/>
+            </a:endParaRPr>
+          </a:p>
+        </p:txBody>
+      </p:sp>
+      <p:sp>
+        <p:nvSpPr>
+          <p:cNvPr id="103" name="Cross 102">
+            <a:extLst>
+              <a:ext uri="{FF2B5EF4-FFF2-40B4-BE49-F238E27FC236}">
+                <a16:creationId xmlns:a16="http://schemas.microsoft.com/office/drawing/2014/main" id="{74B11CB3-688F-C540-A2DB-9DF18B630B56}"/>
+              </a:ext>
+            </a:extLst>
+          </p:cNvPr>
+          <p:cNvSpPr/>
+          <p:nvPr/>
+        </p:nvSpPr>
+        <p:spPr>
+          <a:xfrm rot="2870975">
+            <a:off x="1613187" y="3221918"/>
+            <a:ext cx="444736" cy="444736"/>
+          </a:xfrm>
+          <a:prstGeom prst="plus">
+            <a:avLst>
+              <a:gd name="adj" fmla="val 45370"/>
+            </a:avLst>
+          </a:prstGeom>
+          <a:solidFill>
+            <a:srgbClr val="FF0000"/>
+          </a:solidFill>
+          <a:ln>
+            <a:noFill/>
+          </a:ln>
+        </p:spPr>
+        <p:style>
+          <a:lnRef idx="2">
+            <a:schemeClr val="accent1">
+              <a:shade val="50000"/>
+            </a:schemeClr>
+          </a:lnRef>
+          <a:fillRef idx="1">
+            <a:schemeClr val="accent1"/>
+          </a:fillRef>
+          <a:effectRef idx="0">
+            <a:schemeClr val="accent1"/>
+          </a:effectRef>
+          <a:fontRef idx="minor">
+            <a:schemeClr val="lt1"/>
+          </a:fontRef>
+        </p:style>
+        <p:txBody>
+          <a:bodyPr rtlCol="0" anchor="t"/>
+          <a:lstStyle/>
+          <a:p>
+            <a:pPr marL="0" marR="0" indent="0" algn="l" defTabSz="685800" rtl="0" eaLnBrk="1" fontAlgn="auto" latinLnBrk="0" hangingPunct="1">
+              <a:lnSpc>
+                <a:spcPct val="100000"/>
+              </a:lnSpc>
+              <a:spcBef>
+                <a:spcPts val="0"/>
+              </a:spcBef>
+              <a:spcAft>
+                <a:spcPts val="0"/>
+              </a:spcAft>
+              <a:buClrTx/>
+              <a:buSzTx/>
+              <a:buFontTx/>
+              <a:buNone/>
+              <a:tabLst/>
+            </a:pPr>
+            <a:endParaRPr kumimoji="0" sz="1000" b="0" i="0" u="none" strike="noStrike" kern="1200" cap="none" spc="0" normalizeH="0" baseline="0" noProof="0" dirty="0">
+              <a:ln>
+                <a:noFill/>
+              </a:ln>
+              <a:solidFill>
+                <a:prstClr val="white"/>
+              </a:solidFill>
+              <a:effectLst/>
+              <a:uLnTx/>
+              <a:uFillTx/>
+              <a:latin typeface="Arial"/>
+              <a:ea typeface="+mn-ea"/>
+              <a:cs typeface="+mn-cs"/>
+            </a:endParaRPr>
+          </a:p>
+        </p:txBody>
+      </p:sp>
+      <p:cxnSp>
+        <p:nvCxnSpPr>
+          <p:cNvPr id="104" name="Elbow Connector 103">
+            <a:extLst>
+              <a:ext uri="{FF2B5EF4-FFF2-40B4-BE49-F238E27FC236}">
+                <a16:creationId xmlns:a16="http://schemas.microsoft.com/office/drawing/2014/main" id="{9A828FC8-C1F6-944E-9B1E-495310C3FAF3}"/>
+              </a:ext>
+            </a:extLst>
+          </p:cNvPr>
+          <p:cNvCxnSpPr>
+            <a:cxnSpLocks/>
+            <a:stCxn id="119" idx="0"/>
+          </p:cNvCxnSpPr>
+          <p:nvPr/>
+        </p:nvCxnSpPr>
+        <p:spPr>
+          <a:xfrm rot="16200000" flipH="1">
+            <a:off x="1253953" y="3397308"/>
+            <a:ext cx="220739" cy="925388"/>
+          </a:xfrm>
+          <a:prstGeom prst="bentConnector4">
+            <a:avLst>
+              <a:gd name="adj1" fmla="val -61536"/>
+              <a:gd name="adj2" fmla="val 52896"/>
+            </a:avLst>
+          </a:prstGeom>
+          <a:ln w="12700">
+            <a:solidFill>
+              <a:schemeClr val="accent6"/>
+            </a:solidFill>
+            <a:tailEnd type="triangle"/>
+          </a:ln>
+          <a:effectLst/>
+        </p:spPr>
+        <p:style>
+          <a:lnRef idx="2">
+            <a:schemeClr val="accent1"/>
+          </a:lnRef>
+          <a:fillRef idx="0">
+            <a:schemeClr val="accent1"/>
+          </a:fillRef>
+          <a:effectRef idx="1">
+            <a:schemeClr val="accent1"/>
+          </a:effectRef>
+          <a:fontRef idx="minor">
+            <a:schemeClr val="tx1"/>
+          </a:fontRef>
+        </p:style>
+      </p:cxnSp>
+      <p:cxnSp>
+        <p:nvCxnSpPr>
+          <p:cNvPr id="107" name="Straight Connector 106">
+            <a:extLst>
+              <a:ext uri="{FF2B5EF4-FFF2-40B4-BE49-F238E27FC236}">
+                <a16:creationId xmlns:a16="http://schemas.microsoft.com/office/drawing/2014/main" id="{FAE310E5-EFEE-394B-B9D8-37EA965E9E72}"/>
+              </a:ext>
+            </a:extLst>
+          </p:cNvPr>
+          <p:cNvCxnSpPr>
+            <a:cxnSpLocks/>
+          </p:cNvCxnSpPr>
+          <p:nvPr/>
+        </p:nvCxnSpPr>
+        <p:spPr>
+          <a:xfrm flipH="1">
+            <a:off x="1845793" y="3794986"/>
+            <a:ext cx="7886" cy="869779"/>
+          </a:xfrm>
+          <a:prstGeom prst="line">
+            <a:avLst/>
+          </a:prstGeom>
+          <a:ln w="57150">
+            <a:solidFill>
+              <a:srgbClr val="C00000"/>
+            </a:solidFill>
+          </a:ln>
+          <a:effectLst/>
+        </p:spPr>
+        <p:style>
+          <a:lnRef idx="2">
+            <a:schemeClr val="accent1"/>
+          </a:lnRef>
+          <a:fillRef idx="0">
+            <a:schemeClr val="accent1"/>
+          </a:fillRef>
+          <a:effectRef idx="1">
+            <a:schemeClr val="accent1"/>
+          </a:effectRef>
+          <a:fontRef idx="minor">
+            <a:schemeClr val="tx1"/>
+          </a:fontRef>
+        </p:style>
+      </p:cxnSp>
+      <p:grpSp>
+        <p:nvGrpSpPr>
+          <p:cNvPr id="113" name="Group 112">
+            <a:extLst>
+              <a:ext uri="{FF2B5EF4-FFF2-40B4-BE49-F238E27FC236}">
+                <a16:creationId xmlns:a16="http://schemas.microsoft.com/office/drawing/2014/main" id="{2BFB6961-215F-A24F-8AC8-187C0042082E}"/>
+              </a:ext>
+            </a:extLst>
+          </p:cNvPr>
+          <p:cNvGrpSpPr/>
+          <p:nvPr/>
+        </p:nvGrpSpPr>
+        <p:grpSpPr>
+          <a:xfrm>
+            <a:off x="320068" y="3749633"/>
+            <a:ext cx="635153" cy="252252"/>
+            <a:chOff x="1193647" y="1635094"/>
+            <a:chExt cx="818524" cy="411476"/>
+          </a:xfrm>
+        </p:grpSpPr>
+        <p:sp>
+          <p:nvSpPr>
+            <p:cNvPr id="114" name="Rounded Rectangle 113">
+              <a:extLst>
+                <a:ext uri="{FF2B5EF4-FFF2-40B4-BE49-F238E27FC236}">
+                  <a16:creationId xmlns:a16="http://schemas.microsoft.com/office/drawing/2014/main" id="{3B433D91-E881-D848-8D92-8B24361253A0}"/>
+                </a:ext>
+              </a:extLst>
+            </p:cNvPr>
+            <p:cNvSpPr/>
+            <p:nvPr/>
+          </p:nvSpPr>
+          <p:spPr bwMode="auto">
+            <a:xfrm>
+              <a:off x="1193647" y="1635094"/>
+              <a:ext cx="138128" cy="411476"/>
+            </a:xfrm>
+            <a:prstGeom prst="roundRect">
+              <a:avLst/>
+            </a:prstGeom>
+            <a:solidFill>
+              <a:schemeClr val="bg1">
+                <a:lumMod val="50000"/>
+              </a:schemeClr>
+            </a:solidFill>
+            <a:ln>
+              <a:solidFill>
+                <a:schemeClr val="bg1"/>
+              </a:solidFill>
+              <a:prstDash val="solid"/>
+              <a:headEnd type="none" w="med" len="med"/>
+              <a:tailEnd type="none" w="med" len="med"/>
+            </a:ln>
+            <a:effectLst/>
+          </p:spPr>
+          <p:style>
+            <a:lnRef idx="1">
+              <a:schemeClr val="accent5"/>
+            </a:lnRef>
+            <a:fillRef idx="3">
+              <a:schemeClr val="accent5"/>
+            </a:fillRef>
+            <a:effectRef idx="2">
+              <a:schemeClr val="accent5"/>
+            </a:effectRef>
+            <a:fontRef idx="minor">
+              <a:schemeClr val="lt1"/>
+            </a:fontRef>
+          </p:style>
+          <p:txBody>
+            <a:bodyPr vert="horz" wrap="square" lIns="0" tIns="0" rIns="0" bIns="0" numCol="1" rtlCol="0" anchor="ctr" anchorCtr="0" compatLnSpc="1">
+              <a:prstTxWarp prst="textNoShape">
+                <a:avLst/>
+              </a:prstTxWarp>
+              <a:noAutofit/>
+            </a:bodyPr>
+            <a:lstStyle/>
+            <a:p>
+              <a:pPr algn="ctr" defTabSz="685784" eaLnBrk="0" fontAlgn="base" hangingPunct="0">
+                <a:lnSpc>
+                  <a:spcPct val="90000"/>
+                </a:lnSpc>
+                <a:spcBef>
+                  <a:spcPct val="0"/>
+                </a:spcBef>
+                <a:spcAft>
+                  <a:spcPct val="0"/>
+                </a:spcAft>
+              </a:pPr>
+              <a:r>
+                <a:rPr lang="en-US" sz="675">
+                  <a:solidFill>
+                    <a:srgbClr val="FFFFFF"/>
+                  </a:solidFill>
+                  <a:latin typeface="Arial"/>
+                </a:rPr>
+                <a:t>0</a:t>
+              </a:r>
+              <a:endParaRPr lang="en-US" sz="375">
+                <a:solidFill>
+                  <a:srgbClr val="FFFFFF"/>
+                </a:solidFill>
+                <a:latin typeface="Arial"/>
+              </a:endParaRPr>
+            </a:p>
+          </p:txBody>
+        </p:sp>
+        <p:sp>
+          <p:nvSpPr>
+            <p:cNvPr id="115" name="Rounded Rectangle 114">
+              <a:extLst>
+                <a:ext uri="{FF2B5EF4-FFF2-40B4-BE49-F238E27FC236}">
+                  <a16:creationId xmlns:a16="http://schemas.microsoft.com/office/drawing/2014/main" id="{BF308C28-322D-8741-BE3C-CB52AA1A71FD}"/>
+                </a:ext>
+              </a:extLst>
+            </p:cNvPr>
+            <p:cNvSpPr/>
+            <p:nvPr/>
+          </p:nvSpPr>
+          <p:spPr bwMode="auto">
+            <a:xfrm>
+              <a:off x="1330805" y="1635094"/>
+              <a:ext cx="138128" cy="411476"/>
+            </a:xfrm>
+            <a:prstGeom prst="roundRect">
+              <a:avLst/>
+            </a:prstGeom>
+            <a:solidFill>
+              <a:schemeClr val="bg1">
+                <a:lumMod val="50000"/>
+              </a:schemeClr>
+            </a:solidFill>
+            <a:ln>
+              <a:solidFill>
+                <a:schemeClr val="bg1"/>
+              </a:solidFill>
+              <a:prstDash val="solid"/>
+              <a:headEnd type="none" w="med" len="med"/>
+              <a:tailEnd type="none" w="med" len="med"/>
+            </a:ln>
+            <a:effectLst/>
+          </p:spPr>
+          <p:style>
+            <a:lnRef idx="1">
+              <a:schemeClr val="accent5"/>
+            </a:lnRef>
+            <a:fillRef idx="3">
+              <a:schemeClr val="accent5"/>
+            </a:fillRef>
+            <a:effectRef idx="2">
+              <a:schemeClr val="accent5"/>
+            </a:effectRef>
+            <a:fontRef idx="minor">
+              <a:schemeClr val="lt1"/>
+            </a:fontRef>
+          </p:style>
+          <p:txBody>
+            <a:bodyPr vert="horz" wrap="square" lIns="0" tIns="0" rIns="0" bIns="0" numCol="1" rtlCol="0" anchor="ctr" anchorCtr="0" compatLnSpc="1">
+              <a:prstTxWarp prst="textNoShape">
+                <a:avLst/>
+              </a:prstTxWarp>
+              <a:noAutofit/>
+            </a:bodyPr>
+            <a:lstStyle/>
+            <a:p>
+              <a:pPr algn="ctr" defTabSz="685784" eaLnBrk="0" fontAlgn="base" hangingPunct="0">
+                <a:lnSpc>
+                  <a:spcPct val="90000"/>
+                </a:lnSpc>
+                <a:spcBef>
+                  <a:spcPct val="0"/>
+                </a:spcBef>
+                <a:spcAft>
+                  <a:spcPct val="0"/>
+                </a:spcAft>
+              </a:pPr>
+              <a:r>
+                <a:rPr lang="en-US" sz="675">
+                  <a:solidFill>
+                    <a:srgbClr val="FFFFFF"/>
+                  </a:solidFill>
+                  <a:latin typeface="Arial"/>
+                </a:rPr>
+                <a:t>1</a:t>
+              </a:r>
+              <a:endParaRPr lang="en-US" sz="375">
+                <a:solidFill>
+                  <a:srgbClr val="FFFFFF"/>
+                </a:solidFill>
+                <a:latin typeface="Arial"/>
+              </a:endParaRPr>
+            </a:p>
+          </p:txBody>
+        </p:sp>
+        <p:sp>
+          <p:nvSpPr>
+            <p:cNvPr id="116" name="Rounded Rectangle 115">
+              <a:extLst>
+                <a:ext uri="{FF2B5EF4-FFF2-40B4-BE49-F238E27FC236}">
+                  <a16:creationId xmlns:a16="http://schemas.microsoft.com/office/drawing/2014/main" id="{CB8803C3-6347-194B-98D3-BFC267237BE5}"/>
+                </a:ext>
+              </a:extLst>
+            </p:cNvPr>
+            <p:cNvSpPr/>
+            <p:nvPr/>
+          </p:nvSpPr>
+          <p:spPr bwMode="auto">
+            <a:xfrm>
+              <a:off x="1468934" y="1635094"/>
+              <a:ext cx="138128" cy="411476"/>
+            </a:xfrm>
+            <a:prstGeom prst="roundRect">
+              <a:avLst/>
+            </a:prstGeom>
+            <a:solidFill>
+              <a:schemeClr val="bg1">
+                <a:lumMod val="50000"/>
+              </a:schemeClr>
+            </a:solidFill>
+            <a:ln>
+              <a:solidFill>
+                <a:schemeClr val="bg1"/>
+              </a:solidFill>
+              <a:prstDash val="solid"/>
+              <a:headEnd type="none" w="med" len="med"/>
+              <a:tailEnd type="none" w="med" len="med"/>
+            </a:ln>
+            <a:effectLst/>
+          </p:spPr>
+          <p:style>
+            <a:lnRef idx="1">
+              <a:schemeClr val="accent5"/>
+            </a:lnRef>
+            <a:fillRef idx="3">
+              <a:schemeClr val="accent5"/>
+            </a:fillRef>
+            <a:effectRef idx="2">
+              <a:schemeClr val="accent5"/>
+            </a:effectRef>
+            <a:fontRef idx="minor">
+              <a:schemeClr val="lt1"/>
+            </a:fontRef>
+          </p:style>
+          <p:txBody>
+            <a:bodyPr vert="horz" wrap="square" lIns="0" tIns="0" rIns="0" bIns="0" numCol="1" rtlCol="0" anchor="ctr" anchorCtr="0" compatLnSpc="1">
+              <a:prstTxWarp prst="textNoShape">
+                <a:avLst/>
+              </a:prstTxWarp>
+              <a:noAutofit/>
+            </a:bodyPr>
+            <a:lstStyle/>
+            <a:p>
+              <a:pPr algn="ctr" defTabSz="685784" eaLnBrk="0" fontAlgn="base" hangingPunct="0">
+                <a:lnSpc>
+                  <a:spcPct val="90000"/>
+                </a:lnSpc>
+                <a:spcBef>
+                  <a:spcPct val="0"/>
+                </a:spcBef>
+                <a:spcAft>
+                  <a:spcPct val="0"/>
+                </a:spcAft>
+              </a:pPr>
+              <a:r>
+                <a:rPr lang="en-US" sz="675">
+                  <a:solidFill>
+                    <a:srgbClr val="FFFFFF"/>
+                  </a:solidFill>
+                  <a:latin typeface="Arial"/>
+                </a:rPr>
+                <a:t>2</a:t>
+              </a:r>
+              <a:endParaRPr lang="en-US" sz="375">
+                <a:solidFill>
+                  <a:srgbClr val="FFFFFF"/>
+                </a:solidFill>
+                <a:latin typeface="Arial"/>
+              </a:endParaRPr>
+            </a:p>
+          </p:txBody>
+        </p:sp>
+        <p:sp>
+          <p:nvSpPr>
+            <p:cNvPr id="117" name="Rounded Rectangle 116">
+              <a:extLst>
+                <a:ext uri="{FF2B5EF4-FFF2-40B4-BE49-F238E27FC236}">
+                  <a16:creationId xmlns:a16="http://schemas.microsoft.com/office/drawing/2014/main" id="{EC24C66E-9AD4-4D43-B1B5-500302BAA63D}"/>
+                </a:ext>
+              </a:extLst>
+            </p:cNvPr>
+            <p:cNvSpPr/>
+            <p:nvPr/>
+          </p:nvSpPr>
+          <p:spPr bwMode="auto">
+            <a:xfrm>
+              <a:off x="1606093" y="1635094"/>
+              <a:ext cx="138128" cy="411476"/>
+            </a:xfrm>
+            <a:prstGeom prst="roundRect">
+              <a:avLst/>
+            </a:prstGeom>
+            <a:solidFill>
+              <a:schemeClr val="bg1">
+                <a:lumMod val="50000"/>
+              </a:schemeClr>
+            </a:solidFill>
+            <a:ln>
+              <a:solidFill>
+                <a:schemeClr val="bg1"/>
+              </a:solidFill>
+              <a:prstDash val="solid"/>
+              <a:headEnd type="none" w="med" len="med"/>
+              <a:tailEnd type="none" w="med" len="med"/>
+            </a:ln>
+            <a:effectLst/>
+          </p:spPr>
+          <p:style>
+            <a:lnRef idx="1">
+              <a:schemeClr val="accent5"/>
+            </a:lnRef>
+            <a:fillRef idx="3">
+              <a:schemeClr val="accent5"/>
+            </a:fillRef>
+            <a:effectRef idx="2">
+              <a:schemeClr val="accent5"/>
+            </a:effectRef>
+            <a:fontRef idx="minor">
+              <a:schemeClr val="lt1"/>
+            </a:fontRef>
+          </p:style>
+          <p:txBody>
+            <a:bodyPr vert="horz" wrap="square" lIns="0" tIns="0" rIns="0" bIns="0" numCol="1" rtlCol="0" anchor="ctr" anchorCtr="0" compatLnSpc="1">
+              <a:prstTxWarp prst="textNoShape">
+                <a:avLst/>
+              </a:prstTxWarp>
+              <a:noAutofit/>
+            </a:bodyPr>
+            <a:lstStyle/>
+            <a:p>
+              <a:pPr algn="ctr" defTabSz="685784" eaLnBrk="0" fontAlgn="base" hangingPunct="0">
+                <a:lnSpc>
+                  <a:spcPct val="90000"/>
+                </a:lnSpc>
+                <a:spcBef>
+                  <a:spcPct val="0"/>
+                </a:spcBef>
+                <a:spcAft>
+                  <a:spcPct val="0"/>
+                </a:spcAft>
+              </a:pPr>
+              <a:r>
+                <a:rPr lang="en-US" sz="675">
+                  <a:solidFill>
+                    <a:srgbClr val="FFFFFF"/>
+                  </a:solidFill>
+                  <a:latin typeface="Arial"/>
+                </a:rPr>
+                <a:t>3</a:t>
+              </a:r>
+              <a:endParaRPr lang="en-US" sz="375">
+                <a:solidFill>
+                  <a:srgbClr val="FFFFFF"/>
+                </a:solidFill>
+                <a:latin typeface="Arial"/>
+              </a:endParaRPr>
+            </a:p>
+          </p:txBody>
+        </p:sp>
+        <p:sp>
+          <p:nvSpPr>
+            <p:cNvPr id="118" name="Rounded Rectangle 117">
+              <a:extLst>
+                <a:ext uri="{FF2B5EF4-FFF2-40B4-BE49-F238E27FC236}">
+                  <a16:creationId xmlns:a16="http://schemas.microsoft.com/office/drawing/2014/main" id="{D9837F73-D8C6-4D4F-AC3B-BCAC2C19A0A2}"/>
+                </a:ext>
+              </a:extLst>
+            </p:cNvPr>
+            <p:cNvSpPr/>
+            <p:nvPr/>
+          </p:nvSpPr>
+          <p:spPr bwMode="auto">
+            <a:xfrm>
+              <a:off x="1744220" y="1635094"/>
+              <a:ext cx="138128" cy="411476"/>
+            </a:xfrm>
+            <a:prstGeom prst="roundRect">
+              <a:avLst/>
+            </a:prstGeom>
+            <a:solidFill>
+              <a:schemeClr val="bg1">
+                <a:lumMod val="50000"/>
+              </a:schemeClr>
+            </a:solidFill>
+            <a:ln>
+              <a:solidFill>
+                <a:schemeClr val="bg1"/>
+              </a:solidFill>
+              <a:prstDash val="solid"/>
+              <a:headEnd type="none" w="med" len="med"/>
+              <a:tailEnd type="none" w="med" len="med"/>
+            </a:ln>
+            <a:effectLst/>
+          </p:spPr>
+          <p:style>
+            <a:lnRef idx="1">
+              <a:schemeClr val="accent5"/>
+            </a:lnRef>
+            <a:fillRef idx="3">
+              <a:schemeClr val="accent5"/>
+            </a:fillRef>
+            <a:effectRef idx="2">
+              <a:schemeClr val="accent5"/>
+            </a:effectRef>
+            <a:fontRef idx="minor">
+              <a:schemeClr val="lt1"/>
+            </a:fontRef>
+          </p:style>
+          <p:txBody>
+            <a:bodyPr vert="horz" wrap="square" lIns="0" tIns="0" rIns="0" bIns="0" numCol="1" rtlCol="0" anchor="ctr" anchorCtr="0" compatLnSpc="1">
+              <a:prstTxWarp prst="textNoShape">
+                <a:avLst/>
+              </a:prstTxWarp>
+              <a:noAutofit/>
+            </a:bodyPr>
+            <a:lstStyle/>
+            <a:p>
+              <a:pPr algn="ctr" defTabSz="685784" eaLnBrk="0" fontAlgn="base" hangingPunct="0">
+                <a:lnSpc>
+                  <a:spcPct val="90000"/>
+                </a:lnSpc>
+                <a:spcBef>
+                  <a:spcPct val="0"/>
+                </a:spcBef>
+                <a:spcAft>
+                  <a:spcPct val="0"/>
+                </a:spcAft>
+              </a:pPr>
+              <a:r>
+                <a:rPr lang="en-US" sz="675">
+                  <a:solidFill>
+                    <a:srgbClr val="FFFFFF"/>
+                  </a:solidFill>
+                  <a:latin typeface="Arial"/>
+                </a:rPr>
+                <a:t>4</a:t>
+              </a:r>
+              <a:endParaRPr lang="en-US" sz="375">
+                <a:solidFill>
+                  <a:srgbClr val="FFFFFF"/>
+                </a:solidFill>
+                <a:latin typeface="Arial"/>
+              </a:endParaRPr>
+            </a:p>
+          </p:txBody>
+        </p:sp>
+        <p:sp>
+          <p:nvSpPr>
+            <p:cNvPr id="119" name="Rounded Rectangle 118">
+              <a:extLst>
+                <a:ext uri="{FF2B5EF4-FFF2-40B4-BE49-F238E27FC236}">
+                  <a16:creationId xmlns:a16="http://schemas.microsoft.com/office/drawing/2014/main" id="{EABD786B-1A9C-7E40-8E87-2A516A8502EE}"/>
+                </a:ext>
+              </a:extLst>
+            </p:cNvPr>
+            <p:cNvSpPr/>
+            <p:nvPr/>
+          </p:nvSpPr>
+          <p:spPr bwMode="auto">
+            <a:xfrm>
+              <a:off x="1874043" y="1635094"/>
+              <a:ext cx="138128" cy="411476"/>
+            </a:xfrm>
+            <a:prstGeom prst="roundRect">
+              <a:avLst/>
+            </a:prstGeom>
+            <a:solidFill>
+              <a:schemeClr val="bg1">
+                <a:lumMod val="50000"/>
+              </a:schemeClr>
+            </a:solidFill>
+            <a:ln>
+              <a:solidFill>
+                <a:schemeClr val="bg1"/>
+              </a:solidFill>
+              <a:prstDash val="solid"/>
+              <a:headEnd type="none" w="med" len="med"/>
+              <a:tailEnd type="none" w="med" len="med"/>
+            </a:ln>
+            <a:effectLst/>
+          </p:spPr>
+          <p:style>
+            <a:lnRef idx="1">
+              <a:schemeClr val="accent5"/>
+            </a:lnRef>
+            <a:fillRef idx="3">
+              <a:schemeClr val="accent5"/>
+            </a:fillRef>
+            <a:effectRef idx="2">
+              <a:schemeClr val="accent5"/>
+            </a:effectRef>
+            <a:fontRef idx="minor">
+              <a:schemeClr val="lt1"/>
+            </a:fontRef>
+          </p:style>
+          <p:txBody>
+            <a:bodyPr vert="horz" wrap="square" lIns="0" tIns="0" rIns="0" bIns="0" numCol="1" rtlCol="0" anchor="ctr" anchorCtr="0" compatLnSpc="1">
+              <a:prstTxWarp prst="textNoShape">
+                <a:avLst/>
+              </a:prstTxWarp>
+              <a:noAutofit/>
+            </a:bodyPr>
+            <a:lstStyle/>
+            <a:p>
+              <a:pPr algn="ctr" defTabSz="685784" eaLnBrk="0" fontAlgn="base" hangingPunct="0">
+                <a:lnSpc>
+                  <a:spcPct val="90000"/>
+                </a:lnSpc>
+                <a:spcBef>
+                  <a:spcPct val="0"/>
+                </a:spcBef>
+                <a:spcAft>
+                  <a:spcPct val="0"/>
+                </a:spcAft>
+              </a:pPr>
+              <a:r>
+                <a:rPr lang="en-US" sz="675">
+                  <a:solidFill>
+                    <a:srgbClr val="FFFFFF"/>
+                  </a:solidFill>
+                  <a:latin typeface="Arial"/>
+                </a:rPr>
+                <a:t>5</a:t>
+              </a:r>
+              <a:endParaRPr lang="en-US" sz="375">
+                <a:solidFill>
+                  <a:srgbClr val="FFFFFF"/>
+                </a:solidFill>
+                <a:latin typeface="Arial"/>
+              </a:endParaRPr>
+            </a:p>
+          </p:txBody>
+        </p:sp>
+      </p:grpSp>
+      <p:sp>
+        <p:nvSpPr>
+          <p:cNvPr id="120" name="Rectangle 119">
+            <a:extLst>
+              <a:ext uri="{FF2B5EF4-FFF2-40B4-BE49-F238E27FC236}">
+                <a16:creationId xmlns:a16="http://schemas.microsoft.com/office/drawing/2014/main" id="{0F0AA046-3241-1E46-B794-BB8BCA7A64FA}"/>
+              </a:ext>
+            </a:extLst>
+          </p:cNvPr>
+          <p:cNvSpPr/>
+          <p:nvPr/>
+        </p:nvSpPr>
+        <p:spPr>
+          <a:xfrm>
+            <a:off x="234562" y="4105893"/>
+            <a:ext cx="598241" cy="230832"/>
+          </a:xfrm>
+          <a:prstGeom prst="rect">
+            <a:avLst/>
+          </a:prstGeom>
+        </p:spPr>
+        <p:txBody>
+          <a:bodyPr wrap="none">
+            <a:spAutoFit/>
+          </a:bodyPr>
+          <a:lstStyle/>
+          <a:p>
+            <a:r>
+              <a:rPr lang="en-US" sz="900">
+                <a:latin typeface="Menlo" panose="020B0609030804020204" pitchFamily="49" charset="0"/>
+              </a:rPr>
+              <a:t>orders</a:t>
+            </a:r>
+            <a:endParaRPr lang="en-US" sz="900">
+              <a:effectLst/>
+              <a:latin typeface="Menlo" panose="020B0609030804020204" pitchFamily="49" charset="0"/>
+            </a:endParaRPr>
+          </a:p>
+        </p:txBody>
+      </p:sp>
+      <p:sp>
+        <p:nvSpPr>
+          <p:cNvPr id="124" name="Rounded Rectangle 123">
+            <a:extLst>
+              <a:ext uri="{FF2B5EF4-FFF2-40B4-BE49-F238E27FC236}">
+                <a16:creationId xmlns:a16="http://schemas.microsoft.com/office/drawing/2014/main" id="{57050523-EE6A-A44E-876A-AB724D53C6D8}"/>
+              </a:ext>
+            </a:extLst>
+          </p:cNvPr>
+          <p:cNvSpPr/>
+          <p:nvPr/>
+        </p:nvSpPr>
+        <p:spPr bwMode="auto">
+          <a:xfrm>
+            <a:off x="5221750" y="4352064"/>
+            <a:ext cx="107184" cy="252252"/>
+          </a:xfrm>
+          <a:prstGeom prst="roundRect">
+            <a:avLst/>
+          </a:prstGeom>
+          <a:solidFill>
+            <a:schemeClr val="bg1">
+              <a:lumMod val="50000"/>
+            </a:schemeClr>
+          </a:solidFill>
+          <a:ln>
+            <a:solidFill>
+              <a:schemeClr val="bg1"/>
+            </a:solidFill>
+            <a:prstDash val="solid"/>
+            <a:headEnd type="none" w="med" len="med"/>
+            <a:tailEnd type="none" w="med" len="med"/>
+          </a:ln>
+          <a:effectLst/>
+        </p:spPr>
+        <p:style>
+          <a:lnRef idx="1">
+            <a:schemeClr val="accent5"/>
+          </a:lnRef>
+          <a:fillRef idx="3">
+            <a:schemeClr val="accent5"/>
+          </a:fillRef>
+          <a:effectRef idx="2">
+            <a:schemeClr val="accent5"/>
+          </a:effectRef>
+          <a:fontRef idx="minor">
+            <a:schemeClr val="lt1"/>
+          </a:fontRef>
+        </p:style>
+        <p:txBody>
+          <a:bodyPr vert="horz" wrap="square" lIns="0" tIns="0" rIns="0" bIns="0" numCol="1" rtlCol="0" anchor="ctr" anchorCtr="0" compatLnSpc="1">
+            <a:prstTxWarp prst="textNoShape">
+              <a:avLst/>
+            </a:prstTxWarp>
+            <a:noAutofit/>
+          </a:bodyPr>
+          <a:lstStyle/>
+          <a:p>
+            <a:pPr algn="ctr" defTabSz="685784" eaLnBrk="0" fontAlgn="base" hangingPunct="0">
+              <a:lnSpc>
+                <a:spcPct val="90000"/>
+              </a:lnSpc>
+              <a:spcBef>
+                <a:spcPct val="0"/>
+              </a:spcBef>
+              <a:spcAft>
+                <a:spcPct val="0"/>
+              </a:spcAft>
+            </a:pPr>
+            <a:r>
+              <a:rPr lang="en-US" sz="675" dirty="0">
+                <a:solidFill>
+                  <a:srgbClr val="FFFFFF"/>
+                </a:solidFill>
+                <a:latin typeface="Arial"/>
+              </a:rPr>
+              <a:t>20</a:t>
+            </a:r>
+            <a:endParaRPr lang="en-US" sz="375" dirty="0">
+              <a:solidFill>
+                <a:srgbClr val="FFFFFF"/>
+              </a:solidFill>
+              <a:latin typeface="Arial"/>
+            </a:endParaRPr>
+          </a:p>
+        </p:txBody>
+      </p:sp>
+      <p:sp>
+        <p:nvSpPr>
+          <p:cNvPr id="125" name="Rounded Rectangle 124">
+            <a:extLst>
+              <a:ext uri="{FF2B5EF4-FFF2-40B4-BE49-F238E27FC236}">
+                <a16:creationId xmlns:a16="http://schemas.microsoft.com/office/drawing/2014/main" id="{E7B54D2A-8875-8341-A466-E4EECEC972A2}"/>
+              </a:ext>
+            </a:extLst>
+          </p:cNvPr>
+          <p:cNvSpPr/>
+          <p:nvPr/>
+        </p:nvSpPr>
+        <p:spPr bwMode="auto">
+          <a:xfrm>
+            <a:off x="5328181" y="4352064"/>
+            <a:ext cx="107184" cy="252252"/>
+          </a:xfrm>
+          <a:prstGeom prst="roundRect">
+            <a:avLst/>
+          </a:prstGeom>
+          <a:solidFill>
+            <a:schemeClr val="bg1">
+              <a:lumMod val="50000"/>
+            </a:schemeClr>
+          </a:solidFill>
+          <a:ln>
+            <a:solidFill>
+              <a:schemeClr val="bg1"/>
+            </a:solidFill>
+            <a:prstDash val="solid"/>
+            <a:headEnd type="none" w="med" len="med"/>
+            <a:tailEnd type="none" w="med" len="med"/>
+          </a:ln>
+          <a:effectLst/>
+        </p:spPr>
+        <p:style>
+          <a:lnRef idx="1">
+            <a:schemeClr val="accent5"/>
+          </a:lnRef>
+          <a:fillRef idx="3">
+            <a:schemeClr val="accent5"/>
+          </a:fillRef>
+          <a:effectRef idx="2">
+            <a:schemeClr val="accent5"/>
+          </a:effectRef>
+          <a:fontRef idx="minor">
+            <a:schemeClr val="lt1"/>
+          </a:fontRef>
+        </p:style>
+        <p:txBody>
+          <a:bodyPr vert="horz" wrap="square" lIns="0" tIns="0" rIns="0" bIns="0" numCol="1" rtlCol="0" anchor="ctr" anchorCtr="0" compatLnSpc="1">
+            <a:prstTxWarp prst="textNoShape">
+              <a:avLst/>
+            </a:prstTxWarp>
+            <a:noAutofit/>
+          </a:bodyPr>
+          <a:lstStyle/>
+          <a:p>
+            <a:pPr algn="ctr" defTabSz="685784" eaLnBrk="0" fontAlgn="base" hangingPunct="0">
+              <a:lnSpc>
+                <a:spcPct val="90000"/>
+              </a:lnSpc>
+              <a:spcBef>
+                <a:spcPct val="0"/>
+              </a:spcBef>
+              <a:spcAft>
+                <a:spcPct val="0"/>
+              </a:spcAft>
+            </a:pPr>
+            <a:r>
+              <a:rPr lang="en-US" sz="675" dirty="0">
+                <a:solidFill>
+                  <a:srgbClr val="FFFFFF"/>
+                </a:solidFill>
+                <a:latin typeface="Arial"/>
+              </a:rPr>
+              <a:t>21</a:t>
+            </a:r>
+            <a:endParaRPr lang="en-US" sz="375" dirty="0">
+              <a:solidFill>
+                <a:srgbClr val="FFFFFF"/>
+              </a:solidFill>
+              <a:latin typeface="Arial"/>
+            </a:endParaRPr>
+          </a:p>
+        </p:txBody>
+      </p:sp>
+      <p:sp>
+        <p:nvSpPr>
+          <p:cNvPr id="126" name="Rounded Rectangle 125">
+            <a:extLst>
+              <a:ext uri="{FF2B5EF4-FFF2-40B4-BE49-F238E27FC236}">
+                <a16:creationId xmlns:a16="http://schemas.microsoft.com/office/drawing/2014/main" id="{DF146A1B-8B78-494E-B38A-7B6EC52C4EEA}"/>
+              </a:ext>
+            </a:extLst>
+          </p:cNvPr>
+          <p:cNvSpPr/>
+          <p:nvPr/>
+        </p:nvSpPr>
+        <p:spPr bwMode="auto">
+          <a:xfrm>
+            <a:off x="5435365" y="4352064"/>
+            <a:ext cx="107184" cy="252252"/>
+          </a:xfrm>
+          <a:prstGeom prst="roundRect">
+            <a:avLst/>
+          </a:prstGeom>
+          <a:solidFill>
+            <a:schemeClr val="bg1">
+              <a:lumMod val="50000"/>
+            </a:schemeClr>
+          </a:solidFill>
+          <a:ln>
+            <a:solidFill>
+              <a:schemeClr val="bg1"/>
+            </a:solidFill>
+            <a:prstDash val="solid"/>
+            <a:headEnd type="none" w="med" len="med"/>
+            <a:tailEnd type="none" w="med" len="med"/>
+          </a:ln>
+          <a:effectLst/>
+        </p:spPr>
+        <p:style>
+          <a:lnRef idx="1">
+            <a:schemeClr val="accent5"/>
+          </a:lnRef>
+          <a:fillRef idx="3">
+            <a:schemeClr val="accent5"/>
+          </a:fillRef>
+          <a:effectRef idx="2">
+            <a:schemeClr val="accent5"/>
+          </a:effectRef>
+          <a:fontRef idx="minor">
+            <a:schemeClr val="lt1"/>
+          </a:fontRef>
+        </p:style>
+        <p:txBody>
+          <a:bodyPr vert="horz" wrap="square" lIns="0" tIns="0" rIns="0" bIns="0" numCol="1" rtlCol="0" anchor="ctr" anchorCtr="0" compatLnSpc="1">
+            <a:prstTxWarp prst="textNoShape">
+              <a:avLst/>
+            </a:prstTxWarp>
+            <a:noAutofit/>
+          </a:bodyPr>
+          <a:lstStyle/>
+          <a:p>
+            <a:pPr algn="ctr" defTabSz="685784" eaLnBrk="0" fontAlgn="base" hangingPunct="0">
+              <a:lnSpc>
+                <a:spcPct val="90000"/>
+              </a:lnSpc>
+              <a:spcBef>
+                <a:spcPct val="0"/>
+              </a:spcBef>
+              <a:spcAft>
+                <a:spcPct val="0"/>
+              </a:spcAft>
+            </a:pPr>
+            <a:r>
+              <a:rPr lang="en-US" sz="675" dirty="0">
+                <a:solidFill>
+                  <a:srgbClr val="FFFFFF"/>
+                </a:solidFill>
+                <a:latin typeface="Arial"/>
+              </a:rPr>
+              <a:t>22</a:t>
+            </a:r>
+            <a:endParaRPr lang="en-US" sz="375" dirty="0">
+              <a:solidFill>
+                <a:srgbClr val="FFFFFF"/>
+              </a:solidFill>
+              <a:latin typeface="Arial"/>
+            </a:endParaRPr>
+          </a:p>
+        </p:txBody>
+      </p:sp>
+      <p:sp>
+        <p:nvSpPr>
+          <p:cNvPr id="127" name="Rounded Rectangle 126">
+            <a:extLst>
+              <a:ext uri="{FF2B5EF4-FFF2-40B4-BE49-F238E27FC236}">
+                <a16:creationId xmlns:a16="http://schemas.microsoft.com/office/drawing/2014/main" id="{A7487878-EA34-FF4B-B4F5-7B3E89B988F1}"/>
+              </a:ext>
+            </a:extLst>
+          </p:cNvPr>
+          <p:cNvSpPr/>
+          <p:nvPr/>
+        </p:nvSpPr>
+        <p:spPr bwMode="auto">
+          <a:xfrm>
+            <a:off x="5541797" y="4352064"/>
+            <a:ext cx="107184" cy="252252"/>
+          </a:xfrm>
+          <a:prstGeom prst="roundRect">
+            <a:avLst/>
+          </a:prstGeom>
+          <a:solidFill>
+            <a:schemeClr val="bg1">
+              <a:lumMod val="50000"/>
+            </a:schemeClr>
+          </a:solidFill>
+          <a:ln>
+            <a:solidFill>
+              <a:schemeClr val="bg1"/>
+            </a:solidFill>
+            <a:prstDash val="solid"/>
+            <a:headEnd type="none" w="med" len="med"/>
+            <a:tailEnd type="none" w="med" len="med"/>
+          </a:ln>
+          <a:effectLst/>
+        </p:spPr>
+        <p:style>
+          <a:lnRef idx="1">
+            <a:schemeClr val="accent5"/>
+          </a:lnRef>
+          <a:fillRef idx="3">
+            <a:schemeClr val="accent5"/>
+          </a:fillRef>
+          <a:effectRef idx="2">
+            <a:schemeClr val="accent5"/>
+          </a:effectRef>
+          <a:fontRef idx="minor">
+            <a:schemeClr val="lt1"/>
+          </a:fontRef>
+        </p:style>
+        <p:txBody>
+          <a:bodyPr vert="horz" wrap="square" lIns="0" tIns="0" rIns="0" bIns="0" numCol="1" rtlCol="0" anchor="ctr" anchorCtr="0" compatLnSpc="1">
+            <a:prstTxWarp prst="textNoShape">
+              <a:avLst/>
+            </a:prstTxWarp>
+            <a:noAutofit/>
+          </a:bodyPr>
+          <a:lstStyle/>
+          <a:p>
+            <a:pPr algn="ctr" defTabSz="685784" eaLnBrk="0" fontAlgn="base" hangingPunct="0">
+              <a:lnSpc>
+                <a:spcPct val="90000"/>
+              </a:lnSpc>
+              <a:spcBef>
+                <a:spcPct val="0"/>
+              </a:spcBef>
+              <a:spcAft>
+                <a:spcPct val="0"/>
+              </a:spcAft>
+            </a:pPr>
+            <a:r>
+              <a:rPr lang="en-US" sz="675" dirty="0">
+                <a:solidFill>
+                  <a:srgbClr val="FFFFFF"/>
+                </a:solidFill>
+                <a:latin typeface="Arial"/>
+              </a:rPr>
+              <a:t>23</a:t>
+            </a:r>
+            <a:endParaRPr lang="en-US" sz="375" dirty="0">
+              <a:solidFill>
+                <a:srgbClr val="FFFFFF"/>
+              </a:solidFill>
+              <a:latin typeface="Arial"/>
+            </a:endParaRPr>
+          </a:p>
+        </p:txBody>
+      </p:sp>
+      <p:sp>
+        <p:nvSpPr>
+          <p:cNvPr id="128" name="Rounded Rectangle 127">
+            <a:extLst>
+              <a:ext uri="{FF2B5EF4-FFF2-40B4-BE49-F238E27FC236}">
+                <a16:creationId xmlns:a16="http://schemas.microsoft.com/office/drawing/2014/main" id="{61B1B4C7-5199-4A4D-BE7A-8AB61D4085CA}"/>
+              </a:ext>
+            </a:extLst>
+          </p:cNvPr>
+          <p:cNvSpPr/>
+          <p:nvPr/>
+        </p:nvSpPr>
+        <p:spPr bwMode="auto">
+          <a:xfrm>
+            <a:off x="5648980" y="4352064"/>
+            <a:ext cx="107184" cy="252252"/>
+          </a:xfrm>
+          <a:prstGeom prst="roundRect">
+            <a:avLst/>
+          </a:prstGeom>
+          <a:solidFill>
+            <a:schemeClr val="bg1">
+              <a:lumMod val="50000"/>
+            </a:schemeClr>
+          </a:solidFill>
+          <a:ln>
+            <a:solidFill>
+              <a:schemeClr val="bg1"/>
+            </a:solidFill>
+            <a:prstDash val="solid"/>
+            <a:headEnd type="none" w="med" len="med"/>
+            <a:tailEnd type="none" w="med" len="med"/>
+          </a:ln>
+          <a:effectLst/>
+        </p:spPr>
+        <p:style>
+          <a:lnRef idx="1">
+            <a:schemeClr val="accent5"/>
+          </a:lnRef>
+          <a:fillRef idx="3">
+            <a:schemeClr val="accent5"/>
+          </a:fillRef>
+          <a:effectRef idx="2">
+            <a:schemeClr val="accent5"/>
+          </a:effectRef>
+          <a:fontRef idx="minor">
+            <a:schemeClr val="lt1"/>
+          </a:fontRef>
+        </p:style>
+        <p:txBody>
+          <a:bodyPr vert="horz" wrap="square" lIns="0" tIns="0" rIns="0" bIns="0" numCol="1" rtlCol="0" anchor="ctr" anchorCtr="0" compatLnSpc="1">
+            <a:prstTxWarp prst="textNoShape">
+              <a:avLst/>
+            </a:prstTxWarp>
+            <a:noAutofit/>
+          </a:bodyPr>
+          <a:lstStyle/>
+          <a:p>
+            <a:pPr algn="ctr" defTabSz="685784" eaLnBrk="0" fontAlgn="base" hangingPunct="0">
+              <a:lnSpc>
+                <a:spcPct val="90000"/>
+              </a:lnSpc>
+              <a:spcBef>
+                <a:spcPct val="0"/>
+              </a:spcBef>
+              <a:spcAft>
+                <a:spcPct val="0"/>
+              </a:spcAft>
+            </a:pPr>
+            <a:r>
+              <a:rPr lang="en-US" sz="675" dirty="0">
+                <a:solidFill>
+                  <a:srgbClr val="FFFFFF"/>
+                </a:solidFill>
+                <a:latin typeface="Arial"/>
+              </a:rPr>
+              <a:t>24</a:t>
+            </a:r>
+            <a:endParaRPr lang="en-US" sz="375" dirty="0">
+              <a:solidFill>
+                <a:srgbClr val="FFFFFF"/>
+              </a:solidFill>
+              <a:latin typeface="Arial"/>
+            </a:endParaRPr>
+          </a:p>
+        </p:txBody>
+      </p:sp>
+      <p:sp>
+        <p:nvSpPr>
+          <p:cNvPr id="129" name="Rounded Rectangle 128">
+            <a:extLst>
+              <a:ext uri="{FF2B5EF4-FFF2-40B4-BE49-F238E27FC236}">
+                <a16:creationId xmlns:a16="http://schemas.microsoft.com/office/drawing/2014/main" id="{2946FEDD-C5E8-0841-B297-C94ABC746B92}"/>
+              </a:ext>
+            </a:extLst>
+          </p:cNvPr>
+          <p:cNvSpPr/>
+          <p:nvPr/>
+        </p:nvSpPr>
+        <p:spPr bwMode="auto">
+          <a:xfrm>
+            <a:off x="5749719" y="4352064"/>
+            <a:ext cx="107184" cy="252252"/>
+          </a:xfrm>
+          <a:prstGeom prst="roundRect">
+            <a:avLst/>
+          </a:prstGeom>
+          <a:solidFill>
+            <a:srgbClr val="FFC000"/>
+          </a:solidFill>
+          <a:ln>
+            <a:solidFill>
+              <a:schemeClr val="bg1"/>
+            </a:solidFill>
+            <a:prstDash val="solid"/>
+            <a:headEnd type="none" w="med" len="med"/>
+            <a:tailEnd type="none" w="med" len="med"/>
+          </a:ln>
+          <a:effectLst/>
+        </p:spPr>
+        <p:style>
+          <a:lnRef idx="1">
+            <a:schemeClr val="accent5"/>
+          </a:lnRef>
+          <a:fillRef idx="3">
+            <a:schemeClr val="accent5"/>
+          </a:fillRef>
+          <a:effectRef idx="2">
+            <a:schemeClr val="accent5"/>
+          </a:effectRef>
+          <a:fontRef idx="minor">
+            <a:schemeClr val="lt1"/>
+          </a:fontRef>
+        </p:style>
+        <p:txBody>
+          <a:bodyPr vert="horz" wrap="square" lIns="0" tIns="0" rIns="0" bIns="0" numCol="1" rtlCol="0" anchor="ctr" anchorCtr="0" compatLnSpc="1">
+            <a:prstTxWarp prst="textNoShape">
+              <a:avLst/>
+            </a:prstTxWarp>
+            <a:noAutofit/>
+          </a:bodyPr>
+          <a:lstStyle/>
+          <a:p>
+            <a:pPr algn="ctr" defTabSz="685784" eaLnBrk="0" fontAlgn="base" hangingPunct="0">
+              <a:lnSpc>
+                <a:spcPct val="90000"/>
+              </a:lnSpc>
+              <a:spcBef>
+                <a:spcPct val="0"/>
+              </a:spcBef>
+              <a:spcAft>
+                <a:spcPct val="0"/>
+              </a:spcAft>
+            </a:pPr>
+            <a:r>
+              <a:rPr lang="en-US" sz="675" dirty="0">
+                <a:solidFill>
+                  <a:srgbClr val="FFFFFF"/>
+                </a:solidFill>
+                <a:latin typeface="Arial"/>
+              </a:rPr>
+              <a:t>25</a:t>
+            </a:r>
+            <a:endParaRPr lang="en-US" sz="375" dirty="0">
+              <a:solidFill>
+                <a:srgbClr val="FFFFFF"/>
+              </a:solidFill>
+              <a:latin typeface="Arial"/>
+            </a:endParaRPr>
+          </a:p>
+        </p:txBody>
+      </p:sp>
+      <p:sp>
+        <p:nvSpPr>
+          <p:cNvPr id="130" name="Rectangle 129">
+            <a:extLst>
+              <a:ext uri="{FF2B5EF4-FFF2-40B4-BE49-F238E27FC236}">
+                <a16:creationId xmlns:a16="http://schemas.microsoft.com/office/drawing/2014/main" id="{3B6F58F1-AB6B-0040-8AA1-236E7CA984E3}"/>
+              </a:ext>
+            </a:extLst>
+          </p:cNvPr>
+          <p:cNvSpPr/>
+          <p:nvPr/>
+        </p:nvSpPr>
+        <p:spPr>
+          <a:xfrm>
+            <a:off x="5134835" y="4560319"/>
+            <a:ext cx="1080745" cy="230832"/>
+          </a:xfrm>
+          <a:prstGeom prst="rect">
+            <a:avLst/>
+          </a:prstGeom>
+        </p:spPr>
+        <p:txBody>
+          <a:bodyPr wrap="none">
+            <a:spAutoFit/>
+          </a:bodyPr>
+          <a:lstStyle/>
+          <a:p>
+            <a:r>
+              <a:rPr lang="en-US" sz="900" dirty="0">
+                <a:latin typeface="Menlo" panose="020B0609030804020204" pitchFamily="49" charset="0"/>
+              </a:rPr>
+              <a:t>source.orders</a:t>
+            </a:r>
+            <a:endParaRPr lang="en-US" sz="900" dirty="0">
+              <a:effectLst/>
+              <a:latin typeface="Menlo" panose="020B0609030804020204" pitchFamily="49" charset="0"/>
+            </a:endParaRPr>
+          </a:p>
+        </p:txBody>
+      </p:sp>
+      <p:sp>
+        <p:nvSpPr>
+          <p:cNvPr id="131" name="Rounded Rectangle 130">
+            <a:extLst>
+              <a:ext uri="{FF2B5EF4-FFF2-40B4-BE49-F238E27FC236}">
+                <a16:creationId xmlns:a16="http://schemas.microsoft.com/office/drawing/2014/main" id="{86DF408F-5BBD-1F46-958F-21E066F78390}"/>
+              </a:ext>
+            </a:extLst>
+          </p:cNvPr>
+          <p:cNvSpPr/>
+          <p:nvPr/>
+        </p:nvSpPr>
+        <p:spPr bwMode="auto">
+          <a:xfrm>
+            <a:off x="5875615" y="4345440"/>
+            <a:ext cx="107184" cy="252252"/>
+          </a:xfrm>
+          <a:prstGeom prst="roundRect">
+            <a:avLst/>
+          </a:prstGeom>
+          <a:solidFill>
+            <a:srgbClr val="FFC000"/>
+          </a:solidFill>
+          <a:ln>
+            <a:solidFill>
+              <a:schemeClr val="bg1"/>
+            </a:solidFill>
+            <a:prstDash val="solid"/>
+            <a:headEnd type="none" w="med" len="med"/>
+            <a:tailEnd type="none" w="med" len="med"/>
+          </a:ln>
+          <a:effectLst/>
+        </p:spPr>
+        <p:style>
+          <a:lnRef idx="1">
+            <a:schemeClr val="accent5"/>
+          </a:lnRef>
+          <a:fillRef idx="3">
+            <a:schemeClr val="accent5"/>
+          </a:fillRef>
+          <a:effectRef idx="2">
+            <a:schemeClr val="accent5"/>
+          </a:effectRef>
+          <a:fontRef idx="minor">
+            <a:schemeClr val="lt1"/>
+          </a:fontRef>
+        </p:style>
+        <p:txBody>
+          <a:bodyPr vert="horz" wrap="square" lIns="0" tIns="0" rIns="0" bIns="0" numCol="1" rtlCol="0" anchor="ctr" anchorCtr="0" compatLnSpc="1">
+            <a:prstTxWarp prst="textNoShape">
+              <a:avLst/>
+            </a:prstTxWarp>
+            <a:noAutofit/>
+          </a:bodyPr>
+          <a:lstStyle/>
+          <a:p>
+            <a:pPr algn="ctr" defTabSz="685784" eaLnBrk="0" fontAlgn="base" hangingPunct="0">
+              <a:lnSpc>
+                <a:spcPct val="90000"/>
+              </a:lnSpc>
+              <a:spcBef>
+                <a:spcPct val="0"/>
+              </a:spcBef>
+              <a:spcAft>
+                <a:spcPct val="0"/>
+              </a:spcAft>
+            </a:pPr>
+            <a:r>
+              <a:rPr lang="en-US" sz="675" dirty="0">
+                <a:solidFill>
+                  <a:srgbClr val="FFFFFF"/>
+                </a:solidFill>
+                <a:latin typeface="Arial"/>
+              </a:rPr>
+              <a:t>26</a:t>
+            </a:r>
+            <a:endParaRPr lang="en-US" sz="375" dirty="0">
+              <a:solidFill>
+                <a:srgbClr val="FFFFFF"/>
+              </a:solidFill>
+              <a:latin typeface="Arial"/>
+            </a:endParaRPr>
+          </a:p>
+        </p:txBody>
+      </p:sp>
+      <p:cxnSp>
+        <p:nvCxnSpPr>
+          <p:cNvPr id="132" name="Elbow Connector 131">
+            <a:extLst>
+              <a:ext uri="{FF2B5EF4-FFF2-40B4-BE49-F238E27FC236}">
+                <a16:creationId xmlns:a16="http://schemas.microsoft.com/office/drawing/2014/main" id="{2CC35F08-8706-C942-BF76-259C6E0A58A1}"/>
+              </a:ext>
+            </a:extLst>
+          </p:cNvPr>
+          <p:cNvCxnSpPr>
+            <a:cxnSpLocks/>
+          </p:cNvCxnSpPr>
+          <p:nvPr/>
+        </p:nvCxnSpPr>
+        <p:spPr>
+          <a:xfrm>
+            <a:off x="3272220" y="2171633"/>
+            <a:ext cx="2552903" cy="127765"/>
+          </a:xfrm>
+          <a:prstGeom prst="bentConnector2">
+            <a:avLst/>
+          </a:prstGeom>
+          <a:ln w="12700">
+            <a:solidFill>
+              <a:schemeClr val="accent6"/>
+            </a:solidFill>
+            <a:tailEnd type="triangle"/>
+          </a:ln>
+          <a:effectLst/>
+        </p:spPr>
+        <p:style>
+          <a:lnRef idx="2">
+            <a:schemeClr val="accent1"/>
+          </a:lnRef>
+          <a:fillRef idx="0">
+            <a:schemeClr val="accent1"/>
+          </a:fillRef>
+          <a:effectRef idx="1">
+            <a:schemeClr val="accent1"/>
+          </a:effectRef>
+          <a:fontRef idx="minor">
+            <a:schemeClr val="tx1"/>
+          </a:fontRef>
+        </p:style>
+      </p:cxnSp>
+      <p:cxnSp>
+        <p:nvCxnSpPr>
+          <p:cNvPr id="133" name="Straight Connector 132">
+            <a:extLst>
+              <a:ext uri="{FF2B5EF4-FFF2-40B4-BE49-F238E27FC236}">
+                <a16:creationId xmlns:a16="http://schemas.microsoft.com/office/drawing/2014/main" id="{8E9B3159-F758-664B-8142-412F9E31B877}"/>
+              </a:ext>
+            </a:extLst>
+          </p:cNvPr>
+          <p:cNvCxnSpPr>
+            <a:cxnSpLocks/>
+          </p:cNvCxnSpPr>
+          <p:nvPr/>
+        </p:nvCxnSpPr>
+        <p:spPr>
+          <a:xfrm flipH="1">
+            <a:off x="3245103" y="3723396"/>
+            <a:ext cx="7884" cy="1067755"/>
+          </a:xfrm>
+          <a:prstGeom prst="line">
+            <a:avLst/>
+          </a:prstGeom>
+          <a:ln w="57150">
+            <a:solidFill>
+              <a:srgbClr val="C00000"/>
+            </a:solidFill>
+          </a:ln>
+          <a:effectLst/>
+        </p:spPr>
+        <p:style>
+          <a:lnRef idx="2">
+            <a:schemeClr val="accent1"/>
+          </a:lnRef>
+          <a:fillRef idx="0">
+            <a:schemeClr val="accent1"/>
+          </a:fillRef>
+          <a:effectRef idx="1">
+            <a:schemeClr val="accent1"/>
+          </a:effectRef>
+          <a:fontRef idx="minor">
+            <a:schemeClr val="tx1"/>
+          </a:fontRef>
+        </p:style>
+      </p:cxnSp>
+      <p:cxnSp>
+        <p:nvCxnSpPr>
+          <p:cNvPr id="136" name="Elbow Connector 135">
+            <a:extLst>
+              <a:ext uri="{FF2B5EF4-FFF2-40B4-BE49-F238E27FC236}">
+                <a16:creationId xmlns:a16="http://schemas.microsoft.com/office/drawing/2014/main" id="{AB1D386B-1A82-E64B-B234-114D7B5EA894}"/>
+              </a:ext>
+            </a:extLst>
+          </p:cNvPr>
+          <p:cNvCxnSpPr>
+            <a:cxnSpLocks/>
+          </p:cNvCxnSpPr>
+          <p:nvPr/>
+        </p:nvCxnSpPr>
+        <p:spPr>
+          <a:xfrm>
+            <a:off x="1839551" y="4058563"/>
+            <a:ext cx="1367776" cy="12700"/>
+          </a:xfrm>
+          <a:prstGeom prst="bentConnector3">
+            <a:avLst>
+              <a:gd name="adj1" fmla="val 50000"/>
+            </a:avLst>
+          </a:prstGeom>
+          <a:ln w="12700">
+            <a:solidFill>
+              <a:schemeClr val="accent6"/>
+            </a:solidFill>
+            <a:tailEnd type="triangle"/>
+          </a:ln>
+          <a:effectLst/>
+        </p:spPr>
+        <p:style>
+          <a:lnRef idx="2">
+            <a:schemeClr val="accent1"/>
+          </a:lnRef>
+          <a:fillRef idx="0">
+            <a:schemeClr val="accent1"/>
+          </a:fillRef>
+          <a:effectRef idx="1">
+            <a:schemeClr val="accent1"/>
+          </a:effectRef>
+          <a:fontRef idx="minor">
+            <a:schemeClr val="tx1"/>
+          </a:fontRef>
+        </p:style>
+      </p:cxnSp>
+    </p:spTree>
+    <p:extLst>
+      <p:ext uri="{BB962C8B-B14F-4D97-AF65-F5344CB8AC3E}">
+        <p14:creationId xmlns:p14="http://schemas.microsoft.com/office/powerpoint/2010/main" val="3457730704"/>
+      </p:ext>
+    </p:extLst>
+  </p:cSld>
+  <p:clrMapOvr>
+    <a:masterClrMapping/>
+  </p:clrMapOvr>
+</p:sld>
+</file>
+
+<file path=ppt/slides/slide16.xml><?xml version="1.0" encoding="utf-8"?>
+<p:sld xmlns:a="http://schemas.openxmlformats.org/drawingml/2006/main" xmlns:r="http://schemas.openxmlformats.org/officeDocument/2006/relationships" xmlns:p="http://schemas.openxmlformats.org/presentationml/2006/main">
+  <p:cSld>
+    <p:spTree>
+      <p:nvGrpSpPr>
+        <p:cNvPr id="1" name=""/>
+        <p:cNvGrpSpPr/>
+        <p:nvPr/>
+      </p:nvGrpSpPr>
+      <p:grpSpPr>
+        <a:xfrm>
+          <a:off x="0" y="0"/>
+          <a:ext cx="0" cy="0"/>
+          <a:chOff x="0" y="0"/>
+          <a:chExt cx="0" cy="0"/>
+        </a:xfrm>
+      </p:grpSpPr>
+      <p:sp>
+        <p:nvSpPr>
+          <p:cNvPr id="2" name="Title 1">
+            <a:extLst>
+              <a:ext uri="{FF2B5EF4-FFF2-40B4-BE49-F238E27FC236}">
+                <a16:creationId xmlns:a16="http://schemas.microsoft.com/office/drawing/2014/main" id="{58169065-201E-5F42-BB75-6EA30E0A8D38}"/>
+              </a:ext>
+            </a:extLst>
+          </p:cNvPr>
+          <p:cNvSpPr>
+            <a:spLocks noGrp="1"/>
+          </p:cNvSpPr>
+          <p:nvPr>
+            <p:ph type="title"/>
+          </p:nvPr>
+        </p:nvSpPr>
+        <p:spPr/>
+        <p:txBody>
+          <a:bodyPr/>
+          <a:lstStyle/>
+          <a:p>
+            <a:r>
+              <a:rPr lang="en-US" dirty="0"/>
+              <a:t>Mirror maker monitoring</a:t>
+            </a:r>
+            <a:endParaRPr dirty="0"/>
+          </a:p>
+        </p:txBody>
+      </p:sp>
+      <p:sp>
+        <p:nvSpPr>
+          <p:cNvPr id="4" name="Slide Number Placeholder 3">
+            <a:extLst>
+              <a:ext uri="{FF2B5EF4-FFF2-40B4-BE49-F238E27FC236}">
+                <a16:creationId xmlns:a16="http://schemas.microsoft.com/office/drawing/2014/main" id="{D461EF70-49A7-3F48-A6F1-90FB6453A640}"/>
+              </a:ext>
+            </a:extLst>
+          </p:cNvPr>
+          <p:cNvSpPr>
+            <a:spLocks noGrp="1"/>
+          </p:cNvSpPr>
+          <p:nvPr>
+            <p:ph type="sldNum" sz="quarter" idx="10"/>
+          </p:nvPr>
+        </p:nvSpPr>
+        <p:spPr/>
+        <p:txBody>
+          <a:bodyPr/>
+          <a:lstStyle/>
+          <a:p>
+            <a:fld id="{2F63A97E-D605-DC42-8452-C14CD1FA87FA}" type="slidenum">
+              <a:rPr lang="en-US" smtClean="0">
+                <a:solidFill>
+                  <a:srgbClr val="5AAAFA"/>
+                </a:solidFill>
+              </a:rPr>
+              <a:pPr/>
+              <a:t>16</a:t>
             </a:fld>
             <a:endParaRPr lang="en-US">
               <a:solidFill>

</xml_diff>

<commit_message>
Deployed db9725e with MkDocs version: 1.0.4
</commit_message>
<xml_diff>
--- a/mm2-diagrams.pptx
+++ b/mm2-diagrams.pptx
@@ -230,7 +230,7 @@
           <a:p>
             <a:fld id="{43B1B1F9-D0CB-FF4D-BEE0-BED1F1FDA196}" type="datetimeFigureOut">
               <a:rPr lang="en-US" smtClean="0"/>
-              <a:t>4/9/20</a:t>
+              <a:t>4/10/20</a:t>
             </a:fld>
             <a:endParaRPr lang="en-US"/>
           </a:p>
@@ -395,7 +395,7 @@
           <a:p>
             <a:fld id="{26BE012A-D992-5D42-B86E-AA2BC0764EE1}" type="datetimeFigureOut">
               <a:rPr lang="en-US" smtClean="0"/>
-              <a:t>4/9/20</a:t>
+              <a:t>4/10/20</a:t>
             </a:fld>
             <a:endParaRPr lang="en-US"/>
           </a:p>
@@ -3314,14 +3314,14 @@
           </a:ln>
           <a:extLst>
             <a:ext uri="{909E8E84-426E-40dd-AFC4-6F175D3DCCD1}">
-              <a14:hiddenFill xmlns:a14="http://schemas.microsoft.com/office/drawing/2010/main" xmlns="">
+              <a14:hiddenFill xmlns="" xmlns:a14="http://schemas.microsoft.com/office/drawing/2010/main">
                 <a:solidFill>
                   <a:srgbClr val="FFFFFF"/>
                 </a:solidFill>
               </a14:hiddenFill>
             </a:ext>
             <a:ext uri="{91240B29-F687-4f45-9708-019B960494DF}">
-              <a14:hiddenLine xmlns:a14="http://schemas.microsoft.com/office/drawing/2010/main" xmlns="" w="9525">
+              <a14:hiddenLine xmlns="" xmlns:a14="http://schemas.microsoft.com/office/drawing/2010/main" w="9525">
                 <a:solidFill>
                   <a:srgbClr val="000000"/>
                 </a:solidFill>
@@ -3373,14 +3373,14 @@
           <a:effectLst/>
           <a:extLst>
             <a:ext uri="{909E8E84-426E-40dd-AFC4-6F175D3DCCD1}">
-              <a14:hiddenFill xmlns:a14="http://schemas.microsoft.com/office/drawing/2010/main" xmlns="">
+              <a14:hiddenFill xmlns="" xmlns:a14="http://schemas.microsoft.com/office/drawing/2010/main">
                 <a:solidFill>
                   <a:schemeClr val="accent1"/>
                 </a:solidFill>
               </a14:hiddenFill>
             </a:ext>
             <a:ext uri="{91240B29-F687-4f45-9708-019B960494DF}">
-              <a14:hiddenLine xmlns:a14="http://schemas.microsoft.com/office/drawing/2010/main" xmlns="" w="9525">
+              <a14:hiddenLine xmlns="" xmlns:a14="http://schemas.microsoft.com/office/drawing/2010/main" w="9525">
                 <a:solidFill>
                   <a:schemeClr val="tx1"/>
                 </a:solidFill>
@@ -3390,7 +3390,7 @@
               </a14:hiddenLine>
             </a:ext>
             <a:ext uri="{AF507438-7753-43e0-B8FC-AC1667EBCBE1}">
-              <a14:hiddenEffects xmlns:a14="http://schemas.microsoft.com/office/drawing/2010/main" xmlns="">
+              <a14:hiddenEffects xmlns="" xmlns:a14="http://schemas.microsoft.com/office/drawing/2010/main">
                 <a:effectLst>
                   <a:outerShdw blurRad="63500" dist="38099" dir="2700000" algn="ctr" rotWithShape="0">
                     <a:schemeClr val="bg2">
@@ -4106,10 +4106,10 @@
           </a:ln>
           <a:extLst>
             <a:ext uri="{FAA26D3D-D897-4be2-8F04-BA451C77F1D7}">
-              <ma14:placeholderFlag xmlns="" xmlns:ma14="http://schemas.microsoft.com/office/mac/drawingml/2011/main" val="1"/>
+              <ma14:placeholderFlag xmlns:ma14="http://schemas.microsoft.com/office/mac/drawingml/2011/main" xmlns="" val="1"/>
             </a:ext>
             <a:ext uri="{909E8E84-426E-40dd-AFC4-6F175D3DCCD1}">
-              <a14:hiddenFill xmlns="" xmlns:a14="http://schemas.microsoft.com/office/drawing/2010/main">
+              <a14:hiddenFill xmlns:a14="http://schemas.microsoft.com/office/drawing/2010/main" xmlns="">
                 <a:solidFill>
                   <a:srgbClr val="FFFFFF"/>
                 </a:solidFill>
@@ -4160,10 +4160,10 @@
           </a:ln>
           <a:extLst>
             <a:ext uri="{FAA26D3D-D897-4be2-8F04-BA451C77F1D7}">
-              <ma14:placeholderFlag xmlns="" xmlns:ma14="http://schemas.microsoft.com/office/mac/drawingml/2011/main" val="1"/>
+              <ma14:placeholderFlag xmlns:ma14="http://schemas.microsoft.com/office/mac/drawingml/2011/main" xmlns="" val="1"/>
             </a:ext>
             <a:ext uri="{909E8E84-426E-40dd-AFC4-6F175D3DCCD1}">
-              <a14:hiddenFill xmlns="" xmlns:a14="http://schemas.microsoft.com/office/drawing/2010/main">
+              <a14:hiddenFill xmlns:a14="http://schemas.microsoft.com/office/drawing/2010/main" xmlns="">
                 <a:solidFill>
                   <a:srgbClr val="FFFFFF"/>
                 </a:solidFill>
@@ -18807,12 +18807,12 @@
           <a:lstStyle/>
           <a:p>
             <a:r>
-              <a:rPr lang="en-US" sz="900">
+              <a:rPr lang="en-US" sz="900" dirty="0">
                 <a:latin typeface="Menlo" panose="020B0609030804020204" pitchFamily="49" charset="0"/>
               </a:rPr>
               <a:t>orders</a:t>
             </a:r>
-            <a:endParaRPr lang="en-US" sz="900">
+            <a:endParaRPr lang="en-US" sz="900" dirty="0">
               <a:effectLst/>
               <a:latin typeface="Menlo" panose="020B0609030804020204" pitchFamily="49" charset="0"/>
             </a:endParaRPr>
@@ -18876,7 +18876,7 @@
         <p:spPr>
           <a:xfrm>
             <a:off x="1293483" y="812956"/>
-            <a:ext cx="1136158" cy="336180"/>
+            <a:ext cx="1128274" cy="464598"/>
           </a:xfrm>
           <a:prstGeom prst="rect">
             <a:avLst/>
@@ -18925,7 +18925,7 @@
                 </a:solidFill>
                 <a:latin typeface="Arial"/>
               </a:rPr>
-              <a:t>Mirror Source Task</a:t>
+              <a:t>Mirror Source Task, Kafka Producer</a:t>
             </a:r>
           </a:p>
         </p:txBody>
@@ -18945,9 +18945,9 @@
           <p:nvPr/>
         </p:nvCxnSpPr>
         <p:spPr>
-          <a:xfrm flipH="1">
-            <a:off x="1845793" y="1871056"/>
-            <a:ext cx="1" cy="1572515"/>
+          <a:xfrm>
+            <a:off x="1845795" y="1871056"/>
+            <a:ext cx="7884" cy="1259143"/>
           </a:xfrm>
           <a:prstGeom prst="line">
             <a:avLst/>
@@ -18974,75 +18974,6 @@
           </a:fontRef>
         </p:style>
       </p:cxnSp>
-      <p:sp>
-        <p:nvSpPr>
-          <p:cNvPr id="53" name="Rectangle 52">
-            <a:extLst>
-              <a:ext uri="{FF2B5EF4-FFF2-40B4-BE49-F238E27FC236}">
-                <a16:creationId xmlns:a16="http://schemas.microsoft.com/office/drawing/2014/main" id="{A56E5990-A282-E043-8A05-20A7D7C1101F}"/>
-              </a:ext>
-            </a:extLst>
-          </p:cNvPr>
-          <p:cNvSpPr/>
-          <p:nvPr/>
-        </p:nvSpPr>
-        <p:spPr>
-          <a:xfrm>
-            <a:off x="2692792" y="812956"/>
-            <a:ext cx="1136158" cy="336180"/>
-          </a:xfrm>
-          <a:prstGeom prst="rect">
-            <a:avLst/>
-          </a:prstGeom>
-          <a:solidFill>
-            <a:srgbClr val="FCEBB8"/>
-          </a:solidFill>
-          <a:ln>
-            <a:noFill/>
-          </a:ln>
-        </p:spPr>
-        <p:style>
-          <a:lnRef idx="2">
-            <a:schemeClr val="accent1">
-              <a:shade val="50000"/>
-            </a:schemeClr>
-          </a:lnRef>
-          <a:fillRef idx="1">
-            <a:schemeClr val="accent1"/>
-          </a:fillRef>
-          <a:effectRef idx="0">
-            <a:schemeClr val="accent1"/>
-          </a:effectRef>
-          <a:fontRef idx="minor">
-            <a:schemeClr val="lt1"/>
-          </a:fontRef>
-        </p:style>
-        <p:txBody>
-          <a:bodyPr rtlCol="0" anchor="t"/>
-          <a:lstStyle/>
-          <a:p>
-            <a:pPr algn="ctr" eaLnBrk="0" fontAlgn="base" hangingPunct="0">
-              <a:spcBef>
-                <a:spcPct val="0"/>
-              </a:spcBef>
-              <a:spcAft>
-                <a:spcPct val="0"/>
-              </a:spcAft>
-            </a:pPr>
-            <a:r>
-              <a:rPr lang="en-US" sz="900" b="1" dirty="0">
-                <a:solidFill>
-                  <a:srgbClr val="325C80">
-                    <a:lumMod val="50000"/>
-                  </a:srgbClr>
-                </a:solidFill>
-                <a:latin typeface="Arial"/>
-              </a:rPr>
-              <a:t>Mirror Sink Task</a:t>
-            </a:r>
-          </a:p>
-        </p:txBody>
-      </p:sp>
       <p:grpSp>
         <p:nvGrpSpPr>
           <p:cNvPr id="54" name="Group 53">
@@ -19674,139 +19605,6 @@
       </p:cxnSp>
       <p:cxnSp>
         <p:nvCxnSpPr>
-          <p:cNvPr id="66" name="Straight Connector 65">
-            <a:extLst>
-              <a:ext uri="{FF2B5EF4-FFF2-40B4-BE49-F238E27FC236}">
-                <a16:creationId xmlns:a16="http://schemas.microsoft.com/office/drawing/2014/main" id="{E579B518-0C74-EB4B-914D-926DCEA62A71}"/>
-              </a:ext>
-            </a:extLst>
-          </p:cNvPr>
-          <p:cNvCxnSpPr/>
-          <p:nvPr/>
-        </p:nvCxnSpPr>
-        <p:spPr>
-          <a:xfrm flipH="1">
-            <a:off x="3245103" y="1149136"/>
-            <a:ext cx="15768" cy="2796341"/>
-          </a:xfrm>
-          <a:prstGeom prst="line">
-            <a:avLst/>
-          </a:prstGeom>
-          <a:ln>
-            <a:solidFill>
-              <a:srgbClr val="C00000"/>
-            </a:solidFill>
-          </a:ln>
-          <a:effectLst/>
-        </p:spPr>
-        <p:style>
-          <a:lnRef idx="2">
-            <a:schemeClr val="accent1"/>
-          </a:lnRef>
-          <a:fillRef idx="0">
-            <a:schemeClr val="accent1"/>
-          </a:fillRef>
-          <a:effectRef idx="1">
-            <a:schemeClr val="accent1"/>
-          </a:effectRef>
-          <a:fontRef idx="minor">
-            <a:schemeClr val="tx1"/>
-          </a:fontRef>
-        </p:style>
-      </p:cxnSp>
-      <p:cxnSp>
-        <p:nvCxnSpPr>
-          <p:cNvPr id="67" name="Straight Connector 66">
-            <a:extLst>
-              <a:ext uri="{FF2B5EF4-FFF2-40B4-BE49-F238E27FC236}">
-                <a16:creationId xmlns:a16="http://schemas.microsoft.com/office/drawing/2014/main" id="{CCCD17CF-1F1B-1E42-8D70-8DC415243C94}"/>
-              </a:ext>
-            </a:extLst>
-          </p:cNvPr>
-          <p:cNvCxnSpPr>
-            <a:cxnSpLocks/>
-          </p:cNvCxnSpPr>
-          <p:nvPr/>
-        </p:nvCxnSpPr>
-        <p:spPr>
-          <a:xfrm>
-            <a:off x="3245103" y="1878856"/>
-            <a:ext cx="0" cy="1496340"/>
-          </a:xfrm>
-          <a:prstGeom prst="line">
-            <a:avLst/>
-          </a:prstGeom>
-          <a:ln w="57150">
-            <a:solidFill>
-              <a:srgbClr val="C00000"/>
-            </a:solidFill>
-          </a:ln>
-          <a:effectLst/>
-        </p:spPr>
-        <p:style>
-          <a:lnRef idx="2">
-            <a:schemeClr val="accent1"/>
-          </a:lnRef>
-          <a:fillRef idx="0">
-            <a:schemeClr val="accent1"/>
-          </a:fillRef>
-          <a:effectRef idx="1">
-            <a:schemeClr val="accent1"/>
-          </a:effectRef>
-          <a:fontRef idx="minor">
-            <a:schemeClr val="tx1"/>
-          </a:fontRef>
-        </p:style>
-      </p:cxnSp>
-      <p:cxnSp>
-        <p:nvCxnSpPr>
-          <p:cNvPr id="69" name="Elbow Connector 68">
-            <a:extLst>
-              <a:ext uri="{FF2B5EF4-FFF2-40B4-BE49-F238E27FC236}">
-                <a16:creationId xmlns:a16="http://schemas.microsoft.com/office/drawing/2014/main" id="{ED4BE080-310A-614E-A111-817ADA548323}"/>
-              </a:ext>
-            </a:extLst>
-          </p:cNvPr>
-          <p:cNvCxnSpPr>
-            <a:cxnSpLocks/>
-          </p:cNvCxnSpPr>
-          <p:nvPr/>
-        </p:nvCxnSpPr>
-        <p:spPr>
-          <a:xfrm>
-            <a:off x="1861562" y="2052125"/>
-            <a:ext cx="1367776" cy="12700"/>
-          </a:xfrm>
-          <a:prstGeom prst="bentConnector3">
-            <a:avLst>
-              <a:gd name="adj1" fmla="val 50000"/>
-            </a:avLst>
-          </a:prstGeom>
-          <a:ln w="12700">
-            <a:solidFill>
-              <a:schemeClr val="accent6"/>
-            </a:solidFill>
-            <a:tailEnd type="triangle"/>
-          </a:ln>
-          <a:effectLst/>
-        </p:spPr>
-        <p:style>
-          <a:lnRef idx="2">
-            <a:schemeClr val="accent1"/>
-          </a:lnRef>
-          <a:fillRef idx="0">
-            <a:schemeClr val="accent1"/>
-          </a:fillRef>
-          <a:effectRef idx="1">
-            <a:schemeClr val="accent1"/>
-          </a:effectRef>
-          <a:fontRef idx="minor">
-            <a:schemeClr val="tx1"/>
-          </a:fontRef>
-        </p:style>
-      </p:cxnSp>
-      <p:cxnSp>
-        <p:nvCxnSpPr>
           <p:cNvPr id="72" name="Elbow Connector 71">
             <a:extLst>
               <a:ext uri="{FF2B5EF4-FFF2-40B4-BE49-F238E27FC236}">
@@ -19822,8 +19620,8 @@
         </p:nvCxnSpPr>
         <p:spPr>
           <a:xfrm>
-            <a:off x="3272220" y="4180738"/>
-            <a:ext cx="2656987" cy="164702"/>
+            <a:off x="1853678" y="4084014"/>
+            <a:ext cx="4075529" cy="261426"/>
           </a:xfrm>
           <a:prstGeom prst="bentConnector2">
             <a:avLst/>
@@ -20788,8 +20586,8 @@
         </p:nvCxnSpPr>
         <p:spPr>
           <a:xfrm>
-            <a:off x="3276636" y="2428089"/>
-            <a:ext cx="1982020" cy="674496"/>
+            <a:off x="1888357" y="2305798"/>
+            <a:ext cx="3370299" cy="796787"/>
           </a:xfrm>
           <a:prstGeom prst="bentConnector3">
             <a:avLst>
@@ -20836,8 +20634,8 @@
         </p:nvCxnSpPr>
         <p:spPr>
           <a:xfrm>
-            <a:off x="3228544" y="2837702"/>
-            <a:ext cx="2030112" cy="777196"/>
+            <a:off x="1880339" y="2513591"/>
+            <a:ext cx="3378317" cy="1101307"/>
           </a:xfrm>
           <a:prstGeom prst="bentConnector3">
             <a:avLst>
@@ -20883,8 +20681,8 @@
         </p:nvCxnSpPr>
         <p:spPr>
           <a:xfrm rot="10800000" flipV="1">
-            <a:off x="1845794" y="3196141"/>
-            <a:ext cx="1375185" cy="137276"/>
+            <a:off x="1861562" y="2704789"/>
+            <a:ext cx="2737160" cy="252252"/>
           </a:xfrm>
           <a:prstGeom prst="bentConnector3">
             <a:avLst>
@@ -20928,7 +20726,7 @@
         </p:nvSpPr>
         <p:spPr>
           <a:xfrm>
-            <a:off x="426007" y="3384065"/>
+            <a:off x="403078" y="3136922"/>
             <a:ext cx="1356462" cy="230832"/>
           </a:xfrm>
           <a:prstGeom prst="rect">
@@ -20968,7 +20766,7 @@
         </p:nvSpPr>
         <p:spPr>
           <a:xfrm rot="2870975">
-            <a:off x="1613187" y="3221918"/>
+            <a:off x="1613187" y="2972537"/>
             <a:ext cx="444736" cy="444736"/>
           </a:xfrm>
           <a:prstGeom prst="plus">
@@ -22368,13 +22166,14 @@
           </p:cNvPr>
           <p:cNvCxnSpPr>
             <a:cxnSpLocks/>
+            <a:endCxn id="62" idx="0"/>
           </p:cNvCxnSpPr>
           <p:nvPr/>
         </p:nvCxnSpPr>
         <p:spPr>
           <a:xfrm>
-            <a:off x="3272220" y="2171633"/>
-            <a:ext cx="2552903" cy="127765"/>
+            <a:off x="1880339" y="2042942"/>
+            <a:ext cx="3949200" cy="301224"/>
           </a:xfrm>
           <a:prstGeom prst="bentConnector2">
             <a:avLst/>
@@ -22402,97 +22201,106 @@
           </a:fontRef>
         </p:style>
       </p:cxnSp>
-      <p:cxnSp>
-        <p:nvCxnSpPr>
-          <p:cNvPr id="133" name="Straight Connector 132">
-            <a:extLst>
-              <a:ext uri="{FF2B5EF4-FFF2-40B4-BE49-F238E27FC236}">
-                <a16:creationId xmlns:a16="http://schemas.microsoft.com/office/drawing/2014/main" id="{8E9B3159-F758-664B-8142-412F9E31B877}"/>
-              </a:ext>
-            </a:extLst>
-          </p:cNvPr>
-          <p:cNvCxnSpPr>
-            <a:cxnSpLocks/>
-          </p:cNvCxnSpPr>
-          <p:nvPr/>
-        </p:nvCxnSpPr>
-        <p:spPr>
-          <a:xfrm flipH="1">
-            <a:off x="3245103" y="3723396"/>
-            <a:ext cx="7884" cy="1067755"/>
-          </a:xfrm>
-          <a:prstGeom prst="line">
-            <a:avLst/>
-          </a:prstGeom>
-          <a:ln w="57150">
-            <a:solidFill>
-              <a:srgbClr val="C00000"/>
-            </a:solidFill>
-          </a:ln>
-          <a:effectLst/>
-        </p:spPr>
-        <p:style>
-          <a:lnRef idx="2">
-            <a:schemeClr val="accent1"/>
-          </a:lnRef>
-          <a:fillRef idx="0">
-            <a:schemeClr val="accent1"/>
-          </a:fillRef>
-          <a:effectRef idx="1">
-            <a:schemeClr val="accent1"/>
-          </a:effectRef>
-          <a:fontRef idx="minor">
-            <a:schemeClr val="tx1"/>
-          </a:fontRef>
-        </p:style>
-      </p:cxnSp>
-      <p:cxnSp>
-        <p:nvCxnSpPr>
-          <p:cNvPr id="136" name="Elbow Connector 135">
-            <a:extLst>
-              <a:ext uri="{FF2B5EF4-FFF2-40B4-BE49-F238E27FC236}">
-                <a16:creationId xmlns:a16="http://schemas.microsoft.com/office/drawing/2014/main" id="{AB1D386B-1A82-E64B-B234-114D7B5EA894}"/>
-              </a:ext>
-            </a:extLst>
-          </p:cNvPr>
-          <p:cNvCxnSpPr>
-            <a:cxnSpLocks/>
-          </p:cNvCxnSpPr>
-          <p:nvPr/>
-        </p:nvCxnSpPr>
-        <p:spPr>
-          <a:xfrm>
-            <a:off x="1839551" y="4058563"/>
-            <a:ext cx="1367776" cy="12700"/>
-          </a:xfrm>
-          <a:prstGeom prst="bentConnector3">
+      <p:sp>
+        <p:nvSpPr>
+          <p:cNvPr id="75" name="AutoShape 4">
+            <a:extLst>
+              <a:ext uri="{FF2B5EF4-FFF2-40B4-BE49-F238E27FC236}">
+                <a16:creationId xmlns:a16="http://schemas.microsoft.com/office/drawing/2014/main" id="{2BCE90B9-9E13-AA47-9B18-B14EB432C62B}"/>
+              </a:ext>
+            </a:extLst>
+          </p:cNvPr>
+          <p:cNvSpPr>
+            <a:spLocks noChangeArrowheads="1"/>
+          </p:cNvSpPr>
+          <p:nvPr/>
+        </p:nvSpPr>
+        <p:spPr bwMode="auto">
+          <a:xfrm>
+            <a:off x="4617497" y="1142445"/>
+            <a:ext cx="2603466" cy="3680379"/>
+          </a:xfrm>
+          <a:prstGeom prst="roundRect">
             <a:avLst>
-              <a:gd name="adj1" fmla="val 50000"/>
+              <a:gd name="adj" fmla="val 7117"/>
             </a:avLst>
           </a:prstGeom>
+          <a:noFill/>
           <a:ln w="12700">
             <a:solidFill>
-              <a:schemeClr val="accent6"/>
+              <a:schemeClr val="accent3"/>
             </a:solidFill>
-            <a:tailEnd type="triangle"/>
+            <a:prstDash val="dash"/>
+            <a:round/>
+            <a:headEnd/>
+            <a:tailEnd/>
           </a:ln>
-          <a:effectLst/>
-        </p:spPr>
-        <p:style>
-          <a:lnRef idx="2">
-            <a:schemeClr val="accent1"/>
-          </a:lnRef>
-          <a:fillRef idx="0">
-            <a:schemeClr val="accent1"/>
-          </a:fillRef>
-          <a:effectRef idx="1">
-            <a:schemeClr val="accent1"/>
-          </a:effectRef>
-          <a:fontRef idx="minor">
-            <a:schemeClr val="tx1"/>
-          </a:fontRef>
-        </p:style>
-      </p:cxnSp>
+        </p:spPr>
+        <p:txBody>
+          <a:bodyPr lIns="0" tIns="0" rIns="0" bIns="0" anchor="t" anchorCtr="1"/>
+          <a:lstStyle/>
+          <a:p>
+            <a:pPr algn="ctr" eaLnBrk="0" fontAlgn="base" hangingPunct="0">
+              <a:spcBef>
+                <a:spcPct val="0"/>
+              </a:spcBef>
+              <a:spcAft>
+                <a:spcPct val="0"/>
+              </a:spcAft>
+            </a:pPr>
+            <a:r>
+              <a:rPr lang="en-US" sz="750" dirty="0">
+                <a:solidFill>
+                  <a:srgbClr val="6D7777"/>
+                </a:solidFill>
+                <a:latin typeface="Arial" panose="020B0604020202020204" pitchFamily="34" charset="0"/>
+                <a:cs typeface="Arial" panose="020B0604020202020204" pitchFamily="34" charset="0"/>
+              </a:rPr>
+              <a:t>Kafka  Target Cluster</a:t>
+            </a:r>
+          </a:p>
+        </p:txBody>
+      </p:sp>
+      <p:sp>
+        <p:nvSpPr>
+          <p:cNvPr id="90" name="Rectangle 89">
+            <a:extLst>
+              <a:ext uri="{FF2B5EF4-FFF2-40B4-BE49-F238E27FC236}">
+                <a16:creationId xmlns:a16="http://schemas.microsoft.com/office/drawing/2014/main" id="{533214EA-D78B-C740-9798-59664B886375}"/>
+              </a:ext>
+            </a:extLst>
+          </p:cNvPr>
+          <p:cNvSpPr/>
+          <p:nvPr/>
+        </p:nvSpPr>
+        <p:spPr>
+          <a:xfrm>
+            <a:off x="4044551" y="2484906"/>
+            <a:ext cx="460382" cy="230832"/>
+          </a:xfrm>
+          <a:prstGeom prst="rect">
+            <a:avLst/>
+          </a:prstGeom>
+        </p:spPr>
+        <p:txBody>
+          <a:bodyPr wrap="none">
+            <a:spAutoFit/>
+          </a:bodyPr>
+          <a:lstStyle/>
+          <a:p>
+            <a:r>
+              <a:rPr lang="en-US" sz="900" dirty="0">
+                <a:latin typeface="Menlo" panose="020B0609030804020204" pitchFamily="49" charset="0"/>
+              </a:rPr>
+              <a:t>acks</a:t>
+            </a:r>
+            <a:endParaRPr lang="en-US" sz="900" dirty="0">
+              <a:effectLst/>
+              <a:latin typeface="Menlo" panose="020B0609030804020204" pitchFamily="49" charset="0"/>
+            </a:endParaRPr>
+          </a:p>
+        </p:txBody>
+      </p:sp>
     </p:spTree>
     <p:extLst>
       <p:ext uri="{BB962C8B-B14F-4D97-AF65-F5344CB8AC3E}">

</xml_diff>

<commit_message>
Deployed 509aff3 with MkDocs version: 1.0.4
</commit_message>
<xml_diff>
--- a/mm2-diagrams.pptx
+++ b/mm2-diagrams.pptx
@@ -6,10 +6,10 @@
     <p:sldMasterId id="2147483943" r:id="rId2"/>
   </p:sldMasterIdLst>
   <p:notesMasterIdLst>
-    <p:notesMasterId r:id="rId19"/>
+    <p:notesMasterId r:id="rId20"/>
   </p:notesMasterIdLst>
   <p:handoutMasterIdLst>
-    <p:handoutMasterId r:id="rId20"/>
+    <p:handoutMasterId r:id="rId21"/>
   </p:handoutMasterIdLst>
   <p:sldIdLst>
     <p:sldId id="141169016" r:id="rId3"/>
@@ -27,7 +27,8 @@
     <p:sldId id="141169021" r:id="rId15"/>
     <p:sldId id="141169022" r:id="rId16"/>
     <p:sldId id="141169023" r:id="rId17"/>
-    <p:sldId id="141169017" r:id="rId18"/>
+    <p:sldId id="141169024" r:id="rId18"/>
+    <p:sldId id="141169017" r:id="rId19"/>
   </p:sldIdLst>
   <p:sldSz cx="9144000" cy="5143500" type="screen16x9"/>
   <p:notesSz cx="6858000" cy="9144000"/>
@@ -3314,14 +3315,14 @@
           </a:ln>
           <a:extLst>
             <a:ext uri="{909E8E84-426E-40dd-AFC4-6F175D3DCCD1}">
-              <a14:hiddenFill xmlns="" xmlns:a14="http://schemas.microsoft.com/office/drawing/2010/main">
+              <a14:hiddenFill xmlns:a14="http://schemas.microsoft.com/office/drawing/2010/main" xmlns="">
                 <a:solidFill>
                   <a:srgbClr val="FFFFFF"/>
                 </a:solidFill>
               </a14:hiddenFill>
             </a:ext>
             <a:ext uri="{91240B29-F687-4f45-9708-019B960494DF}">
-              <a14:hiddenLine xmlns="" xmlns:a14="http://schemas.microsoft.com/office/drawing/2010/main" w="9525">
+              <a14:hiddenLine xmlns:a14="http://schemas.microsoft.com/office/drawing/2010/main" xmlns="" w="9525">
                 <a:solidFill>
                   <a:srgbClr val="000000"/>
                 </a:solidFill>
@@ -3373,14 +3374,14 @@
           <a:effectLst/>
           <a:extLst>
             <a:ext uri="{909E8E84-426E-40dd-AFC4-6F175D3DCCD1}">
-              <a14:hiddenFill xmlns="" xmlns:a14="http://schemas.microsoft.com/office/drawing/2010/main">
+              <a14:hiddenFill xmlns:a14="http://schemas.microsoft.com/office/drawing/2010/main" xmlns="">
                 <a:solidFill>
                   <a:schemeClr val="accent1"/>
                 </a:solidFill>
               </a14:hiddenFill>
             </a:ext>
             <a:ext uri="{91240B29-F687-4f45-9708-019B960494DF}">
-              <a14:hiddenLine xmlns="" xmlns:a14="http://schemas.microsoft.com/office/drawing/2010/main" w="9525">
+              <a14:hiddenLine xmlns:a14="http://schemas.microsoft.com/office/drawing/2010/main" xmlns="" w="9525">
                 <a:solidFill>
                   <a:schemeClr val="tx1"/>
                 </a:solidFill>
@@ -3390,7 +3391,7 @@
               </a14:hiddenLine>
             </a:ext>
             <a:ext uri="{AF507438-7753-43e0-B8FC-AC1667EBCBE1}">
-              <a14:hiddenEffects xmlns="" xmlns:a14="http://schemas.microsoft.com/office/drawing/2010/main">
+              <a14:hiddenEffects xmlns:a14="http://schemas.microsoft.com/office/drawing/2010/main" xmlns="">
                 <a:effectLst>
                   <a:outerShdw blurRad="63500" dist="38099" dir="2700000" algn="ctr" rotWithShape="0">
                     <a:schemeClr val="bg2">
@@ -4106,10 +4107,10 @@
           </a:ln>
           <a:extLst>
             <a:ext uri="{FAA26D3D-D897-4be2-8F04-BA451C77F1D7}">
-              <ma14:placeholderFlag xmlns:ma14="http://schemas.microsoft.com/office/mac/drawingml/2011/main" xmlns="" val="1"/>
+              <ma14:placeholderFlag xmlns="" xmlns:ma14="http://schemas.microsoft.com/office/mac/drawingml/2011/main" val="1"/>
             </a:ext>
             <a:ext uri="{909E8E84-426E-40dd-AFC4-6F175D3DCCD1}">
-              <a14:hiddenFill xmlns:a14="http://schemas.microsoft.com/office/drawing/2010/main" xmlns="">
+              <a14:hiddenFill xmlns="" xmlns:a14="http://schemas.microsoft.com/office/drawing/2010/main">
                 <a:solidFill>
                   <a:srgbClr val="FFFFFF"/>
                 </a:solidFill>
@@ -4160,10 +4161,10 @@
           </a:ln>
           <a:extLst>
             <a:ext uri="{FAA26D3D-D897-4be2-8F04-BA451C77F1D7}">
-              <ma14:placeholderFlag xmlns:ma14="http://schemas.microsoft.com/office/mac/drawingml/2011/main" xmlns="" val="1"/>
+              <ma14:placeholderFlag xmlns="" xmlns:ma14="http://schemas.microsoft.com/office/mac/drawingml/2011/main" val="1"/>
             </a:ext>
             <a:ext uri="{909E8E84-426E-40dd-AFC4-6F175D3DCCD1}">
-              <a14:hiddenFill xmlns:a14="http://schemas.microsoft.com/office/drawing/2010/main" xmlns="">
+              <a14:hiddenFill xmlns="" xmlns:a14="http://schemas.microsoft.com/office/drawing/2010/main">
                 <a:solidFill>
                   <a:srgbClr val="FFFFFF"/>
                 </a:solidFill>
@@ -22336,7 +22337,7 @@
           <p:cNvPr id="2" name="Title 1">
             <a:extLst>
               <a:ext uri="{FF2B5EF4-FFF2-40B4-BE49-F238E27FC236}">
-                <a16:creationId xmlns:a16="http://schemas.microsoft.com/office/drawing/2014/main" id="{58169065-201E-5F42-BB75-6EA30E0A8D38}"/>
+                <a16:creationId xmlns:a16="http://schemas.microsoft.com/office/drawing/2014/main" id="{7839F556-B1EC-FB41-AB2A-4BEC5CC26A58}"/>
               </a:ext>
             </a:extLst>
           </p:cNvPr>
@@ -22354,7 +22355,7 @@
           <a:p>
             <a:r>
               <a:rPr lang="en-US" dirty="0"/>
-              <a:t>Mirror maker monitoring</a:t>
+              <a:t>k8s resources</a:t>
             </a:r>
             <a:endParaRPr dirty="0"/>
           </a:p>
@@ -22365,7 +22366,7 @@
           <p:cNvPr id="4" name="Slide Number Placeholder 3">
             <a:extLst>
               <a:ext uri="{FF2B5EF4-FFF2-40B4-BE49-F238E27FC236}">
-                <a16:creationId xmlns:a16="http://schemas.microsoft.com/office/drawing/2014/main" id="{D461EF70-49A7-3F48-A6F1-90FB6453A640}"/>
+                <a16:creationId xmlns:a16="http://schemas.microsoft.com/office/drawing/2014/main" id="{5AD82EF3-B5C9-624B-91F5-60C84E98CA66}"/>
               </a:ext>
             </a:extLst>
           </p:cNvPr>
@@ -22389,6 +22390,1244 @@
               </a:rPr>
               <a:pPr/>
               <a:t>16</a:t>
+            </a:fld>
+            <a:endParaRPr lang="en-US">
+              <a:solidFill>
+                <a:srgbClr val="5AAAFA"/>
+              </a:solidFill>
+            </a:endParaRPr>
+          </a:p>
+        </p:txBody>
+      </p:sp>
+      <p:sp>
+        <p:nvSpPr>
+          <p:cNvPr id="5" name="TextBox 4">
+            <a:extLst>
+              <a:ext uri="{FF2B5EF4-FFF2-40B4-BE49-F238E27FC236}">
+                <a16:creationId xmlns:a16="http://schemas.microsoft.com/office/drawing/2014/main" id="{0D175810-9449-6449-A6FE-3248C8047A2A}"/>
+              </a:ext>
+            </a:extLst>
+          </p:cNvPr>
+          <p:cNvSpPr txBox="1"/>
+          <p:nvPr/>
+        </p:nvSpPr>
+        <p:spPr>
+          <a:xfrm>
+            <a:off x="159474" y="3459980"/>
+            <a:ext cx="2111475" cy="276999"/>
+          </a:xfrm>
+          <a:prstGeom prst="rect">
+            <a:avLst/>
+          </a:prstGeom>
+          <a:noFill/>
+        </p:spPr>
+        <p:txBody>
+          <a:bodyPr wrap="none" rtlCol="0">
+            <a:spAutoFit/>
+          </a:bodyPr>
+          <a:lstStyle/>
+          <a:p>
+            <a:r>
+              <a:rPr lang="en-US" sz="1200" dirty="0"/>
+              <a:t>prometheus-operator-strimzi</a:t>
+            </a:r>
+          </a:p>
+        </p:txBody>
+      </p:sp>
+      <p:sp>
+        <p:nvSpPr>
+          <p:cNvPr id="6" name="Rounded Rectangle 5">
+            <a:extLst>
+              <a:ext uri="{FF2B5EF4-FFF2-40B4-BE49-F238E27FC236}">
+                <a16:creationId xmlns:a16="http://schemas.microsoft.com/office/drawing/2014/main" id="{7E0F2BED-2A42-DE4D-AA6D-16FA4D70CCB1}"/>
+              </a:ext>
+            </a:extLst>
+          </p:cNvPr>
+          <p:cNvSpPr/>
+          <p:nvPr/>
+        </p:nvSpPr>
+        <p:spPr>
+          <a:xfrm>
+            <a:off x="124691" y="847580"/>
+            <a:ext cx="2715491" cy="274638"/>
+          </a:xfrm>
+          <a:prstGeom prst="roundRect">
+            <a:avLst/>
+          </a:prstGeom>
+          <a:ln>
+            <a:noFill/>
+          </a:ln>
+        </p:spPr>
+        <p:style>
+          <a:lnRef idx="2">
+            <a:schemeClr val="accent1">
+              <a:shade val="50000"/>
+            </a:schemeClr>
+          </a:lnRef>
+          <a:fillRef idx="1">
+            <a:schemeClr val="accent1"/>
+          </a:fillRef>
+          <a:effectRef idx="0">
+            <a:schemeClr val="accent1"/>
+          </a:effectRef>
+          <a:fontRef idx="minor">
+            <a:schemeClr val="lt1"/>
+          </a:fontRef>
+        </p:style>
+        <p:txBody>
+          <a:bodyPr rtlCol="0" anchor="t"/>
+          <a:lstStyle/>
+          <a:p>
+            <a:pPr marL="0" marR="0" indent="0" algn="l" defTabSz="685800" rtl="0" eaLnBrk="1" fontAlgn="auto" latinLnBrk="0" hangingPunct="1">
+              <a:lnSpc>
+                <a:spcPct val="100000"/>
+              </a:lnSpc>
+              <a:spcBef>
+                <a:spcPts val="0"/>
+              </a:spcBef>
+              <a:spcAft>
+                <a:spcPts val="0"/>
+              </a:spcAft>
+              <a:buClrTx/>
+              <a:buSzTx/>
+              <a:buFontTx/>
+              <a:buNone/>
+              <a:tabLst/>
+            </a:pPr>
+            <a:r>
+              <a:rPr kumimoji="0" lang="en-US" sz="1200" b="0" i="0" u="none" strike="noStrike" kern="1200" cap="none" spc="0" normalizeH="0" baseline="0" noProof="0" dirty="0">
+                <a:ln>
+                  <a:noFill/>
+                </a:ln>
+                <a:solidFill>
+                  <a:prstClr val="white"/>
+                </a:solidFill>
+                <a:effectLst/>
+                <a:uLnTx/>
+                <a:uFillTx/>
+                <a:latin typeface="Arial"/>
+                <a:ea typeface="+mn-ea"/>
+                <a:cs typeface="+mn-cs"/>
+              </a:rPr>
+              <a:t>Cluster Roles</a:t>
+            </a:r>
+            <a:endParaRPr kumimoji="0" sz="1200" b="0" i="0" u="none" strike="noStrike" kern="1200" cap="none" spc="0" normalizeH="0" baseline="0" noProof="0" dirty="0">
+              <a:ln>
+                <a:noFill/>
+              </a:ln>
+              <a:solidFill>
+                <a:prstClr val="white"/>
+              </a:solidFill>
+              <a:effectLst/>
+              <a:uLnTx/>
+              <a:uFillTx/>
+              <a:latin typeface="Arial"/>
+              <a:ea typeface="+mn-ea"/>
+              <a:cs typeface="+mn-cs"/>
+            </a:endParaRPr>
+          </a:p>
+        </p:txBody>
+      </p:sp>
+      <p:sp>
+        <p:nvSpPr>
+          <p:cNvPr id="7" name="Rounded Rectangle 6">
+            <a:extLst>
+              <a:ext uri="{FF2B5EF4-FFF2-40B4-BE49-F238E27FC236}">
+                <a16:creationId xmlns:a16="http://schemas.microsoft.com/office/drawing/2014/main" id="{25B4C4D3-1A20-F245-8B77-6BE5AC6C5D97}"/>
+              </a:ext>
+            </a:extLst>
+          </p:cNvPr>
+          <p:cNvSpPr/>
+          <p:nvPr/>
+        </p:nvSpPr>
+        <p:spPr>
+          <a:xfrm>
+            <a:off x="6222134" y="819870"/>
+            <a:ext cx="2715491" cy="274638"/>
+          </a:xfrm>
+          <a:prstGeom prst="roundRect">
+            <a:avLst/>
+          </a:prstGeom>
+          <a:ln>
+            <a:noFill/>
+          </a:ln>
+        </p:spPr>
+        <p:style>
+          <a:lnRef idx="2">
+            <a:schemeClr val="accent1">
+              <a:shade val="50000"/>
+            </a:schemeClr>
+          </a:lnRef>
+          <a:fillRef idx="1">
+            <a:schemeClr val="accent1"/>
+          </a:fillRef>
+          <a:effectRef idx="0">
+            <a:schemeClr val="accent1"/>
+          </a:effectRef>
+          <a:fontRef idx="minor">
+            <a:schemeClr val="lt1"/>
+          </a:fontRef>
+        </p:style>
+        <p:txBody>
+          <a:bodyPr rtlCol="0" anchor="t"/>
+          <a:lstStyle/>
+          <a:p>
+            <a:pPr marL="0" marR="0" indent="0" algn="l" defTabSz="685800" rtl="0" eaLnBrk="1" fontAlgn="auto" latinLnBrk="0" hangingPunct="1">
+              <a:lnSpc>
+                <a:spcPct val="100000"/>
+              </a:lnSpc>
+              <a:spcBef>
+                <a:spcPts val="0"/>
+              </a:spcBef>
+              <a:spcAft>
+                <a:spcPts val="0"/>
+              </a:spcAft>
+              <a:buClrTx/>
+              <a:buSzTx/>
+              <a:buFontTx/>
+              <a:buNone/>
+              <a:tabLst/>
+            </a:pPr>
+            <a:r>
+              <a:rPr kumimoji="0" lang="en-US" sz="1200" b="0" i="0" u="none" strike="noStrike" kern="1200" cap="none" spc="0" normalizeH="0" baseline="0" noProof="0" dirty="0">
+                <a:ln>
+                  <a:noFill/>
+                </a:ln>
+                <a:solidFill>
+                  <a:prstClr val="white"/>
+                </a:solidFill>
+                <a:effectLst/>
+                <a:uLnTx/>
+                <a:uFillTx/>
+                <a:latin typeface="Arial"/>
+                <a:ea typeface="+mn-ea"/>
+                <a:cs typeface="+mn-cs"/>
+              </a:rPr>
+              <a:t>Service Accounts</a:t>
+            </a:r>
+            <a:endParaRPr kumimoji="0" sz="1200" b="0" i="0" u="none" strike="noStrike" kern="1200" cap="none" spc="0" normalizeH="0" baseline="0" noProof="0" dirty="0">
+              <a:ln>
+                <a:noFill/>
+              </a:ln>
+              <a:solidFill>
+                <a:prstClr val="white"/>
+              </a:solidFill>
+              <a:effectLst/>
+              <a:uLnTx/>
+              <a:uFillTx/>
+              <a:latin typeface="Arial"/>
+              <a:ea typeface="+mn-ea"/>
+              <a:cs typeface="+mn-cs"/>
+            </a:endParaRPr>
+          </a:p>
+        </p:txBody>
+      </p:sp>
+      <p:sp>
+        <p:nvSpPr>
+          <p:cNvPr id="8" name="Rounded Rectangle 7">
+            <a:extLst>
+              <a:ext uri="{FF2B5EF4-FFF2-40B4-BE49-F238E27FC236}">
+                <a16:creationId xmlns:a16="http://schemas.microsoft.com/office/drawing/2014/main" id="{E492A07F-AF95-044B-8E6C-7F65AF88E652}"/>
+              </a:ext>
+            </a:extLst>
+          </p:cNvPr>
+          <p:cNvSpPr/>
+          <p:nvPr/>
+        </p:nvSpPr>
+        <p:spPr>
+          <a:xfrm>
+            <a:off x="3301075" y="819870"/>
+            <a:ext cx="2715491" cy="274638"/>
+          </a:xfrm>
+          <a:prstGeom prst="roundRect">
+            <a:avLst/>
+          </a:prstGeom>
+          <a:ln>
+            <a:noFill/>
+          </a:ln>
+        </p:spPr>
+        <p:style>
+          <a:lnRef idx="2">
+            <a:schemeClr val="accent1">
+              <a:shade val="50000"/>
+            </a:schemeClr>
+          </a:lnRef>
+          <a:fillRef idx="1">
+            <a:schemeClr val="accent1"/>
+          </a:fillRef>
+          <a:effectRef idx="0">
+            <a:schemeClr val="accent1"/>
+          </a:effectRef>
+          <a:fontRef idx="minor">
+            <a:schemeClr val="lt1"/>
+          </a:fontRef>
+        </p:style>
+        <p:txBody>
+          <a:bodyPr rtlCol="0" anchor="t"/>
+          <a:lstStyle/>
+          <a:p>
+            <a:pPr marL="0" marR="0" indent="0" algn="l" defTabSz="685800" rtl="0" eaLnBrk="1" fontAlgn="auto" latinLnBrk="0" hangingPunct="1">
+              <a:lnSpc>
+                <a:spcPct val="100000"/>
+              </a:lnSpc>
+              <a:spcBef>
+                <a:spcPts val="0"/>
+              </a:spcBef>
+              <a:spcAft>
+                <a:spcPts val="0"/>
+              </a:spcAft>
+              <a:buClrTx/>
+              <a:buSzTx/>
+              <a:buFontTx/>
+              <a:buNone/>
+              <a:tabLst/>
+            </a:pPr>
+            <a:r>
+              <a:rPr kumimoji="0" lang="en-US" sz="1200" b="0" i="0" u="none" strike="noStrike" kern="1200" cap="none" spc="0" normalizeH="0" baseline="0" noProof="0" dirty="0">
+                <a:ln>
+                  <a:noFill/>
+                </a:ln>
+                <a:solidFill>
+                  <a:prstClr val="white"/>
+                </a:solidFill>
+                <a:effectLst/>
+                <a:uLnTx/>
+                <a:uFillTx/>
+                <a:latin typeface="Arial"/>
+                <a:ea typeface="+mn-ea"/>
+                <a:cs typeface="+mn-cs"/>
+              </a:rPr>
+              <a:t>Cluster Roles Binding</a:t>
+            </a:r>
+            <a:endParaRPr kumimoji="0" sz="1200" b="0" i="0" u="none" strike="noStrike" kern="1200" cap="none" spc="0" normalizeH="0" baseline="0" noProof="0" dirty="0">
+              <a:ln>
+                <a:noFill/>
+              </a:ln>
+              <a:solidFill>
+                <a:prstClr val="white"/>
+              </a:solidFill>
+              <a:effectLst/>
+              <a:uLnTx/>
+              <a:uFillTx/>
+              <a:latin typeface="Arial"/>
+              <a:ea typeface="+mn-ea"/>
+              <a:cs typeface="+mn-cs"/>
+            </a:endParaRPr>
+          </a:p>
+        </p:txBody>
+      </p:sp>
+      <p:sp>
+        <p:nvSpPr>
+          <p:cNvPr id="9" name="Rectangle 8">
+            <a:extLst>
+              <a:ext uri="{FF2B5EF4-FFF2-40B4-BE49-F238E27FC236}">
+                <a16:creationId xmlns:a16="http://schemas.microsoft.com/office/drawing/2014/main" id="{6ED012EE-C9CF-3746-B7BC-52BB979AEF3A}"/>
+              </a:ext>
+            </a:extLst>
+          </p:cNvPr>
+          <p:cNvSpPr/>
+          <p:nvPr/>
+        </p:nvSpPr>
+        <p:spPr>
+          <a:xfrm>
+            <a:off x="3422066" y="3202808"/>
+            <a:ext cx="1962734" cy="253917"/>
+          </a:xfrm>
+          <a:prstGeom prst="rect">
+            <a:avLst/>
+          </a:prstGeom>
+        </p:spPr>
+        <p:txBody>
+          <a:bodyPr wrap="square">
+            <a:spAutoFit/>
+          </a:bodyPr>
+          <a:lstStyle/>
+          <a:p>
+            <a:r>
+              <a:rPr lang="en-US" sz="1050" dirty="0">
+                <a:solidFill>
+                  <a:srgbClr val="0000FF"/>
+                </a:solidFill>
+                <a:latin typeface="Menlo" panose="020B0609030804020204" pitchFamily="49" charset="0"/>
+              </a:rPr>
+              <a:t>prometheus-operator</a:t>
+            </a:r>
+          </a:p>
+        </p:txBody>
+      </p:sp>
+      <p:sp>
+        <p:nvSpPr>
+          <p:cNvPr id="10" name="Rectangle 9">
+            <a:extLst>
+              <a:ext uri="{FF2B5EF4-FFF2-40B4-BE49-F238E27FC236}">
+                <a16:creationId xmlns:a16="http://schemas.microsoft.com/office/drawing/2014/main" id="{45372050-31D0-654A-AF4E-19D71C6EDCA2}"/>
+              </a:ext>
+            </a:extLst>
+          </p:cNvPr>
+          <p:cNvSpPr/>
+          <p:nvPr/>
+        </p:nvSpPr>
+        <p:spPr>
+          <a:xfrm>
+            <a:off x="6737639" y="3200957"/>
+            <a:ext cx="2199986" cy="246221"/>
+          </a:xfrm>
+          <a:prstGeom prst="rect">
+            <a:avLst/>
+          </a:prstGeom>
+        </p:spPr>
+        <p:txBody>
+          <a:bodyPr wrap="square">
+            <a:spAutoFit/>
+          </a:bodyPr>
+          <a:lstStyle/>
+          <a:p>
+            <a:r>
+              <a:rPr lang="en-US" sz="1000" dirty="0">
+                <a:solidFill>
+                  <a:srgbClr val="953FDA"/>
+                </a:solidFill>
+                <a:latin typeface="Menlo" panose="020B0609030804020204" pitchFamily="49" charset="0"/>
+              </a:rPr>
+              <a:t>prometheus-operator </a:t>
+            </a:r>
+          </a:p>
+        </p:txBody>
+      </p:sp>
+      <p:cxnSp>
+        <p:nvCxnSpPr>
+          <p:cNvPr id="12" name="Curved Connector 11">
+            <a:extLst>
+              <a:ext uri="{FF2B5EF4-FFF2-40B4-BE49-F238E27FC236}">
+                <a16:creationId xmlns:a16="http://schemas.microsoft.com/office/drawing/2014/main" id="{04CE69D5-763B-A64E-91D8-B2A4A207B179}"/>
+              </a:ext>
+            </a:extLst>
+          </p:cNvPr>
+          <p:cNvCxnSpPr>
+            <a:cxnSpLocks/>
+            <a:stCxn id="13" idx="3"/>
+            <a:endCxn id="16" idx="1"/>
+          </p:cNvCxnSpPr>
+          <p:nvPr/>
+        </p:nvCxnSpPr>
+        <p:spPr>
+          <a:xfrm>
+            <a:off x="5558422" y="1831043"/>
+            <a:ext cx="979192" cy="226832"/>
+          </a:xfrm>
+          <a:prstGeom prst="curvedConnector3">
+            <a:avLst>
+              <a:gd name="adj1" fmla="val 50000"/>
+            </a:avLst>
+          </a:prstGeom>
+          <a:ln>
+            <a:solidFill>
+              <a:schemeClr val="accent6"/>
+            </a:solidFill>
+            <a:tailEnd type="triangle"/>
+          </a:ln>
+          <a:effectLst/>
+        </p:spPr>
+        <p:style>
+          <a:lnRef idx="2">
+            <a:schemeClr val="accent1"/>
+          </a:lnRef>
+          <a:fillRef idx="0">
+            <a:schemeClr val="accent1"/>
+          </a:fillRef>
+          <a:effectRef idx="1">
+            <a:schemeClr val="accent1"/>
+          </a:effectRef>
+          <a:fontRef idx="minor">
+            <a:schemeClr val="tx1"/>
+          </a:fontRef>
+        </p:style>
+      </p:cxnSp>
+      <p:sp>
+        <p:nvSpPr>
+          <p:cNvPr id="13" name="Rectangle 12">
+            <a:extLst>
+              <a:ext uri="{FF2B5EF4-FFF2-40B4-BE49-F238E27FC236}">
+                <a16:creationId xmlns:a16="http://schemas.microsoft.com/office/drawing/2014/main" id="{BE5F233E-4725-D145-9EDA-4A2C9CB1228D}"/>
+              </a:ext>
+            </a:extLst>
+          </p:cNvPr>
+          <p:cNvSpPr/>
+          <p:nvPr/>
+        </p:nvSpPr>
+        <p:spPr>
+          <a:xfrm>
+            <a:off x="3422066" y="1704085"/>
+            <a:ext cx="2136356" cy="253916"/>
+          </a:xfrm>
+          <a:prstGeom prst="rect">
+            <a:avLst/>
+          </a:prstGeom>
+        </p:spPr>
+        <p:txBody>
+          <a:bodyPr wrap="square">
+            <a:spAutoFit/>
+          </a:bodyPr>
+          <a:lstStyle/>
+          <a:p>
+            <a:r>
+              <a:rPr lang="en-US" sz="1050" dirty="0">
+                <a:solidFill>
+                  <a:srgbClr val="0000FF"/>
+                </a:solidFill>
+                <a:latin typeface="Menlo" panose="020B0609030804020204" pitchFamily="49" charset="0"/>
+              </a:rPr>
+              <a:t>strimzi-cluster-operator</a:t>
+            </a:r>
+          </a:p>
+        </p:txBody>
+      </p:sp>
+      <p:sp>
+        <p:nvSpPr>
+          <p:cNvPr id="16" name="Rectangle 15">
+            <a:extLst>
+              <a:ext uri="{FF2B5EF4-FFF2-40B4-BE49-F238E27FC236}">
+                <a16:creationId xmlns:a16="http://schemas.microsoft.com/office/drawing/2014/main" id="{2DE8CFF1-445D-724D-AF71-0FC7907E4001}"/>
+              </a:ext>
+            </a:extLst>
+          </p:cNvPr>
+          <p:cNvSpPr/>
+          <p:nvPr/>
+        </p:nvSpPr>
+        <p:spPr>
+          <a:xfrm>
+            <a:off x="6537614" y="1934764"/>
+            <a:ext cx="2199986" cy="246221"/>
+          </a:xfrm>
+          <a:prstGeom prst="rect">
+            <a:avLst/>
+          </a:prstGeom>
+        </p:spPr>
+        <p:txBody>
+          <a:bodyPr wrap="square">
+            <a:spAutoFit/>
+          </a:bodyPr>
+          <a:lstStyle/>
+          <a:p>
+            <a:r>
+              <a:rPr lang="en-US" sz="1000" dirty="0">
+                <a:solidFill>
+                  <a:srgbClr val="953FDA"/>
+                </a:solidFill>
+                <a:latin typeface="Menlo" panose="020B0609030804020204" pitchFamily="49" charset="0"/>
+              </a:rPr>
+              <a:t>strimzi-cluster-operator</a:t>
+            </a:r>
+            <a:endParaRPr lang="en-US" sz="1000" dirty="0">
+              <a:solidFill>
+                <a:srgbClr val="953FDA"/>
+              </a:solidFill>
+              <a:effectLst/>
+              <a:latin typeface="Menlo" panose="020B0609030804020204" pitchFamily="49" charset="0"/>
+            </a:endParaRPr>
+          </a:p>
+        </p:txBody>
+      </p:sp>
+      <p:sp>
+        <p:nvSpPr>
+          <p:cNvPr id="21" name="TextBox 20">
+            <a:extLst>
+              <a:ext uri="{FF2B5EF4-FFF2-40B4-BE49-F238E27FC236}">
+                <a16:creationId xmlns:a16="http://schemas.microsoft.com/office/drawing/2014/main" id="{CD2664F9-0E6D-6844-8B7C-7DC3EC33CACA}"/>
+              </a:ext>
+            </a:extLst>
+          </p:cNvPr>
+          <p:cNvSpPr txBox="1"/>
+          <p:nvPr/>
+        </p:nvSpPr>
+        <p:spPr>
+          <a:xfrm>
+            <a:off x="159474" y="2296299"/>
+            <a:ext cx="1669047" cy="646331"/>
+          </a:xfrm>
+          <a:prstGeom prst="rect">
+            <a:avLst/>
+          </a:prstGeom>
+          <a:noFill/>
+        </p:spPr>
+        <p:txBody>
+          <a:bodyPr wrap="none" rtlCol="0">
+            <a:spAutoFit/>
+          </a:bodyPr>
+          <a:lstStyle/>
+          <a:p>
+            <a:r>
+              <a:rPr lang="en-US" sz="1200" dirty="0"/>
+              <a:t>strimzi-kafka-broker</a:t>
+            </a:r>
+          </a:p>
+          <a:p>
+            <a:r>
+              <a:rPr lang="en-US" sz="1200" dirty="0"/>
+              <a:t>strimzi-topic-operator</a:t>
+            </a:r>
+          </a:p>
+          <a:p>
+            <a:r>
+              <a:rPr lang="en-US" sz="1200" dirty="0"/>
+              <a:t>strimzi-entity-operator</a:t>
+            </a:r>
+          </a:p>
+        </p:txBody>
+      </p:sp>
+      <p:sp>
+        <p:nvSpPr>
+          <p:cNvPr id="22" name="Rectangle 21">
+            <a:extLst>
+              <a:ext uri="{FF2B5EF4-FFF2-40B4-BE49-F238E27FC236}">
+                <a16:creationId xmlns:a16="http://schemas.microsoft.com/office/drawing/2014/main" id="{E4D8D13F-2B7E-D346-B705-546D180DAD15}"/>
+              </a:ext>
+            </a:extLst>
+          </p:cNvPr>
+          <p:cNvSpPr/>
+          <p:nvPr/>
+        </p:nvSpPr>
+        <p:spPr>
+          <a:xfrm>
+            <a:off x="159474" y="1249845"/>
+            <a:ext cx="2518030" cy="430887"/>
+          </a:xfrm>
+          <a:prstGeom prst="rect">
+            <a:avLst/>
+          </a:prstGeom>
+        </p:spPr>
+        <p:txBody>
+          <a:bodyPr wrap="square">
+            <a:spAutoFit/>
+          </a:bodyPr>
+          <a:lstStyle/>
+          <a:p>
+            <a:r>
+              <a:rPr lang="en-US" sz="1100" dirty="0"/>
+              <a:t>strimzi-cluster-operator-</a:t>
+            </a:r>
+          </a:p>
+          <a:p>
+            <a:r>
+              <a:rPr lang="en-US" sz="1100" dirty="0"/>
+              <a:t>namespaced</a:t>
+            </a:r>
+          </a:p>
+        </p:txBody>
+      </p:sp>
+      <p:cxnSp>
+        <p:nvCxnSpPr>
+          <p:cNvPr id="23" name="Curved Connector 22">
+            <a:extLst>
+              <a:ext uri="{FF2B5EF4-FFF2-40B4-BE49-F238E27FC236}">
+                <a16:creationId xmlns:a16="http://schemas.microsoft.com/office/drawing/2014/main" id="{2C24BB2D-38A5-E542-9DBA-942883895116}"/>
+              </a:ext>
+            </a:extLst>
+          </p:cNvPr>
+          <p:cNvCxnSpPr>
+            <a:cxnSpLocks/>
+            <a:stCxn id="13" idx="1"/>
+            <a:endCxn id="22" idx="3"/>
+          </p:cNvCxnSpPr>
+          <p:nvPr/>
+        </p:nvCxnSpPr>
+        <p:spPr>
+          <a:xfrm rot="10800000">
+            <a:off x="2677504" y="1465289"/>
+            <a:ext cx="744562" cy="365754"/>
+          </a:xfrm>
+          <a:prstGeom prst="curvedConnector3">
+            <a:avLst>
+              <a:gd name="adj1" fmla="val 50000"/>
+            </a:avLst>
+          </a:prstGeom>
+          <a:ln>
+            <a:solidFill>
+              <a:schemeClr val="accent6"/>
+            </a:solidFill>
+            <a:tailEnd type="triangle"/>
+          </a:ln>
+          <a:effectLst/>
+        </p:spPr>
+        <p:style>
+          <a:lnRef idx="2">
+            <a:schemeClr val="accent1"/>
+          </a:lnRef>
+          <a:fillRef idx="0">
+            <a:schemeClr val="accent1"/>
+          </a:fillRef>
+          <a:effectRef idx="1">
+            <a:schemeClr val="accent1"/>
+          </a:effectRef>
+          <a:fontRef idx="minor">
+            <a:schemeClr val="tx1"/>
+          </a:fontRef>
+        </p:style>
+      </p:cxnSp>
+      <p:cxnSp>
+        <p:nvCxnSpPr>
+          <p:cNvPr id="31" name="Curved Connector 30">
+            <a:extLst>
+              <a:ext uri="{FF2B5EF4-FFF2-40B4-BE49-F238E27FC236}">
+                <a16:creationId xmlns:a16="http://schemas.microsoft.com/office/drawing/2014/main" id="{8597923E-34F0-4E43-9F04-05D1F91F0448}"/>
+              </a:ext>
+            </a:extLst>
+          </p:cNvPr>
+          <p:cNvCxnSpPr>
+            <a:cxnSpLocks/>
+            <a:stCxn id="13" idx="1"/>
+            <a:endCxn id="32" idx="3"/>
+          </p:cNvCxnSpPr>
+          <p:nvPr/>
+        </p:nvCxnSpPr>
+        <p:spPr>
+          <a:xfrm rot="10800000" flipV="1">
+            <a:off x="2371940" y="1831043"/>
+            <a:ext cx="1050127" cy="53040"/>
+          </a:xfrm>
+          <a:prstGeom prst="curvedConnector3">
+            <a:avLst>
+              <a:gd name="adj1" fmla="val 50000"/>
+            </a:avLst>
+          </a:prstGeom>
+          <a:ln>
+            <a:solidFill>
+              <a:schemeClr val="accent6"/>
+            </a:solidFill>
+            <a:tailEnd type="triangle"/>
+          </a:ln>
+          <a:effectLst/>
+        </p:spPr>
+        <p:style>
+          <a:lnRef idx="2">
+            <a:schemeClr val="accent1"/>
+          </a:lnRef>
+          <a:fillRef idx="0">
+            <a:schemeClr val="accent1"/>
+          </a:fillRef>
+          <a:effectRef idx="1">
+            <a:schemeClr val="accent1"/>
+          </a:effectRef>
+          <a:fontRef idx="minor">
+            <a:schemeClr val="tx1"/>
+          </a:fontRef>
+        </p:style>
+      </p:cxnSp>
+      <p:sp>
+        <p:nvSpPr>
+          <p:cNvPr id="32" name="TextBox 31">
+            <a:extLst>
+              <a:ext uri="{FF2B5EF4-FFF2-40B4-BE49-F238E27FC236}">
+                <a16:creationId xmlns:a16="http://schemas.microsoft.com/office/drawing/2014/main" id="{5F851831-C8A6-6746-9A87-76517A0F5F63}"/>
+              </a:ext>
+            </a:extLst>
+          </p:cNvPr>
+          <p:cNvSpPr txBox="1"/>
+          <p:nvPr/>
+        </p:nvSpPr>
+        <p:spPr>
+          <a:xfrm>
+            <a:off x="159474" y="1745583"/>
+            <a:ext cx="2212465" cy="276999"/>
+          </a:xfrm>
+          <a:prstGeom prst="rect">
+            <a:avLst/>
+          </a:prstGeom>
+          <a:noFill/>
+        </p:spPr>
+        <p:txBody>
+          <a:bodyPr wrap="none" rtlCol="0">
+            <a:spAutoFit/>
+          </a:bodyPr>
+          <a:lstStyle/>
+          <a:p>
+            <a:r>
+              <a:rPr lang="en-US" sz="1200" dirty="0"/>
+              <a:t>strimzi-cluster-operator-global</a:t>
+            </a:r>
+          </a:p>
+        </p:txBody>
+      </p:sp>
+      <p:cxnSp>
+        <p:nvCxnSpPr>
+          <p:cNvPr id="38" name="Curved Connector 37">
+            <a:extLst>
+              <a:ext uri="{FF2B5EF4-FFF2-40B4-BE49-F238E27FC236}">
+                <a16:creationId xmlns:a16="http://schemas.microsoft.com/office/drawing/2014/main" id="{1F0FCCDA-2E74-6948-B159-9E05BE597A8E}"/>
+              </a:ext>
+            </a:extLst>
+          </p:cNvPr>
+          <p:cNvCxnSpPr>
+            <a:cxnSpLocks/>
+            <a:stCxn id="13" idx="1"/>
+            <a:endCxn id="21" idx="3"/>
+          </p:cNvCxnSpPr>
+          <p:nvPr/>
+        </p:nvCxnSpPr>
+        <p:spPr>
+          <a:xfrm rot="10800000" flipV="1">
+            <a:off x="1828522" y="1831043"/>
+            <a:ext cx="1593545" cy="788422"/>
+          </a:xfrm>
+          <a:prstGeom prst="curvedConnector3">
+            <a:avLst>
+              <a:gd name="adj1" fmla="val 50000"/>
+            </a:avLst>
+          </a:prstGeom>
+          <a:ln>
+            <a:solidFill>
+              <a:schemeClr val="accent6"/>
+            </a:solidFill>
+            <a:tailEnd type="triangle"/>
+          </a:ln>
+          <a:effectLst/>
+        </p:spPr>
+        <p:style>
+          <a:lnRef idx="2">
+            <a:schemeClr val="accent1"/>
+          </a:lnRef>
+          <a:fillRef idx="0">
+            <a:schemeClr val="accent1"/>
+          </a:fillRef>
+          <a:effectRef idx="1">
+            <a:schemeClr val="accent1"/>
+          </a:effectRef>
+          <a:fontRef idx="minor">
+            <a:schemeClr val="tx1"/>
+          </a:fontRef>
+        </p:style>
+      </p:cxnSp>
+      <p:sp>
+        <p:nvSpPr>
+          <p:cNvPr id="41" name="Rectangle 40">
+            <a:extLst>
+              <a:ext uri="{FF2B5EF4-FFF2-40B4-BE49-F238E27FC236}">
+                <a16:creationId xmlns:a16="http://schemas.microsoft.com/office/drawing/2014/main" id="{54C2BF07-85E0-D340-B543-311A7D69001B}"/>
+              </a:ext>
+            </a:extLst>
+          </p:cNvPr>
+          <p:cNvSpPr/>
+          <p:nvPr/>
+        </p:nvSpPr>
+        <p:spPr>
+          <a:xfrm>
+            <a:off x="169429" y="3062458"/>
+            <a:ext cx="1023037" cy="261610"/>
+          </a:xfrm>
+          <a:prstGeom prst="rect">
+            <a:avLst/>
+          </a:prstGeom>
+        </p:spPr>
+        <p:txBody>
+          <a:bodyPr wrap="none">
+            <a:spAutoFit/>
+          </a:bodyPr>
+          <a:lstStyle/>
+          <a:p>
+            <a:r>
+              <a:rPr lang="en-US" sz="1100" dirty="0"/>
+              <a:t>strimzi-admin</a:t>
+            </a:r>
+          </a:p>
+        </p:txBody>
+      </p:sp>
+      <p:cxnSp>
+        <p:nvCxnSpPr>
+          <p:cNvPr id="42" name="Curved Connector 41">
+            <a:extLst>
+              <a:ext uri="{FF2B5EF4-FFF2-40B4-BE49-F238E27FC236}">
+                <a16:creationId xmlns:a16="http://schemas.microsoft.com/office/drawing/2014/main" id="{E7DA0BD5-2310-BC45-AC2A-FFD2236CC624}"/>
+              </a:ext>
+            </a:extLst>
+          </p:cNvPr>
+          <p:cNvCxnSpPr>
+            <a:cxnSpLocks/>
+            <a:stCxn id="9" idx="1"/>
+            <a:endCxn id="5" idx="3"/>
+          </p:cNvCxnSpPr>
+          <p:nvPr/>
+        </p:nvCxnSpPr>
+        <p:spPr>
+          <a:xfrm rot="10800000" flipV="1">
+            <a:off x="2270950" y="3329766"/>
+            <a:ext cx="1151117" cy="268713"/>
+          </a:xfrm>
+          <a:prstGeom prst="curvedConnector3">
+            <a:avLst>
+              <a:gd name="adj1" fmla="val 50000"/>
+            </a:avLst>
+          </a:prstGeom>
+          <a:ln>
+            <a:solidFill>
+              <a:schemeClr val="accent6"/>
+            </a:solidFill>
+            <a:tailEnd type="triangle"/>
+          </a:ln>
+          <a:effectLst/>
+        </p:spPr>
+        <p:style>
+          <a:lnRef idx="2">
+            <a:schemeClr val="accent1"/>
+          </a:lnRef>
+          <a:fillRef idx="0">
+            <a:schemeClr val="accent1"/>
+          </a:fillRef>
+          <a:effectRef idx="1">
+            <a:schemeClr val="accent1"/>
+          </a:effectRef>
+          <a:fontRef idx="minor">
+            <a:schemeClr val="tx1"/>
+          </a:fontRef>
+        </p:style>
+      </p:cxnSp>
+      <p:cxnSp>
+        <p:nvCxnSpPr>
+          <p:cNvPr id="45" name="Curved Connector 44">
+            <a:extLst>
+              <a:ext uri="{FF2B5EF4-FFF2-40B4-BE49-F238E27FC236}">
+                <a16:creationId xmlns:a16="http://schemas.microsoft.com/office/drawing/2014/main" id="{46F99FA9-558C-E244-AE40-91A85AF4C468}"/>
+              </a:ext>
+            </a:extLst>
+          </p:cNvPr>
+          <p:cNvCxnSpPr>
+            <a:cxnSpLocks/>
+            <a:stCxn id="9" idx="3"/>
+            <a:endCxn id="10" idx="1"/>
+          </p:cNvCxnSpPr>
+          <p:nvPr/>
+        </p:nvCxnSpPr>
+        <p:spPr>
+          <a:xfrm flipV="1">
+            <a:off x="5384800" y="3324068"/>
+            <a:ext cx="1352839" cy="5699"/>
+          </a:xfrm>
+          <a:prstGeom prst="curvedConnector3">
+            <a:avLst>
+              <a:gd name="adj1" fmla="val 50000"/>
+            </a:avLst>
+          </a:prstGeom>
+          <a:ln>
+            <a:solidFill>
+              <a:schemeClr val="accent6"/>
+            </a:solidFill>
+            <a:tailEnd type="triangle"/>
+          </a:ln>
+          <a:effectLst/>
+        </p:spPr>
+        <p:style>
+          <a:lnRef idx="2">
+            <a:schemeClr val="accent1"/>
+          </a:lnRef>
+          <a:fillRef idx="0">
+            <a:schemeClr val="accent1"/>
+          </a:fillRef>
+          <a:effectRef idx="1">
+            <a:schemeClr val="accent1"/>
+          </a:effectRef>
+          <a:fontRef idx="minor">
+            <a:schemeClr val="tx1"/>
+          </a:fontRef>
+        </p:style>
+      </p:cxnSp>
+      <p:sp>
+        <p:nvSpPr>
+          <p:cNvPr id="57" name="TextBox 56">
+            <a:extLst>
+              <a:ext uri="{FF2B5EF4-FFF2-40B4-BE49-F238E27FC236}">
+                <a16:creationId xmlns:a16="http://schemas.microsoft.com/office/drawing/2014/main" id="{77EE460B-0C78-3A46-B652-1BF681EFC29B}"/>
+              </a:ext>
+            </a:extLst>
+          </p:cNvPr>
+          <p:cNvSpPr txBox="1"/>
+          <p:nvPr/>
+        </p:nvSpPr>
+        <p:spPr>
+          <a:xfrm>
+            <a:off x="159474" y="3947671"/>
+            <a:ext cx="1471878" cy="276999"/>
+          </a:xfrm>
+          <a:prstGeom prst="rect">
+            <a:avLst/>
+          </a:prstGeom>
+          <a:noFill/>
+        </p:spPr>
+        <p:txBody>
+          <a:bodyPr wrap="none" rtlCol="0">
+            <a:spAutoFit/>
+          </a:bodyPr>
+          <a:lstStyle/>
+          <a:p>
+            <a:r>
+              <a:rPr lang="en-US" sz="1200" dirty="0"/>
+              <a:t>prometheus-server</a:t>
+            </a:r>
+          </a:p>
+        </p:txBody>
+      </p:sp>
+      <p:sp>
+        <p:nvSpPr>
+          <p:cNvPr id="58" name="Rectangle 57">
+            <a:extLst>
+              <a:ext uri="{FF2B5EF4-FFF2-40B4-BE49-F238E27FC236}">
+                <a16:creationId xmlns:a16="http://schemas.microsoft.com/office/drawing/2014/main" id="{6A9B98CA-AC75-AE4A-AFFB-CBD91FF2C4F5}"/>
+              </a:ext>
+            </a:extLst>
+          </p:cNvPr>
+          <p:cNvSpPr/>
+          <p:nvPr/>
+        </p:nvSpPr>
+        <p:spPr>
+          <a:xfrm>
+            <a:off x="3422066" y="3690500"/>
+            <a:ext cx="1962734" cy="253916"/>
+          </a:xfrm>
+          <a:prstGeom prst="rect">
+            <a:avLst/>
+          </a:prstGeom>
+        </p:spPr>
+        <p:txBody>
+          <a:bodyPr wrap="square">
+            <a:spAutoFit/>
+          </a:bodyPr>
+          <a:lstStyle/>
+          <a:p>
+            <a:r>
+              <a:rPr lang="en-US" sz="1050" dirty="0">
+                <a:solidFill>
+                  <a:srgbClr val="0000FF"/>
+                </a:solidFill>
+                <a:latin typeface="Menlo" panose="020B0609030804020204" pitchFamily="49" charset="0"/>
+              </a:rPr>
+              <a:t>prometheus-server</a:t>
+            </a:r>
+          </a:p>
+        </p:txBody>
+      </p:sp>
+      <p:sp>
+        <p:nvSpPr>
+          <p:cNvPr id="59" name="Rectangle 58">
+            <a:extLst>
+              <a:ext uri="{FF2B5EF4-FFF2-40B4-BE49-F238E27FC236}">
+                <a16:creationId xmlns:a16="http://schemas.microsoft.com/office/drawing/2014/main" id="{6EF02051-583E-6745-94C8-0DA1FF872A7E}"/>
+              </a:ext>
+            </a:extLst>
+          </p:cNvPr>
+          <p:cNvSpPr/>
+          <p:nvPr/>
+        </p:nvSpPr>
+        <p:spPr>
+          <a:xfrm>
+            <a:off x="6737639" y="3688648"/>
+            <a:ext cx="2199986" cy="246221"/>
+          </a:xfrm>
+          <a:prstGeom prst="rect">
+            <a:avLst/>
+          </a:prstGeom>
+        </p:spPr>
+        <p:txBody>
+          <a:bodyPr wrap="square">
+            <a:spAutoFit/>
+          </a:bodyPr>
+          <a:lstStyle/>
+          <a:p>
+            <a:r>
+              <a:rPr lang="en-US" sz="1000" dirty="0">
+                <a:solidFill>
+                  <a:srgbClr val="953FDA"/>
+                </a:solidFill>
+                <a:latin typeface="Menlo" panose="020B0609030804020204" pitchFamily="49" charset="0"/>
+              </a:rPr>
+              <a:t>prometheus-operator </a:t>
+            </a:r>
+          </a:p>
+        </p:txBody>
+      </p:sp>
+      <p:cxnSp>
+        <p:nvCxnSpPr>
+          <p:cNvPr id="60" name="Curved Connector 59">
+            <a:extLst>
+              <a:ext uri="{FF2B5EF4-FFF2-40B4-BE49-F238E27FC236}">
+                <a16:creationId xmlns:a16="http://schemas.microsoft.com/office/drawing/2014/main" id="{0F49CA1B-4608-6240-9E91-9527663F52D3}"/>
+              </a:ext>
+            </a:extLst>
+          </p:cNvPr>
+          <p:cNvCxnSpPr>
+            <a:cxnSpLocks/>
+            <a:stCxn id="58" idx="3"/>
+            <a:endCxn id="59" idx="1"/>
+          </p:cNvCxnSpPr>
+          <p:nvPr/>
+        </p:nvCxnSpPr>
+        <p:spPr>
+          <a:xfrm flipV="1">
+            <a:off x="5384800" y="3811759"/>
+            <a:ext cx="1352839" cy="5699"/>
+          </a:xfrm>
+          <a:prstGeom prst="curvedConnector3">
+            <a:avLst>
+              <a:gd name="adj1" fmla="val 50000"/>
+            </a:avLst>
+          </a:prstGeom>
+          <a:ln>
+            <a:solidFill>
+              <a:schemeClr val="accent6"/>
+            </a:solidFill>
+            <a:tailEnd type="triangle"/>
+          </a:ln>
+          <a:effectLst/>
+        </p:spPr>
+        <p:style>
+          <a:lnRef idx="2">
+            <a:schemeClr val="accent1"/>
+          </a:lnRef>
+          <a:fillRef idx="0">
+            <a:schemeClr val="accent1"/>
+          </a:fillRef>
+          <a:effectRef idx="1">
+            <a:schemeClr val="accent1"/>
+          </a:effectRef>
+          <a:fontRef idx="minor">
+            <a:schemeClr val="tx1"/>
+          </a:fontRef>
+        </p:style>
+      </p:cxnSp>
+      <p:cxnSp>
+        <p:nvCxnSpPr>
+          <p:cNvPr id="68" name="Curved Connector 67">
+            <a:extLst>
+              <a:ext uri="{FF2B5EF4-FFF2-40B4-BE49-F238E27FC236}">
+                <a16:creationId xmlns:a16="http://schemas.microsoft.com/office/drawing/2014/main" id="{20E5CB08-1456-6D45-83DD-1A4E7CA70892}"/>
+              </a:ext>
+            </a:extLst>
+          </p:cNvPr>
+          <p:cNvCxnSpPr>
+            <a:cxnSpLocks/>
+            <a:stCxn id="58" idx="1"/>
+            <a:endCxn id="57" idx="3"/>
+          </p:cNvCxnSpPr>
+          <p:nvPr/>
+        </p:nvCxnSpPr>
+        <p:spPr>
+          <a:xfrm rot="10800000" flipV="1">
+            <a:off x="1631352" y="3817457"/>
+            <a:ext cx="1790714" cy="268713"/>
+          </a:xfrm>
+          <a:prstGeom prst="curvedConnector3">
+            <a:avLst>
+              <a:gd name="adj1" fmla="val 50000"/>
+            </a:avLst>
+          </a:prstGeom>
+          <a:ln>
+            <a:solidFill>
+              <a:schemeClr val="accent6"/>
+            </a:solidFill>
+            <a:tailEnd type="triangle"/>
+          </a:ln>
+          <a:effectLst/>
+        </p:spPr>
+        <p:style>
+          <a:lnRef idx="2">
+            <a:schemeClr val="accent1"/>
+          </a:lnRef>
+          <a:fillRef idx="0">
+            <a:schemeClr val="accent1"/>
+          </a:fillRef>
+          <a:effectRef idx="1">
+            <a:schemeClr val="accent1"/>
+          </a:effectRef>
+          <a:fontRef idx="minor">
+            <a:schemeClr val="tx1"/>
+          </a:fontRef>
+        </p:style>
+      </p:cxnSp>
+    </p:spTree>
+    <p:extLst>
+      <p:ext uri="{BB962C8B-B14F-4D97-AF65-F5344CB8AC3E}">
+        <p14:creationId xmlns:p14="http://schemas.microsoft.com/office/powerpoint/2010/main" val="1570748692"/>
+      </p:ext>
+    </p:extLst>
+  </p:cSld>
+  <p:clrMapOvr>
+    <a:masterClrMapping/>
+  </p:clrMapOvr>
+</p:sld>
+</file>
+
+<file path=ppt/slides/slide17.xml><?xml version="1.0" encoding="utf-8"?>
+<p:sld xmlns:a="http://schemas.openxmlformats.org/drawingml/2006/main" xmlns:r="http://schemas.openxmlformats.org/officeDocument/2006/relationships" xmlns:p="http://schemas.openxmlformats.org/presentationml/2006/main">
+  <p:cSld>
+    <p:spTree>
+      <p:nvGrpSpPr>
+        <p:cNvPr id="1" name=""/>
+        <p:cNvGrpSpPr/>
+        <p:nvPr/>
+      </p:nvGrpSpPr>
+      <p:grpSpPr>
+        <a:xfrm>
+          <a:off x="0" y="0"/>
+          <a:ext cx="0" cy="0"/>
+          <a:chOff x="0" y="0"/>
+          <a:chExt cx="0" cy="0"/>
+        </a:xfrm>
+      </p:grpSpPr>
+      <p:sp>
+        <p:nvSpPr>
+          <p:cNvPr id="2" name="Title 1">
+            <a:extLst>
+              <a:ext uri="{FF2B5EF4-FFF2-40B4-BE49-F238E27FC236}">
+                <a16:creationId xmlns:a16="http://schemas.microsoft.com/office/drawing/2014/main" id="{58169065-201E-5F42-BB75-6EA30E0A8D38}"/>
+              </a:ext>
+            </a:extLst>
+          </p:cNvPr>
+          <p:cNvSpPr>
+            <a:spLocks noGrp="1"/>
+          </p:cNvSpPr>
+          <p:nvPr>
+            <p:ph type="title"/>
+          </p:nvPr>
+        </p:nvSpPr>
+        <p:spPr/>
+        <p:txBody>
+          <a:bodyPr/>
+          <a:lstStyle/>
+          <a:p>
+            <a:r>
+              <a:rPr lang="en-US" dirty="0"/>
+              <a:t>Mirror maker monitoring</a:t>
+            </a:r>
+            <a:endParaRPr dirty="0"/>
+          </a:p>
+        </p:txBody>
+      </p:sp>
+      <p:sp>
+        <p:nvSpPr>
+          <p:cNvPr id="4" name="Slide Number Placeholder 3">
+            <a:extLst>
+              <a:ext uri="{FF2B5EF4-FFF2-40B4-BE49-F238E27FC236}">
+                <a16:creationId xmlns:a16="http://schemas.microsoft.com/office/drawing/2014/main" id="{D461EF70-49A7-3F48-A6F1-90FB6453A640}"/>
+              </a:ext>
+            </a:extLst>
+          </p:cNvPr>
+          <p:cNvSpPr>
+            <a:spLocks noGrp="1"/>
+          </p:cNvSpPr>
+          <p:nvPr>
+            <p:ph type="sldNum" sz="quarter" idx="10"/>
+          </p:nvPr>
+        </p:nvSpPr>
+        <p:spPr/>
+        <p:txBody>
+          <a:bodyPr/>
+          <a:lstStyle/>
+          <a:p>
+            <a:fld id="{2F63A97E-D605-DC42-8452-C14CD1FA87FA}" type="slidenum">
+              <a:rPr lang="en-US" smtClean="0">
+                <a:solidFill>
+                  <a:srgbClr val="5AAAFA"/>
+                </a:solidFill>
+              </a:rPr>
+              <a:pPr/>
+              <a:t>17</a:t>
             </a:fld>
             <a:endParaRPr lang="en-US">
               <a:solidFill>
@@ -22883,7 +24122,7 @@
         </p:blipFill>
         <p:spPr>
           <a:xfrm>
-            <a:off x="426518" y="3683763"/>
+            <a:off x="606629" y="4016281"/>
             <a:ext cx="441419" cy="441419"/>
           </a:xfrm>
           <a:prstGeom prst="rect">
@@ -22907,7 +24146,7 @@
         </p:nvSpPr>
         <p:spPr bwMode="auto">
           <a:xfrm>
-            <a:off x="426518" y="3619539"/>
+            <a:off x="606629" y="3952057"/>
             <a:ext cx="1373707" cy="586032"/>
           </a:xfrm>
           <a:prstGeom prst="roundRect">
@@ -22960,7 +24199,7 @@
         </p:blipFill>
         <p:spPr>
           <a:xfrm>
-            <a:off x="368147" y="2772603"/>
+            <a:off x="395857" y="3132825"/>
             <a:ext cx="586032" cy="586032"/>
           </a:xfrm>
           <a:prstGeom prst="rect">
@@ -22984,8 +24223,8 @@
         </p:nvSpPr>
         <p:spPr bwMode="auto">
           <a:xfrm>
-            <a:off x="426517" y="2802628"/>
-            <a:ext cx="3379852" cy="756860"/>
+            <a:off x="454227" y="2834387"/>
+            <a:ext cx="3352142" cy="1085324"/>
           </a:xfrm>
           <a:prstGeom prst="roundRect">
             <a:avLst>
@@ -23130,8 +24369,8 @@
         </p:nvSpPr>
         <p:spPr>
           <a:xfrm>
-            <a:off x="2259776" y="2871631"/>
-            <a:ext cx="1178989" cy="203645"/>
+            <a:off x="2151498" y="3373740"/>
+            <a:ext cx="1397824" cy="340039"/>
           </a:xfrm>
           <a:prstGeom prst="rect">
             <a:avLst/>
@@ -23189,21 +24428,13 @@
               <a:tabLst/>
             </a:pPr>
             <a:r>
-              <a:rPr kumimoji="0" lang="en-US" sz="1000" b="0" i="0" u="none" strike="noStrike" kern="1200" cap="none" spc="0" normalizeH="0" baseline="0" noProof="0" dirty="0">
-                <a:ln>
-                  <a:noFill/>
-                </a:ln>
+              <a:rPr lang="en-US" sz="1000" dirty="0">
                 <a:solidFill>
                   <a:srgbClr val="0000FF"/>
                 </a:solidFill>
-                <a:effectLst/>
-                <a:uLnTx/>
-                <a:uFillTx/>
                 <a:latin typeface="Arial"/>
-                <a:ea typeface="+mn-ea"/>
-                <a:cs typeface="+mn-cs"/>
               </a:rPr>
-              <a:t>Retrieval</a:t>
+              <a:t>Prometheus-server</a:t>
             </a:r>
             <a:endParaRPr kumimoji="0" sz="1000" b="0" i="0" u="none" strike="noStrike" kern="1200" cap="none" spc="0" normalizeH="0" baseline="0" noProof="0" dirty="0">
               <a:ln>
@@ -23236,8 +24467,8 @@
         </p:nvSpPr>
         <p:spPr>
           <a:xfrm>
-            <a:off x="954179" y="2853128"/>
-            <a:ext cx="771525" cy="222148"/>
+            <a:off x="849283" y="3228398"/>
+            <a:ext cx="950942" cy="290684"/>
           </a:xfrm>
           <a:prstGeom prst="rect">
             <a:avLst/>
@@ -23289,7 +24520,7 @@
                 </a:solidFill>
                 <a:latin typeface="Arial"/>
               </a:rPr>
-              <a:t>operators</a:t>
+              <a:t>Prometheus- operator</a:t>
             </a:r>
             <a:endParaRPr kumimoji="0" sz="900" b="0" i="0" u="none" strike="noStrike" kern="1200" cap="none" spc="0" normalizeH="0" baseline="0" noProof="0" dirty="0">
               <a:ln>
@@ -23330,7 +24561,7 @@
         </p:blipFill>
         <p:spPr>
           <a:xfrm>
-            <a:off x="227789" y="4440222"/>
+            <a:off x="227789" y="4467932"/>
             <a:ext cx="261023" cy="238649"/>
           </a:xfrm>
           <a:prstGeom prst="rect">
@@ -23338,6 +24569,112 @@
           </a:prstGeom>
         </p:spPr>
       </p:pic>
+      <p:sp>
+        <p:nvSpPr>
+          <p:cNvPr id="25" name="Rectangle 24">
+            <a:extLst>
+              <a:ext uri="{FF2B5EF4-FFF2-40B4-BE49-F238E27FC236}">
+                <a16:creationId xmlns:a16="http://schemas.microsoft.com/office/drawing/2014/main" id="{B65DE0D7-1E84-164A-8728-EADB34EDB8AE}"/>
+              </a:ext>
+            </a:extLst>
+          </p:cNvPr>
+          <p:cNvSpPr/>
+          <p:nvPr/>
+        </p:nvSpPr>
+        <p:spPr>
+          <a:xfrm>
+            <a:off x="2159800" y="2931971"/>
+            <a:ext cx="1397824" cy="340039"/>
+          </a:xfrm>
+          <a:prstGeom prst="rect">
+            <a:avLst/>
+          </a:prstGeom>
+          <a:solidFill>
+            <a:srgbClr val="FFC000">
+              <a:alpha val="50000"/>
+            </a:srgbClr>
+          </a:solidFill>
+          <a:ln>
+            <a:noFill/>
+          </a:ln>
+          <a:effectLst>
+            <a:outerShdw blurRad="50800" dist="38100" dir="5400000" algn="t" rotWithShape="0">
+              <a:prstClr val="black">
+                <a:alpha val="40000"/>
+              </a:prstClr>
+            </a:outerShdw>
+          </a:effectLst>
+        </p:spPr>
+        <p:style>
+          <a:lnRef idx="2">
+            <a:schemeClr val="accent1">
+              <a:shade val="50000"/>
+            </a:schemeClr>
+          </a:lnRef>
+          <a:fillRef idx="1">
+            <a:schemeClr val="accent1"/>
+          </a:fillRef>
+          <a:effectRef idx="0">
+            <a:schemeClr val="accent1"/>
+          </a:effectRef>
+          <a:fontRef idx="minor">
+            <a:schemeClr val="lt1"/>
+          </a:fontRef>
+        </p:style>
+        <p:txBody>
+          <a:bodyPr rtlCol="0" anchor="ctr"/>
+          <a:lstStyle/>
+          <a:p>
+            <a:pPr marL="0" marR="0" indent="0" algn="ctr" defTabSz="685800" rtl="0" eaLnBrk="1" fontAlgn="auto" latinLnBrk="0" hangingPunct="1">
+              <a:lnSpc>
+                <a:spcPct val="100000"/>
+              </a:lnSpc>
+              <a:spcBef>
+                <a:spcPts val="0"/>
+              </a:spcBef>
+              <a:spcAft>
+                <a:spcPts val="0"/>
+              </a:spcAft>
+              <a:buClrTx/>
+              <a:buSzTx/>
+              <a:buFontTx/>
+              <a:buNone/>
+              <a:tabLst/>
+            </a:pPr>
+            <a:r>
+              <a:rPr kumimoji="0" lang="en-US" sz="1000" b="0" i="0" u="none" strike="noStrike" kern="1200" cap="none" spc="0" normalizeH="0" baseline="0" noProof="0" dirty="0">
+                <a:ln>
+                  <a:noFill/>
+                </a:ln>
+                <a:solidFill>
+                  <a:srgbClr val="0000FF"/>
+                </a:solidFill>
+                <a:effectLst/>
+                <a:uLnTx/>
+                <a:uFillTx/>
+                <a:latin typeface="Arial"/>
+                <a:ea typeface="+mn-ea"/>
+                <a:cs typeface="+mn-cs"/>
+              </a:rPr>
+              <a:t>Service Monitor</a:t>
+            </a:r>
+            <a:endParaRPr kumimoji="0" sz="1000" b="0" i="0" u="none" strike="noStrike" kern="1200" cap="none" spc="0" normalizeH="0" baseline="0" noProof="0" dirty="0">
+              <a:ln>
+                <a:noFill/>
+              </a:ln>
+              <a:solidFill>
+                <a:srgbClr val="0000FF"/>
+              </a:solidFill>
+              <a:effectLst/>
+              <a:uLnTx/>
+              <a:uFillTx/>
+              <a:latin typeface="Arial"/>
+              <a:ea typeface="+mn-ea"/>
+              <a:cs typeface="+mn-cs"/>
+            </a:endParaRPr>
+          </a:p>
+        </p:txBody>
+      </p:sp>
     </p:spTree>
     <p:extLst>
       <p:ext uri="{BB962C8B-B14F-4D97-AF65-F5344CB8AC3E}">

</xml_diff>

<commit_message>
Deployed 0cfd939 with MkDocs version: 1.0.4
</commit_message>
<xml_diff>
--- a/mm2-diagrams.pptx
+++ b/mm2-diagrams.pptx
@@ -6,10 +6,10 @@
     <p:sldMasterId id="2147483943" r:id="rId2"/>
   </p:sldMasterIdLst>
   <p:notesMasterIdLst>
-    <p:notesMasterId r:id="rId20"/>
+    <p:notesMasterId r:id="rId21"/>
   </p:notesMasterIdLst>
   <p:handoutMasterIdLst>
-    <p:handoutMasterId r:id="rId21"/>
+    <p:handoutMasterId r:id="rId22"/>
   </p:handoutMasterIdLst>
   <p:sldIdLst>
     <p:sldId id="141169016" r:id="rId3"/>
@@ -28,7 +28,8 @@
     <p:sldId id="141169022" r:id="rId16"/>
     <p:sldId id="141169023" r:id="rId17"/>
     <p:sldId id="141169024" r:id="rId18"/>
-    <p:sldId id="141169017" r:id="rId19"/>
+    <p:sldId id="141169025" r:id="rId19"/>
+    <p:sldId id="141169017" r:id="rId20"/>
   </p:sldIdLst>
   <p:sldSz cx="9144000" cy="5143500" type="screen16x9"/>
   <p:notesSz cx="6858000" cy="9144000"/>
@@ -231,7 +232,7 @@
           <a:p>
             <a:fld id="{43B1B1F9-D0CB-FF4D-BEE0-BED1F1FDA196}" type="datetimeFigureOut">
               <a:rPr lang="en-US" smtClean="0"/>
-              <a:t>4/10/20</a:t>
+              <a:t>4/17/20</a:t>
             </a:fld>
             <a:endParaRPr lang="en-US"/>
           </a:p>
@@ -396,7 +397,7 @@
           <a:p>
             <a:fld id="{26BE012A-D992-5D42-B86E-AA2BC0764EE1}" type="datetimeFigureOut">
               <a:rPr lang="en-US" smtClean="0"/>
-              <a:t>4/10/20</a:t>
+              <a:t>4/17/20</a:t>
             </a:fld>
             <a:endParaRPr lang="en-US"/>
           </a:p>
@@ -1316,6 +1317,133 @@
     <p:extLst>
       <p:ext uri="{BB962C8B-B14F-4D97-AF65-F5344CB8AC3E}">
         <p14:creationId xmlns:p14="http://schemas.microsoft.com/office/powerpoint/2010/main" val="3125368110"/>
+      </p:ext>
+    </p:extLst>
+  </p:cSld>
+  <p:clrMapOvr>
+    <a:masterClrMapping/>
+  </p:clrMapOvr>
+</p:notes>
+</file>
+
+<file path=ppt/notesSlides/notesSlide7.xml><?xml version="1.0" encoding="utf-8"?>
+<p:notes xmlns:a="http://schemas.openxmlformats.org/drawingml/2006/main" xmlns:r="http://schemas.openxmlformats.org/officeDocument/2006/relationships" xmlns:p="http://schemas.openxmlformats.org/presentationml/2006/main">
+  <p:cSld>
+    <p:spTree>
+      <p:nvGrpSpPr>
+        <p:cNvPr id="1" name=""/>
+        <p:cNvGrpSpPr/>
+        <p:nvPr/>
+      </p:nvGrpSpPr>
+      <p:grpSpPr>
+        <a:xfrm>
+          <a:off x="0" y="0"/>
+          <a:ext cx="0" cy="0"/>
+          <a:chOff x="0" y="0"/>
+          <a:chExt cx="0" cy="0"/>
+        </a:xfrm>
+      </p:grpSpPr>
+      <p:sp>
+        <p:nvSpPr>
+          <p:cNvPr id="2" name="Slide Image Placeholder 1"/>
+          <p:cNvSpPr>
+            <a:spLocks noGrp="1" noRot="1" noChangeAspect="1"/>
+          </p:cNvSpPr>
+          <p:nvPr>
+            <p:ph type="sldImg"/>
+          </p:nvPr>
+        </p:nvSpPr>
+        <p:spPr/>
+      </p:sp>
+      <p:sp>
+        <p:nvSpPr>
+          <p:cNvPr id="3" name="Notes Placeholder 2"/>
+          <p:cNvSpPr>
+            <a:spLocks noGrp="1"/>
+          </p:cNvSpPr>
+          <p:nvPr>
+            <p:ph type="body" idx="1"/>
+          </p:nvPr>
+        </p:nvSpPr>
+        <p:spPr/>
+        <p:txBody>
+          <a:bodyPr/>
+          <a:lstStyle/>
+          <a:p>
+            <a:r>
+              <a:rPr lang="en-US" dirty="0"/>
+              <a:t>ts-1: timestamp when creating the record object before sending</a:t>
+            </a:r>
+          </a:p>
+          <a:p>
+            <a:r>
+              <a:rPr lang="en-US" dirty="0"/>
+              <a:t>ts-2: record timestamp when broker write to topic-partition: source topic</a:t>
+            </a:r>
+          </a:p>
+          <a:p>
+            <a:pPr marL="0" marR="0" lvl="0" indent="0" algn="l" defTabSz="685800" rtl="0" eaLnBrk="1" fontAlgn="auto" latinLnBrk="0" hangingPunct="1">
+              <a:lnSpc>
+                <a:spcPct val="100000"/>
+              </a:lnSpc>
+              <a:spcBef>
+                <a:spcPts val="0"/>
+              </a:spcBef>
+              <a:spcAft>
+                <a:spcPts val="0"/>
+              </a:spcAft>
+              <a:buClrTx/>
+              <a:buSzTx/>
+              <a:buFontTx/>
+              <a:buNone/>
+              <a:tabLst/>
+              <a:defRPr/>
+            </a:pPr>
+            <a:r>
+              <a:rPr lang="en-US" dirty="0"/>
+              <a:t>ts-3: record timestamp when broker write to topic-partition: target topic</a:t>
+            </a:r>
+          </a:p>
+          <a:p>
+            <a:r>
+              <a:rPr lang="en-US" dirty="0"/>
+              <a:t>ts-4: timestamp when polling </a:t>
+            </a:r>
+            <a:r>
+              <a:rPr lang="en-US"/>
+              <a:t>the record</a:t>
+            </a:r>
+            <a:endParaRPr dirty="0"/>
+          </a:p>
+        </p:txBody>
+      </p:sp>
+      <p:sp>
+        <p:nvSpPr>
+          <p:cNvPr id="4" name="Slide Number Placeholder 3"/>
+          <p:cNvSpPr>
+            <a:spLocks noGrp="1"/>
+          </p:cNvSpPr>
+          <p:nvPr>
+            <p:ph type="sldNum" sz="quarter" idx="5"/>
+          </p:nvPr>
+        </p:nvSpPr>
+        <p:spPr/>
+        <p:txBody>
+          <a:bodyPr/>
+          <a:lstStyle/>
+          <a:p>
+            <a:fld id="{18D02FFD-07D4-5C4F-BD77-921008177348}" type="slidenum">
+              <a:rPr lang="en-US" smtClean="0"/>
+              <a:t>17</a:t>
+            </a:fld>
+            <a:endParaRPr lang="en-US"/>
+          </a:p>
+        </p:txBody>
+      </p:sp>
+    </p:spTree>
+    <p:extLst>
+      <p:ext uri="{BB962C8B-B14F-4D97-AF65-F5344CB8AC3E}">
+        <p14:creationId xmlns:p14="http://schemas.microsoft.com/office/powerpoint/2010/main" val="2350639789"/>
       </p:ext>
     </p:extLst>
   </p:cSld>
@@ -23575,7 +23703,7 @@
           <p:cNvPr id="2" name="Title 1">
             <a:extLst>
               <a:ext uri="{FF2B5EF4-FFF2-40B4-BE49-F238E27FC236}">
-                <a16:creationId xmlns:a16="http://schemas.microsoft.com/office/drawing/2014/main" id="{58169065-201E-5F42-BB75-6EA30E0A8D38}"/>
+                <a16:creationId xmlns:a16="http://schemas.microsoft.com/office/drawing/2014/main" id="{AD8AE02D-17FC-B64A-848E-E6EE2E7E5A93}"/>
               </a:ext>
             </a:extLst>
           </p:cNvPr>
@@ -23593,7 +23721,7 @@
           <a:p>
             <a:r>
               <a:rPr lang="en-US" dirty="0"/>
-              <a:t>Mirror maker monitoring</a:t>
+              <a:t>Performance Testing</a:t>
             </a:r>
             <a:endParaRPr dirty="0"/>
           </a:p>
@@ -23604,7 +23732,7 @@
           <p:cNvPr id="4" name="Slide Number Placeholder 3">
             <a:extLst>
               <a:ext uri="{FF2B5EF4-FFF2-40B4-BE49-F238E27FC236}">
-                <a16:creationId xmlns:a16="http://schemas.microsoft.com/office/drawing/2014/main" id="{D461EF70-49A7-3F48-A6F1-90FB6453A640}"/>
+                <a16:creationId xmlns:a16="http://schemas.microsoft.com/office/drawing/2014/main" id="{CC070D25-E38D-7949-AA56-03C3740E6A0A}"/>
               </a:ext>
             </a:extLst>
           </p:cNvPr>
@@ -23628,6 +23756,2199 @@
               </a:rPr>
               <a:pPr/>
               <a:t>17</a:t>
+            </a:fld>
+            <a:endParaRPr lang="en-US">
+              <a:solidFill>
+                <a:srgbClr val="5AAAFA"/>
+              </a:solidFill>
+            </a:endParaRPr>
+          </a:p>
+        </p:txBody>
+      </p:sp>
+      <p:cxnSp>
+        <p:nvCxnSpPr>
+          <p:cNvPr id="6" name="Straight Arrow Connector 5">
+            <a:extLst>
+              <a:ext uri="{FF2B5EF4-FFF2-40B4-BE49-F238E27FC236}">
+                <a16:creationId xmlns:a16="http://schemas.microsoft.com/office/drawing/2014/main" id="{58D4DBE5-E4DA-084F-A7B6-EA6C68F2E2E6}"/>
+              </a:ext>
+            </a:extLst>
+          </p:cNvPr>
+          <p:cNvCxnSpPr/>
+          <p:nvPr/>
+        </p:nvCxnSpPr>
+        <p:spPr>
+          <a:xfrm>
+            <a:off x="293688" y="1056904"/>
+            <a:ext cx="8137793" cy="0"/>
+          </a:xfrm>
+          <a:prstGeom prst="straightConnector1">
+            <a:avLst/>
+          </a:prstGeom>
+          <a:ln>
+            <a:solidFill>
+              <a:schemeClr val="accent2">
+                <a:lumMod val="75000"/>
+              </a:schemeClr>
+            </a:solidFill>
+            <a:tailEnd type="triangle"/>
+          </a:ln>
+          <a:effectLst/>
+        </p:spPr>
+        <p:style>
+          <a:lnRef idx="2">
+            <a:schemeClr val="accent1"/>
+          </a:lnRef>
+          <a:fillRef idx="0">
+            <a:schemeClr val="accent1"/>
+          </a:fillRef>
+          <a:effectRef idx="1">
+            <a:schemeClr val="accent1"/>
+          </a:effectRef>
+          <a:fontRef idx="minor">
+            <a:schemeClr val="tx1"/>
+          </a:fontRef>
+        </p:style>
+      </p:cxnSp>
+      <p:grpSp>
+        <p:nvGrpSpPr>
+          <p:cNvPr id="7" name="Group 6">
+            <a:extLst>
+              <a:ext uri="{FF2B5EF4-FFF2-40B4-BE49-F238E27FC236}">
+                <a16:creationId xmlns:a16="http://schemas.microsoft.com/office/drawing/2014/main" id="{2141735D-BC91-B643-97A8-F25296089FE4}"/>
+              </a:ext>
+            </a:extLst>
+          </p:cNvPr>
+          <p:cNvGrpSpPr/>
+          <p:nvPr/>
+        </p:nvGrpSpPr>
+        <p:grpSpPr>
+          <a:xfrm>
+            <a:off x="981420" y="2199814"/>
+            <a:ext cx="818524" cy="411476"/>
+            <a:chOff x="1193647" y="1635094"/>
+            <a:chExt cx="818524" cy="411476"/>
+          </a:xfrm>
+        </p:grpSpPr>
+        <p:sp>
+          <p:nvSpPr>
+            <p:cNvPr id="8" name="Rounded Rectangle 7">
+              <a:extLst>
+                <a:ext uri="{FF2B5EF4-FFF2-40B4-BE49-F238E27FC236}">
+                  <a16:creationId xmlns:a16="http://schemas.microsoft.com/office/drawing/2014/main" id="{F8DB034D-8B70-FF44-8C50-971ACB67B464}"/>
+                </a:ext>
+              </a:extLst>
+            </p:cNvPr>
+            <p:cNvSpPr/>
+            <p:nvPr/>
+          </p:nvSpPr>
+          <p:spPr bwMode="auto">
+            <a:xfrm>
+              <a:off x="1193647" y="1635094"/>
+              <a:ext cx="138128" cy="411476"/>
+            </a:xfrm>
+            <a:prstGeom prst="roundRect">
+              <a:avLst/>
+            </a:prstGeom>
+            <a:solidFill>
+              <a:schemeClr val="bg1">
+                <a:lumMod val="50000"/>
+              </a:schemeClr>
+            </a:solidFill>
+            <a:ln>
+              <a:solidFill>
+                <a:schemeClr val="bg1"/>
+              </a:solidFill>
+              <a:prstDash val="solid"/>
+              <a:headEnd type="none" w="med" len="med"/>
+              <a:tailEnd type="none" w="med" len="med"/>
+            </a:ln>
+            <a:effectLst/>
+          </p:spPr>
+          <p:style>
+            <a:lnRef idx="1">
+              <a:schemeClr val="accent5"/>
+            </a:lnRef>
+            <a:fillRef idx="3">
+              <a:schemeClr val="accent5"/>
+            </a:fillRef>
+            <a:effectRef idx="2">
+              <a:schemeClr val="accent5"/>
+            </a:effectRef>
+            <a:fontRef idx="minor">
+              <a:schemeClr val="lt1"/>
+            </a:fontRef>
+          </p:style>
+          <p:txBody>
+            <a:bodyPr vert="horz" wrap="square" lIns="0" tIns="0" rIns="0" bIns="0" numCol="1" rtlCol="0" anchor="ctr" anchorCtr="0" compatLnSpc="1">
+              <a:prstTxWarp prst="textNoShape">
+                <a:avLst/>
+              </a:prstTxWarp>
+              <a:noAutofit/>
+            </a:bodyPr>
+            <a:lstStyle/>
+            <a:p>
+              <a:pPr algn="ctr" defTabSz="685784" fontAlgn="base">
+                <a:lnSpc>
+                  <a:spcPct val="90000"/>
+                </a:lnSpc>
+                <a:spcBef>
+                  <a:spcPct val="0"/>
+                </a:spcBef>
+                <a:spcAft>
+                  <a:spcPct val="0"/>
+                </a:spcAft>
+              </a:pPr>
+              <a:r>
+                <a:rPr lang="en-US" sz="675">
+                  <a:solidFill>
+                    <a:schemeClr val="bg1"/>
+                  </a:solidFill>
+                </a:rPr>
+                <a:t>0</a:t>
+              </a:r>
+              <a:endParaRPr lang="en-US" sz="375">
+                <a:solidFill>
+                  <a:schemeClr val="bg1"/>
+                </a:solidFill>
+              </a:endParaRPr>
+            </a:p>
+          </p:txBody>
+        </p:sp>
+        <p:sp>
+          <p:nvSpPr>
+            <p:cNvPr id="9" name="Rounded Rectangle 8">
+              <a:extLst>
+                <a:ext uri="{FF2B5EF4-FFF2-40B4-BE49-F238E27FC236}">
+                  <a16:creationId xmlns:a16="http://schemas.microsoft.com/office/drawing/2014/main" id="{DE767035-5D5C-2A46-8789-58C7AEE8CC11}"/>
+                </a:ext>
+              </a:extLst>
+            </p:cNvPr>
+            <p:cNvSpPr/>
+            <p:nvPr/>
+          </p:nvSpPr>
+          <p:spPr bwMode="auto">
+            <a:xfrm>
+              <a:off x="1330805" y="1635094"/>
+              <a:ext cx="138128" cy="411476"/>
+            </a:xfrm>
+            <a:prstGeom prst="roundRect">
+              <a:avLst/>
+            </a:prstGeom>
+            <a:solidFill>
+              <a:schemeClr val="bg1">
+                <a:lumMod val="50000"/>
+              </a:schemeClr>
+            </a:solidFill>
+            <a:ln>
+              <a:solidFill>
+                <a:schemeClr val="bg1"/>
+              </a:solidFill>
+              <a:prstDash val="solid"/>
+              <a:headEnd type="none" w="med" len="med"/>
+              <a:tailEnd type="none" w="med" len="med"/>
+            </a:ln>
+            <a:effectLst/>
+          </p:spPr>
+          <p:style>
+            <a:lnRef idx="1">
+              <a:schemeClr val="accent5"/>
+            </a:lnRef>
+            <a:fillRef idx="3">
+              <a:schemeClr val="accent5"/>
+            </a:fillRef>
+            <a:effectRef idx="2">
+              <a:schemeClr val="accent5"/>
+            </a:effectRef>
+            <a:fontRef idx="minor">
+              <a:schemeClr val="lt1"/>
+            </a:fontRef>
+          </p:style>
+          <p:txBody>
+            <a:bodyPr vert="horz" wrap="square" lIns="0" tIns="0" rIns="0" bIns="0" numCol="1" rtlCol="0" anchor="ctr" anchorCtr="0" compatLnSpc="1">
+              <a:prstTxWarp prst="textNoShape">
+                <a:avLst/>
+              </a:prstTxWarp>
+              <a:noAutofit/>
+            </a:bodyPr>
+            <a:lstStyle/>
+            <a:p>
+              <a:pPr algn="ctr" defTabSz="685784" fontAlgn="base">
+                <a:lnSpc>
+                  <a:spcPct val="90000"/>
+                </a:lnSpc>
+                <a:spcBef>
+                  <a:spcPct val="0"/>
+                </a:spcBef>
+                <a:spcAft>
+                  <a:spcPct val="0"/>
+                </a:spcAft>
+              </a:pPr>
+              <a:r>
+                <a:rPr lang="en-US" sz="675">
+                  <a:solidFill>
+                    <a:schemeClr val="bg1"/>
+                  </a:solidFill>
+                </a:rPr>
+                <a:t>1</a:t>
+              </a:r>
+              <a:endParaRPr lang="en-US" sz="375">
+                <a:solidFill>
+                  <a:schemeClr val="bg1"/>
+                </a:solidFill>
+              </a:endParaRPr>
+            </a:p>
+          </p:txBody>
+        </p:sp>
+        <p:sp>
+          <p:nvSpPr>
+            <p:cNvPr id="10" name="Rounded Rectangle 9">
+              <a:extLst>
+                <a:ext uri="{FF2B5EF4-FFF2-40B4-BE49-F238E27FC236}">
+                  <a16:creationId xmlns:a16="http://schemas.microsoft.com/office/drawing/2014/main" id="{15201493-9B1A-684D-946C-C3B9AA01B94A}"/>
+                </a:ext>
+              </a:extLst>
+            </p:cNvPr>
+            <p:cNvSpPr/>
+            <p:nvPr/>
+          </p:nvSpPr>
+          <p:spPr bwMode="auto">
+            <a:xfrm>
+              <a:off x="1468934" y="1635094"/>
+              <a:ext cx="138128" cy="411476"/>
+            </a:xfrm>
+            <a:prstGeom prst="roundRect">
+              <a:avLst/>
+            </a:prstGeom>
+            <a:solidFill>
+              <a:schemeClr val="bg1">
+                <a:lumMod val="50000"/>
+              </a:schemeClr>
+            </a:solidFill>
+            <a:ln>
+              <a:solidFill>
+                <a:schemeClr val="bg1"/>
+              </a:solidFill>
+              <a:prstDash val="solid"/>
+              <a:headEnd type="none" w="med" len="med"/>
+              <a:tailEnd type="none" w="med" len="med"/>
+            </a:ln>
+            <a:effectLst/>
+          </p:spPr>
+          <p:style>
+            <a:lnRef idx="1">
+              <a:schemeClr val="accent5"/>
+            </a:lnRef>
+            <a:fillRef idx="3">
+              <a:schemeClr val="accent5"/>
+            </a:fillRef>
+            <a:effectRef idx="2">
+              <a:schemeClr val="accent5"/>
+            </a:effectRef>
+            <a:fontRef idx="minor">
+              <a:schemeClr val="lt1"/>
+            </a:fontRef>
+          </p:style>
+          <p:txBody>
+            <a:bodyPr vert="horz" wrap="square" lIns="0" tIns="0" rIns="0" bIns="0" numCol="1" rtlCol="0" anchor="ctr" anchorCtr="0" compatLnSpc="1">
+              <a:prstTxWarp prst="textNoShape">
+                <a:avLst/>
+              </a:prstTxWarp>
+              <a:noAutofit/>
+            </a:bodyPr>
+            <a:lstStyle/>
+            <a:p>
+              <a:pPr algn="ctr" defTabSz="685784" fontAlgn="base">
+                <a:lnSpc>
+                  <a:spcPct val="90000"/>
+                </a:lnSpc>
+                <a:spcBef>
+                  <a:spcPct val="0"/>
+                </a:spcBef>
+                <a:spcAft>
+                  <a:spcPct val="0"/>
+                </a:spcAft>
+              </a:pPr>
+              <a:r>
+                <a:rPr lang="en-US" sz="675">
+                  <a:solidFill>
+                    <a:schemeClr val="bg1"/>
+                  </a:solidFill>
+                </a:rPr>
+                <a:t>2</a:t>
+              </a:r>
+              <a:endParaRPr lang="en-US" sz="375">
+                <a:solidFill>
+                  <a:schemeClr val="bg1"/>
+                </a:solidFill>
+              </a:endParaRPr>
+            </a:p>
+          </p:txBody>
+        </p:sp>
+        <p:sp>
+          <p:nvSpPr>
+            <p:cNvPr id="11" name="Rounded Rectangle 10">
+              <a:extLst>
+                <a:ext uri="{FF2B5EF4-FFF2-40B4-BE49-F238E27FC236}">
+                  <a16:creationId xmlns:a16="http://schemas.microsoft.com/office/drawing/2014/main" id="{BC2CC101-6B77-D34F-A356-DCC7BA2EB707}"/>
+                </a:ext>
+              </a:extLst>
+            </p:cNvPr>
+            <p:cNvSpPr/>
+            <p:nvPr/>
+          </p:nvSpPr>
+          <p:spPr bwMode="auto">
+            <a:xfrm>
+              <a:off x="1606093" y="1635094"/>
+              <a:ext cx="138128" cy="411476"/>
+            </a:xfrm>
+            <a:prstGeom prst="roundRect">
+              <a:avLst/>
+            </a:prstGeom>
+            <a:solidFill>
+              <a:schemeClr val="bg1">
+                <a:lumMod val="50000"/>
+              </a:schemeClr>
+            </a:solidFill>
+            <a:ln>
+              <a:solidFill>
+                <a:schemeClr val="bg1"/>
+              </a:solidFill>
+              <a:prstDash val="solid"/>
+              <a:headEnd type="none" w="med" len="med"/>
+              <a:tailEnd type="none" w="med" len="med"/>
+            </a:ln>
+            <a:effectLst/>
+          </p:spPr>
+          <p:style>
+            <a:lnRef idx="1">
+              <a:schemeClr val="accent5"/>
+            </a:lnRef>
+            <a:fillRef idx="3">
+              <a:schemeClr val="accent5"/>
+            </a:fillRef>
+            <a:effectRef idx="2">
+              <a:schemeClr val="accent5"/>
+            </a:effectRef>
+            <a:fontRef idx="minor">
+              <a:schemeClr val="lt1"/>
+            </a:fontRef>
+          </p:style>
+          <p:txBody>
+            <a:bodyPr vert="horz" wrap="square" lIns="0" tIns="0" rIns="0" bIns="0" numCol="1" rtlCol="0" anchor="ctr" anchorCtr="0" compatLnSpc="1">
+              <a:prstTxWarp prst="textNoShape">
+                <a:avLst/>
+              </a:prstTxWarp>
+              <a:noAutofit/>
+            </a:bodyPr>
+            <a:lstStyle/>
+            <a:p>
+              <a:pPr algn="ctr" defTabSz="685784" fontAlgn="base">
+                <a:lnSpc>
+                  <a:spcPct val="90000"/>
+                </a:lnSpc>
+                <a:spcBef>
+                  <a:spcPct val="0"/>
+                </a:spcBef>
+                <a:spcAft>
+                  <a:spcPct val="0"/>
+                </a:spcAft>
+              </a:pPr>
+              <a:r>
+                <a:rPr lang="en-US" sz="675">
+                  <a:solidFill>
+                    <a:schemeClr val="bg1"/>
+                  </a:solidFill>
+                </a:rPr>
+                <a:t>3</a:t>
+              </a:r>
+              <a:endParaRPr lang="en-US" sz="375">
+                <a:solidFill>
+                  <a:schemeClr val="bg1"/>
+                </a:solidFill>
+              </a:endParaRPr>
+            </a:p>
+          </p:txBody>
+        </p:sp>
+        <p:sp>
+          <p:nvSpPr>
+            <p:cNvPr id="12" name="Rounded Rectangle 11">
+              <a:extLst>
+                <a:ext uri="{FF2B5EF4-FFF2-40B4-BE49-F238E27FC236}">
+                  <a16:creationId xmlns:a16="http://schemas.microsoft.com/office/drawing/2014/main" id="{EF26485A-6102-854A-A8BD-E887DF1F297F}"/>
+                </a:ext>
+              </a:extLst>
+            </p:cNvPr>
+            <p:cNvSpPr/>
+            <p:nvPr/>
+          </p:nvSpPr>
+          <p:spPr bwMode="auto">
+            <a:xfrm>
+              <a:off x="1744220" y="1635094"/>
+              <a:ext cx="138128" cy="411476"/>
+            </a:xfrm>
+            <a:prstGeom prst="roundRect">
+              <a:avLst/>
+            </a:prstGeom>
+            <a:solidFill>
+              <a:schemeClr val="bg1">
+                <a:lumMod val="50000"/>
+              </a:schemeClr>
+            </a:solidFill>
+            <a:ln>
+              <a:solidFill>
+                <a:schemeClr val="bg1"/>
+              </a:solidFill>
+              <a:prstDash val="solid"/>
+              <a:headEnd type="none" w="med" len="med"/>
+              <a:tailEnd type="none" w="med" len="med"/>
+            </a:ln>
+            <a:effectLst/>
+          </p:spPr>
+          <p:style>
+            <a:lnRef idx="1">
+              <a:schemeClr val="accent5"/>
+            </a:lnRef>
+            <a:fillRef idx="3">
+              <a:schemeClr val="accent5"/>
+            </a:fillRef>
+            <a:effectRef idx="2">
+              <a:schemeClr val="accent5"/>
+            </a:effectRef>
+            <a:fontRef idx="minor">
+              <a:schemeClr val="lt1"/>
+            </a:fontRef>
+          </p:style>
+          <p:txBody>
+            <a:bodyPr vert="horz" wrap="square" lIns="0" tIns="0" rIns="0" bIns="0" numCol="1" rtlCol="0" anchor="ctr" anchorCtr="0" compatLnSpc="1">
+              <a:prstTxWarp prst="textNoShape">
+                <a:avLst/>
+              </a:prstTxWarp>
+              <a:noAutofit/>
+            </a:bodyPr>
+            <a:lstStyle/>
+            <a:p>
+              <a:pPr algn="ctr" defTabSz="685784" fontAlgn="base">
+                <a:lnSpc>
+                  <a:spcPct val="90000"/>
+                </a:lnSpc>
+                <a:spcBef>
+                  <a:spcPct val="0"/>
+                </a:spcBef>
+                <a:spcAft>
+                  <a:spcPct val="0"/>
+                </a:spcAft>
+              </a:pPr>
+              <a:r>
+                <a:rPr lang="en-US" sz="675">
+                  <a:solidFill>
+                    <a:schemeClr val="bg1"/>
+                  </a:solidFill>
+                </a:rPr>
+                <a:t>4</a:t>
+              </a:r>
+              <a:endParaRPr lang="en-US" sz="375">
+                <a:solidFill>
+                  <a:schemeClr val="bg1"/>
+                </a:solidFill>
+              </a:endParaRPr>
+            </a:p>
+          </p:txBody>
+        </p:sp>
+        <p:sp>
+          <p:nvSpPr>
+            <p:cNvPr id="13" name="Rounded Rectangle 12">
+              <a:extLst>
+                <a:ext uri="{FF2B5EF4-FFF2-40B4-BE49-F238E27FC236}">
+                  <a16:creationId xmlns:a16="http://schemas.microsoft.com/office/drawing/2014/main" id="{186786E8-3AAC-984D-8604-97A619529F23}"/>
+                </a:ext>
+              </a:extLst>
+            </p:cNvPr>
+            <p:cNvSpPr/>
+            <p:nvPr/>
+          </p:nvSpPr>
+          <p:spPr bwMode="auto">
+            <a:xfrm>
+              <a:off x="1874043" y="1635094"/>
+              <a:ext cx="138128" cy="411476"/>
+            </a:xfrm>
+            <a:prstGeom prst="roundRect">
+              <a:avLst/>
+            </a:prstGeom>
+            <a:solidFill>
+              <a:schemeClr val="bg1">
+                <a:lumMod val="50000"/>
+              </a:schemeClr>
+            </a:solidFill>
+            <a:ln>
+              <a:solidFill>
+                <a:schemeClr val="bg1"/>
+              </a:solidFill>
+              <a:prstDash val="solid"/>
+              <a:headEnd type="none" w="med" len="med"/>
+              <a:tailEnd type="none" w="med" len="med"/>
+            </a:ln>
+            <a:effectLst/>
+          </p:spPr>
+          <p:style>
+            <a:lnRef idx="1">
+              <a:schemeClr val="accent5"/>
+            </a:lnRef>
+            <a:fillRef idx="3">
+              <a:schemeClr val="accent5"/>
+            </a:fillRef>
+            <a:effectRef idx="2">
+              <a:schemeClr val="accent5"/>
+            </a:effectRef>
+            <a:fontRef idx="minor">
+              <a:schemeClr val="lt1"/>
+            </a:fontRef>
+          </p:style>
+          <p:txBody>
+            <a:bodyPr vert="horz" wrap="square" lIns="0" tIns="0" rIns="0" bIns="0" numCol="1" rtlCol="0" anchor="ctr" anchorCtr="0" compatLnSpc="1">
+              <a:prstTxWarp prst="textNoShape">
+                <a:avLst/>
+              </a:prstTxWarp>
+              <a:noAutofit/>
+            </a:bodyPr>
+            <a:lstStyle/>
+            <a:p>
+              <a:pPr algn="ctr" defTabSz="685784" fontAlgn="base">
+                <a:lnSpc>
+                  <a:spcPct val="90000"/>
+                </a:lnSpc>
+                <a:spcBef>
+                  <a:spcPct val="0"/>
+                </a:spcBef>
+                <a:spcAft>
+                  <a:spcPct val="0"/>
+                </a:spcAft>
+              </a:pPr>
+              <a:r>
+                <a:rPr lang="en-US" sz="675">
+                  <a:solidFill>
+                    <a:schemeClr val="bg1"/>
+                  </a:solidFill>
+                </a:rPr>
+                <a:t>5</a:t>
+              </a:r>
+              <a:endParaRPr lang="en-US" sz="375">
+                <a:solidFill>
+                  <a:schemeClr val="bg1"/>
+                </a:solidFill>
+              </a:endParaRPr>
+            </a:p>
+          </p:txBody>
+        </p:sp>
+      </p:grpSp>
+      <p:sp>
+        <p:nvSpPr>
+          <p:cNvPr id="14" name="Rounded Rectangle 13">
+            <a:extLst>
+              <a:ext uri="{FF2B5EF4-FFF2-40B4-BE49-F238E27FC236}">
+                <a16:creationId xmlns:a16="http://schemas.microsoft.com/office/drawing/2014/main" id="{0907827F-9993-9E43-8499-CE875E70AB57}"/>
+              </a:ext>
+            </a:extLst>
+          </p:cNvPr>
+          <p:cNvSpPr/>
+          <p:nvPr/>
+        </p:nvSpPr>
+        <p:spPr>
+          <a:xfrm>
+            <a:off x="206375" y="1144478"/>
+            <a:ext cx="775045" cy="295845"/>
+          </a:xfrm>
+          <a:prstGeom prst="roundRect">
+            <a:avLst/>
+          </a:prstGeom>
+          <a:solidFill>
+            <a:schemeClr val="accent2">
+              <a:lumMod val="75000"/>
+            </a:schemeClr>
+          </a:solidFill>
+          <a:ln>
+            <a:noFill/>
+          </a:ln>
+          <a:effectLst>
+            <a:outerShdw blurRad="50800" dist="38100" dir="5400000" algn="t" rotWithShape="0">
+              <a:prstClr val="black">
+                <a:alpha val="40000"/>
+              </a:prstClr>
+            </a:outerShdw>
+          </a:effectLst>
+        </p:spPr>
+        <p:style>
+          <a:lnRef idx="2">
+            <a:schemeClr val="accent1">
+              <a:shade val="50000"/>
+            </a:schemeClr>
+          </a:lnRef>
+          <a:fillRef idx="1">
+            <a:schemeClr val="accent1"/>
+          </a:fillRef>
+          <a:effectRef idx="0">
+            <a:schemeClr val="accent1"/>
+          </a:effectRef>
+          <a:fontRef idx="minor">
+            <a:schemeClr val="lt1"/>
+          </a:fontRef>
+        </p:style>
+        <p:txBody>
+          <a:bodyPr rtlCol="0" anchor="t"/>
+          <a:lstStyle/>
+          <a:p>
+            <a:pPr algn="ctr" defTabSz="514350"/>
+            <a:r>
+              <a:rPr lang="en-US" sz="750" dirty="0">
+                <a:solidFill>
+                  <a:prstClr val="white"/>
+                </a:solidFill>
+                <a:latin typeface="Arial"/>
+              </a:rPr>
+              <a:t>Producer</a:t>
+            </a:r>
+          </a:p>
+        </p:txBody>
+      </p:sp>
+      <p:sp>
+        <p:nvSpPr>
+          <p:cNvPr id="16" name="Rounded Rectangle 15">
+            <a:extLst>
+              <a:ext uri="{FF2B5EF4-FFF2-40B4-BE49-F238E27FC236}">
+                <a16:creationId xmlns:a16="http://schemas.microsoft.com/office/drawing/2014/main" id="{47C7A852-690D-B048-850D-725B358B924C}"/>
+              </a:ext>
+            </a:extLst>
+          </p:cNvPr>
+          <p:cNvSpPr/>
+          <p:nvPr/>
+        </p:nvSpPr>
+        <p:spPr>
+          <a:xfrm>
+            <a:off x="3718934" y="1481242"/>
+            <a:ext cx="994405" cy="292973"/>
+          </a:xfrm>
+          <a:prstGeom prst="roundRect">
+            <a:avLst/>
+          </a:prstGeom>
+          <a:solidFill>
+            <a:srgbClr val="7030A0"/>
+          </a:solidFill>
+          <a:ln>
+            <a:noFill/>
+          </a:ln>
+          <a:effectLst>
+            <a:outerShdw blurRad="50800" dist="38100" dir="5400000" algn="t" rotWithShape="0">
+              <a:prstClr val="black">
+                <a:alpha val="40000"/>
+              </a:prstClr>
+            </a:outerShdw>
+          </a:effectLst>
+        </p:spPr>
+        <p:style>
+          <a:lnRef idx="2">
+            <a:schemeClr val="accent1">
+              <a:shade val="50000"/>
+            </a:schemeClr>
+          </a:lnRef>
+          <a:fillRef idx="1">
+            <a:schemeClr val="accent1"/>
+          </a:fillRef>
+          <a:effectRef idx="0">
+            <a:schemeClr val="accent1"/>
+          </a:effectRef>
+          <a:fontRef idx="minor">
+            <a:schemeClr val="lt1"/>
+          </a:fontRef>
+        </p:style>
+        <p:txBody>
+          <a:bodyPr rtlCol="0" anchor="t"/>
+          <a:lstStyle/>
+          <a:p>
+            <a:pPr algn="ctr" defTabSz="514350"/>
+            <a:r>
+              <a:rPr lang="en-US" sz="750">
+                <a:solidFill>
+                  <a:prstClr val="white"/>
+                </a:solidFill>
+                <a:latin typeface="Arial"/>
+              </a:rPr>
+              <a:t>Mirror Maker 2.0</a:t>
+            </a:r>
+          </a:p>
+        </p:txBody>
+      </p:sp>
+      <p:cxnSp>
+        <p:nvCxnSpPr>
+          <p:cNvPr id="18" name="Straight Arrow Connector 17">
+            <a:extLst>
+              <a:ext uri="{FF2B5EF4-FFF2-40B4-BE49-F238E27FC236}">
+                <a16:creationId xmlns:a16="http://schemas.microsoft.com/office/drawing/2014/main" id="{466F4988-4EE2-2848-821F-FEC9E74218EA}"/>
+              </a:ext>
+            </a:extLst>
+          </p:cNvPr>
+          <p:cNvCxnSpPr>
+            <a:cxnSpLocks/>
+          </p:cNvCxnSpPr>
+          <p:nvPr/>
+        </p:nvCxnSpPr>
+        <p:spPr>
+          <a:xfrm>
+            <a:off x="844260" y="926274"/>
+            <a:ext cx="0" cy="2208850"/>
+          </a:xfrm>
+          <a:prstGeom prst="straightConnector1">
+            <a:avLst/>
+          </a:prstGeom>
+          <a:ln>
+            <a:solidFill>
+              <a:schemeClr val="accent2">
+                <a:lumMod val="75000"/>
+              </a:schemeClr>
+            </a:solidFill>
+            <a:tailEnd type="none"/>
+          </a:ln>
+          <a:effectLst/>
+        </p:spPr>
+        <p:style>
+          <a:lnRef idx="2">
+            <a:schemeClr val="accent1"/>
+          </a:lnRef>
+          <a:fillRef idx="0">
+            <a:schemeClr val="accent1"/>
+          </a:fillRef>
+          <a:effectRef idx="1">
+            <a:schemeClr val="accent1"/>
+          </a:effectRef>
+          <a:fontRef idx="minor">
+            <a:schemeClr val="tx1"/>
+          </a:fontRef>
+        </p:style>
+      </p:cxnSp>
+      <p:cxnSp>
+        <p:nvCxnSpPr>
+          <p:cNvPr id="23" name="Elbow Connector 22">
+            <a:extLst>
+              <a:ext uri="{FF2B5EF4-FFF2-40B4-BE49-F238E27FC236}">
+                <a16:creationId xmlns:a16="http://schemas.microsoft.com/office/drawing/2014/main" id="{4703EB7A-DE4F-714E-A139-2F7932178438}"/>
+              </a:ext>
+            </a:extLst>
+          </p:cNvPr>
+          <p:cNvCxnSpPr>
+            <a:cxnSpLocks/>
+            <a:stCxn id="14" idx="3"/>
+            <a:endCxn id="13" idx="0"/>
+          </p:cNvCxnSpPr>
+          <p:nvPr/>
+        </p:nvCxnSpPr>
+        <p:spPr>
+          <a:xfrm>
+            <a:off x="981420" y="1292401"/>
+            <a:ext cx="749460" cy="907413"/>
+          </a:xfrm>
+          <a:prstGeom prst="bentConnector2">
+            <a:avLst/>
+          </a:prstGeom>
+          <a:ln w="12700">
+            <a:solidFill>
+              <a:schemeClr val="accent2">
+                <a:lumMod val="75000"/>
+              </a:schemeClr>
+            </a:solidFill>
+            <a:tailEnd type="triangle"/>
+          </a:ln>
+          <a:effectLst/>
+        </p:spPr>
+        <p:style>
+          <a:lnRef idx="2">
+            <a:schemeClr val="accent1"/>
+          </a:lnRef>
+          <a:fillRef idx="0">
+            <a:schemeClr val="accent1"/>
+          </a:fillRef>
+          <a:effectRef idx="1">
+            <a:schemeClr val="accent1"/>
+          </a:effectRef>
+          <a:fontRef idx="minor">
+            <a:schemeClr val="tx1"/>
+          </a:fontRef>
+        </p:style>
+      </p:cxnSp>
+      <p:sp>
+        <p:nvSpPr>
+          <p:cNvPr id="26" name="TextBox 25">
+            <a:extLst>
+              <a:ext uri="{FF2B5EF4-FFF2-40B4-BE49-F238E27FC236}">
+                <a16:creationId xmlns:a16="http://schemas.microsoft.com/office/drawing/2014/main" id="{331ACA92-40EC-6142-B96D-B5403E327BFB}"/>
+              </a:ext>
+            </a:extLst>
+          </p:cNvPr>
+          <p:cNvSpPr txBox="1"/>
+          <p:nvPr/>
+        </p:nvSpPr>
+        <p:spPr>
+          <a:xfrm>
+            <a:off x="599544" y="687050"/>
+            <a:ext cx="473206" cy="300082"/>
+          </a:xfrm>
+          <a:prstGeom prst="rect">
+            <a:avLst/>
+          </a:prstGeom>
+          <a:noFill/>
+        </p:spPr>
+        <p:txBody>
+          <a:bodyPr wrap="none" rtlCol="0">
+            <a:spAutoFit/>
+          </a:bodyPr>
+          <a:lstStyle/>
+          <a:p>
+            <a:r>
+              <a:rPr lang="en-US" dirty="0"/>
+              <a:t>ts-1</a:t>
+            </a:r>
+            <a:endParaRPr dirty="0"/>
+          </a:p>
+        </p:txBody>
+      </p:sp>
+      <p:sp>
+        <p:nvSpPr>
+          <p:cNvPr id="27" name="TextBox 26">
+            <a:extLst>
+              <a:ext uri="{FF2B5EF4-FFF2-40B4-BE49-F238E27FC236}">
+                <a16:creationId xmlns:a16="http://schemas.microsoft.com/office/drawing/2014/main" id="{DE8AD4E9-E7C4-CB49-9491-A3376921883D}"/>
+              </a:ext>
+            </a:extLst>
+          </p:cNvPr>
+          <p:cNvSpPr txBox="1"/>
+          <p:nvPr/>
+        </p:nvSpPr>
+        <p:spPr>
+          <a:xfrm>
+            <a:off x="1496526" y="687050"/>
+            <a:ext cx="473206" cy="300082"/>
+          </a:xfrm>
+          <a:prstGeom prst="rect">
+            <a:avLst/>
+          </a:prstGeom>
+          <a:noFill/>
+        </p:spPr>
+        <p:txBody>
+          <a:bodyPr wrap="none" rtlCol="0">
+            <a:spAutoFit/>
+          </a:bodyPr>
+          <a:lstStyle/>
+          <a:p>
+            <a:r>
+              <a:rPr lang="en-US" dirty="0"/>
+              <a:t>ts-2</a:t>
+            </a:r>
+            <a:endParaRPr dirty="0"/>
+          </a:p>
+        </p:txBody>
+      </p:sp>
+      <p:sp>
+        <p:nvSpPr>
+          <p:cNvPr id="28" name="TextBox 27">
+            <a:extLst>
+              <a:ext uri="{FF2B5EF4-FFF2-40B4-BE49-F238E27FC236}">
+                <a16:creationId xmlns:a16="http://schemas.microsoft.com/office/drawing/2014/main" id="{F8F20A21-AB0A-0245-8DB9-799E53138B23}"/>
+              </a:ext>
+            </a:extLst>
+          </p:cNvPr>
+          <p:cNvSpPr txBox="1"/>
+          <p:nvPr/>
+        </p:nvSpPr>
+        <p:spPr>
+          <a:xfrm>
+            <a:off x="5672294" y="687050"/>
+            <a:ext cx="473206" cy="300082"/>
+          </a:xfrm>
+          <a:prstGeom prst="rect">
+            <a:avLst/>
+          </a:prstGeom>
+          <a:noFill/>
+        </p:spPr>
+        <p:txBody>
+          <a:bodyPr wrap="none" rtlCol="0">
+            <a:spAutoFit/>
+          </a:bodyPr>
+          <a:lstStyle/>
+          <a:p>
+            <a:r>
+              <a:rPr lang="en-US" dirty="0"/>
+              <a:t>ts-3</a:t>
+            </a:r>
+            <a:endParaRPr dirty="0"/>
+          </a:p>
+        </p:txBody>
+      </p:sp>
+      <p:sp>
+        <p:nvSpPr>
+          <p:cNvPr id="29" name="TextBox 28">
+            <a:extLst>
+              <a:ext uri="{FF2B5EF4-FFF2-40B4-BE49-F238E27FC236}">
+                <a16:creationId xmlns:a16="http://schemas.microsoft.com/office/drawing/2014/main" id="{FE9C729E-8C71-AB4E-8AD4-D37B1693DDA9}"/>
+              </a:ext>
+            </a:extLst>
+          </p:cNvPr>
+          <p:cNvSpPr txBox="1"/>
+          <p:nvPr/>
+        </p:nvSpPr>
+        <p:spPr>
+          <a:xfrm>
+            <a:off x="7013414" y="687050"/>
+            <a:ext cx="473206" cy="300082"/>
+          </a:xfrm>
+          <a:prstGeom prst="rect">
+            <a:avLst/>
+          </a:prstGeom>
+          <a:noFill/>
+        </p:spPr>
+        <p:txBody>
+          <a:bodyPr wrap="none" rtlCol="0">
+            <a:spAutoFit/>
+          </a:bodyPr>
+          <a:lstStyle/>
+          <a:p>
+            <a:r>
+              <a:rPr lang="en-US" dirty="0"/>
+              <a:t>ts-4</a:t>
+            </a:r>
+            <a:endParaRPr dirty="0"/>
+          </a:p>
+        </p:txBody>
+      </p:sp>
+      <p:cxnSp>
+        <p:nvCxnSpPr>
+          <p:cNvPr id="30" name="Straight Arrow Connector 29">
+            <a:extLst>
+              <a:ext uri="{FF2B5EF4-FFF2-40B4-BE49-F238E27FC236}">
+                <a16:creationId xmlns:a16="http://schemas.microsoft.com/office/drawing/2014/main" id="{6EBDD2C9-41B6-D945-8CA0-278BF280D1D3}"/>
+              </a:ext>
+            </a:extLst>
+          </p:cNvPr>
+          <p:cNvCxnSpPr>
+            <a:cxnSpLocks/>
+          </p:cNvCxnSpPr>
+          <p:nvPr/>
+        </p:nvCxnSpPr>
+        <p:spPr>
+          <a:xfrm>
+            <a:off x="1770069" y="941590"/>
+            <a:ext cx="0" cy="2208850"/>
+          </a:xfrm>
+          <a:prstGeom prst="straightConnector1">
+            <a:avLst/>
+          </a:prstGeom>
+          <a:ln>
+            <a:solidFill>
+              <a:schemeClr val="accent2">
+                <a:lumMod val="75000"/>
+              </a:schemeClr>
+            </a:solidFill>
+            <a:tailEnd type="none"/>
+          </a:ln>
+          <a:effectLst/>
+        </p:spPr>
+        <p:style>
+          <a:lnRef idx="2">
+            <a:schemeClr val="accent1"/>
+          </a:lnRef>
+          <a:fillRef idx="0">
+            <a:schemeClr val="accent1"/>
+          </a:fillRef>
+          <a:effectRef idx="1">
+            <a:schemeClr val="accent1"/>
+          </a:effectRef>
+          <a:fontRef idx="minor">
+            <a:schemeClr val="tx1"/>
+          </a:fontRef>
+        </p:style>
+      </p:cxnSp>
+      <p:cxnSp>
+        <p:nvCxnSpPr>
+          <p:cNvPr id="31" name="Straight Arrow Connector 30">
+            <a:extLst>
+              <a:ext uri="{FF2B5EF4-FFF2-40B4-BE49-F238E27FC236}">
+                <a16:creationId xmlns:a16="http://schemas.microsoft.com/office/drawing/2014/main" id="{28975729-A979-4449-83DE-8D95AA4F7863}"/>
+              </a:ext>
+            </a:extLst>
+          </p:cNvPr>
+          <p:cNvCxnSpPr>
+            <a:cxnSpLocks/>
+          </p:cNvCxnSpPr>
+          <p:nvPr/>
+        </p:nvCxnSpPr>
+        <p:spPr>
+          <a:xfrm>
+            <a:off x="5856645" y="941590"/>
+            <a:ext cx="0" cy="2208850"/>
+          </a:xfrm>
+          <a:prstGeom prst="straightConnector1">
+            <a:avLst/>
+          </a:prstGeom>
+          <a:ln>
+            <a:solidFill>
+              <a:schemeClr val="accent2">
+                <a:lumMod val="75000"/>
+              </a:schemeClr>
+            </a:solidFill>
+            <a:tailEnd type="none"/>
+          </a:ln>
+          <a:effectLst/>
+        </p:spPr>
+        <p:style>
+          <a:lnRef idx="2">
+            <a:schemeClr val="accent1"/>
+          </a:lnRef>
+          <a:fillRef idx="0">
+            <a:schemeClr val="accent1"/>
+          </a:fillRef>
+          <a:effectRef idx="1">
+            <a:schemeClr val="accent1"/>
+          </a:effectRef>
+          <a:fontRef idx="minor">
+            <a:schemeClr val="tx1"/>
+          </a:fontRef>
+        </p:style>
+      </p:cxnSp>
+      <p:cxnSp>
+        <p:nvCxnSpPr>
+          <p:cNvPr id="32" name="Straight Arrow Connector 31">
+            <a:extLst>
+              <a:ext uri="{FF2B5EF4-FFF2-40B4-BE49-F238E27FC236}">
+                <a16:creationId xmlns:a16="http://schemas.microsoft.com/office/drawing/2014/main" id="{084DDADE-B90F-7041-96B0-DD684157D7D3}"/>
+              </a:ext>
+            </a:extLst>
+          </p:cNvPr>
+          <p:cNvCxnSpPr>
+            <a:cxnSpLocks/>
+          </p:cNvCxnSpPr>
+          <p:nvPr/>
+        </p:nvCxnSpPr>
+        <p:spPr>
+          <a:xfrm>
+            <a:off x="7250017" y="941590"/>
+            <a:ext cx="0" cy="2208850"/>
+          </a:xfrm>
+          <a:prstGeom prst="straightConnector1">
+            <a:avLst/>
+          </a:prstGeom>
+          <a:ln>
+            <a:solidFill>
+              <a:schemeClr val="accent2">
+                <a:lumMod val="75000"/>
+              </a:schemeClr>
+            </a:solidFill>
+            <a:tailEnd type="none"/>
+          </a:ln>
+          <a:effectLst/>
+        </p:spPr>
+        <p:style>
+          <a:lnRef idx="2">
+            <a:schemeClr val="accent1"/>
+          </a:lnRef>
+          <a:fillRef idx="0">
+            <a:schemeClr val="accent1"/>
+          </a:fillRef>
+          <a:effectRef idx="1">
+            <a:schemeClr val="accent1"/>
+          </a:effectRef>
+          <a:fontRef idx="minor">
+            <a:schemeClr val="tx1"/>
+          </a:fontRef>
+        </p:style>
+      </p:cxnSp>
+      <p:sp>
+        <p:nvSpPr>
+          <p:cNvPr id="15" name="Rounded Rectangle 14">
+            <a:extLst>
+              <a:ext uri="{FF2B5EF4-FFF2-40B4-BE49-F238E27FC236}">
+                <a16:creationId xmlns:a16="http://schemas.microsoft.com/office/drawing/2014/main" id="{EE654857-8786-C641-85B2-1EB43F57CC3C}"/>
+              </a:ext>
+            </a:extLst>
+          </p:cNvPr>
+          <p:cNvSpPr/>
+          <p:nvPr/>
+        </p:nvSpPr>
+        <p:spPr>
+          <a:xfrm>
+            <a:off x="7099097" y="1209063"/>
+            <a:ext cx="775045" cy="295845"/>
+          </a:xfrm>
+          <a:prstGeom prst="roundRect">
+            <a:avLst/>
+          </a:prstGeom>
+          <a:solidFill>
+            <a:srgbClr val="00B050"/>
+          </a:solidFill>
+          <a:ln>
+            <a:noFill/>
+          </a:ln>
+          <a:effectLst>
+            <a:outerShdw blurRad="50800" dist="38100" dir="5400000" algn="t" rotWithShape="0">
+              <a:prstClr val="black">
+                <a:alpha val="40000"/>
+              </a:prstClr>
+            </a:outerShdw>
+          </a:effectLst>
+        </p:spPr>
+        <p:style>
+          <a:lnRef idx="2">
+            <a:schemeClr val="accent1">
+              <a:shade val="50000"/>
+            </a:schemeClr>
+          </a:lnRef>
+          <a:fillRef idx="1">
+            <a:schemeClr val="accent1"/>
+          </a:fillRef>
+          <a:effectRef idx="0">
+            <a:schemeClr val="accent1"/>
+          </a:effectRef>
+          <a:fontRef idx="minor">
+            <a:schemeClr val="lt1"/>
+          </a:fontRef>
+        </p:style>
+        <p:txBody>
+          <a:bodyPr rtlCol="0" anchor="t"/>
+          <a:lstStyle/>
+          <a:p>
+            <a:pPr algn="ctr" defTabSz="514350"/>
+            <a:r>
+              <a:rPr lang="en-US" sz="750" dirty="0">
+                <a:solidFill>
+                  <a:prstClr val="white"/>
+                </a:solidFill>
+                <a:latin typeface="Arial"/>
+              </a:rPr>
+              <a:t>Consumer</a:t>
+            </a:r>
+          </a:p>
+        </p:txBody>
+      </p:sp>
+      <p:sp>
+        <p:nvSpPr>
+          <p:cNvPr id="40" name="Rounded Rectangle 39">
+            <a:extLst>
+              <a:ext uri="{FF2B5EF4-FFF2-40B4-BE49-F238E27FC236}">
+                <a16:creationId xmlns:a16="http://schemas.microsoft.com/office/drawing/2014/main" id="{ADBE9AA5-FFB1-694A-A7FE-B4555753FAA9}"/>
+              </a:ext>
+            </a:extLst>
+          </p:cNvPr>
+          <p:cNvSpPr/>
+          <p:nvPr/>
+        </p:nvSpPr>
+        <p:spPr bwMode="auto">
+          <a:xfrm>
+            <a:off x="5156451" y="2191998"/>
+            <a:ext cx="138128" cy="411476"/>
+          </a:xfrm>
+          <a:prstGeom prst="roundRect">
+            <a:avLst/>
+          </a:prstGeom>
+          <a:solidFill>
+            <a:schemeClr val="bg1">
+              <a:lumMod val="50000"/>
+            </a:schemeClr>
+          </a:solidFill>
+          <a:ln>
+            <a:solidFill>
+              <a:schemeClr val="bg1"/>
+            </a:solidFill>
+            <a:prstDash val="solid"/>
+            <a:headEnd type="none" w="med" len="med"/>
+            <a:tailEnd type="none" w="med" len="med"/>
+          </a:ln>
+          <a:effectLst/>
+        </p:spPr>
+        <p:style>
+          <a:lnRef idx="1">
+            <a:schemeClr val="accent5"/>
+          </a:lnRef>
+          <a:fillRef idx="3">
+            <a:schemeClr val="accent5"/>
+          </a:fillRef>
+          <a:effectRef idx="2">
+            <a:schemeClr val="accent5"/>
+          </a:effectRef>
+          <a:fontRef idx="minor">
+            <a:schemeClr val="lt1"/>
+          </a:fontRef>
+        </p:style>
+        <p:txBody>
+          <a:bodyPr vert="horz" wrap="square" lIns="0" tIns="0" rIns="0" bIns="0" numCol="1" rtlCol="0" anchor="ctr" anchorCtr="0" compatLnSpc="1">
+            <a:prstTxWarp prst="textNoShape">
+              <a:avLst/>
+            </a:prstTxWarp>
+            <a:noAutofit/>
+          </a:bodyPr>
+          <a:lstStyle/>
+          <a:p>
+            <a:pPr algn="ctr" defTabSz="685784" fontAlgn="base">
+              <a:lnSpc>
+                <a:spcPct val="90000"/>
+              </a:lnSpc>
+              <a:spcBef>
+                <a:spcPct val="0"/>
+              </a:spcBef>
+              <a:spcAft>
+                <a:spcPct val="0"/>
+              </a:spcAft>
+            </a:pPr>
+            <a:r>
+              <a:rPr lang="en-US" sz="675" dirty="0">
+                <a:solidFill>
+                  <a:schemeClr val="bg1"/>
+                </a:solidFill>
+              </a:rPr>
+              <a:t>10</a:t>
+            </a:r>
+            <a:endParaRPr lang="en-US" sz="375" dirty="0">
+              <a:solidFill>
+                <a:schemeClr val="bg1"/>
+              </a:solidFill>
+            </a:endParaRPr>
+          </a:p>
+        </p:txBody>
+      </p:sp>
+      <p:sp>
+        <p:nvSpPr>
+          <p:cNvPr id="41" name="Rounded Rectangle 40">
+            <a:extLst>
+              <a:ext uri="{FF2B5EF4-FFF2-40B4-BE49-F238E27FC236}">
+                <a16:creationId xmlns:a16="http://schemas.microsoft.com/office/drawing/2014/main" id="{52214948-3E3F-894D-8B56-407E82C4F31E}"/>
+              </a:ext>
+            </a:extLst>
+          </p:cNvPr>
+          <p:cNvSpPr/>
+          <p:nvPr/>
+        </p:nvSpPr>
+        <p:spPr bwMode="auto">
+          <a:xfrm>
+            <a:off x="5293609" y="2191998"/>
+            <a:ext cx="138128" cy="411476"/>
+          </a:xfrm>
+          <a:prstGeom prst="roundRect">
+            <a:avLst/>
+          </a:prstGeom>
+          <a:solidFill>
+            <a:schemeClr val="bg1">
+              <a:lumMod val="50000"/>
+            </a:schemeClr>
+          </a:solidFill>
+          <a:ln>
+            <a:solidFill>
+              <a:schemeClr val="bg1"/>
+            </a:solidFill>
+            <a:prstDash val="solid"/>
+            <a:headEnd type="none" w="med" len="med"/>
+            <a:tailEnd type="none" w="med" len="med"/>
+          </a:ln>
+          <a:effectLst/>
+        </p:spPr>
+        <p:style>
+          <a:lnRef idx="1">
+            <a:schemeClr val="accent5"/>
+          </a:lnRef>
+          <a:fillRef idx="3">
+            <a:schemeClr val="accent5"/>
+          </a:fillRef>
+          <a:effectRef idx="2">
+            <a:schemeClr val="accent5"/>
+          </a:effectRef>
+          <a:fontRef idx="minor">
+            <a:schemeClr val="lt1"/>
+          </a:fontRef>
+        </p:style>
+        <p:txBody>
+          <a:bodyPr vert="horz" wrap="square" lIns="0" tIns="0" rIns="0" bIns="0" numCol="1" rtlCol="0" anchor="ctr" anchorCtr="0" compatLnSpc="1">
+            <a:prstTxWarp prst="textNoShape">
+              <a:avLst/>
+            </a:prstTxWarp>
+            <a:noAutofit/>
+          </a:bodyPr>
+          <a:lstStyle/>
+          <a:p>
+            <a:pPr algn="ctr" defTabSz="685784" fontAlgn="base">
+              <a:lnSpc>
+                <a:spcPct val="90000"/>
+              </a:lnSpc>
+              <a:spcBef>
+                <a:spcPct val="0"/>
+              </a:spcBef>
+              <a:spcAft>
+                <a:spcPct val="0"/>
+              </a:spcAft>
+            </a:pPr>
+            <a:r>
+              <a:rPr lang="en-US" sz="675" dirty="0">
+                <a:solidFill>
+                  <a:schemeClr val="bg1"/>
+                </a:solidFill>
+              </a:rPr>
+              <a:t>11</a:t>
+            </a:r>
+            <a:endParaRPr lang="en-US" sz="375" dirty="0">
+              <a:solidFill>
+                <a:schemeClr val="bg1"/>
+              </a:solidFill>
+            </a:endParaRPr>
+          </a:p>
+        </p:txBody>
+      </p:sp>
+      <p:sp>
+        <p:nvSpPr>
+          <p:cNvPr id="42" name="Rounded Rectangle 41">
+            <a:extLst>
+              <a:ext uri="{FF2B5EF4-FFF2-40B4-BE49-F238E27FC236}">
+                <a16:creationId xmlns:a16="http://schemas.microsoft.com/office/drawing/2014/main" id="{A13CE97E-0E5E-4E4D-8CA1-620EB4B8BA47}"/>
+              </a:ext>
+            </a:extLst>
+          </p:cNvPr>
+          <p:cNvSpPr/>
+          <p:nvPr/>
+        </p:nvSpPr>
+        <p:spPr bwMode="auto">
+          <a:xfrm>
+            <a:off x="5431738" y="2191998"/>
+            <a:ext cx="138128" cy="411476"/>
+          </a:xfrm>
+          <a:prstGeom prst="roundRect">
+            <a:avLst/>
+          </a:prstGeom>
+          <a:solidFill>
+            <a:schemeClr val="bg1">
+              <a:lumMod val="50000"/>
+            </a:schemeClr>
+          </a:solidFill>
+          <a:ln>
+            <a:solidFill>
+              <a:schemeClr val="bg1"/>
+            </a:solidFill>
+            <a:prstDash val="solid"/>
+            <a:headEnd type="none" w="med" len="med"/>
+            <a:tailEnd type="none" w="med" len="med"/>
+          </a:ln>
+          <a:effectLst/>
+        </p:spPr>
+        <p:style>
+          <a:lnRef idx="1">
+            <a:schemeClr val="accent5"/>
+          </a:lnRef>
+          <a:fillRef idx="3">
+            <a:schemeClr val="accent5"/>
+          </a:fillRef>
+          <a:effectRef idx="2">
+            <a:schemeClr val="accent5"/>
+          </a:effectRef>
+          <a:fontRef idx="minor">
+            <a:schemeClr val="lt1"/>
+          </a:fontRef>
+        </p:style>
+        <p:txBody>
+          <a:bodyPr vert="horz" wrap="square" lIns="0" tIns="0" rIns="0" bIns="0" numCol="1" rtlCol="0" anchor="ctr" anchorCtr="0" compatLnSpc="1">
+            <a:prstTxWarp prst="textNoShape">
+              <a:avLst/>
+            </a:prstTxWarp>
+            <a:noAutofit/>
+          </a:bodyPr>
+          <a:lstStyle/>
+          <a:p>
+            <a:pPr algn="ctr" defTabSz="685784" fontAlgn="base">
+              <a:lnSpc>
+                <a:spcPct val="90000"/>
+              </a:lnSpc>
+              <a:spcBef>
+                <a:spcPct val="0"/>
+              </a:spcBef>
+              <a:spcAft>
+                <a:spcPct val="0"/>
+              </a:spcAft>
+            </a:pPr>
+            <a:r>
+              <a:rPr lang="en-US" sz="675" dirty="0">
+                <a:solidFill>
+                  <a:schemeClr val="bg1"/>
+                </a:solidFill>
+              </a:rPr>
+              <a:t>12</a:t>
+            </a:r>
+            <a:endParaRPr lang="en-US" sz="375" dirty="0">
+              <a:solidFill>
+                <a:schemeClr val="bg1"/>
+              </a:solidFill>
+            </a:endParaRPr>
+          </a:p>
+        </p:txBody>
+      </p:sp>
+      <p:sp>
+        <p:nvSpPr>
+          <p:cNvPr id="43" name="Rounded Rectangle 42">
+            <a:extLst>
+              <a:ext uri="{FF2B5EF4-FFF2-40B4-BE49-F238E27FC236}">
+                <a16:creationId xmlns:a16="http://schemas.microsoft.com/office/drawing/2014/main" id="{0D847C54-A5CD-5144-98F9-BDD6926352FB}"/>
+              </a:ext>
+            </a:extLst>
+          </p:cNvPr>
+          <p:cNvSpPr/>
+          <p:nvPr/>
+        </p:nvSpPr>
+        <p:spPr bwMode="auto">
+          <a:xfrm>
+            <a:off x="5572263" y="2190018"/>
+            <a:ext cx="138128" cy="411476"/>
+          </a:xfrm>
+          <a:prstGeom prst="roundRect">
+            <a:avLst/>
+          </a:prstGeom>
+          <a:solidFill>
+            <a:schemeClr val="bg1">
+              <a:lumMod val="50000"/>
+            </a:schemeClr>
+          </a:solidFill>
+          <a:ln>
+            <a:solidFill>
+              <a:schemeClr val="bg1"/>
+            </a:solidFill>
+            <a:prstDash val="solid"/>
+            <a:headEnd type="none" w="med" len="med"/>
+            <a:tailEnd type="none" w="med" len="med"/>
+          </a:ln>
+          <a:effectLst/>
+        </p:spPr>
+        <p:style>
+          <a:lnRef idx="1">
+            <a:schemeClr val="accent5"/>
+          </a:lnRef>
+          <a:fillRef idx="3">
+            <a:schemeClr val="accent5"/>
+          </a:fillRef>
+          <a:effectRef idx="2">
+            <a:schemeClr val="accent5"/>
+          </a:effectRef>
+          <a:fontRef idx="minor">
+            <a:schemeClr val="lt1"/>
+          </a:fontRef>
+        </p:style>
+        <p:txBody>
+          <a:bodyPr vert="horz" wrap="square" lIns="0" tIns="0" rIns="0" bIns="0" numCol="1" rtlCol="0" anchor="ctr" anchorCtr="0" compatLnSpc="1">
+            <a:prstTxWarp prst="textNoShape">
+              <a:avLst/>
+            </a:prstTxWarp>
+            <a:noAutofit/>
+          </a:bodyPr>
+          <a:lstStyle/>
+          <a:p>
+            <a:pPr algn="ctr" defTabSz="685784" fontAlgn="base">
+              <a:lnSpc>
+                <a:spcPct val="90000"/>
+              </a:lnSpc>
+              <a:spcBef>
+                <a:spcPct val="0"/>
+              </a:spcBef>
+              <a:spcAft>
+                <a:spcPct val="0"/>
+              </a:spcAft>
+            </a:pPr>
+            <a:r>
+              <a:rPr lang="en-US" sz="675" dirty="0">
+                <a:solidFill>
+                  <a:schemeClr val="bg1"/>
+                </a:solidFill>
+              </a:rPr>
+              <a:t>13</a:t>
+            </a:r>
+            <a:endParaRPr lang="en-US" sz="375" dirty="0">
+              <a:solidFill>
+                <a:schemeClr val="bg1"/>
+              </a:solidFill>
+            </a:endParaRPr>
+          </a:p>
+        </p:txBody>
+      </p:sp>
+      <p:sp>
+        <p:nvSpPr>
+          <p:cNvPr id="44" name="Rounded Rectangle 43">
+            <a:extLst>
+              <a:ext uri="{FF2B5EF4-FFF2-40B4-BE49-F238E27FC236}">
+                <a16:creationId xmlns:a16="http://schemas.microsoft.com/office/drawing/2014/main" id="{E8624658-D058-9D4B-BB18-062226A8FA71}"/>
+              </a:ext>
+            </a:extLst>
+          </p:cNvPr>
+          <p:cNvSpPr/>
+          <p:nvPr/>
+        </p:nvSpPr>
+        <p:spPr bwMode="auto">
+          <a:xfrm>
+            <a:off x="5726643" y="2190021"/>
+            <a:ext cx="138128" cy="411476"/>
+          </a:xfrm>
+          <a:prstGeom prst="roundRect">
+            <a:avLst/>
+          </a:prstGeom>
+          <a:solidFill>
+            <a:schemeClr val="bg1">
+              <a:lumMod val="50000"/>
+            </a:schemeClr>
+          </a:solidFill>
+          <a:ln>
+            <a:solidFill>
+              <a:schemeClr val="bg1"/>
+            </a:solidFill>
+            <a:prstDash val="solid"/>
+            <a:headEnd type="none" w="med" len="med"/>
+            <a:tailEnd type="none" w="med" len="med"/>
+          </a:ln>
+          <a:effectLst/>
+        </p:spPr>
+        <p:style>
+          <a:lnRef idx="1">
+            <a:schemeClr val="accent5"/>
+          </a:lnRef>
+          <a:fillRef idx="3">
+            <a:schemeClr val="accent5"/>
+          </a:fillRef>
+          <a:effectRef idx="2">
+            <a:schemeClr val="accent5"/>
+          </a:effectRef>
+          <a:fontRef idx="minor">
+            <a:schemeClr val="lt1"/>
+          </a:fontRef>
+        </p:style>
+        <p:txBody>
+          <a:bodyPr vert="horz" wrap="square" lIns="0" tIns="0" rIns="0" bIns="0" numCol="1" rtlCol="0" anchor="ctr" anchorCtr="0" compatLnSpc="1">
+            <a:prstTxWarp prst="textNoShape">
+              <a:avLst/>
+            </a:prstTxWarp>
+            <a:noAutofit/>
+          </a:bodyPr>
+          <a:lstStyle/>
+          <a:p>
+            <a:pPr algn="ctr" defTabSz="685784" fontAlgn="base">
+              <a:lnSpc>
+                <a:spcPct val="90000"/>
+              </a:lnSpc>
+              <a:spcBef>
+                <a:spcPct val="0"/>
+              </a:spcBef>
+              <a:spcAft>
+                <a:spcPct val="0"/>
+              </a:spcAft>
+            </a:pPr>
+            <a:r>
+              <a:rPr lang="en-US" sz="675" dirty="0">
+                <a:solidFill>
+                  <a:schemeClr val="bg1"/>
+                </a:solidFill>
+              </a:rPr>
+              <a:t>14</a:t>
+            </a:r>
+            <a:endParaRPr lang="en-US" sz="375" dirty="0">
+              <a:solidFill>
+                <a:schemeClr val="bg1"/>
+              </a:solidFill>
+            </a:endParaRPr>
+          </a:p>
+        </p:txBody>
+      </p:sp>
+      <p:cxnSp>
+        <p:nvCxnSpPr>
+          <p:cNvPr id="45" name="Elbow Connector 44">
+            <a:extLst>
+              <a:ext uri="{FF2B5EF4-FFF2-40B4-BE49-F238E27FC236}">
+                <a16:creationId xmlns:a16="http://schemas.microsoft.com/office/drawing/2014/main" id="{4FE47FC5-EA5C-554A-BEAC-0542DEE6075E}"/>
+              </a:ext>
+            </a:extLst>
+          </p:cNvPr>
+          <p:cNvCxnSpPr>
+            <a:cxnSpLocks/>
+            <a:stCxn id="16" idx="3"/>
+            <a:endCxn id="44" idx="0"/>
+          </p:cNvCxnSpPr>
+          <p:nvPr/>
+        </p:nvCxnSpPr>
+        <p:spPr>
+          <a:xfrm>
+            <a:off x="4713339" y="1627729"/>
+            <a:ext cx="1082368" cy="562292"/>
+          </a:xfrm>
+          <a:prstGeom prst="bentConnector2">
+            <a:avLst/>
+          </a:prstGeom>
+          <a:ln w="12700">
+            <a:solidFill>
+              <a:schemeClr val="accent2">
+                <a:lumMod val="75000"/>
+              </a:schemeClr>
+            </a:solidFill>
+            <a:tailEnd type="triangle"/>
+          </a:ln>
+          <a:effectLst/>
+        </p:spPr>
+        <p:style>
+          <a:lnRef idx="2">
+            <a:schemeClr val="accent1"/>
+          </a:lnRef>
+          <a:fillRef idx="0">
+            <a:schemeClr val="accent1"/>
+          </a:fillRef>
+          <a:effectRef idx="1">
+            <a:schemeClr val="accent1"/>
+          </a:effectRef>
+          <a:fontRef idx="minor">
+            <a:schemeClr val="tx1"/>
+          </a:fontRef>
+        </p:style>
+      </p:cxnSp>
+      <p:cxnSp>
+        <p:nvCxnSpPr>
+          <p:cNvPr id="48" name="Elbow Connector 47">
+            <a:extLst>
+              <a:ext uri="{FF2B5EF4-FFF2-40B4-BE49-F238E27FC236}">
+                <a16:creationId xmlns:a16="http://schemas.microsoft.com/office/drawing/2014/main" id="{8F53110A-9DDE-A148-88EC-29E53494AA1F}"/>
+              </a:ext>
+            </a:extLst>
+          </p:cNvPr>
+          <p:cNvCxnSpPr>
+            <a:cxnSpLocks/>
+            <a:stCxn id="12" idx="0"/>
+            <a:endCxn id="16" idx="1"/>
+          </p:cNvCxnSpPr>
+          <p:nvPr/>
+        </p:nvCxnSpPr>
+        <p:spPr>
+          <a:xfrm rot="5400000" flipH="1" flipV="1">
+            <a:off x="2373953" y="854834"/>
+            <a:ext cx="572085" cy="2117877"/>
+          </a:xfrm>
+          <a:prstGeom prst="bentConnector2">
+            <a:avLst/>
+          </a:prstGeom>
+          <a:ln w="12700">
+            <a:solidFill>
+              <a:schemeClr val="accent2">
+                <a:lumMod val="75000"/>
+              </a:schemeClr>
+            </a:solidFill>
+            <a:tailEnd type="triangle"/>
+          </a:ln>
+          <a:effectLst/>
+        </p:spPr>
+        <p:style>
+          <a:lnRef idx="2">
+            <a:schemeClr val="accent1"/>
+          </a:lnRef>
+          <a:fillRef idx="0">
+            <a:schemeClr val="accent1"/>
+          </a:fillRef>
+          <a:effectRef idx="1">
+            <a:schemeClr val="accent1"/>
+          </a:effectRef>
+          <a:fontRef idx="minor">
+            <a:schemeClr val="tx1"/>
+          </a:fontRef>
+        </p:style>
+      </p:cxnSp>
+      <p:cxnSp>
+        <p:nvCxnSpPr>
+          <p:cNvPr id="51" name="Elbow Connector 50">
+            <a:extLst>
+              <a:ext uri="{FF2B5EF4-FFF2-40B4-BE49-F238E27FC236}">
+                <a16:creationId xmlns:a16="http://schemas.microsoft.com/office/drawing/2014/main" id="{8DA8A9B5-1EF7-E341-8416-8D6862EECD02}"/>
+              </a:ext>
+            </a:extLst>
+          </p:cNvPr>
+          <p:cNvCxnSpPr>
+            <a:cxnSpLocks/>
+            <a:stCxn id="43" idx="0"/>
+            <a:endCxn id="15" idx="1"/>
+          </p:cNvCxnSpPr>
+          <p:nvPr/>
+        </p:nvCxnSpPr>
+        <p:spPr>
+          <a:xfrm rot="5400000" flipH="1" flipV="1">
+            <a:off x="5953696" y="1044617"/>
+            <a:ext cx="833032" cy="1457770"/>
+          </a:xfrm>
+          <a:prstGeom prst="bentConnector2">
+            <a:avLst/>
+          </a:prstGeom>
+          <a:ln w="12700">
+            <a:solidFill>
+              <a:schemeClr val="accent2">
+                <a:lumMod val="75000"/>
+              </a:schemeClr>
+            </a:solidFill>
+            <a:tailEnd type="triangle"/>
+          </a:ln>
+          <a:effectLst/>
+        </p:spPr>
+        <p:style>
+          <a:lnRef idx="2">
+            <a:schemeClr val="accent1"/>
+          </a:lnRef>
+          <a:fillRef idx="0">
+            <a:schemeClr val="accent1"/>
+          </a:fillRef>
+          <a:effectRef idx="1">
+            <a:schemeClr val="accent1"/>
+          </a:effectRef>
+          <a:fontRef idx="minor">
+            <a:schemeClr val="tx1"/>
+          </a:fontRef>
+        </p:style>
+      </p:cxnSp>
+      <p:sp>
+        <p:nvSpPr>
+          <p:cNvPr id="54" name="TextBox 53">
+            <a:extLst>
+              <a:ext uri="{FF2B5EF4-FFF2-40B4-BE49-F238E27FC236}">
+                <a16:creationId xmlns:a16="http://schemas.microsoft.com/office/drawing/2014/main" id="{B83FC267-113A-E243-AB79-6CFAB7C91EFA}"/>
+              </a:ext>
+            </a:extLst>
+          </p:cNvPr>
+          <p:cNvSpPr txBox="1"/>
+          <p:nvPr/>
+        </p:nvSpPr>
+        <p:spPr>
+          <a:xfrm>
+            <a:off x="739282" y="3276270"/>
+            <a:ext cx="1075936" cy="507831"/>
+          </a:xfrm>
+          <a:prstGeom prst="rect">
+            <a:avLst/>
+          </a:prstGeom>
+          <a:noFill/>
+        </p:spPr>
+        <p:txBody>
+          <a:bodyPr wrap="none" rtlCol="0">
+            <a:spAutoFit/>
+          </a:bodyPr>
+          <a:lstStyle/>
+          <a:p>
+            <a:r>
+              <a:rPr lang="en-US" sz="900" dirty="0"/>
+              <a:t>time to write to </a:t>
+            </a:r>
+          </a:p>
+          <a:p>
+            <a:r>
+              <a:rPr lang="en-US" sz="900" dirty="0"/>
+              <a:t>source topic</a:t>
+            </a:r>
+          </a:p>
+          <a:p>
+            <a:r>
+              <a:rPr lang="en-US" sz="900" dirty="0"/>
+              <a:t>record timestamp</a:t>
+            </a:r>
+            <a:endParaRPr sz="900" dirty="0"/>
+          </a:p>
+        </p:txBody>
+      </p:sp>
+      <p:cxnSp>
+        <p:nvCxnSpPr>
+          <p:cNvPr id="55" name="Straight Arrow Connector 54">
+            <a:extLst>
+              <a:ext uri="{FF2B5EF4-FFF2-40B4-BE49-F238E27FC236}">
+                <a16:creationId xmlns:a16="http://schemas.microsoft.com/office/drawing/2014/main" id="{8597B556-E12F-0742-B1FB-055673B6C7EE}"/>
+              </a:ext>
+            </a:extLst>
+          </p:cNvPr>
+          <p:cNvCxnSpPr>
+            <a:cxnSpLocks/>
+          </p:cNvCxnSpPr>
+          <p:nvPr/>
+        </p:nvCxnSpPr>
+        <p:spPr>
+          <a:xfrm>
+            <a:off x="836147" y="3276270"/>
+            <a:ext cx="933922" cy="0"/>
+          </a:xfrm>
+          <a:prstGeom prst="straightConnector1">
+            <a:avLst/>
+          </a:prstGeom>
+          <a:ln>
+            <a:solidFill>
+              <a:srgbClr val="7030A0"/>
+            </a:solidFill>
+            <a:headEnd type="triangle"/>
+            <a:tailEnd type="triangle"/>
+          </a:ln>
+          <a:effectLst/>
+        </p:spPr>
+        <p:style>
+          <a:lnRef idx="2">
+            <a:schemeClr val="accent1"/>
+          </a:lnRef>
+          <a:fillRef idx="0">
+            <a:schemeClr val="accent1"/>
+          </a:fillRef>
+          <a:effectRef idx="1">
+            <a:schemeClr val="accent1"/>
+          </a:effectRef>
+          <a:fontRef idx="minor">
+            <a:schemeClr val="tx1"/>
+          </a:fontRef>
+        </p:style>
+      </p:cxnSp>
+      <p:cxnSp>
+        <p:nvCxnSpPr>
+          <p:cNvPr id="58" name="Straight Arrow Connector 57">
+            <a:extLst>
+              <a:ext uri="{FF2B5EF4-FFF2-40B4-BE49-F238E27FC236}">
+                <a16:creationId xmlns:a16="http://schemas.microsoft.com/office/drawing/2014/main" id="{9A6DC89A-BF1D-7E44-91E4-48C2688DE4E6}"/>
+              </a:ext>
+            </a:extLst>
+          </p:cNvPr>
+          <p:cNvCxnSpPr>
+            <a:cxnSpLocks/>
+          </p:cNvCxnSpPr>
+          <p:nvPr/>
+        </p:nvCxnSpPr>
+        <p:spPr>
+          <a:xfrm>
+            <a:off x="1799944" y="3276270"/>
+            <a:ext cx="3995763" cy="0"/>
+          </a:xfrm>
+          <a:prstGeom prst="straightConnector1">
+            <a:avLst/>
+          </a:prstGeom>
+          <a:ln>
+            <a:solidFill>
+              <a:srgbClr val="7030A0"/>
+            </a:solidFill>
+            <a:headEnd type="triangle"/>
+            <a:tailEnd type="triangle"/>
+          </a:ln>
+          <a:effectLst/>
+        </p:spPr>
+        <p:style>
+          <a:lnRef idx="2">
+            <a:schemeClr val="accent1"/>
+          </a:lnRef>
+          <a:fillRef idx="0">
+            <a:schemeClr val="accent1"/>
+          </a:fillRef>
+          <a:effectRef idx="1">
+            <a:schemeClr val="accent1"/>
+          </a:effectRef>
+          <a:fontRef idx="minor">
+            <a:schemeClr val="tx1"/>
+          </a:fontRef>
+        </p:style>
+      </p:cxnSp>
+      <p:sp>
+        <p:nvSpPr>
+          <p:cNvPr id="61" name="TextBox 60">
+            <a:extLst>
+              <a:ext uri="{FF2B5EF4-FFF2-40B4-BE49-F238E27FC236}">
+                <a16:creationId xmlns:a16="http://schemas.microsoft.com/office/drawing/2014/main" id="{0A9EFC4A-9B52-C543-9A25-1ED2C1EF6FB7}"/>
+              </a:ext>
+            </a:extLst>
+          </p:cNvPr>
+          <p:cNvSpPr txBox="1"/>
+          <p:nvPr/>
+        </p:nvSpPr>
+        <p:spPr>
+          <a:xfrm>
+            <a:off x="3409480" y="3286064"/>
+            <a:ext cx="1595309" cy="369332"/>
+          </a:xfrm>
+          <a:prstGeom prst="rect">
+            <a:avLst/>
+          </a:prstGeom>
+          <a:noFill/>
+        </p:spPr>
+        <p:txBody>
+          <a:bodyPr wrap="none" rtlCol="0">
+            <a:spAutoFit/>
+          </a:bodyPr>
+          <a:lstStyle/>
+          <a:p>
+            <a:r>
+              <a:rPr lang="en-US" sz="900" dirty="0"/>
+              <a:t>time to mirror to target topic</a:t>
+            </a:r>
+          </a:p>
+          <a:p>
+            <a:r>
+              <a:rPr lang="en-US" sz="900" dirty="0"/>
+              <a:t>record timestamp</a:t>
+            </a:r>
+            <a:endParaRPr sz="900" dirty="0"/>
+          </a:p>
+        </p:txBody>
+      </p:sp>
+      <p:sp>
+        <p:nvSpPr>
+          <p:cNvPr id="62" name="TextBox 61">
+            <a:extLst>
+              <a:ext uri="{FF2B5EF4-FFF2-40B4-BE49-F238E27FC236}">
+                <a16:creationId xmlns:a16="http://schemas.microsoft.com/office/drawing/2014/main" id="{CE49A3A6-881E-524B-AB01-B1C3AEA6F27D}"/>
+              </a:ext>
+            </a:extLst>
+          </p:cNvPr>
+          <p:cNvSpPr txBox="1"/>
+          <p:nvPr/>
+        </p:nvSpPr>
+        <p:spPr>
+          <a:xfrm>
+            <a:off x="4843672" y="3979063"/>
+            <a:ext cx="1646605" cy="369332"/>
+          </a:xfrm>
+          <a:prstGeom prst="rect">
+            <a:avLst/>
+          </a:prstGeom>
+          <a:noFill/>
+        </p:spPr>
+        <p:txBody>
+          <a:bodyPr wrap="none" rtlCol="0">
+            <a:spAutoFit/>
+          </a:bodyPr>
+          <a:lstStyle/>
+          <a:p>
+            <a:r>
+              <a:rPr lang="en-US" sz="900" dirty="0"/>
+              <a:t>time to get replicated record </a:t>
+            </a:r>
+          </a:p>
+          <a:p>
+            <a:r>
+              <a:rPr lang="en-US" sz="900" dirty="0"/>
+              <a:t>from source to destination</a:t>
+            </a:r>
+            <a:endParaRPr sz="900" dirty="0"/>
+          </a:p>
+        </p:txBody>
+      </p:sp>
+      <p:cxnSp>
+        <p:nvCxnSpPr>
+          <p:cNvPr id="63" name="Straight Arrow Connector 62">
+            <a:extLst>
+              <a:ext uri="{FF2B5EF4-FFF2-40B4-BE49-F238E27FC236}">
+                <a16:creationId xmlns:a16="http://schemas.microsoft.com/office/drawing/2014/main" id="{162272F5-9557-9F44-9A16-0B2DB47D26B1}"/>
+              </a:ext>
+            </a:extLst>
+          </p:cNvPr>
+          <p:cNvCxnSpPr>
+            <a:cxnSpLocks/>
+          </p:cNvCxnSpPr>
+          <p:nvPr/>
+        </p:nvCxnSpPr>
+        <p:spPr>
+          <a:xfrm flipV="1">
+            <a:off x="739282" y="3894615"/>
+            <a:ext cx="6510735" cy="39823"/>
+          </a:xfrm>
+          <a:prstGeom prst="straightConnector1">
+            <a:avLst/>
+          </a:prstGeom>
+          <a:ln>
+            <a:solidFill>
+              <a:srgbClr val="7030A0"/>
+            </a:solidFill>
+            <a:headEnd type="triangle"/>
+            <a:tailEnd type="triangle"/>
+          </a:ln>
+          <a:effectLst/>
+        </p:spPr>
+        <p:style>
+          <a:lnRef idx="2">
+            <a:schemeClr val="accent1"/>
+          </a:lnRef>
+          <a:fillRef idx="0">
+            <a:schemeClr val="accent1"/>
+          </a:fillRef>
+          <a:effectRef idx="1">
+            <a:schemeClr val="accent1"/>
+          </a:effectRef>
+          <a:fontRef idx="minor">
+            <a:schemeClr val="tx1"/>
+          </a:fontRef>
+        </p:style>
+      </p:cxnSp>
+      <p:cxnSp>
+        <p:nvCxnSpPr>
+          <p:cNvPr id="66" name="Straight Arrow Connector 65">
+            <a:extLst>
+              <a:ext uri="{FF2B5EF4-FFF2-40B4-BE49-F238E27FC236}">
+                <a16:creationId xmlns:a16="http://schemas.microsoft.com/office/drawing/2014/main" id="{EB7BA36F-8B8F-864C-9002-70D0E4F505E4}"/>
+              </a:ext>
+            </a:extLst>
+          </p:cNvPr>
+          <p:cNvCxnSpPr>
+            <a:cxnSpLocks/>
+          </p:cNvCxnSpPr>
+          <p:nvPr/>
+        </p:nvCxnSpPr>
+        <p:spPr>
+          <a:xfrm>
+            <a:off x="5903251" y="3286064"/>
+            <a:ext cx="1346766" cy="0"/>
+          </a:xfrm>
+          <a:prstGeom prst="straightConnector1">
+            <a:avLst/>
+          </a:prstGeom>
+          <a:ln>
+            <a:solidFill>
+              <a:srgbClr val="7030A0"/>
+            </a:solidFill>
+            <a:headEnd type="triangle"/>
+            <a:tailEnd type="triangle"/>
+          </a:ln>
+          <a:effectLst/>
+        </p:spPr>
+        <p:style>
+          <a:lnRef idx="2">
+            <a:schemeClr val="accent1"/>
+          </a:lnRef>
+          <a:fillRef idx="0">
+            <a:schemeClr val="accent1"/>
+          </a:fillRef>
+          <a:effectRef idx="1">
+            <a:schemeClr val="accent1"/>
+          </a:effectRef>
+          <a:fontRef idx="minor">
+            <a:schemeClr val="tx1"/>
+          </a:fontRef>
+        </p:style>
+      </p:cxnSp>
+      <p:sp>
+        <p:nvSpPr>
+          <p:cNvPr id="68" name="TextBox 67">
+            <a:extLst>
+              <a:ext uri="{FF2B5EF4-FFF2-40B4-BE49-F238E27FC236}">
+                <a16:creationId xmlns:a16="http://schemas.microsoft.com/office/drawing/2014/main" id="{50F2E47E-5160-8640-8833-49685FA9A86F}"/>
+              </a:ext>
+            </a:extLst>
+          </p:cNvPr>
+          <p:cNvSpPr txBox="1"/>
+          <p:nvPr/>
+        </p:nvSpPr>
+        <p:spPr>
+          <a:xfrm>
+            <a:off x="6016681" y="3329911"/>
+            <a:ext cx="1075936" cy="507831"/>
+          </a:xfrm>
+          <a:prstGeom prst="rect">
+            <a:avLst/>
+          </a:prstGeom>
+          <a:noFill/>
+        </p:spPr>
+        <p:txBody>
+          <a:bodyPr wrap="none" rtlCol="0">
+            <a:spAutoFit/>
+          </a:bodyPr>
+          <a:lstStyle/>
+          <a:p>
+            <a:r>
+              <a:rPr lang="en-US" sz="900" dirty="0"/>
+              <a:t>time to consume </a:t>
+            </a:r>
+          </a:p>
+          <a:p>
+            <a:r>
+              <a:rPr lang="en-US" sz="900" dirty="0"/>
+              <a:t>from topic</a:t>
+            </a:r>
+          </a:p>
+          <a:p>
+            <a:r>
+              <a:rPr lang="en-US" sz="900" dirty="0"/>
+              <a:t>record timestamp</a:t>
+            </a:r>
+            <a:endParaRPr sz="900" dirty="0"/>
+          </a:p>
+        </p:txBody>
+      </p:sp>
+    </p:spTree>
+    <p:extLst>
+      <p:ext uri="{BB962C8B-B14F-4D97-AF65-F5344CB8AC3E}">
+        <p14:creationId xmlns:p14="http://schemas.microsoft.com/office/powerpoint/2010/main" val="862692346"/>
+      </p:ext>
+    </p:extLst>
+  </p:cSld>
+  <p:clrMapOvr>
+    <a:masterClrMapping/>
+  </p:clrMapOvr>
+</p:sld>
+</file>
+
+<file path=ppt/slides/slide18.xml><?xml version="1.0" encoding="utf-8"?>
+<p:sld xmlns:a="http://schemas.openxmlformats.org/drawingml/2006/main" xmlns:r="http://schemas.openxmlformats.org/officeDocument/2006/relationships" xmlns:p="http://schemas.openxmlformats.org/presentationml/2006/main">
+  <p:cSld>
+    <p:spTree>
+      <p:nvGrpSpPr>
+        <p:cNvPr id="1" name=""/>
+        <p:cNvGrpSpPr/>
+        <p:nvPr/>
+      </p:nvGrpSpPr>
+      <p:grpSpPr>
+        <a:xfrm>
+          <a:off x="0" y="0"/>
+          <a:ext cx="0" cy="0"/>
+          <a:chOff x="0" y="0"/>
+          <a:chExt cx="0" cy="0"/>
+        </a:xfrm>
+      </p:grpSpPr>
+      <p:sp>
+        <p:nvSpPr>
+          <p:cNvPr id="2" name="Title 1">
+            <a:extLst>
+              <a:ext uri="{FF2B5EF4-FFF2-40B4-BE49-F238E27FC236}">
+                <a16:creationId xmlns:a16="http://schemas.microsoft.com/office/drawing/2014/main" id="{58169065-201E-5F42-BB75-6EA30E0A8D38}"/>
+              </a:ext>
+            </a:extLst>
+          </p:cNvPr>
+          <p:cNvSpPr>
+            <a:spLocks noGrp="1"/>
+          </p:cNvSpPr>
+          <p:nvPr>
+            <p:ph type="title"/>
+          </p:nvPr>
+        </p:nvSpPr>
+        <p:spPr/>
+        <p:txBody>
+          <a:bodyPr/>
+          <a:lstStyle/>
+          <a:p>
+            <a:r>
+              <a:rPr lang="en-US" dirty="0"/>
+              <a:t>Mirror maker monitoring</a:t>
+            </a:r>
+            <a:endParaRPr dirty="0"/>
+          </a:p>
+        </p:txBody>
+      </p:sp>
+      <p:sp>
+        <p:nvSpPr>
+          <p:cNvPr id="4" name="Slide Number Placeholder 3">
+            <a:extLst>
+              <a:ext uri="{FF2B5EF4-FFF2-40B4-BE49-F238E27FC236}">
+                <a16:creationId xmlns:a16="http://schemas.microsoft.com/office/drawing/2014/main" id="{D461EF70-49A7-3F48-A6F1-90FB6453A640}"/>
+              </a:ext>
+            </a:extLst>
+          </p:cNvPr>
+          <p:cNvSpPr>
+            <a:spLocks noGrp="1"/>
+          </p:cNvSpPr>
+          <p:nvPr>
+            <p:ph type="sldNum" sz="quarter" idx="10"/>
+          </p:nvPr>
+        </p:nvSpPr>
+        <p:spPr/>
+        <p:txBody>
+          <a:bodyPr/>
+          <a:lstStyle/>
+          <a:p>
+            <a:fld id="{2F63A97E-D605-DC42-8452-C14CD1FA87FA}" type="slidenum">
+              <a:rPr lang="en-US" smtClean="0">
+                <a:solidFill>
+                  <a:srgbClr val="5AAAFA"/>
+                </a:solidFill>
+              </a:rPr>
+              <a:pPr/>
+              <a:t>18</a:t>
             </a:fld>
             <a:endParaRPr lang="en-US">
               <a:solidFill>
@@ -30785,8 +33106,8 @@
         </p:nvSpPr>
         <p:spPr>
           <a:xfrm>
-            <a:off x="6347632" y="2081320"/>
-            <a:ext cx="1487185" cy="437889"/>
+            <a:off x="6347633" y="2081320"/>
+            <a:ext cx="1487184" cy="682081"/>
           </a:xfrm>
           <a:prstGeom prst="rect">
             <a:avLst/>
@@ -30857,7 +33178,7 @@
         </p:nvSpPr>
         <p:spPr>
           <a:xfrm>
-            <a:off x="6347632" y="2615948"/>
+            <a:off x="6347632" y="2853454"/>
             <a:ext cx="1487185" cy="685800"/>
           </a:xfrm>
           <a:prstGeom prst="rect">
@@ -30929,7 +33250,7 @@
         </p:nvSpPr>
         <p:spPr>
           <a:xfrm>
-            <a:off x="6347631" y="3391801"/>
+            <a:off x="6347631" y="3629307"/>
             <a:ext cx="1487185" cy="531964"/>
           </a:xfrm>
           <a:prstGeom prst="rect">
@@ -31002,7 +33323,7 @@
         <p:spPr>
           <a:xfrm>
             <a:off x="4003921" y="2524058"/>
-            <a:ext cx="1136158" cy="640696"/>
+            <a:ext cx="1136158" cy="383922"/>
           </a:xfrm>
           <a:prstGeom prst="rect">
             <a:avLst/>
@@ -31043,7 +33364,7 @@
               </a:spcAft>
             </a:pPr>
             <a:r>
-              <a:rPr lang="en-US" sz="900" b="1">
+              <a:rPr lang="en-US" sz="900" b="1" dirty="0">
                 <a:solidFill>
                   <a:srgbClr val="325C80">
                     <a:lumMod val="50000"/>
@@ -31051,7 +33372,7 @@
                 </a:solidFill>
                 <a:latin typeface="Arial"/>
               </a:rPr>
-              <a:t>Mirror Maker 2.0 Source Connector</a:t>
+              <a:t>Mirror Maker 2.0 Connector</a:t>
             </a:r>
           </a:p>
         </p:txBody>
@@ -31246,55 +33567,6 @@
           </a:prstGeom>
         </p:spPr>
       </p:pic>
-      <p:cxnSp>
-        <p:nvCxnSpPr>
-          <p:cNvPr id="14" name="Elbow Connector 13">
-            <a:extLst>
-              <a:ext uri="{FF2B5EF4-FFF2-40B4-BE49-F238E27FC236}">
-                <a16:creationId xmlns:a16="http://schemas.microsoft.com/office/drawing/2014/main" id="{39756F27-A065-CE48-97BD-FE2A9157CD07}"/>
-              </a:ext>
-            </a:extLst>
-          </p:cNvPr>
-          <p:cNvCxnSpPr>
-            <a:cxnSpLocks/>
-            <a:stCxn id="29" idx="3"/>
-            <a:endCxn id="9" idx="1"/>
-          </p:cNvCxnSpPr>
-          <p:nvPr/>
-        </p:nvCxnSpPr>
-        <p:spPr>
-          <a:xfrm flipV="1">
-            <a:off x="1670013" y="2844406"/>
-            <a:ext cx="2333908" cy="218232"/>
-          </a:xfrm>
-          <a:prstGeom prst="bentConnector3">
-            <a:avLst>
-              <a:gd name="adj1" fmla="val 50000"/>
-            </a:avLst>
-          </a:prstGeom>
-          <a:ln w="12700">
-            <a:solidFill>
-              <a:srgbClr val="0000FF"/>
-            </a:solidFill>
-            <a:tailEnd type="triangle"/>
-          </a:ln>
-          <a:effectLst/>
-        </p:spPr>
-        <p:style>
-          <a:lnRef idx="2">
-            <a:schemeClr val="accent1"/>
-          </a:lnRef>
-          <a:fillRef idx="0">
-            <a:schemeClr val="accent1"/>
-          </a:fillRef>
-          <a:effectRef idx="1">
-            <a:schemeClr val="accent1"/>
-          </a:effectRef>
-          <a:fontRef idx="minor">
-            <a:schemeClr val="tx1"/>
-          </a:fontRef>
-        </p:style>
-      </p:cxnSp>
       <p:sp>
         <p:nvSpPr>
           <p:cNvPr id="15" name="Can 14">
@@ -31309,7 +33581,7 @@
         </p:nvSpPr>
         <p:spPr>
           <a:xfrm rot="16200000">
-            <a:off x="7022901" y="2352839"/>
+            <a:off x="6963526" y="2590345"/>
             <a:ext cx="309314" cy="1314515"/>
           </a:xfrm>
           <a:prstGeom prst="can">
@@ -31364,7 +33636,7 @@
                 </a:solidFill>
                 <a:latin typeface="Arial"/>
               </a:rPr>
-              <a:t>source.products</a:t>
+              <a:t>source-topic-name-B*</a:t>
             </a:r>
           </a:p>
         </p:txBody>
@@ -31380,15 +33652,15 @@
           </p:cNvPr>
           <p:cNvCxnSpPr>
             <a:cxnSpLocks/>
-            <a:stCxn id="9" idx="3"/>
+            <a:stCxn id="30" idx="3"/>
             <a:endCxn id="15" idx="1"/>
           </p:cNvCxnSpPr>
           <p:nvPr/>
         </p:nvCxnSpPr>
         <p:spPr>
           <a:xfrm>
-            <a:off x="5140079" y="2844406"/>
-            <a:ext cx="1380222" cy="165691"/>
+            <a:off x="5140079" y="3190556"/>
+            <a:ext cx="1320847" cy="57047"/>
           </a:xfrm>
           <a:prstGeom prst="bentConnector3">
             <a:avLst>
@@ -31421,10 +33693,10 @@
       </p:cxnSp>
       <p:sp>
         <p:nvSpPr>
-          <p:cNvPr id="17" name="Cloud 16">
-            <a:extLst>
-              <a:ext uri="{FF2B5EF4-FFF2-40B4-BE49-F238E27FC236}">
-                <a16:creationId xmlns:a16="http://schemas.microsoft.com/office/drawing/2014/main" id="{76E7E86F-0DEA-6341-979E-6002CA33BA88}"/>
+          <p:cNvPr id="24" name="Rectangle 23">
+            <a:extLst>
+              <a:ext uri="{FF2B5EF4-FFF2-40B4-BE49-F238E27FC236}">
+                <a16:creationId xmlns:a16="http://schemas.microsoft.com/office/drawing/2014/main" id="{2B5C39AC-275D-AE4F-A296-2994360D1E3D}"/>
               </a:ext>
             </a:extLst>
           </p:cNvPr>
@@ -31432,64 +33704,9 @@
           <p:nvPr/>
         </p:nvSpPr>
         <p:spPr>
-          <a:xfrm rot="16200000">
-            <a:off x="2018935" y="3046895"/>
-            <a:ext cx="1922727" cy="524935"/>
-          </a:xfrm>
-          <a:prstGeom prst="cloud">
-            <a:avLst/>
-          </a:prstGeom>
-          <a:noFill/>
-          <a:ln>
-            <a:solidFill>
-              <a:schemeClr val="tx2">
-                <a:lumMod val="60000"/>
-                <a:lumOff val="40000"/>
-              </a:schemeClr>
-            </a:solidFill>
-          </a:ln>
-        </p:spPr>
-        <p:style>
-          <a:lnRef idx="2">
-            <a:schemeClr val="accent1">
-              <a:shade val="50000"/>
-            </a:schemeClr>
-          </a:lnRef>
-          <a:fillRef idx="1">
-            <a:schemeClr val="accent1"/>
-          </a:fillRef>
-          <a:effectRef idx="0">
-            <a:schemeClr val="accent1"/>
-          </a:effectRef>
-          <a:fontRef idx="minor">
-            <a:schemeClr val="lt1"/>
-          </a:fontRef>
-        </p:style>
-        <p:txBody>
-          <a:bodyPr rtlCol="0" anchor="ctr"/>
-          <a:lstStyle/>
-          <a:p>
-            <a:pPr algn="ctr"/>
-            <a:endParaRPr lang="en-US"/>
-          </a:p>
-        </p:txBody>
-      </p:sp>
-      <p:sp>
-        <p:nvSpPr>
-          <p:cNvPr id="24" name="Rectangle 23">
-            <a:extLst>
-              <a:ext uri="{FF2B5EF4-FFF2-40B4-BE49-F238E27FC236}">
-                <a16:creationId xmlns:a16="http://schemas.microsoft.com/office/drawing/2014/main" id="{2B5C39AC-275D-AE4F-A296-2994360D1E3D}"/>
-              </a:ext>
-            </a:extLst>
-          </p:cNvPr>
-          <p:cNvSpPr/>
-          <p:nvPr/>
-        </p:nvSpPr>
-        <p:spPr>
           <a:xfrm>
             <a:off x="585230" y="2133861"/>
-            <a:ext cx="1487185" cy="437889"/>
+            <a:ext cx="1487185" cy="693954"/>
           </a:xfrm>
           <a:prstGeom prst="rect">
             <a:avLst/>
@@ -31560,7 +33777,7 @@
         </p:nvSpPr>
         <p:spPr>
           <a:xfrm>
-            <a:off x="585230" y="2668489"/>
+            <a:off x="585230" y="2917868"/>
             <a:ext cx="1487185" cy="685800"/>
           </a:xfrm>
           <a:prstGeom prst="rect">
@@ -31632,7 +33849,7 @@
         </p:nvSpPr>
         <p:spPr>
           <a:xfrm>
-            <a:off x="585229" y="3444342"/>
+            <a:off x="585229" y="3693721"/>
             <a:ext cx="1487185" cy="531964"/>
           </a:xfrm>
           <a:prstGeom prst="rect">
@@ -31822,7 +34039,7 @@
         </p:nvSpPr>
         <p:spPr>
           <a:xfrm rot="16200000">
-            <a:off x="1059299" y="2606581"/>
+            <a:off x="1059299" y="2855960"/>
             <a:ext cx="309314" cy="912114"/>
           </a:xfrm>
           <a:prstGeom prst="can">
@@ -31877,7 +34094,7 @@
                 </a:solidFill>
                 <a:latin typeface="Arial"/>
               </a:rPr>
-              <a:t>products</a:t>
+              <a:t>topic-name-B*</a:t>
             </a:r>
           </a:p>
         </p:txBody>
@@ -31982,6 +34199,744 @@
           </a:p>
         </p:txBody>
       </p:sp>
+      <p:sp>
+        <p:nvSpPr>
+          <p:cNvPr id="30" name="Rectangle 29">
+            <a:extLst>
+              <a:ext uri="{FF2B5EF4-FFF2-40B4-BE49-F238E27FC236}">
+                <a16:creationId xmlns:a16="http://schemas.microsoft.com/office/drawing/2014/main" id="{07E5DDD0-6572-904F-8774-BA06E124E585}"/>
+              </a:ext>
+            </a:extLst>
+          </p:cNvPr>
+          <p:cNvSpPr/>
+          <p:nvPr/>
+        </p:nvSpPr>
+        <p:spPr>
+          <a:xfrm>
+            <a:off x="4003921" y="2998595"/>
+            <a:ext cx="1136158" cy="383922"/>
+          </a:xfrm>
+          <a:prstGeom prst="rect">
+            <a:avLst/>
+          </a:prstGeom>
+          <a:solidFill>
+            <a:srgbClr val="FCEBB8"/>
+          </a:solidFill>
+          <a:ln>
+            <a:noFill/>
+          </a:ln>
+        </p:spPr>
+        <p:style>
+          <a:lnRef idx="2">
+            <a:schemeClr val="accent1">
+              <a:shade val="50000"/>
+            </a:schemeClr>
+          </a:lnRef>
+          <a:fillRef idx="1">
+            <a:schemeClr val="accent1"/>
+          </a:fillRef>
+          <a:effectRef idx="0">
+            <a:schemeClr val="accent1"/>
+          </a:effectRef>
+          <a:fontRef idx="minor">
+            <a:schemeClr val="lt1"/>
+          </a:fontRef>
+        </p:style>
+        <p:txBody>
+          <a:bodyPr rtlCol="0" anchor="t"/>
+          <a:lstStyle/>
+          <a:p>
+            <a:pPr algn="ctr" eaLnBrk="0" fontAlgn="base" hangingPunct="0">
+              <a:spcBef>
+                <a:spcPct val="0"/>
+              </a:spcBef>
+              <a:spcAft>
+                <a:spcPct val="0"/>
+              </a:spcAft>
+            </a:pPr>
+            <a:r>
+              <a:rPr lang="en-US" sz="900" b="1" dirty="0">
+                <a:solidFill>
+                  <a:srgbClr val="325C80">
+                    <a:lumMod val="50000"/>
+                  </a:srgbClr>
+                </a:solidFill>
+                <a:latin typeface="Arial"/>
+              </a:rPr>
+              <a:t>Mirror Maker 2.0 Connector</a:t>
+            </a:r>
+          </a:p>
+        </p:txBody>
+      </p:sp>
+      <p:sp>
+        <p:nvSpPr>
+          <p:cNvPr id="31" name="Rectangle 30">
+            <a:extLst>
+              <a:ext uri="{FF2B5EF4-FFF2-40B4-BE49-F238E27FC236}">
+                <a16:creationId xmlns:a16="http://schemas.microsoft.com/office/drawing/2014/main" id="{1B70A39B-5BCD-2D4F-A22B-B8A00DB97B42}"/>
+              </a:ext>
+            </a:extLst>
+          </p:cNvPr>
+          <p:cNvSpPr/>
+          <p:nvPr/>
+        </p:nvSpPr>
+        <p:spPr>
+          <a:xfrm>
+            <a:off x="4003921" y="3461981"/>
+            <a:ext cx="1136158" cy="383922"/>
+          </a:xfrm>
+          <a:prstGeom prst="rect">
+            <a:avLst/>
+          </a:prstGeom>
+          <a:solidFill>
+            <a:srgbClr val="FCEBB8"/>
+          </a:solidFill>
+          <a:ln>
+            <a:noFill/>
+          </a:ln>
+        </p:spPr>
+        <p:style>
+          <a:lnRef idx="2">
+            <a:schemeClr val="accent1">
+              <a:shade val="50000"/>
+            </a:schemeClr>
+          </a:lnRef>
+          <a:fillRef idx="1">
+            <a:schemeClr val="accent1"/>
+          </a:fillRef>
+          <a:effectRef idx="0">
+            <a:schemeClr val="accent1"/>
+          </a:effectRef>
+          <a:fontRef idx="minor">
+            <a:schemeClr val="lt1"/>
+          </a:fontRef>
+        </p:style>
+        <p:txBody>
+          <a:bodyPr rtlCol="0" anchor="t"/>
+          <a:lstStyle/>
+          <a:p>
+            <a:pPr algn="ctr" eaLnBrk="0" fontAlgn="base" hangingPunct="0">
+              <a:spcBef>
+                <a:spcPct val="0"/>
+              </a:spcBef>
+              <a:spcAft>
+                <a:spcPct val="0"/>
+              </a:spcAft>
+            </a:pPr>
+            <a:r>
+              <a:rPr lang="en-US" sz="900" b="1" dirty="0">
+                <a:solidFill>
+                  <a:srgbClr val="325C80">
+                    <a:lumMod val="50000"/>
+                  </a:srgbClr>
+                </a:solidFill>
+                <a:latin typeface="Arial"/>
+              </a:rPr>
+              <a:t>Mirror Maker 2.0 Connector</a:t>
+            </a:r>
+          </a:p>
+        </p:txBody>
+      </p:sp>
+      <p:cxnSp>
+        <p:nvCxnSpPr>
+          <p:cNvPr id="14" name="Elbow Connector 13">
+            <a:extLst>
+              <a:ext uri="{FF2B5EF4-FFF2-40B4-BE49-F238E27FC236}">
+                <a16:creationId xmlns:a16="http://schemas.microsoft.com/office/drawing/2014/main" id="{39756F27-A065-CE48-97BD-FE2A9157CD07}"/>
+              </a:ext>
+            </a:extLst>
+          </p:cNvPr>
+          <p:cNvCxnSpPr>
+            <a:cxnSpLocks/>
+            <a:stCxn id="29" idx="3"/>
+            <a:endCxn id="30" idx="1"/>
+          </p:cNvCxnSpPr>
+          <p:nvPr/>
+        </p:nvCxnSpPr>
+        <p:spPr>
+          <a:xfrm flipV="1">
+            <a:off x="1670013" y="3190556"/>
+            <a:ext cx="2333908" cy="121461"/>
+          </a:xfrm>
+          <a:prstGeom prst="bentConnector3">
+            <a:avLst>
+              <a:gd name="adj1" fmla="val 50000"/>
+            </a:avLst>
+          </a:prstGeom>
+          <a:ln w="12700">
+            <a:solidFill>
+              <a:srgbClr val="0000FF"/>
+            </a:solidFill>
+            <a:tailEnd type="triangle"/>
+          </a:ln>
+          <a:effectLst/>
+        </p:spPr>
+        <p:style>
+          <a:lnRef idx="2">
+            <a:schemeClr val="accent1"/>
+          </a:lnRef>
+          <a:fillRef idx="0">
+            <a:schemeClr val="accent1"/>
+          </a:fillRef>
+          <a:effectRef idx="1">
+            <a:schemeClr val="accent1"/>
+          </a:effectRef>
+          <a:fontRef idx="minor">
+            <a:schemeClr val="tx1"/>
+          </a:fontRef>
+        </p:style>
+      </p:cxnSp>
+      <p:sp>
+        <p:nvSpPr>
+          <p:cNvPr id="32" name="Can 31">
+            <a:extLst>
+              <a:ext uri="{FF2B5EF4-FFF2-40B4-BE49-F238E27FC236}">
+                <a16:creationId xmlns:a16="http://schemas.microsoft.com/office/drawing/2014/main" id="{4183D53B-9BC7-2841-840A-8D80012CB27A}"/>
+              </a:ext>
+            </a:extLst>
+          </p:cNvPr>
+          <p:cNvSpPr/>
+          <p:nvPr/>
+        </p:nvSpPr>
+        <p:spPr>
+          <a:xfrm rot="16200000">
+            <a:off x="6963526" y="3313258"/>
+            <a:ext cx="309314" cy="1314515"/>
+          </a:xfrm>
+          <a:prstGeom prst="can">
+            <a:avLst/>
+          </a:prstGeom>
+          <a:pattFill prst="dkVert">
+            <a:fgClr>
+              <a:srgbClr val="92D050"/>
+            </a:fgClr>
+            <a:bgClr>
+              <a:schemeClr val="bg1"/>
+            </a:bgClr>
+          </a:pattFill>
+          <a:ln>
+            <a:noFill/>
+          </a:ln>
+        </p:spPr>
+        <p:style>
+          <a:lnRef idx="2">
+            <a:schemeClr val="accent1">
+              <a:shade val="50000"/>
+            </a:schemeClr>
+          </a:lnRef>
+          <a:fillRef idx="1">
+            <a:schemeClr val="accent1"/>
+          </a:fillRef>
+          <a:effectRef idx="0">
+            <a:schemeClr val="accent1"/>
+          </a:effectRef>
+          <a:fontRef idx="minor">
+            <a:schemeClr val="lt1"/>
+          </a:fontRef>
+        </p:style>
+        <p:txBody>
+          <a:bodyPr vert="vert" rtlCol="0" anchor="ctr"/>
+          <a:lstStyle/>
+          <a:p>
+            <a:pPr algn="ctr" eaLnBrk="0" fontAlgn="base" hangingPunct="0">
+              <a:spcBef>
+                <a:spcPct val="0"/>
+              </a:spcBef>
+              <a:spcAft>
+                <a:spcPct val="0"/>
+              </a:spcAft>
+            </a:pPr>
+            <a:r>
+              <a:rPr lang="en-US" sz="1000" b="1" dirty="0">
+                <a:solidFill>
+                  <a:schemeClr val="accent4">
+                    <a:lumMod val="75000"/>
+                  </a:schemeClr>
+                </a:solidFill>
+                <a:latin typeface="Arial"/>
+              </a:rPr>
+              <a:t>source-topic-name-C*</a:t>
+            </a:r>
+          </a:p>
+        </p:txBody>
+      </p:sp>
+      <p:cxnSp>
+        <p:nvCxnSpPr>
+          <p:cNvPr id="33" name="Elbow Connector 32">
+            <a:extLst>
+              <a:ext uri="{FF2B5EF4-FFF2-40B4-BE49-F238E27FC236}">
+                <a16:creationId xmlns:a16="http://schemas.microsoft.com/office/drawing/2014/main" id="{69BA5A83-FCCC-B841-BEE7-929F00A667E2}"/>
+              </a:ext>
+            </a:extLst>
+          </p:cNvPr>
+          <p:cNvCxnSpPr>
+            <a:cxnSpLocks/>
+            <a:stCxn id="31" idx="3"/>
+            <a:endCxn id="32" idx="1"/>
+          </p:cNvCxnSpPr>
+          <p:nvPr/>
+        </p:nvCxnSpPr>
+        <p:spPr>
+          <a:xfrm>
+            <a:off x="5140079" y="3653942"/>
+            <a:ext cx="1320847" cy="316574"/>
+          </a:xfrm>
+          <a:prstGeom prst="bentConnector3">
+            <a:avLst>
+              <a:gd name="adj1" fmla="val 50000"/>
+            </a:avLst>
+          </a:prstGeom>
+          <a:ln w="12700">
+            <a:solidFill>
+              <a:srgbClr val="0000FF"/>
+            </a:solidFill>
+            <a:prstDash val="sysDash"/>
+            <a:tailEnd type="triangle"/>
+          </a:ln>
+          <a:effectLst/>
+        </p:spPr>
+        <p:style>
+          <a:lnRef idx="2">
+            <a:schemeClr val="accent1"/>
+          </a:lnRef>
+          <a:fillRef idx="0">
+            <a:schemeClr val="accent1"/>
+          </a:fillRef>
+          <a:effectRef idx="1">
+            <a:schemeClr val="accent1"/>
+          </a:effectRef>
+          <a:fontRef idx="minor">
+            <a:schemeClr val="tx1"/>
+          </a:fontRef>
+        </p:style>
+      </p:cxnSp>
+      <p:sp>
+        <p:nvSpPr>
+          <p:cNvPr id="34" name="Can 33">
+            <a:extLst>
+              <a:ext uri="{FF2B5EF4-FFF2-40B4-BE49-F238E27FC236}">
+                <a16:creationId xmlns:a16="http://schemas.microsoft.com/office/drawing/2014/main" id="{F7C081CE-8FBC-F146-9228-33ACDC96E6C2}"/>
+              </a:ext>
+            </a:extLst>
+          </p:cNvPr>
+          <p:cNvSpPr/>
+          <p:nvPr/>
+        </p:nvSpPr>
+        <p:spPr>
+          <a:xfrm rot="16200000">
+            <a:off x="1059299" y="3578873"/>
+            <a:ext cx="309314" cy="912114"/>
+          </a:xfrm>
+          <a:prstGeom prst="can">
+            <a:avLst/>
+          </a:prstGeom>
+          <a:pattFill prst="dkVert">
+            <a:fgClr>
+              <a:srgbClr val="92D050"/>
+            </a:fgClr>
+            <a:bgClr>
+              <a:schemeClr val="bg1"/>
+            </a:bgClr>
+          </a:pattFill>
+          <a:ln>
+            <a:noFill/>
+          </a:ln>
+        </p:spPr>
+        <p:style>
+          <a:lnRef idx="2">
+            <a:schemeClr val="accent1">
+              <a:shade val="50000"/>
+            </a:schemeClr>
+          </a:lnRef>
+          <a:fillRef idx="1">
+            <a:schemeClr val="accent1"/>
+          </a:fillRef>
+          <a:effectRef idx="0">
+            <a:schemeClr val="accent1"/>
+          </a:effectRef>
+          <a:fontRef idx="minor">
+            <a:schemeClr val="lt1"/>
+          </a:fontRef>
+        </p:style>
+        <p:txBody>
+          <a:bodyPr vert="vert" rtlCol="0" anchor="ctr"/>
+          <a:lstStyle/>
+          <a:p>
+            <a:pPr algn="ctr" eaLnBrk="0" fontAlgn="base" hangingPunct="0">
+              <a:spcBef>
+                <a:spcPct val="0"/>
+              </a:spcBef>
+              <a:spcAft>
+                <a:spcPct val="0"/>
+              </a:spcAft>
+            </a:pPr>
+            <a:r>
+              <a:rPr lang="en-US" sz="1000" b="1" dirty="0">
+                <a:solidFill>
+                  <a:schemeClr val="accent4">
+                    <a:lumMod val="75000"/>
+                  </a:schemeClr>
+                </a:solidFill>
+                <a:latin typeface="Arial"/>
+              </a:rPr>
+              <a:t>topic-name-C*</a:t>
+            </a:r>
+          </a:p>
+        </p:txBody>
+      </p:sp>
+      <p:cxnSp>
+        <p:nvCxnSpPr>
+          <p:cNvPr id="35" name="Elbow Connector 34">
+            <a:extLst>
+              <a:ext uri="{FF2B5EF4-FFF2-40B4-BE49-F238E27FC236}">
+                <a16:creationId xmlns:a16="http://schemas.microsoft.com/office/drawing/2014/main" id="{933F6857-54C4-D141-A048-FF372430DCBF}"/>
+              </a:ext>
+            </a:extLst>
+          </p:cNvPr>
+          <p:cNvCxnSpPr>
+            <a:cxnSpLocks/>
+            <a:stCxn id="34" idx="3"/>
+            <a:endCxn id="31" idx="1"/>
+          </p:cNvCxnSpPr>
+          <p:nvPr/>
+        </p:nvCxnSpPr>
+        <p:spPr>
+          <a:xfrm flipV="1">
+            <a:off x="1670013" y="3653942"/>
+            <a:ext cx="2333908" cy="380988"/>
+          </a:xfrm>
+          <a:prstGeom prst="bentConnector3">
+            <a:avLst>
+              <a:gd name="adj1" fmla="val 50000"/>
+            </a:avLst>
+          </a:prstGeom>
+          <a:ln w="12700">
+            <a:solidFill>
+              <a:srgbClr val="0000FF"/>
+            </a:solidFill>
+            <a:tailEnd type="triangle"/>
+          </a:ln>
+          <a:effectLst/>
+        </p:spPr>
+        <p:style>
+          <a:lnRef idx="2">
+            <a:schemeClr val="accent1"/>
+          </a:lnRef>
+          <a:fillRef idx="0">
+            <a:schemeClr val="accent1"/>
+          </a:fillRef>
+          <a:effectRef idx="1">
+            <a:schemeClr val="accent1"/>
+          </a:effectRef>
+          <a:fontRef idx="minor">
+            <a:schemeClr val="tx1"/>
+          </a:fontRef>
+        </p:style>
+      </p:cxnSp>
+      <p:sp>
+        <p:nvSpPr>
+          <p:cNvPr id="36" name="Can 35">
+            <a:extLst>
+              <a:ext uri="{FF2B5EF4-FFF2-40B4-BE49-F238E27FC236}">
+                <a16:creationId xmlns:a16="http://schemas.microsoft.com/office/drawing/2014/main" id="{C1F7A952-47A5-EA4E-BD64-FF988F9AB84B}"/>
+              </a:ext>
+            </a:extLst>
+          </p:cNvPr>
+          <p:cNvSpPr/>
+          <p:nvPr/>
+        </p:nvSpPr>
+        <p:spPr>
+          <a:xfrm rot="16200000">
+            <a:off x="6948441" y="1816585"/>
+            <a:ext cx="309314" cy="1314515"/>
+          </a:xfrm>
+          <a:prstGeom prst="can">
+            <a:avLst/>
+          </a:prstGeom>
+          <a:pattFill prst="dkVert">
+            <a:fgClr>
+              <a:srgbClr val="92D050"/>
+            </a:fgClr>
+            <a:bgClr>
+              <a:schemeClr val="bg1"/>
+            </a:bgClr>
+          </a:pattFill>
+          <a:ln>
+            <a:noFill/>
+          </a:ln>
+        </p:spPr>
+        <p:style>
+          <a:lnRef idx="2">
+            <a:schemeClr val="accent1">
+              <a:shade val="50000"/>
+            </a:schemeClr>
+          </a:lnRef>
+          <a:fillRef idx="1">
+            <a:schemeClr val="accent1"/>
+          </a:fillRef>
+          <a:effectRef idx="0">
+            <a:schemeClr val="accent1"/>
+          </a:effectRef>
+          <a:fontRef idx="minor">
+            <a:schemeClr val="lt1"/>
+          </a:fontRef>
+        </p:style>
+        <p:txBody>
+          <a:bodyPr vert="vert" rtlCol="0" anchor="ctr"/>
+          <a:lstStyle/>
+          <a:p>
+            <a:pPr algn="ctr" eaLnBrk="0" fontAlgn="base" hangingPunct="0">
+              <a:spcBef>
+                <a:spcPct val="0"/>
+              </a:spcBef>
+              <a:spcAft>
+                <a:spcPct val="0"/>
+              </a:spcAft>
+            </a:pPr>
+            <a:r>
+              <a:rPr lang="en-US" sz="1000" b="1" dirty="0">
+                <a:solidFill>
+                  <a:schemeClr val="accent4">
+                    <a:lumMod val="75000"/>
+                  </a:schemeClr>
+                </a:solidFill>
+                <a:latin typeface="Arial"/>
+              </a:rPr>
+              <a:t>source-topic-name-A*</a:t>
+            </a:r>
+          </a:p>
+        </p:txBody>
+      </p:sp>
+      <p:sp>
+        <p:nvSpPr>
+          <p:cNvPr id="37" name="Can 36">
+            <a:extLst>
+              <a:ext uri="{FF2B5EF4-FFF2-40B4-BE49-F238E27FC236}">
+                <a16:creationId xmlns:a16="http://schemas.microsoft.com/office/drawing/2014/main" id="{18844471-66BE-FD48-AB9E-4A7C34815F61}"/>
+              </a:ext>
+            </a:extLst>
+          </p:cNvPr>
+          <p:cNvSpPr/>
+          <p:nvPr/>
+        </p:nvSpPr>
+        <p:spPr>
+          <a:xfrm rot="16200000">
+            <a:off x="1093535" y="2034325"/>
+            <a:ext cx="309314" cy="912114"/>
+          </a:xfrm>
+          <a:prstGeom prst="can">
+            <a:avLst/>
+          </a:prstGeom>
+          <a:pattFill prst="dkVert">
+            <a:fgClr>
+              <a:srgbClr val="92D050"/>
+            </a:fgClr>
+            <a:bgClr>
+              <a:schemeClr val="bg1"/>
+            </a:bgClr>
+          </a:pattFill>
+          <a:ln>
+            <a:noFill/>
+          </a:ln>
+        </p:spPr>
+        <p:style>
+          <a:lnRef idx="2">
+            <a:schemeClr val="accent1">
+              <a:shade val="50000"/>
+            </a:schemeClr>
+          </a:lnRef>
+          <a:fillRef idx="1">
+            <a:schemeClr val="accent1"/>
+          </a:fillRef>
+          <a:effectRef idx="0">
+            <a:schemeClr val="accent1"/>
+          </a:effectRef>
+          <a:fontRef idx="minor">
+            <a:schemeClr val="lt1"/>
+          </a:fontRef>
+        </p:style>
+        <p:txBody>
+          <a:bodyPr vert="vert" rtlCol="0" anchor="ctr"/>
+          <a:lstStyle/>
+          <a:p>
+            <a:pPr algn="ctr" eaLnBrk="0" fontAlgn="base" hangingPunct="0">
+              <a:spcBef>
+                <a:spcPct val="0"/>
+              </a:spcBef>
+              <a:spcAft>
+                <a:spcPct val="0"/>
+              </a:spcAft>
+            </a:pPr>
+            <a:r>
+              <a:rPr lang="en-US" sz="1000" b="1" dirty="0">
+                <a:solidFill>
+                  <a:schemeClr val="accent4">
+                    <a:lumMod val="75000"/>
+                  </a:schemeClr>
+                </a:solidFill>
+                <a:latin typeface="Arial"/>
+              </a:rPr>
+              <a:t>topic-name-A*</a:t>
+            </a:r>
+          </a:p>
+        </p:txBody>
+      </p:sp>
+      <p:cxnSp>
+        <p:nvCxnSpPr>
+          <p:cNvPr id="38" name="Elbow Connector 37">
+            <a:extLst>
+              <a:ext uri="{FF2B5EF4-FFF2-40B4-BE49-F238E27FC236}">
+                <a16:creationId xmlns:a16="http://schemas.microsoft.com/office/drawing/2014/main" id="{10C6A4F8-C269-C743-AAF1-AA7A937FF54B}"/>
+              </a:ext>
+            </a:extLst>
+          </p:cNvPr>
+          <p:cNvCxnSpPr>
+            <a:cxnSpLocks/>
+            <a:stCxn id="37" idx="3"/>
+            <a:endCxn id="9" idx="1"/>
+          </p:cNvCxnSpPr>
+          <p:nvPr/>
+        </p:nvCxnSpPr>
+        <p:spPr>
+          <a:xfrm>
+            <a:off x="1704249" y="2490382"/>
+            <a:ext cx="2299672" cy="225637"/>
+          </a:xfrm>
+          <a:prstGeom prst="bentConnector3">
+            <a:avLst>
+              <a:gd name="adj1" fmla="val 50000"/>
+            </a:avLst>
+          </a:prstGeom>
+          <a:ln w="12700">
+            <a:solidFill>
+              <a:srgbClr val="0000FF"/>
+            </a:solidFill>
+            <a:tailEnd type="triangle"/>
+          </a:ln>
+          <a:effectLst/>
+        </p:spPr>
+        <p:style>
+          <a:lnRef idx="2">
+            <a:schemeClr val="accent1"/>
+          </a:lnRef>
+          <a:fillRef idx="0">
+            <a:schemeClr val="accent1"/>
+          </a:fillRef>
+          <a:effectRef idx="1">
+            <a:schemeClr val="accent1"/>
+          </a:effectRef>
+          <a:fontRef idx="minor">
+            <a:schemeClr val="tx1"/>
+          </a:fontRef>
+        </p:style>
+      </p:cxnSp>
+      <p:sp>
+        <p:nvSpPr>
+          <p:cNvPr id="17" name="Cloud 16">
+            <a:extLst>
+              <a:ext uri="{FF2B5EF4-FFF2-40B4-BE49-F238E27FC236}">
+                <a16:creationId xmlns:a16="http://schemas.microsoft.com/office/drawing/2014/main" id="{76E7E86F-0DEA-6341-979E-6002CA33BA88}"/>
+              </a:ext>
+            </a:extLst>
+          </p:cNvPr>
+          <p:cNvSpPr/>
+          <p:nvPr/>
+        </p:nvSpPr>
+        <p:spPr>
+          <a:xfrm rot="16200000">
+            <a:off x="2018935" y="3046895"/>
+            <a:ext cx="1922727" cy="524935"/>
+          </a:xfrm>
+          <a:prstGeom prst="cloud">
+            <a:avLst/>
+          </a:prstGeom>
+          <a:solidFill>
+            <a:schemeClr val="bg1"/>
+          </a:solidFill>
+          <a:ln>
+            <a:solidFill>
+              <a:schemeClr val="tx2">
+                <a:lumMod val="60000"/>
+                <a:lumOff val="40000"/>
+              </a:schemeClr>
+            </a:solidFill>
+          </a:ln>
+        </p:spPr>
+        <p:style>
+          <a:lnRef idx="2">
+            <a:schemeClr val="accent1">
+              <a:shade val="50000"/>
+            </a:schemeClr>
+          </a:lnRef>
+          <a:fillRef idx="1">
+            <a:schemeClr val="accent1"/>
+          </a:fillRef>
+          <a:effectRef idx="0">
+            <a:schemeClr val="accent1"/>
+          </a:effectRef>
+          <a:fontRef idx="minor">
+            <a:schemeClr val="lt1"/>
+          </a:fontRef>
+        </p:style>
+        <p:txBody>
+          <a:bodyPr rtlCol="0" anchor="ctr"/>
+          <a:lstStyle/>
+          <a:p>
+            <a:pPr algn="ctr"/>
+            <a:endParaRPr lang="en-US"/>
+          </a:p>
+        </p:txBody>
+      </p:sp>
+      <p:cxnSp>
+        <p:nvCxnSpPr>
+          <p:cNvPr id="42" name="Elbow Connector 41">
+            <a:extLst>
+              <a:ext uri="{FF2B5EF4-FFF2-40B4-BE49-F238E27FC236}">
+                <a16:creationId xmlns:a16="http://schemas.microsoft.com/office/drawing/2014/main" id="{42DA60E8-16D8-324F-B19E-29C0F6E6AECD}"/>
+              </a:ext>
+            </a:extLst>
+          </p:cNvPr>
+          <p:cNvCxnSpPr>
+            <a:cxnSpLocks/>
+            <a:stCxn id="9" idx="3"/>
+            <a:endCxn id="36" idx="1"/>
+          </p:cNvCxnSpPr>
+          <p:nvPr/>
+        </p:nvCxnSpPr>
+        <p:spPr>
+          <a:xfrm flipV="1">
+            <a:off x="5140079" y="2473843"/>
+            <a:ext cx="1305762" cy="242176"/>
+          </a:xfrm>
+          <a:prstGeom prst="bentConnector3">
+            <a:avLst>
+              <a:gd name="adj1" fmla="val 50000"/>
+            </a:avLst>
+          </a:prstGeom>
+          <a:ln w="12700">
+            <a:solidFill>
+              <a:srgbClr val="0000FF"/>
+            </a:solidFill>
+            <a:prstDash val="sysDash"/>
+            <a:tailEnd type="triangle"/>
+          </a:ln>
+          <a:effectLst/>
+        </p:spPr>
+        <p:style>
+          <a:lnRef idx="2">
+            <a:schemeClr val="accent1"/>
+          </a:lnRef>
+          <a:fillRef idx="0">
+            <a:schemeClr val="accent1"/>
+          </a:fillRef>
+          <a:effectRef idx="1">
+            <a:schemeClr val="accent1"/>
+          </a:effectRef>
+          <a:fontRef idx="minor">
+            <a:schemeClr val="tx1"/>
+          </a:fontRef>
+        </p:style>
+      </p:cxnSp>
     </p:spTree>
     <p:extLst>
       <p:ext uri="{BB962C8B-B14F-4D97-AF65-F5344CB8AC3E}">

</xml_diff>

<commit_message>
Deployed 9852f50 with MkDocs version: 1.0.4
</commit_message>
<xml_diff>
--- a/mm2-diagrams.pptx
+++ b/mm2-diagrams.pptx
@@ -232,7 +232,7 @@
           <a:p>
             <a:fld id="{43B1B1F9-D0CB-FF4D-BEE0-BED1F1FDA196}" type="datetimeFigureOut">
               <a:rPr lang="en-US" smtClean="0"/>
-              <a:t>4/17/20</a:t>
+              <a:t>4/21/20</a:t>
             </a:fld>
             <a:endParaRPr lang="en-US"/>
           </a:p>
@@ -397,7 +397,7 @@
           <a:p>
             <a:fld id="{26BE012A-D992-5D42-B86E-AA2BC0764EE1}" type="datetimeFigureOut">
               <a:rPr lang="en-US" smtClean="0"/>
-              <a:t>4/17/20</a:t>
+              <a:t>4/21/20</a:t>
             </a:fld>
             <a:endParaRPr lang="en-US"/>
           </a:p>
@@ -1407,11 +1407,7 @@
           <a:p>
             <a:r>
               <a:rPr lang="en-US" dirty="0"/>
-              <a:t>ts-4: timestamp when polling </a:t>
-            </a:r>
-            <a:r>
-              <a:rPr lang="en-US"/>
-              <a:t>the record</a:t>
+              <a:t>ts-4: timestamp when polling the record</a:t>
             </a:r>
             <a:endParaRPr dirty="0"/>
           </a:p>
@@ -3443,14 +3439,14 @@
           </a:ln>
           <a:extLst>
             <a:ext uri="{909E8E84-426E-40dd-AFC4-6F175D3DCCD1}">
-              <a14:hiddenFill xmlns:a14="http://schemas.microsoft.com/office/drawing/2010/main" xmlns="">
+              <a14:hiddenFill xmlns="" xmlns:a14="http://schemas.microsoft.com/office/drawing/2010/main">
                 <a:solidFill>
                   <a:srgbClr val="FFFFFF"/>
                 </a:solidFill>
               </a14:hiddenFill>
             </a:ext>
             <a:ext uri="{91240B29-F687-4f45-9708-019B960494DF}">
-              <a14:hiddenLine xmlns:a14="http://schemas.microsoft.com/office/drawing/2010/main" xmlns="" w="9525">
+              <a14:hiddenLine xmlns="" xmlns:a14="http://schemas.microsoft.com/office/drawing/2010/main" w="9525">
                 <a:solidFill>
                   <a:srgbClr val="000000"/>
                 </a:solidFill>
@@ -3502,14 +3498,14 @@
           <a:effectLst/>
           <a:extLst>
             <a:ext uri="{909E8E84-426E-40dd-AFC4-6F175D3DCCD1}">
-              <a14:hiddenFill xmlns:a14="http://schemas.microsoft.com/office/drawing/2010/main" xmlns="">
+              <a14:hiddenFill xmlns="" xmlns:a14="http://schemas.microsoft.com/office/drawing/2010/main">
                 <a:solidFill>
                   <a:schemeClr val="accent1"/>
                 </a:solidFill>
               </a14:hiddenFill>
             </a:ext>
             <a:ext uri="{91240B29-F687-4f45-9708-019B960494DF}">
-              <a14:hiddenLine xmlns:a14="http://schemas.microsoft.com/office/drawing/2010/main" xmlns="" w="9525">
+              <a14:hiddenLine xmlns="" xmlns:a14="http://schemas.microsoft.com/office/drawing/2010/main" w="9525">
                 <a:solidFill>
                   <a:schemeClr val="tx1"/>
                 </a:solidFill>
@@ -3519,7 +3515,7 @@
               </a14:hiddenLine>
             </a:ext>
             <a:ext uri="{AF507438-7753-43e0-B8FC-AC1667EBCBE1}">
-              <a14:hiddenEffects xmlns:a14="http://schemas.microsoft.com/office/drawing/2010/main" xmlns="">
+              <a14:hiddenEffects xmlns="" xmlns:a14="http://schemas.microsoft.com/office/drawing/2010/main">
                 <a:effectLst>
                   <a:outerShdw blurRad="63500" dist="38099" dir="2700000" algn="ctr" rotWithShape="0">
                     <a:schemeClr val="bg2">
@@ -4235,10 +4231,10 @@
           </a:ln>
           <a:extLst>
             <a:ext uri="{FAA26D3D-D897-4be2-8F04-BA451C77F1D7}">
-              <ma14:placeholderFlag xmlns="" xmlns:ma14="http://schemas.microsoft.com/office/mac/drawingml/2011/main" val="1"/>
+              <ma14:placeholderFlag xmlns:ma14="http://schemas.microsoft.com/office/mac/drawingml/2011/main" xmlns="" val="1"/>
             </a:ext>
             <a:ext uri="{909E8E84-426E-40dd-AFC4-6F175D3DCCD1}">
-              <a14:hiddenFill xmlns="" xmlns:a14="http://schemas.microsoft.com/office/drawing/2010/main">
+              <a14:hiddenFill xmlns:a14="http://schemas.microsoft.com/office/drawing/2010/main" xmlns="">
                 <a:solidFill>
                   <a:srgbClr val="FFFFFF"/>
                 </a:solidFill>
@@ -4289,10 +4285,10 @@
           </a:ln>
           <a:extLst>
             <a:ext uri="{FAA26D3D-D897-4be2-8F04-BA451C77F1D7}">
-              <ma14:placeholderFlag xmlns="" xmlns:ma14="http://schemas.microsoft.com/office/mac/drawingml/2011/main" val="1"/>
+              <ma14:placeholderFlag xmlns:ma14="http://schemas.microsoft.com/office/mac/drawingml/2011/main" xmlns="" val="1"/>
             </a:ext>
             <a:ext uri="{909E8E84-426E-40dd-AFC4-6F175D3DCCD1}">
-              <a14:hiddenFill xmlns="" xmlns:a14="http://schemas.microsoft.com/office/drawing/2010/main">
+              <a14:hiddenFill xmlns:a14="http://schemas.microsoft.com/office/drawing/2010/main" xmlns="">
                 <a:solidFill>
                   <a:srgbClr val="FFFFFF"/>
                 </a:solidFill>
@@ -24588,7 +24584,7 @@
         <p:spPr>
           <a:xfrm>
             <a:off x="599544" y="687050"/>
-            <a:ext cx="473206" cy="300082"/>
+            <a:ext cx="559769" cy="300082"/>
           </a:xfrm>
           <a:prstGeom prst="rect">
             <a:avLst/>
@@ -24603,7 +24599,7 @@
           <a:p>
             <a:r>
               <a:rPr lang="en-US" dirty="0"/>
-              <a:t>ts-1</a:t>
+              <a:t>TS-1</a:t>
             </a:r>
             <a:endParaRPr dirty="0"/>
           </a:p>
@@ -24624,7 +24620,7 @@
         <p:spPr>
           <a:xfrm>
             <a:off x="1496526" y="687050"/>
-            <a:ext cx="473206" cy="300082"/>
+            <a:ext cx="559769" cy="300082"/>
           </a:xfrm>
           <a:prstGeom prst="rect">
             <a:avLst/>
@@ -24639,7 +24635,7 @@
           <a:p>
             <a:r>
               <a:rPr lang="en-US" dirty="0"/>
-              <a:t>ts-2</a:t>
+              <a:t>TS-2</a:t>
             </a:r>
             <a:endParaRPr dirty="0"/>
           </a:p>
@@ -24660,7 +24656,7 @@
         <p:spPr>
           <a:xfrm>
             <a:off x="5672294" y="687050"/>
-            <a:ext cx="473206" cy="300082"/>
+            <a:ext cx="559769" cy="300082"/>
           </a:xfrm>
           <a:prstGeom prst="rect">
             <a:avLst/>
@@ -24675,7 +24671,7 @@
           <a:p>
             <a:r>
               <a:rPr lang="en-US" dirty="0"/>
-              <a:t>ts-3</a:t>
+              <a:t>TS-3</a:t>
             </a:r>
             <a:endParaRPr dirty="0"/>
           </a:p>
@@ -24696,7 +24692,7 @@
         <p:spPr>
           <a:xfrm>
             <a:off x="7013414" y="687050"/>
-            <a:ext cx="473206" cy="300082"/>
+            <a:ext cx="559769" cy="300082"/>
           </a:xfrm>
           <a:prstGeom prst="rect">
             <a:avLst/>
@@ -24711,7 +24707,7 @@
           <a:p>
             <a:r>
               <a:rPr lang="en-US" dirty="0"/>
-              <a:t>ts-4</a:t>
+              <a:t>TS-4</a:t>
             </a:r>
             <a:endParaRPr dirty="0"/>
           </a:p>

</xml_diff>

<commit_message>
Deployed e13fef1 with MkDocs version: 1.0.4
</commit_message>
<xml_diff>
--- a/mm2-diagrams.pptx
+++ b/mm2-diagrams.pptx
@@ -6,10 +6,10 @@
     <p:sldMasterId id="2147483943" r:id="rId2"/>
   </p:sldMasterIdLst>
   <p:notesMasterIdLst>
-    <p:notesMasterId r:id="rId21"/>
+    <p:notesMasterId r:id="rId23"/>
   </p:notesMasterIdLst>
   <p:handoutMasterIdLst>
-    <p:handoutMasterId r:id="rId22"/>
+    <p:handoutMasterId r:id="rId24"/>
   </p:handoutMasterIdLst>
   <p:sldIdLst>
     <p:sldId id="141169016" r:id="rId3"/>
@@ -28,8 +28,10 @@
     <p:sldId id="141169022" r:id="rId16"/>
     <p:sldId id="141169023" r:id="rId17"/>
     <p:sldId id="141169024" r:id="rId18"/>
-    <p:sldId id="141169025" r:id="rId19"/>
-    <p:sldId id="141169017" r:id="rId20"/>
+    <p:sldId id="141169026" r:id="rId19"/>
+    <p:sldId id="141169025" r:id="rId20"/>
+    <p:sldId id="141169027" r:id="rId21"/>
+    <p:sldId id="141169017" r:id="rId22"/>
   </p:sldIdLst>
   <p:sldSz cx="9144000" cy="5143500" type="screen16x9"/>
   <p:notesSz cx="6858000" cy="9144000"/>
@@ -1430,7 +1432,7 @@
           <a:p>
             <a:fld id="{18D02FFD-07D4-5C4F-BD77-921008177348}" type="slidenum">
               <a:rPr lang="en-US" smtClean="0"/>
-              <a:t>17</a:t>
+              <a:t>18</a:t>
             </a:fld>
             <a:endParaRPr lang="en-US"/>
           </a:p>
@@ -3439,14 +3441,14 @@
           </a:ln>
           <a:extLst>
             <a:ext uri="{909E8E84-426E-40dd-AFC4-6F175D3DCCD1}">
-              <a14:hiddenFill xmlns="" xmlns:a14="http://schemas.microsoft.com/office/drawing/2010/main">
+              <a14:hiddenFill xmlns:a14="http://schemas.microsoft.com/office/drawing/2010/main" xmlns="">
                 <a:solidFill>
                   <a:srgbClr val="FFFFFF"/>
                 </a:solidFill>
               </a14:hiddenFill>
             </a:ext>
             <a:ext uri="{91240B29-F687-4f45-9708-019B960494DF}">
-              <a14:hiddenLine xmlns="" xmlns:a14="http://schemas.microsoft.com/office/drawing/2010/main" w="9525">
+              <a14:hiddenLine xmlns:a14="http://schemas.microsoft.com/office/drawing/2010/main" xmlns="" w="9525">
                 <a:solidFill>
                   <a:srgbClr val="000000"/>
                 </a:solidFill>
@@ -3498,14 +3500,14 @@
           <a:effectLst/>
           <a:extLst>
             <a:ext uri="{909E8E84-426E-40dd-AFC4-6F175D3DCCD1}">
-              <a14:hiddenFill xmlns="" xmlns:a14="http://schemas.microsoft.com/office/drawing/2010/main">
+              <a14:hiddenFill xmlns:a14="http://schemas.microsoft.com/office/drawing/2010/main" xmlns="">
                 <a:solidFill>
                   <a:schemeClr val="accent1"/>
                 </a:solidFill>
               </a14:hiddenFill>
             </a:ext>
             <a:ext uri="{91240B29-F687-4f45-9708-019B960494DF}">
-              <a14:hiddenLine xmlns="" xmlns:a14="http://schemas.microsoft.com/office/drawing/2010/main" w="9525">
+              <a14:hiddenLine xmlns:a14="http://schemas.microsoft.com/office/drawing/2010/main" xmlns="" w="9525">
                 <a:solidFill>
                   <a:schemeClr val="tx1"/>
                 </a:solidFill>
@@ -3515,7 +3517,7 @@
               </a14:hiddenLine>
             </a:ext>
             <a:ext uri="{AF507438-7753-43e0-B8FC-AC1667EBCBE1}">
-              <a14:hiddenEffects xmlns="" xmlns:a14="http://schemas.microsoft.com/office/drawing/2010/main">
+              <a14:hiddenEffects xmlns:a14="http://schemas.microsoft.com/office/drawing/2010/main" xmlns="">
                 <a:effectLst>
                   <a:outerShdw blurRad="63500" dist="38099" dir="2700000" algn="ctr" rotWithShape="0">
                     <a:schemeClr val="bg2">
@@ -4231,10 +4233,10 @@
           </a:ln>
           <a:extLst>
             <a:ext uri="{FAA26D3D-D897-4be2-8F04-BA451C77F1D7}">
-              <ma14:placeholderFlag xmlns:ma14="http://schemas.microsoft.com/office/mac/drawingml/2011/main" xmlns="" val="1"/>
+              <ma14:placeholderFlag xmlns="" xmlns:ma14="http://schemas.microsoft.com/office/mac/drawingml/2011/main" val="1"/>
             </a:ext>
             <a:ext uri="{909E8E84-426E-40dd-AFC4-6F175D3DCCD1}">
-              <a14:hiddenFill xmlns:a14="http://schemas.microsoft.com/office/drawing/2010/main" xmlns="">
+              <a14:hiddenFill xmlns="" xmlns:a14="http://schemas.microsoft.com/office/drawing/2010/main">
                 <a:solidFill>
                   <a:srgbClr val="FFFFFF"/>
                 </a:solidFill>
@@ -4285,10 +4287,10 @@
           </a:ln>
           <a:extLst>
             <a:ext uri="{FAA26D3D-D897-4be2-8F04-BA451C77F1D7}">
-              <ma14:placeholderFlag xmlns:ma14="http://schemas.microsoft.com/office/mac/drawingml/2011/main" xmlns="" val="1"/>
+              <ma14:placeholderFlag xmlns="" xmlns:ma14="http://schemas.microsoft.com/office/mac/drawingml/2011/main" val="1"/>
             </a:ext>
             <a:ext uri="{909E8E84-426E-40dd-AFC4-6F175D3DCCD1}">
-              <a14:hiddenFill xmlns:a14="http://schemas.microsoft.com/office/drawing/2010/main" xmlns="">
+              <a14:hiddenFill xmlns="" xmlns:a14="http://schemas.microsoft.com/office/drawing/2010/main">
                 <a:solidFill>
                   <a:srgbClr val="FFFFFF"/>
                 </a:solidFill>
@@ -23699,7 +23701,7 @@
           <p:cNvPr id="2" name="Title 1">
             <a:extLst>
               <a:ext uri="{FF2B5EF4-FFF2-40B4-BE49-F238E27FC236}">
-                <a16:creationId xmlns:a16="http://schemas.microsoft.com/office/drawing/2014/main" id="{AD8AE02D-17FC-B64A-848E-E6EE2E7E5A93}"/>
+                <a16:creationId xmlns:a16="http://schemas.microsoft.com/office/drawing/2014/main" id="{59DFA31E-6839-E645-B74F-3C2A8B134560}"/>
               </a:ext>
             </a:extLst>
           </p:cNvPr>
@@ -23716,10 +23718,10 @@
           <a:lstStyle/>
           <a:p>
             <a:r>
-              <a:rPr lang="en-US" dirty="0"/>
-              <a:t>Performance Testing</a:t>
-            </a:r>
-            <a:endParaRPr dirty="0"/>
+              <a:rPr lang="en-US" sz="2000" dirty="0"/>
+              <a:t>Performance Testing: System Context</a:t>
+            </a:r>
+            <a:endParaRPr sz="2000" dirty="0"/>
           </a:p>
         </p:txBody>
       </p:sp>
@@ -23728,7 +23730,7 @@
           <p:cNvPr id="4" name="Slide Number Placeholder 3">
             <a:extLst>
               <a:ext uri="{FF2B5EF4-FFF2-40B4-BE49-F238E27FC236}">
-                <a16:creationId xmlns:a16="http://schemas.microsoft.com/office/drawing/2014/main" id="{CC070D25-E38D-7949-AA56-03C3740E6A0A}"/>
+                <a16:creationId xmlns:a16="http://schemas.microsoft.com/office/drawing/2014/main" id="{E06F04CA-E56A-9549-B3E2-9769F935C1E2}"/>
               </a:ext>
             </a:extLst>
           </p:cNvPr>
@@ -23752,6 +23754,1378 @@
               </a:rPr>
               <a:pPr/>
               <a:t>17</a:t>
+            </a:fld>
+            <a:endParaRPr lang="en-US">
+              <a:solidFill>
+                <a:srgbClr val="5AAAFA"/>
+              </a:solidFill>
+            </a:endParaRPr>
+          </a:p>
+        </p:txBody>
+      </p:sp>
+      <p:grpSp>
+        <p:nvGrpSpPr>
+          <p:cNvPr id="5" name="Group 4">
+            <a:extLst>
+              <a:ext uri="{FF2B5EF4-FFF2-40B4-BE49-F238E27FC236}">
+                <a16:creationId xmlns:a16="http://schemas.microsoft.com/office/drawing/2014/main" id="{F80EFECB-2C9F-E84C-AA57-FFE518C34598}"/>
+              </a:ext>
+            </a:extLst>
+          </p:cNvPr>
+          <p:cNvGrpSpPr/>
+          <p:nvPr/>
+        </p:nvGrpSpPr>
+        <p:grpSpPr>
+          <a:xfrm>
+            <a:off x="3468723" y="752352"/>
+            <a:ext cx="936435" cy="1123110"/>
+            <a:chOff x="3635564" y="430268"/>
+            <a:chExt cx="936435" cy="1123110"/>
+          </a:xfrm>
+        </p:grpSpPr>
+        <p:sp>
+          <p:nvSpPr>
+            <p:cNvPr id="6" name="Rounded Rectangle 5">
+              <a:extLst>
+                <a:ext uri="{FF2B5EF4-FFF2-40B4-BE49-F238E27FC236}">
+                  <a16:creationId xmlns:a16="http://schemas.microsoft.com/office/drawing/2014/main" id="{93521FEB-D0D8-DA4A-A5F8-D3C349C464C7}"/>
+                </a:ext>
+              </a:extLst>
+            </p:cNvPr>
+            <p:cNvSpPr/>
+            <p:nvPr/>
+          </p:nvSpPr>
+          <p:spPr>
+            <a:xfrm>
+              <a:off x="3635564" y="875058"/>
+              <a:ext cx="936435" cy="678320"/>
+            </a:xfrm>
+            <a:prstGeom prst="roundRect">
+              <a:avLst/>
+            </a:prstGeom>
+            <a:ln>
+              <a:noFill/>
+            </a:ln>
+          </p:spPr>
+          <p:style>
+            <a:lnRef idx="2">
+              <a:schemeClr val="accent1">
+                <a:shade val="50000"/>
+              </a:schemeClr>
+            </a:lnRef>
+            <a:fillRef idx="1">
+              <a:schemeClr val="accent1"/>
+            </a:fillRef>
+            <a:effectRef idx="0">
+              <a:schemeClr val="accent1"/>
+            </a:effectRef>
+            <a:fontRef idx="minor">
+              <a:schemeClr val="lt1"/>
+            </a:fontRef>
+          </p:style>
+          <p:txBody>
+            <a:bodyPr rtlCol="0" anchor="ctr"/>
+            <a:lstStyle/>
+            <a:p>
+              <a:pPr marL="0" marR="0" indent="0" algn="ctr" defTabSz="685800" rtl="0" eaLnBrk="1" fontAlgn="auto" latinLnBrk="0" hangingPunct="1">
+                <a:lnSpc>
+                  <a:spcPct val="100000"/>
+                </a:lnSpc>
+                <a:spcBef>
+                  <a:spcPts val="0"/>
+                </a:spcBef>
+                <a:spcAft>
+                  <a:spcPts val="0"/>
+                </a:spcAft>
+                <a:buClrTx/>
+                <a:buSzTx/>
+                <a:buFontTx/>
+                <a:buNone/>
+                <a:tabLst/>
+              </a:pPr>
+              <a:r>
+                <a:rPr lang="en-US" sz="1000" dirty="0">
+                  <a:solidFill>
+                    <a:prstClr val="white"/>
+                  </a:solidFill>
+                  <a:latin typeface="Arial"/>
+                </a:rPr>
+                <a:t>Tester</a:t>
+              </a:r>
+              <a:endParaRPr kumimoji="0" sz="1000" b="0" i="0" u="none" strike="noStrike" kern="1200" cap="none" spc="0" normalizeH="0" baseline="0" noProof="0" dirty="0">
+                <a:ln>
+                  <a:noFill/>
+                </a:ln>
+                <a:solidFill>
+                  <a:prstClr val="white"/>
+                </a:solidFill>
+                <a:effectLst/>
+                <a:uLnTx/>
+                <a:uFillTx/>
+                <a:latin typeface="Arial"/>
+                <a:ea typeface="+mn-ea"/>
+                <a:cs typeface="+mn-cs"/>
+              </a:endParaRPr>
+            </a:p>
+          </p:txBody>
+        </p:sp>
+        <p:sp>
+          <p:nvSpPr>
+            <p:cNvPr id="7" name="Oval 6">
+              <a:extLst>
+                <a:ext uri="{FF2B5EF4-FFF2-40B4-BE49-F238E27FC236}">
+                  <a16:creationId xmlns:a16="http://schemas.microsoft.com/office/drawing/2014/main" id="{AB6328E2-4265-5E44-AADB-5781C1BE6FDA}"/>
+                </a:ext>
+              </a:extLst>
+            </p:cNvPr>
+            <p:cNvSpPr/>
+            <p:nvPr/>
+          </p:nvSpPr>
+          <p:spPr>
+            <a:xfrm>
+              <a:off x="3827363" y="430268"/>
+              <a:ext cx="552836" cy="489898"/>
+            </a:xfrm>
+            <a:prstGeom prst="ellipse">
+              <a:avLst/>
+            </a:prstGeom>
+            <a:ln>
+              <a:noFill/>
+            </a:ln>
+          </p:spPr>
+          <p:style>
+            <a:lnRef idx="2">
+              <a:schemeClr val="accent1">
+                <a:shade val="50000"/>
+              </a:schemeClr>
+            </a:lnRef>
+            <a:fillRef idx="1">
+              <a:schemeClr val="accent1"/>
+            </a:fillRef>
+            <a:effectRef idx="0">
+              <a:schemeClr val="accent1"/>
+            </a:effectRef>
+            <a:fontRef idx="minor">
+              <a:schemeClr val="lt1"/>
+            </a:fontRef>
+          </p:style>
+          <p:txBody>
+            <a:bodyPr rtlCol="0" anchor="t"/>
+            <a:lstStyle/>
+            <a:p>
+              <a:pPr marL="0" marR="0" indent="0" algn="l" defTabSz="685800" rtl="0" eaLnBrk="1" fontAlgn="auto" latinLnBrk="0" hangingPunct="1">
+                <a:lnSpc>
+                  <a:spcPct val="100000"/>
+                </a:lnSpc>
+                <a:spcBef>
+                  <a:spcPts val="0"/>
+                </a:spcBef>
+                <a:spcAft>
+                  <a:spcPts val="0"/>
+                </a:spcAft>
+                <a:buClrTx/>
+                <a:buSzTx/>
+                <a:buFontTx/>
+                <a:buNone/>
+                <a:tabLst/>
+              </a:pPr>
+              <a:endParaRPr kumimoji="0" sz="1000" b="0" i="0" u="none" strike="noStrike" kern="1200" cap="none" spc="0" normalizeH="0" baseline="0" noProof="0" dirty="0">
+                <a:ln>
+                  <a:noFill/>
+                </a:ln>
+                <a:solidFill>
+                  <a:prstClr val="white"/>
+                </a:solidFill>
+                <a:effectLst/>
+                <a:uLnTx/>
+                <a:uFillTx/>
+                <a:latin typeface="Arial"/>
+                <a:ea typeface="+mn-ea"/>
+                <a:cs typeface="+mn-cs"/>
+              </a:endParaRPr>
+            </a:p>
+          </p:txBody>
+        </p:sp>
+      </p:grpSp>
+      <p:sp>
+        <p:nvSpPr>
+          <p:cNvPr id="8" name="Rectangle 7">
+            <a:extLst>
+              <a:ext uri="{FF2B5EF4-FFF2-40B4-BE49-F238E27FC236}">
+                <a16:creationId xmlns:a16="http://schemas.microsoft.com/office/drawing/2014/main" id="{4131C140-520F-1A48-B89D-099B753D7E9C}"/>
+              </a:ext>
+            </a:extLst>
+          </p:cNvPr>
+          <p:cNvSpPr/>
+          <p:nvPr/>
+        </p:nvSpPr>
+        <p:spPr>
+          <a:xfrm>
+            <a:off x="3218694" y="2367753"/>
+            <a:ext cx="1663547" cy="914400"/>
+          </a:xfrm>
+          <a:prstGeom prst="rect">
+            <a:avLst/>
+          </a:prstGeom>
+          <a:solidFill>
+            <a:srgbClr val="3567A6"/>
+          </a:solidFill>
+          <a:ln/>
+        </p:spPr>
+        <p:style>
+          <a:lnRef idx="0">
+            <a:schemeClr val="accent1"/>
+          </a:lnRef>
+          <a:fillRef idx="3">
+            <a:schemeClr val="accent1"/>
+          </a:fillRef>
+          <a:effectRef idx="3">
+            <a:schemeClr val="accent1"/>
+          </a:effectRef>
+          <a:fontRef idx="minor">
+            <a:schemeClr val="lt1"/>
+          </a:fontRef>
+        </p:style>
+        <p:txBody>
+          <a:bodyPr rtlCol="0" anchor="ctr"/>
+          <a:lstStyle/>
+          <a:p>
+            <a:pPr marL="0" marR="0" indent="0" algn="ctr" defTabSz="685800" rtl="0" eaLnBrk="1" fontAlgn="auto" latinLnBrk="0" hangingPunct="1">
+              <a:lnSpc>
+                <a:spcPct val="100000"/>
+              </a:lnSpc>
+              <a:spcBef>
+                <a:spcPts val="0"/>
+              </a:spcBef>
+              <a:spcAft>
+                <a:spcPts val="0"/>
+              </a:spcAft>
+              <a:buClrTx/>
+              <a:buSzTx/>
+              <a:buFontTx/>
+              <a:buNone/>
+              <a:tabLst/>
+            </a:pPr>
+            <a:r>
+              <a:rPr kumimoji="0" lang="en-US" sz="1000" b="0" i="0" u="none" strike="noStrike" kern="1200" cap="none" spc="0" normalizeH="0" baseline="0" noProof="0" dirty="0">
+                <a:ln>
+                  <a:noFill/>
+                </a:ln>
+                <a:solidFill>
+                  <a:prstClr val="white"/>
+                </a:solidFill>
+                <a:effectLst/>
+                <a:uLnTx/>
+                <a:uFillTx/>
+                <a:latin typeface="Arial"/>
+                <a:ea typeface="+mn-ea"/>
+                <a:cs typeface="+mn-cs"/>
+              </a:rPr>
+              <a:t>Kafka Performance Tool</a:t>
+            </a:r>
+          </a:p>
+          <a:p>
+            <a:pPr marL="0" marR="0" indent="0" algn="ctr" defTabSz="685800" rtl="0" eaLnBrk="1" fontAlgn="auto" latinLnBrk="0" hangingPunct="1">
+              <a:lnSpc>
+                <a:spcPct val="100000"/>
+              </a:lnSpc>
+              <a:spcBef>
+                <a:spcPts val="0"/>
+              </a:spcBef>
+              <a:spcAft>
+                <a:spcPts val="0"/>
+              </a:spcAft>
+              <a:buClrTx/>
+              <a:buSzTx/>
+              <a:buFontTx/>
+              <a:buNone/>
+              <a:tabLst/>
+            </a:pPr>
+            <a:r>
+              <a:rPr lang="en-US" sz="800" dirty="0">
+                <a:solidFill>
+                  <a:prstClr val="white"/>
+                </a:solidFill>
+                <a:latin typeface="Arial"/>
+              </a:rPr>
+              <a:t>[software system]</a:t>
+            </a:r>
+            <a:endParaRPr kumimoji="0" lang="en-US" sz="800" b="0" i="0" u="none" strike="noStrike" kern="1200" cap="none" spc="0" normalizeH="0" baseline="0" noProof="0" dirty="0">
+              <a:ln>
+                <a:noFill/>
+              </a:ln>
+              <a:solidFill>
+                <a:prstClr val="white"/>
+              </a:solidFill>
+              <a:effectLst/>
+              <a:uLnTx/>
+              <a:uFillTx/>
+              <a:latin typeface="Arial"/>
+              <a:ea typeface="+mn-ea"/>
+              <a:cs typeface="+mn-cs"/>
+            </a:endParaRPr>
+          </a:p>
+          <a:p>
+            <a:pPr marL="0" marR="0" indent="0" algn="ctr" defTabSz="685800" rtl="0" eaLnBrk="1" fontAlgn="auto" latinLnBrk="0" hangingPunct="1">
+              <a:lnSpc>
+                <a:spcPct val="100000"/>
+              </a:lnSpc>
+              <a:spcBef>
+                <a:spcPts val="0"/>
+              </a:spcBef>
+              <a:spcAft>
+                <a:spcPts val="0"/>
+              </a:spcAft>
+              <a:buClrTx/>
+              <a:buSzTx/>
+              <a:buFontTx/>
+              <a:buNone/>
+              <a:tabLst/>
+            </a:pPr>
+            <a:endParaRPr lang="en-US" sz="1000" dirty="0">
+              <a:solidFill>
+                <a:prstClr val="white"/>
+              </a:solidFill>
+              <a:latin typeface="Arial"/>
+            </a:endParaRPr>
+          </a:p>
+          <a:p>
+            <a:pPr marL="0" marR="0" indent="0" algn="ctr" defTabSz="685800" rtl="0" eaLnBrk="1" fontAlgn="auto" latinLnBrk="0" hangingPunct="1">
+              <a:lnSpc>
+                <a:spcPct val="100000"/>
+              </a:lnSpc>
+              <a:spcBef>
+                <a:spcPts val="0"/>
+              </a:spcBef>
+              <a:spcAft>
+                <a:spcPts val="0"/>
+              </a:spcAft>
+              <a:buClrTx/>
+              <a:buSzTx/>
+              <a:buFontTx/>
+              <a:buNone/>
+              <a:tabLst/>
+            </a:pPr>
+            <a:r>
+              <a:rPr kumimoji="0" lang="en-US" sz="800" b="0" i="0" u="none" strike="noStrike" kern="1200" cap="none" spc="0" normalizeH="0" baseline="0" noProof="0" dirty="0">
+                <a:ln>
+                  <a:noFill/>
+                </a:ln>
+                <a:solidFill>
+                  <a:prstClr val="white"/>
+                </a:solidFill>
+                <a:effectLst/>
+                <a:uLnTx/>
+                <a:uFillTx/>
+                <a:latin typeface="Arial"/>
+                <a:ea typeface="+mn-ea"/>
+                <a:cs typeface="+mn-cs"/>
+              </a:rPr>
+              <a:t>Allows </a:t>
+            </a:r>
+            <a:r>
+              <a:rPr lang="en-US" sz="800" dirty="0">
+                <a:solidFill>
+                  <a:prstClr val="white"/>
+                </a:solidFill>
+                <a:latin typeface="Arial"/>
+              </a:rPr>
+              <a:t>stress kafka cluster and measure latency</a:t>
+            </a:r>
+            <a:endParaRPr kumimoji="0" sz="800" b="0" i="0" u="none" strike="noStrike" kern="1200" cap="none" spc="0" normalizeH="0" baseline="0" noProof="0" dirty="0">
+              <a:ln>
+                <a:noFill/>
+              </a:ln>
+              <a:solidFill>
+                <a:prstClr val="white"/>
+              </a:solidFill>
+              <a:effectLst/>
+              <a:uLnTx/>
+              <a:uFillTx/>
+              <a:latin typeface="Arial"/>
+              <a:ea typeface="+mn-ea"/>
+              <a:cs typeface="+mn-cs"/>
+            </a:endParaRPr>
+          </a:p>
+        </p:txBody>
+      </p:sp>
+      <p:sp>
+        <p:nvSpPr>
+          <p:cNvPr id="9" name="Rectangle 8">
+            <a:extLst>
+              <a:ext uri="{FF2B5EF4-FFF2-40B4-BE49-F238E27FC236}">
+                <a16:creationId xmlns:a16="http://schemas.microsoft.com/office/drawing/2014/main" id="{D0E2B8D2-575D-7A4F-9978-19F1A3B25D46}"/>
+              </a:ext>
+            </a:extLst>
+          </p:cNvPr>
+          <p:cNvSpPr/>
+          <p:nvPr/>
+        </p:nvSpPr>
+        <p:spPr>
+          <a:xfrm>
+            <a:off x="6232612" y="3528298"/>
+            <a:ext cx="1663547" cy="914400"/>
+          </a:xfrm>
+          <a:prstGeom prst="rect">
+            <a:avLst/>
+          </a:prstGeom>
+          <a:solidFill>
+            <a:schemeClr val="bg1">
+              <a:lumMod val="50000"/>
+            </a:schemeClr>
+          </a:solidFill>
+          <a:ln/>
+        </p:spPr>
+        <p:style>
+          <a:lnRef idx="0">
+            <a:schemeClr val="accent1"/>
+          </a:lnRef>
+          <a:fillRef idx="3">
+            <a:schemeClr val="accent1"/>
+          </a:fillRef>
+          <a:effectRef idx="3">
+            <a:schemeClr val="accent1"/>
+          </a:effectRef>
+          <a:fontRef idx="minor">
+            <a:schemeClr val="lt1"/>
+          </a:fontRef>
+        </p:style>
+        <p:txBody>
+          <a:bodyPr rtlCol="0" anchor="ctr"/>
+          <a:lstStyle/>
+          <a:p>
+            <a:pPr marL="0" marR="0" indent="0" algn="ctr" defTabSz="685800" rtl="0" eaLnBrk="1" fontAlgn="auto" latinLnBrk="0" hangingPunct="1">
+              <a:lnSpc>
+                <a:spcPct val="100000"/>
+              </a:lnSpc>
+              <a:spcBef>
+                <a:spcPts val="0"/>
+              </a:spcBef>
+              <a:spcAft>
+                <a:spcPts val="0"/>
+              </a:spcAft>
+              <a:buClrTx/>
+              <a:buSzTx/>
+              <a:buFontTx/>
+              <a:buNone/>
+              <a:tabLst/>
+            </a:pPr>
+            <a:r>
+              <a:rPr kumimoji="0" lang="en-US" sz="1000" b="0" i="0" u="none" strike="noStrike" kern="1200" cap="none" spc="0" normalizeH="0" baseline="0" noProof="0" dirty="0">
+                <a:ln>
+                  <a:noFill/>
+                </a:ln>
+                <a:solidFill>
+                  <a:prstClr val="white"/>
+                </a:solidFill>
+                <a:effectLst/>
+                <a:uLnTx/>
+                <a:uFillTx/>
+                <a:latin typeface="Arial"/>
+                <a:ea typeface="+mn-ea"/>
+                <a:cs typeface="+mn-cs"/>
+              </a:rPr>
+              <a:t>Kafka Cluster</a:t>
+            </a:r>
+          </a:p>
+          <a:p>
+            <a:pPr marL="0" marR="0" indent="0" algn="ctr" defTabSz="685800" rtl="0" eaLnBrk="1" fontAlgn="auto" latinLnBrk="0" hangingPunct="1">
+              <a:lnSpc>
+                <a:spcPct val="100000"/>
+              </a:lnSpc>
+              <a:spcBef>
+                <a:spcPts val="0"/>
+              </a:spcBef>
+              <a:spcAft>
+                <a:spcPts val="0"/>
+              </a:spcAft>
+              <a:buClrTx/>
+              <a:buSzTx/>
+              <a:buFontTx/>
+              <a:buNone/>
+              <a:tabLst/>
+            </a:pPr>
+            <a:r>
+              <a:rPr lang="en-US" sz="800" dirty="0">
+                <a:solidFill>
+                  <a:prstClr val="white"/>
+                </a:solidFill>
+                <a:latin typeface="Arial"/>
+              </a:rPr>
+              <a:t>[software system]</a:t>
+            </a:r>
+            <a:endParaRPr kumimoji="0" lang="en-US" sz="800" b="0" i="0" u="none" strike="noStrike" kern="1200" cap="none" spc="0" normalizeH="0" baseline="0" noProof="0" dirty="0">
+              <a:ln>
+                <a:noFill/>
+              </a:ln>
+              <a:solidFill>
+                <a:prstClr val="white"/>
+              </a:solidFill>
+              <a:effectLst/>
+              <a:uLnTx/>
+              <a:uFillTx/>
+              <a:latin typeface="Arial"/>
+              <a:ea typeface="+mn-ea"/>
+              <a:cs typeface="+mn-cs"/>
+            </a:endParaRPr>
+          </a:p>
+          <a:p>
+            <a:pPr marL="0" marR="0" indent="0" algn="ctr" defTabSz="685800" rtl="0" eaLnBrk="1" fontAlgn="auto" latinLnBrk="0" hangingPunct="1">
+              <a:lnSpc>
+                <a:spcPct val="100000"/>
+              </a:lnSpc>
+              <a:spcBef>
+                <a:spcPts val="0"/>
+              </a:spcBef>
+              <a:spcAft>
+                <a:spcPts val="0"/>
+              </a:spcAft>
+              <a:buClrTx/>
+              <a:buSzTx/>
+              <a:buFontTx/>
+              <a:buNone/>
+              <a:tabLst/>
+            </a:pPr>
+            <a:endParaRPr lang="en-US" sz="1000" dirty="0">
+              <a:solidFill>
+                <a:prstClr val="white"/>
+              </a:solidFill>
+              <a:latin typeface="Arial"/>
+            </a:endParaRPr>
+          </a:p>
+        </p:txBody>
+      </p:sp>
+      <p:cxnSp>
+        <p:nvCxnSpPr>
+          <p:cNvPr id="10" name="Straight Arrow Connector 9">
+            <a:extLst>
+              <a:ext uri="{FF2B5EF4-FFF2-40B4-BE49-F238E27FC236}">
+                <a16:creationId xmlns:a16="http://schemas.microsoft.com/office/drawing/2014/main" id="{F918A8D0-AD6C-3A41-87EA-EF802A10A724}"/>
+              </a:ext>
+            </a:extLst>
+          </p:cNvPr>
+          <p:cNvCxnSpPr>
+            <a:cxnSpLocks/>
+            <a:stCxn id="8" idx="3"/>
+            <a:endCxn id="9" idx="1"/>
+          </p:cNvCxnSpPr>
+          <p:nvPr/>
+        </p:nvCxnSpPr>
+        <p:spPr>
+          <a:xfrm>
+            <a:off x="4882241" y="2824953"/>
+            <a:ext cx="1350371" cy="1160545"/>
+          </a:xfrm>
+          <a:prstGeom prst="straightConnector1">
+            <a:avLst/>
+          </a:prstGeom>
+          <a:ln>
+            <a:solidFill>
+              <a:schemeClr val="accent2">
+                <a:lumMod val="50000"/>
+              </a:schemeClr>
+            </a:solidFill>
+            <a:tailEnd type="triangle"/>
+          </a:ln>
+          <a:effectLst/>
+        </p:spPr>
+        <p:style>
+          <a:lnRef idx="2">
+            <a:schemeClr val="accent1"/>
+          </a:lnRef>
+          <a:fillRef idx="0">
+            <a:schemeClr val="accent1"/>
+          </a:fillRef>
+          <a:effectRef idx="1">
+            <a:schemeClr val="accent1"/>
+          </a:effectRef>
+          <a:fontRef idx="minor">
+            <a:schemeClr val="tx1"/>
+          </a:fontRef>
+        </p:style>
+      </p:cxnSp>
+      <p:sp>
+        <p:nvSpPr>
+          <p:cNvPr id="11" name="TextBox 10">
+            <a:extLst>
+              <a:ext uri="{FF2B5EF4-FFF2-40B4-BE49-F238E27FC236}">
+                <a16:creationId xmlns:a16="http://schemas.microsoft.com/office/drawing/2014/main" id="{71E1247C-49D7-D147-9304-6DE26446F6CF}"/>
+              </a:ext>
+            </a:extLst>
+          </p:cNvPr>
+          <p:cNvSpPr txBox="1"/>
+          <p:nvPr/>
+        </p:nvSpPr>
+        <p:spPr>
+          <a:xfrm>
+            <a:off x="4953095" y="3258716"/>
+            <a:ext cx="1279517" cy="338554"/>
+          </a:xfrm>
+          <a:prstGeom prst="rect">
+            <a:avLst/>
+          </a:prstGeom>
+          <a:solidFill>
+            <a:schemeClr val="bg1"/>
+          </a:solidFill>
+        </p:spPr>
+        <p:txBody>
+          <a:bodyPr wrap="none" rtlCol="0">
+            <a:spAutoFit/>
+          </a:bodyPr>
+          <a:lstStyle/>
+          <a:p>
+            <a:r>
+              <a:rPr lang="en-US" sz="800" dirty="0"/>
+              <a:t>Publishes &amp; Consumes </a:t>
+            </a:r>
+          </a:p>
+          <a:p>
+            <a:r>
+              <a:rPr lang="en-US" sz="800" dirty="0"/>
+              <a:t>messages</a:t>
+            </a:r>
+          </a:p>
+        </p:txBody>
+      </p:sp>
+      <p:cxnSp>
+        <p:nvCxnSpPr>
+          <p:cNvPr id="13" name="Straight Arrow Connector 12">
+            <a:extLst>
+              <a:ext uri="{FF2B5EF4-FFF2-40B4-BE49-F238E27FC236}">
+                <a16:creationId xmlns:a16="http://schemas.microsoft.com/office/drawing/2014/main" id="{F17228FB-5052-F34E-BFC4-E5C2BD5C5C69}"/>
+              </a:ext>
+            </a:extLst>
+          </p:cNvPr>
+          <p:cNvCxnSpPr>
+            <a:cxnSpLocks/>
+            <a:stCxn id="6" idx="2"/>
+            <a:endCxn id="8" idx="0"/>
+          </p:cNvCxnSpPr>
+          <p:nvPr/>
+        </p:nvCxnSpPr>
+        <p:spPr>
+          <a:xfrm>
+            <a:off x="3936941" y="1875462"/>
+            <a:ext cx="113527" cy="492291"/>
+          </a:xfrm>
+          <a:prstGeom prst="straightConnector1">
+            <a:avLst/>
+          </a:prstGeom>
+          <a:ln>
+            <a:solidFill>
+              <a:schemeClr val="accent2">
+                <a:lumMod val="50000"/>
+              </a:schemeClr>
+            </a:solidFill>
+            <a:tailEnd type="triangle"/>
+          </a:ln>
+          <a:effectLst/>
+        </p:spPr>
+        <p:style>
+          <a:lnRef idx="2">
+            <a:schemeClr val="accent1"/>
+          </a:lnRef>
+          <a:fillRef idx="0">
+            <a:schemeClr val="accent1"/>
+          </a:fillRef>
+          <a:effectRef idx="1">
+            <a:schemeClr val="accent1"/>
+          </a:effectRef>
+          <a:fontRef idx="minor">
+            <a:schemeClr val="tx1"/>
+          </a:fontRef>
+        </p:style>
+      </p:cxnSp>
+      <p:sp>
+        <p:nvSpPr>
+          <p:cNvPr id="14" name="TextBox 13">
+            <a:extLst>
+              <a:ext uri="{FF2B5EF4-FFF2-40B4-BE49-F238E27FC236}">
+                <a16:creationId xmlns:a16="http://schemas.microsoft.com/office/drawing/2014/main" id="{E911EA25-6B7C-5E45-ACA4-ADEB2692F0E0}"/>
+              </a:ext>
+            </a:extLst>
+          </p:cNvPr>
+          <p:cNvSpPr txBox="1"/>
+          <p:nvPr/>
+        </p:nvSpPr>
+        <p:spPr>
+          <a:xfrm>
+            <a:off x="3295096" y="2006828"/>
+            <a:ext cx="1083951" cy="215444"/>
+          </a:xfrm>
+          <a:prstGeom prst="rect">
+            <a:avLst/>
+          </a:prstGeom>
+          <a:solidFill>
+            <a:schemeClr val="bg1"/>
+          </a:solidFill>
+        </p:spPr>
+        <p:txBody>
+          <a:bodyPr wrap="none" rtlCol="0">
+            <a:spAutoFit/>
+          </a:bodyPr>
+          <a:lstStyle/>
+          <a:p>
+            <a:r>
+              <a:rPr lang="en-US" sz="800" dirty="0"/>
+              <a:t>Deploy, trigger runs</a:t>
+            </a:r>
+            <a:endParaRPr sz="800" dirty="0"/>
+          </a:p>
+        </p:txBody>
+      </p:sp>
+      <p:sp>
+        <p:nvSpPr>
+          <p:cNvPr id="18" name="Rectangle 17">
+            <a:extLst>
+              <a:ext uri="{FF2B5EF4-FFF2-40B4-BE49-F238E27FC236}">
+                <a16:creationId xmlns:a16="http://schemas.microsoft.com/office/drawing/2014/main" id="{731E9411-8E61-6E4B-B6D9-674CB64458C6}"/>
+              </a:ext>
+            </a:extLst>
+          </p:cNvPr>
+          <p:cNvSpPr/>
+          <p:nvPr/>
+        </p:nvSpPr>
+        <p:spPr>
+          <a:xfrm>
+            <a:off x="844534" y="2403222"/>
+            <a:ext cx="1663547" cy="914400"/>
+          </a:xfrm>
+          <a:prstGeom prst="rect">
+            <a:avLst/>
+          </a:prstGeom>
+          <a:solidFill>
+            <a:schemeClr val="bg1">
+              <a:lumMod val="50000"/>
+            </a:schemeClr>
+          </a:solidFill>
+          <a:ln/>
+        </p:spPr>
+        <p:style>
+          <a:lnRef idx="0">
+            <a:schemeClr val="accent1"/>
+          </a:lnRef>
+          <a:fillRef idx="3">
+            <a:schemeClr val="accent1"/>
+          </a:fillRef>
+          <a:effectRef idx="3">
+            <a:schemeClr val="accent1"/>
+          </a:effectRef>
+          <a:fontRef idx="minor">
+            <a:schemeClr val="lt1"/>
+          </a:fontRef>
+        </p:style>
+        <p:txBody>
+          <a:bodyPr rtlCol="0" anchor="ctr"/>
+          <a:lstStyle/>
+          <a:p>
+            <a:pPr marL="0" marR="0" indent="0" algn="ctr" defTabSz="685800" rtl="0" eaLnBrk="1" fontAlgn="auto" latinLnBrk="0" hangingPunct="1">
+              <a:lnSpc>
+                <a:spcPct val="100000"/>
+              </a:lnSpc>
+              <a:spcBef>
+                <a:spcPts val="0"/>
+              </a:spcBef>
+              <a:spcAft>
+                <a:spcPts val="0"/>
+              </a:spcAft>
+              <a:buClrTx/>
+              <a:buSzTx/>
+              <a:buFontTx/>
+              <a:buNone/>
+              <a:tabLst/>
+            </a:pPr>
+            <a:r>
+              <a:rPr kumimoji="0" lang="en-US" sz="1000" b="0" i="0" u="none" strike="noStrike" kern="1200" cap="none" spc="0" normalizeH="0" baseline="0" noProof="0" dirty="0">
+                <a:ln>
+                  <a:noFill/>
+                </a:ln>
+                <a:solidFill>
+                  <a:prstClr val="white"/>
+                </a:solidFill>
+                <a:effectLst/>
+                <a:uLnTx/>
+                <a:uFillTx/>
+                <a:latin typeface="Arial"/>
+                <a:ea typeface="+mn-ea"/>
+                <a:cs typeface="+mn-cs"/>
+              </a:rPr>
+              <a:t>Mirror Maker 2</a:t>
+            </a:r>
+          </a:p>
+          <a:p>
+            <a:pPr marL="0" marR="0" indent="0" algn="ctr" defTabSz="685800" rtl="0" eaLnBrk="1" fontAlgn="auto" latinLnBrk="0" hangingPunct="1">
+              <a:lnSpc>
+                <a:spcPct val="100000"/>
+              </a:lnSpc>
+              <a:spcBef>
+                <a:spcPts val="0"/>
+              </a:spcBef>
+              <a:spcAft>
+                <a:spcPts val="0"/>
+              </a:spcAft>
+              <a:buClrTx/>
+              <a:buSzTx/>
+              <a:buFontTx/>
+              <a:buNone/>
+              <a:tabLst/>
+            </a:pPr>
+            <a:r>
+              <a:rPr lang="en-US" sz="800" dirty="0">
+                <a:solidFill>
+                  <a:prstClr val="white"/>
+                </a:solidFill>
+                <a:latin typeface="Arial"/>
+              </a:rPr>
+              <a:t>[software system]</a:t>
+            </a:r>
+            <a:endParaRPr kumimoji="0" lang="en-US" sz="800" b="0" i="0" u="none" strike="noStrike" kern="1200" cap="none" spc="0" normalizeH="0" baseline="0" noProof="0" dirty="0">
+              <a:ln>
+                <a:noFill/>
+              </a:ln>
+              <a:solidFill>
+                <a:prstClr val="white"/>
+              </a:solidFill>
+              <a:effectLst/>
+              <a:uLnTx/>
+              <a:uFillTx/>
+              <a:latin typeface="Arial"/>
+              <a:ea typeface="+mn-ea"/>
+              <a:cs typeface="+mn-cs"/>
+            </a:endParaRPr>
+          </a:p>
+          <a:p>
+            <a:pPr marL="0" marR="0" indent="0" algn="ctr" defTabSz="685800" rtl="0" eaLnBrk="1" fontAlgn="auto" latinLnBrk="0" hangingPunct="1">
+              <a:lnSpc>
+                <a:spcPct val="100000"/>
+              </a:lnSpc>
+              <a:spcBef>
+                <a:spcPts val="0"/>
+              </a:spcBef>
+              <a:spcAft>
+                <a:spcPts val="0"/>
+              </a:spcAft>
+              <a:buClrTx/>
+              <a:buSzTx/>
+              <a:buFontTx/>
+              <a:buNone/>
+              <a:tabLst/>
+            </a:pPr>
+            <a:endParaRPr lang="en-US" sz="1000" dirty="0">
+              <a:solidFill>
+                <a:prstClr val="white"/>
+              </a:solidFill>
+              <a:latin typeface="Arial"/>
+            </a:endParaRPr>
+          </a:p>
+        </p:txBody>
+      </p:sp>
+      <p:cxnSp>
+        <p:nvCxnSpPr>
+          <p:cNvPr id="19" name="Straight Arrow Connector 18">
+            <a:extLst>
+              <a:ext uri="{FF2B5EF4-FFF2-40B4-BE49-F238E27FC236}">
+                <a16:creationId xmlns:a16="http://schemas.microsoft.com/office/drawing/2014/main" id="{CF15ECF9-2867-184F-B35E-0C52B005AC10}"/>
+              </a:ext>
+            </a:extLst>
+          </p:cNvPr>
+          <p:cNvCxnSpPr>
+            <a:cxnSpLocks/>
+            <a:stCxn id="6" idx="1"/>
+            <a:endCxn id="18" idx="0"/>
+          </p:cNvCxnSpPr>
+          <p:nvPr/>
+        </p:nvCxnSpPr>
+        <p:spPr>
+          <a:xfrm flipH="1">
+            <a:off x="1676308" y="1536302"/>
+            <a:ext cx="1792415" cy="866920"/>
+          </a:xfrm>
+          <a:prstGeom prst="straightConnector1">
+            <a:avLst/>
+          </a:prstGeom>
+          <a:ln>
+            <a:solidFill>
+              <a:schemeClr val="accent2">
+                <a:lumMod val="50000"/>
+              </a:schemeClr>
+            </a:solidFill>
+            <a:tailEnd type="triangle"/>
+          </a:ln>
+          <a:effectLst/>
+        </p:spPr>
+        <p:style>
+          <a:lnRef idx="2">
+            <a:schemeClr val="accent1"/>
+          </a:lnRef>
+          <a:fillRef idx="0">
+            <a:schemeClr val="accent1"/>
+          </a:fillRef>
+          <a:effectRef idx="1">
+            <a:schemeClr val="accent1"/>
+          </a:effectRef>
+          <a:fontRef idx="minor">
+            <a:schemeClr val="tx1"/>
+          </a:fontRef>
+        </p:style>
+      </p:cxnSp>
+      <p:sp>
+        <p:nvSpPr>
+          <p:cNvPr id="26" name="TextBox 25">
+            <a:extLst>
+              <a:ext uri="{FF2B5EF4-FFF2-40B4-BE49-F238E27FC236}">
+                <a16:creationId xmlns:a16="http://schemas.microsoft.com/office/drawing/2014/main" id="{7BC92992-0CD5-164F-AD40-AAF6BE598858}"/>
+              </a:ext>
+            </a:extLst>
+          </p:cNvPr>
+          <p:cNvSpPr txBox="1"/>
+          <p:nvPr/>
+        </p:nvSpPr>
+        <p:spPr>
+          <a:xfrm>
+            <a:off x="2122524" y="1875462"/>
+            <a:ext cx="1083951" cy="215444"/>
+          </a:xfrm>
+          <a:prstGeom prst="rect">
+            <a:avLst/>
+          </a:prstGeom>
+          <a:solidFill>
+            <a:schemeClr val="bg1"/>
+          </a:solidFill>
+        </p:spPr>
+        <p:txBody>
+          <a:bodyPr wrap="none" rtlCol="0">
+            <a:spAutoFit/>
+          </a:bodyPr>
+          <a:lstStyle/>
+          <a:p>
+            <a:r>
+              <a:rPr lang="en-US" sz="800" dirty="0"/>
+              <a:t>Deploy, trigger runs</a:t>
+            </a:r>
+            <a:endParaRPr sz="800" dirty="0"/>
+          </a:p>
+        </p:txBody>
+      </p:sp>
+      <p:cxnSp>
+        <p:nvCxnSpPr>
+          <p:cNvPr id="29" name="Straight Arrow Connector 28">
+            <a:extLst>
+              <a:ext uri="{FF2B5EF4-FFF2-40B4-BE49-F238E27FC236}">
+                <a16:creationId xmlns:a16="http://schemas.microsoft.com/office/drawing/2014/main" id="{CED1673D-A61D-824D-8C21-D591C027F3C5}"/>
+              </a:ext>
+            </a:extLst>
+          </p:cNvPr>
+          <p:cNvCxnSpPr>
+            <a:cxnSpLocks/>
+            <a:stCxn id="8" idx="2"/>
+            <a:endCxn id="28" idx="0"/>
+          </p:cNvCxnSpPr>
+          <p:nvPr/>
+        </p:nvCxnSpPr>
+        <p:spPr>
+          <a:xfrm flipH="1">
+            <a:off x="3370838" y="3282153"/>
+            <a:ext cx="679630" cy="492291"/>
+          </a:xfrm>
+          <a:prstGeom prst="straightConnector1">
+            <a:avLst/>
+          </a:prstGeom>
+          <a:ln>
+            <a:solidFill>
+              <a:schemeClr val="accent2">
+                <a:lumMod val="50000"/>
+              </a:schemeClr>
+            </a:solidFill>
+            <a:tailEnd type="triangle"/>
+          </a:ln>
+          <a:effectLst/>
+        </p:spPr>
+        <p:style>
+          <a:lnRef idx="2">
+            <a:schemeClr val="accent1"/>
+          </a:lnRef>
+          <a:fillRef idx="0">
+            <a:schemeClr val="accent1"/>
+          </a:fillRef>
+          <a:effectRef idx="1">
+            <a:schemeClr val="accent1"/>
+          </a:effectRef>
+          <a:fontRef idx="minor">
+            <a:schemeClr val="tx1"/>
+          </a:fontRef>
+        </p:style>
+      </p:cxnSp>
+      <p:sp>
+        <p:nvSpPr>
+          <p:cNvPr id="32" name="TextBox 31">
+            <a:extLst>
+              <a:ext uri="{FF2B5EF4-FFF2-40B4-BE49-F238E27FC236}">
+                <a16:creationId xmlns:a16="http://schemas.microsoft.com/office/drawing/2014/main" id="{018CA162-B9D9-5D43-B7DA-E7D093961629}"/>
+              </a:ext>
+            </a:extLst>
+          </p:cNvPr>
+          <p:cNvSpPr txBox="1"/>
+          <p:nvPr/>
+        </p:nvSpPr>
+        <p:spPr>
+          <a:xfrm>
+            <a:off x="3043224" y="3336127"/>
+            <a:ext cx="1279517" cy="338554"/>
+          </a:xfrm>
+          <a:prstGeom prst="rect">
+            <a:avLst/>
+          </a:prstGeom>
+          <a:solidFill>
+            <a:schemeClr val="bg1"/>
+          </a:solidFill>
+        </p:spPr>
+        <p:txBody>
+          <a:bodyPr wrap="none" rtlCol="0">
+            <a:spAutoFit/>
+          </a:bodyPr>
+          <a:lstStyle/>
+          <a:p>
+            <a:r>
+              <a:rPr lang="en-US" sz="800" dirty="0"/>
+              <a:t>Publishes &amp; Consumes </a:t>
+            </a:r>
+          </a:p>
+          <a:p>
+            <a:r>
+              <a:rPr lang="en-US" sz="800" dirty="0"/>
+              <a:t>messages</a:t>
+            </a:r>
+          </a:p>
+        </p:txBody>
+      </p:sp>
+      <p:cxnSp>
+        <p:nvCxnSpPr>
+          <p:cNvPr id="38" name="Elbow Connector 37">
+            <a:extLst>
+              <a:ext uri="{FF2B5EF4-FFF2-40B4-BE49-F238E27FC236}">
+                <a16:creationId xmlns:a16="http://schemas.microsoft.com/office/drawing/2014/main" id="{9FB7594D-DEDA-CD41-AE83-217D67988383}"/>
+              </a:ext>
+            </a:extLst>
+          </p:cNvPr>
+          <p:cNvCxnSpPr>
+            <a:stCxn id="18" idx="2"/>
+            <a:endCxn id="28" idx="1"/>
+          </p:cNvCxnSpPr>
+          <p:nvPr/>
+        </p:nvCxnSpPr>
+        <p:spPr>
+          <a:xfrm rot="16200000" flipH="1">
+            <a:off x="1650675" y="3343255"/>
+            <a:ext cx="914022" cy="862756"/>
+          </a:xfrm>
+          <a:prstGeom prst="bentConnector2">
+            <a:avLst/>
+          </a:prstGeom>
+          <a:ln>
+            <a:solidFill>
+              <a:schemeClr val="accent6"/>
+            </a:solidFill>
+            <a:tailEnd type="triangle"/>
+          </a:ln>
+          <a:effectLst/>
+        </p:spPr>
+        <p:style>
+          <a:lnRef idx="2">
+            <a:schemeClr val="accent1"/>
+          </a:lnRef>
+          <a:fillRef idx="0">
+            <a:schemeClr val="accent1"/>
+          </a:fillRef>
+          <a:effectRef idx="1">
+            <a:schemeClr val="accent1"/>
+          </a:effectRef>
+          <a:fontRef idx="minor">
+            <a:schemeClr val="tx1"/>
+          </a:fontRef>
+        </p:style>
+      </p:cxnSp>
+      <p:cxnSp>
+        <p:nvCxnSpPr>
+          <p:cNvPr id="39" name="Elbow Connector 38">
+            <a:extLst>
+              <a:ext uri="{FF2B5EF4-FFF2-40B4-BE49-F238E27FC236}">
+                <a16:creationId xmlns:a16="http://schemas.microsoft.com/office/drawing/2014/main" id="{4ECFCE31-274A-974A-BA72-B59DBB20F4CE}"/>
+              </a:ext>
+            </a:extLst>
+          </p:cNvPr>
+          <p:cNvCxnSpPr>
+            <a:cxnSpLocks/>
+            <a:stCxn id="18" idx="2"/>
+            <a:endCxn id="9" idx="1"/>
+          </p:cNvCxnSpPr>
+          <p:nvPr/>
+        </p:nvCxnSpPr>
+        <p:spPr>
+          <a:xfrm rot="16200000" flipH="1">
+            <a:off x="3620522" y="1373408"/>
+            <a:ext cx="667876" cy="4556304"/>
+          </a:xfrm>
+          <a:prstGeom prst="bentConnector2">
+            <a:avLst/>
+          </a:prstGeom>
+          <a:ln>
+            <a:solidFill>
+              <a:schemeClr val="accent6"/>
+            </a:solidFill>
+            <a:tailEnd type="triangle"/>
+          </a:ln>
+          <a:effectLst/>
+        </p:spPr>
+        <p:style>
+          <a:lnRef idx="2">
+            <a:schemeClr val="accent1"/>
+          </a:lnRef>
+          <a:fillRef idx="0">
+            <a:schemeClr val="accent1"/>
+          </a:fillRef>
+          <a:effectRef idx="1">
+            <a:schemeClr val="accent1"/>
+          </a:effectRef>
+          <a:fontRef idx="minor">
+            <a:schemeClr val="tx1"/>
+          </a:fontRef>
+        </p:style>
+      </p:cxnSp>
+      <p:sp>
+        <p:nvSpPr>
+          <p:cNvPr id="28" name="Rectangle 27">
+            <a:extLst>
+              <a:ext uri="{FF2B5EF4-FFF2-40B4-BE49-F238E27FC236}">
+                <a16:creationId xmlns:a16="http://schemas.microsoft.com/office/drawing/2014/main" id="{74729975-8414-8941-98AD-12678BAE8825}"/>
+              </a:ext>
+            </a:extLst>
+          </p:cNvPr>
+          <p:cNvSpPr/>
+          <p:nvPr/>
+        </p:nvSpPr>
+        <p:spPr>
+          <a:xfrm>
+            <a:off x="2539064" y="3774444"/>
+            <a:ext cx="1663547" cy="914400"/>
+          </a:xfrm>
+          <a:prstGeom prst="rect">
+            <a:avLst/>
+          </a:prstGeom>
+          <a:solidFill>
+            <a:schemeClr val="bg1">
+              <a:lumMod val="50000"/>
+            </a:schemeClr>
+          </a:solidFill>
+          <a:ln/>
+        </p:spPr>
+        <p:style>
+          <a:lnRef idx="0">
+            <a:schemeClr val="accent1"/>
+          </a:lnRef>
+          <a:fillRef idx="3">
+            <a:schemeClr val="accent1"/>
+          </a:fillRef>
+          <a:effectRef idx="3">
+            <a:schemeClr val="accent1"/>
+          </a:effectRef>
+          <a:fontRef idx="minor">
+            <a:schemeClr val="lt1"/>
+          </a:fontRef>
+        </p:style>
+        <p:txBody>
+          <a:bodyPr rtlCol="0" anchor="ctr"/>
+          <a:lstStyle/>
+          <a:p>
+            <a:pPr marL="0" marR="0" indent="0" algn="ctr" defTabSz="685800" rtl="0" eaLnBrk="1" fontAlgn="auto" latinLnBrk="0" hangingPunct="1">
+              <a:lnSpc>
+                <a:spcPct val="100000"/>
+              </a:lnSpc>
+              <a:spcBef>
+                <a:spcPts val="0"/>
+              </a:spcBef>
+              <a:spcAft>
+                <a:spcPts val="0"/>
+              </a:spcAft>
+              <a:buClrTx/>
+              <a:buSzTx/>
+              <a:buFontTx/>
+              <a:buNone/>
+              <a:tabLst/>
+            </a:pPr>
+            <a:r>
+              <a:rPr kumimoji="0" lang="en-US" sz="1000" b="0" i="0" u="none" strike="noStrike" kern="1200" cap="none" spc="0" normalizeH="0" baseline="0" noProof="0" dirty="0">
+                <a:ln>
+                  <a:noFill/>
+                </a:ln>
+                <a:solidFill>
+                  <a:prstClr val="white"/>
+                </a:solidFill>
+                <a:effectLst/>
+                <a:uLnTx/>
+                <a:uFillTx/>
+                <a:latin typeface="Arial"/>
+                <a:ea typeface="+mn-ea"/>
+                <a:cs typeface="+mn-cs"/>
+              </a:rPr>
+              <a:t>Kafka Cluster</a:t>
+            </a:r>
+          </a:p>
+          <a:p>
+            <a:pPr marL="0" marR="0" indent="0" algn="ctr" defTabSz="685800" rtl="0" eaLnBrk="1" fontAlgn="auto" latinLnBrk="0" hangingPunct="1">
+              <a:lnSpc>
+                <a:spcPct val="100000"/>
+              </a:lnSpc>
+              <a:spcBef>
+                <a:spcPts val="0"/>
+              </a:spcBef>
+              <a:spcAft>
+                <a:spcPts val="0"/>
+              </a:spcAft>
+              <a:buClrTx/>
+              <a:buSzTx/>
+              <a:buFontTx/>
+              <a:buNone/>
+              <a:tabLst/>
+            </a:pPr>
+            <a:r>
+              <a:rPr lang="en-US" sz="800" dirty="0">
+                <a:solidFill>
+                  <a:prstClr val="white"/>
+                </a:solidFill>
+                <a:latin typeface="Arial"/>
+              </a:rPr>
+              <a:t>[software system]</a:t>
+            </a:r>
+            <a:endParaRPr kumimoji="0" lang="en-US" sz="800" b="0" i="0" u="none" strike="noStrike" kern="1200" cap="none" spc="0" normalizeH="0" baseline="0" noProof="0" dirty="0">
+              <a:ln>
+                <a:noFill/>
+              </a:ln>
+              <a:solidFill>
+                <a:prstClr val="white"/>
+              </a:solidFill>
+              <a:effectLst/>
+              <a:uLnTx/>
+              <a:uFillTx/>
+              <a:latin typeface="Arial"/>
+              <a:ea typeface="+mn-ea"/>
+              <a:cs typeface="+mn-cs"/>
+            </a:endParaRPr>
+          </a:p>
+          <a:p>
+            <a:pPr marL="0" marR="0" indent="0" algn="ctr" defTabSz="685800" rtl="0" eaLnBrk="1" fontAlgn="auto" latinLnBrk="0" hangingPunct="1">
+              <a:lnSpc>
+                <a:spcPct val="100000"/>
+              </a:lnSpc>
+              <a:spcBef>
+                <a:spcPts val="0"/>
+              </a:spcBef>
+              <a:spcAft>
+                <a:spcPts val="0"/>
+              </a:spcAft>
+              <a:buClrTx/>
+              <a:buSzTx/>
+              <a:buFontTx/>
+              <a:buNone/>
+              <a:tabLst/>
+            </a:pPr>
+            <a:endParaRPr lang="en-US" sz="1000" dirty="0">
+              <a:solidFill>
+                <a:prstClr val="white"/>
+              </a:solidFill>
+              <a:latin typeface="Arial"/>
+            </a:endParaRPr>
+          </a:p>
+        </p:txBody>
+      </p:sp>
+    </p:spTree>
+    <p:extLst>
+      <p:ext uri="{BB962C8B-B14F-4D97-AF65-F5344CB8AC3E}">
+        <p14:creationId xmlns:p14="http://schemas.microsoft.com/office/powerpoint/2010/main" val="3404373823"/>
+      </p:ext>
+    </p:extLst>
+  </p:cSld>
+  <p:clrMapOvr>
+    <a:masterClrMapping/>
+  </p:clrMapOvr>
+</p:sld>
+</file>
+
+<file path=ppt/slides/slide18.xml><?xml version="1.0" encoding="utf-8"?>
+<p:sld xmlns:a="http://schemas.openxmlformats.org/drawingml/2006/main" xmlns:r="http://schemas.openxmlformats.org/officeDocument/2006/relationships" xmlns:p="http://schemas.openxmlformats.org/presentationml/2006/main">
+  <p:cSld>
+    <p:spTree>
+      <p:nvGrpSpPr>
+        <p:cNvPr id="1" name=""/>
+        <p:cNvGrpSpPr/>
+        <p:nvPr/>
+      </p:nvGrpSpPr>
+      <p:grpSpPr>
+        <a:xfrm>
+          <a:off x="0" y="0"/>
+          <a:ext cx="0" cy="0"/>
+          <a:chOff x="0" y="0"/>
+          <a:chExt cx="0" cy="0"/>
+        </a:xfrm>
+      </p:grpSpPr>
+      <p:sp>
+        <p:nvSpPr>
+          <p:cNvPr id="2" name="Title 1">
+            <a:extLst>
+              <a:ext uri="{FF2B5EF4-FFF2-40B4-BE49-F238E27FC236}">
+                <a16:creationId xmlns:a16="http://schemas.microsoft.com/office/drawing/2014/main" id="{AD8AE02D-17FC-B64A-848E-E6EE2E7E5A93}"/>
+              </a:ext>
+            </a:extLst>
+          </p:cNvPr>
+          <p:cNvSpPr>
+            <a:spLocks noGrp="1"/>
+          </p:cNvSpPr>
+          <p:nvPr>
+            <p:ph type="title"/>
+          </p:nvPr>
+        </p:nvSpPr>
+        <p:spPr/>
+        <p:txBody>
+          <a:bodyPr/>
+          <a:lstStyle/>
+          <a:p>
+            <a:r>
+              <a:rPr lang="en-US" dirty="0"/>
+              <a:t>Performance Testing</a:t>
+            </a:r>
+            <a:endParaRPr dirty="0"/>
+          </a:p>
+        </p:txBody>
+      </p:sp>
+      <p:sp>
+        <p:nvSpPr>
+          <p:cNvPr id="4" name="Slide Number Placeholder 3">
+            <a:extLst>
+              <a:ext uri="{FF2B5EF4-FFF2-40B4-BE49-F238E27FC236}">
+                <a16:creationId xmlns:a16="http://schemas.microsoft.com/office/drawing/2014/main" id="{CC070D25-E38D-7949-AA56-03C3740E6A0A}"/>
+              </a:ext>
+            </a:extLst>
+          </p:cNvPr>
+          <p:cNvSpPr>
+            <a:spLocks noGrp="1"/>
+          </p:cNvSpPr>
+          <p:nvPr>
+            <p:ph type="sldNum" sz="quarter" idx="10"/>
+          </p:nvPr>
+        </p:nvSpPr>
+        <p:spPr/>
+        <p:txBody>
+          <a:bodyPr/>
+          <a:lstStyle/>
+          <a:p>
+            <a:fld id="{2F63A97E-D605-DC42-8452-C14CD1FA87FA}" type="slidenum">
+              <a:rPr lang="en-US" smtClean="0">
+                <a:solidFill>
+                  <a:srgbClr val="5AAAFA"/>
+                </a:solidFill>
+              </a:rPr>
+              <a:pPr/>
+              <a:t>18</a:t>
             </a:fld>
             <a:endParaRPr lang="en-US">
               <a:solidFill>
@@ -25870,7 +27244,7 @@
 </p:sld>
 </file>
 
-<file path=ppt/slides/slide18.xml><?xml version="1.0" encoding="utf-8"?>
+<file path=ppt/slides/slide19.xml><?xml version="1.0" encoding="utf-8"?>
 <p:sld xmlns:a="http://schemas.openxmlformats.org/drawingml/2006/main" xmlns:r="http://schemas.openxmlformats.org/officeDocument/2006/relationships" xmlns:p="http://schemas.openxmlformats.org/presentationml/2006/main">
   <p:cSld>
     <p:spTree>
@@ -25892,7 +27266,7 @@
           <p:cNvPr id="2" name="Title 1">
             <a:extLst>
               <a:ext uri="{FF2B5EF4-FFF2-40B4-BE49-F238E27FC236}">
-                <a16:creationId xmlns:a16="http://schemas.microsoft.com/office/drawing/2014/main" id="{58169065-201E-5F42-BB75-6EA30E0A8D38}"/>
+                <a16:creationId xmlns:a16="http://schemas.microsoft.com/office/drawing/2014/main" id="{59DFA31E-6839-E645-B74F-3C2A8B134560}"/>
               </a:ext>
             </a:extLst>
           </p:cNvPr>
@@ -25903,16 +27277,25 @@
             <p:ph type="title"/>
           </p:nvPr>
         </p:nvSpPr>
-        <p:spPr/>
+        <p:spPr>
+          <a:xfrm>
+            <a:off x="293688" y="44451"/>
+            <a:ext cx="5522912" cy="660400"/>
+          </a:xfrm>
+        </p:spPr>
         <p:txBody>
           <a:bodyPr/>
           <a:lstStyle/>
           <a:p>
             <a:r>
-              <a:rPr lang="en-US" dirty="0"/>
-              <a:t>Mirror maker monitoring</a:t>
-            </a:r>
-            <a:endParaRPr dirty="0"/>
+              <a:rPr lang="en-US" sz="2400" dirty="0"/>
+              <a:t>Performance Testing: </a:t>
+            </a:r>
+            <a:r>
+              <a:rPr lang="en-US" sz="2000" dirty="0"/>
+              <a:t>Container diagram</a:t>
+            </a:r>
+            <a:endParaRPr sz="2400" dirty="0"/>
           </a:p>
         </p:txBody>
       </p:sp>
@@ -25921,7 +27304,7 @@
           <p:cNvPr id="4" name="Slide Number Placeholder 3">
             <a:extLst>
               <a:ext uri="{FF2B5EF4-FFF2-40B4-BE49-F238E27FC236}">
-                <a16:creationId xmlns:a16="http://schemas.microsoft.com/office/drawing/2014/main" id="{D461EF70-49A7-3F48-A6F1-90FB6453A640}"/>
+                <a16:creationId xmlns:a16="http://schemas.microsoft.com/office/drawing/2014/main" id="{E06F04CA-E56A-9549-B3E2-9769F935C1E2}"/>
               </a:ext>
             </a:extLst>
           </p:cNvPr>
@@ -25944,7 +27327,7 @@
                 </a:solidFill>
               </a:rPr>
               <a:pPr/>
-              <a:t>18</a:t>
+              <a:t>19</a:t>
             </a:fld>
             <a:endParaRPr lang="en-US">
               <a:solidFill>
@@ -25954,12 +27337,196 @@
           </a:p>
         </p:txBody>
       </p:sp>
-      <p:sp>
-        <p:nvSpPr>
-          <p:cNvPr id="5" name="Rectangle 4">
-            <a:extLst>
-              <a:ext uri="{FF2B5EF4-FFF2-40B4-BE49-F238E27FC236}">
-                <a16:creationId xmlns:a16="http://schemas.microsoft.com/office/drawing/2014/main" id="{D1CF926F-7952-E345-9F38-503542966212}"/>
+      <p:grpSp>
+        <p:nvGrpSpPr>
+          <p:cNvPr id="5" name="Group 4">
+            <a:extLst>
+              <a:ext uri="{FF2B5EF4-FFF2-40B4-BE49-F238E27FC236}">
+                <a16:creationId xmlns:a16="http://schemas.microsoft.com/office/drawing/2014/main" id="{F80EFECB-2C9F-E84C-AA57-FFE518C34598}"/>
+              </a:ext>
+            </a:extLst>
+          </p:cNvPr>
+          <p:cNvGrpSpPr/>
+          <p:nvPr/>
+        </p:nvGrpSpPr>
+        <p:grpSpPr>
+          <a:xfrm>
+            <a:off x="391384" y="1983184"/>
+            <a:ext cx="655152" cy="1025130"/>
+            <a:chOff x="3635564" y="430268"/>
+            <a:chExt cx="936435" cy="1123110"/>
+          </a:xfrm>
+        </p:grpSpPr>
+        <p:sp>
+          <p:nvSpPr>
+            <p:cNvPr id="6" name="Rounded Rectangle 5">
+              <a:extLst>
+                <a:ext uri="{FF2B5EF4-FFF2-40B4-BE49-F238E27FC236}">
+                  <a16:creationId xmlns:a16="http://schemas.microsoft.com/office/drawing/2014/main" id="{93521FEB-D0D8-DA4A-A5F8-D3C349C464C7}"/>
+                </a:ext>
+              </a:extLst>
+            </p:cNvPr>
+            <p:cNvSpPr/>
+            <p:nvPr/>
+          </p:nvSpPr>
+          <p:spPr>
+            <a:xfrm>
+              <a:off x="3635564" y="875058"/>
+              <a:ext cx="936435" cy="678320"/>
+            </a:xfrm>
+            <a:prstGeom prst="roundRect">
+              <a:avLst/>
+            </a:prstGeom>
+            <a:ln>
+              <a:noFill/>
+            </a:ln>
+          </p:spPr>
+          <p:style>
+            <a:lnRef idx="2">
+              <a:schemeClr val="accent1">
+                <a:shade val="50000"/>
+              </a:schemeClr>
+            </a:lnRef>
+            <a:fillRef idx="1">
+              <a:schemeClr val="accent1"/>
+            </a:fillRef>
+            <a:effectRef idx="0">
+              <a:schemeClr val="accent1"/>
+            </a:effectRef>
+            <a:fontRef idx="minor">
+              <a:schemeClr val="lt1"/>
+            </a:fontRef>
+          </p:style>
+          <p:txBody>
+            <a:bodyPr rtlCol="0" anchor="ctr"/>
+            <a:lstStyle/>
+            <a:p>
+              <a:pPr marL="0" marR="0" indent="0" algn="ctr" defTabSz="685800" rtl="0" eaLnBrk="1" fontAlgn="auto" latinLnBrk="0" hangingPunct="1">
+                <a:lnSpc>
+                  <a:spcPct val="100000"/>
+                </a:lnSpc>
+                <a:spcBef>
+                  <a:spcPts val="0"/>
+                </a:spcBef>
+                <a:spcAft>
+                  <a:spcPts val="0"/>
+                </a:spcAft>
+                <a:buClrTx/>
+                <a:buSzTx/>
+                <a:buFontTx/>
+                <a:buNone/>
+                <a:tabLst/>
+              </a:pPr>
+              <a:r>
+                <a:rPr lang="en-US" sz="1000" dirty="0">
+                  <a:solidFill>
+                    <a:prstClr val="white"/>
+                  </a:solidFill>
+                  <a:latin typeface="Arial"/>
+                </a:rPr>
+                <a:t>Tester</a:t>
+              </a:r>
+              <a:endParaRPr kumimoji="0" sz="1000" b="0" i="0" u="none" strike="noStrike" kern="1200" cap="none" spc="0" normalizeH="0" baseline="0" noProof="0" dirty="0">
+                <a:ln>
+                  <a:noFill/>
+                </a:ln>
+                <a:solidFill>
+                  <a:prstClr val="white"/>
+                </a:solidFill>
+                <a:effectLst/>
+                <a:uLnTx/>
+                <a:uFillTx/>
+                <a:latin typeface="Arial"/>
+                <a:ea typeface="+mn-ea"/>
+                <a:cs typeface="+mn-cs"/>
+              </a:endParaRPr>
+            </a:p>
+          </p:txBody>
+        </p:sp>
+        <p:sp>
+          <p:nvSpPr>
+            <p:cNvPr id="7" name="Oval 6">
+              <a:extLst>
+                <a:ext uri="{FF2B5EF4-FFF2-40B4-BE49-F238E27FC236}">
+                  <a16:creationId xmlns:a16="http://schemas.microsoft.com/office/drawing/2014/main" id="{AB6328E2-4265-5E44-AADB-5781C1BE6FDA}"/>
+                </a:ext>
+              </a:extLst>
+            </p:cNvPr>
+            <p:cNvSpPr/>
+            <p:nvPr/>
+          </p:nvSpPr>
+          <p:spPr>
+            <a:xfrm>
+              <a:off x="3827363" y="430268"/>
+              <a:ext cx="552836" cy="489898"/>
+            </a:xfrm>
+            <a:prstGeom prst="ellipse">
+              <a:avLst/>
+            </a:prstGeom>
+            <a:ln>
+              <a:noFill/>
+            </a:ln>
+          </p:spPr>
+          <p:style>
+            <a:lnRef idx="2">
+              <a:schemeClr val="accent1">
+                <a:shade val="50000"/>
+              </a:schemeClr>
+            </a:lnRef>
+            <a:fillRef idx="1">
+              <a:schemeClr val="accent1"/>
+            </a:fillRef>
+            <a:effectRef idx="0">
+              <a:schemeClr val="accent1"/>
+            </a:effectRef>
+            <a:fontRef idx="minor">
+              <a:schemeClr val="lt1"/>
+            </a:fontRef>
+          </p:style>
+          <p:txBody>
+            <a:bodyPr rtlCol="0" anchor="t"/>
+            <a:lstStyle/>
+            <a:p>
+              <a:pPr marL="0" marR="0" indent="0" algn="l" defTabSz="685800" rtl="0" eaLnBrk="1" fontAlgn="auto" latinLnBrk="0" hangingPunct="1">
+                <a:lnSpc>
+                  <a:spcPct val="100000"/>
+                </a:lnSpc>
+                <a:spcBef>
+                  <a:spcPts val="0"/>
+                </a:spcBef>
+                <a:spcAft>
+                  <a:spcPts val="0"/>
+                </a:spcAft>
+                <a:buClrTx/>
+                <a:buSzTx/>
+                <a:buFontTx/>
+                <a:buNone/>
+                <a:tabLst/>
+              </a:pPr>
+              <a:endParaRPr kumimoji="0" sz="1000" b="0" i="0" u="none" strike="noStrike" kern="1200" cap="none" spc="0" normalizeH="0" baseline="0" noProof="0" dirty="0">
+                <a:ln>
+                  <a:noFill/>
+                </a:ln>
+                <a:solidFill>
+                  <a:prstClr val="white"/>
+                </a:solidFill>
+                <a:effectLst/>
+                <a:uLnTx/>
+                <a:uFillTx/>
+                <a:latin typeface="Arial"/>
+                <a:ea typeface="+mn-ea"/>
+                <a:cs typeface="+mn-cs"/>
+              </a:endParaRPr>
+            </a:p>
+          </p:txBody>
+        </p:sp>
+      </p:grpSp>
+      <p:sp>
+        <p:nvSpPr>
+          <p:cNvPr id="8" name="Rectangle 7">
+            <a:extLst>
+              <a:ext uri="{FF2B5EF4-FFF2-40B4-BE49-F238E27FC236}">
+                <a16:creationId xmlns:a16="http://schemas.microsoft.com/office/drawing/2014/main" id="{4131C140-520F-1A48-B89D-099B753D7E9C}"/>
               </a:ext>
             </a:extLst>
           </p:cNvPr>
@@ -25968,650 +27535,25 @@
         </p:nvSpPr>
         <p:spPr>
           <a:xfrm>
-            <a:off x="298411" y="1073442"/>
-            <a:ext cx="4008458" cy="3498557"/>
+            <a:off x="3781865" y="1698144"/>
+            <a:ext cx="1663547" cy="570079"/>
           </a:xfrm>
           <a:prstGeom prst="rect">
             <a:avLst/>
           </a:prstGeom>
-          <a:noFill/>
-          <a:ln>
-            <a:solidFill>
-              <a:srgbClr val="0000FF"/>
-            </a:solidFill>
-            <a:prstDash val="dash"/>
-          </a:ln>
+          <a:solidFill>
+            <a:srgbClr val="3567A6"/>
+          </a:solidFill>
+          <a:ln/>
         </p:spPr>
         <p:style>
-          <a:lnRef idx="2">
-            <a:schemeClr val="accent1">
-              <a:shade val="50000"/>
-            </a:schemeClr>
+          <a:lnRef idx="0">
+            <a:schemeClr val="accent1"/>
           </a:lnRef>
-          <a:fillRef idx="1">
+          <a:fillRef idx="3">
             <a:schemeClr val="accent1"/>
           </a:fillRef>
-          <a:effectRef idx="0">
-            <a:schemeClr val="accent1"/>
-          </a:effectRef>
-          <a:fontRef idx="minor">
-            <a:schemeClr val="lt1"/>
-          </a:fontRef>
-        </p:style>
-        <p:txBody>
-          <a:bodyPr rtlCol="0" anchor="t"/>
-          <a:lstStyle/>
-          <a:p>
-            <a:pPr algn="ctr" defTabSz="514350"/>
-            <a:r>
-              <a:rPr lang="en-US" sz="750" b="1" dirty="0">
-                <a:solidFill>
-                  <a:srgbClr val="0000FF"/>
-                </a:solidFill>
-                <a:latin typeface="Arial"/>
-              </a:rPr>
-              <a:t>On-Premise OpenShift Environment</a:t>
-            </a:r>
-          </a:p>
-        </p:txBody>
-      </p:sp>
-      <p:sp>
-        <p:nvSpPr>
-          <p:cNvPr id="6" name="Rectangle 5">
-            <a:extLst>
-              <a:ext uri="{FF2B5EF4-FFF2-40B4-BE49-F238E27FC236}">
-                <a16:creationId xmlns:a16="http://schemas.microsoft.com/office/drawing/2014/main" id="{0CA26A3C-A42A-F549-B895-ED3A96176D25}"/>
-              </a:ext>
-            </a:extLst>
-          </p:cNvPr>
-          <p:cNvSpPr/>
-          <p:nvPr/>
-        </p:nvSpPr>
-        <p:spPr>
-          <a:xfrm>
-            <a:off x="4710303" y="1073443"/>
-            <a:ext cx="3747898" cy="1304727"/>
-          </a:xfrm>
-          <a:prstGeom prst="rect">
-            <a:avLst/>
-          </a:prstGeom>
-          <a:noFill/>
-          <a:ln>
-            <a:solidFill>
-              <a:srgbClr val="00B050"/>
-            </a:solidFill>
-            <a:prstDash val="dash"/>
-          </a:ln>
-        </p:spPr>
-        <p:style>
-          <a:lnRef idx="2">
-            <a:schemeClr val="accent1">
-              <a:shade val="50000"/>
-            </a:schemeClr>
-          </a:lnRef>
-          <a:fillRef idx="1">
-            <a:schemeClr val="accent1"/>
-          </a:fillRef>
-          <a:effectRef idx="0">
-            <a:schemeClr val="accent1"/>
-          </a:effectRef>
-          <a:fontRef idx="minor">
-            <a:schemeClr val="lt1"/>
-          </a:fontRef>
-        </p:style>
-        <p:txBody>
-          <a:bodyPr rtlCol="0" anchor="t"/>
-          <a:lstStyle/>
-          <a:p>
-            <a:pPr algn="ctr" defTabSz="514350"/>
-            <a:r>
-              <a:rPr lang="en-US" sz="750" b="1">
-                <a:solidFill>
-                  <a:srgbClr val="00B050"/>
-                </a:solidFill>
-                <a:latin typeface="Arial"/>
-              </a:rPr>
-              <a:t>IBM Cloud</a:t>
-            </a:r>
-          </a:p>
-        </p:txBody>
-      </p:sp>
-      <p:sp>
-        <p:nvSpPr>
-          <p:cNvPr id="7" name="AutoShape 4">
-            <a:extLst>
-              <a:ext uri="{FF2B5EF4-FFF2-40B4-BE49-F238E27FC236}">
-                <a16:creationId xmlns:a16="http://schemas.microsoft.com/office/drawing/2014/main" id="{2CAC27AF-BDB4-874D-9765-42C852359FEA}"/>
-              </a:ext>
-            </a:extLst>
-          </p:cNvPr>
-          <p:cNvSpPr>
-            <a:spLocks noChangeArrowheads="1"/>
-          </p:cNvSpPr>
-          <p:nvPr/>
-        </p:nvSpPr>
-        <p:spPr bwMode="auto">
-          <a:xfrm>
-            <a:off x="4935506" y="1352325"/>
-            <a:ext cx="3333325" cy="480994"/>
-          </a:xfrm>
-          <a:prstGeom prst="roundRect">
-            <a:avLst>
-              <a:gd name="adj" fmla="val 7117"/>
-            </a:avLst>
-          </a:prstGeom>
-          <a:solidFill>
-            <a:schemeClr val="bg1">
-              <a:lumMod val="85000"/>
-            </a:schemeClr>
-          </a:solidFill>
-          <a:ln w="12700">
-            <a:noFill/>
-            <a:prstDash val="dash"/>
-            <a:round/>
-            <a:headEnd/>
-            <a:tailEnd/>
-          </a:ln>
-          <a:effectLst>
-            <a:outerShdw blurRad="50800" dist="38100" dir="5400000" algn="t" rotWithShape="0">
-              <a:prstClr val="black">
-                <a:alpha val="40000"/>
-              </a:prstClr>
-            </a:outerShdw>
-          </a:effectLst>
-        </p:spPr>
-        <p:txBody>
-          <a:bodyPr lIns="0" tIns="0" rIns="0" bIns="0" anchor="b" anchorCtr="1"/>
-          <a:lstStyle/>
-          <a:p>
-            <a:pPr algn="ctr"/>
-            <a:r>
-              <a:rPr lang="en-US" sz="750" dirty="0"/>
-              <a:t>Event Streams Cluster</a:t>
-            </a:r>
-          </a:p>
-        </p:txBody>
-      </p:sp>
-      <p:pic>
-        <p:nvPicPr>
-          <p:cNvPr id="8" name="Picture 7">
-            <a:extLst>
-              <a:ext uri="{FF2B5EF4-FFF2-40B4-BE49-F238E27FC236}">
-                <a16:creationId xmlns:a16="http://schemas.microsoft.com/office/drawing/2014/main" id="{EF287F09-1597-E54C-96CA-65D387410EA2}"/>
-              </a:ext>
-            </a:extLst>
-          </p:cNvPr>
-          <p:cNvPicPr>
-            <a:picLocks noChangeAspect="1"/>
-          </p:cNvPicPr>
-          <p:nvPr/>
-        </p:nvPicPr>
-        <p:blipFill>
-          <a:blip r:embed="rId2">
-            <a:extLst>
-              <a:ext uri="{28A0092B-C50C-407E-A947-70E740481C1C}">
-                <a14:useLocalDpi xmlns:a14="http://schemas.microsoft.com/office/drawing/2010/main" val="0"/>
-              </a:ext>
-            </a:extLst>
-          </a:blip>
-          <a:stretch>
-            <a:fillRect/>
-          </a:stretch>
-        </p:blipFill>
-        <p:spPr>
-          <a:xfrm>
-            <a:off x="4954099" y="1343245"/>
-            <a:ext cx="173643" cy="229320"/>
-          </a:xfrm>
-          <a:prstGeom prst="rect">
-            <a:avLst/>
-          </a:prstGeom>
-        </p:spPr>
-      </p:pic>
-      <p:sp>
-        <p:nvSpPr>
-          <p:cNvPr id="9" name="AutoShape 4">
-            <a:extLst>
-              <a:ext uri="{FF2B5EF4-FFF2-40B4-BE49-F238E27FC236}">
-                <a16:creationId xmlns:a16="http://schemas.microsoft.com/office/drawing/2014/main" id="{06ED4964-77CB-C244-9CD6-DD7D7ECC8BB7}"/>
-              </a:ext>
-            </a:extLst>
-          </p:cNvPr>
-          <p:cNvSpPr>
-            <a:spLocks noChangeArrowheads="1"/>
-          </p:cNvSpPr>
-          <p:nvPr/>
-        </p:nvSpPr>
-        <p:spPr bwMode="auto">
-          <a:xfrm>
-            <a:off x="473044" y="1364814"/>
-            <a:ext cx="3333325" cy="529093"/>
-          </a:xfrm>
-          <a:prstGeom prst="roundRect">
-            <a:avLst>
-              <a:gd name="adj" fmla="val 7117"/>
-            </a:avLst>
-          </a:prstGeom>
-          <a:solidFill>
-            <a:schemeClr val="bg1">
-              <a:lumMod val="85000"/>
-            </a:schemeClr>
-          </a:solidFill>
-          <a:ln w="12700">
-            <a:noFill/>
-            <a:prstDash val="dash"/>
-            <a:round/>
-            <a:headEnd/>
-            <a:tailEnd/>
-          </a:ln>
-          <a:effectLst>
-            <a:outerShdw blurRad="50800" dist="38100" dir="5400000" algn="t" rotWithShape="0">
-              <a:prstClr val="black">
-                <a:alpha val="40000"/>
-              </a:prstClr>
-            </a:outerShdw>
-          </a:effectLst>
-        </p:spPr>
-        <p:txBody>
-          <a:bodyPr lIns="0" tIns="0" rIns="0" bIns="0" anchor="b" anchorCtr="1"/>
-          <a:lstStyle/>
-          <a:p>
-            <a:pPr algn="ctr"/>
-            <a:r>
-              <a:rPr lang="en-US" sz="750" dirty="0"/>
-              <a:t>Kafka Cluster</a:t>
-            </a:r>
-          </a:p>
-        </p:txBody>
-      </p:sp>
-      <p:sp>
-        <p:nvSpPr>
-          <p:cNvPr id="10" name="AutoShape 4">
-            <a:extLst>
-              <a:ext uri="{FF2B5EF4-FFF2-40B4-BE49-F238E27FC236}">
-                <a16:creationId xmlns:a16="http://schemas.microsoft.com/office/drawing/2014/main" id="{68BBEC4F-56F3-BA49-9027-6552D383514C}"/>
-              </a:ext>
-            </a:extLst>
-          </p:cNvPr>
-          <p:cNvSpPr>
-            <a:spLocks noChangeArrowheads="1"/>
-          </p:cNvSpPr>
-          <p:nvPr/>
-        </p:nvSpPr>
-        <p:spPr bwMode="auto">
-          <a:xfrm>
-            <a:off x="1874843" y="1985717"/>
-            <a:ext cx="1931526" cy="756859"/>
-          </a:xfrm>
-          <a:prstGeom prst="roundRect">
-            <a:avLst>
-              <a:gd name="adj" fmla="val 7117"/>
-            </a:avLst>
-          </a:prstGeom>
-          <a:noFill/>
-          <a:ln w="12700">
-            <a:solidFill>
-              <a:schemeClr val="accent3"/>
-            </a:solidFill>
-            <a:prstDash val="dash"/>
-            <a:round/>
-            <a:headEnd/>
-            <a:tailEnd/>
-          </a:ln>
-        </p:spPr>
-        <p:txBody>
-          <a:bodyPr lIns="0" tIns="0" rIns="0" bIns="0" anchor="b" anchorCtr="1"/>
-          <a:lstStyle/>
-          <a:p>
-            <a:pPr algn="ctr"/>
-            <a:r>
-              <a:rPr lang="en-US" sz="750" dirty="0"/>
-              <a:t>Kafka Connect Cluster</a:t>
-            </a:r>
-          </a:p>
-        </p:txBody>
-      </p:sp>
-      <p:pic>
-        <p:nvPicPr>
-          <p:cNvPr id="11" name="Picture 10">
-            <a:extLst>
-              <a:ext uri="{FF2B5EF4-FFF2-40B4-BE49-F238E27FC236}">
-                <a16:creationId xmlns:a16="http://schemas.microsoft.com/office/drawing/2014/main" id="{E64E2EC7-6630-C742-BB9C-0EA220F0C451}"/>
-              </a:ext>
-            </a:extLst>
-          </p:cNvPr>
-          <p:cNvPicPr>
-            <a:picLocks noChangeAspect="1"/>
-          </p:cNvPicPr>
-          <p:nvPr/>
-        </p:nvPicPr>
-        <p:blipFill>
-          <a:blip r:embed="rId3"/>
-          <a:stretch>
-            <a:fillRect/>
-          </a:stretch>
-        </p:blipFill>
-        <p:spPr>
-          <a:xfrm>
-            <a:off x="473044" y="2006695"/>
-            <a:ext cx="376238" cy="371475"/>
-          </a:xfrm>
-          <a:prstGeom prst="rect">
-            <a:avLst/>
-          </a:prstGeom>
-        </p:spPr>
-      </p:pic>
-      <p:sp>
-        <p:nvSpPr>
-          <p:cNvPr id="12" name="Rounded Rectangle 11">
-            <a:extLst>
-              <a:ext uri="{FF2B5EF4-FFF2-40B4-BE49-F238E27FC236}">
-                <a16:creationId xmlns:a16="http://schemas.microsoft.com/office/drawing/2014/main" id="{81FDB62D-A052-4F40-BF37-660B409B0781}"/>
-              </a:ext>
-            </a:extLst>
-          </p:cNvPr>
-          <p:cNvSpPr/>
-          <p:nvPr/>
-        </p:nvSpPr>
-        <p:spPr>
-          <a:xfrm>
-            <a:off x="1974858" y="2038791"/>
-            <a:ext cx="1682742" cy="532959"/>
-          </a:xfrm>
-          <a:prstGeom prst="roundRect">
-            <a:avLst/>
-          </a:prstGeom>
-          <a:solidFill>
-            <a:srgbClr val="7030A0">
-              <a:alpha val="35000"/>
-            </a:srgbClr>
-          </a:solidFill>
-          <a:ln>
-            <a:noFill/>
-          </a:ln>
-          <a:effectLst>
-            <a:outerShdw blurRad="50800" dist="38100" dir="5400000" algn="t" rotWithShape="0">
-              <a:prstClr val="black">
-                <a:alpha val="40000"/>
-              </a:prstClr>
-            </a:outerShdw>
-          </a:effectLst>
-        </p:spPr>
-        <p:style>
-          <a:lnRef idx="2">
-            <a:schemeClr val="accent1">
-              <a:shade val="50000"/>
-            </a:schemeClr>
-          </a:lnRef>
-          <a:fillRef idx="1">
-            <a:schemeClr val="accent1"/>
-          </a:fillRef>
-          <a:effectRef idx="0">
-            <a:schemeClr val="accent1"/>
-          </a:effectRef>
-          <a:fontRef idx="minor">
-            <a:schemeClr val="lt1"/>
-          </a:fontRef>
-        </p:style>
-        <p:txBody>
-          <a:bodyPr rtlCol="0" anchor="t"/>
-          <a:lstStyle/>
-          <a:p>
-            <a:pPr algn="ctr" defTabSz="514350"/>
-            <a:r>
-              <a:rPr lang="en-US" sz="750">
-                <a:solidFill>
-                  <a:prstClr val="white"/>
-                </a:solidFill>
-                <a:latin typeface="Arial"/>
-              </a:rPr>
-              <a:t>Mirror Maker 2.0</a:t>
-            </a:r>
-          </a:p>
-        </p:txBody>
-      </p:sp>
-      <p:sp>
-        <p:nvSpPr>
-          <p:cNvPr id="16" name="AutoShape 4">
-            <a:extLst>
-              <a:ext uri="{FF2B5EF4-FFF2-40B4-BE49-F238E27FC236}">
-                <a16:creationId xmlns:a16="http://schemas.microsoft.com/office/drawing/2014/main" id="{46132ABB-C97C-584F-9405-C43BC31330E7}"/>
-              </a:ext>
-            </a:extLst>
-          </p:cNvPr>
-          <p:cNvSpPr>
-            <a:spLocks noChangeArrowheads="1"/>
-          </p:cNvSpPr>
-          <p:nvPr/>
-        </p:nvSpPr>
-        <p:spPr bwMode="auto">
-          <a:xfrm>
-            <a:off x="473044" y="1965516"/>
-            <a:ext cx="1327181" cy="606234"/>
-          </a:xfrm>
-          <a:prstGeom prst="roundRect">
-            <a:avLst>
-              <a:gd name="adj" fmla="val 7117"/>
-            </a:avLst>
-          </a:prstGeom>
-          <a:noFill/>
-          <a:ln w="12700">
-            <a:solidFill>
-              <a:schemeClr val="accent3"/>
-            </a:solidFill>
-            <a:prstDash val="dash"/>
-            <a:round/>
-            <a:headEnd/>
-            <a:tailEnd/>
-          </a:ln>
-        </p:spPr>
-        <p:txBody>
-          <a:bodyPr lIns="0" tIns="0" rIns="0" bIns="0" anchor="b" anchorCtr="1"/>
-          <a:lstStyle/>
-          <a:p>
-            <a:pPr algn="ctr"/>
-            <a:r>
-              <a:rPr lang="en-US" sz="750" dirty="0"/>
-              <a:t>Strimzi Operators</a:t>
-            </a:r>
-          </a:p>
-        </p:txBody>
-      </p:sp>
-      <p:pic>
-        <p:nvPicPr>
-          <p:cNvPr id="17" name="Picture 16">
-            <a:extLst>
-              <a:ext uri="{FF2B5EF4-FFF2-40B4-BE49-F238E27FC236}">
-                <a16:creationId xmlns:a16="http://schemas.microsoft.com/office/drawing/2014/main" id="{5AF3EA7F-ADF8-8D4D-AF71-A53109AD3A0B}"/>
-              </a:ext>
-            </a:extLst>
-          </p:cNvPr>
-          <p:cNvPicPr>
-            <a:picLocks noChangeAspect="1"/>
-          </p:cNvPicPr>
-          <p:nvPr/>
-        </p:nvPicPr>
-        <p:blipFill>
-          <a:blip r:embed="rId4"/>
-          <a:stretch>
-            <a:fillRect/>
-          </a:stretch>
-        </p:blipFill>
-        <p:spPr>
-          <a:xfrm>
-            <a:off x="606629" y="4016281"/>
-            <a:ext cx="441419" cy="441419"/>
-          </a:xfrm>
-          <a:prstGeom prst="rect">
-            <a:avLst/>
-          </a:prstGeom>
-        </p:spPr>
-      </p:pic>
-      <p:sp>
-        <p:nvSpPr>
-          <p:cNvPr id="18" name="AutoShape 4">
-            <a:extLst>
-              <a:ext uri="{FF2B5EF4-FFF2-40B4-BE49-F238E27FC236}">
-                <a16:creationId xmlns:a16="http://schemas.microsoft.com/office/drawing/2014/main" id="{1A70F136-F70D-A140-B177-FC17A525B768}"/>
-              </a:ext>
-            </a:extLst>
-          </p:cNvPr>
-          <p:cNvSpPr>
-            <a:spLocks noChangeArrowheads="1"/>
-          </p:cNvSpPr>
-          <p:nvPr/>
-        </p:nvSpPr>
-        <p:spPr bwMode="auto">
-          <a:xfrm>
-            <a:off x="606629" y="3952057"/>
-            <a:ext cx="1373707" cy="586032"/>
-          </a:xfrm>
-          <a:prstGeom prst="roundRect">
-            <a:avLst>
-              <a:gd name="adj" fmla="val 7117"/>
-            </a:avLst>
-          </a:prstGeom>
-          <a:noFill/>
-          <a:ln w="15875">
-            <a:solidFill>
-              <a:srgbClr val="FF7D54"/>
-            </a:solidFill>
-            <a:prstDash val="dash"/>
-            <a:round/>
-            <a:headEnd/>
-            <a:tailEnd/>
-          </a:ln>
-        </p:spPr>
-        <p:txBody>
-          <a:bodyPr lIns="0" tIns="0" rIns="0" bIns="0" anchor="b" anchorCtr="1"/>
-          <a:lstStyle/>
-          <a:p>
-            <a:pPr algn="ctr"/>
-            <a:r>
-              <a:rPr lang="en-US" sz="750" dirty="0"/>
-              <a:t>Grafana pod</a:t>
-            </a:r>
-          </a:p>
-        </p:txBody>
-      </p:sp>
-      <p:pic>
-        <p:nvPicPr>
-          <p:cNvPr id="19" name="Picture 18">
-            <a:extLst>
-              <a:ext uri="{FF2B5EF4-FFF2-40B4-BE49-F238E27FC236}">
-                <a16:creationId xmlns:a16="http://schemas.microsoft.com/office/drawing/2014/main" id="{FDC25DF4-6FBC-FC4A-97DF-9EB78AC1658C}"/>
-              </a:ext>
-            </a:extLst>
-          </p:cNvPr>
-          <p:cNvPicPr>
-            <a:picLocks noChangeAspect="1"/>
-          </p:cNvPicPr>
-          <p:nvPr/>
-        </p:nvPicPr>
-        <p:blipFill>
-          <a:blip r:embed="rId5"/>
-          <a:stretch>
-            <a:fillRect/>
-          </a:stretch>
-        </p:blipFill>
-        <p:spPr>
-          <a:xfrm>
-            <a:off x="395857" y="3132825"/>
-            <a:ext cx="586032" cy="586032"/>
-          </a:xfrm>
-          <a:prstGeom prst="rect">
-            <a:avLst/>
-          </a:prstGeom>
-        </p:spPr>
-      </p:pic>
-      <p:sp>
-        <p:nvSpPr>
-          <p:cNvPr id="20" name="AutoShape 4">
-            <a:extLst>
-              <a:ext uri="{FF2B5EF4-FFF2-40B4-BE49-F238E27FC236}">
-                <a16:creationId xmlns:a16="http://schemas.microsoft.com/office/drawing/2014/main" id="{3A86148D-8831-CD4A-9297-FE01CF360EF1}"/>
-              </a:ext>
-            </a:extLst>
-          </p:cNvPr>
-          <p:cNvSpPr>
-            <a:spLocks noChangeArrowheads="1"/>
-          </p:cNvSpPr>
-          <p:nvPr/>
-        </p:nvSpPr>
-        <p:spPr bwMode="auto">
-          <a:xfrm>
-            <a:off x="454227" y="2834387"/>
-            <a:ext cx="3352142" cy="1085324"/>
-          </a:xfrm>
-          <a:prstGeom prst="roundRect">
-            <a:avLst>
-              <a:gd name="adj" fmla="val 7117"/>
-            </a:avLst>
-          </a:prstGeom>
-          <a:noFill/>
-          <a:ln w="15875">
-            <a:solidFill>
-              <a:srgbClr val="FF7D54"/>
-            </a:solidFill>
-            <a:prstDash val="dash"/>
-            <a:round/>
-            <a:headEnd/>
-            <a:tailEnd/>
-          </a:ln>
-        </p:spPr>
-        <p:txBody>
-          <a:bodyPr lIns="0" tIns="0" rIns="0" bIns="0" anchor="b" anchorCtr="1"/>
-          <a:lstStyle/>
-          <a:p>
-            <a:pPr algn="ctr"/>
-            <a:r>
-              <a:rPr lang="en-US" sz="750" dirty="0">
-                <a:solidFill>
-                  <a:srgbClr val="0000FF"/>
-                </a:solidFill>
-              </a:rPr>
-              <a:t>Prometheus server</a:t>
-            </a:r>
-          </a:p>
-        </p:txBody>
-      </p:sp>
-      <p:sp>
-        <p:nvSpPr>
-          <p:cNvPr id="21" name="Rectangle 20">
-            <a:extLst>
-              <a:ext uri="{FF2B5EF4-FFF2-40B4-BE49-F238E27FC236}">
-                <a16:creationId xmlns:a16="http://schemas.microsoft.com/office/drawing/2014/main" id="{076D9C7B-6860-ED42-A6BF-7B972A6CEEAF}"/>
-              </a:ext>
-            </a:extLst>
-          </p:cNvPr>
-          <p:cNvSpPr/>
-          <p:nvPr/>
-        </p:nvSpPr>
-        <p:spPr>
-          <a:xfrm>
-            <a:off x="2226244" y="2278153"/>
-            <a:ext cx="1178989" cy="203645"/>
-          </a:xfrm>
-          <a:prstGeom prst="rect">
-            <a:avLst/>
-          </a:prstGeom>
-          <a:solidFill>
-            <a:schemeClr val="bg1"/>
-          </a:solidFill>
-          <a:ln>
-            <a:noFill/>
-          </a:ln>
-        </p:spPr>
-        <p:style>
-          <a:lnRef idx="2">
-            <a:schemeClr val="accent1">
-              <a:shade val="50000"/>
-            </a:schemeClr>
-          </a:lnRef>
-          <a:fillRef idx="1">
-            <a:schemeClr val="accent1"/>
-          </a:fillRef>
-          <a:effectRef idx="0">
+          <a:effectRef idx="3">
             <a:schemeClr val="accent1"/>
           </a:effectRef>
           <a:fontRef idx="minor">
@@ -26644,7 +27586,7 @@
                   <a:noFill/>
                 </a:ln>
                 <a:solidFill>
-                  <a:srgbClr val="0000FF"/>
+                  <a:prstClr val="white"/>
                 </a:solidFill>
                 <a:effectLst/>
                 <a:uLnTx/>
@@ -26653,14 +27595,14 @@
                 <a:ea typeface="+mn-ea"/>
                 <a:cs typeface="+mn-cs"/>
               </a:rPr>
-              <a:t>JMX Exporter</a:t>
-            </a:r>
-            <a:endParaRPr kumimoji="0" sz="1000" b="0" i="0" u="none" strike="noStrike" kern="1200" cap="none" spc="0" normalizeH="0" baseline="0" noProof="0" dirty="0">
+              <a:t>Producer App</a:t>
+            </a:r>
+            <a:endParaRPr kumimoji="0" sz="800" b="0" i="0" u="none" strike="noStrike" kern="1200" cap="none" spc="0" normalizeH="0" baseline="0" noProof="0" dirty="0">
               <a:ln>
                 <a:noFill/>
               </a:ln>
               <a:solidFill>
-                <a:srgbClr val="0000FF"/>
+                <a:prstClr val="white"/>
               </a:solidFill>
               <a:effectLst/>
               <a:uLnTx/>
@@ -26674,10 +27616,10 @@
       </p:sp>
       <p:sp>
         <p:nvSpPr>
-          <p:cNvPr id="22" name="Rectangle 21">
-            <a:extLst>
-              <a:ext uri="{FF2B5EF4-FFF2-40B4-BE49-F238E27FC236}">
-                <a16:creationId xmlns:a16="http://schemas.microsoft.com/office/drawing/2014/main" id="{A6091AB6-07D1-734B-907C-5A867E67B5EA}"/>
+          <p:cNvPr id="9" name="Rectangle 8">
+            <a:extLst>
+              <a:ext uri="{FF2B5EF4-FFF2-40B4-BE49-F238E27FC236}">
+                <a16:creationId xmlns:a16="http://schemas.microsoft.com/office/drawing/2014/main" id="{D0E2B8D2-575D-7A4F-9978-19F1A3B25D46}"/>
               </a:ext>
             </a:extLst>
           </p:cNvPr>
@@ -26686,38 +27628,27 @@
         </p:nvSpPr>
         <p:spPr>
           <a:xfrm>
-            <a:off x="2151498" y="3373740"/>
-            <a:ext cx="1397824" cy="340039"/>
+            <a:off x="7274078" y="943318"/>
+            <a:ext cx="1663547" cy="914400"/>
           </a:xfrm>
           <a:prstGeom prst="rect">
             <a:avLst/>
           </a:prstGeom>
           <a:solidFill>
-            <a:srgbClr val="FFC000">
-              <a:alpha val="50000"/>
-            </a:srgbClr>
+            <a:schemeClr val="bg1">
+              <a:lumMod val="50000"/>
+            </a:schemeClr>
           </a:solidFill>
-          <a:ln>
-            <a:noFill/>
-          </a:ln>
-          <a:effectLst>
-            <a:outerShdw blurRad="50800" dist="38100" dir="5400000" algn="t" rotWithShape="0">
-              <a:prstClr val="black">
-                <a:alpha val="40000"/>
-              </a:prstClr>
-            </a:outerShdw>
-          </a:effectLst>
+          <a:ln/>
         </p:spPr>
         <p:style>
-          <a:lnRef idx="2">
-            <a:schemeClr val="accent1">
-              <a:shade val="50000"/>
-            </a:schemeClr>
+          <a:lnRef idx="0">
+            <a:schemeClr val="accent1"/>
           </a:lnRef>
-          <a:fillRef idx="1">
+          <a:fillRef idx="3">
             <a:schemeClr val="accent1"/>
           </a:fillRef>
-          <a:effectRef idx="0">
+          <a:effectRef idx="3">
             <a:schemeClr val="accent1"/>
           </a:effectRef>
           <a:fontRef idx="minor">
@@ -26745,74 +27676,23 @@
               <a:tabLst/>
             </a:pPr>
             <a:r>
-              <a:rPr lang="en-US" sz="1000" dirty="0">
-                <a:solidFill>
-                  <a:srgbClr val="0000FF"/>
-                </a:solidFill>
+              <a:rPr kumimoji="0" lang="en-US" sz="1000" b="0" i="0" u="none" strike="noStrike" kern="1200" cap="none" spc="0" normalizeH="0" baseline="0" noProof="0" dirty="0">
+                <a:ln>
+                  <a:noFill/>
+                </a:ln>
+                <a:solidFill>
+                  <a:prstClr val="white"/>
+                </a:solidFill>
+                <a:effectLst/>
+                <a:uLnTx/>
+                <a:uFillTx/>
                 <a:latin typeface="Arial"/>
+                <a:ea typeface="+mn-ea"/>
+                <a:cs typeface="+mn-cs"/>
               </a:rPr>
-              <a:t>Prometheus-server</a:t>
-            </a:r>
-            <a:endParaRPr kumimoji="0" sz="1000" b="0" i="0" u="none" strike="noStrike" kern="1200" cap="none" spc="0" normalizeH="0" baseline="0" noProof="0" dirty="0">
-              <a:ln>
-                <a:noFill/>
-              </a:ln>
-              <a:solidFill>
-                <a:srgbClr val="0000FF"/>
-              </a:solidFill>
-              <a:effectLst/>
-              <a:uLnTx/>
-              <a:uFillTx/>
-              <a:latin typeface="Arial"/>
-              <a:ea typeface="+mn-ea"/>
-              <a:cs typeface="+mn-cs"/>
-            </a:endParaRPr>
-          </a:p>
-        </p:txBody>
-      </p:sp>
-      <p:sp>
-        <p:nvSpPr>
-          <p:cNvPr id="23" name="Rectangle 22">
-            <a:extLst>
-              <a:ext uri="{FF2B5EF4-FFF2-40B4-BE49-F238E27FC236}">
-                <a16:creationId xmlns:a16="http://schemas.microsoft.com/office/drawing/2014/main" id="{6CC001E1-112D-534E-AD5E-9A88AE633D40}"/>
-              </a:ext>
-            </a:extLst>
-          </p:cNvPr>
-          <p:cNvSpPr/>
-          <p:nvPr/>
-        </p:nvSpPr>
-        <p:spPr>
-          <a:xfrm>
-            <a:off x="849283" y="3228398"/>
-            <a:ext cx="950942" cy="290684"/>
-          </a:xfrm>
-          <a:prstGeom prst="rect">
-            <a:avLst/>
-          </a:prstGeom>
-          <a:ln>
-            <a:noFill/>
-          </a:ln>
-        </p:spPr>
-        <p:style>
-          <a:lnRef idx="2">
-            <a:schemeClr val="accent1">
-              <a:shade val="50000"/>
-            </a:schemeClr>
-          </a:lnRef>
-          <a:fillRef idx="1">
-            <a:schemeClr val="accent1"/>
-          </a:fillRef>
-          <a:effectRef idx="0">
-            <a:schemeClr val="accent1"/>
-          </a:effectRef>
-          <a:fontRef idx="minor">
-            <a:schemeClr val="lt1"/>
-          </a:fontRef>
-        </p:style>
-        <p:txBody>
-          <a:bodyPr rtlCol="0" anchor="ctr"/>
-          <a:lstStyle/>
+              <a:t>Kafka Cluster</a:t>
+            </a:r>
+          </a:p>
           <a:p>
             <a:pPr marL="0" marR="0" indent="0" algn="ctr" defTabSz="685800" rtl="0" eaLnBrk="1" fontAlgn="auto" latinLnBrk="0" hangingPunct="1">
               <a:lnSpc>
@@ -26831,15 +27711,15 @@
               <a:tabLst/>
             </a:pPr>
             <a:r>
-              <a:rPr lang="en-US" sz="900" dirty="0">
+              <a:rPr lang="en-US" sz="800" dirty="0">
                 <a:solidFill>
                   <a:prstClr val="white"/>
                 </a:solidFill>
                 <a:latin typeface="Arial"/>
               </a:rPr>
-              <a:t>Prometheus- operator</a:t>
-            </a:r>
-            <a:endParaRPr kumimoji="0" sz="900" b="0" i="0" u="none" strike="noStrike" kern="1200" cap="none" spc="0" normalizeH="0" baseline="0" noProof="0" dirty="0">
+              <a:t>[software system]</a:t>
+            </a:r>
+            <a:endParaRPr kumimoji="0" lang="en-US" sz="800" b="0" i="0" u="none" strike="noStrike" kern="1200" cap="none" spc="0" normalizeH="0" baseline="0" noProof="0" dirty="0">
               <a:ln>
                 <a:noFill/>
               </a:ln>
@@ -26854,93 +27734,6 @@
               <a:cs typeface="+mn-cs"/>
             </a:endParaRPr>
           </a:p>
-        </p:txBody>
-      </p:sp>
-      <p:pic>
-        <p:nvPicPr>
-          <p:cNvPr id="24" name="Picture 23">
-            <a:extLst>
-              <a:ext uri="{FF2B5EF4-FFF2-40B4-BE49-F238E27FC236}">
-                <a16:creationId xmlns:a16="http://schemas.microsoft.com/office/drawing/2014/main" id="{DEB5148B-58E6-1346-821C-FE8CF1F886CB}"/>
-              </a:ext>
-            </a:extLst>
-          </p:cNvPr>
-          <p:cNvPicPr>
-            <a:picLocks noChangeAspect="1"/>
-          </p:cNvPicPr>
-          <p:nvPr/>
-        </p:nvPicPr>
-        <p:blipFill>
-          <a:blip r:embed="rId6"/>
-          <a:stretch>
-            <a:fillRect/>
-          </a:stretch>
-        </p:blipFill>
-        <p:spPr>
-          <a:xfrm>
-            <a:off x="227789" y="4467932"/>
-            <a:ext cx="261023" cy="238649"/>
-          </a:xfrm>
-          <a:prstGeom prst="rect">
-            <a:avLst/>
-          </a:prstGeom>
-        </p:spPr>
-      </p:pic>
-      <p:sp>
-        <p:nvSpPr>
-          <p:cNvPr id="25" name="Rectangle 24">
-            <a:extLst>
-              <a:ext uri="{FF2B5EF4-FFF2-40B4-BE49-F238E27FC236}">
-                <a16:creationId xmlns:a16="http://schemas.microsoft.com/office/drawing/2014/main" id="{B65DE0D7-1E84-164A-8728-EADB34EDB8AE}"/>
-              </a:ext>
-            </a:extLst>
-          </p:cNvPr>
-          <p:cNvSpPr/>
-          <p:nvPr/>
-        </p:nvSpPr>
-        <p:spPr>
-          <a:xfrm>
-            <a:off x="2159800" y="2931971"/>
-            <a:ext cx="1397824" cy="340039"/>
-          </a:xfrm>
-          <a:prstGeom prst="rect">
-            <a:avLst/>
-          </a:prstGeom>
-          <a:solidFill>
-            <a:srgbClr val="FFC000">
-              <a:alpha val="50000"/>
-            </a:srgbClr>
-          </a:solidFill>
-          <a:ln>
-            <a:noFill/>
-          </a:ln>
-          <a:effectLst>
-            <a:outerShdw blurRad="50800" dist="38100" dir="5400000" algn="t" rotWithShape="0">
-              <a:prstClr val="black">
-                <a:alpha val="40000"/>
-              </a:prstClr>
-            </a:outerShdw>
-          </a:effectLst>
-        </p:spPr>
-        <p:style>
-          <a:lnRef idx="2">
-            <a:schemeClr val="accent1">
-              <a:shade val="50000"/>
-            </a:schemeClr>
-          </a:lnRef>
-          <a:fillRef idx="1">
-            <a:schemeClr val="accent1"/>
-          </a:fillRef>
-          <a:effectRef idx="0">
-            <a:schemeClr val="accent1"/>
-          </a:effectRef>
-          <a:fontRef idx="minor">
-            <a:schemeClr val="lt1"/>
-          </a:fontRef>
-        </p:style>
-        <p:txBody>
-          <a:bodyPr rtlCol="0" anchor="ctr"/>
-          <a:lstStyle/>
           <a:p>
             <a:pPr marL="0" marR="0" indent="0" algn="ctr" defTabSz="685800" rtl="0" eaLnBrk="1" fontAlgn="auto" latinLnBrk="0" hangingPunct="1">
               <a:lnSpc>
@@ -26958,13 +27751,170 @@
               <a:buNone/>
               <a:tabLst/>
             </a:pPr>
+            <a:endParaRPr lang="en-US" sz="1000" dirty="0">
+              <a:solidFill>
+                <a:prstClr val="white"/>
+              </a:solidFill>
+              <a:latin typeface="Arial"/>
+            </a:endParaRPr>
+          </a:p>
+        </p:txBody>
+      </p:sp>
+      <p:cxnSp>
+        <p:nvCxnSpPr>
+          <p:cNvPr id="13" name="Straight Arrow Connector 12">
+            <a:extLst>
+              <a:ext uri="{FF2B5EF4-FFF2-40B4-BE49-F238E27FC236}">
+                <a16:creationId xmlns:a16="http://schemas.microsoft.com/office/drawing/2014/main" id="{F17228FB-5052-F34E-BFC4-E5C2BD5C5C69}"/>
+              </a:ext>
+            </a:extLst>
+          </p:cNvPr>
+          <p:cNvCxnSpPr>
+            <a:cxnSpLocks/>
+            <a:stCxn id="6" idx="3"/>
+            <a:endCxn id="8" idx="1"/>
+          </p:cNvCxnSpPr>
+          <p:nvPr/>
+        </p:nvCxnSpPr>
+        <p:spPr>
+          <a:xfrm flipV="1">
+            <a:off x="1046536" y="1983184"/>
+            <a:ext cx="2735329" cy="715559"/>
+          </a:xfrm>
+          <a:prstGeom prst="straightConnector1">
+            <a:avLst/>
+          </a:prstGeom>
+          <a:ln>
+            <a:solidFill>
+              <a:schemeClr val="accent2">
+                <a:lumMod val="50000"/>
+              </a:schemeClr>
+            </a:solidFill>
+            <a:tailEnd type="triangle"/>
+          </a:ln>
+          <a:effectLst/>
+        </p:spPr>
+        <p:style>
+          <a:lnRef idx="2">
+            <a:schemeClr val="accent1"/>
+          </a:lnRef>
+          <a:fillRef idx="0">
+            <a:schemeClr val="accent1"/>
+          </a:fillRef>
+          <a:effectRef idx="1">
+            <a:schemeClr val="accent1"/>
+          </a:effectRef>
+          <a:fontRef idx="minor">
+            <a:schemeClr val="tx1"/>
+          </a:fontRef>
+        </p:style>
+      </p:cxnSp>
+      <p:sp>
+        <p:nvSpPr>
+          <p:cNvPr id="14" name="TextBox 13">
+            <a:extLst>
+              <a:ext uri="{FF2B5EF4-FFF2-40B4-BE49-F238E27FC236}">
+                <a16:creationId xmlns:a16="http://schemas.microsoft.com/office/drawing/2014/main" id="{E911EA25-6B7C-5E45-ACA4-ADEB2692F0E0}"/>
+              </a:ext>
+            </a:extLst>
+          </p:cNvPr>
+          <p:cNvSpPr txBox="1"/>
+          <p:nvPr/>
+        </p:nvSpPr>
+        <p:spPr>
+          <a:xfrm>
+            <a:off x="1797680" y="2283979"/>
+            <a:ext cx="739305" cy="215444"/>
+          </a:xfrm>
+          <a:prstGeom prst="rect">
+            <a:avLst/>
+          </a:prstGeom>
+          <a:solidFill>
+            <a:schemeClr val="bg1"/>
+          </a:solidFill>
+        </p:spPr>
+        <p:txBody>
+          <a:bodyPr wrap="none" rtlCol="0">
+            <a:spAutoFit/>
+          </a:bodyPr>
+          <a:lstStyle/>
+          <a:p>
+            <a:r>
+              <a:rPr lang="en-US" sz="800" dirty="0"/>
+              <a:t>Trigger runs</a:t>
+            </a:r>
+            <a:endParaRPr sz="800" dirty="0"/>
+          </a:p>
+        </p:txBody>
+      </p:sp>
+      <p:sp>
+        <p:nvSpPr>
+          <p:cNvPr id="18" name="Rectangle 17">
+            <a:extLst>
+              <a:ext uri="{FF2B5EF4-FFF2-40B4-BE49-F238E27FC236}">
+                <a16:creationId xmlns:a16="http://schemas.microsoft.com/office/drawing/2014/main" id="{731E9411-8E61-6E4B-B6D9-674CB64458C6}"/>
+              </a:ext>
+            </a:extLst>
+          </p:cNvPr>
+          <p:cNvSpPr/>
+          <p:nvPr/>
+        </p:nvSpPr>
+        <p:spPr>
+          <a:xfrm>
+            <a:off x="7274077" y="2365256"/>
+            <a:ext cx="1663547" cy="588110"/>
+          </a:xfrm>
+          <a:prstGeom prst="rect">
+            <a:avLst/>
+          </a:prstGeom>
+          <a:solidFill>
+            <a:schemeClr val="bg1">
+              <a:lumMod val="50000"/>
+            </a:schemeClr>
+          </a:solidFill>
+          <a:ln/>
+        </p:spPr>
+        <p:style>
+          <a:lnRef idx="0">
+            <a:schemeClr val="accent1"/>
+          </a:lnRef>
+          <a:fillRef idx="3">
+            <a:schemeClr val="accent1"/>
+          </a:fillRef>
+          <a:effectRef idx="3">
+            <a:schemeClr val="accent1"/>
+          </a:effectRef>
+          <a:fontRef idx="minor">
+            <a:schemeClr val="lt1"/>
+          </a:fontRef>
+        </p:style>
+        <p:txBody>
+          <a:bodyPr rtlCol="0" anchor="ctr"/>
+          <a:lstStyle/>
+          <a:p>
+            <a:pPr marL="0" marR="0" indent="0" algn="ctr" defTabSz="685800" rtl="0" eaLnBrk="1" fontAlgn="auto" latinLnBrk="0" hangingPunct="1">
+              <a:lnSpc>
+                <a:spcPct val="100000"/>
+              </a:lnSpc>
+              <a:spcBef>
+                <a:spcPts val="0"/>
+              </a:spcBef>
+              <a:spcAft>
+                <a:spcPts val="0"/>
+              </a:spcAft>
+              <a:buClrTx/>
+              <a:buSzTx/>
+              <a:buFontTx/>
+              <a:buNone/>
+              <a:tabLst/>
+            </a:pPr>
             <a:r>
               <a:rPr kumimoji="0" lang="en-US" sz="1000" b="0" i="0" u="none" strike="noStrike" kern="1200" cap="none" spc="0" normalizeH="0" baseline="0" noProof="0" dirty="0">
                 <a:ln>
                   <a:noFill/>
                 </a:ln>
                 <a:solidFill>
-                  <a:srgbClr val="0000FF"/>
+                  <a:prstClr val="white"/>
                 </a:solidFill>
                 <a:effectLst/>
                 <a:uLnTx/>
@@ -26973,7 +27923,391 @@
                 <a:ea typeface="+mn-ea"/>
                 <a:cs typeface="+mn-cs"/>
               </a:rPr>
-              <a:t>Service Monitor</a:t>
+              <a:t>Mirror Maker 2</a:t>
+            </a:r>
+          </a:p>
+          <a:p>
+            <a:pPr marL="0" marR="0" indent="0" algn="ctr" defTabSz="685800" rtl="0" eaLnBrk="1" fontAlgn="auto" latinLnBrk="0" hangingPunct="1">
+              <a:lnSpc>
+                <a:spcPct val="100000"/>
+              </a:lnSpc>
+              <a:spcBef>
+                <a:spcPts val="0"/>
+              </a:spcBef>
+              <a:spcAft>
+                <a:spcPts val="0"/>
+              </a:spcAft>
+              <a:buClrTx/>
+              <a:buSzTx/>
+              <a:buFontTx/>
+              <a:buNone/>
+              <a:tabLst/>
+            </a:pPr>
+            <a:r>
+              <a:rPr lang="en-US" sz="800" dirty="0">
+                <a:solidFill>
+                  <a:prstClr val="white"/>
+                </a:solidFill>
+                <a:latin typeface="Arial"/>
+              </a:rPr>
+              <a:t>[software system]</a:t>
+            </a:r>
+            <a:endParaRPr kumimoji="0" lang="en-US" sz="800" b="0" i="0" u="none" strike="noStrike" kern="1200" cap="none" spc="0" normalizeH="0" baseline="0" noProof="0" dirty="0">
+              <a:ln>
+                <a:noFill/>
+              </a:ln>
+              <a:solidFill>
+                <a:prstClr val="white"/>
+              </a:solidFill>
+              <a:effectLst/>
+              <a:uLnTx/>
+              <a:uFillTx/>
+              <a:latin typeface="Arial"/>
+              <a:ea typeface="+mn-ea"/>
+              <a:cs typeface="+mn-cs"/>
+            </a:endParaRPr>
+          </a:p>
+          <a:p>
+            <a:pPr marL="0" marR="0" indent="0" algn="ctr" defTabSz="685800" rtl="0" eaLnBrk="1" fontAlgn="auto" latinLnBrk="0" hangingPunct="1">
+              <a:lnSpc>
+                <a:spcPct val="100000"/>
+              </a:lnSpc>
+              <a:spcBef>
+                <a:spcPts val="0"/>
+              </a:spcBef>
+              <a:spcAft>
+                <a:spcPts val="0"/>
+              </a:spcAft>
+              <a:buClrTx/>
+              <a:buSzTx/>
+              <a:buFontTx/>
+              <a:buNone/>
+              <a:tabLst/>
+            </a:pPr>
+            <a:endParaRPr lang="en-US" sz="1000" dirty="0">
+              <a:solidFill>
+                <a:prstClr val="white"/>
+              </a:solidFill>
+              <a:latin typeface="Arial"/>
+            </a:endParaRPr>
+          </a:p>
+        </p:txBody>
+      </p:sp>
+      <p:cxnSp>
+        <p:nvCxnSpPr>
+          <p:cNvPr id="38" name="Elbow Connector 37">
+            <a:extLst>
+              <a:ext uri="{FF2B5EF4-FFF2-40B4-BE49-F238E27FC236}">
+                <a16:creationId xmlns:a16="http://schemas.microsoft.com/office/drawing/2014/main" id="{9FB7594D-DEDA-CD41-AE83-217D67988383}"/>
+              </a:ext>
+            </a:extLst>
+          </p:cNvPr>
+          <p:cNvCxnSpPr>
+            <a:cxnSpLocks/>
+            <a:stCxn id="18" idx="2"/>
+            <a:endCxn id="28" idx="0"/>
+          </p:cNvCxnSpPr>
+          <p:nvPr/>
+        </p:nvCxnSpPr>
+        <p:spPr>
+          <a:xfrm rot="5400000">
+            <a:off x="7893870" y="3165347"/>
+            <a:ext cx="423963" cy="12700"/>
+          </a:xfrm>
+          <a:prstGeom prst="bentConnector3">
+            <a:avLst>
+              <a:gd name="adj1" fmla="val 50000"/>
+            </a:avLst>
+          </a:prstGeom>
+          <a:ln>
+            <a:solidFill>
+              <a:schemeClr val="accent6"/>
+            </a:solidFill>
+            <a:tailEnd type="triangle"/>
+          </a:ln>
+          <a:effectLst/>
+        </p:spPr>
+        <p:style>
+          <a:lnRef idx="2">
+            <a:schemeClr val="accent1"/>
+          </a:lnRef>
+          <a:fillRef idx="0">
+            <a:schemeClr val="accent1"/>
+          </a:fillRef>
+          <a:effectRef idx="1">
+            <a:schemeClr val="accent1"/>
+          </a:effectRef>
+          <a:fontRef idx="minor">
+            <a:schemeClr val="tx1"/>
+          </a:fontRef>
+        </p:style>
+      </p:cxnSp>
+      <p:cxnSp>
+        <p:nvCxnSpPr>
+          <p:cNvPr id="39" name="Elbow Connector 38">
+            <a:extLst>
+              <a:ext uri="{FF2B5EF4-FFF2-40B4-BE49-F238E27FC236}">
+                <a16:creationId xmlns:a16="http://schemas.microsoft.com/office/drawing/2014/main" id="{4ECFCE31-274A-974A-BA72-B59DBB20F4CE}"/>
+              </a:ext>
+            </a:extLst>
+          </p:cNvPr>
+          <p:cNvCxnSpPr>
+            <a:cxnSpLocks/>
+            <a:stCxn id="9" idx="2"/>
+            <a:endCxn id="18" idx="0"/>
+          </p:cNvCxnSpPr>
+          <p:nvPr/>
+        </p:nvCxnSpPr>
+        <p:spPr>
+          <a:xfrm rot="5400000">
+            <a:off x="7852083" y="2111487"/>
+            <a:ext cx="507538" cy="1"/>
+          </a:xfrm>
+          <a:prstGeom prst="bentConnector3">
+            <a:avLst>
+              <a:gd name="adj1" fmla="val 50000"/>
+            </a:avLst>
+          </a:prstGeom>
+          <a:ln>
+            <a:solidFill>
+              <a:schemeClr val="accent6"/>
+            </a:solidFill>
+            <a:tailEnd type="triangle"/>
+          </a:ln>
+          <a:effectLst/>
+        </p:spPr>
+        <p:style>
+          <a:lnRef idx="2">
+            <a:schemeClr val="accent1"/>
+          </a:lnRef>
+          <a:fillRef idx="0">
+            <a:schemeClr val="accent1"/>
+          </a:fillRef>
+          <a:effectRef idx="1">
+            <a:schemeClr val="accent1"/>
+          </a:effectRef>
+          <a:fontRef idx="minor">
+            <a:schemeClr val="tx1"/>
+          </a:fontRef>
+        </p:style>
+      </p:cxnSp>
+      <p:sp>
+        <p:nvSpPr>
+          <p:cNvPr id="28" name="Rectangle 27">
+            <a:extLst>
+              <a:ext uri="{FF2B5EF4-FFF2-40B4-BE49-F238E27FC236}">
+                <a16:creationId xmlns:a16="http://schemas.microsoft.com/office/drawing/2014/main" id="{74729975-8414-8941-98AD-12678BAE8825}"/>
+              </a:ext>
+            </a:extLst>
+          </p:cNvPr>
+          <p:cNvSpPr/>
+          <p:nvPr/>
+        </p:nvSpPr>
+        <p:spPr>
+          <a:xfrm>
+            <a:off x="7274077" y="3377329"/>
+            <a:ext cx="1663547" cy="914400"/>
+          </a:xfrm>
+          <a:prstGeom prst="rect">
+            <a:avLst/>
+          </a:prstGeom>
+          <a:solidFill>
+            <a:schemeClr val="bg1">
+              <a:lumMod val="50000"/>
+            </a:schemeClr>
+          </a:solidFill>
+          <a:ln/>
+        </p:spPr>
+        <p:style>
+          <a:lnRef idx="0">
+            <a:schemeClr val="accent1"/>
+          </a:lnRef>
+          <a:fillRef idx="3">
+            <a:schemeClr val="accent1"/>
+          </a:fillRef>
+          <a:effectRef idx="3">
+            <a:schemeClr val="accent1"/>
+          </a:effectRef>
+          <a:fontRef idx="minor">
+            <a:schemeClr val="lt1"/>
+          </a:fontRef>
+        </p:style>
+        <p:txBody>
+          <a:bodyPr rtlCol="0" anchor="ctr"/>
+          <a:lstStyle/>
+          <a:p>
+            <a:pPr marL="0" marR="0" indent="0" algn="ctr" defTabSz="685800" rtl="0" eaLnBrk="1" fontAlgn="auto" latinLnBrk="0" hangingPunct="1">
+              <a:lnSpc>
+                <a:spcPct val="100000"/>
+              </a:lnSpc>
+              <a:spcBef>
+                <a:spcPts val="0"/>
+              </a:spcBef>
+              <a:spcAft>
+                <a:spcPts val="0"/>
+              </a:spcAft>
+              <a:buClrTx/>
+              <a:buSzTx/>
+              <a:buFontTx/>
+              <a:buNone/>
+              <a:tabLst/>
+            </a:pPr>
+            <a:r>
+              <a:rPr kumimoji="0" lang="en-US" sz="1000" b="0" i="0" u="none" strike="noStrike" kern="1200" cap="none" spc="0" normalizeH="0" baseline="0" noProof="0" dirty="0">
+                <a:ln>
+                  <a:noFill/>
+                </a:ln>
+                <a:solidFill>
+                  <a:prstClr val="white"/>
+                </a:solidFill>
+                <a:effectLst/>
+                <a:uLnTx/>
+                <a:uFillTx/>
+                <a:latin typeface="Arial"/>
+                <a:ea typeface="+mn-ea"/>
+                <a:cs typeface="+mn-cs"/>
+              </a:rPr>
+              <a:t>Kafka Cluster</a:t>
+            </a:r>
+          </a:p>
+          <a:p>
+            <a:pPr marL="0" marR="0" indent="0" algn="ctr" defTabSz="685800" rtl="0" eaLnBrk="1" fontAlgn="auto" latinLnBrk="0" hangingPunct="1">
+              <a:lnSpc>
+                <a:spcPct val="100000"/>
+              </a:lnSpc>
+              <a:spcBef>
+                <a:spcPts val="0"/>
+              </a:spcBef>
+              <a:spcAft>
+                <a:spcPts val="0"/>
+              </a:spcAft>
+              <a:buClrTx/>
+              <a:buSzTx/>
+              <a:buFontTx/>
+              <a:buNone/>
+              <a:tabLst/>
+            </a:pPr>
+            <a:r>
+              <a:rPr lang="en-US" sz="800" dirty="0">
+                <a:solidFill>
+                  <a:prstClr val="white"/>
+                </a:solidFill>
+                <a:latin typeface="Arial"/>
+              </a:rPr>
+              <a:t>[software system]</a:t>
+            </a:r>
+            <a:endParaRPr kumimoji="0" lang="en-US" sz="800" b="0" i="0" u="none" strike="noStrike" kern="1200" cap="none" spc="0" normalizeH="0" baseline="0" noProof="0" dirty="0">
+              <a:ln>
+                <a:noFill/>
+              </a:ln>
+              <a:solidFill>
+                <a:prstClr val="white"/>
+              </a:solidFill>
+              <a:effectLst/>
+              <a:uLnTx/>
+              <a:uFillTx/>
+              <a:latin typeface="Arial"/>
+              <a:ea typeface="+mn-ea"/>
+              <a:cs typeface="+mn-cs"/>
+            </a:endParaRPr>
+          </a:p>
+          <a:p>
+            <a:pPr marL="0" marR="0" indent="0" algn="ctr" defTabSz="685800" rtl="0" eaLnBrk="1" fontAlgn="auto" latinLnBrk="0" hangingPunct="1">
+              <a:lnSpc>
+                <a:spcPct val="100000"/>
+              </a:lnSpc>
+              <a:spcBef>
+                <a:spcPts val="0"/>
+              </a:spcBef>
+              <a:spcAft>
+                <a:spcPts val="0"/>
+              </a:spcAft>
+              <a:buClrTx/>
+              <a:buSzTx/>
+              <a:buFontTx/>
+              <a:buNone/>
+              <a:tabLst/>
+            </a:pPr>
+            <a:endParaRPr lang="en-US" sz="1000" dirty="0">
+              <a:solidFill>
+                <a:prstClr val="white"/>
+              </a:solidFill>
+              <a:latin typeface="Arial"/>
+            </a:endParaRPr>
+          </a:p>
+        </p:txBody>
+      </p:sp>
+      <p:sp>
+        <p:nvSpPr>
+          <p:cNvPr id="21" name="Rounded Rectangle 20">
+            <a:extLst>
+              <a:ext uri="{FF2B5EF4-FFF2-40B4-BE49-F238E27FC236}">
+                <a16:creationId xmlns:a16="http://schemas.microsoft.com/office/drawing/2014/main" id="{3CFBFB33-1218-1B46-8042-273C666C5186}"/>
+              </a:ext>
+            </a:extLst>
+          </p:cNvPr>
+          <p:cNvSpPr/>
+          <p:nvPr/>
+        </p:nvSpPr>
+        <p:spPr>
+          <a:xfrm>
+            <a:off x="2691871" y="1400519"/>
+            <a:ext cx="3731384" cy="3057182"/>
+          </a:xfrm>
+          <a:prstGeom prst="roundRect">
+            <a:avLst>
+              <a:gd name="adj" fmla="val 3149"/>
+            </a:avLst>
+          </a:prstGeom>
+          <a:noFill/>
+          <a:ln w="12700">
+            <a:prstDash val="dash"/>
+          </a:ln>
+        </p:spPr>
+        <p:style>
+          <a:lnRef idx="2">
+            <a:schemeClr val="accent1">
+              <a:shade val="50000"/>
+            </a:schemeClr>
+          </a:lnRef>
+          <a:fillRef idx="1">
+            <a:schemeClr val="accent1"/>
+          </a:fillRef>
+          <a:effectRef idx="0">
+            <a:schemeClr val="accent1"/>
+          </a:effectRef>
+          <a:fontRef idx="minor">
+            <a:schemeClr val="lt1"/>
+          </a:fontRef>
+        </p:style>
+        <p:txBody>
+          <a:bodyPr rtlCol="0" anchor="b"/>
+          <a:lstStyle/>
+          <a:p>
+            <a:pPr marL="0" marR="0" indent="0" algn="l" defTabSz="685800" rtl="0" eaLnBrk="1" fontAlgn="auto" latinLnBrk="0" hangingPunct="1">
+              <a:lnSpc>
+                <a:spcPct val="100000"/>
+              </a:lnSpc>
+              <a:spcBef>
+                <a:spcPts val="0"/>
+              </a:spcBef>
+              <a:spcAft>
+                <a:spcPts val="0"/>
+              </a:spcAft>
+              <a:buClrTx/>
+              <a:buSzTx/>
+              <a:buFontTx/>
+              <a:buNone/>
+              <a:tabLst/>
+            </a:pPr>
+            <a:r>
+              <a:rPr lang="en-US" sz="1000" dirty="0">
+                <a:solidFill>
+                  <a:srgbClr val="0000FF"/>
+                </a:solidFill>
+                <a:latin typeface="Arial"/>
+              </a:rPr>
+              <a:t>Kafka Perf Tool</a:t>
             </a:r>
             <a:endParaRPr kumimoji="0" sz="1000" b="0" i="0" u="none" strike="noStrike" kern="1200" cap="none" spc="0" normalizeH="0" baseline="0" noProof="0" dirty="0">
               <a:ln>
@@ -26992,10 +28326,376 @@
           </a:p>
         </p:txBody>
       </p:sp>
+      <p:cxnSp>
+        <p:nvCxnSpPr>
+          <p:cNvPr id="58" name="Elbow Connector 57">
+            <a:extLst>
+              <a:ext uri="{FF2B5EF4-FFF2-40B4-BE49-F238E27FC236}">
+                <a16:creationId xmlns:a16="http://schemas.microsoft.com/office/drawing/2014/main" id="{075CAE59-ED9A-0F48-BF04-07CA88610939}"/>
+              </a:ext>
+            </a:extLst>
+          </p:cNvPr>
+          <p:cNvCxnSpPr>
+            <a:stCxn id="8" idx="3"/>
+            <a:endCxn id="9" idx="1"/>
+          </p:cNvCxnSpPr>
+          <p:nvPr/>
+        </p:nvCxnSpPr>
+        <p:spPr>
+          <a:xfrm flipV="1">
+            <a:off x="5445412" y="1400518"/>
+            <a:ext cx="1828666" cy="582666"/>
+          </a:xfrm>
+          <a:prstGeom prst="bentConnector3">
+            <a:avLst/>
+          </a:prstGeom>
+          <a:ln>
+            <a:solidFill>
+              <a:schemeClr val="accent6"/>
+            </a:solidFill>
+            <a:tailEnd type="triangle"/>
+          </a:ln>
+          <a:effectLst/>
+        </p:spPr>
+        <p:style>
+          <a:lnRef idx="2">
+            <a:schemeClr val="accent1"/>
+          </a:lnRef>
+          <a:fillRef idx="0">
+            <a:schemeClr val="accent1"/>
+          </a:fillRef>
+          <a:effectRef idx="1">
+            <a:schemeClr val="accent1"/>
+          </a:effectRef>
+          <a:fontRef idx="minor">
+            <a:schemeClr val="tx1"/>
+          </a:fontRef>
+        </p:style>
+      </p:cxnSp>
+      <p:sp>
+        <p:nvSpPr>
+          <p:cNvPr id="32" name="TextBox 31">
+            <a:extLst>
+              <a:ext uri="{FF2B5EF4-FFF2-40B4-BE49-F238E27FC236}">
+                <a16:creationId xmlns:a16="http://schemas.microsoft.com/office/drawing/2014/main" id="{018CA162-B9D9-5D43-B7DA-E7D093961629}"/>
+              </a:ext>
+            </a:extLst>
+          </p:cNvPr>
+          <p:cNvSpPr txBox="1"/>
+          <p:nvPr/>
+        </p:nvSpPr>
+        <p:spPr>
+          <a:xfrm>
+            <a:off x="6287704" y="1232646"/>
+            <a:ext cx="660758" cy="338554"/>
+          </a:xfrm>
+          <a:prstGeom prst="rect">
+            <a:avLst/>
+          </a:prstGeom>
+          <a:solidFill>
+            <a:schemeClr val="bg1"/>
+          </a:solidFill>
+        </p:spPr>
+        <p:txBody>
+          <a:bodyPr wrap="none" rtlCol="0">
+            <a:spAutoFit/>
+          </a:bodyPr>
+          <a:lstStyle/>
+          <a:p>
+            <a:r>
+              <a:rPr lang="en-US" sz="800" dirty="0"/>
+              <a:t>Publishes</a:t>
+            </a:r>
+          </a:p>
+          <a:p>
+            <a:r>
+              <a:rPr lang="en-US" sz="800" dirty="0"/>
+              <a:t>messages</a:t>
+            </a:r>
+          </a:p>
+        </p:txBody>
+      </p:sp>
+      <p:sp>
+        <p:nvSpPr>
+          <p:cNvPr id="59" name="Rectangle 58">
+            <a:extLst>
+              <a:ext uri="{FF2B5EF4-FFF2-40B4-BE49-F238E27FC236}">
+                <a16:creationId xmlns:a16="http://schemas.microsoft.com/office/drawing/2014/main" id="{D155D4FC-3D16-6E45-995F-1AC06BCEBEEC}"/>
+              </a:ext>
+            </a:extLst>
+          </p:cNvPr>
+          <p:cNvSpPr/>
+          <p:nvPr/>
+        </p:nvSpPr>
+        <p:spPr>
+          <a:xfrm>
+            <a:off x="3781865" y="3324146"/>
+            <a:ext cx="1663547" cy="570079"/>
+          </a:xfrm>
+          <a:prstGeom prst="rect">
+            <a:avLst/>
+          </a:prstGeom>
+          <a:solidFill>
+            <a:srgbClr val="3567A6"/>
+          </a:solidFill>
+          <a:ln/>
+        </p:spPr>
+        <p:style>
+          <a:lnRef idx="0">
+            <a:schemeClr val="accent1"/>
+          </a:lnRef>
+          <a:fillRef idx="3">
+            <a:schemeClr val="accent1"/>
+          </a:fillRef>
+          <a:effectRef idx="3">
+            <a:schemeClr val="accent1"/>
+          </a:effectRef>
+          <a:fontRef idx="minor">
+            <a:schemeClr val="lt1"/>
+          </a:fontRef>
+        </p:style>
+        <p:txBody>
+          <a:bodyPr rtlCol="0" anchor="ctr"/>
+          <a:lstStyle/>
+          <a:p>
+            <a:pPr marL="0" marR="0" indent="0" algn="ctr" defTabSz="685800" rtl="0" eaLnBrk="1" fontAlgn="auto" latinLnBrk="0" hangingPunct="1">
+              <a:lnSpc>
+                <a:spcPct val="100000"/>
+              </a:lnSpc>
+              <a:spcBef>
+                <a:spcPts val="0"/>
+              </a:spcBef>
+              <a:spcAft>
+                <a:spcPts val="0"/>
+              </a:spcAft>
+              <a:buClrTx/>
+              <a:buSzTx/>
+              <a:buFontTx/>
+              <a:buNone/>
+              <a:tabLst/>
+            </a:pPr>
+            <a:r>
+              <a:rPr kumimoji="0" lang="en-US" sz="1000" b="0" i="0" u="none" strike="noStrike" kern="1200" cap="none" spc="0" normalizeH="0" baseline="0" noProof="0" dirty="0">
+                <a:ln>
+                  <a:noFill/>
+                </a:ln>
+                <a:solidFill>
+                  <a:prstClr val="white"/>
+                </a:solidFill>
+                <a:effectLst/>
+                <a:uLnTx/>
+                <a:uFillTx/>
+                <a:latin typeface="Arial"/>
+                <a:ea typeface="+mn-ea"/>
+                <a:cs typeface="+mn-cs"/>
+              </a:rPr>
+              <a:t>Consumer App</a:t>
+            </a:r>
+            <a:endParaRPr kumimoji="0" sz="800" b="0" i="0" u="none" strike="noStrike" kern="1200" cap="none" spc="0" normalizeH="0" baseline="0" noProof="0" dirty="0">
+              <a:ln>
+                <a:noFill/>
+              </a:ln>
+              <a:solidFill>
+                <a:prstClr val="white"/>
+              </a:solidFill>
+              <a:effectLst/>
+              <a:uLnTx/>
+              <a:uFillTx/>
+              <a:latin typeface="Arial"/>
+              <a:ea typeface="+mn-ea"/>
+              <a:cs typeface="+mn-cs"/>
+            </a:endParaRPr>
+          </a:p>
+        </p:txBody>
+      </p:sp>
+      <p:cxnSp>
+        <p:nvCxnSpPr>
+          <p:cNvPr id="60" name="Elbow Connector 59">
+            <a:extLst>
+              <a:ext uri="{FF2B5EF4-FFF2-40B4-BE49-F238E27FC236}">
+                <a16:creationId xmlns:a16="http://schemas.microsoft.com/office/drawing/2014/main" id="{B78B66F9-0572-E24C-AC98-746F0E060A12}"/>
+              </a:ext>
+            </a:extLst>
+          </p:cNvPr>
+          <p:cNvCxnSpPr>
+            <a:cxnSpLocks/>
+            <a:stCxn id="28" idx="1"/>
+            <a:endCxn id="59" idx="3"/>
+          </p:cNvCxnSpPr>
+          <p:nvPr/>
+        </p:nvCxnSpPr>
+        <p:spPr>
+          <a:xfrm rot="10800000">
+            <a:off x="5445413" y="3609187"/>
+            <a:ext cx="1828665" cy="225343"/>
+          </a:xfrm>
+          <a:prstGeom prst="bentConnector3">
+            <a:avLst>
+              <a:gd name="adj1" fmla="val 50000"/>
+            </a:avLst>
+          </a:prstGeom>
+          <a:ln>
+            <a:solidFill>
+              <a:schemeClr val="accent6"/>
+            </a:solidFill>
+            <a:tailEnd type="triangle"/>
+          </a:ln>
+          <a:effectLst/>
+        </p:spPr>
+        <p:style>
+          <a:lnRef idx="2">
+            <a:schemeClr val="accent1"/>
+          </a:lnRef>
+          <a:fillRef idx="0">
+            <a:schemeClr val="accent1"/>
+          </a:fillRef>
+          <a:effectRef idx="1">
+            <a:schemeClr val="accent1"/>
+          </a:effectRef>
+          <a:fontRef idx="minor">
+            <a:schemeClr val="tx1"/>
+          </a:fontRef>
+        </p:style>
+      </p:cxnSp>
+      <p:sp>
+        <p:nvSpPr>
+          <p:cNvPr id="11" name="TextBox 10">
+            <a:extLst>
+              <a:ext uri="{FF2B5EF4-FFF2-40B4-BE49-F238E27FC236}">
+                <a16:creationId xmlns:a16="http://schemas.microsoft.com/office/drawing/2014/main" id="{71E1247C-49D7-D147-9304-6DE26446F6CF}"/>
+              </a:ext>
+            </a:extLst>
+          </p:cNvPr>
+          <p:cNvSpPr txBox="1"/>
+          <p:nvPr/>
+        </p:nvSpPr>
+        <p:spPr>
+          <a:xfrm>
+            <a:off x="5733997" y="3439908"/>
+            <a:ext cx="705642" cy="338554"/>
+          </a:xfrm>
+          <a:prstGeom prst="rect">
+            <a:avLst/>
+          </a:prstGeom>
+          <a:solidFill>
+            <a:schemeClr val="bg1"/>
+          </a:solidFill>
+        </p:spPr>
+        <p:txBody>
+          <a:bodyPr wrap="none" rtlCol="0">
+            <a:spAutoFit/>
+          </a:bodyPr>
+          <a:lstStyle/>
+          <a:p>
+            <a:r>
+              <a:rPr lang="en-US" sz="800" dirty="0"/>
+              <a:t>Consumes </a:t>
+            </a:r>
+          </a:p>
+          <a:p>
+            <a:r>
+              <a:rPr lang="en-US" sz="800" dirty="0"/>
+              <a:t>messages</a:t>
+            </a:r>
+          </a:p>
+        </p:txBody>
+      </p:sp>
+      <p:cxnSp>
+        <p:nvCxnSpPr>
+          <p:cNvPr id="63" name="Straight Arrow Connector 62">
+            <a:extLst>
+              <a:ext uri="{FF2B5EF4-FFF2-40B4-BE49-F238E27FC236}">
+                <a16:creationId xmlns:a16="http://schemas.microsoft.com/office/drawing/2014/main" id="{793811A6-8EDB-6049-9D05-992872AC2C47}"/>
+              </a:ext>
+            </a:extLst>
+          </p:cNvPr>
+          <p:cNvCxnSpPr>
+            <a:cxnSpLocks/>
+            <a:stCxn id="6" idx="3"/>
+          </p:cNvCxnSpPr>
+          <p:nvPr/>
+        </p:nvCxnSpPr>
+        <p:spPr>
+          <a:xfrm>
+            <a:off x="1046536" y="2698743"/>
+            <a:ext cx="2753541" cy="910442"/>
+          </a:xfrm>
+          <a:prstGeom prst="straightConnector1">
+            <a:avLst/>
+          </a:prstGeom>
+          <a:ln>
+            <a:solidFill>
+              <a:schemeClr val="accent2">
+                <a:lumMod val="50000"/>
+              </a:schemeClr>
+            </a:solidFill>
+            <a:tailEnd type="triangle"/>
+          </a:ln>
+          <a:effectLst/>
+        </p:spPr>
+        <p:style>
+          <a:lnRef idx="2">
+            <a:schemeClr val="accent1"/>
+          </a:lnRef>
+          <a:fillRef idx="0">
+            <a:schemeClr val="accent1"/>
+          </a:fillRef>
+          <a:effectRef idx="1">
+            <a:schemeClr val="accent1"/>
+          </a:effectRef>
+          <a:fontRef idx="minor">
+            <a:schemeClr val="tx1"/>
+          </a:fontRef>
+        </p:style>
+      </p:cxnSp>
+      <p:sp>
+        <p:nvSpPr>
+          <p:cNvPr id="66" name="TextBox 65">
+            <a:extLst>
+              <a:ext uri="{FF2B5EF4-FFF2-40B4-BE49-F238E27FC236}">
+                <a16:creationId xmlns:a16="http://schemas.microsoft.com/office/drawing/2014/main" id="{556E4385-085A-774A-8EA3-5E8126E0DD98}"/>
+              </a:ext>
+            </a:extLst>
+          </p:cNvPr>
+          <p:cNvSpPr txBox="1"/>
+          <p:nvPr/>
+        </p:nvSpPr>
+        <p:spPr>
+          <a:xfrm>
+            <a:off x="1972078" y="3021541"/>
+            <a:ext cx="771365" cy="338554"/>
+          </a:xfrm>
+          <a:prstGeom prst="rect">
+            <a:avLst/>
+          </a:prstGeom>
+          <a:solidFill>
+            <a:schemeClr val="bg1"/>
+          </a:solidFill>
+        </p:spPr>
+        <p:txBody>
+          <a:bodyPr wrap="none" rtlCol="0">
+            <a:spAutoFit/>
+          </a:bodyPr>
+          <a:lstStyle/>
+          <a:p>
+            <a:r>
+              <a:rPr lang="en-US" sz="800" dirty="0"/>
+              <a:t>Get Latency </a:t>
+            </a:r>
+          </a:p>
+          <a:p>
+            <a:r>
+              <a:rPr lang="en-US" sz="800" dirty="0"/>
+              <a:t>metrics</a:t>
+            </a:r>
+            <a:endParaRPr sz="800" dirty="0"/>
+          </a:p>
+        </p:txBody>
+      </p:sp>
     </p:spTree>
     <p:extLst>
       <p:ext uri="{BB962C8B-B14F-4D97-AF65-F5344CB8AC3E}">
-        <p14:creationId xmlns:p14="http://schemas.microsoft.com/office/powerpoint/2010/main" val="1287331392"/>
+        <p14:creationId xmlns:p14="http://schemas.microsoft.com/office/powerpoint/2010/main" val="3837135968"/>
       </p:ext>
     </p:extLst>
   </p:cSld>
@@ -29410,6 +31110,1141 @@
     <p:extLst>
       <p:ext uri="{BB962C8B-B14F-4D97-AF65-F5344CB8AC3E}">
         <p14:creationId xmlns:p14="http://schemas.microsoft.com/office/powerpoint/2010/main" val="3868124045"/>
+      </p:ext>
+    </p:extLst>
+  </p:cSld>
+  <p:clrMapOvr>
+    <a:masterClrMapping/>
+  </p:clrMapOvr>
+</p:sld>
+</file>
+
+<file path=ppt/slides/slide20.xml><?xml version="1.0" encoding="utf-8"?>
+<p:sld xmlns:a="http://schemas.openxmlformats.org/drawingml/2006/main" xmlns:r="http://schemas.openxmlformats.org/officeDocument/2006/relationships" xmlns:p="http://schemas.openxmlformats.org/presentationml/2006/main">
+  <p:cSld>
+    <p:spTree>
+      <p:nvGrpSpPr>
+        <p:cNvPr id="1" name=""/>
+        <p:cNvGrpSpPr/>
+        <p:nvPr/>
+      </p:nvGrpSpPr>
+      <p:grpSpPr>
+        <a:xfrm>
+          <a:off x="0" y="0"/>
+          <a:ext cx="0" cy="0"/>
+          <a:chOff x="0" y="0"/>
+          <a:chExt cx="0" cy="0"/>
+        </a:xfrm>
+      </p:grpSpPr>
+      <p:sp>
+        <p:nvSpPr>
+          <p:cNvPr id="2" name="Title 1">
+            <a:extLst>
+              <a:ext uri="{FF2B5EF4-FFF2-40B4-BE49-F238E27FC236}">
+                <a16:creationId xmlns:a16="http://schemas.microsoft.com/office/drawing/2014/main" id="{58169065-201E-5F42-BB75-6EA30E0A8D38}"/>
+              </a:ext>
+            </a:extLst>
+          </p:cNvPr>
+          <p:cNvSpPr>
+            <a:spLocks noGrp="1"/>
+          </p:cNvSpPr>
+          <p:nvPr>
+            <p:ph type="title"/>
+          </p:nvPr>
+        </p:nvSpPr>
+        <p:spPr/>
+        <p:txBody>
+          <a:bodyPr/>
+          <a:lstStyle/>
+          <a:p>
+            <a:r>
+              <a:rPr lang="en-US" dirty="0"/>
+              <a:t>Mirror maker monitoring</a:t>
+            </a:r>
+            <a:endParaRPr dirty="0"/>
+          </a:p>
+        </p:txBody>
+      </p:sp>
+      <p:sp>
+        <p:nvSpPr>
+          <p:cNvPr id="4" name="Slide Number Placeholder 3">
+            <a:extLst>
+              <a:ext uri="{FF2B5EF4-FFF2-40B4-BE49-F238E27FC236}">
+                <a16:creationId xmlns:a16="http://schemas.microsoft.com/office/drawing/2014/main" id="{D461EF70-49A7-3F48-A6F1-90FB6453A640}"/>
+              </a:ext>
+            </a:extLst>
+          </p:cNvPr>
+          <p:cNvSpPr>
+            <a:spLocks noGrp="1"/>
+          </p:cNvSpPr>
+          <p:nvPr>
+            <p:ph type="sldNum" sz="quarter" idx="10"/>
+          </p:nvPr>
+        </p:nvSpPr>
+        <p:spPr/>
+        <p:txBody>
+          <a:bodyPr/>
+          <a:lstStyle/>
+          <a:p>
+            <a:fld id="{2F63A97E-D605-DC42-8452-C14CD1FA87FA}" type="slidenum">
+              <a:rPr lang="en-US" smtClean="0">
+                <a:solidFill>
+                  <a:srgbClr val="5AAAFA"/>
+                </a:solidFill>
+              </a:rPr>
+              <a:pPr/>
+              <a:t>20</a:t>
+            </a:fld>
+            <a:endParaRPr lang="en-US">
+              <a:solidFill>
+                <a:srgbClr val="5AAAFA"/>
+              </a:solidFill>
+            </a:endParaRPr>
+          </a:p>
+        </p:txBody>
+      </p:sp>
+      <p:sp>
+        <p:nvSpPr>
+          <p:cNvPr id="5" name="Rectangle 4">
+            <a:extLst>
+              <a:ext uri="{FF2B5EF4-FFF2-40B4-BE49-F238E27FC236}">
+                <a16:creationId xmlns:a16="http://schemas.microsoft.com/office/drawing/2014/main" id="{D1CF926F-7952-E345-9F38-503542966212}"/>
+              </a:ext>
+            </a:extLst>
+          </p:cNvPr>
+          <p:cNvSpPr/>
+          <p:nvPr/>
+        </p:nvSpPr>
+        <p:spPr>
+          <a:xfrm>
+            <a:off x="298411" y="1073442"/>
+            <a:ext cx="4008458" cy="3498557"/>
+          </a:xfrm>
+          <a:prstGeom prst="rect">
+            <a:avLst/>
+          </a:prstGeom>
+          <a:noFill/>
+          <a:ln>
+            <a:solidFill>
+              <a:srgbClr val="0000FF"/>
+            </a:solidFill>
+            <a:prstDash val="dash"/>
+          </a:ln>
+        </p:spPr>
+        <p:style>
+          <a:lnRef idx="2">
+            <a:schemeClr val="accent1">
+              <a:shade val="50000"/>
+            </a:schemeClr>
+          </a:lnRef>
+          <a:fillRef idx="1">
+            <a:schemeClr val="accent1"/>
+          </a:fillRef>
+          <a:effectRef idx="0">
+            <a:schemeClr val="accent1"/>
+          </a:effectRef>
+          <a:fontRef idx="minor">
+            <a:schemeClr val="lt1"/>
+          </a:fontRef>
+        </p:style>
+        <p:txBody>
+          <a:bodyPr rtlCol="0" anchor="t"/>
+          <a:lstStyle/>
+          <a:p>
+            <a:pPr algn="ctr" defTabSz="514350"/>
+            <a:r>
+              <a:rPr lang="en-US" sz="750" b="1" dirty="0">
+                <a:solidFill>
+                  <a:srgbClr val="0000FF"/>
+                </a:solidFill>
+                <a:latin typeface="Arial"/>
+              </a:rPr>
+              <a:t>On-Premise OpenShift Environment</a:t>
+            </a:r>
+          </a:p>
+        </p:txBody>
+      </p:sp>
+      <p:sp>
+        <p:nvSpPr>
+          <p:cNvPr id="6" name="Rectangle 5">
+            <a:extLst>
+              <a:ext uri="{FF2B5EF4-FFF2-40B4-BE49-F238E27FC236}">
+                <a16:creationId xmlns:a16="http://schemas.microsoft.com/office/drawing/2014/main" id="{0CA26A3C-A42A-F549-B895-ED3A96176D25}"/>
+              </a:ext>
+            </a:extLst>
+          </p:cNvPr>
+          <p:cNvSpPr/>
+          <p:nvPr/>
+        </p:nvSpPr>
+        <p:spPr>
+          <a:xfrm>
+            <a:off x="4710303" y="1073443"/>
+            <a:ext cx="3747898" cy="1304727"/>
+          </a:xfrm>
+          <a:prstGeom prst="rect">
+            <a:avLst/>
+          </a:prstGeom>
+          <a:noFill/>
+          <a:ln>
+            <a:solidFill>
+              <a:srgbClr val="00B050"/>
+            </a:solidFill>
+            <a:prstDash val="dash"/>
+          </a:ln>
+        </p:spPr>
+        <p:style>
+          <a:lnRef idx="2">
+            <a:schemeClr val="accent1">
+              <a:shade val="50000"/>
+            </a:schemeClr>
+          </a:lnRef>
+          <a:fillRef idx="1">
+            <a:schemeClr val="accent1"/>
+          </a:fillRef>
+          <a:effectRef idx="0">
+            <a:schemeClr val="accent1"/>
+          </a:effectRef>
+          <a:fontRef idx="minor">
+            <a:schemeClr val="lt1"/>
+          </a:fontRef>
+        </p:style>
+        <p:txBody>
+          <a:bodyPr rtlCol="0" anchor="t"/>
+          <a:lstStyle/>
+          <a:p>
+            <a:pPr algn="ctr" defTabSz="514350"/>
+            <a:r>
+              <a:rPr lang="en-US" sz="750" b="1">
+                <a:solidFill>
+                  <a:srgbClr val="00B050"/>
+                </a:solidFill>
+                <a:latin typeface="Arial"/>
+              </a:rPr>
+              <a:t>IBM Cloud</a:t>
+            </a:r>
+          </a:p>
+        </p:txBody>
+      </p:sp>
+      <p:sp>
+        <p:nvSpPr>
+          <p:cNvPr id="7" name="AutoShape 4">
+            <a:extLst>
+              <a:ext uri="{FF2B5EF4-FFF2-40B4-BE49-F238E27FC236}">
+                <a16:creationId xmlns:a16="http://schemas.microsoft.com/office/drawing/2014/main" id="{2CAC27AF-BDB4-874D-9765-42C852359FEA}"/>
+              </a:ext>
+            </a:extLst>
+          </p:cNvPr>
+          <p:cNvSpPr>
+            <a:spLocks noChangeArrowheads="1"/>
+          </p:cNvSpPr>
+          <p:nvPr/>
+        </p:nvSpPr>
+        <p:spPr bwMode="auto">
+          <a:xfrm>
+            <a:off x="4935506" y="1352325"/>
+            <a:ext cx="3333325" cy="480994"/>
+          </a:xfrm>
+          <a:prstGeom prst="roundRect">
+            <a:avLst>
+              <a:gd name="adj" fmla="val 7117"/>
+            </a:avLst>
+          </a:prstGeom>
+          <a:solidFill>
+            <a:schemeClr val="bg1">
+              <a:lumMod val="85000"/>
+            </a:schemeClr>
+          </a:solidFill>
+          <a:ln w="12700">
+            <a:noFill/>
+            <a:prstDash val="dash"/>
+            <a:round/>
+            <a:headEnd/>
+            <a:tailEnd/>
+          </a:ln>
+          <a:effectLst>
+            <a:outerShdw blurRad="50800" dist="38100" dir="5400000" algn="t" rotWithShape="0">
+              <a:prstClr val="black">
+                <a:alpha val="40000"/>
+              </a:prstClr>
+            </a:outerShdw>
+          </a:effectLst>
+        </p:spPr>
+        <p:txBody>
+          <a:bodyPr lIns="0" tIns="0" rIns="0" bIns="0" anchor="b" anchorCtr="1"/>
+          <a:lstStyle/>
+          <a:p>
+            <a:pPr algn="ctr"/>
+            <a:r>
+              <a:rPr lang="en-US" sz="750" dirty="0"/>
+              <a:t>Event Streams Cluster</a:t>
+            </a:r>
+          </a:p>
+        </p:txBody>
+      </p:sp>
+      <p:pic>
+        <p:nvPicPr>
+          <p:cNvPr id="8" name="Picture 7">
+            <a:extLst>
+              <a:ext uri="{FF2B5EF4-FFF2-40B4-BE49-F238E27FC236}">
+                <a16:creationId xmlns:a16="http://schemas.microsoft.com/office/drawing/2014/main" id="{EF287F09-1597-E54C-96CA-65D387410EA2}"/>
+              </a:ext>
+            </a:extLst>
+          </p:cNvPr>
+          <p:cNvPicPr>
+            <a:picLocks noChangeAspect="1"/>
+          </p:cNvPicPr>
+          <p:nvPr/>
+        </p:nvPicPr>
+        <p:blipFill>
+          <a:blip r:embed="rId2">
+            <a:extLst>
+              <a:ext uri="{28A0092B-C50C-407E-A947-70E740481C1C}">
+                <a14:useLocalDpi xmlns:a14="http://schemas.microsoft.com/office/drawing/2010/main" val="0"/>
+              </a:ext>
+            </a:extLst>
+          </a:blip>
+          <a:stretch>
+            <a:fillRect/>
+          </a:stretch>
+        </p:blipFill>
+        <p:spPr>
+          <a:xfrm>
+            <a:off x="4954099" y="1343245"/>
+            <a:ext cx="173643" cy="229320"/>
+          </a:xfrm>
+          <a:prstGeom prst="rect">
+            <a:avLst/>
+          </a:prstGeom>
+        </p:spPr>
+      </p:pic>
+      <p:sp>
+        <p:nvSpPr>
+          <p:cNvPr id="9" name="AutoShape 4">
+            <a:extLst>
+              <a:ext uri="{FF2B5EF4-FFF2-40B4-BE49-F238E27FC236}">
+                <a16:creationId xmlns:a16="http://schemas.microsoft.com/office/drawing/2014/main" id="{06ED4964-77CB-C244-9CD6-DD7D7ECC8BB7}"/>
+              </a:ext>
+            </a:extLst>
+          </p:cNvPr>
+          <p:cNvSpPr>
+            <a:spLocks noChangeArrowheads="1"/>
+          </p:cNvSpPr>
+          <p:nvPr/>
+        </p:nvSpPr>
+        <p:spPr bwMode="auto">
+          <a:xfrm>
+            <a:off x="473044" y="1364814"/>
+            <a:ext cx="3333325" cy="529093"/>
+          </a:xfrm>
+          <a:prstGeom prst="roundRect">
+            <a:avLst>
+              <a:gd name="adj" fmla="val 7117"/>
+            </a:avLst>
+          </a:prstGeom>
+          <a:solidFill>
+            <a:schemeClr val="bg1">
+              <a:lumMod val="85000"/>
+            </a:schemeClr>
+          </a:solidFill>
+          <a:ln w="12700">
+            <a:noFill/>
+            <a:prstDash val="dash"/>
+            <a:round/>
+            <a:headEnd/>
+            <a:tailEnd/>
+          </a:ln>
+          <a:effectLst>
+            <a:outerShdw blurRad="50800" dist="38100" dir="5400000" algn="t" rotWithShape="0">
+              <a:prstClr val="black">
+                <a:alpha val="40000"/>
+              </a:prstClr>
+            </a:outerShdw>
+          </a:effectLst>
+        </p:spPr>
+        <p:txBody>
+          <a:bodyPr lIns="0" tIns="0" rIns="0" bIns="0" anchor="b" anchorCtr="1"/>
+          <a:lstStyle/>
+          <a:p>
+            <a:pPr algn="ctr"/>
+            <a:r>
+              <a:rPr lang="en-US" sz="750" dirty="0"/>
+              <a:t>Kafka Cluster</a:t>
+            </a:r>
+          </a:p>
+        </p:txBody>
+      </p:sp>
+      <p:sp>
+        <p:nvSpPr>
+          <p:cNvPr id="10" name="AutoShape 4">
+            <a:extLst>
+              <a:ext uri="{FF2B5EF4-FFF2-40B4-BE49-F238E27FC236}">
+                <a16:creationId xmlns:a16="http://schemas.microsoft.com/office/drawing/2014/main" id="{68BBEC4F-56F3-BA49-9027-6552D383514C}"/>
+              </a:ext>
+            </a:extLst>
+          </p:cNvPr>
+          <p:cNvSpPr>
+            <a:spLocks noChangeArrowheads="1"/>
+          </p:cNvSpPr>
+          <p:nvPr/>
+        </p:nvSpPr>
+        <p:spPr bwMode="auto">
+          <a:xfrm>
+            <a:off x="1874843" y="1985717"/>
+            <a:ext cx="1931526" cy="756859"/>
+          </a:xfrm>
+          <a:prstGeom prst="roundRect">
+            <a:avLst>
+              <a:gd name="adj" fmla="val 7117"/>
+            </a:avLst>
+          </a:prstGeom>
+          <a:noFill/>
+          <a:ln w="12700">
+            <a:solidFill>
+              <a:schemeClr val="accent3"/>
+            </a:solidFill>
+            <a:prstDash val="dash"/>
+            <a:round/>
+            <a:headEnd/>
+            <a:tailEnd/>
+          </a:ln>
+        </p:spPr>
+        <p:txBody>
+          <a:bodyPr lIns="0" tIns="0" rIns="0" bIns="0" anchor="b" anchorCtr="1"/>
+          <a:lstStyle/>
+          <a:p>
+            <a:pPr algn="ctr"/>
+            <a:r>
+              <a:rPr lang="en-US" sz="750" dirty="0"/>
+              <a:t>Kafka Connect Cluster</a:t>
+            </a:r>
+          </a:p>
+        </p:txBody>
+      </p:sp>
+      <p:pic>
+        <p:nvPicPr>
+          <p:cNvPr id="11" name="Picture 10">
+            <a:extLst>
+              <a:ext uri="{FF2B5EF4-FFF2-40B4-BE49-F238E27FC236}">
+                <a16:creationId xmlns:a16="http://schemas.microsoft.com/office/drawing/2014/main" id="{E64E2EC7-6630-C742-BB9C-0EA220F0C451}"/>
+              </a:ext>
+            </a:extLst>
+          </p:cNvPr>
+          <p:cNvPicPr>
+            <a:picLocks noChangeAspect="1"/>
+          </p:cNvPicPr>
+          <p:nvPr/>
+        </p:nvPicPr>
+        <p:blipFill>
+          <a:blip r:embed="rId3"/>
+          <a:stretch>
+            <a:fillRect/>
+          </a:stretch>
+        </p:blipFill>
+        <p:spPr>
+          <a:xfrm>
+            <a:off x="473044" y="2006695"/>
+            <a:ext cx="376238" cy="371475"/>
+          </a:xfrm>
+          <a:prstGeom prst="rect">
+            <a:avLst/>
+          </a:prstGeom>
+        </p:spPr>
+      </p:pic>
+      <p:sp>
+        <p:nvSpPr>
+          <p:cNvPr id="12" name="Rounded Rectangle 11">
+            <a:extLst>
+              <a:ext uri="{FF2B5EF4-FFF2-40B4-BE49-F238E27FC236}">
+                <a16:creationId xmlns:a16="http://schemas.microsoft.com/office/drawing/2014/main" id="{81FDB62D-A052-4F40-BF37-660B409B0781}"/>
+              </a:ext>
+            </a:extLst>
+          </p:cNvPr>
+          <p:cNvSpPr/>
+          <p:nvPr/>
+        </p:nvSpPr>
+        <p:spPr>
+          <a:xfrm>
+            <a:off x="1974858" y="2038791"/>
+            <a:ext cx="1682742" cy="532959"/>
+          </a:xfrm>
+          <a:prstGeom prst="roundRect">
+            <a:avLst/>
+          </a:prstGeom>
+          <a:solidFill>
+            <a:srgbClr val="7030A0">
+              <a:alpha val="35000"/>
+            </a:srgbClr>
+          </a:solidFill>
+          <a:ln>
+            <a:noFill/>
+          </a:ln>
+          <a:effectLst>
+            <a:outerShdw blurRad="50800" dist="38100" dir="5400000" algn="t" rotWithShape="0">
+              <a:prstClr val="black">
+                <a:alpha val="40000"/>
+              </a:prstClr>
+            </a:outerShdw>
+          </a:effectLst>
+        </p:spPr>
+        <p:style>
+          <a:lnRef idx="2">
+            <a:schemeClr val="accent1">
+              <a:shade val="50000"/>
+            </a:schemeClr>
+          </a:lnRef>
+          <a:fillRef idx="1">
+            <a:schemeClr val="accent1"/>
+          </a:fillRef>
+          <a:effectRef idx="0">
+            <a:schemeClr val="accent1"/>
+          </a:effectRef>
+          <a:fontRef idx="minor">
+            <a:schemeClr val="lt1"/>
+          </a:fontRef>
+        </p:style>
+        <p:txBody>
+          <a:bodyPr rtlCol="0" anchor="t"/>
+          <a:lstStyle/>
+          <a:p>
+            <a:pPr algn="ctr" defTabSz="514350"/>
+            <a:r>
+              <a:rPr lang="en-US" sz="750">
+                <a:solidFill>
+                  <a:prstClr val="white"/>
+                </a:solidFill>
+                <a:latin typeface="Arial"/>
+              </a:rPr>
+              <a:t>Mirror Maker 2.0</a:t>
+            </a:r>
+          </a:p>
+        </p:txBody>
+      </p:sp>
+      <p:sp>
+        <p:nvSpPr>
+          <p:cNvPr id="16" name="AutoShape 4">
+            <a:extLst>
+              <a:ext uri="{FF2B5EF4-FFF2-40B4-BE49-F238E27FC236}">
+                <a16:creationId xmlns:a16="http://schemas.microsoft.com/office/drawing/2014/main" id="{46132ABB-C97C-584F-9405-C43BC31330E7}"/>
+              </a:ext>
+            </a:extLst>
+          </p:cNvPr>
+          <p:cNvSpPr>
+            <a:spLocks noChangeArrowheads="1"/>
+          </p:cNvSpPr>
+          <p:nvPr/>
+        </p:nvSpPr>
+        <p:spPr bwMode="auto">
+          <a:xfrm>
+            <a:off x="473044" y="1965516"/>
+            <a:ext cx="1327181" cy="606234"/>
+          </a:xfrm>
+          <a:prstGeom prst="roundRect">
+            <a:avLst>
+              <a:gd name="adj" fmla="val 7117"/>
+            </a:avLst>
+          </a:prstGeom>
+          <a:noFill/>
+          <a:ln w="12700">
+            <a:solidFill>
+              <a:schemeClr val="accent3"/>
+            </a:solidFill>
+            <a:prstDash val="dash"/>
+            <a:round/>
+            <a:headEnd/>
+            <a:tailEnd/>
+          </a:ln>
+        </p:spPr>
+        <p:txBody>
+          <a:bodyPr lIns="0" tIns="0" rIns="0" bIns="0" anchor="b" anchorCtr="1"/>
+          <a:lstStyle/>
+          <a:p>
+            <a:pPr algn="ctr"/>
+            <a:r>
+              <a:rPr lang="en-US" sz="750" dirty="0"/>
+              <a:t>Strimzi Operators</a:t>
+            </a:r>
+          </a:p>
+        </p:txBody>
+      </p:sp>
+      <p:pic>
+        <p:nvPicPr>
+          <p:cNvPr id="17" name="Picture 16">
+            <a:extLst>
+              <a:ext uri="{FF2B5EF4-FFF2-40B4-BE49-F238E27FC236}">
+                <a16:creationId xmlns:a16="http://schemas.microsoft.com/office/drawing/2014/main" id="{5AF3EA7F-ADF8-8D4D-AF71-A53109AD3A0B}"/>
+              </a:ext>
+            </a:extLst>
+          </p:cNvPr>
+          <p:cNvPicPr>
+            <a:picLocks noChangeAspect="1"/>
+          </p:cNvPicPr>
+          <p:nvPr/>
+        </p:nvPicPr>
+        <p:blipFill>
+          <a:blip r:embed="rId4"/>
+          <a:stretch>
+            <a:fillRect/>
+          </a:stretch>
+        </p:blipFill>
+        <p:spPr>
+          <a:xfrm>
+            <a:off x="606629" y="4016281"/>
+            <a:ext cx="441419" cy="441419"/>
+          </a:xfrm>
+          <a:prstGeom prst="rect">
+            <a:avLst/>
+          </a:prstGeom>
+        </p:spPr>
+      </p:pic>
+      <p:sp>
+        <p:nvSpPr>
+          <p:cNvPr id="18" name="AutoShape 4">
+            <a:extLst>
+              <a:ext uri="{FF2B5EF4-FFF2-40B4-BE49-F238E27FC236}">
+                <a16:creationId xmlns:a16="http://schemas.microsoft.com/office/drawing/2014/main" id="{1A70F136-F70D-A140-B177-FC17A525B768}"/>
+              </a:ext>
+            </a:extLst>
+          </p:cNvPr>
+          <p:cNvSpPr>
+            <a:spLocks noChangeArrowheads="1"/>
+          </p:cNvSpPr>
+          <p:nvPr/>
+        </p:nvSpPr>
+        <p:spPr bwMode="auto">
+          <a:xfrm>
+            <a:off x="606629" y="3952057"/>
+            <a:ext cx="1373707" cy="586032"/>
+          </a:xfrm>
+          <a:prstGeom prst="roundRect">
+            <a:avLst>
+              <a:gd name="adj" fmla="val 7117"/>
+            </a:avLst>
+          </a:prstGeom>
+          <a:noFill/>
+          <a:ln w="15875">
+            <a:solidFill>
+              <a:srgbClr val="FF7D54"/>
+            </a:solidFill>
+            <a:prstDash val="dash"/>
+            <a:round/>
+            <a:headEnd/>
+            <a:tailEnd/>
+          </a:ln>
+        </p:spPr>
+        <p:txBody>
+          <a:bodyPr lIns="0" tIns="0" rIns="0" bIns="0" anchor="b" anchorCtr="1"/>
+          <a:lstStyle/>
+          <a:p>
+            <a:pPr algn="ctr"/>
+            <a:r>
+              <a:rPr lang="en-US" sz="750" dirty="0"/>
+              <a:t>Grafana pod</a:t>
+            </a:r>
+          </a:p>
+        </p:txBody>
+      </p:sp>
+      <p:pic>
+        <p:nvPicPr>
+          <p:cNvPr id="19" name="Picture 18">
+            <a:extLst>
+              <a:ext uri="{FF2B5EF4-FFF2-40B4-BE49-F238E27FC236}">
+                <a16:creationId xmlns:a16="http://schemas.microsoft.com/office/drawing/2014/main" id="{FDC25DF4-6FBC-FC4A-97DF-9EB78AC1658C}"/>
+              </a:ext>
+            </a:extLst>
+          </p:cNvPr>
+          <p:cNvPicPr>
+            <a:picLocks noChangeAspect="1"/>
+          </p:cNvPicPr>
+          <p:nvPr/>
+        </p:nvPicPr>
+        <p:blipFill>
+          <a:blip r:embed="rId5"/>
+          <a:stretch>
+            <a:fillRect/>
+          </a:stretch>
+        </p:blipFill>
+        <p:spPr>
+          <a:xfrm>
+            <a:off x="395857" y="3132825"/>
+            <a:ext cx="586032" cy="586032"/>
+          </a:xfrm>
+          <a:prstGeom prst="rect">
+            <a:avLst/>
+          </a:prstGeom>
+        </p:spPr>
+      </p:pic>
+      <p:sp>
+        <p:nvSpPr>
+          <p:cNvPr id="20" name="AutoShape 4">
+            <a:extLst>
+              <a:ext uri="{FF2B5EF4-FFF2-40B4-BE49-F238E27FC236}">
+                <a16:creationId xmlns:a16="http://schemas.microsoft.com/office/drawing/2014/main" id="{3A86148D-8831-CD4A-9297-FE01CF360EF1}"/>
+              </a:ext>
+            </a:extLst>
+          </p:cNvPr>
+          <p:cNvSpPr>
+            <a:spLocks noChangeArrowheads="1"/>
+          </p:cNvSpPr>
+          <p:nvPr/>
+        </p:nvSpPr>
+        <p:spPr bwMode="auto">
+          <a:xfrm>
+            <a:off x="454227" y="2834387"/>
+            <a:ext cx="3352142" cy="1085324"/>
+          </a:xfrm>
+          <a:prstGeom prst="roundRect">
+            <a:avLst>
+              <a:gd name="adj" fmla="val 7117"/>
+            </a:avLst>
+          </a:prstGeom>
+          <a:noFill/>
+          <a:ln w="15875">
+            <a:solidFill>
+              <a:srgbClr val="FF7D54"/>
+            </a:solidFill>
+            <a:prstDash val="dash"/>
+            <a:round/>
+            <a:headEnd/>
+            <a:tailEnd/>
+          </a:ln>
+        </p:spPr>
+        <p:txBody>
+          <a:bodyPr lIns="0" tIns="0" rIns="0" bIns="0" anchor="b" anchorCtr="1"/>
+          <a:lstStyle/>
+          <a:p>
+            <a:pPr algn="ctr"/>
+            <a:r>
+              <a:rPr lang="en-US" sz="750" dirty="0">
+                <a:solidFill>
+                  <a:srgbClr val="0000FF"/>
+                </a:solidFill>
+              </a:rPr>
+              <a:t>Prometheus server</a:t>
+            </a:r>
+          </a:p>
+        </p:txBody>
+      </p:sp>
+      <p:sp>
+        <p:nvSpPr>
+          <p:cNvPr id="21" name="Rectangle 20">
+            <a:extLst>
+              <a:ext uri="{FF2B5EF4-FFF2-40B4-BE49-F238E27FC236}">
+                <a16:creationId xmlns:a16="http://schemas.microsoft.com/office/drawing/2014/main" id="{076D9C7B-6860-ED42-A6BF-7B972A6CEEAF}"/>
+              </a:ext>
+            </a:extLst>
+          </p:cNvPr>
+          <p:cNvSpPr/>
+          <p:nvPr/>
+        </p:nvSpPr>
+        <p:spPr>
+          <a:xfrm>
+            <a:off x="2226244" y="2278153"/>
+            <a:ext cx="1178989" cy="203645"/>
+          </a:xfrm>
+          <a:prstGeom prst="rect">
+            <a:avLst/>
+          </a:prstGeom>
+          <a:solidFill>
+            <a:schemeClr val="bg1"/>
+          </a:solidFill>
+          <a:ln>
+            <a:noFill/>
+          </a:ln>
+        </p:spPr>
+        <p:style>
+          <a:lnRef idx="2">
+            <a:schemeClr val="accent1">
+              <a:shade val="50000"/>
+            </a:schemeClr>
+          </a:lnRef>
+          <a:fillRef idx="1">
+            <a:schemeClr val="accent1"/>
+          </a:fillRef>
+          <a:effectRef idx="0">
+            <a:schemeClr val="accent1"/>
+          </a:effectRef>
+          <a:fontRef idx="minor">
+            <a:schemeClr val="lt1"/>
+          </a:fontRef>
+        </p:style>
+        <p:txBody>
+          <a:bodyPr rtlCol="0" anchor="ctr"/>
+          <a:lstStyle/>
+          <a:p>
+            <a:pPr marL="0" marR="0" indent="0" algn="ctr" defTabSz="685800" rtl="0" eaLnBrk="1" fontAlgn="auto" latinLnBrk="0" hangingPunct="1">
+              <a:lnSpc>
+                <a:spcPct val="100000"/>
+              </a:lnSpc>
+              <a:spcBef>
+                <a:spcPts val="0"/>
+              </a:spcBef>
+              <a:spcAft>
+                <a:spcPts val="0"/>
+              </a:spcAft>
+              <a:buClrTx/>
+              <a:buSzTx/>
+              <a:buFontTx/>
+              <a:buNone/>
+              <a:tabLst/>
+            </a:pPr>
+            <a:r>
+              <a:rPr kumimoji="0" lang="en-US" sz="1000" b="0" i="0" u="none" strike="noStrike" kern="1200" cap="none" spc="0" normalizeH="0" baseline="0" noProof="0" dirty="0">
+                <a:ln>
+                  <a:noFill/>
+                </a:ln>
+                <a:solidFill>
+                  <a:srgbClr val="0000FF"/>
+                </a:solidFill>
+                <a:effectLst/>
+                <a:uLnTx/>
+                <a:uFillTx/>
+                <a:latin typeface="Arial"/>
+                <a:ea typeface="+mn-ea"/>
+                <a:cs typeface="+mn-cs"/>
+              </a:rPr>
+              <a:t>JMX Exporter</a:t>
+            </a:r>
+            <a:endParaRPr kumimoji="0" sz="1000" b="0" i="0" u="none" strike="noStrike" kern="1200" cap="none" spc="0" normalizeH="0" baseline="0" noProof="0" dirty="0">
+              <a:ln>
+                <a:noFill/>
+              </a:ln>
+              <a:solidFill>
+                <a:srgbClr val="0000FF"/>
+              </a:solidFill>
+              <a:effectLst/>
+              <a:uLnTx/>
+              <a:uFillTx/>
+              <a:latin typeface="Arial"/>
+              <a:ea typeface="+mn-ea"/>
+              <a:cs typeface="+mn-cs"/>
+            </a:endParaRPr>
+          </a:p>
+        </p:txBody>
+      </p:sp>
+      <p:sp>
+        <p:nvSpPr>
+          <p:cNvPr id="22" name="Rectangle 21">
+            <a:extLst>
+              <a:ext uri="{FF2B5EF4-FFF2-40B4-BE49-F238E27FC236}">
+                <a16:creationId xmlns:a16="http://schemas.microsoft.com/office/drawing/2014/main" id="{A6091AB6-07D1-734B-907C-5A867E67B5EA}"/>
+              </a:ext>
+            </a:extLst>
+          </p:cNvPr>
+          <p:cNvSpPr/>
+          <p:nvPr/>
+        </p:nvSpPr>
+        <p:spPr>
+          <a:xfrm>
+            <a:off x="2151498" y="3373740"/>
+            <a:ext cx="1397824" cy="340039"/>
+          </a:xfrm>
+          <a:prstGeom prst="rect">
+            <a:avLst/>
+          </a:prstGeom>
+          <a:solidFill>
+            <a:srgbClr val="FFC000">
+              <a:alpha val="50000"/>
+            </a:srgbClr>
+          </a:solidFill>
+          <a:ln>
+            <a:noFill/>
+          </a:ln>
+          <a:effectLst>
+            <a:outerShdw blurRad="50800" dist="38100" dir="5400000" algn="t" rotWithShape="0">
+              <a:prstClr val="black">
+                <a:alpha val="40000"/>
+              </a:prstClr>
+            </a:outerShdw>
+          </a:effectLst>
+        </p:spPr>
+        <p:style>
+          <a:lnRef idx="2">
+            <a:schemeClr val="accent1">
+              <a:shade val="50000"/>
+            </a:schemeClr>
+          </a:lnRef>
+          <a:fillRef idx="1">
+            <a:schemeClr val="accent1"/>
+          </a:fillRef>
+          <a:effectRef idx="0">
+            <a:schemeClr val="accent1"/>
+          </a:effectRef>
+          <a:fontRef idx="minor">
+            <a:schemeClr val="lt1"/>
+          </a:fontRef>
+        </p:style>
+        <p:txBody>
+          <a:bodyPr rtlCol="0" anchor="ctr"/>
+          <a:lstStyle/>
+          <a:p>
+            <a:pPr marL="0" marR="0" indent="0" algn="ctr" defTabSz="685800" rtl="0" eaLnBrk="1" fontAlgn="auto" latinLnBrk="0" hangingPunct="1">
+              <a:lnSpc>
+                <a:spcPct val="100000"/>
+              </a:lnSpc>
+              <a:spcBef>
+                <a:spcPts val="0"/>
+              </a:spcBef>
+              <a:spcAft>
+                <a:spcPts val="0"/>
+              </a:spcAft>
+              <a:buClrTx/>
+              <a:buSzTx/>
+              <a:buFontTx/>
+              <a:buNone/>
+              <a:tabLst/>
+            </a:pPr>
+            <a:r>
+              <a:rPr lang="en-US" sz="1000" dirty="0">
+                <a:solidFill>
+                  <a:srgbClr val="0000FF"/>
+                </a:solidFill>
+                <a:latin typeface="Arial"/>
+              </a:rPr>
+              <a:t>Prometheus-server</a:t>
+            </a:r>
+            <a:endParaRPr kumimoji="0" sz="1000" b="0" i="0" u="none" strike="noStrike" kern="1200" cap="none" spc="0" normalizeH="0" baseline="0" noProof="0" dirty="0">
+              <a:ln>
+                <a:noFill/>
+              </a:ln>
+              <a:solidFill>
+                <a:srgbClr val="0000FF"/>
+              </a:solidFill>
+              <a:effectLst/>
+              <a:uLnTx/>
+              <a:uFillTx/>
+              <a:latin typeface="Arial"/>
+              <a:ea typeface="+mn-ea"/>
+              <a:cs typeface="+mn-cs"/>
+            </a:endParaRPr>
+          </a:p>
+        </p:txBody>
+      </p:sp>
+      <p:sp>
+        <p:nvSpPr>
+          <p:cNvPr id="23" name="Rectangle 22">
+            <a:extLst>
+              <a:ext uri="{FF2B5EF4-FFF2-40B4-BE49-F238E27FC236}">
+                <a16:creationId xmlns:a16="http://schemas.microsoft.com/office/drawing/2014/main" id="{6CC001E1-112D-534E-AD5E-9A88AE633D40}"/>
+              </a:ext>
+            </a:extLst>
+          </p:cNvPr>
+          <p:cNvSpPr/>
+          <p:nvPr/>
+        </p:nvSpPr>
+        <p:spPr>
+          <a:xfrm>
+            <a:off x="849283" y="3228398"/>
+            <a:ext cx="950942" cy="290684"/>
+          </a:xfrm>
+          <a:prstGeom prst="rect">
+            <a:avLst/>
+          </a:prstGeom>
+          <a:ln>
+            <a:noFill/>
+          </a:ln>
+        </p:spPr>
+        <p:style>
+          <a:lnRef idx="2">
+            <a:schemeClr val="accent1">
+              <a:shade val="50000"/>
+            </a:schemeClr>
+          </a:lnRef>
+          <a:fillRef idx="1">
+            <a:schemeClr val="accent1"/>
+          </a:fillRef>
+          <a:effectRef idx="0">
+            <a:schemeClr val="accent1"/>
+          </a:effectRef>
+          <a:fontRef idx="minor">
+            <a:schemeClr val="lt1"/>
+          </a:fontRef>
+        </p:style>
+        <p:txBody>
+          <a:bodyPr rtlCol="0" anchor="ctr"/>
+          <a:lstStyle/>
+          <a:p>
+            <a:pPr marL="0" marR="0" indent="0" algn="ctr" defTabSz="685800" rtl="0" eaLnBrk="1" fontAlgn="auto" latinLnBrk="0" hangingPunct="1">
+              <a:lnSpc>
+                <a:spcPct val="100000"/>
+              </a:lnSpc>
+              <a:spcBef>
+                <a:spcPts val="0"/>
+              </a:spcBef>
+              <a:spcAft>
+                <a:spcPts val="0"/>
+              </a:spcAft>
+              <a:buClrTx/>
+              <a:buSzTx/>
+              <a:buFontTx/>
+              <a:buNone/>
+              <a:tabLst/>
+            </a:pPr>
+            <a:r>
+              <a:rPr lang="en-US" sz="900" dirty="0">
+                <a:solidFill>
+                  <a:prstClr val="white"/>
+                </a:solidFill>
+                <a:latin typeface="Arial"/>
+              </a:rPr>
+              <a:t>Prometheus- operator</a:t>
+            </a:r>
+            <a:endParaRPr kumimoji="0" sz="900" b="0" i="0" u="none" strike="noStrike" kern="1200" cap="none" spc="0" normalizeH="0" baseline="0" noProof="0" dirty="0">
+              <a:ln>
+                <a:noFill/>
+              </a:ln>
+              <a:solidFill>
+                <a:prstClr val="white"/>
+              </a:solidFill>
+              <a:effectLst/>
+              <a:uLnTx/>
+              <a:uFillTx/>
+              <a:latin typeface="Arial"/>
+              <a:ea typeface="+mn-ea"/>
+              <a:cs typeface="+mn-cs"/>
+            </a:endParaRPr>
+          </a:p>
+        </p:txBody>
+      </p:sp>
+      <p:pic>
+        <p:nvPicPr>
+          <p:cNvPr id="24" name="Picture 23">
+            <a:extLst>
+              <a:ext uri="{FF2B5EF4-FFF2-40B4-BE49-F238E27FC236}">
+                <a16:creationId xmlns:a16="http://schemas.microsoft.com/office/drawing/2014/main" id="{DEB5148B-58E6-1346-821C-FE8CF1F886CB}"/>
+              </a:ext>
+            </a:extLst>
+          </p:cNvPr>
+          <p:cNvPicPr>
+            <a:picLocks noChangeAspect="1"/>
+          </p:cNvPicPr>
+          <p:nvPr/>
+        </p:nvPicPr>
+        <p:blipFill>
+          <a:blip r:embed="rId6"/>
+          <a:stretch>
+            <a:fillRect/>
+          </a:stretch>
+        </p:blipFill>
+        <p:spPr>
+          <a:xfrm>
+            <a:off x="227789" y="4467932"/>
+            <a:ext cx="261023" cy="238649"/>
+          </a:xfrm>
+          <a:prstGeom prst="rect">
+            <a:avLst/>
+          </a:prstGeom>
+        </p:spPr>
+      </p:pic>
+      <p:sp>
+        <p:nvSpPr>
+          <p:cNvPr id="25" name="Rectangle 24">
+            <a:extLst>
+              <a:ext uri="{FF2B5EF4-FFF2-40B4-BE49-F238E27FC236}">
+                <a16:creationId xmlns:a16="http://schemas.microsoft.com/office/drawing/2014/main" id="{B65DE0D7-1E84-164A-8728-EADB34EDB8AE}"/>
+              </a:ext>
+            </a:extLst>
+          </p:cNvPr>
+          <p:cNvSpPr/>
+          <p:nvPr/>
+        </p:nvSpPr>
+        <p:spPr>
+          <a:xfrm>
+            <a:off x="2159800" y="2931971"/>
+            <a:ext cx="1397824" cy="340039"/>
+          </a:xfrm>
+          <a:prstGeom prst="rect">
+            <a:avLst/>
+          </a:prstGeom>
+          <a:solidFill>
+            <a:srgbClr val="FFC000">
+              <a:alpha val="50000"/>
+            </a:srgbClr>
+          </a:solidFill>
+          <a:ln>
+            <a:noFill/>
+          </a:ln>
+          <a:effectLst>
+            <a:outerShdw blurRad="50800" dist="38100" dir="5400000" algn="t" rotWithShape="0">
+              <a:prstClr val="black">
+                <a:alpha val="40000"/>
+              </a:prstClr>
+            </a:outerShdw>
+          </a:effectLst>
+        </p:spPr>
+        <p:style>
+          <a:lnRef idx="2">
+            <a:schemeClr val="accent1">
+              <a:shade val="50000"/>
+            </a:schemeClr>
+          </a:lnRef>
+          <a:fillRef idx="1">
+            <a:schemeClr val="accent1"/>
+          </a:fillRef>
+          <a:effectRef idx="0">
+            <a:schemeClr val="accent1"/>
+          </a:effectRef>
+          <a:fontRef idx="minor">
+            <a:schemeClr val="lt1"/>
+          </a:fontRef>
+        </p:style>
+        <p:txBody>
+          <a:bodyPr rtlCol="0" anchor="ctr"/>
+          <a:lstStyle/>
+          <a:p>
+            <a:pPr marL="0" marR="0" indent="0" algn="ctr" defTabSz="685800" rtl="0" eaLnBrk="1" fontAlgn="auto" latinLnBrk="0" hangingPunct="1">
+              <a:lnSpc>
+                <a:spcPct val="100000"/>
+              </a:lnSpc>
+              <a:spcBef>
+                <a:spcPts val="0"/>
+              </a:spcBef>
+              <a:spcAft>
+                <a:spcPts val="0"/>
+              </a:spcAft>
+              <a:buClrTx/>
+              <a:buSzTx/>
+              <a:buFontTx/>
+              <a:buNone/>
+              <a:tabLst/>
+            </a:pPr>
+            <a:r>
+              <a:rPr kumimoji="0" lang="en-US" sz="1000" b="0" i="0" u="none" strike="noStrike" kern="1200" cap="none" spc="0" normalizeH="0" baseline="0" noProof="0" dirty="0">
+                <a:ln>
+                  <a:noFill/>
+                </a:ln>
+                <a:solidFill>
+                  <a:srgbClr val="0000FF"/>
+                </a:solidFill>
+                <a:effectLst/>
+                <a:uLnTx/>
+                <a:uFillTx/>
+                <a:latin typeface="Arial"/>
+                <a:ea typeface="+mn-ea"/>
+                <a:cs typeface="+mn-cs"/>
+              </a:rPr>
+              <a:t>Service Monitor</a:t>
+            </a:r>
+            <a:endParaRPr kumimoji="0" sz="1000" b="0" i="0" u="none" strike="noStrike" kern="1200" cap="none" spc="0" normalizeH="0" baseline="0" noProof="0" dirty="0">
+              <a:ln>
+                <a:noFill/>
+              </a:ln>
+              <a:solidFill>
+                <a:srgbClr val="0000FF"/>
+              </a:solidFill>
+              <a:effectLst/>
+              <a:uLnTx/>
+              <a:uFillTx/>
+              <a:latin typeface="Arial"/>
+              <a:ea typeface="+mn-ea"/>
+              <a:cs typeface="+mn-cs"/>
+            </a:endParaRPr>
+          </a:p>
+        </p:txBody>
+      </p:sp>
+    </p:spTree>
+    <p:extLst>
+      <p:ext uri="{BB962C8B-B14F-4D97-AF65-F5344CB8AC3E}">
+        <p14:creationId xmlns:p14="http://schemas.microsoft.com/office/powerpoint/2010/main" val="1287331392"/>
       </p:ext>
     </p:extLst>
   </p:cSld>

</xml_diff>

<commit_message>
Deployed a87ffa9 with MkDocs version: 1.0.4
</commit_message>
<xml_diff>
--- a/mm2-diagrams.pptx
+++ b/mm2-diagrams.pptx
@@ -6,10 +6,10 @@
     <p:sldMasterId id="2147483943" r:id="rId2"/>
   </p:sldMasterIdLst>
   <p:notesMasterIdLst>
-    <p:notesMasterId r:id="rId23"/>
+    <p:notesMasterId r:id="rId24"/>
   </p:notesMasterIdLst>
   <p:handoutMasterIdLst>
-    <p:handoutMasterId r:id="rId24"/>
+    <p:handoutMasterId r:id="rId25"/>
   </p:handoutMasterIdLst>
   <p:sldIdLst>
     <p:sldId id="141169016" r:id="rId3"/>
@@ -31,7 +31,8 @@
     <p:sldId id="141169026" r:id="rId19"/>
     <p:sldId id="141169025" r:id="rId20"/>
     <p:sldId id="141169027" r:id="rId21"/>
-    <p:sldId id="141169017" r:id="rId22"/>
+    <p:sldId id="141169029" r:id="rId22"/>
+    <p:sldId id="141169017" r:id="rId23"/>
   </p:sldIdLst>
   <p:sldSz cx="9144000" cy="5143500" type="screen16x9"/>
   <p:notesSz cx="6858000" cy="9144000"/>
@@ -234,7 +235,7 @@
           <a:p>
             <a:fld id="{43B1B1F9-D0CB-FF4D-BEE0-BED1F1FDA196}" type="datetimeFigureOut">
               <a:rPr lang="en-US" smtClean="0"/>
-              <a:t>4/21/20</a:t>
+              <a:t>4/24/20</a:t>
             </a:fld>
             <a:endParaRPr lang="en-US"/>
           </a:p>
@@ -399,7 +400,7 @@
           <a:p>
             <a:fld id="{26BE012A-D992-5D42-B86E-AA2BC0764EE1}" type="datetimeFigureOut">
               <a:rPr lang="en-US" smtClean="0"/>
-              <a:t>4/21/20</a:t>
+              <a:t>4/24/20</a:t>
             </a:fld>
             <a:endParaRPr lang="en-US"/>
           </a:p>
@@ -28251,8 +28252,8 @@
         </p:nvSpPr>
         <p:spPr>
           <a:xfrm>
-            <a:off x="2691871" y="1400519"/>
-            <a:ext cx="3731384" cy="3057182"/>
+            <a:off x="1737772" y="1400519"/>
+            <a:ext cx="4685483" cy="3057182"/>
           </a:xfrm>
           <a:prstGeom prst="roundRect">
             <a:avLst>
@@ -28689,6 +28690,211 @@
               <a:t>metrics</a:t>
             </a:r>
             <a:endParaRPr sz="800" dirty="0"/>
+          </a:p>
+        </p:txBody>
+      </p:sp>
+      <p:pic>
+        <p:nvPicPr>
+          <p:cNvPr id="23" name="Picture 22">
+            <a:extLst>
+              <a:ext uri="{FF2B5EF4-FFF2-40B4-BE49-F238E27FC236}">
+                <a16:creationId xmlns:a16="http://schemas.microsoft.com/office/drawing/2014/main" id="{D82FBD58-B726-AB49-ADA0-33691F551FC1}"/>
+              </a:ext>
+            </a:extLst>
+          </p:cNvPr>
+          <p:cNvPicPr>
+            <a:picLocks noChangeAspect="1"/>
+          </p:cNvPicPr>
+          <p:nvPr/>
+        </p:nvPicPr>
+        <p:blipFill>
+          <a:blip r:embed="rId2"/>
+          <a:stretch>
+            <a:fillRect/>
+          </a:stretch>
+        </p:blipFill>
+        <p:spPr>
+          <a:xfrm>
+            <a:off x="1857615" y="1512420"/>
+            <a:ext cx="441419" cy="441419"/>
+          </a:xfrm>
+          <a:prstGeom prst="rect">
+            <a:avLst/>
+          </a:prstGeom>
+        </p:spPr>
+      </p:pic>
+      <p:pic>
+        <p:nvPicPr>
+          <p:cNvPr id="24" name="Picture 23">
+            <a:extLst>
+              <a:ext uri="{FF2B5EF4-FFF2-40B4-BE49-F238E27FC236}">
+                <a16:creationId xmlns:a16="http://schemas.microsoft.com/office/drawing/2014/main" id="{3D7345F2-6378-424A-9A35-13E2319FBD8D}"/>
+              </a:ext>
+            </a:extLst>
+          </p:cNvPr>
+          <p:cNvPicPr>
+            <a:picLocks noChangeAspect="1"/>
+          </p:cNvPicPr>
+          <p:nvPr/>
+        </p:nvPicPr>
+        <p:blipFill>
+          <a:blip r:embed="rId3"/>
+          <a:stretch>
+            <a:fillRect/>
+          </a:stretch>
+        </p:blipFill>
+        <p:spPr>
+          <a:xfrm>
+            <a:off x="1653871" y="3480155"/>
+            <a:ext cx="586032" cy="586032"/>
+          </a:xfrm>
+          <a:prstGeom prst="rect">
+            <a:avLst/>
+          </a:prstGeom>
+        </p:spPr>
+      </p:pic>
+      <p:sp>
+        <p:nvSpPr>
+          <p:cNvPr id="25" name="Rectangle 24">
+            <a:extLst>
+              <a:ext uri="{FF2B5EF4-FFF2-40B4-BE49-F238E27FC236}">
+                <a16:creationId xmlns:a16="http://schemas.microsoft.com/office/drawing/2014/main" id="{B65B1B0D-47BB-B547-AFBC-E8EF7A781B2A}"/>
+              </a:ext>
+            </a:extLst>
+          </p:cNvPr>
+          <p:cNvSpPr/>
+          <p:nvPr/>
+        </p:nvSpPr>
+        <p:spPr>
+          <a:xfrm>
+            <a:off x="1946524" y="3633839"/>
+            <a:ext cx="1397824" cy="340039"/>
+          </a:xfrm>
+          <a:prstGeom prst="rect">
+            <a:avLst/>
+          </a:prstGeom>
+          <a:solidFill>
+            <a:srgbClr val="FFC000">
+              <a:alpha val="50000"/>
+            </a:srgbClr>
+          </a:solidFill>
+          <a:ln>
+            <a:noFill/>
+          </a:ln>
+          <a:effectLst>
+            <a:outerShdw blurRad="50800" dist="38100" dir="5400000" algn="t" rotWithShape="0">
+              <a:prstClr val="black">
+                <a:alpha val="40000"/>
+              </a:prstClr>
+            </a:outerShdw>
+          </a:effectLst>
+        </p:spPr>
+        <p:style>
+          <a:lnRef idx="2">
+            <a:schemeClr val="accent1">
+              <a:shade val="50000"/>
+            </a:schemeClr>
+          </a:lnRef>
+          <a:fillRef idx="1">
+            <a:schemeClr val="accent1"/>
+          </a:fillRef>
+          <a:effectRef idx="0">
+            <a:schemeClr val="accent1"/>
+          </a:effectRef>
+          <a:fontRef idx="minor">
+            <a:schemeClr val="lt1"/>
+          </a:fontRef>
+        </p:style>
+        <p:txBody>
+          <a:bodyPr rtlCol="0" anchor="ctr"/>
+          <a:lstStyle/>
+          <a:p>
+            <a:pPr marL="0" marR="0" indent="0" algn="ctr" defTabSz="685800" rtl="0" eaLnBrk="1" fontAlgn="auto" latinLnBrk="0" hangingPunct="1">
+              <a:lnSpc>
+                <a:spcPct val="100000"/>
+              </a:lnSpc>
+              <a:spcBef>
+                <a:spcPts val="0"/>
+              </a:spcBef>
+              <a:spcAft>
+                <a:spcPts val="0"/>
+              </a:spcAft>
+              <a:buClrTx/>
+              <a:buSzTx/>
+              <a:buFontTx/>
+              <a:buNone/>
+              <a:tabLst/>
+            </a:pPr>
+            <a:r>
+              <a:rPr lang="en-US" sz="1000" dirty="0">
+                <a:solidFill>
+                  <a:srgbClr val="0000FF"/>
+                </a:solidFill>
+                <a:latin typeface="Arial"/>
+              </a:rPr>
+              <a:t>Prometheus-server</a:t>
+            </a:r>
+            <a:endParaRPr kumimoji="0" sz="1000" b="0" i="0" u="none" strike="noStrike" kern="1200" cap="none" spc="0" normalizeH="0" baseline="0" noProof="0" dirty="0">
+              <a:ln>
+                <a:noFill/>
+              </a:ln>
+              <a:solidFill>
+                <a:srgbClr val="0000FF"/>
+              </a:solidFill>
+              <a:effectLst/>
+              <a:uLnTx/>
+              <a:uFillTx/>
+              <a:latin typeface="Arial"/>
+              <a:ea typeface="+mn-ea"/>
+              <a:cs typeface="+mn-cs"/>
+            </a:endParaRPr>
+          </a:p>
+        </p:txBody>
+      </p:sp>
+      <p:sp>
+        <p:nvSpPr>
+          <p:cNvPr id="26" name="AutoShape 4">
+            <a:extLst>
+              <a:ext uri="{FF2B5EF4-FFF2-40B4-BE49-F238E27FC236}">
+                <a16:creationId xmlns:a16="http://schemas.microsoft.com/office/drawing/2014/main" id="{E5540552-8680-C74F-ADCB-3F5D62B88778}"/>
+              </a:ext>
+            </a:extLst>
+          </p:cNvPr>
+          <p:cNvSpPr>
+            <a:spLocks noChangeArrowheads="1"/>
+          </p:cNvSpPr>
+          <p:nvPr/>
+        </p:nvSpPr>
+        <p:spPr bwMode="auto">
+          <a:xfrm>
+            <a:off x="1796739" y="1448384"/>
+            <a:ext cx="1373707" cy="586032"/>
+          </a:xfrm>
+          <a:prstGeom prst="roundRect">
+            <a:avLst>
+              <a:gd name="adj" fmla="val 7117"/>
+            </a:avLst>
+          </a:prstGeom>
+          <a:noFill/>
+          <a:ln w="15875">
+            <a:solidFill>
+              <a:srgbClr val="FF7D54"/>
+            </a:solidFill>
+            <a:prstDash val="dash"/>
+            <a:round/>
+            <a:headEnd/>
+            <a:tailEnd/>
+          </a:ln>
+        </p:spPr>
+        <p:txBody>
+          <a:bodyPr lIns="0" tIns="0" rIns="0" bIns="0" anchor="b" anchorCtr="1"/>
+          <a:lstStyle/>
+          <a:p>
+            <a:pPr algn="ctr"/>
+            <a:r>
+              <a:rPr lang="en-US" sz="750" dirty="0"/>
+              <a:t>Grafana pod</a:t>
+            </a:r>
           </a:p>
         </p:txBody>
       </p:sp>
@@ -31141,7 +31347,7 @@
           <p:cNvPr id="2" name="Title 1">
             <a:extLst>
               <a:ext uri="{FF2B5EF4-FFF2-40B4-BE49-F238E27FC236}">
-                <a16:creationId xmlns:a16="http://schemas.microsoft.com/office/drawing/2014/main" id="{58169065-201E-5F42-BB75-6EA30E0A8D38}"/>
+                <a16:creationId xmlns:a16="http://schemas.microsoft.com/office/drawing/2014/main" id="{7DD0824B-9D29-3747-BFBA-533EF2DF6980}"/>
               </a:ext>
             </a:extLst>
           </p:cNvPr>
@@ -31159,6 +31365,3447 @@
           <a:p>
             <a:r>
               <a:rPr lang="en-US" dirty="0"/>
+              <a:t>Test Environment: Bidirectional</a:t>
+            </a:r>
+          </a:p>
+        </p:txBody>
+      </p:sp>
+      <p:sp>
+        <p:nvSpPr>
+          <p:cNvPr id="4" name="Slide Number Placeholder 3">
+            <a:extLst>
+              <a:ext uri="{FF2B5EF4-FFF2-40B4-BE49-F238E27FC236}">
+                <a16:creationId xmlns:a16="http://schemas.microsoft.com/office/drawing/2014/main" id="{223BEDBE-0C1E-504D-8318-92C91D8D607F}"/>
+              </a:ext>
+            </a:extLst>
+          </p:cNvPr>
+          <p:cNvSpPr>
+            <a:spLocks noGrp="1"/>
+          </p:cNvSpPr>
+          <p:nvPr>
+            <p:ph type="sldNum" sz="quarter" idx="12"/>
+          </p:nvPr>
+        </p:nvSpPr>
+        <p:spPr>
+          <a:xfrm>
+            <a:off x="8537409" y="4831164"/>
+            <a:ext cx="400384" cy="273844"/>
+          </a:xfrm>
+          <a:prstGeom prst="rect">
+            <a:avLst/>
+          </a:prstGeom>
+        </p:spPr>
+        <p:txBody>
+          <a:bodyPr vert="horz" lIns="91440" tIns="45720" rIns="91440" bIns="45720" rtlCol="0" anchor="ctr"/>
+          <a:lstStyle>
+            <a:defPPr>
+              <a:defRPr lang="en-US"/>
+            </a:defPPr>
+            <a:lvl1pPr marL="0" algn="r" defTabSz="685800" rtl="0" eaLnBrk="1" latinLnBrk="0" hangingPunct="1">
+              <a:defRPr sz="900" kern="1200">
+                <a:solidFill>
+                  <a:schemeClr val="tx1"/>
+                </a:solidFill>
+                <a:latin typeface="+mn-lt"/>
+                <a:ea typeface="+mn-ea"/>
+                <a:cs typeface="+mn-cs"/>
+              </a:defRPr>
+            </a:lvl1pPr>
+            <a:lvl2pPr marL="342900" algn="l" defTabSz="685800" rtl="0" eaLnBrk="1" latinLnBrk="0" hangingPunct="1">
+              <a:defRPr sz="1350" kern="1200">
+                <a:solidFill>
+                  <a:schemeClr val="tx1"/>
+                </a:solidFill>
+                <a:latin typeface="+mn-lt"/>
+                <a:ea typeface="+mn-ea"/>
+                <a:cs typeface="+mn-cs"/>
+              </a:defRPr>
+            </a:lvl2pPr>
+            <a:lvl3pPr marL="685800" algn="l" defTabSz="685800" rtl="0" eaLnBrk="1" latinLnBrk="0" hangingPunct="1">
+              <a:defRPr sz="1350" kern="1200">
+                <a:solidFill>
+                  <a:schemeClr val="tx1"/>
+                </a:solidFill>
+                <a:latin typeface="+mn-lt"/>
+                <a:ea typeface="+mn-ea"/>
+                <a:cs typeface="+mn-cs"/>
+              </a:defRPr>
+            </a:lvl3pPr>
+            <a:lvl4pPr marL="1028700" algn="l" defTabSz="685800" rtl="0" eaLnBrk="1" latinLnBrk="0" hangingPunct="1">
+              <a:defRPr sz="1350" kern="1200">
+                <a:solidFill>
+                  <a:schemeClr val="tx1"/>
+                </a:solidFill>
+                <a:latin typeface="+mn-lt"/>
+                <a:ea typeface="+mn-ea"/>
+                <a:cs typeface="+mn-cs"/>
+              </a:defRPr>
+            </a:lvl4pPr>
+            <a:lvl5pPr marL="1371600" algn="l" defTabSz="685800" rtl="0" eaLnBrk="1" latinLnBrk="0" hangingPunct="1">
+              <a:defRPr sz="1350" kern="1200">
+                <a:solidFill>
+                  <a:schemeClr val="tx1"/>
+                </a:solidFill>
+                <a:latin typeface="+mn-lt"/>
+                <a:ea typeface="+mn-ea"/>
+                <a:cs typeface="+mn-cs"/>
+              </a:defRPr>
+            </a:lvl5pPr>
+            <a:lvl6pPr marL="1714500" algn="l" defTabSz="685800" rtl="0" eaLnBrk="1" latinLnBrk="0" hangingPunct="1">
+              <a:defRPr sz="1350" kern="1200">
+                <a:solidFill>
+                  <a:schemeClr val="tx1"/>
+                </a:solidFill>
+                <a:latin typeface="+mn-lt"/>
+                <a:ea typeface="+mn-ea"/>
+                <a:cs typeface="+mn-cs"/>
+              </a:defRPr>
+            </a:lvl6pPr>
+            <a:lvl7pPr marL="2057400" algn="l" defTabSz="685800" rtl="0" eaLnBrk="1" latinLnBrk="0" hangingPunct="1">
+              <a:defRPr sz="1350" kern="1200">
+                <a:solidFill>
+                  <a:schemeClr val="tx1"/>
+                </a:solidFill>
+                <a:latin typeface="+mn-lt"/>
+                <a:ea typeface="+mn-ea"/>
+                <a:cs typeface="+mn-cs"/>
+              </a:defRPr>
+            </a:lvl7pPr>
+            <a:lvl8pPr marL="2400300" algn="l" defTabSz="685800" rtl="0" eaLnBrk="1" latinLnBrk="0" hangingPunct="1">
+              <a:defRPr sz="1350" kern="1200">
+                <a:solidFill>
+                  <a:schemeClr val="tx1"/>
+                </a:solidFill>
+                <a:latin typeface="+mn-lt"/>
+                <a:ea typeface="+mn-ea"/>
+                <a:cs typeface="+mn-cs"/>
+              </a:defRPr>
+            </a:lvl8pPr>
+            <a:lvl9pPr marL="2743200" algn="l" defTabSz="685800" rtl="0" eaLnBrk="1" latinLnBrk="0" hangingPunct="1">
+              <a:defRPr sz="1350" kern="1200">
+                <a:solidFill>
+                  <a:schemeClr val="tx1"/>
+                </a:solidFill>
+                <a:latin typeface="+mn-lt"/>
+                <a:ea typeface="+mn-ea"/>
+                <a:cs typeface="+mn-cs"/>
+              </a:defRPr>
+            </a:lvl9pPr>
+          </a:lstStyle>
+          <a:p>
+            <a:pPr eaLnBrk="0" fontAlgn="base" hangingPunct="0">
+              <a:spcBef>
+                <a:spcPct val="0"/>
+              </a:spcBef>
+              <a:spcAft>
+                <a:spcPct val="0"/>
+              </a:spcAft>
+            </a:pPr>
+            <a:fld id="{E9549862-13E2-C34D-815E-8545BD36FC59}" type="slidenum">
+              <a:rPr lang="en-US" smtClean="0">
+                <a:solidFill>
+                  <a:srgbClr val="6D7777"/>
+                </a:solidFill>
+              </a:rPr>
+              <a:pPr eaLnBrk="0" fontAlgn="base" hangingPunct="0">
+                <a:spcBef>
+                  <a:spcPct val="0"/>
+                </a:spcBef>
+                <a:spcAft>
+                  <a:spcPct val="0"/>
+                </a:spcAft>
+              </a:pPr>
+              <a:t>20</a:t>
+            </a:fld>
+            <a:endParaRPr lang="en-US">
+              <a:solidFill>
+                <a:srgbClr val="6D7777"/>
+              </a:solidFill>
+              <a:latin typeface="Arial" panose="020B0604020202020204" pitchFamily="34" charset="0"/>
+              <a:cs typeface="Arial" panose="020B0604020202020204" pitchFamily="34" charset="0"/>
+            </a:endParaRPr>
+          </a:p>
+        </p:txBody>
+      </p:sp>
+      <p:sp>
+        <p:nvSpPr>
+          <p:cNvPr id="5" name="Rectangle 4">
+            <a:extLst>
+              <a:ext uri="{FF2B5EF4-FFF2-40B4-BE49-F238E27FC236}">
+                <a16:creationId xmlns:a16="http://schemas.microsoft.com/office/drawing/2014/main" id="{A0F8AA87-8AA4-D045-B050-ED7AC92CDFC1}"/>
+              </a:ext>
+            </a:extLst>
+          </p:cNvPr>
+          <p:cNvSpPr/>
+          <p:nvPr/>
+        </p:nvSpPr>
+        <p:spPr>
+          <a:xfrm>
+            <a:off x="251999" y="815691"/>
+            <a:ext cx="4008458" cy="3473033"/>
+          </a:xfrm>
+          <a:prstGeom prst="rect">
+            <a:avLst/>
+          </a:prstGeom>
+          <a:noFill/>
+          <a:ln>
+            <a:solidFill>
+              <a:srgbClr val="0000FF"/>
+            </a:solidFill>
+            <a:prstDash val="dash"/>
+          </a:ln>
+        </p:spPr>
+        <p:style>
+          <a:lnRef idx="2">
+            <a:schemeClr val="accent1">
+              <a:shade val="50000"/>
+            </a:schemeClr>
+          </a:lnRef>
+          <a:fillRef idx="1">
+            <a:schemeClr val="accent1"/>
+          </a:fillRef>
+          <a:effectRef idx="0">
+            <a:schemeClr val="accent1"/>
+          </a:effectRef>
+          <a:fontRef idx="minor">
+            <a:schemeClr val="lt1"/>
+          </a:fontRef>
+        </p:style>
+        <p:txBody>
+          <a:bodyPr rtlCol="0" anchor="t"/>
+          <a:lstStyle/>
+          <a:p>
+            <a:pPr algn="ctr" defTabSz="514350"/>
+            <a:r>
+              <a:rPr lang="en-US" sz="750" b="1">
+                <a:solidFill>
+                  <a:srgbClr val="0000FF"/>
+                </a:solidFill>
+                <a:latin typeface="Arial"/>
+              </a:rPr>
+              <a:t>On-Premise Environment</a:t>
+            </a:r>
+          </a:p>
+        </p:txBody>
+      </p:sp>
+      <p:sp>
+        <p:nvSpPr>
+          <p:cNvPr id="6" name="Rectangle 5">
+            <a:extLst>
+              <a:ext uri="{FF2B5EF4-FFF2-40B4-BE49-F238E27FC236}">
+                <a16:creationId xmlns:a16="http://schemas.microsoft.com/office/drawing/2014/main" id="{90B1E0CB-CD1E-D14F-9238-763E6AF8FC20}"/>
+              </a:ext>
+            </a:extLst>
+          </p:cNvPr>
+          <p:cNvSpPr/>
+          <p:nvPr/>
+        </p:nvSpPr>
+        <p:spPr>
+          <a:xfrm>
+            <a:off x="4710303" y="815691"/>
+            <a:ext cx="4135285" cy="3512118"/>
+          </a:xfrm>
+          <a:prstGeom prst="rect">
+            <a:avLst/>
+          </a:prstGeom>
+          <a:noFill/>
+          <a:ln>
+            <a:solidFill>
+              <a:srgbClr val="00B050"/>
+            </a:solidFill>
+            <a:prstDash val="dash"/>
+          </a:ln>
+        </p:spPr>
+        <p:style>
+          <a:lnRef idx="2">
+            <a:schemeClr val="accent1">
+              <a:shade val="50000"/>
+            </a:schemeClr>
+          </a:lnRef>
+          <a:fillRef idx="1">
+            <a:schemeClr val="accent1"/>
+          </a:fillRef>
+          <a:effectRef idx="0">
+            <a:schemeClr val="accent1"/>
+          </a:effectRef>
+          <a:fontRef idx="minor">
+            <a:schemeClr val="lt1"/>
+          </a:fontRef>
+        </p:style>
+        <p:txBody>
+          <a:bodyPr rtlCol="0" anchor="t"/>
+          <a:lstStyle/>
+          <a:p>
+            <a:pPr algn="ctr" defTabSz="514350"/>
+            <a:r>
+              <a:rPr lang="en-US" sz="750" b="1">
+                <a:solidFill>
+                  <a:srgbClr val="00B050"/>
+                </a:solidFill>
+                <a:latin typeface="Arial"/>
+              </a:rPr>
+              <a:t>IBM Cloud</a:t>
+            </a:r>
+          </a:p>
+        </p:txBody>
+      </p:sp>
+      <p:sp>
+        <p:nvSpPr>
+          <p:cNvPr id="8" name="Rounded Rectangle 7">
+            <a:extLst>
+              <a:ext uri="{FF2B5EF4-FFF2-40B4-BE49-F238E27FC236}">
+                <a16:creationId xmlns:a16="http://schemas.microsoft.com/office/drawing/2014/main" id="{AF5BE487-0468-A243-9C73-9209F84D654B}"/>
+              </a:ext>
+            </a:extLst>
+          </p:cNvPr>
+          <p:cNvSpPr/>
+          <p:nvPr/>
+        </p:nvSpPr>
+        <p:spPr bwMode="auto">
+          <a:xfrm>
+            <a:off x="5547599" y="1195193"/>
+            <a:ext cx="138128" cy="411476"/>
+          </a:xfrm>
+          <a:prstGeom prst="roundRect">
+            <a:avLst/>
+          </a:prstGeom>
+          <a:solidFill>
+            <a:schemeClr val="bg1">
+              <a:lumMod val="50000"/>
+            </a:schemeClr>
+          </a:solidFill>
+          <a:ln>
+            <a:solidFill>
+              <a:schemeClr val="bg1"/>
+            </a:solidFill>
+            <a:prstDash val="solid"/>
+            <a:headEnd type="none" w="med" len="med"/>
+            <a:tailEnd type="none" w="med" len="med"/>
+          </a:ln>
+          <a:effectLst/>
+        </p:spPr>
+        <p:style>
+          <a:lnRef idx="1">
+            <a:schemeClr val="accent5"/>
+          </a:lnRef>
+          <a:fillRef idx="3">
+            <a:schemeClr val="accent5"/>
+          </a:fillRef>
+          <a:effectRef idx="2">
+            <a:schemeClr val="accent5"/>
+          </a:effectRef>
+          <a:fontRef idx="minor">
+            <a:schemeClr val="lt1"/>
+          </a:fontRef>
+        </p:style>
+        <p:txBody>
+          <a:bodyPr vert="horz" wrap="square" lIns="0" tIns="0" rIns="0" bIns="0" numCol="1" rtlCol="0" anchor="ctr" anchorCtr="0" compatLnSpc="1">
+            <a:prstTxWarp prst="textNoShape">
+              <a:avLst/>
+            </a:prstTxWarp>
+            <a:noAutofit/>
+          </a:bodyPr>
+          <a:lstStyle/>
+          <a:p>
+            <a:pPr algn="ctr" defTabSz="685784" eaLnBrk="0" fontAlgn="base" hangingPunct="0">
+              <a:lnSpc>
+                <a:spcPct val="90000"/>
+              </a:lnSpc>
+              <a:spcBef>
+                <a:spcPct val="0"/>
+              </a:spcBef>
+              <a:spcAft>
+                <a:spcPct val="0"/>
+              </a:spcAft>
+            </a:pPr>
+            <a:r>
+              <a:rPr lang="en-US" sz="675">
+                <a:solidFill>
+                  <a:srgbClr val="FFFFFF"/>
+                </a:solidFill>
+                <a:latin typeface="Arial"/>
+              </a:rPr>
+              <a:t>0</a:t>
+            </a:r>
+            <a:endParaRPr lang="en-US" sz="375">
+              <a:solidFill>
+                <a:srgbClr val="FFFFFF"/>
+              </a:solidFill>
+              <a:latin typeface="Arial"/>
+            </a:endParaRPr>
+          </a:p>
+        </p:txBody>
+      </p:sp>
+      <p:sp>
+        <p:nvSpPr>
+          <p:cNvPr id="9" name="Rounded Rectangle 8">
+            <a:extLst>
+              <a:ext uri="{FF2B5EF4-FFF2-40B4-BE49-F238E27FC236}">
+                <a16:creationId xmlns:a16="http://schemas.microsoft.com/office/drawing/2014/main" id="{D5E58477-E1E3-594C-AF48-F4CA8530EABE}"/>
+              </a:ext>
+            </a:extLst>
+          </p:cNvPr>
+          <p:cNvSpPr/>
+          <p:nvPr/>
+        </p:nvSpPr>
+        <p:spPr bwMode="auto">
+          <a:xfrm>
+            <a:off x="5684757" y="1195193"/>
+            <a:ext cx="138128" cy="411476"/>
+          </a:xfrm>
+          <a:prstGeom prst="roundRect">
+            <a:avLst/>
+          </a:prstGeom>
+          <a:solidFill>
+            <a:schemeClr val="bg1">
+              <a:lumMod val="50000"/>
+            </a:schemeClr>
+          </a:solidFill>
+          <a:ln>
+            <a:solidFill>
+              <a:schemeClr val="bg1"/>
+            </a:solidFill>
+            <a:prstDash val="solid"/>
+            <a:headEnd type="none" w="med" len="med"/>
+            <a:tailEnd type="none" w="med" len="med"/>
+          </a:ln>
+          <a:effectLst/>
+        </p:spPr>
+        <p:style>
+          <a:lnRef idx="1">
+            <a:schemeClr val="accent5"/>
+          </a:lnRef>
+          <a:fillRef idx="3">
+            <a:schemeClr val="accent5"/>
+          </a:fillRef>
+          <a:effectRef idx="2">
+            <a:schemeClr val="accent5"/>
+          </a:effectRef>
+          <a:fontRef idx="minor">
+            <a:schemeClr val="lt1"/>
+          </a:fontRef>
+        </p:style>
+        <p:txBody>
+          <a:bodyPr vert="horz" wrap="square" lIns="0" tIns="0" rIns="0" bIns="0" numCol="1" rtlCol="0" anchor="ctr" anchorCtr="0" compatLnSpc="1">
+            <a:prstTxWarp prst="textNoShape">
+              <a:avLst/>
+            </a:prstTxWarp>
+            <a:noAutofit/>
+          </a:bodyPr>
+          <a:lstStyle/>
+          <a:p>
+            <a:pPr algn="ctr" defTabSz="685784" eaLnBrk="0" fontAlgn="base" hangingPunct="0">
+              <a:lnSpc>
+                <a:spcPct val="90000"/>
+              </a:lnSpc>
+              <a:spcBef>
+                <a:spcPct val="0"/>
+              </a:spcBef>
+              <a:spcAft>
+                <a:spcPct val="0"/>
+              </a:spcAft>
+            </a:pPr>
+            <a:r>
+              <a:rPr lang="en-US" sz="675">
+                <a:solidFill>
+                  <a:srgbClr val="FFFFFF"/>
+                </a:solidFill>
+                <a:latin typeface="Arial"/>
+              </a:rPr>
+              <a:t>1</a:t>
+            </a:r>
+            <a:endParaRPr lang="en-US" sz="375">
+              <a:solidFill>
+                <a:srgbClr val="FFFFFF"/>
+              </a:solidFill>
+              <a:latin typeface="Arial"/>
+            </a:endParaRPr>
+          </a:p>
+        </p:txBody>
+      </p:sp>
+      <p:sp>
+        <p:nvSpPr>
+          <p:cNvPr id="10" name="Rounded Rectangle 9">
+            <a:extLst>
+              <a:ext uri="{FF2B5EF4-FFF2-40B4-BE49-F238E27FC236}">
+                <a16:creationId xmlns:a16="http://schemas.microsoft.com/office/drawing/2014/main" id="{F7310BC1-71B2-BD47-95DA-A5A9F09D389B}"/>
+              </a:ext>
+            </a:extLst>
+          </p:cNvPr>
+          <p:cNvSpPr/>
+          <p:nvPr/>
+        </p:nvSpPr>
+        <p:spPr bwMode="auto">
+          <a:xfrm>
+            <a:off x="5822886" y="1195193"/>
+            <a:ext cx="138128" cy="411476"/>
+          </a:xfrm>
+          <a:prstGeom prst="roundRect">
+            <a:avLst/>
+          </a:prstGeom>
+          <a:solidFill>
+            <a:schemeClr val="bg1">
+              <a:lumMod val="50000"/>
+            </a:schemeClr>
+          </a:solidFill>
+          <a:ln>
+            <a:solidFill>
+              <a:schemeClr val="bg1"/>
+            </a:solidFill>
+            <a:prstDash val="solid"/>
+            <a:headEnd type="none" w="med" len="med"/>
+            <a:tailEnd type="none" w="med" len="med"/>
+          </a:ln>
+          <a:effectLst/>
+        </p:spPr>
+        <p:style>
+          <a:lnRef idx="1">
+            <a:schemeClr val="accent5"/>
+          </a:lnRef>
+          <a:fillRef idx="3">
+            <a:schemeClr val="accent5"/>
+          </a:fillRef>
+          <a:effectRef idx="2">
+            <a:schemeClr val="accent5"/>
+          </a:effectRef>
+          <a:fontRef idx="minor">
+            <a:schemeClr val="lt1"/>
+          </a:fontRef>
+        </p:style>
+        <p:txBody>
+          <a:bodyPr vert="horz" wrap="square" lIns="0" tIns="0" rIns="0" bIns="0" numCol="1" rtlCol="0" anchor="ctr" anchorCtr="0" compatLnSpc="1">
+            <a:prstTxWarp prst="textNoShape">
+              <a:avLst/>
+            </a:prstTxWarp>
+            <a:noAutofit/>
+          </a:bodyPr>
+          <a:lstStyle/>
+          <a:p>
+            <a:pPr algn="ctr" defTabSz="685784" eaLnBrk="0" fontAlgn="base" hangingPunct="0">
+              <a:lnSpc>
+                <a:spcPct val="90000"/>
+              </a:lnSpc>
+              <a:spcBef>
+                <a:spcPct val="0"/>
+              </a:spcBef>
+              <a:spcAft>
+                <a:spcPct val="0"/>
+              </a:spcAft>
+            </a:pPr>
+            <a:r>
+              <a:rPr lang="en-US" sz="675">
+                <a:solidFill>
+                  <a:srgbClr val="FFFFFF"/>
+                </a:solidFill>
+                <a:latin typeface="Arial"/>
+              </a:rPr>
+              <a:t>2</a:t>
+            </a:r>
+            <a:endParaRPr lang="en-US" sz="375">
+              <a:solidFill>
+                <a:srgbClr val="FFFFFF"/>
+              </a:solidFill>
+              <a:latin typeface="Arial"/>
+            </a:endParaRPr>
+          </a:p>
+        </p:txBody>
+      </p:sp>
+      <p:sp>
+        <p:nvSpPr>
+          <p:cNvPr id="11" name="Rounded Rectangle 10">
+            <a:extLst>
+              <a:ext uri="{FF2B5EF4-FFF2-40B4-BE49-F238E27FC236}">
+                <a16:creationId xmlns:a16="http://schemas.microsoft.com/office/drawing/2014/main" id="{B6291CC4-0B45-D044-90E7-3543E7A968CF}"/>
+              </a:ext>
+            </a:extLst>
+          </p:cNvPr>
+          <p:cNvSpPr/>
+          <p:nvPr/>
+        </p:nvSpPr>
+        <p:spPr bwMode="auto">
+          <a:xfrm>
+            <a:off x="5960044" y="1195193"/>
+            <a:ext cx="138128" cy="411476"/>
+          </a:xfrm>
+          <a:prstGeom prst="roundRect">
+            <a:avLst/>
+          </a:prstGeom>
+          <a:solidFill>
+            <a:schemeClr val="bg1">
+              <a:lumMod val="50000"/>
+            </a:schemeClr>
+          </a:solidFill>
+          <a:ln>
+            <a:solidFill>
+              <a:schemeClr val="bg1"/>
+            </a:solidFill>
+            <a:prstDash val="solid"/>
+            <a:headEnd type="none" w="med" len="med"/>
+            <a:tailEnd type="none" w="med" len="med"/>
+          </a:ln>
+          <a:effectLst/>
+        </p:spPr>
+        <p:style>
+          <a:lnRef idx="1">
+            <a:schemeClr val="accent5"/>
+          </a:lnRef>
+          <a:fillRef idx="3">
+            <a:schemeClr val="accent5"/>
+          </a:fillRef>
+          <a:effectRef idx="2">
+            <a:schemeClr val="accent5"/>
+          </a:effectRef>
+          <a:fontRef idx="minor">
+            <a:schemeClr val="lt1"/>
+          </a:fontRef>
+        </p:style>
+        <p:txBody>
+          <a:bodyPr vert="horz" wrap="square" lIns="0" tIns="0" rIns="0" bIns="0" numCol="1" rtlCol="0" anchor="ctr" anchorCtr="0" compatLnSpc="1">
+            <a:prstTxWarp prst="textNoShape">
+              <a:avLst/>
+            </a:prstTxWarp>
+            <a:noAutofit/>
+          </a:bodyPr>
+          <a:lstStyle/>
+          <a:p>
+            <a:pPr algn="ctr" defTabSz="685784" eaLnBrk="0" fontAlgn="base" hangingPunct="0">
+              <a:lnSpc>
+                <a:spcPct val="90000"/>
+              </a:lnSpc>
+              <a:spcBef>
+                <a:spcPct val="0"/>
+              </a:spcBef>
+              <a:spcAft>
+                <a:spcPct val="0"/>
+              </a:spcAft>
+            </a:pPr>
+            <a:r>
+              <a:rPr lang="en-US" sz="675">
+                <a:solidFill>
+                  <a:srgbClr val="FFFFFF"/>
+                </a:solidFill>
+                <a:latin typeface="Arial"/>
+              </a:rPr>
+              <a:t>3</a:t>
+            </a:r>
+            <a:endParaRPr lang="en-US" sz="375">
+              <a:solidFill>
+                <a:srgbClr val="FFFFFF"/>
+              </a:solidFill>
+              <a:latin typeface="Arial"/>
+            </a:endParaRPr>
+          </a:p>
+        </p:txBody>
+      </p:sp>
+      <p:sp>
+        <p:nvSpPr>
+          <p:cNvPr id="12" name="Rounded Rectangle 11">
+            <a:extLst>
+              <a:ext uri="{FF2B5EF4-FFF2-40B4-BE49-F238E27FC236}">
+                <a16:creationId xmlns:a16="http://schemas.microsoft.com/office/drawing/2014/main" id="{94EF47BB-26F6-B343-B071-171636EE579D}"/>
+              </a:ext>
+            </a:extLst>
+          </p:cNvPr>
+          <p:cNvSpPr/>
+          <p:nvPr/>
+        </p:nvSpPr>
+        <p:spPr bwMode="auto">
+          <a:xfrm>
+            <a:off x="6098172" y="1195193"/>
+            <a:ext cx="138128" cy="411476"/>
+          </a:xfrm>
+          <a:prstGeom prst="roundRect">
+            <a:avLst/>
+          </a:prstGeom>
+          <a:solidFill>
+            <a:schemeClr val="bg1">
+              <a:lumMod val="50000"/>
+            </a:schemeClr>
+          </a:solidFill>
+          <a:ln>
+            <a:solidFill>
+              <a:schemeClr val="bg1"/>
+            </a:solidFill>
+            <a:prstDash val="solid"/>
+            <a:headEnd type="none" w="med" len="med"/>
+            <a:tailEnd type="none" w="med" len="med"/>
+          </a:ln>
+          <a:effectLst/>
+        </p:spPr>
+        <p:style>
+          <a:lnRef idx="1">
+            <a:schemeClr val="accent5"/>
+          </a:lnRef>
+          <a:fillRef idx="3">
+            <a:schemeClr val="accent5"/>
+          </a:fillRef>
+          <a:effectRef idx="2">
+            <a:schemeClr val="accent5"/>
+          </a:effectRef>
+          <a:fontRef idx="minor">
+            <a:schemeClr val="lt1"/>
+          </a:fontRef>
+        </p:style>
+        <p:txBody>
+          <a:bodyPr vert="horz" wrap="square" lIns="0" tIns="0" rIns="0" bIns="0" numCol="1" rtlCol="0" anchor="ctr" anchorCtr="0" compatLnSpc="1">
+            <a:prstTxWarp prst="textNoShape">
+              <a:avLst/>
+            </a:prstTxWarp>
+            <a:noAutofit/>
+          </a:bodyPr>
+          <a:lstStyle/>
+          <a:p>
+            <a:pPr algn="ctr" defTabSz="685784" eaLnBrk="0" fontAlgn="base" hangingPunct="0">
+              <a:lnSpc>
+                <a:spcPct val="90000"/>
+              </a:lnSpc>
+              <a:spcBef>
+                <a:spcPct val="0"/>
+              </a:spcBef>
+              <a:spcAft>
+                <a:spcPct val="0"/>
+              </a:spcAft>
+            </a:pPr>
+            <a:r>
+              <a:rPr lang="en-US" sz="675">
+                <a:solidFill>
+                  <a:srgbClr val="FFFFFF"/>
+                </a:solidFill>
+                <a:latin typeface="Arial"/>
+              </a:rPr>
+              <a:t>4</a:t>
+            </a:r>
+            <a:endParaRPr lang="en-US" sz="375">
+              <a:solidFill>
+                <a:srgbClr val="FFFFFF"/>
+              </a:solidFill>
+              <a:latin typeface="Arial"/>
+            </a:endParaRPr>
+          </a:p>
+        </p:txBody>
+      </p:sp>
+      <p:sp>
+        <p:nvSpPr>
+          <p:cNvPr id="13" name="Rounded Rectangle 12">
+            <a:extLst>
+              <a:ext uri="{FF2B5EF4-FFF2-40B4-BE49-F238E27FC236}">
+                <a16:creationId xmlns:a16="http://schemas.microsoft.com/office/drawing/2014/main" id="{00BCA8E7-112B-094B-8994-52A4B5E872FB}"/>
+              </a:ext>
+            </a:extLst>
+          </p:cNvPr>
+          <p:cNvSpPr/>
+          <p:nvPr/>
+        </p:nvSpPr>
+        <p:spPr bwMode="auto">
+          <a:xfrm>
+            <a:off x="6227995" y="1195193"/>
+            <a:ext cx="138128" cy="411476"/>
+          </a:xfrm>
+          <a:prstGeom prst="roundRect">
+            <a:avLst/>
+          </a:prstGeom>
+          <a:solidFill>
+            <a:schemeClr val="bg1">
+              <a:lumMod val="50000"/>
+            </a:schemeClr>
+          </a:solidFill>
+          <a:ln>
+            <a:solidFill>
+              <a:schemeClr val="bg1"/>
+            </a:solidFill>
+            <a:prstDash val="solid"/>
+            <a:headEnd type="none" w="med" len="med"/>
+            <a:tailEnd type="none" w="med" len="med"/>
+          </a:ln>
+          <a:effectLst/>
+        </p:spPr>
+        <p:style>
+          <a:lnRef idx="1">
+            <a:schemeClr val="accent5"/>
+          </a:lnRef>
+          <a:fillRef idx="3">
+            <a:schemeClr val="accent5"/>
+          </a:fillRef>
+          <a:effectRef idx="2">
+            <a:schemeClr val="accent5"/>
+          </a:effectRef>
+          <a:fontRef idx="minor">
+            <a:schemeClr val="lt1"/>
+          </a:fontRef>
+        </p:style>
+        <p:txBody>
+          <a:bodyPr vert="horz" wrap="square" lIns="0" tIns="0" rIns="0" bIns="0" numCol="1" rtlCol="0" anchor="ctr" anchorCtr="0" compatLnSpc="1">
+            <a:prstTxWarp prst="textNoShape">
+              <a:avLst/>
+            </a:prstTxWarp>
+            <a:noAutofit/>
+          </a:bodyPr>
+          <a:lstStyle/>
+          <a:p>
+            <a:pPr algn="ctr" defTabSz="685784" eaLnBrk="0" fontAlgn="base" hangingPunct="0">
+              <a:lnSpc>
+                <a:spcPct val="90000"/>
+              </a:lnSpc>
+              <a:spcBef>
+                <a:spcPct val="0"/>
+              </a:spcBef>
+              <a:spcAft>
+                <a:spcPct val="0"/>
+              </a:spcAft>
+            </a:pPr>
+            <a:r>
+              <a:rPr lang="en-US" sz="675">
+                <a:solidFill>
+                  <a:srgbClr val="FFFFFF"/>
+                </a:solidFill>
+                <a:latin typeface="Arial"/>
+              </a:rPr>
+              <a:t>5</a:t>
+            </a:r>
+            <a:endParaRPr lang="en-US" sz="375">
+              <a:solidFill>
+                <a:srgbClr val="FFFFFF"/>
+              </a:solidFill>
+              <a:latin typeface="Arial"/>
+            </a:endParaRPr>
+          </a:p>
+        </p:txBody>
+      </p:sp>
+      <p:sp>
+        <p:nvSpPr>
+          <p:cNvPr id="14" name="AutoShape 4">
+            <a:extLst>
+              <a:ext uri="{FF2B5EF4-FFF2-40B4-BE49-F238E27FC236}">
+                <a16:creationId xmlns:a16="http://schemas.microsoft.com/office/drawing/2014/main" id="{419F5FD2-9DE2-F445-A68B-0CAD344E39B6}"/>
+              </a:ext>
+            </a:extLst>
+          </p:cNvPr>
+          <p:cNvSpPr>
+            <a:spLocks noChangeArrowheads="1"/>
+          </p:cNvSpPr>
+          <p:nvPr/>
+        </p:nvSpPr>
+        <p:spPr bwMode="auto">
+          <a:xfrm>
+            <a:off x="4803410" y="1060171"/>
+            <a:ext cx="3968536" cy="745927"/>
+          </a:xfrm>
+          <a:prstGeom prst="roundRect">
+            <a:avLst>
+              <a:gd name="adj" fmla="val 7117"/>
+            </a:avLst>
+          </a:prstGeom>
+          <a:noFill/>
+          <a:ln w="12700">
+            <a:solidFill>
+              <a:schemeClr val="accent3"/>
+            </a:solidFill>
+            <a:prstDash val="dash"/>
+            <a:round/>
+            <a:headEnd/>
+            <a:tailEnd/>
+          </a:ln>
+        </p:spPr>
+        <p:txBody>
+          <a:bodyPr lIns="0" tIns="0" rIns="0" bIns="0" anchor="b" anchorCtr="1"/>
+          <a:lstStyle/>
+          <a:p>
+            <a:pPr algn="ctr" eaLnBrk="0" fontAlgn="base" hangingPunct="0">
+              <a:spcBef>
+                <a:spcPct val="0"/>
+              </a:spcBef>
+              <a:spcAft>
+                <a:spcPct val="0"/>
+              </a:spcAft>
+            </a:pPr>
+            <a:r>
+              <a:rPr lang="en-US" sz="750" dirty="0">
+                <a:solidFill>
+                  <a:srgbClr val="6D7777"/>
+                </a:solidFill>
+                <a:latin typeface="Arial" panose="020B0604020202020204" pitchFamily="34" charset="0"/>
+                <a:cs typeface="Arial" panose="020B0604020202020204" pitchFamily="34" charset="0"/>
+              </a:rPr>
+              <a:t>Event Streams Cluster</a:t>
+            </a:r>
+          </a:p>
+        </p:txBody>
+      </p:sp>
+      <p:pic>
+        <p:nvPicPr>
+          <p:cNvPr id="15" name="Picture 14">
+            <a:extLst>
+              <a:ext uri="{FF2B5EF4-FFF2-40B4-BE49-F238E27FC236}">
+                <a16:creationId xmlns:a16="http://schemas.microsoft.com/office/drawing/2014/main" id="{4D675F2E-5ADD-244D-A2C8-DC471A256E75}"/>
+              </a:ext>
+            </a:extLst>
+          </p:cNvPr>
+          <p:cNvPicPr>
+            <a:picLocks noChangeAspect="1"/>
+          </p:cNvPicPr>
+          <p:nvPr/>
+        </p:nvPicPr>
+        <p:blipFill>
+          <a:blip r:embed="rId2">
+            <a:extLst>
+              <a:ext uri="{28A0092B-C50C-407E-A947-70E740481C1C}">
+                <a14:useLocalDpi xmlns:a14="http://schemas.microsoft.com/office/drawing/2010/main" val="0"/>
+              </a:ext>
+            </a:extLst>
+          </a:blip>
+          <a:stretch>
+            <a:fillRect/>
+          </a:stretch>
+        </p:blipFill>
+        <p:spPr>
+          <a:xfrm>
+            <a:off x="4945417" y="1503235"/>
+            <a:ext cx="191007" cy="252252"/>
+          </a:xfrm>
+          <a:prstGeom prst="rect">
+            <a:avLst/>
+          </a:prstGeom>
+        </p:spPr>
+      </p:pic>
+      <p:sp>
+        <p:nvSpPr>
+          <p:cNvPr id="16" name="AutoShape 4">
+            <a:extLst>
+              <a:ext uri="{FF2B5EF4-FFF2-40B4-BE49-F238E27FC236}">
+                <a16:creationId xmlns:a16="http://schemas.microsoft.com/office/drawing/2014/main" id="{8537465C-CC23-3A49-BF55-D3D5F0E218A8}"/>
+              </a:ext>
+            </a:extLst>
+          </p:cNvPr>
+          <p:cNvSpPr>
+            <a:spLocks noChangeArrowheads="1"/>
+          </p:cNvSpPr>
+          <p:nvPr/>
+        </p:nvSpPr>
+        <p:spPr bwMode="auto">
+          <a:xfrm>
+            <a:off x="4925539" y="2409121"/>
+            <a:ext cx="3611870" cy="1712816"/>
+          </a:xfrm>
+          <a:prstGeom prst="roundRect">
+            <a:avLst>
+              <a:gd name="adj" fmla="val 7117"/>
+            </a:avLst>
+          </a:prstGeom>
+          <a:noFill/>
+          <a:ln w="12700">
+            <a:solidFill>
+              <a:schemeClr val="accent3"/>
+            </a:solidFill>
+            <a:prstDash val="dash"/>
+            <a:round/>
+            <a:headEnd/>
+            <a:tailEnd/>
+          </a:ln>
+        </p:spPr>
+        <p:txBody>
+          <a:bodyPr lIns="0" tIns="0" rIns="0" bIns="0" anchor="b" anchorCtr="1"/>
+          <a:lstStyle/>
+          <a:p>
+            <a:pPr algn="ctr" eaLnBrk="0" fontAlgn="base" hangingPunct="0">
+              <a:spcBef>
+                <a:spcPct val="0"/>
+              </a:spcBef>
+              <a:spcAft>
+                <a:spcPct val="0"/>
+              </a:spcAft>
+            </a:pPr>
+            <a:endParaRPr lang="en-US" sz="750">
+              <a:solidFill>
+                <a:srgbClr val="6D7777"/>
+              </a:solidFill>
+              <a:latin typeface="Arial" panose="020B0604020202020204" pitchFamily="34" charset="0"/>
+              <a:cs typeface="Arial" panose="020B0604020202020204" pitchFamily="34" charset="0"/>
+            </a:endParaRPr>
+          </a:p>
+        </p:txBody>
+      </p:sp>
+      <p:pic>
+        <p:nvPicPr>
+          <p:cNvPr id="17" name="Picture 16">
+            <a:extLst>
+              <a:ext uri="{FF2B5EF4-FFF2-40B4-BE49-F238E27FC236}">
+                <a16:creationId xmlns:a16="http://schemas.microsoft.com/office/drawing/2014/main" id="{6ABC5224-3E3C-5747-867A-AC22EFA3C6D3}"/>
+              </a:ext>
+            </a:extLst>
+          </p:cNvPr>
+          <p:cNvPicPr>
+            <a:picLocks noChangeAspect="1"/>
+          </p:cNvPicPr>
+          <p:nvPr/>
+        </p:nvPicPr>
+        <p:blipFill>
+          <a:blip r:embed="rId3"/>
+          <a:stretch>
+            <a:fillRect/>
+          </a:stretch>
+        </p:blipFill>
+        <p:spPr>
+          <a:xfrm>
+            <a:off x="4874613" y="3916065"/>
+            <a:ext cx="225173" cy="205872"/>
+          </a:xfrm>
+          <a:prstGeom prst="rect">
+            <a:avLst/>
+          </a:prstGeom>
+        </p:spPr>
+      </p:pic>
+      <p:pic>
+        <p:nvPicPr>
+          <p:cNvPr id="19" name="Picture 18">
+            <a:extLst>
+              <a:ext uri="{FF2B5EF4-FFF2-40B4-BE49-F238E27FC236}">
+                <a16:creationId xmlns:a16="http://schemas.microsoft.com/office/drawing/2014/main" id="{7706F5A4-7139-564E-A4D8-D1D149150755}"/>
+              </a:ext>
+            </a:extLst>
+          </p:cNvPr>
+          <p:cNvPicPr>
+            <a:picLocks noChangeAspect="1"/>
+          </p:cNvPicPr>
+          <p:nvPr/>
+        </p:nvPicPr>
+        <p:blipFill>
+          <a:blip r:embed="rId3"/>
+          <a:stretch>
+            <a:fillRect/>
+          </a:stretch>
+        </p:blipFill>
+        <p:spPr>
+          <a:xfrm>
+            <a:off x="211015" y="4121937"/>
+            <a:ext cx="225173" cy="205872"/>
+          </a:xfrm>
+          <a:prstGeom prst="rect">
+            <a:avLst/>
+          </a:prstGeom>
+        </p:spPr>
+      </p:pic>
+      <p:grpSp>
+        <p:nvGrpSpPr>
+          <p:cNvPr id="3" name="Group 2">
+            <a:extLst>
+              <a:ext uri="{FF2B5EF4-FFF2-40B4-BE49-F238E27FC236}">
+                <a16:creationId xmlns:a16="http://schemas.microsoft.com/office/drawing/2014/main" id="{C32B04C6-EDFD-6245-847E-EB8C8D437026}"/>
+              </a:ext>
+            </a:extLst>
+          </p:cNvPr>
+          <p:cNvGrpSpPr/>
+          <p:nvPr/>
+        </p:nvGrpSpPr>
+        <p:grpSpPr>
+          <a:xfrm>
+            <a:off x="514554" y="1231093"/>
+            <a:ext cx="818524" cy="411476"/>
+            <a:chOff x="1193647" y="1635094"/>
+            <a:chExt cx="818524" cy="411476"/>
+          </a:xfrm>
+        </p:grpSpPr>
+        <p:sp>
+          <p:nvSpPr>
+            <p:cNvPr id="28" name="Rounded Rectangle 27">
+              <a:extLst>
+                <a:ext uri="{FF2B5EF4-FFF2-40B4-BE49-F238E27FC236}">
+                  <a16:creationId xmlns:a16="http://schemas.microsoft.com/office/drawing/2014/main" id="{058E4018-54EF-C241-A10F-9BB485461EFF}"/>
+                </a:ext>
+              </a:extLst>
+            </p:cNvPr>
+            <p:cNvSpPr/>
+            <p:nvPr/>
+          </p:nvSpPr>
+          <p:spPr bwMode="auto">
+            <a:xfrm>
+              <a:off x="1193647" y="1635094"/>
+              <a:ext cx="138128" cy="411476"/>
+            </a:xfrm>
+            <a:prstGeom prst="roundRect">
+              <a:avLst/>
+            </a:prstGeom>
+            <a:solidFill>
+              <a:schemeClr val="bg1">
+                <a:lumMod val="50000"/>
+              </a:schemeClr>
+            </a:solidFill>
+            <a:ln>
+              <a:solidFill>
+                <a:schemeClr val="bg1"/>
+              </a:solidFill>
+              <a:prstDash val="solid"/>
+              <a:headEnd type="none" w="med" len="med"/>
+              <a:tailEnd type="none" w="med" len="med"/>
+            </a:ln>
+            <a:effectLst/>
+          </p:spPr>
+          <p:style>
+            <a:lnRef idx="1">
+              <a:schemeClr val="accent5"/>
+            </a:lnRef>
+            <a:fillRef idx="3">
+              <a:schemeClr val="accent5"/>
+            </a:fillRef>
+            <a:effectRef idx="2">
+              <a:schemeClr val="accent5"/>
+            </a:effectRef>
+            <a:fontRef idx="minor">
+              <a:schemeClr val="lt1"/>
+            </a:fontRef>
+          </p:style>
+          <p:txBody>
+            <a:bodyPr vert="horz" wrap="square" lIns="0" tIns="0" rIns="0" bIns="0" numCol="1" rtlCol="0" anchor="ctr" anchorCtr="0" compatLnSpc="1">
+              <a:prstTxWarp prst="textNoShape">
+                <a:avLst/>
+              </a:prstTxWarp>
+              <a:noAutofit/>
+            </a:bodyPr>
+            <a:lstStyle/>
+            <a:p>
+              <a:pPr algn="ctr" defTabSz="685784" eaLnBrk="0" fontAlgn="base" hangingPunct="0">
+                <a:lnSpc>
+                  <a:spcPct val="90000"/>
+                </a:lnSpc>
+                <a:spcBef>
+                  <a:spcPct val="0"/>
+                </a:spcBef>
+                <a:spcAft>
+                  <a:spcPct val="0"/>
+                </a:spcAft>
+              </a:pPr>
+              <a:r>
+                <a:rPr lang="en-US" sz="675">
+                  <a:solidFill>
+                    <a:srgbClr val="FFFFFF"/>
+                  </a:solidFill>
+                  <a:latin typeface="Arial"/>
+                </a:rPr>
+                <a:t>0</a:t>
+              </a:r>
+              <a:endParaRPr lang="en-US" sz="375">
+                <a:solidFill>
+                  <a:srgbClr val="FFFFFF"/>
+                </a:solidFill>
+                <a:latin typeface="Arial"/>
+              </a:endParaRPr>
+            </a:p>
+          </p:txBody>
+        </p:sp>
+        <p:sp>
+          <p:nvSpPr>
+            <p:cNvPr id="29" name="Rounded Rectangle 28">
+              <a:extLst>
+                <a:ext uri="{FF2B5EF4-FFF2-40B4-BE49-F238E27FC236}">
+                  <a16:creationId xmlns:a16="http://schemas.microsoft.com/office/drawing/2014/main" id="{2DEDB43F-6BDF-F347-95A5-F47AA2B1C71F}"/>
+                </a:ext>
+              </a:extLst>
+            </p:cNvPr>
+            <p:cNvSpPr/>
+            <p:nvPr/>
+          </p:nvSpPr>
+          <p:spPr bwMode="auto">
+            <a:xfrm>
+              <a:off x="1330805" y="1635094"/>
+              <a:ext cx="138128" cy="411476"/>
+            </a:xfrm>
+            <a:prstGeom prst="roundRect">
+              <a:avLst/>
+            </a:prstGeom>
+            <a:solidFill>
+              <a:schemeClr val="bg1">
+                <a:lumMod val="50000"/>
+              </a:schemeClr>
+            </a:solidFill>
+            <a:ln>
+              <a:solidFill>
+                <a:schemeClr val="bg1"/>
+              </a:solidFill>
+              <a:prstDash val="solid"/>
+              <a:headEnd type="none" w="med" len="med"/>
+              <a:tailEnd type="none" w="med" len="med"/>
+            </a:ln>
+            <a:effectLst/>
+          </p:spPr>
+          <p:style>
+            <a:lnRef idx="1">
+              <a:schemeClr val="accent5"/>
+            </a:lnRef>
+            <a:fillRef idx="3">
+              <a:schemeClr val="accent5"/>
+            </a:fillRef>
+            <a:effectRef idx="2">
+              <a:schemeClr val="accent5"/>
+            </a:effectRef>
+            <a:fontRef idx="minor">
+              <a:schemeClr val="lt1"/>
+            </a:fontRef>
+          </p:style>
+          <p:txBody>
+            <a:bodyPr vert="horz" wrap="square" lIns="0" tIns="0" rIns="0" bIns="0" numCol="1" rtlCol="0" anchor="ctr" anchorCtr="0" compatLnSpc="1">
+              <a:prstTxWarp prst="textNoShape">
+                <a:avLst/>
+              </a:prstTxWarp>
+              <a:noAutofit/>
+            </a:bodyPr>
+            <a:lstStyle/>
+            <a:p>
+              <a:pPr algn="ctr" defTabSz="685784" eaLnBrk="0" fontAlgn="base" hangingPunct="0">
+                <a:lnSpc>
+                  <a:spcPct val="90000"/>
+                </a:lnSpc>
+                <a:spcBef>
+                  <a:spcPct val="0"/>
+                </a:spcBef>
+                <a:spcAft>
+                  <a:spcPct val="0"/>
+                </a:spcAft>
+              </a:pPr>
+              <a:r>
+                <a:rPr lang="en-US" sz="675">
+                  <a:solidFill>
+                    <a:srgbClr val="FFFFFF"/>
+                  </a:solidFill>
+                  <a:latin typeface="Arial"/>
+                </a:rPr>
+                <a:t>1</a:t>
+              </a:r>
+              <a:endParaRPr lang="en-US" sz="375">
+                <a:solidFill>
+                  <a:srgbClr val="FFFFFF"/>
+                </a:solidFill>
+                <a:latin typeface="Arial"/>
+              </a:endParaRPr>
+            </a:p>
+          </p:txBody>
+        </p:sp>
+        <p:sp>
+          <p:nvSpPr>
+            <p:cNvPr id="30" name="Rounded Rectangle 29">
+              <a:extLst>
+                <a:ext uri="{FF2B5EF4-FFF2-40B4-BE49-F238E27FC236}">
+                  <a16:creationId xmlns:a16="http://schemas.microsoft.com/office/drawing/2014/main" id="{99244A3B-B483-4E43-A1E9-229B6A27DB31}"/>
+                </a:ext>
+              </a:extLst>
+            </p:cNvPr>
+            <p:cNvSpPr/>
+            <p:nvPr/>
+          </p:nvSpPr>
+          <p:spPr bwMode="auto">
+            <a:xfrm>
+              <a:off x="1468934" y="1635094"/>
+              <a:ext cx="138128" cy="411476"/>
+            </a:xfrm>
+            <a:prstGeom prst="roundRect">
+              <a:avLst/>
+            </a:prstGeom>
+            <a:solidFill>
+              <a:schemeClr val="bg1">
+                <a:lumMod val="50000"/>
+              </a:schemeClr>
+            </a:solidFill>
+            <a:ln>
+              <a:solidFill>
+                <a:schemeClr val="bg1"/>
+              </a:solidFill>
+              <a:prstDash val="solid"/>
+              <a:headEnd type="none" w="med" len="med"/>
+              <a:tailEnd type="none" w="med" len="med"/>
+            </a:ln>
+            <a:effectLst/>
+          </p:spPr>
+          <p:style>
+            <a:lnRef idx="1">
+              <a:schemeClr val="accent5"/>
+            </a:lnRef>
+            <a:fillRef idx="3">
+              <a:schemeClr val="accent5"/>
+            </a:fillRef>
+            <a:effectRef idx="2">
+              <a:schemeClr val="accent5"/>
+            </a:effectRef>
+            <a:fontRef idx="minor">
+              <a:schemeClr val="lt1"/>
+            </a:fontRef>
+          </p:style>
+          <p:txBody>
+            <a:bodyPr vert="horz" wrap="square" lIns="0" tIns="0" rIns="0" bIns="0" numCol="1" rtlCol="0" anchor="ctr" anchorCtr="0" compatLnSpc="1">
+              <a:prstTxWarp prst="textNoShape">
+                <a:avLst/>
+              </a:prstTxWarp>
+              <a:noAutofit/>
+            </a:bodyPr>
+            <a:lstStyle/>
+            <a:p>
+              <a:pPr algn="ctr" defTabSz="685784" eaLnBrk="0" fontAlgn="base" hangingPunct="0">
+                <a:lnSpc>
+                  <a:spcPct val="90000"/>
+                </a:lnSpc>
+                <a:spcBef>
+                  <a:spcPct val="0"/>
+                </a:spcBef>
+                <a:spcAft>
+                  <a:spcPct val="0"/>
+                </a:spcAft>
+              </a:pPr>
+              <a:r>
+                <a:rPr lang="en-US" sz="675">
+                  <a:solidFill>
+                    <a:srgbClr val="FFFFFF"/>
+                  </a:solidFill>
+                  <a:latin typeface="Arial"/>
+                </a:rPr>
+                <a:t>2</a:t>
+              </a:r>
+              <a:endParaRPr lang="en-US" sz="375">
+                <a:solidFill>
+                  <a:srgbClr val="FFFFFF"/>
+                </a:solidFill>
+                <a:latin typeface="Arial"/>
+              </a:endParaRPr>
+            </a:p>
+          </p:txBody>
+        </p:sp>
+        <p:sp>
+          <p:nvSpPr>
+            <p:cNvPr id="31" name="Rounded Rectangle 30">
+              <a:extLst>
+                <a:ext uri="{FF2B5EF4-FFF2-40B4-BE49-F238E27FC236}">
+                  <a16:creationId xmlns:a16="http://schemas.microsoft.com/office/drawing/2014/main" id="{2FC00369-550F-1D47-959E-8E43C24D3F4F}"/>
+                </a:ext>
+              </a:extLst>
+            </p:cNvPr>
+            <p:cNvSpPr/>
+            <p:nvPr/>
+          </p:nvSpPr>
+          <p:spPr bwMode="auto">
+            <a:xfrm>
+              <a:off x="1606093" y="1635094"/>
+              <a:ext cx="138128" cy="411476"/>
+            </a:xfrm>
+            <a:prstGeom prst="roundRect">
+              <a:avLst/>
+            </a:prstGeom>
+            <a:solidFill>
+              <a:schemeClr val="bg1">
+                <a:lumMod val="50000"/>
+              </a:schemeClr>
+            </a:solidFill>
+            <a:ln>
+              <a:solidFill>
+                <a:schemeClr val="bg1"/>
+              </a:solidFill>
+              <a:prstDash val="solid"/>
+              <a:headEnd type="none" w="med" len="med"/>
+              <a:tailEnd type="none" w="med" len="med"/>
+            </a:ln>
+            <a:effectLst/>
+          </p:spPr>
+          <p:style>
+            <a:lnRef idx="1">
+              <a:schemeClr val="accent5"/>
+            </a:lnRef>
+            <a:fillRef idx="3">
+              <a:schemeClr val="accent5"/>
+            </a:fillRef>
+            <a:effectRef idx="2">
+              <a:schemeClr val="accent5"/>
+            </a:effectRef>
+            <a:fontRef idx="minor">
+              <a:schemeClr val="lt1"/>
+            </a:fontRef>
+          </p:style>
+          <p:txBody>
+            <a:bodyPr vert="horz" wrap="square" lIns="0" tIns="0" rIns="0" bIns="0" numCol="1" rtlCol="0" anchor="ctr" anchorCtr="0" compatLnSpc="1">
+              <a:prstTxWarp prst="textNoShape">
+                <a:avLst/>
+              </a:prstTxWarp>
+              <a:noAutofit/>
+            </a:bodyPr>
+            <a:lstStyle/>
+            <a:p>
+              <a:pPr algn="ctr" defTabSz="685784" eaLnBrk="0" fontAlgn="base" hangingPunct="0">
+                <a:lnSpc>
+                  <a:spcPct val="90000"/>
+                </a:lnSpc>
+                <a:spcBef>
+                  <a:spcPct val="0"/>
+                </a:spcBef>
+                <a:spcAft>
+                  <a:spcPct val="0"/>
+                </a:spcAft>
+              </a:pPr>
+              <a:r>
+                <a:rPr lang="en-US" sz="675">
+                  <a:solidFill>
+                    <a:srgbClr val="FFFFFF"/>
+                  </a:solidFill>
+                  <a:latin typeface="Arial"/>
+                </a:rPr>
+                <a:t>3</a:t>
+              </a:r>
+              <a:endParaRPr lang="en-US" sz="375">
+                <a:solidFill>
+                  <a:srgbClr val="FFFFFF"/>
+                </a:solidFill>
+                <a:latin typeface="Arial"/>
+              </a:endParaRPr>
+            </a:p>
+          </p:txBody>
+        </p:sp>
+        <p:sp>
+          <p:nvSpPr>
+            <p:cNvPr id="32" name="Rounded Rectangle 31">
+              <a:extLst>
+                <a:ext uri="{FF2B5EF4-FFF2-40B4-BE49-F238E27FC236}">
+                  <a16:creationId xmlns:a16="http://schemas.microsoft.com/office/drawing/2014/main" id="{CEA02F82-9665-7243-AA5C-E8A8BC93F3C2}"/>
+                </a:ext>
+              </a:extLst>
+            </p:cNvPr>
+            <p:cNvSpPr/>
+            <p:nvPr/>
+          </p:nvSpPr>
+          <p:spPr bwMode="auto">
+            <a:xfrm>
+              <a:off x="1744220" y="1635094"/>
+              <a:ext cx="138128" cy="411476"/>
+            </a:xfrm>
+            <a:prstGeom prst="roundRect">
+              <a:avLst/>
+            </a:prstGeom>
+            <a:solidFill>
+              <a:schemeClr val="bg1">
+                <a:lumMod val="50000"/>
+              </a:schemeClr>
+            </a:solidFill>
+            <a:ln>
+              <a:solidFill>
+                <a:schemeClr val="bg1"/>
+              </a:solidFill>
+              <a:prstDash val="solid"/>
+              <a:headEnd type="none" w="med" len="med"/>
+              <a:tailEnd type="none" w="med" len="med"/>
+            </a:ln>
+            <a:effectLst/>
+          </p:spPr>
+          <p:style>
+            <a:lnRef idx="1">
+              <a:schemeClr val="accent5"/>
+            </a:lnRef>
+            <a:fillRef idx="3">
+              <a:schemeClr val="accent5"/>
+            </a:fillRef>
+            <a:effectRef idx="2">
+              <a:schemeClr val="accent5"/>
+            </a:effectRef>
+            <a:fontRef idx="minor">
+              <a:schemeClr val="lt1"/>
+            </a:fontRef>
+          </p:style>
+          <p:txBody>
+            <a:bodyPr vert="horz" wrap="square" lIns="0" tIns="0" rIns="0" bIns="0" numCol="1" rtlCol="0" anchor="ctr" anchorCtr="0" compatLnSpc="1">
+              <a:prstTxWarp prst="textNoShape">
+                <a:avLst/>
+              </a:prstTxWarp>
+              <a:noAutofit/>
+            </a:bodyPr>
+            <a:lstStyle/>
+            <a:p>
+              <a:pPr algn="ctr" defTabSz="685784" eaLnBrk="0" fontAlgn="base" hangingPunct="0">
+                <a:lnSpc>
+                  <a:spcPct val="90000"/>
+                </a:lnSpc>
+                <a:spcBef>
+                  <a:spcPct val="0"/>
+                </a:spcBef>
+                <a:spcAft>
+                  <a:spcPct val="0"/>
+                </a:spcAft>
+              </a:pPr>
+              <a:r>
+                <a:rPr lang="en-US" sz="675">
+                  <a:solidFill>
+                    <a:srgbClr val="FFFFFF"/>
+                  </a:solidFill>
+                  <a:latin typeface="Arial"/>
+                </a:rPr>
+                <a:t>4</a:t>
+              </a:r>
+              <a:endParaRPr lang="en-US" sz="375">
+                <a:solidFill>
+                  <a:srgbClr val="FFFFFF"/>
+                </a:solidFill>
+                <a:latin typeface="Arial"/>
+              </a:endParaRPr>
+            </a:p>
+          </p:txBody>
+        </p:sp>
+        <p:sp>
+          <p:nvSpPr>
+            <p:cNvPr id="33" name="Rounded Rectangle 32">
+              <a:extLst>
+                <a:ext uri="{FF2B5EF4-FFF2-40B4-BE49-F238E27FC236}">
+                  <a16:creationId xmlns:a16="http://schemas.microsoft.com/office/drawing/2014/main" id="{23355CB8-33EA-2344-9D2F-FD6C81E06FC2}"/>
+                </a:ext>
+              </a:extLst>
+            </p:cNvPr>
+            <p:cNvSpPr/>
+            <p:nvPr/>
+          </p:nvSpPr>
+          <p:spPr bwMode="auto">
+            <a:xfrm>
+              <a:off x="1874043" y="1635094"/>
+              <a:ext cx="138128" cy="411476"/>
+            </a:xfrm>
+            <a:prstGeom prst="roundRect">
+              <a:avLst/>
+            </a:prstGeom>
+            <a:solidFill>
+              <a:schemeClr val="bg1">
+                <a:lumMod val="50000"/>
+              </a:schemeClr>
+            </a:solidFill>
+            <a:ln>
+              <a:solidFill>
+                <a:schemeClr val="bg1"/>
+              </a:solidFill>
+              <a:prstDash val="solid"/>
+              <a:headEnd type="none" w="med" len="med"/>
+              <a:tailEnd type="none" w="med" len="med"/>
+            </a:ln>
+            <a:effectLst/>
+          </p:spPr>
+          <p:style>
+            <a:lnRef idx="1">
+              <a:schemeClr val="accent5"/>
+            </a:lnRef>
+            <a:fillRef idx="3">
+              <a:schemeClr val="accent5"/>
+            </a:fillRef>
+            <a:effectRef idx="2">
+              <a:schemeClr val="accent5"/>
+            </a:effectRef>
+            <a:fontRef idx="minor">
+              <a:schemeClr val="lt1"/>
+            </a:fontRef>
+          </p:style>
+          <p:txBody>
+            <a:bodyPr vert="horz" wrap="square" lIns="0" tIns="0" rIns="0" bIns="0" numCol="1" rtlCol="0" anchor="ctr" anchorCtr="0" compatLnSpc="1">
+              <a:prstTxWarp prst="textNoShape">
+                <a:avLst/>
+              </a:prstTxWarp>
+              <a:noAutofit/>
+            </a:bodyPr>
+            <a:lstStyle/>
+            <a:p>
+              <a:pPr algn="ctr" defTabSz="685784" eaLnBrk="0" fontAlgn="base" hangingPunct="0">
+                <a:lnSpc>
+                  <a:spcPct val="90000"/>
+                </a:lnSpc>
+                <a:spcBef>
+                  <a:spcPct val="0"/>
+                </a:spcBef>
+                <a:spcAft>
+                  <a:spcPct val="0"/>
+                </a:spcAft>
+              </a:pPr>
+              <a:r>
+                <a:rPr lang="en-US" sz="675">
+                  <a:solidFill>
+                    <a:srgbClr val="FFFFFF"/>
+                  </a:solidFill>
+                  <a:latin typeface="Arial"/>
+                </a:rPr>
+                <a:t>5</a:t>
+              </a:r>
+              <a:endParaRPr lang="en-US" sz="375">
+                <a:solidFill>
+                  <a:srgbClr val="FFFFFF"/>
+                </a:solidFill>
+                <a:latin typeface="Arial"/>
+              </a:endParaRPr>
+            </a:p>
+          </p:txBody>
+        </p:sp>
+      </p:grpSp>
+      <p:sp>
+        <p:nvSpPr>
+          <p:cNvPr id="34" name="AutoShape 4">
+            <a:extLst>
+              <a:ext uri="{FF2B5EF4-FFF2-40B4-BE49-F238E27FC236}">
+                <a16:creationId xmlns:a16="http://schemas.microsoft.com/office/drawing/2014/main" id="{B1D40963-EC1B-E049-A09B-96D331A21F58}"/>
+              </a:ext>
+            </a:extLst>
+          </p:cNvPr>
+          <p:cNvSpPr>
+            <a:spLocks noChangeArrowheads="1"/>
+          </p:cNvSpPr>
+          <p:nvPr/>
+        </p:nvSpPr>
+        <p:spPr bwMode="auto">
+          <a:xfrm>
+            <a:off x="360994" y="1065752"/>
+            <a:ext cx="3893392" cy="1027599"/>
+          </a:xfrm>
+          <a:prstGeom prst="roundRect">
+            <a:avLst>
+              <a:gd name="adj" fmla="val 7117"/>
+            </a:avLst>
+          </a:prstGeom>
+          <a:noFill/>
+          <a:ln w="12700">
+            <a:solidFill>
+              <a:schemeClr val="accent3"/>
+            </a:solidFill>
+            <a:prstDash val="dash"/>
+            <a:round/>
+            <a:headEnd/>
+            <a:tailEnd/>
+          </a:ln>
+        </p:spPr>
+        <p:txBody>
+          <a:bodyPr lIns="0" tIns="0" rIns="0" bIns="0" anchor="t" anchorCtr="1"/>
+          <a:lstStyle/>
+          <a:p>
+            <a:pPr algn="ctr" eaLnBrk="0" fontAlgn="base" hangingPunct="0">
+              <a:spcBef>
+                <a:spcPct val="0"/>
+              </a:spcBef>
+              <a:spcAft>
+                <a:spcPct val="0"/>
+              </a:spcAft>
+            </a:pPr>
+            <a:r>
+              <a:rPr lang="en-US" sz="750">
+                <a:solidFill>
+                  <a:srgbClr val="6D7777"/>
+                </a:solidFill>
+                <a:latin typeface="Arial" panose="020B0604020202020204" pitchFamily="34" charset="0"/>
+                <a:cs typeface="Arial" panose="020B0604020202020204" pitchFamily="34" charset="0"/>
+              </a:rPr>
+              <a:t>Kafka Cluster</a:t>
+            </a:r>
+          </a:p>
+        </p:txBody>
+      </p:sp>
+      <p:sp>
+        <p:nvSpPr>
+          <p:cNvPr id="51" name="Rounded Rectangle 50">
+            <a:extLst>
+              <a:ext uri="{FF2B5EF4-FFF2-40B4-BE49-F238E27FC236}">
+                <a16:creationId xmlns:a16="http://schemas.microsoft.com/office/drawing/2014/main" id="{6A15D4F8-9899-8240-BB05-FA0F6F1A556B}"/>
+              </a:ext>
+            </a:extLst>
+          </p:cNvPr>
+          <p:cNvSpPr/>
+          <p:nvPr/>
+        </p:nvSpPr>
+        <p:spPr>
+          <a:xfrm>
+            <a:off x="356431" y="2423568"/>
+            <a:ext cx="987079" cy="385454"/>
+          </a:xfrm>
+          <a:prstGeom prst="roundRect">
+            <a:avLst/>
+          </a:prstGeom>
+          <a:solidFill>
+            <a:schemeClr val="tx2">
+              <a:lumMod val="75000"/>
+            </a:schemeClr>
+          </a:solidFill>
+          <a:ln>
+            <a:noFill/>
+          </a:ln>
+          <a:effectLst>
+            <a:outerShdw blurRad="50800" dist="38100" dir="5400000" algn="t" rotWithShape="0">
+              <a:prstClr val="black">
+                <a:alpha val="40000"/>
+              </a:prstClr>
+            </a:outerShdw>
+          </a:effectLst>
+        </p:spPr>
+        <p:style>
+          <a:lnRef idx="2">
+            <a:schemeClr val="accent1">
+              <a:shade val="50000"/>
+            </a:schemeClr>
+          </a:lnRef>
+          <a:fillRef idx="1">
+            <a:schemeClr val="accent1"/>
+          </a:fillRef>
+          <a:effectRef idx="0">
+            <a:schemeClr val="accent1"/>
+          </a:effectRef>
+          <a:fontRef idx="minor">
+            <a:schemeClr val="lt1"/>
+          </a:fontRef>
+        </p:style>
+        <p:txBody>
+          <a:bodyPr rtlCol="0" anchor="t"/>
+          <a:lstStyle/>
+          <a:p>
+            <a:pPr algn="ctr" defTabSz="514350"/>
+            <a:r>
+              <a:rPr lang="en-US" sz="750" dirty="0">
+                <a:solidFill>
+                  <a:prstClr val="white"/>
+                </a:solidFill>
+                <a:latin typeface="Arial"/>
+              </a:rPr>
+              <a:t>Perf Consumer App</a:t>
+            </a:r>
+          </a:p>
+        </p:txBody>
+      </p:sp>
+      <p:sp>
+        <p:nvSpPr>
+          <p:cNvPr id="52" name="Cloud 51">
+            <a:extLst>
+              <a:ext uri="{FF2B5EF4-FFF2-40B4-BE49-F238E27FC236}">
+                <a16:creationId xmlns:a16="http://schemas.microsoft.com/office/drawing/2014/main" id="{4695F1F6-1E1D-364B-B95A-5F6E3043E184}"/>
+              </a:ext>
+            </a:extLst>
+          </p:cNvPr>
+          <p:cNvSpPr/>
+          <p:nvPr/>
+        </p:nvSpPr>
+        <p:spPr>
+          <a:xfrm rot="16200000">
+            <a:off x="3800806" y="2418013"/>
+            <a:ext cx="1442045" cy="393701"/>
+          </a:xfrm>
+          <a:prstGeom prst="cloud">
+            <a:avLst/>
+          </a:prstGeom>
+          <a:noFill/>
+          <a:ln>
+            <a:solidFill>
+              <a:schemeClr val="tx2">
+                <a:lumMod val="60000"/>
+                <a:lumOff val="40000"/>
+              </a:schemeClr>
+            </a:solidFill>
+          </a:ln>
+        </p:spPr>
+        <p:style>
+          <a:lnRef idx="2">
+            <a:schemeClr val="accent1">
+              <a:shade val="50000"/>
+            </a:schemeClr>
+          </a:lnRef>
+          <a:fillRef idx="1">
+            <a:schemeClr val="accent1"/>
+          </a:fillRef>
+          <a:effectRef idx="0">
+            <a:schemeClr val="accent1"/>
+          </a:effectRef>
+          <a:fontRef idx="minor">
+            <a:schemeClr val="lt1"/>
+          </a:fontRef>
+        </p:style>
+        <p:txBody>
+          <a:bodyPr rtlCol="0" anchor="ctr"/>
+          <a:lstStyle/>
+          <a:p>
+            <a:pPr algn="ctr" eaLnBrk="0" fontAlgn="base" hangingPunct="0">
+              <a:spcBef>
+                <a:spcPct val="0"/>
+              </a:spcBef>
+              <a:spcAft>
+                <a:spcPct val="0"/>
+              </a:spcAft>
+            </a:pPr>
+            <a:endParaRPr lang="en-US">
+              <a:solidFill>
+                <a:srgbClr val="FFFFFF"/>
+              </a:solidFill>
+              <a:latin typeface="Arial"/>
+            </a:endParaRPr>
+          </a:p>
+        </p:txBody>
+      </p:sp>
+      <p:sp>
+        <p:nvSpPr>
+          <p:cNvPr id="38" name="Rounded Rectangle 37">
+            <a:extLst>
+              <a:ext uri="{FF2B5EF4-FFF2-40B4-BE49-F238E27FC236}">
+                <a16:creationId xmlns:a16="http://schemas.microsoft.com/office/drawing/2014/main" id="{B8888133-CCF3-0944-9B5C-B88A02187A65}"/>
+              </a:ext>
+            </a:extLst>
+          </p:cNvPr>
+          <p:cNvSpPr/>
+          <p:nvPr/>
+        </p:nvSpPr>
+        <p:spPr>
+          <a:xfrm>
+            <a:off x="3041634" y="2639138"/>
+            <a:ext cx="994405" cy="411012"/>
+          </a:xfrm>
+          <a:prstGeom prst="roundRect">
+            <a:avLst/>
+          </a:prstGeom>
+          <a:solidFill>
+            <a:srgbClr val="7030A0"/>
+          </a:solidFill>
+          <a:ln>
+            <a:noFill/>
+          </a:ln>
+          <a:effectLst>
+            <a:outerShdw blurRad="50800" dist="38100" dir="5400000" algn="t" rotWithShape="0">
+              <a:prstClr val="black">
+                <a:alpha val="40000"/>
+              </a:prstClr>
+            </a:outerShdw>
+          </a:effectLst>
+        </p:spPr>
+        <p:style>
+          <a:lnRef idx="2">
+            <a:schemeClr val="accent1">
+              <a:shade val="50000"/>
+            </a:schemeClr>
+          </a:lnRef>
+          <a:fillRef idx="1">
+            <a:schemeClr val="accent1"/>
+          </a:fillRef>
+          <a:effectRef idx="0">
+            <a:schemeClr val="accent1"/>
+          </a:effectRef>
+          <a:fontRef idx="minor">
+            <a:schemeClr val="lt1"/>
+          </a:fontRef>
+        </p:style>
+        <p:txBody>
+          <a:bodyPr rtlCol="0" anchor="t"/>
+          <a:lstStyle/>
+          <a:p>
+            <a:pPr algn="ctr" defTabSz="514350"/>
+            <a:r>
+              <a:rPr lang="en-US" sz="750" dirty="0">
+                <a:solidFill>
+                  <a:prstClr val="white"/>
+                </a:solidFill>
+                <a:latin typeface="Arial"/>
+              </a:rPr>
+              <a:t>MirrorMaker 2.0</a:t>
+            </a:r>
+          </a:p>
+          <a:p>
+            <a:pPr algn="ctr" defTabSz="514350"/>
+            <a:r>
+              <a:rPr lang="en-US" sz="750" dirty="0">
+                <a:solidFill>
+                  <a:prstClr val="white"/>
+                </a:solidFill>
+              </a:rPr>
+              <a:t>esm-to-esi</a:t>
+            </a:r>
+            <a:endParaRPr lang="en-US" sz="750" dirty="0">
+              <a:solidFill>
+                <a:prstClr val="white"/>
+              </a:solidFill>
+              <a:latin typeface="Arial"/>
+            </a:endParaRPr>
+          </a:p>
+        </p:txBody>
+      </p:sp>
+      <p:sp>
+        <p:nvSpPr>
+          <p:cNvPr id="7" name="TextBox 6">
+            <a:extLst>
+              <a:ext uri="{FF2B5EF4-FFF2-40B4-BE49-F238E27FC236}">
+                <a16:creationId xmlns:a16="http://schemas.microsoft.com/office/drawing/2014/main" id="{9C49EA51-B835-094C-91A0-D088AFF81C4B}"/>
+              </a:ext>
+            </a:extLst>
+          </p:cNvPr>
+          <p:cNvSpPr txBox="1"/>
+          <p:nvPr/>
+        </p:nvSpPr>
+        <p:spPr>
+          <a:xfrm>
+            <a:off x="566251" y="1052580"/>
+            <a:ext cx="971741" cy="246221"/>
+          </a:xfrm>
+          <a:prstGeom prst="rect">
+            <a:avLst/>
+          </a:prstGeom>
+          <a:noFill/>
+        </p:spPr>
+        <p:txBody>
+          <a:bodyPr wrap="none" rtlCol="0">
+            <a:spAutoFit/>
+          </a:bodyPr>
+          <a:lstStyle/>
+          <a:p>
+            <a:pPr eaLnBrk="0" fontAlgn="base" hangingPunct="0">
+              <a:spcBef>
+                <a:spcPct val="0"/>
+              </a:spcBef>
+              <a:spcAft>
+                <a:spcPct val="0"/>
+              </a:spcAft>
+            </a:pPr>
+            <a:r>
+              <a:rPr lang="en-US" sz="1000" dirty="0">
+                <a:solidFill>
+                  <a:srgbClr val="6D7777"/>
+                </a:solidFill>
+                <a:latin typeface="Arial" panose="020B0604020202020204" pitchFamily="34" charset="0"/>
+                <a:cs typeface="Arial" panose="020B0604020202020204" pitchFamily="34" charset="0"/>
+              </a:rPr>
+              <a:t>esm.accounts</a:t>
+            </a:r>
+          </a:p>
+        </p:txBody>
+      </p:sp>
+      <p:sp>
+        <p:nvSpPr>
+          <p:cNvPr id="39" name="TextBox 38">
+            <a:extLst>
+              <a:ext uri="{FF2B5EF4-FFF2-40B4-BE49-F238E27FC236}">
+                <a16:creationId xmlns:a16="http://schemas.microsoft.com/office/drawing/2014/main" id="{E43F178F-4B90-3F45-964F-1FF716720D0E}"/>
+              </a:ext>
+            </a:extLst>
+          </p:cNvPr>
+          <p:cNvSpPr txBox="1"/>
+          <p:nvPr/>
+        </p:nvSpPr>
+        <p:spPr>
+          <a:xfrm>
+            <a:off x="5479778" y="1019514"/>
+            <a:ext cx="694421" cy="246221"/>
+          </a:xfrm>
+          <a:prstGeom prst="rect">
+            <a:avLst/>
+          </a:prstGeom>
+          <a:noFill/>
+        </p:spPr>
+        <p:txBody>
+          <a:bodyPr wrap="none" rtlCol="0">
+            <a:spAutoFit/>
+          </a:bodyPr>
+          <a:lstStyle/>
+          <a:p>
+            <a:pPr eaLnBrk="0" fontAlgn="base" hangingPunct="0">
+              <a:spcBef>
+                <a:spcPct val="0"/>
+              </a:spcBef>
+              <a:spcAft>
+                <a:spcPct val="0"/>
+              </a:spcAft>
+            </a:pPr>
+            <a:r>
+              <a:rPr lang="en-US" sz="1000" dirty="0">
+                <a:solidFill>
+                  <a:srgbClr val="6D7777"/>
+                </a:solidFill>
+                <a:latin typeface="Arial" panose="020B0604020202020204" pitchFamily="34" charset="0"/>
+                <a:cs typeface="Arial" panose="020B0604020202020204" pitchFamily="34" charset="0"/>
+              </a:rPr>
+              <a:t>accounts</a:t>
+            </a:r>
+          </a:p>
+        </p:txBody>
+      </p:sp>
+      <p:cxnSp>
+        <p:nvCxnSpPr>
+          <p:cNvPr id="21" name="Elbow Connector 20">
+            <a:extLst>
+              <a:ext uri="{FF2B5EF4-FFF2-40B4-BE49-F238E27FC236}">
+                <a16:creationId xmlns:a16="http://schemas.microsoft.com/office/drawing/2014/main" id="{1FA5726D-2767-B849-85A3-7CAA002588F7}"/>
+              </a:ext>
+            </a:extLst>
+          </p:cNvPr>
+          <p:cNvCxnSpPr>
+            <a:cxnSpLocks/>
+            <a:stCxn id="11" idx="2"/>
+            <a:endCxn id="38" idx="3"/>
+          </p:cNvCxnSpPr>
+          <p:nvPr/>
+        </p:nvCxnSpPr>
+        <p:spPr>
+          <a:xfrm rot="5400000">
+            <a:off x="4413587" y="1229122"/>
+            <a:ext cx="1237975" cy="1993069"/>
+          </a:xfrm>
+          <a:prstGeom prst="bentConnector2">
+            <a:avLst/>
+          </a:prstGeom>
+          <a:ln w="12700">
+            <a:solidFill>
+              <a:srgbClr val="953FDA"/>
+            </a:solidFill>
+            <a:tailEnd type="triangle"/>
+          </a:ln>
+          <a:effectLst/>
+        </p:spPr>
+        <p:style>
+          <a:lnRef idx="2">
+            <a:schemeClr val="accent1"/>
+          </a:lnRef>
+          <a:fillRef idx="0">
+            <a:schemeClr val="accent1"/>
+          </a:fillRef>
+          <a:effectRef idx="1">
+            <a:schemeClr val="accent1"/>
+          </a:effectRef>
+          <a:fontRef idx="minor">
+            <a:schemeClr val="tx1"/>
+          </a:fontRef>
+        </p:style>
+      </p:cxnSp>
+      <p:cxnSp>
+        <p:nvCxnSpPr>
+          <p:cNvPr id="53" name="Elbow Connector 52">
+            <a:extLst>
+              <a:ext uri="{FF2B5EF4-FFF2-40B4-BE49-F238E27FC236}">
+                <a16:creationId xmlns:a16="http://schemas.microsoft.com/office/drawing/2014/main" id="{0DC1C79B-85E9-B246-88E9-908878ECC75B}"/>
+              </a:ext>
+            </a:extLst>
+          </p:cNvPr>
+          <p:cNvCxnSpPr>
+            <a:cxnSpLocks/>
+            <a:stCxn id="38" idx="1"/>
+            <a:endCxn id="33" idx="3"/>
+          </p:cNvCxnSpPr>
+          <p:nvPr/>
+        </p:nvCxnSpPr>
+        <p:spPr>
+          <a:xfrm rot="10800000">
+            <a:off x="1333078" y="1436832"/>
+            <a:ext cx="1708556" cy="1407813"/>
+          </a:xfrm>
+          <a:prstGeom prst="bentConnector3">
+            <a:avLst>
+              <a:gd name="adj1" fmla="val 50000"/>
+            </a:avLst>
+          </a:prstGeom>
+          <a:ln w="12700">
+            <a:solidFill>
+              <a:srgbClr val="7030A0"/>
+            </a:solidFill>
+            <a:tailEnd type="triangle"/>
+          </a:ln>
+          <a:effectLst/>
+        </p:spPr>
+        <p:style>
+          <a:lnRef idx="2">
+            <a:schemeClr val="accent1"/>
+          </a:lnRef>
+          <a:fillRef idx="0">
+            <a:schemeClr val="accent1"/>
+          </a:fillRef>
+          <a:effectRef idx="1">
+            <a:schemeClr val="accent1"/>
+          </a:effectRef>
+          <a:fontRef idx="minor">
+            <a:schemeClr val="tx1"/>
+          </a:fontRef>
+        </p:style>
+      </p:cxnSp>
+      <p:sp>
+        <p:nvSpPr>
+          <p:cNvPr id="54" name="Rounded Rectangle 53">
+            <a:extLst>
+              <a:ext uri="{FF2B5EF4-FFF2-40B4-BE49-F238E27FC236}">
+                <a16:creationId xmlns:a16="http://schemas.microsoft.com/office/drawing/2014/main" id="{BCDFEE58-EA3C-BF4F-8577-559474779C96}"/>
+              </a:ext>
+            </a:extLst>
+          </p:cNvPr>
+          <p:cNvSpPr/>
+          <p:nvPr/>
+        </p:nvSpPr>
+        <p:spPr>
+          <a:xfrm>
+            <a:off x="7096234" y="2639138"/>
+            <a:ext cx="994405" cy="292973"/>
+          </a:xfrm>
+          <a:prstGeom prst="roundRect">
+            <a:avLst/>
+          </a:prstGeom>
+          <a:solidFill>
+            <a:srgbClr val="7030A0"/>
+          </a:solidFill>
+          <a:ln>
+            <a:noFill/>
+          </a:ln>
+          <a:effectLst>
+            <a:outerShdw blurRad="50800" dist="38100" dir="5400000" algn="t" rotWithShape="0">
+              <a:prstClr val="black">
+                <a:alpha val="40000"/>
+              </a:prstClr>
+            </a:outerShdw>
+          </a:effectLst>
+        </p:spPr>
+        <p:style>
+          <a:lnRef idx="2">
+            <a:schemeClr val="accent1">
+              <a:shade val="50000"/>
+            </a:schemeClr>
+          </a:lnRef>
+          <a:fillRef idx="1">
+            <a:schemeClr val="accent1"/>
+          </a:fillRef>
+          <a:effectRef idx="0">
+            <a:schemeClr val="accent1"/>
+          </a:effectRef>
+          <a:fontRef idx="minor">
+            <a:schemeClr val="lt1"/>
+          </a:fontRef>
+        </p:style>
+        <p:txBody>
+          <a:bodyPr rtlCol="0" anchor="t"/>
+          <a:lstStyle/>
+          <a:p>
+            <a:pPr algn="ctr" defTabSz="514350"/>
+            <a:r>
+              <a:rPr lang="en-US" sz="750" dirty="0">
+                <a:solidFill>
+                  <a:prstClr val="white"/>
+                </a:solidFill>
+                <a:latin typeface="Arial"/>
+              </a:rPr>
+              <a:t>MirrorMaker 2.0</a:t>
+            </a:r>
+          </a:p>
+          <a:p>
+            <a:pPr algn="ctr" defTabSz="514350"/>
+            <a:r>
+              <a:rPr lang="en-US" sz="750" dirty="0">
+                <a:solidFill>
+                  <a:prstClr val="white"/>
+                </a:solidFill>
+              </a:rPr>
+              <a:t>esi-to-esm</a:t>
+            </a:r>
+            <a:endParaRPr lang="en-US" sz="750" dirty="0">
+              <a:solidFill>
+                <a:prstClr val="white"/>
+              </a:solidFill>
+              <a:latin typeface="Arial"/>
+            </a:endParaRPr>
+          </a:p>
+        </p:txBody>
+      </p:sp>
+      <p:grpSp>
+        <p:nvGrpSpPr>
+          <p:cNvPr id="27" name="Group 26">
+            <a:extLst>
+              <a:ext uri="{FF2B5EF4-FFF2-40B4-BE49-F238E27FC236}">
+                <a16:creationId xmlns:a16="http://schemas.microsoft.com/office/drawing/2014/main" id="{0133CC9E-8289-8846-893F-ED90BFCE9071}"/>
+              </a:ext>
+            </a:extLst>
+          </p:cNvPr>
+          <p:cNvGrpSpPr/>
+          <p:nvPr/>
+        </p:nvGrpSpPr>
+        <p:grpSpPr>
+          <a:xfrm>
+            <a:off x="2988263" y="1210397"/>
+            <a:ext cx="550574" cy="411476"/>
+            <a:chOff x="4142228" y="2170290"/>
+            <a:chExt cx="734098" cy="548634"/>
+          </a:xfrm>
+          <a:solidFill>
+            <a:schemeClr val="accent2"/>
+          </a:solidFill>
+        </p:grpSpPr>
+        <p:sp>
+          <p:nvSpPr>
+            <p:cNvPr id="55" name="Rounded Rectangle 54">
+              <a:extLst>
+                <a:ext uri="{FF2B5EF4-FFF2-40B4-BE49-F238E27FC236}">
+                  <a16:creationId xmlns:a16="http://schemas.microsoft.com/office/drawing/2014/main" id="{92B84068-862F-214A-AFC7-BB3F876418C7}"/>
+                </a:ext>
+              </a:extLst>
+            </p:cNvPr>
+            <p:cNvSpPr/>
+            <p:nvPr/>
+          </p:nvSpPr>
+          <p:spPr bwMode="auto">
+            <a:xfrm>
+              <a:off x="4142228" y="2170290"/>
+              <a:ext cx="184171" cy="548634"/>
+            </a:xfrm>
+            <a:prstGeom prst="roundRect">
+              <a:avLst/>
+            </a:prstGeom>
+            <a:grpFill/>
+            <a:ln>
+              <a:solidFill>
+                <a:schemeClr val="bg1"/>
+              </a:solidFill>
+              <a:prstDash val="solid"/>
+              <a:headEnd type="none" w="med" len="med"/>
+              <a:tailEnd type="none" w="med" len="med"/>
+            </a:ln>
+            <a:effectLst/>
+          </p:spPr>
+          <p:style>
+            <a:lnRef idx="1">
+              <a:schemeClr val="accent5"/>
+            </a:lnRef>
+            <a:fillRef idx="3">
+              <a:schemeClr val="accent5"/>
+            </a:fillRef>
+            <a:effectRef idx="2">
+              <a:schemeClr val="accent5"/>
+            </a:effectRef>
+            <a:fontRef idx="minor">
+              <a:schemeClr val="lt1"/>
+            </a:fontRef>
+          </p:style>
+          <p:txBody>
+            <a:bodyPr vert="horz" wrap="square" lIns="0" tIns="0" rIns="0" bIns="0" numCol="1" rtlCol="0" anchor="ctr" anchorCtr="0" compatLnSpc="1">
+              <a:prstTxWarp prst="textNoShape">
+                <a:avLst/>
+              </a:prstTxWarp>
+              <a:noAutofit/>
+            </a:bodyPr>
+            <a:lstStyle/>
+            <a:p>
+              <a:pPr algn="ctr" defTabSz="685784" eaLnBrk="0" fontAlgn="base" hangingPunct="0">
+                <a:lnSpc>
+                  <a:spcPct val="90000"/>
+                </a:lnSpc>
+                <a:spcBef>
+                  <a:spcPct val="0"/>
+                </a:spcBef>
+                <a:spcAft>
+                  <a:spcPct val="0"/>
+                </a:spcAft>
+              </a:pPr>
+              <a:r>
+                <a:rPr lang="en-US" sz="675">
+                  <a:solidFill>
+                    <a:srgbClr val="FFFFFF"/>
+                  </a:solidFill>
+                  <a:latin typeface="Arial"/>
+                </a:rPr>
+                <a:t>0</a:t>
+              </a:r>
+              <a:endParaRPr lang="en-US" sz="375">
+                <a:solidFill>
+                  <a:srgbClr val="FFFFFF"/>
+                </a:solidFill>
+                <a:latin typeface="Arial"/>
+              </a:endParaRPr>
+            </a:p>
+          </p:txBody>
+        </p:sp>
+        <p:sp>
+          <p:nvSpPr>
+            <p:cNvPr id="56" name="Rounded Rectangle 55">
+              <a:extLst>
+                <a:ext uri="{FF2B5EF4-FFF2-40B4-BE49-F238E27FC236}">
+                  <a16:creationId xmlns:a16="http://schemas.microsoft.com/office/drawing/2014/main" id="{5F0AA40F-B79A-BC4E-9403-E1032F2A0869}"/>
+                </a:ext>
+              </a:extLst>
+            </p:cNvPr>
+            <p:cNvSpPr/>
+            <p:nvPr/>
+          </p:nvSpPr>
+          <p:spPr bwMode="auto">
+            <a:xfrm>
+              <a:off x="4325105" y="2170290"/>
+              <a:ext cx="184171" cy="548634"/>
+            </a:xfrm>
+            <a:prstGeom prst="roundRect">
+              <a:avLst/>
+            </a:prstGeom>
+            <a:grpFill/>
+            <a:ln>
+              <a:solidFill>
+                <a:schemeClr val="bg1"/>
+              </a:solidFill>
+              <a:prstDash val="solid"/>
+              <a:headEnd type="none" w="med" len="med"/>
+              <a:tailEnd type="none" w="med" len="med"/>
+            </a:ln>
+            <a:effectLst/>
+          </p:spPr>
+          <p:style>
+            <a:lnRef idx="1">
+              <a:schemeClr val="accent5"/>
+            </a:lnRef>
+            <a:fillRef idx="3">
+              <a:schemeClr val="accent5"/>
+            </a:fillRef>
+            <a:effectRef idx="2">
+              <a:schemeClr val="accent5"/>
+            </a:effectRef>
+            <a:fontRef idx="minor">
+              <a:schemeClr val="lt1"/>
+            </a:fontRef>
+          </p:style>
+          <p:txBody>
+            <a:bodyPr vert="horz" wrap="square" lIns="0" tIns="0" rIns="0" bIns="0" numCol="1" rtlCol="0" anchor="ctr" anchorCtr="0" compatLnSpc="1">
+              <a:prstTxWarp prst="textNoShape">
+                <a:avLst/>
+              </a:prstTxWarp>
+              <a:noAutofit/>
+            </a:bodyPr>
+            <a:lstStyle/>
+            <a:p>
+              <a:pPr algn="ctr" defTabSz="685784" eaLnBrk="0" fontAlgn="base" hangingPunct="0">
+                <a:lnSpc>
+                  <a:spcPct val="90000"/>
+                </a:lnSpc>
+                <a:spcBef>
+                  <a:spcPct val="0"/>
+                </a:spcBef>
+                <a:spcAft>
+                  <a:spcPct val="0"/>
+                </a:spcAft>
+              </a:pPr>
+              <a:r>
+                <a:rPr lang="en-US" sz="675">
+                  <a:solidFill>
+                    <a:srgbClr val="FFFFFF"/>
+                  </a:solidFill>
+                  <a:latin typeface="Arial"/>
+                </a:rPr>
+                <a:t>1</a:t>
+              </a:r>
+              <a:endParaRPr lang="en-US" sz="375">
+                <a:solidFill>
+                  <a:srgbClr val="FFFFFF"/>
+                </a:solidFill>
+                <a:latin typeface="Arial"/>
+              </a:endParaRPr>
+            </a:p>
+          </p:txBody>
+        </p:sp>
+        <p:sp>
+          <p:nvSpPr>
+            <p:cNvPr id="57" name="Rounded Rectangle 56">
+              <a:extLst>
+                <a:ext uri="{FF2B5EF4-FFF2-40B4-BE49-F238E27FC236}">
+                  <a16:creationId xmlns:a16="http://schemas.microsoft.com/office/drawing/2014/main" id="{063DB5D0-7E32-ED46-9957-BB8A789CC107}"/>
+                </a:ext>
+              </a:extLst>
+            </p:cNvPr>
+            <p:cNvSpPr/>
+            <p:nvPr/>
+          </p:nvSpPr>
+          <p:spPr bwMode="auto">
+            <a:xfrm>
+              <a:off x="4509277" y="2170290"/>
+              <a:ext cx="184171" cy="548634"/>
+            </a:xfrm>
+            <a:prstGeom prst="roundRect">
+              <a:avLst/>
+            </a:prstGeom>
+            <a:grpFill/>
+            <a:ln>
+              <a:solidFill>
+                <a:schemeClr val="bg1"/>
+              </a:solidFill>
+              <a:prstDash val="solid"/>
+              <a:headEnd type="none" w="med" len="med"/>
+              <a:tailEnd type="none" w="med" len="med"/>
+            </a:ln>
+            <a:effectLst/>
+          </p:spPr>
+          <p:style>
+            <a:lnRef idx="1">
+              <a:schemeClr val="accent5"/>
+            </a:lnRef>
+            <a:fillRef idx="3">
+              <a:schemeClr val="accent5"/>
+            </a:fillRef>
+            <a:effectRef idx="2">
+              <a:schemeClr val="accent5"/>
+            </a:effectRef>
+            <a:fontRef idx="minor">
+              <a:schemeClr val="lt1"/>
+            </a:fontRef>
+          </p:style>
+          <p:txBody>
+            <a:bodyPr vert="horz" wrap="square" lIns="0" tIns="0" rIns="0" bIns="0" numCol="1" rtlCol="0" anchor="ctr" anchorCtr="0" compatLnSpc="1">
+              <a:prstTxWarp prst="textNoShape">
+                <a:avLst/>
+              </a:prstTxWarp>
+              <a:noAutofit/>
+            </a:bodyPr>
+            <a:lstStyle/>
+            <a:p>
+              <a:pPr algn="ctr" defTabSz="685784" eaLnBrk="0" fontAlgn="base" hangingPunct="0">
+                <a:lnSpc>
+                  <a:spcPct val="90000"/>
+                </a:lnSpc>
+                <a:spcBef>
+                  <a:spcPct val="0"/>
+                </a:spcBef>
+                <a:spcAft>
+                  <a:spcPct val="0"/>
+                </a:spcAft>
+              </a:pPr>
+              <a:r>
+                <a:rPr lang="en-US" sz="675">
+                  <a:solidFill>
+                    <a:srgbClr val="FFFFFF"/>
+                  </a:solidFill>
+                  <a:latin typeface="Arial"/>
+                </a:rPr>
+                <a:t>2</a:t>
+              </a:r>
+              <a:endParaRPr lang="en-US" sz="375">
+                <a:solidFill>
+                  <a:srgbClr val="FFFFFF"/>
+                </a:solidFill>
+                <a:latin typeface="Arial"/>
+              </a:endParaRPr>
+            </a:p>
+          </p:txBody>
+        </p:sp>
+        <p:sp>
+          <p:nvSpPr>
+            <p:cNvPr id="58" name="Rounded Rectangle 57">
+              <a:extLst>
+                <a:ext uri="{FF2B5EF4-FFF2-40B4-BE49-F238E27FC236}">
+                  <a16:creationId xmlns:a16="http://schemas.microsoft.com/office/drawing/2014/main" id="{CF3D7F0C-5550-B744-A29A-3C539C8C3FD1}"/>
+                </a:ext>
+              </a:extLst>
+            </p:cNvPr>
+            <p:cNvSpPr/>
+            <p:nvPr/>
+          </p:nvSpPr>
+          <p:spPr bwMode="auto">
+            <a:xfrm>
+              <a:off x="4692155" y="2170290"/>
+              <a:ext cx="184171" cy="548634"/>
+            </a:xfrm>
+            <a:prstGeom prst="roundRect">
+              <a:avLst/>
+            </a:prstGeom>
+            <a:grpFill/>
+            <a:ln>
+              <a:solidFill>
+                <a:schemeClr val="bg1"/>
+              </a:solidFill>
+              <a:prstDash val="solid"/>
+              <a:headEnd type="none" w="med" len="med"/>
+              <a:tailEnd type="none" w="med" len="med"/>
+            </a:ln>
+            <a:effectLst/>
+          </p:spPr>
+          <p:style>
+            <a:lnRef idx="1">
+              <a:schemeClr val="accent5"/>
+            </a:lnRef>
+            <a:fillRef idx="3">
+              <a:schemeClr val="accent5"/>
+            </a:fillRef>
+            <a:effectRef idx="2">
+              <a:schemeClr val="accent5"/>
+            </a:effectRef>
+            <a:fontRef idx="minor">
+              <a:schemeClr val="lt1"/>
+            </a:fontRef>
+          </p:style>
+          <p:txBody>
+            <a:bodyPr vert="horz" wrap="square" lIns="0" tIns="0" rIns="0" bIns="0" numCol="1" rtlCol="0" anchor="ctr" anchorCtr="0" compatLnSpc="1">
+              <a:prstTxWarp prst="textNoShape">
+                <a:avLst/>
+              </a:prstTxWarp>
+              <a:noAutofit/>
+            </a:bodyPr>
+            <a:lstStyle/>
+            <a:p>
+              <a:pPr algn="ctr" defTabSz="685784" eaLnBrk="0" fontAlgn="base" hangingPunct="0">
+                <a:lnSpc>
+                  <a:spcPct val="90000"/>
+                </a:lnSpc>
+                <a:spcBef>
+                  <a:spcPct val="0"/>
+                </a:spcBef>
+                <a:spcAft>
+                  <a:spcPct val="0"/>
+                </a:spcAft>
+              </a:pPr>
+              <a:r>
+                <a:rPr lang="en-US" sz="675">
+                  <a:solidFill>
+                    <a:srgbClr val="FFFFFF"/>
+                  </a:solidFill>
+                  <a:latin typeface="Arial"/>
+                </a:rPr>
+                <a:t>3</a:t>
+              </a:r>
+              <a:endParaRPr lang="en-US" sz="375">
+                <a:solidFill>
+                  <a:srgbClr val="FFFFFF"/>
+                </a:solidFill>
+                <a:latin typeface="Arial"/>
+              </a:endParaRPr>
+            </a:p>
+          </p:txBody>
+        </p:sp>
+      </p:grpSp>
+      <p:grpSp>
+        <p:nvGrpSpPr>
+          <p:cNvPr id="59" name="Group 58">
+            <a:extLst>
+              <a:ext uri="{FF2B5EF4-FFF2-40B4-BE49-F238E27FC236}">
+                <a16:creationId xmlns:a16="http://schemas.microsoft.com/office/drawing/2014/main" id="{FD5AA850-537D-3E4E-8CE2-1A4B2824A233}"/>
+              </a:ext>
+            </a:extLst>
+          </p:cNvPr>
+          <p:cNvGrpSpPr/>
+          <p:nvPr/>
+        </p:nvGrpSpPr>
+        <p:grpSpPr>
+          <a:xfrm>
+            <a:off x="7803877" y="1229992"/>
+            <a:ext cx="550574" cy="411476"/>
+            <a:chOff x="4142228" y="2170290"/>
+            <a:chExt cx="734098" cy="548634"/>
+          </a:xfrm>
+          <a:solidFill>
+            <a:schemeClr val="accent2"/>
+          </a:solidFill>
+        </p:grpSpPr>
+        <p:sp>
+          <p:nvSpPr>
+            <p:cNvPr id="60" name="Rounded Rectangle 59">
+              <a:extLst>
+                <a:ext uri="{FF2B5EF4-FFF2-40B4-BE49-F238E27FC236}">
+                  <a16:creationId xmlns:a16="http://schemas.microsoft.com/office/drawing/2014/main" id="{A20AC59D-8FFD-7348-9C18-392BF6BA646D}"/>
+                </a:ext>
+              </a:extLst>
+            </p:cNvPr>
+            <p:cNvSpPr/>
+            <p:nvPr/>
+          </p:nvSpPr>
+          <p:spPr bwMode="auto">
+            <a:xfrm>
+              <a:off x="4142228" y="2170290"/>
+              <a:ext cx="184171" cy="548634"/>
+            </a:xfrm>
+            <a:prstGeom prst="roundRect">
+              <a:avLst/>
+            </a:prstGeom>
+            <a:grpFill/>
+            <a:ln>
+              <a:solidFill>
+                <a:schemeClr val="bg1"/>
+              </a:solidFill>
+              <a:prstDash val="solid"/>
+              <a:headEnd type="none" w="med" len="med"/>
+              <a:tailEnd type="none" w="med" len="med"/>
+            </a:ln>
+            <a:effectLst/>
+          </p:spPr>
+          <p:style>
+            <a:lnRef idx="1">
+              <a:schemeClr val="accent5"/>
+            </a:lnRef>
+            <a:fillRef idx="3">
+              <a:schemeClr val="accent5"/>
+            </a:fillRef>
+            <a:effectRef idx="2">
+              <a:schemeClr val="accent5"/>
+            </a:effectRef>
+            <a:fontRef idx="minor">
+              <a:schemeClr val="lt1"/>
+            </a:fontRef>
+          </p:style>
+          <p:txBody>
+            <a:bodyPr vert="horz" wrap="square" lIns="0" tIns="0" rIns="0" bIns="0" numCol="1" rtlCol="0" anchor="ctr" anchorCtr="0" compatLnSpc="1">
+              <a:prstTxWarp prst="textNoShape">
+                <a:avLst/>
+              </a:prstTxWarp>
+              <a:noAutofit/>
+            </a:bodyPr>
+            <a:lstStyle/>
+            <a:p>
+              <a:pPr algn="ctr" defTabSz="685784" eaLnBrk="0" fontAlgn="base" hangingPunct="0">
+                <a:lnSpc>
+                  <a:spcPct val="90000"/>
+                </a:lnSpc>
+                <a:spcBef>
+                  <a:spcPct val="0"/>
+                </a:spcBef>
+                <a:spcAft>
+                  <a:spcPct val="0"/>
+                </a:spcAft>
+              </a:pPr>
+              <a:r>
+                <a:rPr lang="en-US" sz="675">
+                  <a:solidFill>
+                    <a:srgbClr val="FFFFFF"/>
+                  </a:solidFill>
+                  <a:latin typeface="Arial"/>
+                </a:rPr>
+                <a:t>0</a:t>
+              </a:r>
+              <a:endParaRPr lang="en-US" sz="375">
+                <a:solidFill>
+                  <a:srgbClr val="FFFFFF"/>
+                </a:solidFill>
+                <a:latin typeface="Arial"/>
+              </a:endParaRPr>
+            </a:p>
+          </p:txBody>
+        </p:sp>
+        <p:sp>
+          <p:nvSpPr>
+            <p:cNvPr id="61" name="Rounded Rectangle 60">
+              <a:extLst>
+                <a:ext uri="{FF2B5EF4-FFF2-40B4-BE49-F238E27FC236}">
+                  <a16:creationId xmlns:a16="http://schemas.microsoft.com/office/drawing/2014/main" id="{25FEF91A-27F6-0A46-BA6F-4762CB0B4693}"/>
+                </a:ext>
+              </a:extLst>
+            </p:cNvPr>
+            <p:cNvSpPr/>
+            <p:nvPr/>
+          </p:nvSpPr>
+          <p:spPr bwMode="auto">
+            <a:xfrm>
+              <a:off x="4325105" y="2170290"/>
+              <a:ext cx="184171" cy="548634"/>
+            </a:xfrm>
+            <a:prstGeom prst="roundRect">
+              <a:avLst/>
+            </a:prstGeom>
+            <a:grpFill/>
+            <a:ln>
+              <a:solidFill>
+                <a:schemeClr val="bg1"/>
+              </a:solidFill>
+              <a:prstDash val="solid"/>
+              <a:headEnd type="none" w="med" len="med"/>
+              <a:tailEnd type="none" w="med" len="med"/>
+            </a:ln>
+            <a:effectLst/>
+          </p:spPr>
+          <p:style>
+            <a:lnRef idx="1">
+              <a:schemeClr val="accent5"/>
+            </a:lnRef>
+            <a:fillRef idx="3">
+              <a:schemeClr val="accent5"/>
+            </a:fillRef>
+            <a:effectRef idx="2">
+              <a:schemeClr val="accent5"/>
+            </a:effectRef>
+            <a:fontRef idx="minor">
+              <a:schemeClr val="lt1"/>
+            </a:fontRef>
+          </p:style>
+          <p:txBody>
+            <a:bodyPr vert="horz" wrap="square" lIns="0" tIns="0" rIns="0" bIns="0" numCol="1" rtlCol="0" anchor="ctr" anchorCtr="0" compatLnSpc="1">
+              <a:prstTxWarp prst="textNoShape">
+                <a:avLst/>
+              </a:prstTxWarp>
+              <a:noAutofit/>
+            </a:bodyPr>
+            <a:lstStyle/>
+            <a:p>
+              <a:pPr algn="ctr" defTabSz="685784" eaLnBrk="0" fontAlgn="base" hangingPunct="0">
+                <a:lnSpc>
+                  <a:spcPct val="90000"/>
+                </a:lnSpc>
+                <a:spcBef>
+                  <a:spcPct val="0"/>
+                </a:spcBef>
+                <a:spcAft>
+                  <a:spcPct val="0"/>
+                </a:spcAft>
+              </a:pPr>
+              <a:r>
+                <a:rPr lang="en-US" sz="675">
+                  <a:solidFill>
+                    <a:srgbClr val="FFFFFF"/>
+                  </a:solidFill>
+                  <a:latin typeface="Arial"/>
+                </a:rPr>
+                <a:t>1</a:t>
+              </a:r>
+              <a:endParaRPr lang="en-US" sz="375">
+                <a:solidFill>
+                  <a:srgbClr val="FFFFFF"/>
+                </a:solidFill>
+                <a:latin typeface="Arial"/>
+              </a:endParaRPr>
+            </a:p>
+          </p:txBody>
+        </p:sp>
+        <p:sp>
+          <p:nvSpPr>
+            <p:cNvPr id="62" name="Rounded Rectangle 61">
+              <a:extLst>
+                <a:ext uri="{FF2B5EF4-FFF2-40B4-BE49-F238E27FC236}">
+                  <a16:creationId xmlns:a16="http://schemas.microsoft.com/office/drawing/2014/main" id="{3349F8B5-00F7-094B-A6C5-89B1479B83E8}"/>
+                </a:ext>
+              </a:extLst>
+            </p:cNvPr>
+            <p:cNvSpPr/>
+            <p:nvPr/>
+          </p:nvSpPr>
+          <p:spPr bwMode="auto">
+            <a:xfrm>
+              <a:off x="4509277" y="2170290"/>
+              <a:ext cx="184171" cy="548634"/>
+            </a:xfrm>
+            <a:prstGeom prst="roundRect">
+              <a:avLst/>
+            </a:prstGeom>
+            <a:grpFill/>
+            <a:ln>
+              <a:solidFill>
+                <a:schemeClr val="bg1"/>
+              </a:solidFill>
+              <a:prstDash val="solid"/>
+              <a:headEnd type="none" w="med" len="med"/>
+              <a:tailEnd type="none" w="med" len="med"/>
+            </a:ln>
+            <a:effectLst/>
+          </p:spPr>
+          <p:style>
+            <a:lnRef idx="1">
+              <a:schemeClr val="accent5"/>
+            </a:lnRef>
+            <a:fillRef idx="3">
+              <a:schemeClr val="accent5"/>
+            </a:fillRef>
+            <a:effectRef idx="2">
+              <a:schemeClr val="accent5"/>
+            </a:effectRef>
+            <a:fontRef idx="minor">
+              <a:schemeClr val="lt1"/>
+            </a:fontRef>
+          </p:style>
+          <p:txBody>
+            <a:bodyPr vert="horz" wrap="square" lIns="0" tIns="0" rIns="0" bIns="0" numCol="1" rtlCol="0" anchor="ctr" anchorCtr="0" compatLnSpc="1">
+              <a:prstTxWarp prst="textNoShape">
+                <a:avLst/>
+              </a:prstTxWarp>
+              <a:noAutofit/>
+            </a:bodyPr>
+            <a:lstStyle/>
+            <a:p>
+              <a:pPr algn="ctr" defTabSz="685784" eaLnBrk="0" fontAlgn="base" hangingPunct="0">
+                <a:lnSpc>
+                  <a:spcPct val="90000"/>
+                </a:lnSpc>
+                <a:spcBef>
+                  <a:spcPct val="0"/>
+                </a:spcBef>
+                <a:spcAft>
+                  <a:spcPct val="0"/>
+                </a:spcAft>
+              </a:pPr>
+              <a:r>
+                <a:rPr lang="en-US" sz="675">
+                  <a:solidFill>
+                    <a:srgbClr val="FFFFFF"/>
+                  </a:solidFill>
+                  <a:latin typeface="Arial"/>
+                </a:rPr>
+                <a:t>2</a:t>
+              </a:r>
+              <a:endParaRPr lang="en-US" sz="375">
+                <a:solidFill>
+                  <a:srgbClr val="FFFFFF"/>
+                </a:solidFill>
+                <a:latin typeface="Arial"/>
+              </a:endParaRPr>
+            </a:p>
+          </p:txBody>
+        </p:sp>
+        <p:sp>
+          <p:nvSpPr>
+            <p:cNvPr id="63" name="Rounded Rectangle 62">
+              <a:extLst>
+                <a:ext uri="{FF2B5EF4-FFF2-40B4-BE49-F238E27FC236}">
+                  <a16:creationId xmlns:a16="http://schemas.microsoft.com/office/drawing/2014/main" id="{BF93E0B7-5222-CA4E-B87F-E9F75D85DA75}"/>
+                </a:ext>
+              </a:extLst>
+            </p:cNvPr>
+            <p:cNvSpPr/>
+            <p:nvPr/>
+          </p:nvSpPr>
+          <p:spPr bwMode="auto">
+            <a:xfrm>
+              <a:off x="4692155" y="2170290"/>
+              <a:ext cx="184171" cy="548634"/>
+            </a:xfrm>
+            <a:prstGeom prst="roundRect">
+              <a:avLst/>
+            </a:prstGeom>
+            <a:grpFill/>
+            <a:ln>
+              <a:solidFill>
+                <a:schemeClr val="bg1"/>
+              </a:solidFill>
+              <a:prstDash val="solid"/>
+              <a:headEnd type="none" w="med" len="med"/>
+              <a:tailEnd type="none" w="med" len="med"/>
+            </a:ln>
+            <a:effectLst/>
+          </p:spPr>
+          <p:style>
+            <a:lnRef idx="1">
+              <a:schemeClr val="accent5"/>
+            </a:lnRef>
+            <a:fillRef idx="3">
+              <a:schemeClr val="accent5"/>
+            </a:fillRef>
+            <a:effectRef idx="2">
+              <a:schemeClr val="accent5"/>
+            </a:effectRef>
+            <a:fontRef idx="minor">
+              <a:schemeClr val="lt1"/>
+            </a:fontRef>
+          </p:style>
+          <p:txBody>
+            <a:bodyPr vert="horz" wrap="square" lIns="0" tIns="0" rIns="0" bIns="0" numCol="1" rtlCol="0" anchor="ctr" anchorCtr="0" compatLnSpc="1">
+              <a:prstTxWarp prst="textNoShape">
+                <a:avLst/>
+              </a:prstTxWarp>
+              <a:noAutofit/>
+            </a:bodyPr>
+            <a:lstStyle/>
+            <a:p>
+              <a:pPr algn="ctr" defTabSz="685784" eaLnBrk="0" fontAlgn="base" hangingPunct="0">
+                <a:lnSpc>
+                  <a:spcPct val="90000"/>
+                </a:lnSpc>
+                <a:spcBef>
+                  <a:spcPct val="0"/>
+                </a:spcBef>
+                <a:spcAft>
+                  <a:spcPct val="0"/>
+                </a:spcAft>
+              </a:pPr>
+              <a:r>
+                <a:rPr lang="en-US" sz="675">
+                  <a:solidFill>
+                    <a:srgbClr val="FFFFFF"/>
+                  </a:solidFill>
+                  <a:latin typeface="Arial"/>
+                </a:rPr>
+                <a:t>3</a:t>
+              </a:r>
+              <a:endParaRPr lang="en-US" sz="375">
+                <a:solidFill>
+                  <a:srgbClr val="FFFFFF"/>
+                </a:solidFill>
+                <a:latin typeface="Arial"/>
+              </a:endParaRPr>
+            </a:p>
+          </p:txBody>
+        </p:sp>
+      </p:grpSp>
+      <p:sp>
+        <p:nvSpPr>
+          <p:cNvPr id="64" name="TextBox 63">
+            <a:extLst>
+              <a:ext uri="{FF2B5EF4-FFF2-40B4-BE49-F238E27FC236}">
+                <a16:creationId xmlns:a16="http://schemas.microsoft.com/office/drawing/2014/main" id="{4B2F4F93-F429-0240-81C4-4D6E56493136}"/>
+              </a:ext>
+            </a:extLst>
+          </p:cNvPr>
+          <p:cNvSpPr txBox="1"/>
+          <p:nvPr/>
+        </p:nvSpPr>
+        <p:spPr>
+          <a:xfrm>
+            <a:off x="3000996" y="1011797"/>
+            <a:ext cx="694421" cy="246221"/>
+          </a:xfrm>
+          <a:prstGeom prst="rect">
+            <a:avLst/>
+          </a:prstGeom>
+          <a:noFill/>
+        </p:spPr>
+        <p:txBody>
+          <a:bodyPr wrap="none" rtlCol="0">
+            <a:spAutoFit/>
+          </a:bodyPr>
+          <a:lstStyle/>
+          <a:p>
+            <a:pPr eaLnBrk="0" fontAlgn="base" hangingPunct="0">
+              <a:spcBef>
+                <a:spcPct val="0"/>
+              </a:spcBef>
+              <a:spcAft>
+                <a:spcPct val="0"/>
+              </a:spcAft>
+            </a:pPr>
+            <a:r>
+              <a:rPr lang="en-US" sz="1000" dirty="0">
+                <a:solidFill>
+                  <a:srgbClr val="7CC7FF">
+                    <a:lumMod val="75000"/>
+                  </a:srgbClr>
+                </a:solidFill>
+                <a:latin typeface="Arial" panose="020B0604020202020204" pitchFamily="34" charset="0"/>
+                <a:cs typeface="Arial" panose="020B0604020202020204" pitchFamily="34" charset="0"/>
+              </a:rPr>
+              <a:t>accounts</a:t>
+            </a:r>
+          </a:p>
+        </p:txBody>
+      </p:sp>
+      <p:sp>
+        <p:nvSpPr>
+          <p:cNvPr id="65" name="TextBox 64">
+            <a:extLst>
+              <a:ext uri="{FF2B5EF4-FFF2-40B4-BE49-F238E27FC236}">
+                <a16:creationId xmlns:a16="http://schemas.microsoft.com/office/drawing/2014/main" id="{D2EF4825-55C7-D64B-9CC6-C4E9B1FB2DE2}"/>
+              </a:ext>
+            </a:extLst>
+          </p:cNvPr>
+          <p:cNvSpPr txBox="1"/>
+          <p:nvPr/>
+        </p:nvSpPr>
+        <p:spPr>
+          <a:xfrm>
+            <a:off x="7739235" y="1066084"/>
+            <a:ext cx="893193" cy="246221"/>
+          </a:xfrm>
+          <a:prstGeom prst="rect">
+            <a:avLst/>
+          </a:prstGeom>
+          <a:noFill/>
+        </p:spPr>
+        <p:txBody>
+          <a:bodyPr wrap="none" rtlCol="0">
+            <a:spAutoFit/>
+          </a:bodyPr>
+          <a:lstStyle/>
+          <a:p>
+            <a:pPr eaLnBrk="0" fontAlgn="base" hangingPunct="0">
+              <a:spcBef>
+                <a:spcPct val="0"/>
+              </a:spcBef>
+              <a:spcAft>
+                <a:spcPct val="0"/>
+              </a:spcAft>
+            </a:pPr>
+            <a:r>
+              <a:rPr lang="en-US" sz="1000" dirty="0">
+                <a:solidFill>
+                  <a:srgbClr val="7CC7FF">
+                    <a:lumMod val="75000"/>
+                  </a:srgbClr>
+                </a:solidFill>
+                <a:latin typeface="Arial" panose="020B0604020202020204" pitchFamily="34" charset="0"/>
+                <a:cs typeface="Arial" panose="020B0604020202020204" pitchFamily="34" charset="0"/>
+              </a:rPr>
+              <a:t>esi.accounts</a:t>
+            </a:r>
+          </a:p>
+        </p:txBody>
+      </p:sp>
+      <p:cxnSp>
+        <p:nvCxnSpPr>
+          <p:cNvPr id="66" name="Elbow Connector 65">
+            <a:extLst>
+              <a:ext uri="{FF2B5EF4-FFF2-40B4-BE49-F238E27FC236}">
+                <a16:creationId xmlns:a16="http://schemas.microsoft.com/office/drawing/2014/main" id="{04E1D577-F7BA-A54E-8951-2E5C45D2673F}"/>
+              </a:ext>
+            </a:extLst>
+          </p:cNvPr>
+          <p:cNvCxnSpPr>
+            <a:cxnSpLocks/>
+            <a:stCxn id="58" idx="3"/>
+            <a:endCxn id="54" idx="1"/>
+          </p:cNvCxnSpPr>
+          <p:nvPr/>
+        </p:nvCxnSpPr>
+        <p:spPr>
+          <a:xfrm>
+            <a:off x="3538837" y="1416135"/>
+            <a:ext cx="3557397" cy="1369490"/>
+          </a:xfrm>
+          <a:prstGeom prst="bentConnector3">
+            <a:avLst>
+              <a:gd name="adj1" fmla="val 50000"/>
+            </a:avLst>
+          </a:prstGeom>
+          <a:ln w="12700">
+            <a:solidFill>
+              <a:schemeClr val="accent2">
+                <a:lumMod val="75000"/>
+              </a:schemeClr>
+            </a:solidFill>
+            <a:tailEnd type="triangle"/>
+          </a:ln>
+          <a:effectLst/>
+        </p:spPr>
+        <p:style>
+          <a:lnRef idx="2">
+            <a:schemeClr val="accent1"/>
+          </a:lnRef>
+          <a:fillRef idx="0">
+            <a:schemeClr val="accent1"/>
+          </a:fillRef>
+          <a:effectRef idx="1">
+            <a:schemeClr val="accent1"/>
+          </a:effectRef>
+          <a:fontRef idx="minor">
+            <a:schemeClr val="tx1"/>
+          </a:fontRef>
+        </p:style>
+      </p:cxnSp>
+      <p:cxnSp>
+        <p:nvCxnSpPr>
+          <p:cNvPr id="67" name="Elbow Connector 66">
+            <a:extLst>
+              <a:ext uri="{FF2B5EF4-FFF2-40B4-BE49-F238E27FC236}">
+                <a16:creationId xmlns:a16="http://schemas.microsoft.com/office/drawing/2014/main" id="{F9EEE920-2F36-B647-B9B7-0D41C91AAB04}"/>
+              </a:ext>
+            </a:extLst>
+          </p:cNvPr>
+          <p:cNvCxnSpPr>
+            <a:cxnSpLocks/>
+            <a:stCxn id="54" idx="3"/>
+            <a:endCxn id="63" idx="2"/>
+          </p:cNvCxnSpPr>
+          <p:nvPr/>
+        </p:nvCxnSpPr>
+        <p:spPr>
+          <a:xfrm flipV="1">
+            <a:off x="8090639" y="1641468"/>
+            <a:ext cx="194748" cy="1144157"/>
+          </a:xfrm>
+          <a:prstGeom prst="bentConnector2">
+            <a:avLst/>
+          </a:prstGeom>
+          <a:ln w="12700">
+            <a:solidFill>
+              <a:schemeClr val="accent2">
+                <a:lumMod val="75000"/>
+              </a:schemeClr>
+            </a:solidFill>
+            <a:tailEnd type="triangle"/>
+          </a:ln>
+          <a:effectLst/>
+        </p:spPr>
+        <p:style>
+          <a:lnRef idx="2">
+            <a:schemeClr val="accent1"/>
+          </a:lnRef>
+          <a:fillRef idx="0">
+            <a:schemeClr val="accent1"/>
+          </a:fillRef>
+          <a:effectRef idx="1">
+            <a:schemeClr val="accent1"/>
+          </a:effectRef>
+          <a:fontRef idx="minor">
+            <a:schemeClr val="tx1"/>
+          </a:fontRef>
+        </p:style>
+      </p:cxnSp>
+      <p:cxnSp>
+        <p:nvCxnSpPr>
+          <p:cNvPr id="68" name="Elbow Connector 67">
+            <a:extLst>
+              <a:ext uri="{FF2B5EF4-FFF2-40B4-BE49-F238E27FC236}">
+                <a16:creationId xmlns:a16="http://schemas.microsoft.com/office/drawing/2014/main" id="{B473D33C-C78F-AF44-850B-4143BA1B6753}"/>
+              </a:ext>
+            </a:extLst>
+          </p:cNvPr>
+          <p:cNvCxnSpPr>
+            <a:cxnSpLocks/>
+            <a:stCxn id="51" idx="0"/>
+            <a:endCxn id="31" idx="2"/>
+          </p:cNvCxnSpPr>
+          <p:nvPr/>
+        </p:nvCxnSpPr>
+        <p:spPr>
+          <a:xfrm rot="5400000" flipH="1" flipV="1">
+            <a:off x="532518" y="1960023"/>
+            <a:ext cx="780999" cy="146093"/>
+          </a:xfrm>
+          <a:prstGeom prst="bentConnector3">
+            <a:avLst>
+              <a:gd name="adj1" fmla="val 50000"/>
+            </a:avLst>
+          </a:prstGeom>
+          <a:ln w="12700">
+            <a:solidFill>
+              <a:srgbClr val="953FDA"/>
+            </a:solidFill>
+            <a:headEnd type="none"/>
+            <a:tailEnd type="none"/>
+          </a:ln>
+          <a:effectLst/>
+        </p:spPr>
+        <p:style>
+          <a:lnRef idx="2">
+            <a:schemeClr val="accent1"/>
+          </a:lnRef>
+          <a:fillRef idx="0">
+            <a:schemeClr val="accent1"/>
+          </a:fillRef>
+          <a:effectRef idx="1">
+            <a:schemeClr val="accent1"/>
+          </a:effectRef>
+          <a:fontRef idx="minor">
+            <a:schemeClr val="tx1"/>
+          </a:fontRef>
+        </p:style>
+      </p:cxnSp>
+      <p:cxnSp>
+        <p:nvCxnSpPr>
+          <p:cNvPr id="69" name="Elbow Connector 68">
+            <a:extLst>
+              <a:ext uri="{FF2B5EF4-FFF2-40B4-BE49-F238E27FC236}">
+                <a16:creationId xmlns:a16="http://schemas.microsoft.com/office/drawing/2014/main" id="{EA906B92-3973-AC40-86F8-798C66D25F7A}"/>
+              </a:ext>
+            </a:extLst>
+          </p:cNvPr>
+          <p:cNvCxnSpPr>
+            <a:cxnSpLocks/>
+            <a:stCxn id="76" idx="0"/>
+            <a:endCxn id="58" idx="2"/>
+          </p:cNvCxnSpPr>
+          <p:nvPr/>
+        </p:nvCxnSpPr>
+        <p:spPr>
+          <a:xfrm rot="5400000" flipH="1" flipV="1">
+            <a:off x="1852784" y="1862542"/>
+            <a:ext cx="1857657" cy="1376321"/>
+          </a:xfrm>
+          <a:prstGeom prst="bentConnector3">
+            <a:avLst>
+              <a:gd name="adj1" fmla="val 50000"/>
+            </a:avLst>
+          </a:prstGeom>
+          <a:ln w="12700">
+            <a:solidFill>
+              <a:schemeClr val="accent2">
+                <a:lumMod val="75000"/>
+              </a:schemeClr>
+            </a:solidFill>
+            <a:headEnd type="triangle"/>
+            <a:tailEnd type="triangle"/>
+          </a:ln>
+          <a:effectLst/>
+        </p:spPr>
+        <p:style>
+          <a:lnRef idx="2">
+            <a:schemeClr val="accent1"/>
+          </a:lnRef>
+          <a:fillRef idx="0">
+            <a:schemeClr val="accent1"/>
+          </a:fillRef>
+          <a:effectRef idx="1">
+            <a:schemeClr val="accent1"/>
+          </a:effectRef>
+          <a:fontRef idx="minor">
+            <a:schemeClr val="tx1"/>
+          </a:fontRef>
+        </p:style>
+      </p:cxnSp>
+      <p:cxnSp>
+        <p:nvCxnSpPr>
+          <p:cNvPr id="70" name="Elbow Connector 69">
+            <a:extLst>
+              <a:ext uri="{FF2B5EF4-FFF2-40B4-BE49-F238E27FC236}">
+                <a16:creationId xmlns:a16="http://schemas.microsoft.com/office/drawing/2014/main" id="{4D8B9D72-96A0-7043-AA3B-D10CE59AD7BB}"/>
+              </a:ext>
+            </a:extLst>
+          </p:cNvPr>
+          <p:cNvCxnSpPr>
+            <a:cxnSpLocks/>
+            <a:endCxn id="12" idx="2"/>
+          </p:cNvCxnSpPr>
+          <p:nvPr/>
+        </p:nvCxnSpPr>
+        <p:spPr>
+          <a:xfrm rot="16200000" flipV="1">
+            <a:off x="5286126" y="2487780"/>
+            <a:ext cx="1872861" cy="110639"/>
+          </a:xfrm>
+          <a:prstGeom prst="bentConnector3">
+            <a:avLst>
+              <a:gd name="adj1" fmla="val 50000"/>
+            </a:avLst>
+          </a:prstGeom>
+          <a:ln w="15875">
+            <a:solidFill>
+              <a:srgbClr val="00B050"/>
+            </a:solidFill>
+            <a:headEnd type="triangle"/>
+            <a:tailEnd type="triangle"/>
+          </a:ln>
+          <a:effectLst/>
+        </p:spPr>
+        <p:style>
+          <a:lnRef idx="2">
+            <a:schemeClr val="accent1"/>
+          </a:lnRef>
+          <a:fillRef idx="0">
+            <a:schemeClr val="accent1"/>
+          </a:fillRef>
+          <a:effectRef idx="1">
+            <a:schemeClr val="accent1"/>
+          </a:effectRef>
+          <a:fontRef idx="minor">
+            <a:schemeClr val="tx1"/>
+          </a:fontRef>
+        </p:style>
+      </p:cxnSp>
+      <p:pic>
+        <p:nvPicPr>
+          <p:cNvPr id="72" name="Picture 71">
+            <a:extLst>
+              <a:ext uri="{FF2B5EF4-FFF2-40B4-BE49-F238E27FC236}">
+                <a16:creationId xmlns:a16="http://schemas.microsoft.com/office/drawing/2014/main" id="{7AA36845-A2F6-2543-821D-F06C70CC4B8C}"/>
+              </a:ext>
+            </a:extLst>
+          </p:cNvPr>
+          <p:cNvPicPr>
+            <a:picLocks noChangeAspect="1"/>
+          </p:cNvPicPr>
+          <p:nvPr/>
+        </p:nvPicPr>
+        <p:blipFill>
+          <a:blip r:embed="rId2">
+            <a:extLst>
+              <a:ext uri="{28A0092B-C50C-407E-A947-70E740481C1C}">
+                <a14:useLocalDpi xmlns:a14="http://schemas.microsoft.com/office/drawing/2010/main" val="0"/>
+              </a:ext>
+            </a:extLst>
+          </a:blip>
+          <a:stretch>
+            <a:fillRect/>
+          </a:stretch>
+        </p:blipFill>
+        <p:spPr>
+          <a:xfrm>
+            <a:off x="300840" y="1607985"/>
+            <a:ext cx="191007" cy="252252"/>
+          </a:xfrm>
+          <a:prstGeom prst="rect">
+            <a:avLst/>
+          </a:prstGeom>
+        </p:spPr>
+      </p:pic>
+      <p:pic>
+        <p:nvPicPr>
+          <p:cNvPr id="71" name="Picture 70" descr="A picture containing sign, clock&#10;&#10;Description automatically generated">
+            <a:extLst>
+              <a:ext uri="{FF2B5EF4-FFF2-40B4-BE49-F238E27FC236}">
+                <a16:creationId xmlns:a16="http://schemas.microsoft.com/office/drawing/2014/main" id="{7908A8B9-9BE3-D342-9BAF-8EF0C1CD40BC}"/>
+              </a:ext>
+            </a:extLst>
+          </p:cNvPr>
+          <p:cNvPicPr>
+            <a:picLocks noChangeAspect="1"/>
+          </p:cNvPicPr>
+          <p:nvPr/>
+        </p:nvPicPr>
+        <p:blipFill>
+          <a:blip r:embed="rId4"/>
+          <a:stretch>
+            <a:fillRect/>
+          </a:stretch>
+        </p:blipFill>
+        <p:spPr>
+          <a:xfrm>
+            <a:off x="8488079" y="604643"/>
+            <a:ext cx="397442" cy="351885"/>
+          </a:xfrm>
+          <a:prstGeom prst="rect">
+            <a:avLst/>
+          </a:prstGeom>
+          <a:solidFill>
+            <a:schemeClr val="bg1"/>
+          </a:solidFill>
+        </p:spPr>
+      </p:pic>
+      <p:sp>
+        <p:nvSpPr>
+          <p:cNvPr id="76" name="Rounded Rectangle 75">
+            <a:extLst>
+              <a:ext uri="{FF2B5EF4-FFF2-40B4-BE49-F238E27FC236}">
+                <a16:creationId xmlns:a16="http://schemas.microsoft.com/office/drawing/2014/main" id="{2C1CB860-FD57-8546-9BDC-D947F9E2CD08}"/>
+              </a:ext>
+            </a:extLst>
+          </p:cNvPr>
+          <p:cNvSpPr/>
+          <p:nvPr/>
+        </p:nvSpPr>
+        <p:spPr>
+          <a:xfrm>
+            <a:off x="1583267" y="3479530"/>
+            <a:ext cx="1020370" cy="421662"/>
+          </a:xfrm>
+          <a:prstGeom prst="roundRect">
+            <a:avLst/>
+          </a:prstGeom>
+          <a:solidFill>
+            <a:srgbClr val="00B050"/>
+          </a:solidFill>
+          <a:ln>
+            <a:noFill/>
+          </a:ln>
+          <a:effectLst>
+            <a:outerShdw blurRad="50800" dist="38100" dir="5400000" algn="t" rotWithShape="0">
+              <a:prstClr val="black">
+                <a:alpha val="40000"/>
+              </a:prstClr>
+            </a:outerShdw>
+          </a:effectLst>
+        </p:spPr>
+        <p:style>
+          <a:lnRef idx="2">
+            <a:schemeClr val="accent1">
+              <a:shade val="50000"/>
+            </a:schemeClr>
+          </a:lnRef>
+          <a:fillRef idx="1">
+            <a:schemeClr val="accent1"/>
+          </a:fillRef>
+          <a:effectRef idx="0">
+            <a:schemeClr val="accent1"/>
+          </a:effectRef>
+          <a:fontRef idx="minor">
+            <a:schemeClr val="lt1"/>
+          </a:fontRef>
+        </p:style>
+        <p:txBody>
+          <a:bodyPr rtlCol="0" anchor="t"/>
+          <a:lstStyle/>
+          <a:p>
+            <a:pPr algn="ctr" defTabSz="514350"/>
+            <a:r>
+              <a:rPr lang="en-US" sz="750" dirty="0">
+                <a:solidFill>
+                  <a:prstClr val="white"/>
+                </a:solidFill>
+                <a:latin typeface="Arial"/>
+              </a:rPr>
+              <a:t>Perf Producer </a:t>
+            </a:r>
+          </a:p>
+        </p:txBody>
+      </p:sp>
+      <p:sp>
+        <p:nvSpPr>
+          <p:cNvPr id="80" name="Rounded Rectangle 79">
+            <a:extLst>
+              <a:ext uri="{FF2B5EF4-FFF2-40B4-BE49-F238E27FC236}">
+                <a16:creationId xmlns:a16="http://schemas.microsoft.com/office/drawing/2014/main" id="{F30DA413-A71D-6343-B4AA-D8C5D57CE1A0}"/>
+              </a:ext>
+            </a:extLst>
+          </p:cNvPr>
+          <p:cNvSpPr/>
+          <p:nvPr/>
+        </p:nvSpPr>
+        <p:spPr>
+          <a:xfrm>
+            <a:off x="5381765" y="3479530"/>
+            <a:ext cx="1020370" cy="421662"/>
+          </a:xfrm>
+          <a:prstGeom prst="roundRect">
+            <a:avLst/>
+          </a:prstGeom>
+          <a:solidFill>
+            <a:srgbClr val="00B050"/>
+          </a:solidFill>
+          <a:ln>
+            <a:noFill/>
+          </a:ln>
+          <a:effectLst>
+            <a:outerShdw blurRad="50800" dist="38100" dir="5400000" algn="t" rotWithShape="0">
+              <a:prstClr val="black">
+                <a:alpha val="40000"/>
+              </a:prstClr>
+            </a:outerShdw>
+          </a:effectLst>
+        </p:spPr>
+        <p:style>
+          <a:lnRef idx="2">
+            <a:schemeClr val="accent1">
+              <a:shade val="50000"/>
+            </a:schemeClr>
+          </a:lnRef>
+          <a:fillRef idx="1">
+            <a:schemeClr val="accent1"/>
+          </a:fillRef>
+          <a:effectRef idx="0">
+            <a:schemeClr val="accent1"/>
+          </a:effectRef>
+          <a:fontRef idx="minor">
+            <a:schemeClr val="lt1"/>
+          </a:fontRef>
+        </p:style>
+        <p:txBody>
+          <a:bodyPr rtlCol="0" anchor="t"/>
+          <a:lstStyle/>
+          <a:p>
+            <a:pPr algn="ctr" defTabSz="514350"/>
+            <a:r>
+              <a:rPr lang="en-US" sz="750" dirty="0">
+                <a:solidFill>
+                  <a:prstClr val="white"/>
+                </a:solidFill>
+                <a:latin typeface="Arial"/>
+              </a:rPr>
+              <a:t>Perf Producer </a:t>
+            </a:r>
+          </a:p>
+        </p:txBody>
+      </p:sp>
+    </p:spTree>
+    <p:extLst>
+      <p:ext uri="{BB962C8B-B14F-4D97-AF65-F5344CB8AC3E}">
+        <p14:creationId xmlns:p14="http://schemas.microsoft.com/office/powerpoint/2010/main" val="2552631241"/>
+      </p:ext>
+    </p:extLst>
+  </p:cSld>
+  <p:clrMapOvr>
+    <a:masterClrMapping/>
+  </p:clrMapOvr>
+</p:sld>
+</file>
+
+<file path=ppt/slides/slide21.xml><?xml version="1.0" encoding="utf-8"?>
+<p:sld xmlns:a="http://schemas.openxmlformats.org/drawingml/2006/main" xmlns:r="http://schemas.openxmlformats.org/officeDocument/2006/relationships" xmlns:p="http://schemas.openxmlformats.org/presentationml/2006/main">
+  <p:cSld>
+    <p:spTree>
+      <p:nvGrpSpPr>
+        <p:cNvPr id="1" name=""/>
+        <p:cNvGrpSpPr/>
+        <p:nvPr/>
+      </p:nvGrpSpPr>
+      <p:grpSpPr>
+        <a:xfrm>
+          <a:off x="0" y="0"/>
+          <a:ext cx="0" cy="0"/>
+          <a:chOff x="0" y="0"/>
+          <a:chExt cx="0" cy="0"/>
+        </a:xfrm>
+      </p:grpSpPr>
+      <p:sp>
+        <p:nvSpPr>
+          <p:cNvPr id="2" name="Title 1">
+            <a:extLst>
+              <a:ext uri="{FF2B5EF4-FFF2-40B4-BE49-F238E27FC236}">
+                <a16:creationId xmlns:a16="http://schemas.microsoft.com/office/drawing/2014/main" id="{58169065-201E-5F42-BB75-6EA30E0A8D38}"/>
+              </a:ext>
+            </a:extLst>
+          </p:cNvPr>
+          <p:cNvSpPr>
+            <a:spLocks noGrp="1"/>
+          </p:cNvSpPr>
+          <p:nvPr>
+            <p:ph type="title"/>
+          </p:nvPr>
+        </p:nvSpPr>
+        <p:spPr/>
+        <p:txBody>
+          <a:bodyPr/>
+          <a:lstStyle/>
+          <a:p>
+            <a:r>
+              <a:rPr lang="en-US" dirty="0"/>
               <a:t>Mirror maker monitoring</a:t>
             </a:r>
             <a:endParaRPr dirty="0"/>
@@ -31193,7 +34840,7 @@
                 </a:solidFill>
               </a:rPr>
               <a:pPr/>
-              <a:t>20</a:t>
+              <a:t>21</a:t>
             </a:fld>
             <a:endParaRPr lang="en-US">
               <a:solidFill>

</xml_diff>

<commit_message>
Deployed 749fccc with MkDocs version: 1.0.4
</commit_message>
<xml_diff>
--- a/mm2-diagrams.pptx
+++ b/mm2-diagrams.pptx
@@ -235,7 +235,7 @@
           <a:p>
             <a:fld id="{43B1B1F9-D0CB-FF4D-BEE0-BED1F1FDA196}" type="datetimeFigureOut">
               <a:rPr lang="en-US" smtClean="0"/>
-              <a:t>4/24/20</a:t>
+              <a:t>4/29/20</a:t>
             </a:fld>
             <a:endParaRPr lang="en-US"/>
           </a:p>
@@ -400,7 +400,7 @@
           <a:p>
             <a:fld id="{26BE012A-D992-5D42-B86E-AA2BC0764EE1}" type="datetimeFigureOut">
               <a:rPr lang="en-US" smtClean="0"/>
-              <a:t>4/24/20</a:t>
+              <a:t>4/29/20</a:t>
             </a:fld>
             <a:endParaRPr lang="en-US"/>
           </a:p>
@@ -3442,14 +3442,14 @@
           </a:ln>
           <a:extLst>
             <a:ext uri="{909E8E84-426E-40dd-AFC4-6F175D3DCCD1}">
-              <a14:hiddenFill xmlns:a14="http://schemas.microsoft.com/office/drawing/2010/main" xmlns="">
+              <a14:hiddenFill xmlns="" xmlns:a14="http://schemas.microsoft.com/office/drawing/2010/main">
                 <a:solidFill>
                   <a:srgbClr val="FFFFFF"/>
                 </a:solidFill>
               </a14:hiddenFill>
             </a:ext>
             <a:ext uri="{91240B29-F687-4f45-9708-019B960494DF}">
-              <a14:hiddenLine xmlns:a14="http://schemas.microsoft.com/office/drawing/2010/main" xmlns="" w="9525">
+              <a14:hiddenLine xmlns="" xmlns:a14="http://schemas.microsoft.com/office/drawing/2010/main" w="9525">
                 <a:solidFill>
                   <a:srgbClr val="000000"/>
                 </a:solidFill>
@@ -3501,14 +3501,14 @@
           <a:effectLst/>
           <a:extLst>
             <a:ext uri="{909E8E84-426E-40dd-AFC4-6F175D3DCCD1}">
-              <a14:hiddenFill xmlns:a14="http://schemas.microsoft.com/office/drawing/2010/main" xmlns="">
+              <a14:hiddenFill xmlns="" xmlns:a14="http://schemas.microsoft.com/office/drawing/2010/main">
                 <a:solidFill>
                   <a:schemeClr val="accent1"/>
                 </a:solidFill>
               </a14:hiddenFill>
             </a:ext>
             <a:ext uri="{91240B29-F687-4f45-9708-019B960494DF}">
-              <a14:hiddenLine xmlns:a14="http://schemas.microsoft.com/office/drawing/2010/main" xmlns="" w="9525">
+              <a14:hiddenLine xmlns="" xmlns:a14="http://schemas.microsoft.com/office/drawing/2010/main" w="9525">
                 <a:solidFill>
                   <a:schemeClr val="tx1"/>
                 </a:solidFill>
@@ -3518,7 +3518,7 @@
               </a14:hiddenLine>
             </a:ext>
             <a:ext uri="{AF507438-7753-43e0-B8FC-AC1667EBCBE1}">
-              <a14:hiddenEffects xmlns:a14="http://schemas.microsoft.com/office/drawing/2010/main" xmlns="">
+              <a14:hiddenEffects xmlns="" xmlns:a14="http://schemas.microsoft.com/office/drawing/2010/main">
                 <a:effectLst>
                   <a:outerShdw blurRad="63500" dist="38099" dir="2700000" algn="ctr" rotWithShape="0">
                     <a:schemeClr val="bg2">
@@ -4234,10 +4234,10 @@
           </a:ln>
           <a:extLst>
             <a:ext uri="{FAA26D3D-D897-4be2-8F04-BA451C77F1D7}">
-              <ma14:placeholderFlag xmlns="" xmlns:ma14="http://schemas.microsoft.com/office/mac/drawingml/2011/main" val="1"/>
+              <ma14:placeholderFlag xmlns:ma14="http://schemas.microsoft.com/office/mac/drawingml/2011/main" xmlns="" val="1"/>
             </a:ext>
             <a:ext uri="{909E8E84-426E-40dd-AFC4-6F175D3DCCD1}">
-              <a14:hiddenFill xmlns="" xmlns:a14="http://schemas.microsoft.com/office/drawing/2010/main">
+              <a14:hiddenFill xmlns:a14="http://schemas.microsoft.com/office/drawing/2010/main" xmlns="">
                 <a:solidFill>
                   <a:srgbClr val="FFFFFF"/>
                 </a:solidFill>
@@ -4288,10 +4288,10 @@
           </a:ln>
           <a:extLst>
             <a:ext uri="{FAA26D3D-D897-4be2-8F04-BA451C77F1D7}">
-              <ma14:placeholderFlag xmlns="" xmlns:ma14="http://schemas.microsoft.com/office/mac/drawingml/2011/main" val="1"/>
+              <ma14:placeholderFlag xmlns:ma14="http://schemas.microsoft.com/office/mac/drawingml/2011/main" xmlns="" val="1"/>
             </a:ext>
             <a:ext uri="{909E8E84-426E-40dd-AFC4-6F175D3DCCD1}">
-              <a14:hiddenFill xmlns="" xmlns:a14="http://schemas.microsoft.com/office/drawing/2010/main">
+              <a14:hiddenFill xmlns:a14="http://schemas.microsoft.com/office/drawing/2010/main" xmlns="">
                 <a:solidFill>
                   <a:srgbClr val="FFFFFF"/>
                 </a:solidFill>
@@ -26104,7 +26104,7 @@
         </p:nvCxnSpPr>
         <p:spPr>
           <a:xfrm>
-            <a:off x="1770069" y="941590"/>
+            <a:off x="1793819" y="941590"/>
             <a:ext cx="0" cy="2208850"/>
           </a:xfrm>
           <a:prstGeom prst="straightConnector1">

</xml_diff>

<commit_message>
Deployed 98be6fd with MkDocs version: 1.0.4
</commit_message>
<xml_diff>
--- a/mm2-diagrams.pptx
+++ b/mm2-diagrams.pptx
@@ -235,7 +235,7 @@
           <a:p>
             <a:fld id="{43B1B1F9-D0CB-FF4D-BEE0-BED1F1FDA196}" type="datetimeFigureOut">
               <a:rPr lang="en-US" smtClean="0"/>
-              <a:t>4/29/20</a:t>
+              <a:t>5/15/20</a:t>
             </a:fld>
             <a:endParaRPr lang="en-US"/>
           </a:p>
@@ -400,7 +400,7 @@
           <a:p>
             <a:fld id="{26BE012A-D992-5D42-B86E-AA2BC0764EE1}" type="datetimeFigureOut">
               <a:rPr lang="en-US" smtClean="0"/>
-              <a:t>4/29/20</a:t>
+              <a:t>5/15/20</a:t>
             </a:fld>
             <a:endParaRPr lang="en-US"/>
           </a:p>
@@ -3442,14 +3442,14 @@
           </a:ln>
           <a:extLst>
             <a:ext uri="{909E8E84-426E-40dd-AFC4-6F175D3DCCD1}">
-              <a14:hiddenFill xmlns="" xmlns:a14="http://schemas.microsoft.com/office/drawing/2010/main">
+              <a14:hiddenFill xmlns:a14="http://schemas.microsoft.com/office/drawing/2010/main" xmlns="">
                 <a:solidFill>
                   <a:srgbClr val="FFFFFF"/>
                 </a:solidFill>
               </a14:hiddenFill>
             </a:ext>
             <a:ext uri="{91240B29-F687-4f45-9708-019B960494DF}">
-              <a14:hiddenLine xmlns="" xmlns:a14="http://schemas.microsoft.com/office/drawing/2010/main" w="9525">
+              <a14:hiddenLine xmlns:a14="http://schemas.microsoft.com/office/drawing/2010/main" xmlns="" w="9525">
                 <a:solidFill>
                   <a:srgbClr val="000000"/>
                 </a:solidFill>
@@ -3501,14 +3501,14 @@
           <a:effectLst/>
           <a:extLst>
             <a:ext uri="{909E8E84-426E-40dd-AFC4-6F175D3DCCD1}">
-              <a14:hiddenFill xmlns="" xmlns:a14="http://schemas.microsoft.com/office/drawing/2010/main">
+              <a14:hiddenFill xmlns:a14="http://schemas.microsoft.com/office/drawing/2010/main" xmlns="">
                 <a:solidFill>
                   <a:schemeClr val="accent1"/>
                 </a:solidFill>
               </a14:hiddenFill>
             </a:ext>
             <a:ext uri="{91240B29-F687-4f45-9708-019B960494DF}">
-              <a14:hiddenLine xmlns="" xmlns:a14="http://schemas.microsoft.com/office/drawing/2010/main" w="9525">
+              <a14:hiddenLine xmlns:a14="http://schemas.microsoft.com/office/drawing/2010/main" xmlns="" w="9525">
                 <a:solidFill>
                   <a:schemeClr val="tx1"/>
                 </a:solidFill>
@@ -3518,7 +3518,7 @@
               </a14:hiddenLine>
             </a:ext>
             <a:ext uri="{AF507438-7753-43e0-B8FC-AC1667EBCBE1}">
-              <a14:hiddenEffects xmlns="" xmlns:a14="http://schemas.microsoft.com/office/drawing/2010/main">
+              <a14:hiddenEffects xmlns:a14="http://schemas.microsoft.com/office/drawing/2010/main" xmlns="">
                 <a:effectLst>
                   <a:outerShdw blurRad="63500" dist="38099" dir="2700000" algn="ctr" rotWithShape="0">
                     <a:schemeClr val="bg2">
@@ -4234,10 +4234,10 @@
           </a:ln>
           <a:extLst>
             <a:ext uri="{FAA26D3D-D897-4be2-8F04-BA451C77F1D7}">
-              <ma14:placeholderFlag xmlns:ma14="http://schemas.microsoft.com/office/mac/drawingml/2011/main" xmlns="" val="1"/>
+              <ma14:placeholderFlag xmlns="" xmlns:ma14="http://schemas.microsoft.com/office/mac/drawingml/2011/main" val="1"/>
             </a:ext>
             <a:ext uri="{909E8E84-426E-40dd-AFC4-6F175D3DCCD1}">
-              <a14:hiddenFill xmlns:a14="http://schemas.microsoft.com/office/drawing/2010/main" xmlns="">
+              <a14:hiddenFill xmlns="" xmlns:a14="http://schemas.microsoft.com/office/drawing/2010/main">
                 <a:solidFill>
                   <a:srgbClr val="FFFFFF"/>
                 </a:solidFill>
@@ -4288,10 +4288,10 @@
           </a:ln>
           <a:extLst>
             <a:ext uri="{FAA26D3D-D897-4be2-8F04-BA451C77F1D7}">
-              <ma14:placeholderFlag xmlns:ma14="http://schemas.microsoft.com/office/mac/drawingml/2011/main" xmlns="" val="1"/>
+              <ma14:placeholderFlag xmlns="" xmlns:ma14="http://schemas.microsoft.com/office/mac/drawingml/2011/main" val="1"/>
             </a:ext>
             <a:ext uri="{909E8E84-426E-40dd-AFC4-6F175D3DCCD1}">
-              <a14:hiddenFill xmlns:a14="http://schemas.microsoft.com/office/drawing/2010/main" xmlns="">
+              <a14:hiddenFill xmlns="" xmlns:a14="http://schemas.microsoft.com/office/drawing/2010/main">
                 <a:solidFill>
                   <a:srgbClr val="FFFFFF"/>
                 </a:solidFill>
@@ -49154,7 +49154,7 @@
         </p:nvSpPr>
         <p:spPr bwMode="auto">
           <a:xfrm>
-            <a:off x="6645551" y="2551843"/>
+            <a:off x="2120839" y="2647089"/>
             <a:ext cx="1812650" cy="980126"/>
           </a:xfrm>
           <a:prstGeom prst="roundRect">
@@ -49417,7 +49417,7 @@
         </p:nvSpPr>
         <p:spPr>
           <a:xfrm>
-            <a:off x="7130073" y="3016890"/>
+            <a:off x="2571508" y="3147606"/>
             <a:ext cx="994405" cy="292973"/>
           </a:xfrm>
           <a:prstGeom prst="roundRect">
@@ -49585,14 +49585,14 @@
           <p:nvPr/>
         </p:nvCxnSpPr>
         <p:spPr>
-          <a:xfrm rot="16200000" flipH="1">
-            <a:off x="6312394" y="1351293"/>
-            <a:ext cx="1528798" cy="2095370"/>
+          <a:xfrm rot="16200000" flipH="1" flipV="1">
+            <a:off x="3967754" y="1232738"/>
+            <a:ext cx="1659514" cy="2463195"/>
           </a:xfrm>
           <a:prstGeom prst="bentConnector4">
             <a:avLst>
-              <a:gd name="adj1" fmla="val -14953"/>
-              <a:gd name="adj2" fmla="val 130179"/>
+              <a:gd name="adj1" fmla="val -13775"/>
+              <a:gd name="adj2" fmla="val 51402"/>
             </a:avLst>
           </a:prstGeom>
           <a:ln w="12700">
@@ -49636,8 +49636,8 @@
         </p:nvCxnSpPr>
         <p:spPr>
           <a:xfrm rot="10800000">
-            <a:off x="1943107" y="2046571"/>
-            <a:ext cx="5186966" cy="1116807"/>
+            <a:off x="1943108" y="2046571"/>
+            <a:ext cx="628401" cy="1247523"/>
           </a:xfrm>
           <a:prstGeom prst="bentConnector2">
             <a:avLst/>
@@ -49679,7 +49679,7 @@
         </p:nvSpPr>
         <p:spPr>
           <a:xfrm>
-            <a:off x="7136814" y="2698743"/>
+            <a:off x="2587605" y="2792726"/>
             <a:ext cx="994405" cy="292973"/>
           </a:xfrm>
           <a:prstGeom prst="roundRect">
@@ -50563,13 +50563,15 @@
           <p:nvPr/>
         </p:nvCxnSpPr>
         <p:spPr>
-          <a:xfrm>
-            <a:off x="3657244" y="1833455"/>
-            <a:ext cx="3479570" cy="1011774"/>
-          </a:xfrm>
-          <a:prstGeom prst="bentConnector3">
+          <a:xfrm flipH="1">
+            <a:off x="2587605" y="1833455"/>
+            <a:ext cx="1069640" cy="1105758"/>
+          </a:xfrm>
+          <a:prstGeom prst="bentConnector5">
             <a:avLst>
-              <a:gd name="adj1" fmla="val 24378"/>
+              <a:gd name="adj1" fmla="val -21372"/>
+              <a:gd name="adj2" fmla="val 52679"/>
+              <a:gd name="adj3" fmla="val 121372"/>
             </a:avLst>
           </a:prstGeom>
           <a:ln w="12700">
@@ -50831,12 +50833,12 @@
         </p:nvCxnSpPr>
         <p:spPr>
           <a:xfrm flipV="1">
-            <a:off x="8131219" y="1827611"/>
-            <a:ext cx="199482" cy="1017619"/>
+            <a:off x="3582010" y="1827611"/>
+            <a:ext cx="4748691" cy="1111602"/>
           </a:xfrm>
           <a:prstGeom prst="bentConnector3">
             <a:avLst>
-              <a:gd name="adj1" fmla="val 257385"/>
+              <a:gd name="adj1" fmla="val 104814"/>
             </a:avLst>
           </a:prstGeom>
           <a:ln w="12700">

</xml_diff>